<commit_message>
Title and Graph Names Update
</commit_message>
<xml_diff>
--- a/Presentation/MSDS_7330_Group_Project_Presentation.pptx
+++ b/Presentation/MSDS_7330_Group_Project_Presentation.pptx
@@ -5,7 +5,7 @@
     <p:sldMasterId id="2147483648" r:id="rId1"/>
   </p:sldMasterIdLst>
   <p:notesMasterIdLst>
-    <p:notesMasterId r:id="rId22"/>
+    <p:notesMasterId r:id="rId21"/>
   </p:notesMasterIdLst>
   <p:sldIdLst>
     <p:sldId id="256" r:id="rId2"/>
@@ -22,12 +22,11 @@
     <p:sldId id="273" r:id="rId13"/>
     <p:sldId id="274" r:id="rId14"/>
     <p:sldId id="263" r:id="rId15"/>
-    <p:sldId id="276" r:id="rId16"/>
-    <p:sldId id="257" r:id="rId17"/>
-    <p:sldId id="258" r:id="rId18"/>
-    <p:sldId id="262" r:id="rId19"/>
-    <p:sldId id="275" r:id="rId20"/>
-    <p:sldId id="266" r:id="rId21"/>
+    <p:sldId id="257" r:id="rId16"/>
+    <p:sldId id="258" r:id="rId17"/>
+    <p:sldId id="262" r:id="rId18"/>
+    <p:sldId id="275" r:id="rId19"/>
+    <p:sldId id="266" r:id="rId20"/>
   </p:sldIdLst>
   <p:sldSz cx="12192000" cy="6858000"/>
   <p:notesSz cx="6858000" cy="9144000"/>
@@ -1144,9 +1143,9 @@
     <dgm:cxn modelId="{D824D305-A2DE-2840-9434-75869C296825}" type="presOf" srcId="{D98B5C20-E098-694C-BF21-1ECF2915B5ED}" destId="{25C79D8A-E005-CC41-8C9F-3DF08186CA03}" srcOrd="0" destOrd="0" presId="urn:microsoft.com/office/officeart/2008/layout/RadialCluster"/>
     <dgm:cxn modelId="{A099E015-E820-9F49-941A-E28E7D86B781}" type="presOf" srcId="{CEFBE1CC-099A-F24C-92AA-FE35AB04CF4D}" destId="{529BF845-11CD-4D41-B588-97A4CB9F5547}" srcOrd="0" destOrd="0" presId="urn:microsoft.com/office/officeart/2008/layout/RadialCluster"/>
     <dgm:cxn modelId="{DAC51719-A7B4-AC47-AC21-5EDFD0D938CC}" type="presOf" srcId="{AFBB05AA-B00F-7942-944F-AE8CA6A3C623}" destId="{B37337EC-F7E1-C14B-8D69-1DE47B592ABE}" srcOrd="0" destOrd="0" presId="urn:microsoft.com/office/officeart/2008/layout/RadialCluster"/>
-    <dgm:cxn modelId="{548E8263-BAB8-9B45-9BF5-A81D8B50C58A}" srcId="{6C822FC1-F83A-C847-948B-E21719CC17CD}" destId="{AFBB05AA-B00F-7942-944F-AE8CA6A3C623}" srcOrd="0" destOrd="0" parTransId="{21680FB6-6688-7641-8814-DF6BFB4F9080}" sibTransId="{1126CFBB-1CF0-1945-A915-815EEECBE25A}"/>
     <dgm:cxn modelId="{EA2E4352-266D-9843-AA16-F922226B0420}" srcId="{AFBB05AA-B00F-7942-944F-AE8CA6A3C623}" destId="{BE0979DF-D84E-2345-97A8-8E6EA685D256}" srcOrd="0" destOrd="0" parTransId="{00CE1E3D-5895-6446-9F3E-AB4E4BE5A0C8}" sibTransId="{AC7DC699-FDF3-A545-BD8C-DA84E1E60879}"/>
     <dgm:cxn modelId="{E6287F54-7571-CC49-B241-6162FC723866}" type="presOf" srcId="{21680FB6-6688-7641-8814-DF6BFB4F9080}" destId="{8F5EC628-7EE7-8643-A56A-4563C94FADC0}" srcOrd="0" destOrd="0" presId="urn:microsoft.com/office/officeart/2008/layout/RadialCluster"/>
+    <dgm:cxn modelId="{548E8263-BAB8-9B45-9BF5-A81D8B50C58A}" srcId="{6C822FC1-F83A-C847-948B-E21719CC17CD}" destId="{AFBB05AA-B00F-7942-944F-AE8CA6A3C623}" srcOrd="0" destOrd="0" parTransId="{21680FB6-6688-7641-8814-DF6BFB4F9080}" sibTransId="{1126CFBB-1CF0-1945-A915-815EEECBE25A}"/>
     <dgm:cxn modelId="{A4ED3779-0FE6-D944-AAB7-0920AD42CE16}" type="presOf" srcId="{606AD026-0ACF-594E-A806-80D3B76FEA66}" destId="{B7574D95-F74D-FA49-A64F-B76754182F1F}" srcOrd="0" destOrd="0" presId="urn:microsoft.com/office/officeart/2008/layout/RadialCluster"/>
     <dgm:cxn modelId="{BC8763AC-E2FD-EB4F-88F3-E00970DC8370}" type="presOf" srcId="{9B1EC198-4A1E-5D4C-9B77-9DE047F9D3FA}" destId="{EFB7774B-8185-1644-9141-DBFC7B177724}" srcOrd="0" destOrd="0" presId="urn:microsoft.com/office/officeart/2008/layout/RadialCluster"/>
     <dgm:cxn modelId="{3B8902AE-2D42-DC43-8FB8-BFD1182C63B7}" type="presOf" srcId="{6C822FC1-F83A-C847-948B-E21719CC17CD}" destId="{D37B14B5-FD6D-024D-AD33-4E0F624CF5D0}" srcOrd="0" destOrd="0" presId="urn:microsoft.com/office/officeart/2008/layout/RadialCluster"/>
@@ -5988,7 +5987,7 @@
           <a:p>
             <a:fld id="{8255D30F-08CA-F947-9E33-FA70FD82FF0C}" type="datetimeFigureOut">
               <a:rPr lang="en-US" smtClean="0"/>
-              <a:t>11/24/2018</a:t>
+              <a:t>11/24/18</a:t>
             </a:fld>
             <a:endParaRPr lang="en-US"/>
           </a:p>
@@ -6428,7 +6427,7 @@
           <a:p>
             <a:fld id="{2458F96C-EECA-A145-A75D-16DF3B251606}" type="slidenum">
               <a:rPr lang="en-US" smtClean="0"/>
-              <a:t>19</a:t>
+              <a:t>18</a:t>
             </a:fld>
             <a:endParaRPr lang="en-US"/>
           </a:p>
@@ -7016,7 +7015,7 @@
           <a:p>
             <a:fld id="{2458F96C-EECA-A145-A75D-16DF3B251606}" type="slidenum">
               <a:rPr lang="en-US" smtClean="0"/>
-              <a:t>16</a:t>
+              <a:t>15</a:t>
             </a:fld>
             <a:endParaRPr lang="en-US"/>
           </a:p>
@@ -7100,7 +7099,7 @@
           <a:p>
             <a:fld id="{2458F96C-EECA-A145-A75D-16DF3B251606}" type="slidenum">
               <a:rPr lang="en-US" smtClean="0"/>
-              <a:t>18</a:t>
+              <a:t>17</a:t>
             </a:fld>
             <a:endParaRPr lang="en-US"/>
           </a:p>
@@ -11395,7 +11394,7 @@
           <a:p>
             <a:fld id="{48A87A34-81AB-432B-8DAE-1953F412C126}" type="datetimeFigureOut">
               <a:rPr lang="en-US" dirty="0"/>
-              <a:t>11/24/2018</a:t>
+              <a:t>11/24/18</a:t>
             </a:fld>
             <a:endParaRPr lang="en-US" dirty="0"/>
           </a:p>
@@ -11657,7 +11656,7 @@
           <a:p>
             <a:fld id="{48A87A34-81AB-432B-8DAE-1953F412C126}" type="datetimeFigureOut">
               <a:rPr lang="en-US" dirty="0"/>
-              <a:t>11/24/2018</a:t>
+              <a:t>11/24/18</a:t>
             </a:fld>
             <a:endParaRPr lang="en-US" dirty="0"/>
           </a:p>
@@ -11848,7 +11847,7 @@
           <a:p>
             <a:fld id="{48A87A34-81AB-432B-8DAE-1953F412C126}" type="datetimeFigureOut">
               <a:rPr lang="en-US" dirty="0"/>
-              <a:t>11/24/2018</a:t>
+              <a:t>11/24/18</a:t>
             </a:fld>
             <a:endParaRPr lang="en-US" dirty="0"/>
           </a:p>
@@ -12106,7 +12105,7 @@
           <a:p>
             <a:fld id="{48A87A34-81AB-432B-8DAE-1953F412C126}" type="datetimeFigureOut">
               <a:rPr lang="en-US" dirty="0"/>
-              <a:t>11/24/2018</a:t>
+              <a:t>11/24/18</a:t>
             </a:fld>
             <a:endParaRPr lang="en-US" dirty="0"/>
           </a:p>
@@ -12535,7 +12534,7 @@
           <a:p>
             <a:fld id="{48A87A34-81AB-432B-8DAE-1953F412C126}" type="datetimeFigureOut">
               <a:rPr lang="en-US" dirty="0"/>
-              <a:t>11/24/2018</a:t>
+              <a:t>11/24/18</a:t>
             </a:fld>
             <a:endParaRPr lang="en-US" dirty="0"/>
           </a:p>
@@ -13076,7 +13075,7 @@
           <a:p>
             <a:fld id="{48A87A34-81AB-432B-8DAE-1953F412C126}" type="datetimeFigureOut">
               <a:rPr lang="en-US" dirty="0"/>
-              <a:t>11/24/2018</a:t>
+              <a:t>11/24/18</a:t>
             </a:fld>
             <a:endParaRPr lang="en-US" dirty="0"/>
           </a:p>
@@ -13791,7 +13790,7 @@
           <a:p>
             <a:fld id="{48A87A34-81AB-432B-8DAE-1953F412C126}" type="datetimeFigureOut">
               <a:rPr lang="en-US" dirty="0"/>
-              <a:t>11/24/2018</a:t>
+              <a:t>11/24/18</a:t>
             </a:fld>
             <a:endParaRPr lang="en-US" dirty="0"/>
           </a:p>
@@ -13956,7 +13955,7 @@
           <a:p>
             <a:fld id="{48A87A34-81AB-432B-8DAE-1953F412C126}" type="datetimeFigureOut">
               <a:rPr lang="en-US" dirty="0"/>
-              <a:t>11/24/2018</a:t>
+              <a:t>11/24/18</a:t>
             </a:fld>
             <a:endParaRPr lang="en-US" dirty="0"/>
           </a:p>
@@ -14131,7 +14130,7 @@
           <a:p>
             <a:fld id="{48A87A34-81AB-432B-8DAE-1953F412C126}" type="datetimeFigureOut">
               <a:rPr lang="en-US" dirty="0"/>
-              <a:t>11/24/2018</a:t>
+              <a:t>11/24/18</a:t>
             </a:fld>
             <a:endParaRPr lang="en-US" dirty="0"/>
           </a:p>
@@ -14296,7 +14295,7 @@
           <a:p>
             <a:fld id="{48A87A34-81AB-432B-8DAE-1953F412C126}" type="datetimeFigureOut">
               <a:rPr lang="en-US" dirty="0"/>
-              <a:t>11/24/2018</a:t>
+              <a:t>11/24/18</a:t>
             </a:fld>
             <a:endParaRPr lang="en-US" dirty="0"/>
           </a:p>
@@ -14541,7 +14540,7 @@
           <a:p>
             <a:fld id="{48A87A34-81AB-432B-8DAE-1953F412C126}" type="datetimeFigureOut">
               <a:rPr lang="en-US" dirty="0"/>
-              <a:t>11/24/2018</a:t>
+              <a:t>11/24/18</a:t>
             </a:fld>
             <a:endParaRPr lang="en-US" dirty="0"/>
           </a:p>
@@ -14768,7 +14767,7 @@
           <a:p>
             <a:fld id="{48A87A34-81AB-432B-8DAE-1953F412C126}" type="datetimeFigureOut">
               <a:rPr lang="en-US" dirty="0"/>
-              <a:t>11/24/2018</a:t>
+              <a:t>11/24/18</a:t>
             </a:fld>
             <a:endParaRPr lang="en-US" dirty="0"/>
           </a:p>
@@ -15144,7 +15143,7 @@
           <a:p>
             <a:fld id="{48A87A34-81AB-432B-8DAE-1953F412C126}" type="datetimeFigureOut">
               <a:rPr lang="en-US" dirty="0"/>
-              <a:t>11/24/2018</a:t>
+              <a:t>11/24/18</a:t>
             </a:fld>
             <a:endParaRPr lang="en-US" dirty="0"/>
           </a:p>
@@ -15257,7 +15256,7 @@
           <a:p>
             <a:fld id="{48A87A34-81AB-432B-8DAE-1953F412C126}" type="datetimeFigureOut">
               <a:rPr lang="en-US" dirty="0"/>
-              <a:t>11/24/2018</a:t>
+              <a:t>11/24/18</a:t>
             </a:fld>
             <a:endParaRPr lang="en-US" dirty="0"/>
           </a:p>
@@ -15347,7 +15346,7 @@
           <a:p>
             <a:fld id="{48A87A34-81AB-432B-8DAE-1953F412C126}" type="datetimeFigureOut">
               <a:rPr lang="en-US" dirty="0"/>
-              <a:t>11/24/2018</a:t>
+              <a:t>11/24/18</a:t>
             </a:fld>
             <a:endParaRPr lang="en-US" dirty="0"/>
           </a:p>
@@ -15591,7 +15590,7 @@
           <a:p>
             <a:fld id="{48A87A34-81AB-432B-8DAE-1953F412C126}" type="datetimeFigureOut">
               <a:rPr lang="en-US" dirty="0"/>
-              <a:t>11/24/2018</a:t>
+              <a:t>11/24/18</a:t>
             </a:fld>
             <a:endParaRPr lang="en-US" dirty="0"/>
           </a:p>
@@ -15866,7 +15865,7 @@
           <a:p>
             <a:fld id="{48A87A34-81AB-432B-8DAE-1953F412C126}" type="datetimeFigureOut">
               <a:rPr lang="en-US" dirty="0"/>
-              <a:t>11/24/2018</a:t>
+              <a:t>11/24/18</a:t>
             </a:fld>
             <a:endParaRPr lang="en-US" dirty="0"/>
           </a:p>
@@ -18939,7 +18938,7 @@
             <a:fld id="{48A87A34-81AB-432B-8DAE-1953F412C126}" type="datetimeFigureOut">
               <a:rPr lang="en-US" dirty="0"/>
               <a:pPr/>
-              <a:t>11/24/2018</a:t>
+              <a:t>11/24/18</a:t>
             </a:fld>
             <a:endParaRPr lang="en-US" dirty="0"/>
           </a:p>
@@ -25754,7 +25753,7 @@
       </p:grpSp>
       <p:pic>
         <p:nvPicPr>
-          <p:cNvPr id="6" name="Content Placeholder 5" descr="A screenshot of a social media post&#10;&#10;Description automatically generated">
+          <p:cNvPr id="6" name="Content Placeholder 5" descr="A screenshot of a social media post&#13;&#10;&#13;&#10;Description automatically generated">
             <a:extLst>
               <a:ext uri="{FF2B5EF4-FFF2-40B4-BE49-F238E27FC236}">
                 <a16:creationId xmlns:a16="http://schemas.microsoft.com/office/drawing/2014/main" id="{0A844342-13F8-A84A-B186-94B3E0AC3126}"/>
@@ -25786,7 +25785,7 @@
       </p:pic>
       <p:pic>
         <p:nvPicPr>
-          <p:cNvPr id="8" name="Picture 7" descr="A screenshot of a cell phone&#10;&#10;Description automatically generated">
+          <p:cNvPr id="8" name="Picture 7" descr="A screenshot of a cell phone&#13;&#10;&#13;&#10;Description automatically generated">
             <a:extLst>
               <a:ext uri="{FF2B5EF4-FFF2-40B4-BE49-F238E27FC236}">
                 <a16:creationId xmlns:a16="http://schemas.microsoft.com/office/drawing/2014/main" id="{3817CF0D-5F9B-4942-9782-188D0834AAD1}"/>
@@ -32102,7 +32101,7 @@
       </p:grpSp>
       <p:pic>
         <p:nvPicPr>
-          <p:cNvPr id="6" name="Content Placeholder 5" descr="A screenshot of a cell phone&#10;&#10;Description automatically generated">
+          <p:cNvPr id="6" name="Content Placeholder 5" descr="A screenshot of a cell phone&#13;&#10;&#13;&#10;Description automatically generated">
             <a:extLst>
               <a:ext uri="{FF2B5EF4-FFF2-40B4-BE49-F238E27FC236}">
                 <a16:creationId xmlns:a16="http://schemas.microsoft.com/office/drawing/2014/main" id="{B1283383-0A61-7D4D-BA8E-4DF4913C0EB5}"/>
@@ -32134,7 +32133,7 @@
       </p:pic>
       <p:pic>
         <p:nvPicPr>
-          <p:cNvPr id="8" name="Picture 7" descr="A screenshot of a cell phone&#10;&#10;Description automatically generated">
+          <p:cNvPr id="8" name="Picture 7" descr="A screenshot of a cell phone&#13;&#10;&#13;&#10;Description automatically generated">
             <a:extLst>
               <a:ext uri="{FF2B5EF4-FFF2-40B4-BE49-F238E27FC236}">
                 <a16:creationId xmlns:a16="http://schemas.microsoft.com/office/drawing/2014/main" id="{FA07B1B6-13DE-2446-99B5-95BF883B8FF5}"/>
@@ -32164,7 +32163,7 @@
       </p:pic>
       <p:pic>
         <p:nvPicPr>
-          <p:cNvPr id="10" name="Picture 9" descr="A screenshot of a cell phone&#10;&#10;Description automatically generated">
+          <p:cNvPr id="10" name="Picture 9" descr="A screenshot of a cell phone&#13;&#10;&#13;&#10;Description automatically generated">
             <a:extLst>
               <a:ext uri="{FF2B5EF4-FFF2-40B4-BE49-F238E27FC236}">
                 <a16:creationId xmlns:a16="http://schemas.microsoft.com/office/drawing/2014/main" id="{683D336B-F397-EC48-B03B-2138057086A7}"/>
@@ -38480,7 +38479,7 @@
       </p:grpSp>
       <p:pic>
         <p:nvPicPr>
-          <p:cNvPr id="6" name="Content Placeholder 5" descr="A screenshot of a cell phone&#10;&#10;Description automatically generated">
+          <p:cNvPr id="6" name="Content Placeholder 5" descr="A screenshot of a cell phone&#13;&#10;&#13;&#10;Description automatically generated">
             <a:extLst>
               <a:ext uri="{FF2B5EF4-FFF2-40B4-BE49-F238E27FC236}">
                 <a16:creationId xmlns:a16="http://schemas.microsoft.com/office/drawing/2014/main" id="{0D01F4DD-1176-F940-95F8-E41DC4C17D87}"/>
@@ -38512,7 +38511,7 @@
       </p:pic>
       <p:pic>
         <p:nvPicPr>
-          <p:cNvPr id="8" name="Picture 7" descr="A screenshot of a social media post&#10;&#10;Description automatically generated">
+          <p:cNvPr id="8" name="Picture 7" descr="A screenshot of a social media post&#13;&#10;&#13;&#10;Description automatically generated">
             <a:extLst>
               <a:ext uri="{FF2B5EF4-FFF2-40B4-BE49-F238E27FC236}">
                 <a16:creationId xmlns:a16="http://schemas.microsoft.com/office/drawing/2014/main" id="{27324692-820E-D64F-B61F-B7D332AE09E4}"/>
@@ -42385,10 +42384,13 @@
           <a:p>
             <a:pPr marL="228600" lvl="1"/>
             <a:r>
-              <a:rPr lang="en-US" dirty="0">
+              <a:rPr lang="en-US" u="sng" dirty="0">
+                <a:solidFill>
+                  <a:srgbClr val="FFFFFF"/>
+                </a:solidFill>
                 <a:hlinkClick r:id="rId3"/>
               </a:rPr>
-              <a:t>https://api.iextrading.com</a:t>
+              <a:t>https://finance.yahoo.com</a:t>
             </a:r>
             <a:endParaRPr lang="en-US" u="sng" dirty="0">
               <a:solidFill>
@@ -44825,7 +44827,7 @@
       </p:grpSp>
       <p:pic>
         <p:nvPicPr>
-          <p:cNvPr id="5" name="Content Placeholder 4" descr="A screenshot of a computer&#10;&#10;Description automatically generated">
+          <p:cNvPr id="5" name="Content Placeholder 4" descr="A screenshot of a computer&#13;&#10;&#13;&#10;Description automatically generated">
             <a:extLst>
               <a:ext uri="{FF2B5EF4-FFF2-40B4-BE49-F238E27FC236}">
                 <a16:creationId xmlns:a16="http://schemas.microsoft.com/office/drawing/2014/main" id="{386836D5-51E8-BE47-A193-5381896EAADD}"/>
@@ -44857,7 +44859,7 @@
       </p:pic>
       <p:pic>
         <p:nvPicPr>
-          <p:cNvPr id="7" name="Picture 6" descr="A screenshot of a social media post&#10;&#10;Description automatically generated">
+          <p:cNvPr id="7" name="Picture 6" descr="A screenshot of a social media post&#13;&#10;&#13;&#10;Description automatically generated">
             <a:extLst>
               <a:ext uri="{FF2B5EF4-FFF2-40B4-BE49-F238E27FC236}">
                 <a16:creationId xmlns:a16="http://schemas.microsoft.com/office/drawing/2014/main" id="{8121EF0A-FE58-3246-B29A-2B3E15CB5965}"/>
@@ -44879,6 +44881,36 @@
           <a:xfrm>
             <a:off x="4205193" y="261373"/>
             <a:ext cx="7812840" cy="1578531"/>
+          </a:xfrm>
+          <a:prstGeom prst="rect">
+            <a:avLst/>
+          </a:prstGeom>
+        </p:spPr>
+      </p:pic>
+      <p:pic>
+        <p:nvPicPr>
+          <p:cNvPr id="89" name="Picture 88">
+            <a:extLst>
+              <a:ext uri="{FF2B5EF4-FFF2-40B4-BE49-F238E27FC236}">
+                <a16:creationId xmlns:a16="http://schemas.microsoft.com/office/drawing/2014/main" id="{8132DB2F-2F25-D640-8C0F-8779EE848886}"/>
+              </a:ext>
+            </a:extLst>
+          </p:cNvPr>
+          <p:cNvPicPr>
+            <a:picLocks noChangeAspect="1"/>
+          </p:cNvPicPr>
+          <p:nvPr/>
+        </p:nvPicPr>
+        <p:blipFill>
+          <a:blip r:embed="rId6"/>
+          <a:stretch>
+            <a:fillRect/>
+          </a:stretch>
+        </p:blipFill>
+        <p:spPr>
+          <a:xfrm>
+            <a:off x="1945156" y="4639179"/>
+            <a:ext cx="1842170" cy="1950533"/>
           </a:xfrm>
           <a:prstGeom prst="rect">
             <a:avLst/>
@@ -44943,7 +44975,7 @@
           <a:p>
             <a:r>
               <a:rPr lang="en-US" dirty="0"/>
-              <a:t>Results: IDEAL Relational Database design</a:t>
+              <a:t>Results: Relational Database design</a:t>
             </a:r>
           </a:p>
         </p:txBody>
@@ -45119,6 +45151,47 @@
           </a:p>
         </p:txBody>
       </p:sp>
+      <p:cxnSp>
+        <p:nvCxnSpPr>
+          <p:cNvPr id="10" name="Straight Connector 9">
+            <a:extLst>
+              <a:ext uri="{FF2B5EF4-FFF2-40B4-BE49-F238E27FC236}">
+                <a16:creationId xmlns:a16="http://schemas.microsoft.com/office/drawing/2014/main" id="{67AD1C1C-3497-4044-A734-95D17FDB0C34}"/>
+              </a:ext>
+            </a:extLst>
+          </p:cNvPr>
+          <p:cNvCxnSpPr/>
+          <p:nvPr/>
+        </p:nvCxnSpPr>
+        <p:spPr>
+          <a:xfrm>
+            <a:off x="1141412" y="930445"/>
+            <a:ext cx="9905999" cy="0"/>
+          </a:xfrm>
+          <a:prstGeom prst="line">
+            <a:avLst/>
+          </a:prstGeom>
+          <a:ln w="38100">
+            <a:solidFill>
+              <a:schemeClr val="tx1"/>
+            </a:solidFill>
+          </a:ln>
+        </p:spPr>
+        <p:style>
+          <a:lnRef idx="1">
+            <a:schemeClr val="accent1"/>
+          </a:lnRef>
+          <a:fillRef idx="0">
+            <a:schemeClr val="accent1"/>
+          </a:fillRef>
+          <a:effectRef idx="0">
+            <a:schemeClr val="accent1"/>
+          </a:effectRef>
+          <a:fontRef idx="minor">
+            <a:schemeClr val="tx1"/>
+          </a:fontRef>
+        </p:style>
+      </p:cxnSp>
     </p:spTree>
     <p:extLst>
       <p:ext uri="{BB962C8B-B14F-4D97-AF65-F5344CB8AC3E}">
@@ -45154,133 +45227,6 @@
           <p:cNvPr id="2" name="Title 1">
             <a:extLst>
               <a:ext uri="{FF2B5EF4-FFF2-40B4-BE49-F238E27FC236}">
-                <a16:creationId xmlns:a16="http://schemas.microsoft.com/office/drawing/2014/main" id="{1398C638-BD0D-4441-86AA-96AA4146E95D}"/>
-              </a:ext>
-            </a:extLst>
-          </p:cNvPr>
-          <p:cNvSpPr>
-            <a:spLocks noGrp="1"/>
-          </p:cNvSpPr>
-          <p:nvPr>
-            <p:ph type="title"/>
-          </p:nvPr>
-        </p:nvSpPr>
-        <p:spPr/>
-        <p:txBody>
-          <a:bodyPr/>
-          <a:lstStyle/>
-          <a:p>
-            <a:r>
-              <a:rPr lang="en-US" dirty="0"/>
-              <a:t>Results: End state database design</a:t>
-            </a:r>
-          </a:p>
-        </p:txBody>
-      </p:sp>
-      <p:sp>
-        <p:nvSpPr>
-          <p:cNvPr id="3" name="Content Placeholder 2">
-            <a:extLst>
-              <a:ext uri="{FF2B5EF4-FFF2-40B4-BE49-F238E27FC236}">
-                <a16:creationId xmlns:a16="http://schemas.microsoft.com/office/drawing/2014/main" id="{86F84B85-7AA7-4760-B9EA-7F6E5C2FD37A}"/>
-              </a:ext>
-            </a:extLst>
-          </p:cNvPr>
-          <p:cNvSpPr>
-            <a:spLocks noGrp="1"/>
-          </p:cNvSpPr>
-          <p:nvPr>
-            <p:ph idx="1"/>
-          </p:nvPr>
-        </p:nvSpPr>
-        <p:spPr/>
-        <p:txBody>
-          <a:bodyPr/>
-          <a:lstStyle/>
-          <a:p>
-            <a:r>
-              <a:rPr lang="en-US" dirty="0"/>
-              <a:t>Practical Requirements:</a:t>
-            </a:r>
-          </a:p>
-          <a:p>
-            <a:pPr lvl="1"/>
-            <a:r>
-              <a:rPr lang="en-US" dirty="0"/>
-              <a:t>Ability to support quick data refreshes.</a:t>
-            </a:r>
-          </a:p>
-          <a:p>
-            <a:pPr lvl="1"/>
-            <a:r>
-              <a:rPr lang="en-US" dirty="0"/>
-              <a:t>Resiliency to rapidly changing code.</a:t>
-            </a:r>
-          </a:p>
-          <a:p>
-            <a:pPr lvl="1"/>
-            <a:r>
-              <a:rPr lang="en-US" dirty="0"/>
-              <a:t>Easy analysis by Spotfire business intelligence tool.</a:t>
-            </a:r>
-          </a:p>
-          <a:p>
-            <a:r>
-              <a:rPr lang="en-US" dirty="0"/>
-              <a:t>End State Design:</a:t>
-            </a:r>
-          </a:p>
-          <a:p>
-            <a:pPr lvl="1"/>
-            <a:r>
-              <a:rPr lang="en-US" dirty="0"/>
-              <a:t>Flat, independent tables.</a:t>
-            </a:r>
-          </a:p>
-          <a:p>
-            <a:pPr lvl="1"/>
-            <a:r>
-              <a:rPr lang="en-US" dirty="0"/>
-              <a:t>Stored procedures as abstraction layers.</a:t>
-            </a:r>
-          </a:p>
-        </p:txBody>
-      </p:sp>
-    </p:spTree>
-    <p:extLst>
-      <p:ext uri="{BB962C8B-B14F-4D97-AF65-F5344CB8AC3E}">
-        <p14:creationId xmlns:p14="http://schemas.microsoft.com/office/powerpoint/2010/main" val="2834269652"/>
-      </p:ext>
-    </p:extLst>
-  </p:cSld>
-  <p:clrMapOvr>
-    <a:masterClrMapping/>
-  </p:clrMapOvr>
-</p:sld>
-</file>
-
-<file path=ppt/slides/slide16.xml><?xml version="1.0" encoding="utf-8"?>
-<p:sld xmlns:a="http://schemas.openxmlformats.org/drawingml/2006/main" xmlns:r="http://schemas.openxmlformats.org/officeDocument/2006/relationships" xmlns:p="http://schemas.openxmlformats.org/presentationml/2006/main">
-  <p:cSld>
-    <p:spTree>
-      <p:nvGrpSpPr>
-        <p:cNvPr id="1" name=""/>
-        <p:cNvGrpSpPr/>
-        <p:nvPr/>
-      </p:nvGrpSpPr>
-      <p:grpSpPr>
-        <a:xfrm>
-          <a:off x="0" y="0"/>
-          <a:ext cx="0" cy="0"/>
-          <a:chOff x="0" y="0"/>
-          <a:chExt cx="0" cy="0"/>
-        </a:xfrm>
-      </p:grpSpPr>
-      <p:sp>
-        <p:nvSpPr>
-          <p:cNvPr id="2" name="Title 1">
-            <a:extLst>
-              <a:ext uri="{FF2B5EF4-FFF2-40B4-BE49-F238E27FC236}">
                 <a16:creationId xmlns:a16="http://schemas.microsoft.com/office/drawing/2014/main" id="{E499424B-B3D1-644B-83EF-CE1C801339DB}"/>
               </a:ext>
             </a:extLst>
@@ -45294,8 +45240,8 @@
         </p:nvSpPr>
         <p:spPr>
           <a:xfrm>
-            <a:off x="6248396" y="27200"/>
-            <a:ext cx="5165386" cy="1522304"/>
+            <a:off x="8085220" y="27199"/>
+            <a:ext cx="3328561" cy="1950533"/>
           </a:xfrm>
         </p:spPr>
         <p:txBody>
@@ -45371,55 +45317,14 @@
         </p:blipFill>
         <p:spPr>
           <a:xfrm>
-            <a:off x="-1" y="0"/>
-            <a:ext cx="5943605" cy="6871599"/>
+            <a:off x="32083" y="0"/>
+            <a:ext cx="7748338" cy="6871599"/>
           </a:xfrm>
           <a:prstGeom prst="rect">
             <a:avLst/>
           </a:prstGeom>
         </p:spPr>
       </p:pic>
-      <p:cxnSp>
-        <p:nvCxnSpPr>
-          <p:cNvPr id="7" name="Straight Arrow Connector 6">
-            <a:extLst>
-              <a:ext uri="{FF2B5EF4-FFF2-40B4-BE49-F238E27FC236}">
-                <a16:creationId xmlns:a16="http://schemas.microsoft.com/office/drawing/2014/main" id="{0ACDB850-8790-8445-8AB7-BC45AC6CC058}"/>
-              </a:ext>
-            </a:extLst>
-          </p:cNvPr>
-          <p:cNvCxnSpPr>
-            <a:cxnSpLocks/>
-          </p:cNvCxnSpPr>
-          <p:nvPr/>
-        </p:nvCxnSpPr>
-        <p:spPr>
-          <a:xfrm flipH="1">
-            <a:off x="2050869" y="1842400"/>
-            <a:ext cx="4197530" cy="0"/>
-          </a:xfrm>
-          <a:prstGeom prst="straightConnector1">
-            <a:avLst/>
-          </a:prstGeom>
-          <a:ln>
-            <a:tailEnd type="triangle"/>
-          </a:ln>
-        </p:spPr>
-        <p:style>
-          <a:lnRef idx="1">
-            <a:schemeClr val="accent1"/>
-          </a:lnRef>
-          <a:fillRef idx="0">
-            <a:schemeClr val="accent1"/>
-          </a:fillRef>
-          <a:effectRef idx="0">
-            <a:schemeClr val="accent1"/>
-          </a:effectRef>
-          <a:fontRef idx="minor">
-            <a:schemeClr val="tx1"/>
-          </a:fontRef>
-        </p:style>
-      </p:cxnSp>
       <p:sp>
         <p:nvSpPr>
           <p:cNvPr id="8" name="TextBox 7">
@@ -45433,9 +45338,9 @@
           <p:nvPr/>
         </p:nvSpPr>
         <p:spPr>
-          <a:xfrm>
-            <a:off x="6248396" y="1519234"/>
-            <a:ext cx="1603373" cy="646331"/>
+          <a:xfrm rot="16200000">
+            <a:off x="1871538" y="2744722"/>
+            <a:ext cx="1299375" cy="275283"/>
           </a:xfrm>
           <a:prstGeom prst="rect">
             <a:avLst/>
@@ -45449,54 +45354,12 @@
           <a:lstStyle/>
           <a:p>
             <a:r>
-              <a:rPr lang="en-US" dirty="0"/>
+              <a:rPr lang="en-US" sz="1200" dirty="0"/>
               <a:t>Orlando shooting</a:t>
             </a:r>
           </a:p>
         </p:txBody>
       </p:sp>
-      <p:cxnSp>
-        <p:nvCxnSpPr>
-          <p:cNvPr id="9" name="Straight Arrow Connector 8">
-            <a:extLst>
-              <a:ext uri="{FF2B5EF4-FFF2-40B4-BE49-F238E27FC236}">
-                <a16:creationId xmlns:a16="http://schemas.microsoft.com/office/drawing/2014/main" id="{37FA6F0E-11DC-7646-8EC1-9A13B576ACED}"/>
-              </a:ext>
-            </a:extLst>
-          </p:cNvPr>
-          <p:cNvCxnSpPr>
-            <a:cxnSpLocks/>
-            <a:stCxn id="10" idx="1"/>
-          </p:cNvCxnSpPr>
-          <p:nvPr/>
-        </p:nvCxnSpPr>
-        <p:spPr>
-          <a:xfrm flipH="1">
-            <a:off x="3004457" y="2569759"/>
-            <a:ext cx="3207179" cy="1"/>
-          </a:xfrm>
-          <a:prstGeom prst="straightConnector1">
-            <a:avLst/>
-          </a:prstGeom>
-          <a:ln>
-            <a:tailEnd type="triangle"/>
-          </a:ln>
-        </p:spPr>
-        <p:style>
-          <a:lnRef idx="1">
-            <a:schemeClr val="accent1"/>
-          </a:lnRef>
-          <a:fillRef idx="0">
-            <a:schemeClr val="accent1"/>
-          </a:fillRef>
-          <a:effectRef idx="0">
-            <a:schemeClr val="accent1"/>
-          </a:effectRef>
-          <a:fontRef idx="minor">
-            <a:schemeClr val="tx1"/>
-          </a:fontRef>
-        </p:style>
-      </p:cxnSp>
       <p:sp>
         <p:nvSpPr>
           <p:cNvPr id="10" name="TextBox 9">
@@ -45510,9 +45373,9 @@
           <p:nvPr/>
         </p:nvSpPr>
         <p:spPr>
-          <a:xfrm>
-            <a:off x="6211636" y="2246593"/>
-            <a:ext cx="1603373" cy="646331"/>
+          <a:xfrm rot="16200000">
+            <a:off x="2824252" y="2322033"/>
+            <a:ext cx="1950534" cy="276999"/>
           </a:xfrm>
           <a:prstGeom prst="rect">
             <a:avLst/>
@@ -45526,54 +45389,12 @@
           <a:lstStyle/>
           <a:p>
             <a:r>
-              <a:rPr lang="en-US" dirty="0"/>
+              <a:rPr lang="en-US" sz="1200" dirty="0"/>
               <a:t>Dallas officer shot and killed</a:t>
             </a:r>
           </a:p>
         </p:txBody>
       </p:sp>
-      <p:cxnSp>
-        <p:nvCxnSpPr>
-          <p:cNvPr id="11" name="Straight Arrow Connector 10">
-            <a:extLst>
-              <a:ext uri="{FF2B5EF4-FFF2-40B4-BE49-F238E27FC236}">
-                <a16:creationId xmlns:a16="http://schemas.microsoft.com/office/drawing/2014/main" id="{F4D2D57E-2406-3E4B-9732-71763681034C}"/>
-              </a:ext>
-            </a:extLst>
-          </p:cNvPr>
-          <p:cNvCxnSpPr>
-            <a:cxnSpLocks/>
-            <a:stCxn id="12" idx="1"/>
-          </p:cNvCxnSpPr>
-          <p:nvPr/>
-        </p:nvCxnSpPr>
-        <p:spPr>
-          <a:xfrm flipH="1">
-            <a:off x="4271554" y="3160993"/>
-            <a:ext cx="1940081" cy="0"/>
-          </a:xfrm>
-          <a:prstGeom prst="straightConnector1">
-            <a:avLst/>
-          </a:prstGeom>
-          <a:ln>
-            <a:tailEnd type="triangle"/>
-          </a:ln>
-        </p:spPr>
-        <p:style>
-          <a:lnRef idx="1">
-            <a:schemeClr val="accent1"/>
-          </a:lnRef>
-          <a:fillRef idx="0">
-            <a:schemeClr val="accent1"/>
-          </a:fillRef>
-          <a:effectRef idx="0">
-            <a:schemeClr val="accent1"/>
-          </a:effectRef>
-          <a:fontRef idx="minor">
-            <a:schemeClr val="tx1"/>
-          </a:fontRef>
-        </p:style>
-      </p:cxnSp>
       <p:sp>
         <p:nvSpPr>
           <p:cNvPr id="12" name="TextBox 11">
@@ -45587,9 +45408,9 @@
           <p:nvPr/>
         </p:nvSpPr>
         <p:spPr>
-          <a:xfrm>
-            <a:off x="6211635" y="2976327"/>
-            <a:ext cx="1603373" cy="369332"/>
+          <a:xfrm rot="16200000">
+            <a:off x="4934620" y="3093635"/>
+            <a:ext cx="1271179" cy="275281"/>
           </a:xfrm>
           <a:prstGeom prst="rect">
             <a:avLst/>
@@ -45603,54 +45424,12 @@
           <a:lstStyle/>
           <a:p>
             <a:r>
-              <a:rPr lang="en-US" dirty="0"/>
+              <a:rPr lang="en-US" sz="1200" dirty="0"/>
               <a:t>Milwaukie Riots</a:t>
             </a:r>
           </a:p>
         </p:txBody>
       </p:sp>
-      <p:cxnSp>
-        <p:nvCxnSpPr>
-          <p:cNvPr id="13" name="Straight Arrow Connector 12">
-            <a:extLst>
-              <a:ext uri="{FF2B5EF4-FFF2-40B4-BE49-F238E27FC236}">
-                <a16:creationId xmlns:a16="http://schemas.microsoft.com/office/drawing/2014/main" id="{C255097E-E34A-D948-94D7-6974C7E4714D}"/>
-              </a:ext>
-            </a:extLst>
-          </p:cNvPr>
-          <p:cNvCxnSpPr>
-            <a:cxnSpLocks/>
-            <a:stCxn id="14" idx="1"/>
-          </p:cNvCxnSpPr>
-          <p:nvPr/>
-        </p:nvCxnSpPr>
-        <p:spPr>
-          <a:xfrm flipH="1">
-            <a:off x="4368967" y="3744951"/>
-            <a:ext cx="1842170" cy="0"/>
-          </a:xfrm>
-          <a:prstGeom prst="straightConnector1">
-            <a:avLst/>
-          </a:prstGeom>
-          <a:ln>
-            <a:tailEnd type="triangle"/>
-          </a:ln>
-        </p:spPr>
-        <p:style>
-          <a:lnRef idx="1">
-            <a:schemeClr val="accent1"/>
-          </a:lnRef>
-          <a:fillRef idx="0">
-            <a:schemeClr val="accent1"/>
-          </a:fillRef>
-          <a:effectRef idx="0">
-            <a:schemeClr val="accent1"/>
-          </a:effectRef>
-          <a:fontRef idx="minor">
-            <a:schemeClr val="tx1"/>
-          </a:fontRef>
-        </p:style>
-      </p:cxnSp>
       <p:sp>
         <p:nvSpPr>
           <p:cNvPr id="14" name="TextBox 13">
@@ -45664,9 +45443,9 @@
           <p:nvPr/>
         </p:nvSpPr>
         <p:spPr>
-          <a:xfrm>
-            <a:off x="6211137" y="3421785"/>
-            <a:ext cx="1603373" cy="646331"/>
+          <a:xfrm rot="16200000">
+            <a:off x="5085989" y="2125891"/>
+            <a:ext cx="1271182" cy="275281"/>
           </a:xfrm>
           <a:prstGeom prst="rect">
             <a:avLst/>
@@ -45680,7 +45459,7 @@
           <a:lstStyle/>
           <a:p>
             <a:r>
-              <a:rPr lang="en-US" dirty="0"/>
+              <a:rPr lang="en-US" sz="1200" dirty="0"/>
               <a:t>Louisiana Floods</a:t>
             </a:r>
           </a:p>
@@ -45708,7 +45487,7 @@
         </p:blipFill>
         <p:spPr>
           <a:xfrm>
-            <a:off x="6172203" y="4166500"/>
+            <a:off x="8085220" y="4695889"/>
             <a:ext cx="1842170" cy="1950533"/>
           </a:xfrm>
           <a:prstGeom prst="rect">
@@ -45729,7 +45508,7 @@
 </p:sld>
 </file>
 
-<file path=ppt/slides/slide17.xml><?xml version="1.0" encoding="utf-8"?>
+<file path=ppt/slides/slide16.xml><?xml version="1.0" encoding="utf-8"?>
 <p:sld xmlns:a="http://schemas.openxmlformats.org/drawingml/2006/main" xmlns:r="http://schemas.openxmlformats.org/officeDocument/2006/relationships" xmlns:p="http://schemas.openxmlformats.org/presentationml/2006/main">
   <p:cSld>
     <p:spTree>
@@ -46125,7 +45904,7 @@
 </p:sld>
 </file>
 
-<file path=ppt/slides/slide18.xml><?xml version="1.0" encoding="utf-8"?>
+<file path=ppt/slides/slide17.xml><?xml version="1.0" encoding="utf-8"?>
 <p:sld xmlns:a="http://schemas.openxmlformats.org/drawingml/2006/main" xmlns:r="http://schemas.openxmlformats.org/officeDocument/2006/relationships" xmlns:p="http://schemas.openxmlformats.org/presentationml/2006/main">
   <p:cSld>
     <p:spTree>
@@ -46206,6 +45985,47 @@
           </a:p>
         </p:txBody>
       </p:sp>
+      <p:cxnSp>
+        <p:nvCxnSpPr>
+          <p:cNvPr id="4" name="Straight Connector 3">
+            <a:extLst>
+              <a:ext uri="{FF2B5EF4-FFF2-40B4-BE49-F238E27FC236}">
+                <a16:creationId xmlns:a16="http://schemas.microsoft.com/office/drawing/2014/main" id="{2F3C9B11-587F-B04C-B6DF-77D181390533}"/>
+              </a:ext>
+            </a:extLst>
+          </p:cNvPr>
+          <p:cNvCxnSpPr/>
+          <p:nvPr/>
+        </p:nvCxnSpPr>
+        <p:spPr>
+          <a:xfrm>
+            <a:off x="1141412" y="1523999"/>
+            <a:ext cx="9905999" cy="0"/>
+          </a:xfrm>
+          <a:prstGeom prst="line">
+            <a:avLst/>
+          </a:prstGeom>
+          <a:ln w="38100">
+            <a:solidFill>
+              <a:schemeClr val="tx1"/>
+            </a:solidFill>
+          </a:ln>
+        </p:spPr>
+        <p:style>
+          <a:lnRef idx="1">
+            <a:schemeClr val="accent1"/>
+          </a:lnRef>
+          <a:fillRef idx="0">
+            <a:schemeClr val="accent1"/>
+          </a:fillRef>
+          <a:effectRef idx="0">
+            <a:schemeClr val="accent1"/>
+          </a:effectRef>
+          <a:fontRef idx="minor">
+            <a:schemeClr val="tx1"/>
+          </a:fontRef>
+        </p:style>
+      </p:cxnSp>
     </p:spTree>
     <p:extLst>
       <p:ext uri="{BB962C8B-B14F-4D97-AF65-F5344CB8AC3E}">
@@ -46219,7 +46039,7 @@
 </p:sld>
 </file>
 
-<file path=ppt/slides/slide19.xml><?xml version="1.0" encoding="utf-8"?>
+<file path=ppt/slides/slide18.xml><?xml version="1.0" encoding="utf-8"?>
 <p:sld xmlns:a="http://schemas.openxmlformats.org/drawingml/2006/main" xmlns:r="http://schemas.openxmlformats.org/officeDocument/2006/relationships" xmlns:p="http://schemas.openxmlformats.org/presentationml/2006/main">
   <p:cSld>
     <p:spTree>
@@ -46324,6 +46144,130 @@
 </p:sld>
 </file>
 
+<file path=ppt/slides/slide19.xml><?xml version="1.0" encoding="utf-8"?>
+<p:sld xmlns:a="http://schemas.openxmlformats.org/drawingml/2006/main" xmlns:r="http://schemas.openxmlformats.org/officeDocument/2006/relationships" xmlns:p="http://schemas.openxmlformats.org/presentationml/2006/main">
+  <p:cSld>
+    <p:spTree>
+      <p:nvGrpSpPr>
+        <p:cNvPr id="1" name=""/>
+        <p:cNvGrpSpPr/>
+        <p:nvPr/>
+      </p:nvGrpSpPr>
+      <p:grpSpPr>
+        <a:xfrm>
+          <a:off x="0" y="0"/>
+          <a:ext cx="0" cy="0"/>
+          <a:chOff x="0" y="0"/>
+          <a:chExt cx="0" cy="0"/>
+        </a:xfrm>
+      </p:grpSpPr>
+      <p:sp>
+        <p:nvSpPr>
+          <p:cNvPr id="2" name="Title 1">
+            <a:extLst>
+              <a:ext uri="{FF2B5EF4-FFF2-40B4-BE49-F238E27FC236}">
+                <a16:creationId xmlns:a16="http://schemas.microsoft.com/office/drawing/2014/main" id="{E40EE3A0-26DE-094D-B08A-0FFF2ED59B62}"/>
+              </a:ext>
+            </a:extLst>
+          </p:cNvPr>
+          <p:cNvSpPr>
+            <a:spLocks noGrp="1"/>
+          </p:cNvSpPr>
+          <p:nvPr>
+            <p:ph type="title"/>
+          </p:nvPr>
+        </p:nvSpPr>
+        <p:spPr/>
+        <p:txBody>
+          <a:bodyPr/>
+          <a:lstStyle/>
+          <a:p>
+            <a:r>
+              <a:rPr lang="en-US" dirty="0"/>
+              <a:t>Conclusions and future work</a:t>
+            </a:r>
+          </a:p>
+        </p:txBody>
+      </p:sp>
+      <p:sp>
+        <p:nvSpPr>
+          <p:cNvPr id="3" name="Content Placeholder 2">
+            <a:extLst>
+              <a:ext uri="{FF2B5EF4-FFF2-40B4-BE49-F238E27FC236}">
+                <a16:creationId xmlns:a16="http://schemas.microsoft.com/office/drawing/2014/main" id="{0D49348D-EFBF-DD47-BD6C-5149EC36A088}"/>
+              </a:ext>
+            </a:extLst>
+          </p:cNvPr>
+          <p:cNvSpPr>
+            <a:spLocks noGrp="1"/>
+          </p:cNvSpPr>
+          <p:nvPr>
+            <p:ph idx="1"/>
+          </p:nvPr>
+        </p:nvSpPr>
+        <p:spPr/>
+        <p:txBody>
+          <a:bodyPr/>
+          <a:lstStyle/>
+          <a:p>
+            <a:endParaRPr lang="en-US" dirty="0"/>
+          </a:p>
+        </p:txBody>
+      </p:sp>
+      <p:cxnSp>
+        <p:nvCxnSpPr>
+          <p:cNvPr id="4" name="Straight Connector 3">
+            <a:extLst>
+              <a:ext uri="{FF2B5EF4-FFF2-40B4-BE49-F238E27FC236}">
+                <a16:creationId xmlns:a16="http://schemas.microsoft.com/office/drawing/2014/main" id="{71382FD6-22C4-0149-8779-B41530C39FDD}"/>
+              </a:ext>
+            </a:extLst>
+          </p:cNvPr>
+          <p:cNvCxnSpPr/>
+          <p:nvPr/>
+        </p:nvCxnSpPr>
+        <p:spPr>
+          <a:xfrm>
+            <a:off x="1141412" y="1523999"/>
+            <a:ext cx="9905999" cy="0"/>
+          </a:xfrm>
+          <a:prstGeom prst="line">
+            <a:avLst/>
+          </a:prstGeom>
+          <a:ln w="38100">
+            <a:solidFill>
+              <a:schemeClr val="tx1"/>
+            </a:solidFill>
+          </a:ln>
+        </p:spPr>
+        <p:style>
+          <a:lnRef idx="1">
+            <a:schemeClr val="accent1"/>
+          </a:lnRef>
+          <a:fillRef idx="0">
+            <a:schemeClr val="accent1"/>
+          </a:fillRef>
+          <a:effectRef idx="0">
+            <a:schemeClr val="accent1"/>
+          </a:effectRef>
+          <a:fontRef idx="minor">
+            <a:schemeClr val="tx1"/>
+          </a:fontRef>
+        </p:style>
+      </p:cxnSp>
+    </p:spTree>
+    <p:extLst>
+      <p:ext uri="{BB962C8B-B14F-4D97-AF65-F5344CB8AC3E}">
+        <p14:creationId xmlns:p14="http://schemas.microsoft.com/office/powerpoint/2010/main" val="1393989079"/>
+      </p:ext>
+    </p:extLst>
+  </p:cSld>
+  <p:clrMapOvr>
+    <a:masterClrMapping/>
+  </p:clrMapOvr>
+</p:sld>
+</file>
+
 <file path=ppt/slides/slide2.xml><?xml version="1.0" encoding="utf-8"?>
 <p:sld xmlns:a="http://schemas.openxmlformats.org/drawingml/2006/main" xmlns:r="http://schemas.openxmlformats.org/officeDocument/2006/relationships" xmlns:p="http://schemas.openxmlformats.org/presentationml/2006/main">
   <p:cSld>
@@ -46419,93 +46363,51 @@
           </a:p>
         </p:txBody>
       </p:sp>
+      <p:cxnSp>
+        <p:nvCxnSpPr>
+          <p:cNvPr id="5" name="Straight Connector 4">
+            <a:extLst>
+              <a:ext uri="{FF2B5EF4-FFF2-40B4-BE49-F238E27FC236}">
+                <a16:creationId xmlns:a16="http://schemas.microsoft.com/office/drawing/2014/main" id="{B319B096-663A-884C-BF4A-75B1358F6FD8}"/>
+              </a:ext>
+            </a:extLst>
+          </p:cNvPr>
+          <p:cNvCxnSpPr/>
+          <p:nvPr/>
+        </p:nvCxnSpPr>
+        <p:spPr>
+          <a:xfrm>
+            <a:off x="1141412" y="1187117"/>
+            <a:ext cx="9905999" cy="0"/>
+          </a:xfrm>
+          <a:prstGeom prst="line">
+            <a:avLst/>
+          </a:prstGeom>
+          <a:ln w="38100">
+            <a:solidFill>
+              <a:schemeClr val="tx1"/>
+            </a:solidFill>
+          </a:ln>
+        </p:spPr>
+        <p:style>
+          <a:lnRef idx="1">
+            <a:schemeClr val="accent1"/>
+          </a:lnRef>
+          <a:fillRef idx="0">
+            <a:schemeClr val="accent1"/>
+          </a:fillRef>
+          <a:effectRef idx="0">
+            <a:schemeClr val="accent1"/>
+          </a:effectRef>
+          <a:fontRef idx="minor">
+            <a:schemeClr val="tx1"/>
+          </a:fontRef>
+        </p:style>
+      </p:cxnSp>
     </p:spTree>
     <p:extLst>
       <p:ext uri="{BB962C8B-B14F-4D97-AF65-F5344CB8AC3E}">
         <p14:creationId xmlns:p14="http://schemas.microsoft.com/office/powerpoint/2010/main" val="2806523440"/>
-      </p:ext>
-    </p:extLst>
-  </p:cSld>
-  <p:clrMapOvr>
-    <a:masterClrMapping/>
-  </p:clrMapOvr>
-</p:sld>
-</file>
-
-<file path=ppt/slides/slide20.xml><?xml version="1.0" encoding="utf-8"?>
-<p:sld xmlns:a="http://schemas.openxmlformats.org/drawingml/2006/main" xmlns:r="http://schemas.openxmlformats.org/officeDocument/2006/relationships" xmlns:p="http://schemas.openxmlformats.org/presentationml/2006/main">
-  <p:cSld>
-    <p:spTree>
-      <p:nvGrpSpPr>
-        <p:cNvPr id="1" name=""/>
-        <p:cNvGrpSpPr/>
-        <p:nvPr/>
-      </p:nvGrpSpPr>
-      <p:grpSpPr>
-        <a:xfrm>
-          <a:off x="0" y="0"/>
-          <a:ext cx="0" cy="0"/>
-          <a:chOff x="0" y="0"/>
-          <a:chExt cx="0" cy="0"/>
-        </a:xfrm>
-      </p:grpSpPr>
-      <p:sp>
-        <p:nvSpPr>
-          <p:cNvPr id="2" name="Title 1">
-            <a:extLst>
-              <a:ext uri="{FF2B5EF4-FFF2-40B4-BE49-F238E27FC236}">
-                <a16:creationId xmlns:a16="http://schemas.microsoft.com/office/drawing/2014/main" id="{E40EE3A0-26DE-094D-B08A-0FFF2ED59B62}"/>
-              </a:ext>
-            </a:extLst>
-          </p:cNvPr>
-          <p:cNvSpPr>
-            <a:spLocks noGrp="1"/>
-          </p:cNvSpPr>
-          <p:nvPr>
-            <p:ph type="title"/>
-          </p:nvPr>
-        </p:nvSpPr>
-        <p:spPr/>
-        <p:txBody>
-          <a:bodyPr/>
-          <a:lstStyle/>
-          <a:p>
-            <a:r>
-              <a:rPr lang="en-US" dirty="0"/>
-              <a:t>Conclusions and future work</a:t>
-            </a:r>
-          </a:p>
-        </p:txBody>
-      </p:sp>
-      <p:sp>
-        <p:nvSpPr>
-          <p:cNvPr id="3" name="Content Placeholder 2">
-            <a:extLst>
-              <a:ext uri="{FF2B5EF4-FFF2-40B4-BE49-F238E27FC236}">
-                <a16:creationId xmlns:a16="http://schemas.microsoft.com/office/drawing/2014/main" id="{0D49348D-EFBF-DD47-BD6C-5149EC36A088}"/>
-              </a:ext>
-            </a:extLst>
-          </p:cNvPr>
-          <p:cNvSpPr>
-            <a:spLocks noGrp="1"/>
-          </p:cNvSpPr>
-          <p:nvPr>
-            <p:ph idx="1"/>
-          </p:nvPr>
-        </p:nvSpPr>
-        <p:spPr/>
-        <p:txBody>
-          <a:bodyPr/>
-          <a:lstStyle/>
-          <a:p>
-            <a:endParaRPr lang="en-US" dirty="0"/>
-          </a:p>
-        </p:txBody>
-      </p:sp>
-    </p:spTree>
-    <p:extLst>
-      <p:ext uri="{BB962C8B-B14F-4D97-AF65-F5344CB8AC3E}">
-        <p14:creationId xmlns:p14="http://schemas.microsoft.com/office/powerpoint/2010/main" val="1393989079"/>
       </p:ext>
     </p:extLst>
   </p:cSld>
@@ -46550,8 +46452,8 @@
         </p:nvSpPr>
         <p:spPr>
           <a:xfrm>
-            <a:off x="1141413" y="618518"/>
-            <a:ext cx="9905998" cy="1275596"/>
+            <a:off x="1141412" y="657726"/>
+            <a:ext cx="9905999" cy="1236388"/>
           </a:xfrm>
         </p:spPr>
         <p:txBody>
@@ -46629,6 +46531,47 @@
           </a:p>
         </p:txBody>
       </p:sp>
+      <p:cxnSp>
+        <p:nvCxnSpPr>
+          <p:cNvPr id="4" name="Straight Connector 3">
+            <a:extLst>
+              <a:ext uri="{FF2B5EF4-FFF2-40B4-BE49-F238E27FC236}">
+                <a16:creationId xmlns:a16="http://schemas.microsoft.com/office/drawing/2014/main" id="{494A6092-4DF1-554C-ACC7-B34E693F5936}"/>
+              </a:ext>
+            </a:extLst>
+          </p:cNvPr>
+          <p:cNvCxnSpPr/>
+          <p:nvPr/>
+        </p:nvCxnSpPr>
+        <p:spPr>
+          <a:xfrm>
+            <a:off x="1141412" y="1443789"/>
+            <a:ext cx="9905999" cy="0"/>
+          </a:xfrm>
+          <a:prstGeom prst="line">
+            <a:avLst/>
+          </a:prstGeom>
+          <a:ln w="38100">
+            <a:solidFill>
+              <a:schemeClr val="tx1"/>
+            </a:solidFill>
+          </a:ln>
+        </p:spPr>
+        <p:style>
+          <a:lnRef idx="1">
+            <a:schemeClr val="accent1"/>
+          </a:lnRef>
+          <a:fillRef idx="0">
+            <a:schemeClr val="accent1"/>
+          </a:fillRef>
+          <a:effectRef idx="0">
+            <a:schemeClr val="accent1"/>
+          </a:effectRef>
+          <a:fontRef idx="minor">
+            <a:schemeClr val="tx1"/>
+          </a:fontRef>
+        </p:style>
+      </p:cxnSp>
     </p:spTree>
     <p:extLst>
       <p:ext uri="{BB962C8B-B14F-4D97-AF65-F5344CB8AC3E}">
@@ -46677,7 +46620,7 @@
         </p:nvSpPr>
         <p:spPr>
           <a:xfrm>
-            <a:off x="1141411" y="619127"/>
+            <a:off x="1141411" y="506833"/>
             <a:ext cx="9906000" cy="823912"/>
           </a:xfrm>
         </p:spPr>
@@ -47396,6 +47339,47 @@
           </a:p>
         </p:txBody>
       </p:sp>
+      <p:cxnSp>
+        <p:nvCxnSpPr>
+          <p:cNvPr id="10" name="Straight Connector 9">
+            <a:extLst>
+              <a:ext uri="{FF2B5EF4-FFF2-40B4-BE49-F238E27FC236}">
+                <a16:creationId xmlns:a16="http://schemas.microsoft.com/office/drawing/2014/main" id="{6A57132B-4504-2742-8E07-0949B629B577}"/>
+              </a:ext>
+            </a:extLst>
+          </p:cNvPr>
+          <p:cNvCxnSpPr/>
+          <p:nvPr/>
+        </p:nvCxnSpPr>
+        <p:spPr>
+          <a:xfrm>
+            <a:off x="1141412" y="1090865"/>
+            <a:ext cx="9905999" cy="0"/>
+          </a:xfrm>
+          <a:prstGeom prst="line">
+            <a:avLst/>
+          </a:prstGeom>
+          <a:ln w="38100">
+            <a:solidFill>
+              <a:schemeClr val="tx1"/>
+            </a:solidFill>
+          </a:ln>
+        </p:spPr>
+        <p:style>
+          <a:lnRef idx="1">
+            <a:schemeClr val="accent1"/>
+          </a:lnRef>
+          <a:fillRef idx="0">
+            <a:schemeClr val="accent1"/>
+          </a:fillRef>
+          <a:effectRef idx="0">
+            <a:schemeClr val="accent1"/>
+          </a:effectRef>
+          <a:fontRef idx="minor">
+            <a:schemeClr val="tx1"/>
+          </a:fontRef>
+        </p:style>
+      </p:cxnSp>
     </p:spTree>
     <p:extLst>
       <p:ext uri="{BB962C8B-B14F-4D97-AF65-F5344CB8AC3E}">
@@ -47454,38 +47438,36 @@
           </a:p>
         </p:txBody>
       </p:sp>
-      <p:pic>
-        <p:nvPicPr>
-          <p:cNvPr id="4" name="Content Placeholder 3">
+      <p:sp>
+        <p:nvSpPr>
+          <p:cNvPr id="16" name="Content Placeholder 15">
             <a:extLst>
               <a:ext uri="{FF2B5EF4-FFF2-40B4-BE49-F238E27FC236}">
-                <a16:creationId xmlns:a16="http://schemas.microsoft.com/office/drawing/2014/main" id="{41986BA5-34C4-4087-A4EE-D7F11D4BFD07}"/>
+                <a16:creationId xmlns:a16="http://schemas.microsoft.com/office/drawing/2014/main" id="{7A0356F7-F0D1-0045-8684-719605ACA64F}"/>
               </a:ext>
             </a:extLst>
           </p:cNvPr>
-          <p:cNvPicPr>
-            <a:picLocks noGrp="1" noChangeAspect="1"/>
-          </p:cNvPicPr>
+          <p:cNvSpPr>
+            <a:spLocks noGrp="1"/>
+          </p:cNvSpPr>
           <p:nvPr>
             <p:ph idx="1"/>
           </p:nvPr>
-        </p:nvPicPr>
-        <p:blipFill>
-          <a:blip r:embed="rId3"/>
-          <a:stretch>
-            <a:fillRect/>
-          </a:stretch>
-        </p:blipFill>
+        </p:nvSpPr>
         <p:spPr>
           <a:xfrm>
-            <a:off x="4457700" y="2175399"/>
-            <a:ext cx="3273426" cy="3953416"/>
+            <a:off x="1141412" y="2512585"/>
+            <a:ext cx="9905999" cy="3278615"/>
           </a:xfrm>
-          <a:prstGeom prst="rect">
-            <a:avLst/>
-          </a:prstGeom>
         </p:spPr>
-      </p:pic>
+        <p:txBody>
+          <a:bodyPr/>
+          <a:lstStyle/>
+          <a:p>
+            <a:endParaRPr lang="en-US" dirty="0"/>
+          </a:p>
+        </p:txBody>
+      </p:sp>
       <p:sp>
         <p:nvSpPr>
           <p:cNvPr id="7" name="TextBox 6">
@@ -47521,6 +47503,47 @@
           </a:p>
         </p:txBody>
       </p:sp>
+      <p:cxnSp>
+        <p:nvCxnSpPr>
+          <p:cNvPr id="5" name="Straight Connector 4">
+            <a:extLst>
+              <a:ext uri="{FF2B5EF4-FFF2-40B4-BE49-F238E27FC236}">
+                <a16:creationId xmlns:a16="http://schemas.microsoft.com/office/drawing/2014/main" id="{815C533E-203F-9B45-A571-D8C40EE5C620}"/>
+              </a:ext>
+            </a:extLst>
+          </p:cNvPr>
+          <p:cNvCxnSpPr/>
+          <p:nvPr/>
+        </p:nvCxnSpPr>
+        <p:spPr>
+          <a:xfrm>
+            <a:off x="1141412" y="1523999"/>
+            <a:ext cx="9905999" cy="0"/>
+          </a:xfrm>
+          <a:prstGeom prst="line">
+            <a:avLst/>
+          </a:prstGeom>
+          <a:ln w="38100">
+            <a:solidFill>
+              <a:schemeClr val="tx1"/>
+            </a:solidFill>
+          </a:ln>
+        </p:spPr>
+        <p:style>
+          <a:lnRef idx="1">
+            <a:schemeClr val="accent1"/>
+          </a:lnRef>
+          <a:fillRef idx="0">
+            <a:schemeClr val="accent1"/>
+          </a:fillRef>
+          <a:effectRef idx="0">
+            <a:schemeClr val="accent1"/>
+          </a:effectRef>
+          <a:fontRef idx="minor">
+            <a:schemeClr val="tx1"/>
+          </a:fontRef>
+        </p:style>
+      </p:cxnSp>
     </p:spTree>
     <p:extLst>
       <p:ext uri="{BB962C8B-B14F-4D97-AF65-F5344CB8AC3E}">
@@ -47603,7 +47626,7 @@
         </p:spPr>
         <p:txBody>
           <a:bodyPr>
-            <a:normAutofit fontScale="55000" lnSpcReduction="20000"/>
+            <a:normAutofit lnSpcReduction="10000"/>
           </a:bodyPr>
           <a:lstStyle/>
           <a:p>
@@ -47653,36 +47676,6 @@
           <a:p>
             <a:r>
               <a:rPr lang="en-US" dirty="0"/>
-              <a:t>C# Libraries used:</a:t>
-            </a:r>
-          </a:p>
-          <a:p>
-            <a:pPr lvl="1"/>
-            <a:r>
-              <a:rPr lang="en-US" dirty="0" err="1"/>
-              <a:t>RestSharp</a:t>
-            </a:r>
-            <a:endParaRPr lang="en-US" dirty="0"/>
-          </a:p>
-          <a:p>
-            <a:pPr lvl="1"/>
-            <a:r>
-              <a:rPr lang="en-US" dirty="0" err="1"/>
-              <a:t>NewstonSoft.Json</a:t>
-            </a:r>
-            <a:endParaRPr lang="en-US" dirty="0"/>
-          </a:p>
-          <a:p>
-            <a:pPr lvl="1"/>
-            <a:r>
-              <a:rPr lang="en-US" dirty="0" err="1"/>
-              <a:t>MySql.Data</a:t>
-            </a:r>
-            <a:endParaRPr lang="en-US" dirty="0"/>
-          </a:p>
-          <a:p>
-            <a:r>
-              <a:rPr lang="en-US" dirty="0"/>
               <a:t>Create tables for the data gathered with column one being date-time format.</a:t>
             </a:r>
           </a:p>
@@ -47726,11 +47719,52 @@
             </a:r>
             <a:r>
               <a:rPr lang="en-US" sz="2400" dirty="0"/>
-              <a:t> Notebook and C#</a:t>
+              <a:t> Notebook</a:t>
             </a:r>
           </a:p>
         </p:txBody>
       </p:sp>
+      <p:cxnSp>
+        <p:nvCxnSpPr>
+          <p:cNvPr id="5" name="Straight Connector 4">
+            <a:extLst>
+              <a:ext uri="{FF2B5EF4-FFF2-40B4-BE49-F238E27FC236}">
+                <a16:creationId xmlns:a16="http://schemas.microsoft.com/office/drawing/2014/main" id="{C21B80B2-D6B1-B940-973A-54A59537D45B}"/>
+              </a:ext>
+            </a:extLst>
+          </p:cNvPr>
+          <p:cNvCxnSpPr/>
+          <p:nvPr/>
+        </p:nvCxnSpPr>
+        <p:spPr>
+          <a:xfrm>
+            <a:off x="1141412" y="1523999"/>
+            <a:ext cx="9905999" cy="0"/>
+          </a:xfrm>
+          <a:prstGeom prst="line">
+            <a:avLst/>
+          </a:prstGeom>
+          <a:ln w="38100">
+            <a:solidFill>
+              <a:schemeClr val="tx1"/>
+            </a:solidFill>
+          </a:ln>
+        </p:spPr>
+        <p:style>
+          <a:lnRef idx="1">
+            <a:schemeClr val="accent1"/>
+          </a:lnRef>
+          <a:fillRef idx="0">
+            <a:schemeClr val="accent1"/>
+          </a:fillRef>
+          <a:effectRef idx="0">
+            <a:schemeClr val="accent1"/>
+          </a:effectRef>
+          <a:fontRef idx="minor">
+            <a:schemeClr val="tx1"/>
+          </a:fontRef>
+        </p:style>
+      </p:cxnSp>
     </p:spTree>
     <p:extLst>
       <p:ext uri="{BB962C8B-B14F-4D97-AF65-F5344CB8AC3E}">
@@ -47872,11 +47906,52 @@
             </a:r>
             <a:r>
               <a:rPr lang="en-US" sz="2400" dirty="0"/>
-              <a:t> Notebook and C#</a:t>
+              <a:t> Notebook</a:t>
             </a:r>
           </a:p>
         </p:txBody>
       </p:sp>
+      <p:cxnSp>
+        <p:nvCxnSpPr>
+          <p:cNvPr id="5" name="Straight Connector 4">
+            <a:extLst>
+              <a:ext uri="{FF2B5EF4-FFF2-40B4-BE49-F238E27FC236}">
+                <a16:creationId xmlns:a16="http://schemas.microsoft.com/office/drawing/2014/main" id="{1E03029E-0F85-FF4C-BEC2-B294170AAFEB}"/>
+              </a:ext>
+            </a:extLst>
+          </p:cNvPr>
+          <p:cNvCxnSpPr/>
+          <p:nvPr/>
+        </p:nvCxnSpPr>
+        <p:spPr>
+          <a:xfrm>
+            <a:off x="1141412" y="1523999"/>
+            <a:ext cx="9905999" cy="0"/>
+          </a:xfrm>
+          <a:prstGeom prst="line">
+            <a:avLst/>
+          </a:prstGeom>
+          <a:ln w="38100">
+            <a:solidFill>
+              <a:schemeClr val="tx1"/>
+            </a:solidFill>
+          </a:ln>
+        </p:spPr>
+        <p:style>
+          <a:lnRef idx="1">
+            <a:schemeClr val="accent1"/>
+          </a:lnRef>
+          <a:fillRef idx="0">
+            <a:schemeClr val="accent1"/>
+          </a:fillRef>
+          <a:effectRef idx="0">
+            <a:schemeClr val="accent1"/>
+          </a:effectRef>
+          <a:fontRef idx="minor">
+            <a:schemeClr val="tx1"/>
+          </a:fontRef>
+        </p:style>
+      </p:cxnSp>
     </p:spTree>
     <p:extLst>
       <p:ext uri="{BB962C8B-B14F-4D97-AF65-F5344CB8AC3E}">
@@ -48022,6 +48097,47 @@
           </a:p>
         </p:txBody>
       </p:sp>
+      <p:cxnSp>
+        <p:nvCxnSpPr>
+          <p:cNvPr id="5" name="Straight Connector 4">
+            <a:extLst>
+              <a:ext uri="{FF2B5EF4-FFF2-40B4-BE49-F238E27FC236}">
+                <a16:creationId xmlns:a16="http://schemas.microsoft.com/office/drawing/2014/main" id="{548701DE-6B6C-5641-AD95-DFA9341006B8}"/>
+              </a:ext>
+            </a:extLst>
+          </p:cNvPr>
+          <p:cNvCxnSpPr/>
+          <p:nvPr/>
+        </p:nvCxnSpPr>
+        <p:spPr>
+          <a:xfrm>
+            <a:off x="1141412" y="1523999"/>
+            <a:ext cx="9905999" cy="0"/>
+          </a:xfrm>
+          <a:prstGeom prst="line">
+            <a:avLst/>
+          </a:prstGeom>
+          <a:ln w="38100">
+            <a:solidFill>
+              <a:schemeClr val="tx1"/>
+            </a:solidFill>
+          </a:ln>
+        </p:spPr>
+        <p:style>
+          <a:lnRef idx="1">
+            <a:schemeClr val="accent1"/>
+          </a:lnRef>
+          <a:fillRef idx="0">
+            <a:schemeClr val="accent1"/>
+          </a:fillRef>
+          <a:effectRef idx="0">
+            <a:schemeClr val="accent1"/>
+          </a:effectRef>
+          <a:fontRef idx="minor">
+            <a:schemeClr val="tx1"/>
+          </a:fontRef>
+        </p:style>
+      </p:cxnSp>
     </p:spTree>
     <p:extLst>
       <p:ext uri="{BB962C8B-B14F-4D97-AF65-F5344CB8AC3E}">
@@ -48070,7 +48186,7 @@
         </p:nvSpPr>
         <p:spPr>
           <a:xfrm>
-            <a:off x="1146704" y="609603"/>
+            <a:off x="1141412" y="957907"/>
             <a:ext cx="7740121" cy="590548"/>
           </a:xfrm>
         </p:spPr>
@@ -48210,12 +48326,53 @@
               <a:rPr lang="en-US" sz="1200" dirty="0">
                 <a:hlinkClick r:id="rId5"/>
               </a:rPr>
-              <a:t>https://api.iextrading.com </a:t>
+              <a:t>https://finance.yahoo.com </a:t>
             </a:r>
             <a:endParaRPr lang="en-US" sz="1200" dirty="0"/>
           </a:p>
         </p:txBody>
       </p:sp>
+      <p:cxnSp>
+        <p:nvCxnSpPr>
+          <p:cNvPr id="5" name="Straight Connector 4">
+            <a:extLst>
+              <a:ext uri="{FF2B5EF4-FFF2-40B4-BE49-F238E27FC236}">
+                <a16:creationId xmlns:a16="http://schemas.microsoft.com/office/drawing/2014/main" id="{6FE2A2A8-8E54-704B-8397-94785746AB9D}"/>
+              </a:ext>
+            </a:extLst>
+          </p:cNvPr>
+          <p:cNvCxnSpPr/>
+          <p:nvPr/>
+        </p:nvCxnSpPr>
+        <p:spPr>
+          <a:xfrm>
+            <a:off x="1141412" y="1443789"/>
+            <a:ext cx="9905999" cy="0"/>
+          </a:xfrm>
+          <a:prstGeom prst="line">
+            <a:avLst/>
+          </a:prstGeom>
+          <a:ln w="38100">
+            <a:solidFill>
+              <a:schemeClr val="tx1"/>
+            </a:solidFill>
+          </a:ln>
+        </p:spPr>
+        <p:style>
+          <a:lnRef idx="1">
+            <a:schemeClr val="accent1"/>
+          </a:lnRef>
+          <a:fillRef idx="0">
+            <a:schemeClr val="accent1"/>
+          </a:fillRef>
+          <a:effectRef idx="0">
+            <a:schemeClr val="accent1"/>
+          </a:effectRef>
+          <a:fontRef idx="minor">
+            <a:schemeClr val="tx1"/>
+          </a:fontRef>
+        </p:style>
+      </p:cxnSp>
     </p:spTree>
     <p:extLst>
       <p:ext uri="{BB962C8B-B14F-4D97-AF65-F5344CB8AC3E}">

</xml_diff>

<commit_message>
Added ER diagram to folder and PPT
</commit_message>
<xml_diff>
--- a/Presentation/MSDS_7330_Group_Project_Presentation.pptx
+++ b/Presentation/MSDS_7330_Group_Project_Presentation.pptx
@@ -1142,9 +1142,9 @@
     <dgm:cxn modelId="{D824D305-A2DE-2840-9434-75869C296825}" type="presOf" srcId="{D98B5C20-E098-694C-BF21-1ECF2915B5ED}" destId="{25C79D8A-E005-CC41-8C9F-3DF08186CA03}" srcOrd="0" destOrd="0" presId="urn:microsoft.com/office/officeart/2008/layout/RadialCluster"/>
     <dgm:cxn modelId="{A099E015-E820-9F49-941A-E28E7D86B781}" type="presOf" srcId="{CEFBE1CC-099A-F24C-92AA-FE35AB04CF4D}" destId="{529BF845-11CD-4D41-B588-97A4CB9F5547}" srcOrd="0" destOrd="0" presId="urn:microsoft.com/office/officeart/2008/layout/RadialCluster"/>
     <dgm:cxn modelId="{DAC51719-A7B4-AC47-AC21-5EDFD0D938CC}" type="presOf" srcId="{AFBB05AA-B00F-7942-944F-AE8CA6A3C623}" destId="{B37337EC-F7E1-C14B-8D69-1DE47B592ABE}" srcOrd="0" destOrd="0" presId="urn:microsoft.com/office/officeart/2008/layout/RadialCluster"/>
+    <dgm:cxn modelId="{548E8263-BAB8-9B45-9BF5-A81D8B50C58A}" srcId="{6C822FC1-F83A-C847-948B-E21719CC17CD}" destId="{AFBB05AA-B00F-7942-944F-AE8CA6A3C623}" srcOrd="0" destOrd="0" parTransId="{21680FB6-6688-7641-8814-DF6BFB4F9080}" sibTransId="{1126CFBB-1CF0-1945-A915-815EEECBE25A}"/>
     <dgm:cxn modelId="{EA2E4352-266D-9843-AA16-F922226B0420}" srcId="{AFBB05AA-B00F-7942-944F-AE8CA6A3C623}" destId="{BE0979DF-D84E-2345-97A8-8E6EA685D256}" srcOrd="0" destOrd="0" parTransId="{00CE1E3D-5895-6446-9F3E-AB4E4BE5A0C8}" sibTransId="{AC7DC699-FDF3-A545-BD8C-DA84E1E60879}"/>
     <dgm:cxn modelId="{E6287F54-7571-CC49-B241-6162FC723866}" type="presOf" srcId="{21680FB6-6688-7641-8814-DF6BFB4F9080}" destId="{8F5EC628-7EE7-8643-A56A-4563C94FADC0}" srcOrd="0" destOrd="0" presId="urn:microsoft.com/office/officeart/2008/layout/RadialCluster"/>
-    <dgm:cxn modelId="{548E8263-BAB8-9B45-9BF5-A81D8B50C58A}" srcId="{6C822FC1-F83A-C847-948B-E21719CC17CD}" destId="{AFBB05AA-B00F-7942-944F-AE8CA6A3C623}" srcOrd="0" destOrd="0" parTransId="{21680FB6-6688-7641-8814-DF6BFB4F9080}" sibTransId="{1126CFBB-1CF0-1945-A915-815EEECBE25A}"/>
     <dgm:cxn modelId="{A4ED3779-0FE6-D944-AAB7-0920AD42CE16}" type="presOf" srcId="{606AD026-0ACF-594E-A806-80D3B76FEA66}" destId="{B7574D95-F74D-FA49-A64F-B76754182F1F}" srcOrd="0" destOrd="0" presId="urn:microsoft.com/office/officeart/2008/layout/RadialCluster"/>
     <dgm:cxn modelId="{BC8763AC-E2FD-EB4F-88F3-E00970DC8370}" type="presOf" srcId="{9B1EC198-4A1E-5D4C-9B77-9DE047F9D3FA}" destId="{EFB7774B-8185-1644-9141-DBFC7B177724}" srcOrd="0" destOrd="0" presId="urn:microsoft.com/office/officeart/2008/layout/RadialCluster"/>
     <dgm:cxn modelId="{3B8902AE-2D42-DC43-8FB8-BFD1182C63B7}" type="presOf" srcId="{6C822FC1-F83A-C847-948B-E21719CC17CD}" destId="{D37B14B5-FD6D-024D-AD33-4E0F624CF5D0}" srcOrd="0" destOrd="0" presId="urn:microsoft.com/office/officeart/2008/layout/RadialCluster"/>
@@ -5986,7 +5986,7 @@
           <a:p>
             <a:fld id="{8255D30F-08CA-F947-9E33-FA70FD82FF0C}" type="datetimeFigureOut">
               <a:rPr lang="en-US" smtClean="0"/>
-              <a:t>11/24/18</a:t>
+              <a:t>11/25/2018</a:t>
             </a:fld>
             <a:endParaRPr lang="en-US"/>
           </a:p>
@@ -7083,7 +7083,7 @@
           <a:noFill/>
           <a:extLst>
             <a:ext uri="{909E8E84-426E-40dd-AFC4-6F175D3DCCD1}">
-              <a14:hiddenFill xmlns:a14="http://schemas.microsoft.com/office/drawing/2010/main" xmlns="">
+              <a14:hiddenFill xmlns="" xmlns:a14="http://schemas.microsoft.com/office/drawing/2010/main">
                 <a:solidFill>
                   <a:srgbClr val="FFFFFF"/>
                 </a:solidFill>
@@ -7143,7 +7143,7 @@
             </a:ln>
             <a:extLst>
               <a:ext uri="{91240B29-F687-4f45-9708-019B960494DF}">
-                <a14:hiddenLine xmlns:a14="http://schemas.microsoft.com/office/drawing/2010/main" xmlns="" w="9525">
+                <a14:hiddenLine xmlns="" xmlns:a14="http://schemas.microsoft.com/office/drawing/2010/main" w="9525">
                   <a:solidFill>
                     <a:srgbClr val="000000"/>
                   </a:solidFill>
@@ -7233,7 +7233,7 @@
             </a:ln>
             <a:extLst>
               <a:ext uri="{91240B29-F687-4f45-9708-019B960494DF}">
-                <a14:hiddenLine xmlns:a14="http://schemas.microsoft.com/office/drawing/2010/main" xmlns="" w="9525">
+                <a14:hiddenLine xmlns="" xmlns:a14="http://schemas.microsoft.com/office/drawing/2010/main" w="9525">
                   <a:solidFill>
                     <a:srgbClr val="000000"/>
                   </a:solidFill>
@@ -7323,7 +7323,7 @@
             </a:ln>
             <a:extLst>
               <a:ext uri="{91240B29-F687-4f45-9708-019B960494DF}">
-                <a14:hiddenLine xmlns:a14="http://schemas.microsoft.com/office/drawing/2010/main" xmlns="" w="9525">
+                <a14:hiddenLine xmlns="" xmlns:a14="http://schemas.microsoft.com/office/drawing/2010/main" w="9525">
                   <a:solidFill>
                     <a:srgbClr val="000000"/>
                   </a:solidFill>
@@ -7357,7 +7357,7 @@
             </a:ln>
             <a:extLst>
               <a:ext uri="{91240B29-F687-4f45-9708-019B960494DF}">
-                <a14:hiddenLine xmlns:a14="http://schemas.microsoft.com/office/drawing/2010/main" xmlns="" w="9525">
+                <a14:hiddenLine xmlns="" xmlns:a14="http://schemas.microsoft.com/office/drawing/2010/main" w="9525">
                   <a:solidFill>
                     <a:srgbClr val="000000"/>
                   </a:solidFill>
@@ -7447,7 +7447,7 @@
             </a:ln>
             <a:extLst>
               <a:ext uri="{91240B29-F687-4f45-9708-019B960494DF}">
-                <a14:hiddenLine xmlns:a14="http://schemas.microsoft.com/office/drawing/2010/main" xmlns="" w="9525">
+                <a14:hiddenLine xmlns="" xmlns:a14="http://schemas.microsoft.com/office/drawing/2010/main" w="9525">
                   <a:solidFill>
                     <a:srgbClr val="000000"/>
                   </a:solidFill>
@@ -7509,7 +7509,7 @@
             </a:ln>
             <a:extLst>
               <a:ext uri="{91240B29-F687-4f45-9708-019B960494DF}">
-                <a14:hiddenLine xmlns:a14="http://schemas.microsoft.com/office/drawing/2010/main" xmlns="" w="9525">
+                <a14:hiddenLine xmlns="" xmlns:a14="http://schemas.microsoft.com/office/drawing/2010/main" w="9525">
                   <a:solidFill>
                     <a:srgbClr val="000000"/>
                   </a:solidFill>
@@ -7571,7 +7571,7 @@
             </a:ln>
             <a:extLst>
               <a:ext uri="{91240B29-F687-4f45-9708-019B960494DF}">
-                <a14:hiddenLine xmlns:a14="http://schemas.microsoft.com/office/drawing/2010/main" xmlns="" w="9525">
+                <a14:hiddenLine xmlns="" xmlns:a14="http://schemas.microsoft.com/office/drawing/2010/main" w="9525">
                   <a:solidFill>
                     <a:srgbClr val="000000"/>
                   </a:solidFill>
@@ -7661,7 +7661,7 @@
             </a:ln>
             <a:extLst>
               <a:ext uri="{91240B29-F687-4f45-9708-019B960494DF}">
-                <a14:hiddenLine xmlns:a14="http://schemas.microsoft.com/office/drawing/2010/main" xmlns="" w="9525">
+                <a14:hiddenLine xmlns="" xmlns:a14="http://schemas.microsoft.com/office/drawing/2010/main" w="9525">
                   <a:solidFill>
                     <a:srgbClr val="000000"/>
                   </a:solidFill>
@@ -7723,7 +7723,7 @@
             </a:ln>
             <a:extLst>
               <a:ext uri="{91240B29-F687-4f45-9708-019B960494DF}">
-                <a14:hiddenLine xmlns:a14="http://schemas.microsoft.com/office/drawing/2010/main" xmlns="" w="9525">
+                <a14:hiddenLine xmlns="" xmlns:a14="http://schemas.microsoft.com/office/drawing/2010/main" w="9525">
                   <a:solidFill>
                     <a:srgbClr val="000000"/>
                   </a:solidFill>
@@ -7785,7 +7785,7 @@
             </a:ln>
             <a:extLst>
               <a:ext uri="{91240B29-F687-4f45-9708-019B960494DF}">
-                <a14:hiddenLine xmlns:a14="http://schemas.microsoft.com/office/drawing/2010/main" xmlns="" w="9525">
+                <a14:hiddenLine xmlns="" xmlns:a14="http://schemas.microsoft.com/office/drawing/2010/main" w="9525">
                   <a:solidFill>
                     <a:srgbClr val="000000"/>
                   </a:solidFill>
@@ -7875,7 +7875,7 @@
             </a:ln>
             <a:extLst>
               <a:ext uri="{91240B29-F687-4f45-9708-019B960494DF}">
-                <a14:hiddenLine xmlns:a14="http://schemas.microsoft.com/office/drawing/2010/main" xmlns="" w="9525">
+                <a14:hiddenLine xmlns="" xmlns:a14="http://schemas.microsoft.com/office/drawing/2010/main" w="9525">
                   <a:solidFill>
                     <a:srgbClr val="000000"/>
                   </a:solidFill>
@@ -7965,7 +7965,7 @@
             </a:ln>
             <a:extLst>
               <a:ext uri="{91240B29-F687-4f45-9708-019B960494DF}">
-                <a14:hiddenLine xmlns:a14="http://schemas.microsoft.com/office/drawing/2010/main" xmlns="" w="9525">
+                <a14:hiddenLine xmlns="" xmlns:a14="http://schemas.microsoft.com/office/drawing/2010/main" w="9525">
                   <a:solidFill>
                     <a:srgbClr val="000000"/>
                   </a:solidFill>
@@ -8027,7 +8027,7 @@
             </a:ln>
             <a:extLst>
               <a:ext uri="{91240B29-F687-4f45-9708-019B960494DF}">
-                <a14:hiddenLine xmlns:a14="http://schemas.microsoft.com/office/drawing/2010/main" xmlns="" w="9525">
+                <a14:hiddenLine xmlns="" xmlns:a14="http://schemas.microsoft.com/office/drawing/2010/main" w="9525">
                   <a:solidFill>
                     <a:srgbClr val="000000"/>
                   </a:solidFill>
@@ -8137,7 +8137,7 @@
             </a:ln>
             <a:extLst>
               <a:ext uri="{91240B29-F687-4f45-9708-019B960494DF}">
-                <a14:hiddenLine xmlns:a14="http://schemas.microsoft.com/office/drawing/2010/main" xmlns="" w="9525">
+                <a14:hiddenLine xmlns="" xmlns:a14="http://schemas.microsoft.com/office/drawing/2010/main" w="9525">
                   <a:solidFill>
                     <a:srgbClr val="000000"/>
                   </a:solidFill>
@@ -8199,7 +8199,7 @@
             </a:ln>
             <a:extLst>
               <a:ext uri="{91240B29-F687-4f45-9708-019B960494DF}">
-                <a14:hiddenLine xmlns:a14="http://schemas.microsoft.com/office/drawing/2010/main" xmlns="" w="9525">
+                <a14:hiddenLine xmlns="" xmlns:a14="http://schemas.microsoft.com/office/drawing/2010/main" w="9525">
                   <a:solidFill>
                     <a:srgbClr val="000000"/>
                   </a:solidFill>
@@ -8289,7 +8289,7 @@
             </a:ln>
             <a:extLst>
               <a:ext uri="{91240B29-F687-4f45-9708-019B960494DF}">
-                <a14:hiddenLine xmlns:a14="http://schemas.microsoft.com/office/drawing/2010/main" xmlns="" w="9525">
+                <a14:hiddenLine xmlns="" xmlns:a14="http://schemas.microsoft.com/office/drawing/2010/main" w="9525">
                   <a:solidFill>
                     <a:srgbClr val="000000"/>
                   </a:solidFill>
@@ -8379,7 +8379,7 @@
             </a:ln>
             <a:extLst>
               <a:ext uri="{91240B29-F687-4f45-9708-019B960494DF}">
-                <a14:hiddenLine xmlns:a14="http://schemas.microsoft.com/office/drawing/2010/main" xmlns="" w="9525">
+                <a14:hiddenLine xmlns="" xmlns:a14="http://schemas.microsoft.com/office/drawing/2010/main" w="9525">
                   <a:solidFill>
                     <a:srgbClr val="000000"/>
                   </a:solidFill>
@@ -8441,7 +8441,7 @@
             </a:ln>
             <a:extLst>
               <a:ext uri="{91240B29-F687-4f45-9708-019B960494DF}">
-                <a14:hiddenLine xmlns:a14="http://schemas.microsoft.com/office/drawing/2010/main" xmlns="" w="9525">
+                <a14:hiddenLine xmlns="" xmlns:a14="http://schemas.microsoft.com/office/drawing/2010/main" w="9525">
                   <a:solidFill>
                     <a:srgbClr val="000000"/>
                   </a:solidFill>
@@ -8531,7 +8531,7 @@
             </a:ln>
             <a:extLst>
               <a:ext uri="{91240B29-F687-4f45-9708-019B960494DF}">
-                <a14:hiddenLine xmlns:a14="http://schemas.microsoft.com/office/drawing/2010/main" xmlns="" w="9525">
+                <a14:hiddenLine xmlns="" xmlns:a14="http://schemas.microsoft.com/office/drawing/2010/main" w="9525">
                   <a:solidFill>
                     <a:srgbClr val="000000"/>
                   </a:solidFill>
@@ -8621,7 +8621,7 @@
             </a:ln>
             <a:extLst>
               <a:ext uri="{91240B29-F687-4f45-9708-019B960494DF}">
-                <a14:hiddenLine xmlns:a14="http://schemas.microsoft.com/office/drawing/2010/main" xmlns="" w="9525">
+                <a14:hiddenLine xmlns="" xmlns:a14="http://schemas.microsoft.com/office/drawing/2010/main" w="9525">
                   <a:solidFill>
                     <a:srgbClr val="000000"/>
                   </a:solidFill>
@@ -8677,7 +8677,7 @@
             </a:ln>
             <a:extLst>
               <a:ext uri="{91240B29-F687-4f45-9708-019B960494DF}">
-                <a14:hiddenLine xmlns:a14="http://schemas.microsoft.com/office/drawing/2010/main" xmlns="" w="9525">
+                <a14:hiddenLine xmlns="" xmlns:a14="http://schemas.microsoft.com/office/drawing/2010/main" w="9525">
                   <a:solidFill>
                     <a:srgbClr val="000000"/>
                   </a:solidFill>
@@ -8767,7 +8767,7 @@
             </a:ln>
             <a:extLst>
               <a:ext uri="{91240B29-F687-4f45-9708-019B960494DF}">
-                <a14:hiddenLine xmlns:a14="http://schemas.microsoft.com/office/drawing/2010/main" xmlns="" w="9525">
+                <a14:hiddenLine xmlns="" xmlns:a14="http://schemas.microsoft.com/office/drawing/2010/main" w="9525">
                   <a:solidFill>
                     <a:srgbClr val="000000"/>
                   </a:solidFill>
@@ -8823,7 +8823,7 @@
             </a:ln>
             <a:extLst>
               <a:ext uri="{91240B29-F687-4f45-9708-019B960494DF}">
-                <a14:hiddenLine xmlns:a14="http://schemas.microsoft.com/office/drawing/2010/main" xmlns="" w="9525">
+                <a14:hiddenLine xmlns="" xmlns:a14="http://schemas.microsoft.com/office/drawing/2010/main" w="9525">
                   <a:solidFill>
                     <a:srgbClr val="000000"/>
                   </a:solidFill>
@@ -8913,7 +8913,7 @@
             </a:ln>
             <a:extLst>
               <a:ext uri="{91240B29-F687-4f45-9708-019B960494DF}">
-                <a14:hiddenLine xmlns:a14="http://schemas.microsoft.com/office/drawing/2010/main" xmlns="" w="9525">
+                <a14:hiddenLine xmlns="" xmlns:a14="http://schemas.microsoft.com/office/drawing/2010/main" w="9525">
                   <a:solidFill>
                     <a:srgbClr val="000000"/>
                   </a:solidFill>
@@ -8981,7 +8981,7 @@
             </a:ln>
             <a:extLst>
               <a:ext uri="{91240B29-F687-4f45-9708-019B960494DF}">
-                <a14:hiddenLine xmlns:a14="http://schemas.microsoft.com/office/drawing/2010/main" xmlns="" w="9525">
+                <a14:hiddenLine xmlns="" xmlns:a14="http://schemas.microsoft.com/office/drawing/2010/main" w="9525">
                   <a:solidFill>
                     <a:srgbClr val="000000"/>
                   </a:solidFill>
@@ -9071,7 +9071,7 @@
             </a:ln>
             <a:extLst>
               <a:ext uri="{91240B29-F687-4f45-9708-019B960494DF}">
-                <a14:hiddenLine xmlns:a14="http://schemas.microsoft.com/office/drawing/2010/main" xmlns="" w="9525">
+                <a14:hiddenLine xmlns="" xmlns:a14="http://schemas.microsoft.com/office/drawing/2010/main" w="9525">
                   <a:solidFill>
                     <a:srgbClr val="000000"/>
                   </a:solidFill>
@@ -9139,7 +9139,7 @@
             </a:ln>
             <a:extLst>
               <a:ext uri="{91240B29-F687-4f45-9708-019B960494DF}">
-                <a14:hiddenLine xmlns:a14="http://schemas.microsoft.com/office/drawing/2010/main" xmlns="" w="9525">
+                <a14:hiddenLine xmlns="" xmlns:a14="http://schemas.microsoft.com/office/drawing/2010/main" w="9525">
                   <a:solidFill>
                     <a:srgbClr val="000000"/>
                   </a:solidFill>
@@ -9229,7 +9229,7 @@
             </a:ln>
             <a:extLst>
               <a:ext uri="{91240B29-F687-4f45-9708-019B960494DF}">
-                <a14:hiddenLine xmlns:a14="http://schemas.microsoft.com/office/drawing/2010/main" xmlns="" w="9525">
+                <a14:hiddenLine xmlns="" xmlns:a14="http://schemas.microsoft.com/office/drawing/2010/main" w="9525">
                   <a:solidFill>
                     <a:srgbClr val="000000"/>
                   </a:solidFill>
@@ -9263,7 +9263,7 @@
             </a:ln>
             <a:extLst>
               <a:ext uri="{91240B29-F687-4f45-9708-019B960494DF}">
-                <a14:hiddenLine xmlns:a14="http://schemas.microsoft.com/office/drawing/2010/main" xmlns="" w="9525">
+                <a14:hiddenLine xmlns="" xmlns:a14="http://schemas.microsoft.com/office/drawing/2010/main" w="9525">
                   <a:solidFill>
                     <a:srgbClr val="000000"/>
                   </a:solidFill>
@@ -9353,7 +9353,7 @@
             </a:ln>
             <a:extLst>
               <a:ext uri="{91240B29-F687-4f45-9708-019B960494DF}">
-                <a14:hiddenLine xmlns:a14="http://schemas.microsoft.com/office/drawing/2010/main" xmlns="" w="9525">
+                <a14:hiddenLine xmlns="" xmlns:a14="http://schemas.microsoft.com/office/drawing/2010/main" w="9525">
                   <a:solidFill>
                     <a:srgbClr val="000000"/>
                   </a:solidFill>
@@ -9415,7 +9415,7 @@
             </a:ln>
             <a:extLst>
               <a:ext uri="{91240B29-F687-4f45-9708-019B960494DF}">
-                <a14:hiddenLine xmlns:a14="http://schemas.microsoft.com/office/drawing/2010/main" xmlns="" w="9525">
+                <a14:hiddenLine xmlns="" xmlns:a14="http://schemas.microsoft.com/office/drawing/2010/main" w="9525">
                   <a:solidFill>
                     <a:srgbClr val="000000"/>
                   </a:solidFill>
@@ -9477,7 +9477,7 @@
             </a:ln>
             <a:extLst>
               <a:ext uri="{91240B29-F687-4f45-9708-019B960494DF}">
-                <a14:hiddenLine xmlns:a14="http://schemas.microsoft.com/office/drawing/2010/main" xmlns="" w="9525">
+                <a14:hiddenLine xmlns="" xmlns:a14="http://schemas.microsoft.com/office/drawing/2010/main" w="9525">
                   <a:solidFill>
                     <a:srgbClr val="000000"/>
                   </a:solidFill>
@@ -9567,7 +9567,7 @@
             </a:ln>
             <a:extLst>
               <a:ext uri="{91240B29-F687-4f45-9708-019B960494DF}">
-                <a14:hiddenLine xmlns:a14="http://schemas.microsoft.com/office/drawing/2010/main" xmlns="" w="9525">
+                <a14:hiddenLine xmlns="" xmlns:a14="http://schemas.microsoft.com/office/drawing/2010/main" w="9525">
                   <a:solidFill>
                     <a:srgbClr val="000000"/>
                   </a:solidFill>
@@ -9635,7 +9635,7 @@
             </a:ln>
             <a:extLst>
               <a:ext uri="{91240B29-F687-4f45-9708-019B960494DF}">
-                <a14:hiddenLine xmlns:a14="http://schemas.microsoft.com/office/drawing/2010/main" xmlns="" w="9525">
+                <a14:hiddenLine xmlns="" xmlns:a14="http://schemas.microsoft.com/office/drawing/2010/main" w="9525">
                   <a:solidFill>
                     <a:srgbClr val="000000"/>
                   </a:solidFill>
@@ -9697,7 +9697,7 @@
             </a:ln>
             <a:extLst>
               <a:ext uri="{91240B29-F687-4f45-9708-019B960494DF}">
-                <a14:hiddenLine xmlns:a14="http://schemas.microsoft.com/office/drawing/2010/main" xmlns="" w="9525">
+                <a14:hiddenLine xmlns="" xmlns:a14="http://schemas.microsoft.com/office/drawing/2010/main" w="9525">
                   <a:solidFill>
                     <a:srgbClr val="000000"/>
                   </a:solidFill>
@@ -9787,7 +9787,7 @@
             </a:ln>
             <a:extLst>
               <a:ext uri="{91240B29-F687-4f45-9708-019B960494DF}">
-                <a14:hiddenLine xmlns:a14="http://schemas.microsoft.com/office/drawing/2010/main" xmlns="" w="9525">
+                <a14:hiddenLine xmlns="" xmlns:a14="http://schemas.microsoft.com/office/drawing/2010/main" w="9525">
                   <a:solidFill>
                     <a:srgbClr val="000000"/>
                   </a:solidFill>
@@ -9849,7 +9849,7 @@
             </a:ln>
             <a:extLst>
               <a:ext uri="{91240B29-F687-4f45-9708-019B960494DF}">
-                <a14:hiddenLine xmlns:a14="http://schemas.microsoft.com/office/drawing/2010/main" xmlns="" w="9525">
+                <a14:hiddenLine xmlns="" xmlns:a14="http://schemas.microsoft.com/office/drawing/2010/main" w="9525">
                   <a:solidFill>
                     <a:srgbClr val="000000"/>
                   </a:solidFill>
@@ -9939,7 +9939,7 @@
             </a:ln>
             <a:extLst>
               <a:ext uri="{91240B29-F687-4f45-9708-019B960494DF}">
-                <a14:hiddenLine xmlns:a14="http://schemas.microsoft.com/office/drawing/2010/main" xmlns="" w="9525">
+                <a14:hiddenLine xmlns="" xmlns:a14="http://schemas.microsoft.com/office/drawing/2010/main" w="9525">
                   <a:solidFill>
                     <a:srgbClr val="000000"/>
                   </a:solidFill>
@@ -10001,7 +10001,7 @@
             </a:ln>
             <a:extLst>
               <a:ext uri="{91240B29-F687-4f45-9708-019B960494DF}">
-                <a14:hiddenLine xmlns:a14="http://schemas.microsoft.com/office/drawing/2010/main" xmlns="" w="9525">
+                <a14:hiddenLine xmlns="" xmlns:a14="http://schemas.microsoft.com/office/drawing/2010/main" w="9525">
                   <a:solidFill>
                     <a:srgbClr val="000000"/>
                   </a:solidFill>
@@ -10091,7 +10091,7 @@
             </a:ln>
             <a:extLst>
               <a:ext uri="{91240B29-F687-4f45-9708-019B960494DF}">
-                <a14:hiddenLine xmlns:a14="http://schemas.microsoft.com/office/drawing/2010/main" xmlns="" w="9525">
+                <a14:hiddenLine xmlns="" xmlns:a14="http://schemas.microsoft.com/office/drawing/2010/main" w="9525">
                   <a:solidFill>
                     <a:srgbClr val="000000"/>
                   </a:solidFill>
@@ -10125,7 +10125,7 @@
             </a:ln>
             <a:extLst>
               <a:ext uri="{91240B29-F687-4f45-9708-019B960494DF}">
-                <a14:hiddenLine xmlns:a14="http://schemas.microsoft.com/office/drawing/2010/main" xmlns="" w="9525">
+                <a14:hiddenLine xmlns="" xmlns:a14="http://schemas.microsoft.com/office/drawing/2010/main" w="9525">
                   <a:solidFill>
                     <a:srgbClr val="000000"/>
                   </a:solidFill>
@@ -10190,7 +10190,7 @@
             </a:ln>
             <a:extLst>
               <a:ext uri="{91240B29-F687-4f45-9708-019B960494DF}">
-                <a14:hiddenLine xmlns:a14="http://schemas.microsoft.com/office/drawing/2010/main" xmlns="" w="9525">
+                <a14:hiddenLine xmlns="" xmlns:a14="http://schemas.microsoft.com/office/drawing/2010/main" w="9525">
                   <a:solidFill>
                     <a:srgbClr val="000000"/>
                   </a:solidFill>
@@ -10280,7 +10280,7 @@
             </a:ln>
             <a:extLst>
               <a:ext uri="{91240B29-F687-4f45-9708-019B960494DF}">
-                <a14:hiddenLine xmlns:a14="http://schemas.microsoft.com/office/drawing/2010/main" xmlns="" w="9525">
+                <a14:hiddenLine xmlns="" xmlns:a14="http://schemas.microsoft.com/office/drawing/2010/main" w="9525">
                   <a:solidFill>
                     <a:srgbClr val="000000"/>
                   </a:solidFill>
@@ -10342,7 +10342,7 @@
             </a:ln>
             <a:extLst>
               <a:ext uri="{91240B29-F687-4f45-9708-019B960494DF}">
-                <a14:hiddenLine xmlns:a14="http://schemas.microsoft.com/office/drawing/2010/main" xmlns="" w="9525">
+                <a14:hiddenLine xmlns="" xmlns:a14="http://schemas.microsoft.com/office/drawing/2010/main" w="9525">
                   <a:solidFill>
                     <a:srgbClr val="000000"/>
                   </a:solidFill>
@@ -10432,7 +10432,7 @@
             </a:ln>
             <a:extLst>
               <a:ext uri="{91240B29-F687-4f45-9708-019B960494DF}">
-                <a14:hiddenLine xmlns:a14="http://schemas.microsoft.com/office/drawing/2010/main" xmlns="" w="9525">
+                <a14:hiddenLine xmlns="" xmlns:a14="http://schemas.microsoft.com/office/drawing/2010/main" w="9525">
                   <a:solidFill>
                     <a:srgbClr val="000000"/>
                   </a:solidFill>
@@ -10522,7 +10522,7 @@
             </a:ln>
             <a:extLst>
               <a:ext uri="{91240B29-F687-4f45-9708-019B960494DF}">
-                <a14:hiddenLine xmlns:a14="http://schemas.microsoft.com/office/drawing/2010/main" xmlns="" w="9525">
+                <a14:hiddenLine xmlns="" xmlns:a14="http://schemas.microsoft.com/office/drawing/2010/main" w="9525">
                   <a:solidFill>
                     <a:srgbClr val="000000"/>
                   </a:solidFill>
@@ -10587,7 +10587,7 @@
             </a:ln>
             <a:extLst>
               <a:ext uri="{91240B29-F687-4f45-9708-019B960494DF}">
-                <a14:hiddenLine xmlns:a14="http://schemas.microsoft.com/office/drawing/2010/main" xmlns="" w="9525">
+                <a14:hiddenLine xmlns="" xmlns:a14="http://schemas.microsoft.com/office/drawing/2010/main" w="9525">
                   <a:solidFill>
                     <a:srgbClr val="000000"/>
                   </a:solidFill>
@@ -10649,7 +10649,7 @@
             </a:ln>
             <a:extLst>
               <a:ext uri="{91240B29-F687-4f45-9708-019B960494DF}">
-                <a14:hiddenLine xmlns:a14="http://schemas.microsoft.com/office/drawing/2010/main" xmlns="" w="9525">
+                <a14:hiddenLine xmlns="" xmlns:a14="http://schemas.microsoft.com/office/drawing/2010/main" w="9525">
                   <a:solidFill>
                     <a:srgbClr val="000000"/>
                   </a:solidFill>
@@ -10739,7 +10739,7 @@
             </a:ln>
             <a:extLst>
               <a:ext uri="{91240B29-F687-4f45-9708-019B960494DF}">
-                <a14:hiddenLine xmlns:a14="http://schemas.microsoft.com/office/drawing/2010/main" xmlns="" w="9525">
+                <a14:hiddenLine xmlns="" xmlns:a14="http://schemas.microsoft.com/office/drawing/2010/main" w="9525">
                   <a:solidFill>
                     <a:srgbClr val="000000"/>
                   </a:solidFill>
@@ -10829,7 +10829,7 @@
             </a:ln>
             <a:extLst>
               <a:ext uri="{91240B29-F687-4f45-9708-019B960494DF}">
-                <a14:hiddenLine xmlns:a14="http://schemas.microsoft.com/office/drawing/2010/main" xmlns="" w="9525">
+                <a14:hiddenLine xmlns="" xmlns:a14="http://schemas.microsoft.com/office/drawing/2010/main" w="9525">
                   <a:solidFill>
                     <a:srgbClr val="000000"/>
                   </a:solidFill>
@@ -10891,7 +10891,7 @@
             </a:ln>
             <a:extLst>
               <a:ext uri="{91240B29-F687-4f45-9708-019B960494DF}">
-                <a14:hiddenLine xmlns:a14="http://schemas.microsoft.com/office/drawing/2010/main" xmlns="" w="9525">
+                <a14:hiddenLine xmlns="" xmlns:a14="http://schemas.microsoft.com/office/drawing/2010/main" w="9525">
                   <a:solidFill>
                     <a:srgbClr val="000000"/>
                   </a:solidFill>
@@ -11011,7 +11011,7 @@
             </a:ln>
             <a:extLst>
               <a:ext uri="{91240B29-F687-4f45-9708-019B960494DF}">
-                <a14:hiddenLine xmlns:a14="http://schemas.microsoft.com/office/drawing/2010/main" xmlns="" w="9525">
+                <a14:hiddenLine xmlns="" xmlns:a14="http://schemas.microsoft.com/office/drawing/2010/main" w="9525">
                   <a:solidFill>
                     <a:srgbClr val="000000"/>
                   </a:solidFill>
@@ -11079,7 +11079,7 @@
             </a:ln>
             <a:extLst>
               <a:ext uri="{91240B29-F687-4f45-9708-019B960494DF}">
-                <a14:hiddenLine xmlns:a14="http://schemas.microsoft.com/office/drawing/2010/main" xmlns="" w="9525">
+                <a14:hiddenLine xmlns="" xmlns:a14="http://schemas.microsoft.com/office/drawing/2010/main" w="9525">
                   <a:solidFill>
                     <a:srgbClr val="000000"/>
                   </a:solidFill>
@@ -11169,7 +11169,7 @@
             </a:ln>
             <a:extLst>
               <a:ext uri="{91240B29-F687-4f45-9708-019B960494DF}">
-                <a14:hiddenLine xmlns:a14="http://schemas.microsoft.com/office/drawing/2010/main" xmlns="" w="9525">
+                <a14:hiddenLine xmlns="" xmlns:a14="http://schemas.microsoft.com/office/drawing/2010/main" w="9525">
                   <a:solidFill>
                     <a:srgbClr val="000000"/>
                   </a:solidFill>
@@ -11309,7 +11309,7 @@
           <a:p>
             <a:fld id="{48A87A34-81AB-432B-8DAE-1953F412C126}" type="datetimeFigureOut">
               <a:rPr lang="en-US" dirty="0"/>
-              <a:t>11/24/18</a:t>
+              <a:t>11/25/2018</a:t>
             </a:fld>
             <a:endParaRPr lang="en-US" dirty="0"/>
           </a:p>
@@ -11571,7 +11571,7 @@
           <a:p>
             <a:fld id="{48A87A34-81AB-432B-8DAE-1953F412C126}" type="datetimeFigureOut">
               <a:rPr lang="en-US" dirty="0"/>
-              <a:t>11/24/18</a:t>
+              <a:t>11/25/2018</a:t>
             </a:fld>
             <a:endParaRPr lang="en-US" dirty="0"/>
           </a:p>
@@ -11762,7 +11762,7 @@
           <a:p>
             <a:fld id="{48A87A34-81AB-432B-8DAE-1953F412C126}" type="datetimeFigureOut">
               <a:rPr lang="en-US" dirty="0"/>
-              <a:t>11/24/18</a:t>
+              <a:t>11/25/2018</a:t>
             </a:fld>
             <a:endParaRPr lang="en-US" dirty="0"/>
           </a:p>
@@ -12020,7 +12020,7 @@
           <a:p>
             <a:fld id="{48A87A34-81AB-432B-8DAE-1953F412C126}" type="datetimeFigureOut">
               <a:rPr lang="en-US" dirty="0"/>
-              <a:t>11/24/18</a:t>
+              <a:t>11/25/2018</a:t>
             </a:fld>
             <a:endParaRPr lang="en-US" dirty="0"/>
           </a:p>
@@ -12449,7 +12449,7 @@
           <a:p>
             <a:fld id="{48A87A34-81AB-432B-8DAE-1953F412C126}" type="datetimeFigureOut">
               <a:rPr lang="en-US" dirty="0"/>
-              <a:t>11/24/18</a:t>
+              <a:t>11/25/2018</a:t>
             </a:fld>
             <a:endParaRPr lang="en-US" dirty="0"/>
           </a:p>
@@ -12990,7 +12990,7 @@
           <a:p>
             <a:fld id="{48A87A34-81AB-432B-8DAE-1953F412C126}" type="datetimeFigureOut">
               <a:rPr lang="en-US" dirty="0"/>
-              <a:t>11/24/18</a:t>
+              <a:t>11/25/2018</a:t>
             </a:fld>
             <a:endParaRPr lang="en-US" dirty="0"/>
           </a:p>
@@ -13705,7 +13705,7 @@
           <a:p>
             <a:fld id="{48A87A34-81AB-432B-8DAE-1953F412C126}" type="datetimeFigureOut">
               <a:rPr lang="en-US" dirty="0"/>
-              <a:t>11/24/18</a:t>
+              <a:t>11/25/2018</a:t>
             </a:fld>
             <a:endParaRPr lang="en-US" dirty="0"/>
           </a:p>
@@ -13870,7 +13870,7 @@
           <a:p>
             <a:fld id="{48A87A34-81AB-432B-8DAE-1953F412C126}" type="datetimeFigureOut">
               <a:rPr lang="en-US" dirty="0"/>
-              <a:t>11/24/18</a:t>
+              <a:t>11/25/2018</a:t>
             </a:fld>
             <a:endParaRPr lang="en-US" dirty="0"/>
           </a:p>
@@ -14045,7 +14045,7 @@
           <a:p>
             <a:fld id="{48A87A34-81AB-432B-8DAE-1953F412C126}" type="datetimeFigureOut">
               <a:rPr lang="en-US" dirty="0"/>
-              <a:t>11/24/18</a:t>
+              <a:t>11/25/2018</a:t>
             </a:fld>
             <a:endParaRPr lang="en-US" dirty="0"/>
           </a:p>
@@ -14210,7 +14210,7 @@
           <a:p>
             <a:fld id="{48A87A34-81AB-432B-8DAE-1953F412C126}" type="datetimeFigureOut">
               <a:rPr lang="en-US" dirty="0"/>
-              <a:t>11/24/18</a:t>
+              <a:t>11/25/2018</a:t>
             </a:fld>
             <a:endParaRPr lang="en-US" dirty="0"/>
           </a:p>
@@ -14455,7 +14455,7 @@
           <a:p>
             <a:fld id="{48A87A34-81AB-432B-8DAE-1953F412C126}" type="datetimeFigureOut">
               <a:rPr lang="en-US" dirty="0"/>
-              <a:t>11/24/18</a:t>
+              <a:t>11/25/2018</a:t>
             </a:fld>
             <a:endParaRPr lang="en-US" dirty="0"/>
           </a:p>
@@ -14682,7 +14682,7 @@
           <a:p>
             <a:fld id="{48A87A34-81AB-432B-8DAE-1953F412C126}" type="datetimeFigureOut">
               <a:rPr lang="en-US" dirty="0"/>
-              <a:t>11/24/18</a:t>
+              <a:t>11/25/2018</a:t>
             </a:fld>
             <a:endParaRPr lang="en-US" dirty="0"/>
           </a:p>
@@ -15058,7 +15058,7 @@
           <a:p>
             <a:fld id="{48A87A34-81AB-432B-8DAE-1953F412C126}" type="datetimeFigureOut">
               <a:rPr lang="en-US" dirty="0"/>
-              <a:t>11/24/18</a:t>
+              <a:t>11/25/2018</a:t>
             </a:fld>
             <a:endParaRPr lang="en-US" dirty="0"/>
           </a:p>
@@ -15171,7 +15171,7 @@
           <a:p>
             <a:fld id="{48A87A34-81AB-432B-8DAE-1953F412C126}" type="datetimeFigureOut">
               <a:rPr lang="en-US" dirty="0"/>
-              <a:t>11/24/18</a:t>
+              <a:t>11/25/2018</a:t>
             </a:fld>
             <a:endParaRPr lang="en-US" dirty="0"/>
           </a:p>
@@ -15261,7 +15261,7 @@
           <a:p>
             <a:fld id="{48A87A34-81AB-432B-8DAE-1953F412C126}" type="datetimeFigureOut">
               <a:rPr lang="en-US" dirty="0"/>
-              <a:t>11/24/18</a:t>
+              <a:t>11/25/2018</a:t>
             </a:fld>
             <a:endParaRPr lang="en-US" dirty="0"/>
           </a:p>
@@ -15505,7 +15505,7 @@
           <a:p>
             <a:fld id="{48A87A34-81AB-432B-8DAE-1953F412C126}" type="datetimeFigureOut">
               <a:rPr lang="en-US" dirty="0"/>
-              <a:t>11/24/18</a:t>
+              <a:t>11/25/2018</a:t>
             </a:fld>
             <a:endParaRPr lang="en-US" dirty="0"/>
           </a:p>
@@ -15780,7 +15780,7 @@
           <a:p>
             <a:fld id="{48A87A34-81AB-432B-8DAE-1953F412C126}" type="datetimeFigureOut">
               <a:rPr lang="en-US" dirty="0"/>
-              <a:t>11/24/18</a:t>
+              <a:t>11/25/2018</a:t>
             </a:fld>
             <a:endParaRPr lang="en-US" dirty="0"/>
           </a:p>
@@ -15891,7 +15891,7 @@
           <a:noFill/>
           <a:extLst>
             <a:ext uri="{909E8E84-426E-40dd-AFC4-6F175D3DCCD1}">
-              <a14:hiddenFill xmlns:a14="http://schemas.microsoft.com/office/drawing/2010/main" xmlns="">
+              <a14:hiddenFill xmlns="" xmlns:a14="http://schemas.microsoft.com/office/drawing/2010/main">
                 <a:solidFill>
                   <a:srgbClr val="FFFFFF"/>
                 </a:solidFill>
@@ -15965,7 +15965,7 @@
               </a:ln>
               <a:extLst>
                 <a:ext uri="{91240B29-F687-4f45-9708-019B960494DF}">
-                  <a14:hiddenLine xmlns:a14="http://schemas.microsoft.com/office/drawing/2010/main" xmlns="" w="9525">
+                  <a14:hiddenLine xmlns="" xmlns:a14="http://schemas.microsoft.com/office/drawing/2010/main" w="9525">
                     <a:solidFill>
                       <a:srgbClr val="000000"/>
                     </a:solidFill>
@@ -16055,7 +16055,7 @@
               </a:ln>
               <a:extLst>
                 <a:ext uri="{91240B29-F687-4f45-9708-019B960494DF}">
-                  <a14:hiddenLine xmlns:a14="http://schemas.microsoft.com/office/drawing/2010/main" xmlns="" w="9525">
+                  <a14:hiddenLine xmlns="" xmlns:a14="http://schemas.microsoft.com/office/drawing/2010/main" w="9525">
                     <a:solidFill>
                       <a:srgbClr val="000000"/>
                     </a:solidFill>
@@ -16145,7 +16145,7 @@
               </a:ln>
               <a:extLst>
                 <a:ext uri="{91240B29-F687-4f45-9708-019B960494DF}">
-                  <a14:hiddenLine xmlns:a14="http://schemas.microsoft.com/office/drawing/2010/main" xmlns="" w="9525">
+                  <a14:hiddenLine xmlns="" xmlns:a14="http://schemas.microsoft.com/office/drawing/2010/main" w="9525">
                     <a:solidFill>
                       <a:srgbClr val="000000"/>
                     </a:solidFill>
@@ -16207,7 +16207,7 @@
               </a:ln>
               <a:extLst>
                 <a:ext uri="{91240B29-F687-4f45-9708-019B960494DF}">
-                  <a14:hiddenLine xmlns:a14="http://schemas.microsoft.com/office/drawing/2010/main" xmlns="" w="9525">
+                  <a14:hiddenLine xmlns="" xmlns:a14="http://schemas.microsoft.com/office/drawing/2010/main" w="9525">
                     <a:solidFill>
                       <a:srgbClr val="000000"/>
                     </a:solidFill>
@@ -16297,7 +16297,7 @@
               </a:ln>
               <a:extLst>
                 <a:ext uri="{91240B29-F687-4f45-9708-019B960494DF}">
-                  <a14:hiddenLine xmlns:a14="http://schemas.microsoft.com/office/drawing/2010/main" xmlns="" w="9525">
+                  <a14:hiddenLine xmlns="" xmlns:a14="http://schemas.microsoft.com/office/drawing/2010/main" w="9525">
                     <a:solidFill>
                       <a:srgbClr val="000000"/>
                     </a:solidFill>
@@ -16359,7 +16359,7 @@
               </a:ln>
               <a:extLst>
                 <a:ext uri="{91240B29-F687-4f45-9708-019B960494DF}">
-                  <a14:hiddenLine xmlns:a14="http://schemas.microsoft.com/office/drawing/2010/main" xmlns="" w="9525">
+                  <a14:hiddenLine xmlns="" xmlns:a14="http://schemas.microsoft.com/office/drawing/2010/main" w="9525">
                     <a:solidFill>
                       <a:srgbClr val="000000"/>
                     </a:solidFill>
@@ -16421,7 +16421,7 @@
               </a:ln>
               <a:extLst>
                 <a:ext uri="{91240B29-F687-4f45-9708-019B960494DF}">
-                  <a14:hiddenLine xmlns:a14="http://schemas.microsoft.com/office/drawing/2010/main" xmlns="" w="9525">
+                  <a14:hiddenLine xmlns="" xmlns:a14="http://schemas.microsoft.com/office/drawing/2010/main" w="9525">
                     <a:solidFill>
                       <a:srgbClr val="000000"/>
                     </a:solidFill>
@@ -16511,7 +16511,7 @@
               </a:ln>
               <a:extLst>
                 <a:ext uri="{91240B29-F687-4f45-9708-019B960494DF}">
-                  <a14:hiddenLine xmlns:a14="http://schemas.microsoft.com/office/drawing/2010/main" xmlns="" w="9525">
+                  <a14:hiddenLine xmlns="" xmlns:a14="http://schemas.microsoft.com/office/drawing/2010/main" w="9525">
                     <a:solidFill>
                       <a:srgbClr val="000000"/>
                     </a:solidFill>
@@ -16601,7 +16601,7 @@
               </a:ln>
               <a:extLst>
                 <a:ext uri="{91240B29-F687-4f45-9708-019B960494DF}">
-                  <a14:hiddenLine xmlns:a14="http://schemas.microsoft.com/office/drawing/2010/main" xmlns="" w="9525">
+                  <a14:hiddenLine xmlns="" xmlns:a14="http://schemas.microsoft.com/office/drawing/2010/main" w="9525">
                     <a:solidFill>
                       <a:srgbClr val="000000"/>
                     </a:solidFill>
@@ -16663,7 +16663,7 @@
               </a:ln>
               <a:extLst>
                 <a:ext uri="{91240B29-F687-4f45-9708-019B960494DF}">
-                  <a14:hiddenLine xmlns:a14="http://schemas.microsoft.com/office/drawing/2010/main" xmlns="" w="9525">
+                  <a14:hiddenLine xmlns="" xmlns:a14="http://schemas.microsoft.com/office/drawing/2010/main" w="9525">
                     <a:solidFill>
                       <a:srgbClr val="000000"/>
                     </a:solidFill>
@@ -16773,7 +16773,7 @@
               </a:ln>
               <a:extLst>
                 <a:ext uri="{91240B29-F687-4f45-9708-019B960494DF}">
-                  <a14:hiddenLine xmlns:a14="http://schemas.microsoft.com/office/drawing/2010/main" xmlns="" w="9525">
+                  <a14:hiddenLine xmlns="" xmlns:a14="http://schemas.microsoft.com/office/drawing/2010/main" w="9525">
                     <a:solidFill>
                       <a:srgbClr val="000000"/>
                     </a:solidFill>
@@ -16857,7 +16857,7 @@
               </a:ln>
               <a:extLst>
                 <a:ext uri="{91240B29-F687-4f45-9708-019B960494DF}">
-                  <a14:hiddenLine xmlns:a14="http://schemas.microsoft.com/office/drawing/2010/main" xmlns="" w="9525">
+                  <a14:hiddenLine xmlns="" xmlns:a14="http://schemas.microsoft.com/office/drawing/2010/main" w="9525">
                     <a:solidFill>
                       <a:srgbClr val="000000"/>
                     </a:solidFill>
@@ -16919,7 +16919,7 @@
               </a:ln>
               <a:extLst>
                 <a:ext uri="{91240B29-F687-4f45-9708-019B960494DF}">
-                  <a14:hiddenLine xmlns:a14="http://schemas.microsoft.com/office/drawing/2010/main" xmlns="" w="9525">
+                  <a14:hiddenLine xmlns="" xmlns:a14="http://schemas.microsoft.com/office/drawing/2010/main" w="9525">
                     <a:solidFill>
                       <a:srgbClr val="000000"/>
                     </a:solidFill>
@@ -16981,7 +16981,7 @@
               </a:ln>
               <a:extLst>
                 <a:ext uri="{91240B29-F687-4f45-9708-019B960494DF}">
-                  <a14:hiddenLine xmlns:a14="http://schemas.microsoft.com/office/drawing/2010/main" xmlns="" w="9525">
+                  <a14:hiddenLine xmlns="" xmlns:a14="http://schemas.microsoft.com/office/drawing/2010/main" w="9525">
                     <a:solidFill>
                       <a:srgbClr val="000000"/>
                     </a:solidFill>
@@ -17071,7 +17071,7 @@
               </a:ln>
               <a:extLst>
                 <a:ext uri="{91240B29-F687-4f45-9708-019B960494DF}">
-                  <a14:hiddenLine xmlns:a14="http://schemas.microsoft.com/office/drawing/2010/main" xmlns="" w="9525">
+                  <a14:hiddenLine xmlns="" xmlns:a14="http://schemas.microsoft.com/office/drawing/2010/main" w="9525">
                     <a:solidFill>
                       <a:srgbClr val="000000"/>
                     </a:solidFill>
@@ -17105,7 +17105,7 @@
               </a:ln>
               <a:extLst>
                 <a:ext uri="{91240B29-F687-4f45-9708-019B960494DF}">
-                  <a14:hiddenLine xmlns:a14="http://schemas.microsoft.com/office/drawing/2010/main" xmlns="" w="9525">
+                  <a14:hiddenLine xmlns="" xmlns:a14="http://schemas.microsoft.com/office/drawing/2010/main" w="9525">
                     <a:solidFill>
                       <a:srgbClr val="000000"/>
                     </a:solidFill>
@@ -17170,7 +17170,7 @@
               </a:ln>
               <a:extLst>
                 <a:ext uri="{91240B29-F687-4f45-9708-019B960494DF}">
-                  <a14:hiddenLine xmlns:a14="http://schemas.microsoft.com/office/drawing/2010/main" xmlns="" w="9525">
+                  <a14:hiddenLine xmlns="" xmlns:a14="http://schemas.microsoft.com/office/drawing/2010/main" w="9525">
                     <a:solidFill>
                       <a:srgbClr val="000000"/>
                     </a:solidFill>
@@ -17260,7 +17260,7 @@
               </a:ln>
               <a:extLst>
                 <a:ext uri="{91240B29-F687-4f45-9708-019B960494DF}">
-                  <a14:hiddenLine xmlns:a14="http://schemas.microsoft.com/office/drawing/2010/main" xmlns="" w="9525">
+                  <a14:hiddenLine xmlns="" xmlns:a14="http://schemas.microsoft.com/office/drawing/2010/main" w="9525">
                     <a:solidFill>
                       <a:srgbClr val="000000"/>
                     </a:solidFill>
@@ -17322,7 +17322,7 @@
               </a:ln>
               <a:extLst>
                 <a:ext uri="{91240B29-F687-4f45-9708-019B960494DF}">
-                  <a14:hiddenLine xmlns:a14="http://schemas.microsoft.com/office/drawing/2010/main" xmlns="" w="9525">
+                  <a14:hiddenLine xmlns="" xmlns:a14="http://schemas.microsoft.com/office/drawing/2010/main" w="9525">
                     <a:solidFill>
                       <a:srgbClr val="000000"/>
                     </a:solidFill>
@@ -17412,7 +17412,7 @@
               </a:ln>
               <a:extLst>
                 <a:ext uri="{91240B29-F687-4f45-9708-019B960494DF}">
-                  <a14:hiddenLine xmlns:a14="http://schemas.microsoft.com/office/drawing/2010/main" xmlns="" w="9525">
+                  <a14:hiddenLine xmlns="" xmlns:a14="http://schemas.microsoft.com/office/drawing/2010/main" w="9525">
                     <a:solidFill>
                       <a:srgbClr val="000000"/>
                     </a:solidFill>
@@ -17477,7 +17477,7 @@
               </a:ln>
               <a:extLst>
                 <a:ext uri="{91240B29-F687-4f45-9708-019B960494DF}">
-                  <a14:hiddenLine xmlns:a14="http://schemas.microsoft.com/office/drawing/2010/main" xmlns="" w="9525">
+                  <a14:hiddenLine xmlns="" xmlns:a14="http://schemas.microsoft.com/office/drawing/2010/main" w="9525">
                     <a:solidFill>
                       <a:srgbClr val="000000"/>
                     </a:solidFill>
@@ -17539,7 +17539,7 @@
               </a:ln>
               <a:extLst>
                 <a:ext uri="{91240B29-F687-4f45-9708-019B960494DF}">
-                  <a14:hiddenLine xmlns:a14="http://schemas.microsoft.com/office/drawing/2010/main" xmlns="" w="9525">
+                  <a14:hiddenLine xmlns="" xmlns:a14="http://schemas.microsoft.com/office/drawing/2010/main" w="9525">
                     <a:solidFill>
                       <a:srgbClr val="000000"/>
                     </a:solidFill>
@@ -17629,7 +17629,7 @@
               </a:ln>
               <a:extLst>
                 <a:ext uri="{91240B29-F687-4f45-9708-019B960494DF}">
-                  <a14:hiddenLine xmlns:a14="http://schemas.microsoft.com/office/drawing/2010/main" xmlns="" w="9525">
+                  <a14:hiddenLine xmlns="" xmlns:a14="http://schemas.microsoft.com/office/drawing/2010/main" w="9525">
                     <a:solidFill>
                       <a:srgbClr val="000000"/>
                     </a:solidFill>
@@ -17719,7 +17719,7 @@
               </a:ln>
               <a:extLst>
                 <a:ext uri="{91240B29-F687-4f45-9708-019B960494DF}">
-                  <a14:hiddenLine xmlns:a14="http://schemas.microsoft.com/office/drawing/2010/main" xmlns="" w="9525">
+                  <a14:hiddenLine xmlns="" xmlns:a14="http://schemas.microsoft.com/office/drawing/2010/main" w="9525">
                     <a:solidFill>
                       <a:srgbClr val="000000"/>
                     </a:solidFill>
@@ -17784,7 +17784,7 @@
               </a:ln>
               <a:extLst>
                 <a:ext uri="{91240B29-F687-4f45-9708-019B960494DF}">
-                  <a14:hiddenLine xmlns:a14="http://schemas.microsoft.com/office/drawing/2010/main" xmlns="" w="9525">
+                  <a14:hiddenLine xmlns="" xmlns:a14="http://schemas.microsoft.com/office/drawing/2010/main" w="9525">
                     <a:solidFill>
                       <a:srgbClr val="000000"/>
                     </a:solidFill>
@@ -17904,7 +17904,7 @@
               </a:ln>
               <a:extLst>
                 <a:ext uri="{91240B29-F687-4f45-9708-019B960494DF}">
-                  <a14:hiddenLine xmlns:a14="http://schemas.microsoft.com/office/drawing/2010/main" xmlns="" w="9525">
+                  <a14:hiddenLine xmlns="" xmlns:a14="http://schemas.microsoft.com/office/drawing/2010/main" w="9525">
                     <a:solidFill>
                       <a:srgbClr val="000000"/>
                     </a:solidFill>
@@ -18002,7 +18002,7 @@
               </a:ln>
               <a:extLst>
                 <a:ext uri="{91240B29-F687-4f45-9708-019B960494DF}">
-                  <a14:hiddenLine xmlns:a14="http://schemas.microsoft.com/office/drawing/2010/main" xmlns="" w="9525">
+                  <a14:hiddenLine xmlns="" xmlns:a14="http://schemas.microsoft.com/office/drawing/2010/main" w="9525">
                     <a:solidFill>
                       <a:srgbClr val="000000"/>
                     </a:solidFill>
@@ -18117,7 +18117,7 @@
               </a:ln>
               <a:extLst>
                 <a:ext uri="{91240B29-F687-4f45-9708-019B960494DF}">
-                  <a14:hiddenLine xmlns:a14="http://schemas.microsoft.com/office/drawing/2010/main" xmlns="" w="9525">
+                  <a14:hiddenLine xmlns="" xmlns:a14="http://schemas.microsoft.com/office/drawing/2010/main" w="9525">
                     <a:solidFill>
                       <a:srgbClr val="000000"/>
                     </a:solidFill>
@@ -18207,7 +18207,7 @@
               </a:ln>
               <a:extLst>
                 <a:ext uri="{91240B29-F687-4f45-9708-019B960494DF}">
-                  <a14:hiddenLine xmlns:a14="http://schemas.microsoft.com/office/drawing/2010/main" xmlns="" w="9525">
+                  <a14:hiddenLine xmlns="" xmlns:a14="http://schemas.microsoft.com/office/drawing/2010/main" w="9525">
                     <a:solidFill>
                       <a:srgbClr val="000000"/>
                     </a:solidFill>
@@ -18272,7 +18272,7 @@
               </a:ln>
               <a:extLst>
                 <a:ext uri="{91240B29-F687-4f45-9708-019B960494DF}">
-                  <a14:hiddenLine xmlns:a14="http://schemas.microsoft.com/office/drawing/2010/main" xmlns="" w="9525">
+                  <a14:hiddenLine xmlns="" xmlns:a14="http://schemas.microsoft.com/office/drawing/2010/main" w="9525">
                     <a:solidFill>
                       <a:srgbClr val="000000"/>
                     </a:solidFill>
@@ -18362,7 +18362,7 @@
               </a:ln>
               <a:extLst>
                 <a:ext uri="{91240B29-F687-4f45-9708-019B960494DF}">
-                  <a14:hiddenLine xmlns:a14="http://schemas.microsoft.com/office/drawing/2010/main" xmlns="" w="9525">
+                  <a14:hiddenLine xmlns="" xmlns:a14="http://schemas.microsoft.com/office/drawing/2010/main" w="9525">
                     <a:solidFill>
                       <a:srgbClr val="000000"/>
                     </a:solidFill>
@@ -18430,7 +18430,7 @@
               </a:ln>
               <a:extLst>
                 <a:ext uri="{91240B29-F687-4f45-9708-019B960494DF}">
-                  <a14:hiddenLine xmlns:a14="http://schemas.microsoft.com/office/drawing/2010/main" xmlns="" w="9525">
+                  <a14:hiddenLine xmlns="" xmlns:a14="http://schemas.microsoft.com/office/drawing/2010/main" w="9525">
                     <a:solidFill>
                       <a:srgbClr val="000000"/>
                     </a:solidFill>
@@ -18520,7 +18520,7 @@
               </a:ln>
               <a:extLst>
                 <a:ext uri="{91240B29-F687-4f45-9708-019B960494DF}">
-                  <a14:hiddenLine xmlns:a14="http://schemas.microsoft.com/office/drawing/2010/main" xmlns="" w="9525">
+                  <a14:hiddenLine xmlns="" xmlns:a14="http://schemas.microsoft.com/office/drawing/2010/main" w="9525">
                     <a:solidFill>
                       <a:srgbClr val="000000"/>
                     </a:solidFill>
@@ -18588,7 +18588,7 @@
               </a:ln>
               <a:extLst>
                 <a:ext uri="{91240B29-F687-4f45-9708-019B960494DF}">
-                  <a14:hiddenLine xmlns:a14="http://schemas.microsoft.com/office/drawing/2010/main" xmlns="" w="9525">
+                  <a14:hiddenLine xmlns="" xmlns:a14="http://schemas.microsoft.com/office/drawing/2010/main" w="9525">
                     <a:solidFill>
                       <a:srgbClr val="000000"/>
                     </a:solidFill>
@@ -18678,7 +18678,7 @@
               </a:ln>
               <a:extLst>
                 <a:ext uri="{91240B29-F687-4f45-9708-019B960494DF}">
-                  <a14:hiddenLine xmlns:a14="http://schemas.microsoft.com/office/drawing/2010/main" xmlns="" w="9525">
+                  <a14:hiddenLine xmlns="" xmlns:a14="http://schemas.microsoft.com/office/drawing/2010/main" w="9525">
                     <a:solidFill>
                       <a:srgbClr val="000000"/>
                     </a:solidFill>
@@ -18712,7 +18712,7 @@
               </a:ln>
               <a:extLst>
                 <a:ext uri="{91240B29-F687-4f45-9708-019B960494DF}">
-                  <a14:hiddenLine xmlns:a14="http://schemas.microsoft.com/office/drawing/2010/main" xmlns="" w="9525">
+                  <a14:hiddenLine xmlns="" xmlns:a14="http://schemas.microsoft.com/office/drawing/2010/main" w="9525">
                     <a:solidFill>
                       <a:srgbClr val="000000"/>
                     </a:solidFill>
@@ -18853,7 +18853,7 @@
             <a:fld id="{48A87A34-81AB-432B-8DAE-1953F412C126}" type="datetimeFigureOut">
               <a:rPr lang="en-US" dirty="0"/>
               <a:pPr/>
-              <a:t>11/24/18</a:t>
+              <a:t>11/25/2018</a:t>
             </a:fld>
             <a:endParaRPr lang="en-US" dirty="0"/>
           </a:p>
@@ -19463,7 +19463,7 @@
           <a:noFill/>
           <a:extLst>
             <a:ext uri="{909E8E84-426E-40dd-AFC4-6F175D3DCCD1}">
-              <a14:hiddenFill xmlns="" xmlns:a16="http://schemas.microsoft.com/office/drawing/2014/main" xmlns:p14="http://schemas.microsoft.com/office/powerpoint/2010/main" xmlns:a14="http://schemas.microsoft.com/office/drawing/2010/main">
+              <a14:hiddenFill xmlns:a14="http://schemas.microsoft.com/office/drawing/2010/main" xmlns:p14="http://schemas.microsoft.com/office/powerpoint/2010/main" xmlns:a16="http://schemas.microsoft.com/office/drawing/2014/main" xmlns="">
                 <a:solidFill>
                   <a:srgbClr val="FFFFFF"/>
                 </a:solidFill>
@@ -19584,7 +19584,7 @@
               </a:ln>
               <a:extLst>
                 <a:ext uri="{91240B29-F687-4f45-9708-019B960494DF}">
-                  <a14:hiddenLine xmlns="" xmlns:a16="http://schemas.microsoft.com/office/drawing/2014/main" xmlns:p14="http://schemas.microsoft.com/office/powerpoint/2010/main" xmlns:a14="http://schemas.microsoft.com/office/drawing/2010/main" w="9525">
+                  <a14:hiddenLine xmlns:a14="http://schemas.microsoft.com/office/drawing/2010/main" xmlns:p14="http://schemas.microsoft.com/office/powerpoint/2010/main" xmlns:a16="http://schemas.microsoft.com/office/drawing/2014/main" xmlns="" w="9525">
                     <a:solidFill>
                       <a:srgbClr val="000000"/>
                     </a:solidFill>
@@ -19689,7 +19689,7 @@
               </a:ln>
               <a:extLst>
                 <a:ext uri="{91240B29-F687-4f45-9708-019B960494DF}">
-                  <a14:hiddenLine xmlns="" xmlns:a16="http://schemas.microsoft.com/office/drawing/2014/main" xmlns:p14="http://schemas.microsoft.com/office/powerpoint/2010/main" xmlns:a14="http://schemas.microsoft.com/office/drawing/2010/main" w="9525">
+                  <a14:hiddenLine xmlns:a14="http://schemas.microsoft.com/office/drawing/2010/main" xmlns:p14="http://schemas.microsoft.com/office/powerpoint/2010/main" xmlns:a16="http://schemas.microsoft.com/office/drawing/2014/main" xmlns="" w="9525">
                     <a:solidFill>
                       <a:srgbClr val="000000"/>
                     </a:solidFill>
@@ -19794,7 +19794,7 @@
               </a:ln>
               <a:extLst>
                 <a:ext uri="{91240B29-F687-4f45-9708-019B960494DF}">
-                  <a14:hiddenLine xmlns="" xmlns:a16="http://schemas.microsoft.com/office/drawing/2014/main" xmlns:p14="http://schemas.microsoft.com/office/powerpoint/2010/main" xmlns:a14="http://schemas.microsoft.com/office/drawing/2010/main" w="9525">
+                  <a14:hiddenLine xmlns:a14="http://schemas.microsoft.com/office/drawing/2010/main" xmlns:p14="http://schemas.microsoft.com/office/powerpoint/2010/main" xmlns:a16="http://schemas.microsoft.com/office/drawing/2014/main" xmlns="" w="9525">
                     <a:solidFill>
                       <a:srgbClr val="000000"/>
                     </a:solidFill>
@@ -19871,7 +19871,7 @@
               </a:ln>
               <a:extLst>
                 <a:ext uri="{91240B29-F687-4f45-9708-019B960494DF}">
-                  <a14:hiddenLine xmlns="" xmlns:a16="http://schemas.microsoft.com/office/drawing/2014/main" xmlns:p14="http://schemas.microsoft.com/office/powerpoint/2010/main" xmlns:a14="http://schemas.microsoft.com/office/drawing/2010/main" w="9525">
+                  <a14:hiddenLine xmlns:a14="http://schemas.microsoft.com/office/drawing/2010/main" xmlns:p14="http://schemas.microsoft.com/office/powerpoint/2010/main" xmlns:a16="http://schemas.microsoft.com/office/drawing/2014/main" xmlns="" w="9525">
                     <a:solidFill>
                       <a:srgbClr val="000000"/>
                     </a:solidFill>
@@ -19976,7 +19976,7 @@
               </a:ln>
               <a:extLst>
                 <a:ext uri="{91240B29-F687-4f45-9708-019B960494DF}">
-                  <a14:hiddenLine xmlns="" xmlns:a16="http://schemas.microsoft.com/office/drawing/2014/main" xmlns:p14="http://schemas.microsoft.com/office/powerpoint/2010/main" xmlns:a14="http://schemas.microsoft.com/office/drawing/2010/main" w="9525">
+                  <a14:hiddenLine xmlns:a14="http://schemas.microsoft.com/office/drawing/2010/main" xmlns:p14="http://schemas.microsoft.com/office/powerpoint/2010/main" xmlns:a16="http://schemas.microsoft.com/office/drawing/2014/main" xmlns="" w="9525">
                     <a:solidFill>
                       <a:srgbClr val="000000"/>
                     </a:solidFill>
@@ -20053,7 +20053,7 @@
               </a:ln>
               <a:extLst>
                 <a:ext uri="{91240B29-F687-4f45-9708-019B960494DF}">
-                  <a14:hiddenLine xmlns="" xmlns:a16="http://schemas.microsoft.com/office/drawing/2014/main" xmlns:p14="http://schemas.microsoft.com/office/powerpoint/2010/main" xmlns:a14="http://schemas.microsoft.com/office/drawing/2010/main" w="9525">
+                  <a14:hiddenLine xmlns:a14="http://schemas.microsoft.com/office/drawing/2010/main" xmlns:p14="http://schemas.microsoft.com/office/powerpoint/2010/main" xmlns:a16="http://schemas.microsoft.com/office/drawing/2014/main" xmlns="" w="9525">
                     <a:solidFill>
                       <a:srgbClr val="000000"/>
                     </a:solidFill>
@@ -20130,7 +20130,7 @@
               </a:ln>
               <a:extLst>
                 <a:ext uri="{91240B29-F687-4f45-9708-019B960494DF}">
-                  <a14:hiddenLine xmlns="" xmlns:a16="http://schemas.microsoft.com/office/drawing/2014/main" xmlns:p14="http://schemas.microsoft.com/office/powerpoint/2010/main" xmlns:a14="http://schemas.microsoft.com/office/drawing/2010/main" w="9525">
+                  <a14:hiddenLine xmlns:a14="http://schemas.microsoft.com/office/drawing/2010/main" xmlns:p14="http://schemas.microsoft.com/office/powerpoint/2010/main" xmlns:a16="http://schemas.microsoft.com/office/drawing/2014/main" xmlns="" w="9525">
                     <a:solidFill>
                       <a:srgbClr val="000000"/>
                     </a:solidFill>
@@ -20235,7 +20235,7 @@
               </a:ln>
               <a:extLst>
                 <a:ext uri="{91240B29-F687-4f45-9708-019B960494DF}">
-                  <a14:hiddenLine xmlns="" xmlns:a16="http://schemas.microsoft.com/office/drawing/2014/main" xmlns:p14="http://schemas.microsoft.com/office/powerpoint/2010/main" xmlns:a14="http://schemas.microsoft.com/office/drawing/2010/main" w="9525">
+                  <a14:hiddenLine xmlns:a14="http://schemas.microsoft.com/office/drawing/2010/main" xmlns:p14="http://schemas.microsoft.com/office/powerpoint/2010/main" xmlns:a16="http://schemas.microsoft.com/office/drawing/2014/main" xmlns="" w="9525">
                     <a:solidFill>
                       <a:srgbClr val="000000"/>
                     </a:solidFill>
@@ -20340,7 +20340,7 @@
               </a:ln>
               <a:extLst>
                 <a:ext uri="{91240B29-F687-4f45-9708-019B960494DF}">
-                  <a14:hiddenLine xmlns="" xmlns:a16="http://schemas.microsoft.com/office/drawing/2014/main" xmlns:p14="http://schemas.microsoft.com/office/powerpoint/2010/main" xmlns:a14="http://schemas.microsoft.com/office/drawing/2010/main" w="9525">
+                  <a14:hiddenLine xmlns:a14="http://schemas.microsoft.com/office/drawing/2010/main" xmlns:p14="http://schemas.microsoft.com/office/powerpoint/2010/main" xmlns:a16="http://schemas.microsoft.com/office/drawing/2014/main" xmlns="" w="9525">
                     <a:solidFill>
                       <a:srgbClr val="000000"/>
                     </a:solidFill>
@@ -20417,7 +20417,7 @@
               </a:ln>
               <a:extLst>
                 <a:ext uri="{91240B29-F687-4f45-9708-019B960494DF}">
-                  <a14:hiddenLine xmlns="" xmlns:a16="http://schemas.microsoft.com/office/drawing/2014/main" xmlns:p14="http://schemas.microsoft.com/office/powerpoint/2010/main" xmlns:a14="http://schemas.microsoft.com/office/drawing/2010/main" w="9525">
+                  <a14:hiddenLine xmlns:a14="http://schemas.microsoft.com/office/drawing/2010/main" xmlns:p14="http://schemas.microsoft.com/office/powerpoint/2010/main" xmlns:a16="http://schemas.microsoft.com/office/drawing/2014/main" xmlns="" w="9525">
                     <a:solidFill>
                       <a:srgbClr val="000000"/>
                     </a:solidFill>
@@ -20542,7 +20542,7 @@
               </a:ln>
               <a:extLst>
                 <a:ext uri="{91240B29-F687-4f45-9708-019B960494DF}">
-                  <a14:hiddenLine xmlns="" xmlns:a16="http://schemas.microsoft.com/office/drawing/2014/main" xmlns:p14="http://schemas.microsoft.com/office/powerpoint/2010/main" xmlns:a14="http://schemas.microsoft.com/office/drawing/2010/main" w="9525">
+                  <a14:hiddenLine xmlns:a14="http://schemas.microsoft.com/office/drawing/2010/main" xmlns:p14="http://schemas.microsoft.com/office/powerpoint/2010/main" xmlns:a16="http://schemas.microsoft.com/office/drawing/2014/main" xmlns="" w="9525">
                     <a:solidFill>
                       <a:srgbClr val="000000"/>
                     </a:solidFill>
@@ -20656,7 +20656,7 @@
               </a:ln>
               <a:extLst>
                 <a:ext uri="{91240B29-F687-4f45-9708-019B960494DF}">
-                  <a14:hiddenLine xmlns="" xmlns:a16="http://schemas.microsoft.com/office/drawing/2014/main" xmlns:p14="http://schemas.microsoft.com/office/powerpoint/2010/main" xmlns:a14="http://schemas.microsoft.com/office/drawing/2010/main" w="9525">
+                  <a14:hiddenLine xmlns:a14="http://schemas.microsoft.com/office/drawing/2010/main" xmlns:p14="http://schemas.microsoft.com/office/powerpoint/2010/main" xmlns:a16="http://schemas.microsoft.com/office/drawing/2014/main" xmlns="" w="9525">
                     <a:solidFill>
                       <a:srgbClr val="000000"/>
                     </a:solidFill>
@@ -20733,7 +20733,7 @@
               </a:ln>
               <a:extLst>
                 <a:ext uri="{91240B29-F687-4f45-9708-019B960494DF}">
-                  <a14:hiddenLine xmlns="" xmlns:a16="http://schemas.microsoft.com/office/drawing/2014/main" xmlns:p14="http://schemas.microsoft.com/office/powerpoint/2010/main" xmlns:a14="http://schemas.microsoft.com/office/drawing/2010/main" w="9525">
+                  <a14:hiddenLine xmlns:a14="http://schemas.microsoft.com/office/drawing/2010/main" xmlns:p14="http://schemas.microsoft.com/office/powerpoint/2010/main" xmlns:a16="http://schemas.microsoft.com/office/drawing/2014/main" xmlns="" w="9525">
                     <a:solidFill>
                       <a:srgbClr val="000000"/>
                     </a:solidFill>
@@ -20810,7 +20810,7 @@
               </a:ln>
               <a:extLst>
                 <a:ext uri="{91240B29-F687-4f45-9708-019B960494DF}">
-                  <a14:hiddenLine xmlns="" xmlns:a16="http://schemas.microsoft.com/office/drawing/2014/main" xmlns:p14="http://schemas.microsoft.com/office/powerpoint/2010/main" xmlns:a14="http://schemas.microsoft.com/office/drawing/2010/main" w="9525">
+                  <a14:hiddenLine xmlns:a14="http://schemas.microsoft.com/office/drawing/2010/main" xmlns:p14="http://schemas.microsoft.com/office/powerpoint/2010/main" xmlns:a16="http://schemas.microsoft.com/office/drawing/2014/main" xmlns="" w="9525">
                     <a:solidFill>
                       <a:srgbClr val="000000"/>
                     </a:solidFill>
@@ -20915,7 +20915,7 @@
               </a:ln>
               <a:extLst>
                 <a:ext uri="{91240B29-F687-4f45-9708-019B960494DF}">
-                  <a14:hiddenLine xmlns="" xmlns:a16="http://schemas.microsoft.com/office/drawing/2014/main" xmlns:p14="http://schemas.microsoft.com/office/powerpoint/2010/main" xmlns:a14="http://schemas.microsoft.com/office/drawing/2010/main" w="9525">
+                  <a14:hiddenLine xmlns:a14="http://schemas.microsoft.com/office/drawing/2010/main" xmlns:p14="http://schemas.microsoft.com/office/powerpoint/2010/main" xmlns:a16="http://schemas.microsoft.com/office/drawing/2014/main" xmlns="" w="9525">
                     <a:solidFill>
                       <a:srgbClr val="000000"/>
                     </a:solidFill>
@@ -20964,7 +20964,7 @@
               </a:ln>
               <a:extLst>
                 <a:ext uri="{91240B29-F687-4f45-9708-019B960494DF}">
-                  <a14:hiddenLine xmlns="" xmlns:a16="http://schemas.microsoft.com/office/drawing/2014/main" xmlns:p14="http://schemas.microsoft.com/office/powerpoint/2010/main" xmlns:a14="http://schemas.microsoft.com/office/drawing/2010/main" w="9525">
+                  <a14:hiddenLine xmlns:a14="http://schemas.microsoft.com/office/drawing/2010/main" xmlns:p14="http://schemas.microsoft.com/office/powerpoint/2010/main" xmlns:a16="http://schemas.microsoft.com/office/drawing/2014/main" xmlns="" w="9525">
                     <a:solidFill>
                       <a:srgbClr val="000000"/>
                     </a:solidFill>
@@ -21044,7 +21044,7 @@
               </a:ln>
               <a:extLst>
                 <a:ext uri="{91240B29-F687-4f45-9708-019B960494DF}">
-                  <a14:hiddenLine xmlns="" xmlns:a16="http://schemas.microsoft.com/office/drawing/2014/main" xmlns:p14="http://schemas.microsoft.com/office/powerpoint/2010/main" xmlns:a14="http://schemas.microsoft.com/office/drawing/2010/main" w="9525">
+                  <a14:hiddenLine xmlns:a14="http://schemas.microsoft.com/office/drawing/2010/main" xmlns:p14="http://schemas.microsoft.com/office/powerpoint/2010/main" xmlns:a16="http://schemas.microsoft.com/office/drawing/2014/main" xmlns="" w="9525">
                     <a:solidFill>
                       <a:srgbClr val="000000"/>
                     </a:solidFill>
@@ -21149,7 +21149,7 @@
               </a:ln>
               <a:extLst>
                 <a:ext uri="{91240B29-F687-4f45-9708-019B960494DF}">
-                  <a14:hiddenLine xmlns="" xmlns:a16="http://schemas.microsoft.com/office/drawing/2014/main" xmlns:p14="http://schemas.microsoft.com/office/powerpoint/2010/main" xmlns:a14="http://schemas.microsoft.com/office/drawing/2010/main" w="9525">
+                  <a14:hiddenLine xmlns:a14="http://schemas.microsoft.com/office/drawing/2010/main" xmlns:p14="http://schemas.microsoft.com/office/powerpoint/2010/main" xmlns:a16="http://schemas.microsoft.com/office/drawing/2014/main" xmlns="" w="9525">
                     <a:solidFill>
                       <a:srgbClr val="000000"/>
                     </a:solidFill>
@@ -21226,7 +21226,7 @@
               </a:ln>
               <a:extLst>
                 <a:ext uri="{91240B29-F687-4f45-9708-019B960494DF}">
-                  <a14:hiddenLine xmlns="" xmlns:a16="http://schemas.microsoft.com/office/drawing/2014/main" xmlns:p14="http://schemas.microsoft.com/office/powerpoint/2010/main" xmlns:a14="http://schemas.microsoft.com/office/drawing/2010/main" w="9525">
+                  <a14:hiddenLine xmlns:a14="http://schemas.microsoft.com/office/drawing/2010/main" xmlns:p14="http://schemas.microsoft.com/office/powerpoint/2010/main" xmlns:a16="http://schemas.microsoft.com/office/drawing/2014/main" xmlns="" w="9525">
                     <a:solidFill>
                       <a:srgbClr val="000000"/>
                     </a:solidFill>
@@ -21331,7 +21331,7 @@
               </a:ln>
               <a:extLst>
                 <a:ext uri="{91240B29-F687-4f45-9708-019B960494DF}">
-                  <a14:hiddenLine xmlns="" xmlns:a16="http://schemas.microsoft.com/office/drawing/2014/main" xmlns:p14="http://schemas.microsoft.com/office/powerpoint/2010/main" xmlns:a14="http://schemas.microsoft.com/office/drawing/2010/main" w="9525">
+                  <a14:hiddenLine xmlns:a14="http://schemas.microsoft.com/office/drawing/2010/main" xmlns:p14="http://schemas.microsoft.com/office/powerpoint/2010/main" xmlns:a16="http://schemas.microsoft.com/office/drawing/2014/main" xmlns="" w="9525">
                     <a:solidFill>
                       <a:srgbClr val="000000"/>
                     </a:solidFill>
@@ -21411,7 +21411,7 @@
               </a:ln>
               <a:extLst>
                 <a:ext uri="{91240B29-F687-4f45-9708-019B960494DF}">
-                  <a14:hiddenLine xmlns="" xmlns:a16="http://schemas.microsoft.com/office/drawing/2014/main" xmlns:p14="http://schemas.microsoft.com/office/powerpoint/2010/main" xmlns:a14="http://schemas.microsoft.com/office/drawing/2010/main" w="9525">
+                  <a14:hiddenLine xmlns:a14="http://schemas.microsoft.com/office/drawing/2010/main" xmlns:p14="http://schemas.microsoft.com/office/powerpoint/2010/main" xmlns:a16="http://schemas.microsoft.com/office/drawing/2014/main" xmlns="" w="9525">
                     <a:solidFill>
                       <a:srgbClr val="000000"/>
                     </a:solidFill>
@@ -21488,7 +21488,7 @@
               </a:ln>
               <a:extLst>
                 <a:ext uri="{91240B29-F687-4f45-9708-019B960494DF}">
-                  <a14:hiddenLine xmlns="" xmlns:a16="http://schemas.microsoft.com/office/drawing/2014/main" xmlns:p14="http://schemas.microsoft.com/office/powerpoint/2010/main" xmlns:a14="http://schemas.microsoft.com/office/drawing/2010/main" w="9525">
+                  <a14:hiddenLine xmlns:a14="http://schemas.microsoft.com/office/drawing/2010/main" xmlns:p14="http://schemas.microsoft.com/office/powerpoint/2010/main" xmlns:a16="http://schemas.microsoft.com/office/drawing/2014/main" xmlns="" w="9525">
                     <a:solidFill>
                       <a:srgbClr val="000000"/>
                     </a:solidFill>
@@ -21593,7 +21593,7 @@
               </a:ln>
               <a:extLst>
                 <a:ext uri="{91240B29-F687-4f45-9708-019B960494DF}">
-                  <a14:hiddenLine xmlns="" xmlns:a16="http://schemas.microsoft.com/office/drawing/2014/main" xmlns:p14="http://schemas.microsoft.com/office/powerpoint/2010/main" xmlns:a14="http://schemas.microsoft.com/office/drawing/2010/main" w="9525">
+                  <a14:hiddenLine xmlns:a14="http://schemas.microsoft.com/office/drawing/2010/main" xmlns:p14="http://schemas.microsoft.com/office/powerpoint/2010/main" xmlns:a16="http://schemas.microsoft.com/office/drawing/2014/main" xmlns="" w="9525">
                     <a:solidFill>
                       <a:srgbClr val="000000"/>
                     </a:solidFill>
@@ -21698,7 +21698,7 @@
               </a:ln>
               <a:extLst>
                 <a:ext uri="{91240B29-F687-4f45-9708-019B960494DF}">
-                  <a14:hiddenLine xmlns="" xmlns:a16="http://schemas.microsoft.com/office/drawing/2014/main" xmlns:p14="http://schemas.microsoft.com/office/powerpoint/2010/main" xmlns:a14="http://schemas.microsoft.com/office/drawing/2010/main" w="9525">
+                  <a14:hiddenLine xmlns:a14="http://schemas.microsoft.com/office/drawing/2010/main" xmlns:p14="http://schemas.microsoft.com/office/powerpoint/2010/main" xmlns:a16="http://schemas.microsoft.com/office/drawing/2014/main" xmlns="" w="9525">
                     <a:solidFill>
                       <a:srgbClr val="000000"/>
                     </a:solidFill>
@@ -21778,7 +21778,7 @@
               </a:ln>
               <a:extLst>
                 <a:ext uri="{91240B29-F687-4f45-9708-019B960494DF}">
-                  <a14:hiddenLine xmlns="" xmlns:a16="http://schemas.microsoft.com/office/drawing/2014/main" xmlns:p14="http://schemas.microsoft.com/office/powerpoint/2010/main" xmlns:a14="http://schemas.microsoft.com/office/drawing/2010/main" w="9525">
+                  <a14:hiddenLine xmlns:a14="http://schemas.microsoft.com/office/drawing/2010/main" xmlns:p14="http://schemas.microsoft.com/office/powerpoint/2010/main" xmlns:a16="http://schemas.microsoft.com/office/drawing/2014/main" xmlns="" w="9525">
                     <a:solidFill>
                       <a:srgbClr val="000000"/>
                     </a:solidFill>
@@ -21913,7 +21913,7 @@
               </a:ln>
               <a:extLst>
                 <a:ext uri="{91240B29-F687-4f45-9708-019B960494DF}">
-                  <a14:hiddenLine xmlns="" xmlns:a16="http://schemas.microsoft.com/office/drawing/2014/main" xmlns:p14="http://schemas.microsoft.com/office/powerpoint/2010/main" xmlns:a14="http://schemas.microsoft.com/office/drawing/2010/main" w="9525">
+                  <a14:hiddenLine xmlns:a14="http://schemas.microsoft.com/office/drawing/2010/main" xmlns:p14="http://schemas.microsoft.com/office/powerpoint/2010/main" xmlns:a16="http://schemas.microsoft.com/office/drawing/2014/main" xmlns="" w="9525">
                     <a:solidFill>
                       <a:srgbClr val="000000"/>
                     </a:solidFill>
@@ -22041,7 +22041,7 @@
               </a:ln>
               <a:extLst>
                 <a:ext uri="{91240B29-F687-4f45-9708-019B960494DF}">
-                  <a14:hiddenLine xmlns="" xmlns:a16="http://schemas.microsoft.com/office/drawing/2014/main" xmlns:p14="http://schemas.microsoft.com/office/powerpoint/2010/main" xmlns:a14="http://schemas.microsoft.com/office/drawing/2010/main" w="9525">
+                  <a14:hiddenLine xmlns:a14="http://schemas.microsoft.com/office/drawing/2010/main" xmlns:p14="http://schemas.microsoft.com/office/powerpoint/2010/main" xmlns:a16="http://schemas.microsoft.com/office/drawing/2014/main" xmlns="" w="9525">
                     <a:solidFill>
                       <a:srgbClr val="000000"/>
                     </a:solidFill>
@@ -22171,7 +22171,7 @@
               </a:ln>
               <a:extLst>
                 <a:ext uri="{91240B29-F687-4f45-9708-019B960494DF}">
-                  <a14:hiddenLine xmlns="" xmlns:a16="http://schemas.microsoft.com/office/drawing/2014/main" xmlns:p14="http://schemas.microsoft.com/office/powerpoint/2010/main" xmlns:a14="http://schemas.microsoft.com/office/drawing/2010/main" w="9525">
+                  <a14:hiddenLine xmlns:a14="http://schemas.microsoft.com/office/drawing/2010/main" xmlns:p14="http://schemas.microsoft.com/office/powerpoint/2010/main" xmlns:a16="http://schemas.microsoft.com/office/drawing/2014/main" xmlns="" w="9525">
                     <a:solidFill>
                       <a:srgbClr val="000000"/>
                     </a:solidFill>
@@ -22276,7 +22276,7 @@
               </a:ln>
               <a:extLst>
                 <a:ext uri="{91240B29-F687-4f45-9708-019B960494DF}">
-                  <a14:hiddenLine xmlns="" xmlns:a16="http://schemas.microsoft.com/office/drawing/2014/main" xmlns:p14="http://schemas.microsoft.com/office/powerpoint/2010/main" xmlns:a14="http://schemas.microsoft.com/office/drawing/2010/main" w="9525">
+                  <a14:hiddenLine xmlns:a14="http://schemas.microsoft.com/office/drawing/2010/main" xmlns:p14="http://schemas.microsoft.com/office/powerpoint/2010/main" xmlns:a16="http://schemas.microsoft.com/office/drawing/2014/main" xmlns="" w="9525">
                     <a:solidFill>
                       <a:srgbClr val="000000"/>
                     </a:solidFill>
@@ -22356,7 +22356,7 @@
               </a:ln>
               <a:extLst>
                 <a:ext uri="{91240B29-F687-4f45-9708-019B960494DF}">
-                  <a14:hiddenLine xmlns="" xmlns:a16="http://schemas.microsoft.com/office/drawing/2014/main" xmlns:p14="http://schemas.microsoft.com/office/powerpoint/2010/main" xmlns:a14="http://schemas.microsoft.com/office/drawing/2010/main" w="9525">
+                  <a14:hiddenLine xmlns:a14="http://schemas.microsoft.com/office/drawing/2010/main" xmlns:p14="http://schemas.microsoft.com/office/powerpoint/2010/main" xmlns:a16="http://schemas.microsoft.com/office/drawing/2014/main" xmlns="" w="9525">
                     <a:solidFill>
                       <a:srgbClr val="000000"/>
                     </a:solidFill>
@@ -22461,7 +22461,7 @@
               </a:ln>
               <a:extLst>
                 <a:ext uri="{91240B29-F687-4f45-9708-019B960494DF}">
-                  <a14:hiddenLine xmlns="" xmlns:a16="http://schemas.microsoft.com/office/drawing/2014/main" xmlns:p14="http://schemas.microsoft.com/office/powerpoint/2010/main" xmlns:a14="http://schemas.microsoft.com/office/drawing/2010/main" w="9525">
+                  <a14:hiddenLine xmlns:a14="http://schemas.microsoft.com/office/drawing/2010/main" xmlns:p14="http://schemas.microsoft.com/office/powerpoint/2010/main" xmlns:a16="http://schemas.microsoft.com/office/drawing/2014/main" xmlns="" w="9525">
                     <a:solidFill>
                       <a:srgbClr val="000000"/>
                     </a:solidFill>
@@ -22544,7 +22544,7 @@
               </a:ln>
               <a:extLst>
                 <a:ext uri="{91240B29-F687-4f45-9708-019B960494DF}">
-                  <a14:hiddenLine xmlns="" xmlns:a16="http://schemas.microsoft.com/office/drawing/2014/main" xmlns:p14="http://schemas.microsoft.com/office/powerpoint/2010/main" xmlns:a14="http://schemas.microsoft.com/office/drawing/2010/main" w="9525">
+                  <a14:hiddenLine xmlns:a14="http://schemas.microsoft.com/office/drawing/2010/main" xmlns:p14="http://schemas.microsoft.com/office/powerpoint/2010/main" xmlns:a16="http://schemas.microsoft.com/office/drawing/2014/main" xmlns="" w="9525">
                     <a:solidFill>
                       <a:srgbClr val="000000"/>
                     </a:solidFill>
@@ -22649,7 +22649,7 @@
               </a:ln>
               <a:extLst>
                 <a:ext uri="{91240B29-F687-4f45-9708-019B960494DF}">
-                  <a14:hiddenLine xmlns="" xmlns:a16="http://schemas.microsoft.com/office/drawing/2014/main" xmlns:p14="http://schemas.microsoft.com/office/powerpoint/2010/main" xmlns:a14="http://schemas.microsoft.com/office/drawing/2010/main" w="9525">
+                  <a14:hiddenLine xmlns:a14="http://schemas.microsoft.com/office/drawing/2010/main" xmlns:p14="http://schemas.microsoft.com/office/powerpoint/2010/main" xmlns:a16="http://schemas.microsoft.com/office/drawing/2014/main" xmlns="" w="9525">
                     <a:solidFill>
                       <a:srgbClr val="000000"/>
                     </a:solidFill>
@@ -22732,7 +22732,7 @@
               </a:ln>
               <a:extLst>
                 <a:ext uri="{91240B29-F687-4f45-9708-019B960494DF}">
-                  <a14:hiddenLine xmlns="" xmlns:a16="http://schemas.microsoft.com/office/drawing/2014/main" xmlns:p14="http://schemas.microsoft.com/office/powerpoint/2010/main" xmlns:a14="http://schemas.microsoft.com/office/drawing/2010/main" w="9525">
+                  <a14:hiddenLine xmlns:a14="http://schemas.microsoft.com/office/drawing/2010/main" xmlns:p14="http://schemas.microsoft.com/office/powerpoint/2010/main" xmlns:a16="http://schemas.microsoft.com/office/drawing/2014/main" xmlns="" w="9525">
                     <a:solidFill>
                       <a:srgbClr val="000000"/>
                     </a:solidFill>
@@ -22837,7 +22837,7 @@
               </a:ln>
               <a:extLst>
                 <a:ext uri="{91240B29-F687-4f45-9708-019B960494DF}">
-                  <a14:hiddenLine xmlns="" xmlns:a16="http://schemas.microsoft.com/office/drawing/2014/main" xmlns:p14="http://schemas.microsoft.com/office/powerpoint/2010/main" xmlns:a14="http://schemas.microsoft.com/office/drawing/2010/main" w="9525">
+                  <a14:hiddenLine xmlns:a14="http://schemas.microsoft.com/office/drawing/2010/main" xmlns:p14="http://schemas.microsoft.com/office/powerpoint/2010/main" xmlns:a16="http://schemas.microsoft.com/office/drawing/2014/main" xmlns="" w="9525">
                     <a:solidFill>
                       <a:srgbClr val="000000"/>
                     </a:solidFill>
@@ -22886,7 +22886,7 @@
               </a:ln>
               <a:extLst>
                 <a:ext uri="{91240B29-F687-4f45-9708-019B960494DF}">
-                  <a14:hiddenLine xmlns="" xmlns:a16="http://schemas.microsoft.com/office/drawing/2014/main" xmlns:p14="http://schemas.microsoft.com/office/powerpoint/2010/main" xmlns:a14="http://schemas.microsoft.com/office/drawing/2010/main" w="9525">
+                  <a14:hiddenLine xmlns:a14="http://schemas.microsoft.com/office/drawing/2010/main" xmlns:p14="http://schemas.microsoft.com/office/powerpoint/2010/main" xmlns:a16="http://schemas.microsoft.com/office/drawing/2014/main" xmlns="" w="9525">
                     <a:solidFill>
                       <a:srgbClr val="000000"/>
                     </a:solidFill>
@@ -23006,7 +23006,7 @@
           </a:prstGeom>
           <a:extLst>
             <a:ext uri="{909E8E84-426E-40dd-AFC4-6F175D3DCCD1}">
-              <a14:hiddenFill xmlns="" xmlns:a16="http://schemas.microsoft.com/office/drawing/2014/main" xmlns:p14="http://schemas.microsoft.com/office/powerpoint/2010/main" xmlns:a14="http://schemas.microsoft.com/office/drawing/2010/main">
+              <a14:hiddenFill xmlns:a14="http://schemas.microsoft.com/office/drawing/2010/main" xmlns:p14="http://schemas.microsoft.com/office/powerpoint/2010/main" xmlns:a16="http://schemas.microsoft.com/office/drawing/2014/main" xmlns="">
                 <a:solidFill>
                   <a:srgbClr val="FFFFFF"/>
                 </a:solidFill>
@@ -23130,7 +23130,7 @@
           <a:noFill/>
           <a:extLst>
             <a:ext uri="{909E8E84-426E-40dd-AFC4-6F175D3DCCD1}">
-              <a14:hiddenFill xmlns="" xmlns:a16="http://schemas.microsoft.com/office/drawing/2014/main" xmlns:p14="http://schemas.microsoft.com/office/powerpoint/2010/main" xmlns:a14="http://schemas.microsoft.com/office/drawing/2010/main">
+              <a14:hiddenFill xmlns:a14="http://schemas.microsoft.com/office/drawing/2010/main" xmlns:p14="http://schemas.microsoft.com/office/powerpoint/2010/main" xmlns:a16="http://schemas.microsoft.com/office/drawing/2014/main" xmlns="">
                 <a:solidFill>
                   <a:srgbClr val="FFFFFF"/>
                 </a:solidFill>
@@ -23324,7 +23324,7 @@
             </a:ln>
             <a:extLst>
               <a:ext uri="{91240B29-F687-4f45-9708-019B960494DF}">
-                <a14:hiddenLine xmlns="" xmlns:a16="http://schemas.microsoft.com/office/drawing/2014/main" xmlns:p14="http://schemas.microsoft.com/office/powerpoint/2010/main" xmlns:a14="http://schemas.microsoft.com/office/drawing/2010/main" w="9525">
+                <a14:hiddenLine xmlns:a14="http://schemas.microsoft.com/office/drawing/2010/main" xmlns:p14="http://schemas.microsoft.com/office/powerpoint/2010/main" xmlns:a16="http://schemas.microsoft.com/office/drawing/2014/main" xmlns="" w="9525">
                   <a:solidFill>
                     <a:srgbClr val="000000"/>
                   </a:solidFill>
@@ -23429,7 +23429,7 @@
             </a:ln>
             <a:extLst>
               <a:ext uri="{91240B29-F687-4f45-9708-019B960494DF}">
-                <a14:hiddenLine xmlns="" xmlns:a16="http://schemas.microsoft.com/office/drawing/2014/main" xmlns:p14="http://schemas.microsoft.com/office/powerpoint/2010/main" xmlns:a14="http://schemas.microsoft.com/office/drawing/2010/main" w="9525">
+                <a14:hiddenLine xmlns:a14="http://schemas.microsoft.com/office/drawing/2010/main" xmlns:p14="http://schemas.microsoft.com/office/powerpoint/2010/main" xmlns:a16="http://schemas.microsoft.com/office/drawing/2014/main" xmlns="" w="9525">
                   <a:solidFill>
                     <a:srgbClr val="000000"/>
                   </a:solidFill>
@@ -23534,7 +23534,7 @@
             </a:ln>
             <a:extLst>
               <a:ext uri="{91240B29-F687-4f45-9708-019B960494DF}">
-                <a14:hiddenLine xmlns="" xmlns:a16="http://schemas.microsoft.com/office/drawing/2014/main" xmlns:p14="http://schemas.microsoft.com/office/powerpoint/2010/main" xmlns:a14="http://schemas.microsoft.com/office/drawing/2010/main" w="9525">
+                <a14:hiddenLine xmlns:a14="http://schemas.microsoft.com/office/drawing/2010/main" xmlns:p14="http://schemas.microsoft.com/office/powerpoint/2010/main" xmlns:a16="http://schemas.microsoft.com/office/drawing/2014/main" xmlns="" w="9525">
                   <a:solidFill>
                     <a:srgbClr val="000000"/>
                   </a:solidFill>
@@ -23611,7 +23611,7 @@
             </a:ln>
             <a:extLst>
               <a:ext uri="{91240B29-F687-4f45-9708-019B960494DF}">
-                <a14:hiddenLine xmlns="" xmlns:a16="http://schemas.microsoft.com/office/drawing/2014/main" xmlns:p14="http://schemas.microsoft.com/office/powerpoint/2010/main" xmlns:a14="http://schemas.microsoft.com/office/drawing/2010/main" w="9525">
+                <a14:hiddenLine xmlns:a14="http://schemas.microsoft.com/office/drawing/2010/main" xmlns:p14="http://schemas.microsoft.com/office/powerpoint/2010/main" xmlns:a16="http://schemas.microsoft.com/office/drawing/2014/main" xmlns="" w="9525">
                   <a:solidFill>
                     <a:srgbClr val="000000"/>
                   </a:solidFill>
@@ -23716,7 +23716,7 @@
             </a:ln>
             <a:extLst>
               <a:ext uri="{91240B29-F687-4f45-9708-019B960494DF}">
-                <a14:hiddenLine xmlns="" xmlns:a16="http://schemas.microsoft.com/office/drawing/2014/main" xmlns:p14="http://schemas.microsoft.com/office/powerpoint/2010/main" xmlns:a14="http://schemas.microsoft.com/office/drawing/2010/main" w="9525">
+                <a14:hiddenLine xmlns:a14="http://schemas.microsoft.com/office/drawing/2010/main" xmlns:p14="http://schemas.microsoft.com/office/powerpoint/2010/main" xmlns:a16="http://schemas.microsoft.com/office/drawing/2014/main" xmlns="" w="9525">
                   <a:solidFill>
                     <a:srgbClr val="000000"/>
                   </a:solidFill>
@@ -23793,7 +23793,7 @@
             </a:ln>
             <a:extLst>
               <a:ext uri="{91240B29-F687-4f45-9708-019B960494DF}">
-                <a14:hiddenLine xmlns="" xmlns:a16="http://schemas.microsoft.com/office/drawing/2014/main" xmlns:p14="http://schemas.microsoft.com/office/powerpoint/2010/main" xmlns:a14="http://schemas.microsoft.com/office/drawing/2010/main" w="9525">
+                <a14:hiddenLine xmlns:a14="http://schemas.microsoft.com/office/drawing/2010/main" xmlns:p14="http://schemas.microsoft.com/office/powerpoint/2010/main" xmlns:a16="http://schemas.microsoft.com/office/drawing/2014/main" xmlns="" w="9525">
                   <a:solidFill>
                     <a:srgbClr val="000000"/>
                   </a:solidFill>
@@ -23870,7 +23870,7 @@
             </a:ln>
             <a:extLst>
               <a:ext uri="{91240B29-F687-4f45-9708-019B960494DF}">
-                <a14:hiddenLine xmlns="" xmlns:a16="http://schemas.microsoft.com/office/drawing/2014/main" xmlns:p14="http://schemas.microsoft.com/office/powerpoint/2010/main" xmlns:a14="http://schemas.microsoft.com/office/drawing/2010/main" w="9525">
+                <a14:hiddenLine xmlns:a14="http://schemas.microsoft.com/office/drawing/2010/main" xmlns:p14="http://schemas.microsoft.com/office/powerpoint/2010/main" xmlns:a16="http://schemas.microsoft.com/office/drawing/2014/main" xmlns="" w="9525">
                   <a:solidFill>
                     <a:srgbClr val="000000"/>
                   </a:solidFill>
@@ -23975,7 +23975,7 @@
             </a:ln>
             <a:extLst>
               <a:ext uri="{91240B29-F687-4f45-9708-019B960494DF}">
-                <a14:hiddenLine xmlns="" xmlns:a16="http://schemas.microsoft.com/office/drawing/2014/main" xmlns:p14="http://schemas.microsoft.com/office/powerpoint/2010/main" xmlns:a14="http://schemas.microsoft.com/office/drawing/2010/main" w="9525">
+                <a14:hiddenLine xmlns:a14="http://schemas.microsoft.com/office/drawing/2010/main" xmlns:p14="http://schemas.microsoft.com/office/powerpoint/2010/main" xmlns:a16="http://schemas.microsoft.com/office/drawing/2014/main" xmlns="" w="9525">
                   <a:solidFill>
                     <a:srgbClr val="000000"/>
                   </a:solidFill>
@@ -24080,7 +24080,7 @@
             </a:ln>
             <a:extLst>
               <a:ext uri="{91240B29-F687-4f45-9708-019B960494DF}">
-                <a14:hiddenLine xmlns="" xmlns:a16="http://schemas.microsoft.com/office/drawing/2014/main" xmlns:p14="http://schemas.microsoft.com/office/powerpoint/2010/main" xmlns:a14="http://schemas.microsoft.com/office/drawing/2010/main" w="9525">
+                <a14:hiddenLine xmlns:a14="http://schemas.microsoft.com/office/drawing/2010/main" xmlns:p14="http://schemas.microsoft.com/office/powerpoint/2010/main" xmlns:a16="http://schemas.microsoft.com/office/drawing/2014/main" xmlns="" w="9525">
                   <a:solidFill>
                     <a:srgbClr val="000000"/>
                   </a:solidFill>
@@ -24157,7 +24157,7 @@
             </a:ln>
             <a:extLst>
               <a:ext uri="{91240B29-F687-4f45-9708-019B960494DF}">
-                <a14:hiddenLine xmlns="" xmlns:a16="http://schemas.microsoft.com/office/drawing/2014/main" xmlns:p14="http://schemas.microsoft.com/office/powerpoint/2010/main" xmlns:a14="http://schemas.microsoft.com/office/drawing/2010/main" w="9525">
+                <a14:hiddenLine xmlns:a14="http://schemas.microsoft.com/office/drawing/2010/main" xmlns:p14="http://schemas.microsoft.com/office/powerpoint/2010/main" xmlns:a16="http://schemas.microsoft.com/office/drawing/2014/main" xmlns="" w="9525">
                   <a:solidFill>
                     <a:srgbClr val="000000"/>
                   </a:solidFill>
@@ -24282,7 +24282,7 @@
             </a:ln>
             <a:extLst>
               <a:ext uri="{91240B29-F687-4f45-9708-019B960494DF}">
-                <a14:hiddenLine xmlns="" xmlns:a16="http://schemas.microsoft.com/office/drawing/2014/main" xmlns:p14="http://schemas.microsoft.com/office/powerpoint/2010/main" xmlns:a14="http://schemas.microsoft.com/office/drawing/2010/main" w="9525">
+                <a14:hiddenLine xmlns:a14="http://schemas.microsoft.com/office/drawing/2010/main" xmlns:p14="http://schemas.microsoft.com/office/powerpoint/2010/main" xmlns:a16="http://schemas.microsoft.com/office/drawing/2014/main" xmlns="" w="9525">
                   <a:solidFill>
                     <a:srgbClr val="000000"/>
                   </a:solidFill>
@@ -24396,7 +24396,7 @@
             </a:ln>
             <a:extLst>
               <a:ext uri="{91240B29-F687-4f45-9708-019B960494DF}">
-                <a14:hiddenLine xmlns="" xmlns:a16="http://schemas.microsoft.com/office/drawing/2014/main" xmlns:p14="http://schemas.microsoft.com/office/powerpoint/2010/main" xmlns:a14="http://schemas.microsoft.com/office/drawing/2010/main" w="9525">
+                <a14:hiddenLine xmlns:a14="http://schemas.microsoft.com/office/drawing/2010/main" xmlns:p14="http://schemas.microsoft.com/office/powerpoint/2010/main" xmlns:a16="http://schemas.microsoft.com/office/drawing/2014/main" xmlns="" w="9525">
                   <a:solidFill>
                     <a:srgbClr val="000000"/>
                   </a:solidFill>
@@ -24473,7 +24473,7 @@
             </a:ln>
             <a:extLst>
               <a:ext uri="{91240B29-F687-4f45-9708-019B960494DF}">
-                <a14:hiddenLine xmlns="" xmlns:a16="http://schemas.microsoft.com/office/drawing/2014/main" xmlns:p14="http://schemas.microsoft.com/office/powerpoint/2010/main" xmlns:a14="http://schemas.microsoft.com/office/drawing/2010/main" w="9525">
+                <a14:hiddenLine xmlns:a14="http://schemas.microsoft.com/office/drawing/2010/main" xmlns:p14="http://schemas.microsoft.com/office/powerpoint/2010/main" xmlns:a16="http://schemas.microsoft.com/office/drawing/2014/main" xmlns="" w="9525">
                   <a:solidFill>
                     <a:srgbClr val="000000"/>
                   </a:solidFill>
@@ -24550,7 +24550,7 @@
             </a:ln>
             <a:extLst>
               <a:ext uri="{91240B29-F687-4f45-9708-019B960494DF}">
-                <a14:hiddenLine xmlns="" xmlns:a16="http://schemas.microsoft.com/office/drawing/2014/main" xmlns:p14="http://schemas.microsoft.com/office/powerpoint/2010/main" xmlns:a14="http://schemas.microsoft.com/office/drawing/2010/main" w="9525">
+                <a14:hiddenLine xmlns:a14="http://schemas.microsoft.com/office/drawing/2010/main" xmlns:p14="http://schemas.microsoft.com/office/powerpoint/2010/main" xmlns:a16="http://schemas.microsoft.com/office/drawing/2014/main" xmlns="" w="9525">
                   <a:solidFill>
                     <a:srgbClr val="000000"/>
                   </a:solidFill>
@@ -24655,7 +24655,7 @@
             </a:ln>
             <a:extLst>
               <a:ext uri="{91240B29-F687-4f45-9708-019B960494DF}">
-                <a14:hiddenLine xmlns="" xmlns:a16="http://schemas.microsoft.com/office/drawing/2014/main" xmlns:p14="http://schemas.microsoft.com/office/powerpoint/2010/main" xmlns:a14="http://schemas.microsoft.com/office/drawing/2010/main" w="9525">
+                <a14:hiddenLine xmlns:a14="http://schemas.microsoft.com/office/drawing/2010/main" xmlns:p14="http://schemas.microsoft.com/office/powerpoint/2010/main" xmlns:a16="http://schemas.microsoft.com/office/drawing/2014/main" xmlns="" w="9525">
                   <a:solidFill>
                     <a:srgbClr val="000000"/>
                   </a:solidFill>
@@ -24704,7 +24704,7 @@
             </a:ln>
             <a:extLst>
               <a:ext uri="{91240B29-F687-4f45-9708-019B960494DF}">
-                <a14:hiddenLine xmlns="" xmlns:a16="http://schemas.microsoft.com/office/drawing/2014/main" xmlns:p14="http://schemas.microsoft.com/office/powerpoint/2010/main" xmlns:a14="http://schemas.microsoft.com/office/drawing/2010/main" w="9525">
+                <a14:hiddenLine xmlns:a14="http://schemas.microsoft.com/office/drawing/2010/main" xmlns:p14="http://schemas.microsoft.com/office/powerpoint/2010/main" xmlns:a16="http://schemas.microsoft.com/office/drawing/2014/main" xmlns="" w="9525">
                   <a:solidFill>
                     <a:srgbClr val="000000"/>
                   </a:solidFill>
@@ -24784,7 +24784,7 @@
             </a:ln>
             <a:extLst>
               <a:ext uri="{91240B29-F687-4f45-9708-019B960494DF}">
-                <a14:hiddenLine xmlns="" xmlns:a16="http://schemas.microsoft.com/office/drawing/2014/main" xmlns:p14="http://schemas.microsoft.com/office/powerpoint/2010/main" xmlns:a14="http://schemas.microsoft.com/office/drawing/2010/main" w="9525">
+                <a14:hiddenLine xmlns:a14="http://schemas.microsoft.com/office/drawing/2010/main" xmlns:p14="http://schemas.microsoft.com/office/powerpoint/2010/main" xmlns:a16="http://schemas.microsoft.com/office/drawing/2014/main" xmlns="" w="9525">
                   <a:solidFill>
                     <a:srgbClr val="000000"/>
                   </a:solidFill>
@@ -24889,7 +24889,7 @@
             </a:ln>
             <a:extLst>
               <a:ext uri="{91240B29-F687-4f45-9708-019B960494DF}">
-                <a14:hiddenLine xmlns="" xmlns:a16="http://schemas.microsoft.com/office/drawing/2014/main" xmlns:p14="http://schemas.microsoft.com/office/powerpoint/2010/main" xmlns:a14="http://schemas.microsoft.com/office/drawing/2010/main" w="9525">
+                <a14:hiddenLine xmlns:a14="http://schemas.microsoft.com/office/drawing/2010/main" xmlns:p14="http://schemas.microsoft.com/office/powerpoint/2010/main" xmlns:a16="http://schemas.microsoft.com/office/drawing/2014/main" xmlns="" w="9525">
                   <a:solidFill>
                     <a:srgbClr val="000000"/>
                   </a:solidFill>
@@ -24966,7 +24966,7 @@
             </a:ln>
             <a:extLst>
               <a:ext uri="{91240B29-F687-4f45-9708-019B960494DF}">
-                <a14:hiddenLine xmlns="" xmlns:a16="http://schemas.microsoft.com/office/drawing/2014/main" xmlns:p14="http://schemas.microsoft.com/office/powerpoint/2010/main" xmlns:a14="http://schemas.microsoft.com/office/drawing/2010/main" w="9525">
+                <a14:hiddenLine xmlns:a14="http://schemas.microsoft.com/office/drawing/2010/main" xmlns:p14="http://schemas.microsoft.com/office/powerpoint/2010/main" xmlns:a16="http://schemas.microsoft.com/office/drawing/2014/main" xmlns="" w="9525">
                   <a:solidFill>
                     <a:srgbClr val="000000"/>
                   </a:solidFill>
@@ -25071,7 +25071,7 @@
             </a:ln>
             <a:extLst>
               <a:ext uri="{91240B29-F687-4f45-9708-019B960494DF}">
-                <a14:hiddenLine xmlns="" xmlns:a16="http://schemas.microsoft.com/office/drawing/2014/main" xmlns:p14="http://schemas.microsoft.com/office/powerpoint/2010/main" xmlns:a14="http://schemas.microsoft.com/office/drawing/2010/main" w="9525">
+                <a14:hiddenLine xmlns:a14="http://schemas.microsoft.com/office/drawing/2010/main" xmlns:p14="http://schemas.microsoft.com/office/powerpoint/2010/main" xmlns:a16="http://schemas.microsoft.com/office/drawing/2014/main" xmlns="" w="9525">
                   <a:solidFill>
                     <a:srgbClr val="000000"/>
                   </a:solidFill>
@@ -25151,7 +25151,7 @@
             </a:ln>
             <a:extLst>
               <a:ext uri="{91240B29-F687-4f45-9708-019B960494DF}">
-                <a14:hiddenLine xmlns="" xmlns:a16="http://schemas.microsoft.com/office/drawing/2014/main" xmlns:p14="http://schemas.microsoft.com/office/powerpoint/2010/main" xmlns:a14="http://schemas.microsoft.com/office/drawing/2010/main" w="9525">
+                <a14:hiddenLine xmlns:a14="http://schemas.microsoft.com/office/drawing/2010/main" xmlns:p14="http://schemas.microsoft.com/office/powerpoint/2010/main" xmlns:a16="http://schemas.microsoft.com/office/drawing/2014/main" xmlns="" w="9525">
                   <a:solidFill>
                     <a:srgbClr val="000000"/>
                   </a:solidFill>
@@ -25228,7 +25228,7 @@
             </a:ln>
             <a:extLst>
               <a:ext uri="{91240B29-F687-4f45-9708-019B960494DF}">
-                <a14:hiddenLine xmlns="" xmlns:a16="http://schemas.microsoft.com/office/drawing/2014/main" xmlns:p14="http://schemas.microsoft.com/office/powerpoint/2010/main" xmlns:a14="http://schemas.microsoft.com/office/drawing/2010/main" w="9525">
+                <a14:hiddenLine xmlns:a14="http://schemas.microsoft.com/office/drawing/2010/main" xmlns:p14="http://schemas.microsoft.com/office/powerpoint/2010/main" xmlns:a16="http://schemas.microsoft.com/office/drawing/2014/main" xmlns="" w="9525">
                   <a:solidFill>
                     <a:srgbClr val="000000"/>
                   </a:solidFill>
@@ -25333,7 +25333,7 @@
             </a:ln>
             <a:extLst>
               <a:ext uri="{91240B29-F687-4f45-9708-019B960494DF}">
-                <a14:hiddenLine xmlns="" xmlns:a16="http://schemas.microsoft.com/office/drawing/2014/main" xmlns:p14="http://schemas.microsoft.com/office/powerpoint/2010/main" xmlns:a14="http://schemas.microsoft.com/office/drawing/2010/main" w="9525">
+                <a14:hiddenLine xmlns:a14="http://schemas.microsoft.com/office/drawing/2010/main" xmlns:p14="http://schemas.microsoft.com/office/powerpoint/2010/main" xmlns:a16="http://schemas.microsoft.com/office/drawing/2014/main" xmlns="" w="9525">
                   <a:solidFill>
                     <a:srgbClr val="000000"/>
                   </a:solidFill>
@@ -25438,7 +25438,7 @@
             </a:ln>
             <a:extLst>
               <a:ext uri="{91240B29-F687-4f45-9708-019B960494DF}">
-                <a14:hiddenLine xmlns="" xmlns:a16="http://schemas.microsoft.com/office/drawing/2014/main" xmlns:p14="http://schemas.microsoft.com/office/powerpoint/2010/main" xmlns:a14="http://schemas.microsoft.com/office/drawing/2010/main" w="9525">
+                <a14:hiddenLine xmlns:a14="http://schemas.microsoft.com/office/drawing/2010/main" xmlns:p14="http://schemas.microsoft.com/office/powerpoint/2010/main" xmlns:a16="http://schemas.microsoft.com/office/drawing/2014/main" xmlns="" w="9525">
                   <a:solidFill>
                     <a:srgbClr val="000000"/>
                   </a:solidFill>
@@ -25518,7 +25518,7 @@
             </a:ln>
             <a:extLst>
               <a:ext uri="{91240B29-F687-4f45-9708-019B960494DF}">
-                <a14:hiddenLine xmlns="" xmlns:a16="http://schemas.microsoft.com/office/drawing/2014/main" xmlns:p14="http://schemas.microsoft.com/office/powerpoint/2010/main" xmlns:a14="http://schemas.microsoft.com/office/drawing/2010/main" w="9525">
+                <a14:hiddenLine xmlns:a14="http://schemas.microsoft.com/office/drawing/2010/main" xmlns:p14="http://schemas.microsoft.com/office/powerpoint/2010/main" xmlns:a16="http://schemas.microsoft.com/office/drawing/2014/main" xmlns="" w="9525">
                   <a:solidFill>
                     <a:srgbClr val="000000"/>
                   </a:solidFill>
@@ -25653,7 +25653,7 @@
             </a:ln>
             <a:extLst>
               <a:ext uri="{91240B29-F687-4f45-9708-019B960494DF}">
-                <a14:hiddenLine xmlns="" xmlns:a16="http://schemas.microsoft.com/office/drawing/2014/main" xmlns:p14="http://schemas.microsoft.com/office/powerpoint/2010/main" xmlns:a14="http://schemas.microsoft.com/office/drawing/2010/main" w="9525">
+                <a14:hiddenLine xmlns:a14="http://schemas.microsoft.com/office/drawing/2010/main" xmlns:p14="http://schemas.microsoft.com/office/powerpoint/2010/main" xmlns:a16="http://schemas.microsoft.com/office/drawing/2014/main" xmlns="" w="9525">
                   <a:solidFill>
                     <a:srgbClr val="000000"/>
                   </a:solidFill>
@@ -25668,7 +25668,7 @@
       </p:grpSp>
       <p:pic>
         <p:nvPicPr>
-          <p:cNvPr id="6" name="Content Placeholder 5" descr="A screenshot of a social media post&#13;&#10;&#13;&#10;Description automatically generated">
+          <p:cNvPr id="6" name="Content Placeholder 5" descr="A screenshot of a social media post&#10;&#10;Description automatically generated">
             <a:extLst>
               <a:ext uri="{FF2B5EF4-FFF2-40B4-BE49-F238E27FC236}">
                 <a16:creationId xmlns:a16="http://schemas.microsoft.com/office/drawing/2014/main" id="{0A844342-13F8-A84A-B186-94B3E0AC3126}"/>
@@ -25700,7 +25700,7 @@
       </p:pic>
       <p:pic>
         <p:nvPicPr>
-          <p:cNvPr id="8" name="Picture 7" descr="A screenshot of a cell phone&#13;&#10;&#13;&#10;Description automatically generated">
+          <p:cNvPr id="8" name="Picture 7" descr="A screenshot of a cell phone&#10;&#10;Description automatically generated">
             <a:extLst>
               <a:ext uri="{FF2B5EF4-FFF2-40B4-BE49-F238E27FC236}">
                 <a16:creationId xmlns:a16="http://schemas.microsoft.com/office/drawing/2014/main" id="{3817CF0D-5F9B-4942-9782-188D0834AAD1}"/>
@@ -25814,7 +25814,7 @@
           <a:noFill/>
           <a:extLst>
             <a:ext uri="{909E8E84-426E-40dd-AFC4-6F175D3DCCD1}">
-              <a14:hiddenFill xmlns="" xmlns:a16="http://schemas.microsoft.com/office/drawing/2014/main" xmlns:p14="http://schemas.microsoft.com/office/powerpoint/2010/main" xmlns:a14="http://schemas.microsoft.com/office/drawing/2010/main">
+              <a14:hiddenFill xmlns:a14="http://schemas.microsoft.com/office/drawing/2010/main" xmlns:p14="http://schemas.microsoft.com/office/powerpoint/2010/main" xmlns:a16="http://schemas.microsoft.com/office/drawing/2014/main" xmlns="">
                 <a:solidFill>
                   <a:srgbClr val="FFFFFF"/>
                 </a:solidFill>
@@ -25935,7 +25935,7 @@
               </a:ln>
               <a:extLst>
                 <a:ext uri="{91240B29-F687-4f45-9708-019B960494DF}">
-                  <a14:hiddenLine xmlns="" xmlns:a16="http://schemas.microsoft.com/office/drawing/2014/main" xmlns:p14="http://schemas.microsoft.com/office/powerpoint/2010/main" xmlns:a14="http://schemas.microsoft.com/office/drawing/2010/main" w="9525">
+                  <a14:hiddenLine xmlns:a14="http://schemas.microsoft.com/office/drawing/2010/main" xmlns:p14="http://schemas.microsoft.com/office/powerpoint/2010/main" xmlns:a16="http://schemas.microsoft.com/office/drawing/2014/main" xmlns="" w="9525">
                     <a:solidFill>
                       <a:srgbClr val="000000"/>
                     </a:solidFill>
@@ -26040,7 +26040,7 @@
               </a:ln>
               <a:extLst>
                 <a:ext uri="{91240B29-F687-4f45-9708-019B960494DF}">
-                  <a14:hiddenLine xmlns="" xmlns:a16="http://schemas.microsoft.com/office/drawing/2014/main" xmlns:p14="http://schemas.microsoft.com/office/powerpoint/2010/main" xmlns:a14="http://schemas.microsoft.com/office/drawing/2010/main" w="9525">
+                  <a14:hiddenLine xmlns:a14="http://schemas.microsoft.com/office/drawing/2010/main" xmlns:p14="http://schemas.microsoft.com/office/powerpoint/2010/main" xmlns:a16="http://schemas.microsoft.com/office/drawing/2014/main" xmlns="" w="9525">
                     <a:solidFill>
                       <a:srgbClr val="000000"/>
                     </a:solidFill>
@@ -26145,7 +26145,7 @@
               </a:ln>
               <a:extLst>
                 <a:ext uri="{91240B29-F687-4f45-9708-019B960494DF}">
-                  <a14:hiddenLine xmlns="" xmlns:a16="http://schemas.microsoft.com/office/drawing/2014/main" xmlns:p14="http://schemas.microsoft.com/office/powerpoint/2010/main" xmlns:a14="http://schemas.microsoft.com/office/drawing/2010/main" w="9525">
+                  <a14:hiddenLine xmlns:a14="http://schemas.microsoft.com/office/drawing/2010/main" xmlns:p14="http://schemas.microsoft.com/office/powerpoint/2010/main" xmlns:a16="http://schemas.microsoft.com/office/drawing/2014/main" xmlns="" w="9525">
                     <a:solidFill>
                       <a:srgbClr val="000000"/>
                     </a:solidFill>
@@ -26222,7 +26222,7 @@
               </a:ln>
               <a:extLst>
                 <a:ext uri="{91240B29-F687-4f45-9708-019B960494DF}">
-                  <a14:hiddenLine xmlns="" xmlns:a16="http://schemas.microsoft.com/office/drawing/2014/main" xmlns:p14="http://schemas.microsoft.com/office/powerpoint/2010/main" xmlns:a14="http://schemas.microsoft.com/office/drawing/2010/main" w="9525">
+                  <a14:hiddenLine xmlns:a14="http://schemas.microsoft.com/office/drawing/2010/main" xmlns:p14="http://schemas.microsoft.com/office/powerpoint/2010/main" xmlns:a16="http://schemas.microsoft.com/office/drawing/2014/main" xmlns="" w="9525">
                     <a:solidFill>
                       <a:srgbClr val="000000"/>
                     </a:solidFill>
@@ -26327,7 +26327,7 @@
               </a:ln>
               <a:extLst>
                 <a:ext uri="{91240B29-F687-4f45-9708-019B960494DF}">
-                  <a14:hiddenLine xmlns="" xmlns:a16="http://schemas.microsoft.com/office/drawing/2014/main" xmlns:p14="http://schemas.microsoft.com/office/powerpoint/2010/main" xmlns:a14="http://schemas.microsoft.com/office/drawing/2010/main" w="9525">
+                  <a14:hiddenLine xmlns:a14="http://schemas.microsoft.com/office/drawing/2010/main" xmlns:p14="http://schemas.microsoft.com/office/powerpoint/2010/main" xmlns:a16="http://schemas.microsoft.com/office/drawing/2014/main" xmlns="" w="9525">
                     <a:solidFill>
                       <a:srgbClr val="000000"/>
                     </a:solidFill>
@@ -26404,7 +26404,7 @@
               </a:ln>
               <a:extLst>
                 <a:ext uri="{91240B29-F687-4f45-9708-019B960494DF}">
-                  <a14:hiddenLine xmlns="" xmlns:a16="http://schemas.microsoft.com/office/drawing/2014/main" xmlns:p14="http://schemas.microsoft.com/office/powerpoint/2010/main" xmlns:a14="http://schemas.microsoft.com/office/drawing/2010/main" w="9525">
+                  <a14:hiddenLine xmlns:a14="http://schemas.microsoft.com/office/drawing/2010/main" xmlns:p14="http://schemas.microsoft.com/office/powerpoint/2010/main" xmlns:a16="http://schemas.microsoft.com/office/drawing/2014/main" xmlns="" w="9525">
                     <a:solidFill>
                       <a:srgbClr val="000000"/>
                     </a:solidFill>
@@ -26481,7 +26481,7 @@
               </a:ln>
               <a:extLst>
                 <a:ext uri="{91240B29-F687-4f45-9708-019B960494DF}">
-                  <a14:hiddenLine xmlns="" xmlns:a16="http://schemas.microsoft.com/office/drawing/2014/main" xmlns:p14="http://schemas.microsoft.com/office/powerpoint/2010/main" xmlns:a14="http://schemas.microsoft.com/office/drawing/2010/main" w="9525">
+                  <a14:hiddenLine xmlns:a14="http://schemas.microsoft.com/office/drawing/2010/main" xmlns:p14="http://schemas.microsoft.com/office/powerpoint/2010/main" xmlns:a16="http://schemas.microsoft.com/office/drawing/2014/main" xmlns="" w="9525">
                     <a:solidFill>
                       <a:srgbClr val="000000"/>
                     </a:solidFill>
@@ -26586,7 +26586,7 @@
               </a:ln>
               <a:extLst>
                 <a:ext uri="{91240B29-F687-4f45-9708-019B960494DF}">
-                  <a14:hiddenLine xmlns="" xmlns:a16="http://schemas.microsoft.com/office/drawing/2014/main" xmlns:p14="http://schemas.microsoft.com/office/powerpoint/2010/main" xmlns:a14="http://schemas.microsoft.com/office/drawing/2010/main" w="9525">
+                  <a14:hiddenLine xmlns:a14="http://schemas.microsoft.com/office/drawing/2010/main" xmlns:p14="http://schemas.microsoft.com/office/powerpoint/2010/main" xmlns:a16="http://schemas.microsoft.com/office/drawing/2014/main" xmlns="" w="9525">
                     <a:solidFill>
                       <a:srgbClr val="000000"/>
                     </a:solidFill>
@@ -26691,7 +26691,7 @@
               </a:ln>
               <a:extLst>
                 <a:ext uri="{91240B29-F687-4f45-9708-019B960494DF}">
-                  <a14:hiddenLine xmlns="" xmlns:a16="http://schemas.microsoft.com/office/drawing/2014/main" xmlns:p14="http://schemas.microsoft.com/office/powerpoint/2010/main" xmlns:a14="http://schemas.microsoft.com/office/drawing/2010/main" w="9525">
+                  <a14:hiddenLine xmlns:a14="http://schemas.microsoft.com/office/drawing/2010/main" xmlns:p14="http://schemas.microsoft.com/office/powerpoint/2010/main" xmlns:a16="http://schemas.microsoft.com/office/drawing/2014/main" xmlns="" w="9525">
                     <a:solidFill>
                       <a:srgbClr val="000000"/>
                     </a:solidFill>
@@ -26768,7 +26768,7 @@
               </a:ln>
               <a:extLst>
                 <a:ext uri="{91240B29-F687-4f45-9708-019B960494DF}">
-                  <a14:hiddenLine xmlns="" xmlns:a16="http://schemas.microsoft.com/office/drawing/2014/main" xmlns:p14="http://schemas.microsoft.com/office/powerpoint/2010/main" xmlns:a14="http://schemas.microsoft.com/office/drawing/2010/main" w="9525">
+                  <a14:hiddenLine xmlns:a14="http://schemas.microsoft.com/office/drawing/2010/main" xmlns:p14="http://schemas.microsoft.com/office/powerpoint/2010/main" xmlns:a16="http://schemas.microsoft.com/office/drawing/2014/main" xmlns="" w="9525">
                     <a:solidFill>
                       <a:srgbClr val="000000"/>
                     </a:solidFill>
@@ -26893,7 +26893,7 @@
               </a:ln>
               <a:extLst>
                 <a:ext uri="{91240B29-F687-4f45-9708-019B960494DF}">
-                  <a14:hiddenLine xmlns="" xmlns:a16="http://schemas.microsoft.com/office/drawing/2014/main" xmlns:p14="http://schemas.microsoft.com/office/powerpoint/2010/main" xmlns:a14="http://schemas.microsoft.com/office/drawing/2010/main" w="9525">
+                  <a14:hiddenLine xmlns:a14="http://schemas.microsoft.com/office/drawing/2010/main" xmlns:p14="http://schemas.microsoft.com/office/powerpoint/2010/main" xmlns:a16="http://schemas.microsoft.com/office/drawing/2014/main" xmlns="" w="9525">
                     <a:solidFill>
                       <a:srgbClr val="000000"/>
                     </a:solidFill>
@@ -27007,7 +27007,7 @@
               </a:ln>
               <a:extLst>
                 <a:ext uri="{91240B29-F687-4f45-9708-019B960494DF}">
-                  <a14:hiddenLine xmlns="" xmlns:a16="http://schemas.microsoft.com/office/drawing/2014/main" xmlns:p14="http://schemas.microsoft.com/office/powerpoint/2010/main" xmlns:a14="http://schemas.microsoft.com/office/drawing/2010/main" w="9525">
+                  <a14:hiddenLine xmlns:a14="http://schemas.microsoft.com/office/drawing/2010/main" xmlns:p14="http://schemas.microsoft.com/office/powerpoint/2010/main" xmlns:a16="http://schemas.microsoft.com/office/drawing/2014/main" xmlns="" w="9525">
                     <a:solidFill>
                       <a:srgbClr val="000000"/>
                     </a:solidFill>
@@ -27084,7 +27084,7 @@
               </a:ln>
               <a:extLst>
                 <a:ext uri="{91240B29-F687-4f45-9708-019B960494DF}">
-                  <a14:hiddenLine xmlns="" xmlns:a16="http://schemas.microsoft.com/office/drawing/2014/main" xmlns:p14="http://schemas.microsoft.com/office/powerpoint/2010/main" xmlns:a14="http://schemas.microsoft.com/office/drawing/2010/main" w="9525">
+                  <a14:hiddenLine xmlns:a14="http://schemas.microsoft.com/office/drawing/2010/main" xmlns:p14="http://schemas.microsoft.com/office/powerpoint/2010/main" xmlns:a16="http://schemas.microsoft.com/office/drawing/2014/main" xmlns="" w="9525">
                     <a:solidFill>
                       <a:srgbClr val="000000"/>
                     </a:solidFill>
@@ -27161,7 +27161,7 @@
               </a:ln>
               <a:extLst>
                 <a:ext uri="{91240B29-F687-4f45-9708-019B960494DF}">
-                  <a14:hiddenLine xmlns="" xmlns:a16="http://schemas.microsoft.com/office/drawing/2014/main" xmlns:p14="http://schemas.microsoft.com/office/powerpoint/2010/main" xmlns:a14="http://schemas.microsoft.com/office/drawing/2010/main" w="9525">
+                  <a14:hiddenLine xmlns:a14="http://schemas.microsoft.com/office/drawing/2010/main" xmlns:p14="http://schemas.microsoft.com/office/powerpoint/2010/main" xmlns:a16="http://schemas.microsoft.com/office/drawing/2014/main" xmlns="" w="9525">
                     <a:solidFill>
                       <a:srgbClr val="000000"/>
                     </a:solidFill>
@@ -27266,7 +27266,7 @@
               </a:ln>
               <a:extLst>
                 <a:ext uri="{91240B29-F687-4f45-9708-019B960494DF}">
-                  <a14:hiddenLine xmlns="" xmlns:a16="http://schemas.microsoft.com/office/drawing/2014/main" xmlns:p14="http://schemas.microsoft.com/office/powerpoint/2010/main" xmlns:a14="http://schemas.microsoft.com/office/drawing/2010/main" w="9525">
+                  <a14:hiddenLine xmlns:a14="http://schemas.microsoft.com/office/drawing/2010/main" xmlns:p14="http://schemas.microsoft.com/office/powerpoint/2010/main" xmlns:a16="http://schemas.microsoft.com/office/drawing/2014/main" xmlns="" w="9525">
                     <a:solidFill>
                       <a:srgbClr val="000000"/>
                     </a:solidFill>
@@ -27315,7 +27315,7 @@
               </a:ln>
               <a:extLst>
                 <a:ext uri="{91240B29-F687-4f45-9708-019B960494DF}">
-                  <a14:hiddenLine xmlns="" xmlns:a16="http://schemas.microsoft.com/office/drawing/2014/main" xmlns:p14="http://schemas.microsoft.com/office/powerpoint/2010/main" xmlns:a14="http://schemas.microsoft.com/office/drawing/2010/main" w="9525">
+                  <a14:hiddenLine xmlns:a14="http://schemas.microsoft.com/office/drawing/2010/main" xmlns:p14="http://schemas.microsoft.com/office/powerpoint/2010/main" xmlns:a16="http://schemas.microsoft.com/office/drawing/2014/main" xmlns="" w="9525">
                     <a:solidFill>
                       <a:srgbClr val="000000"/>
                     </a:solidFill>
@@ -27395,7 +27395,7 @@
               </a:ln>
               <a:extLst>
                 <a:ext uri="{91240B29-F687-4f45-9708-019B960494DF}">
-                  <a14:hiddenLine xmlns="" xmlns:a16="http://schemas.microsoft.com/office/drawing/2014/main" xmlns:p14="http://schemas.microsoft.com/office/powerpoint/2010/main" xmlns:a14="http://schemas.microsoft.com/office/drawing/2010/main" w="9525">
+                  <a14:hiddenLine xmlns:a14="http://schemas.microsoft.com/office/drawing/2010/main" xmlns:p14="http://schemas.microsoft.com/office/powerpoint/2010/main" xmlns:a16="http://schemas.microsoft.com/office/drawing/2014/main" xmlns="" w="9525">
                     <a:solidFill>
                       <a:srgbClr val="000000"/>
                     </a:solidFill>
@@ -27500,7 +27500,7 @@
               </a:ln>
               <a:extLst>
                 <a:ext uri="{91240B29-F687-4f45-9708-019B960494DF}">
-                  <a14:hiddenLine xmlns="" xmlns:a16="http://schemas.microsoft.com/office/drawing/2014/main" xmlns:p14="http://schemas.microsoft.com/office/powerpoint/2010/main" xmlns:a14="http://schemas.microsoft.com/office/drawing/2010/main" w="9525">
+                  <a14:hiddenLine xmlns:a14="http://schemas.microsoft.com/office/drawing/2010/main" xmlns:p14="http://schemas.microsoft.com/office/powerpoint/2010/main" xmlns:a16="http://schemas.microsoft.com/office/drawing/2014/main" xmlns="" w="9525">
                     <a:solidFill>
                       <a:srgbClr val="000000"/>
                     </a:solidFill>
@@ -27577,7 +27577,7 @@
               </a:ln>
               <a:extLst>
                 <a:ext uri="{91240B29-F687-4f45-9708-019B960494DF}">
-                  <a14:hiddenLine xmlns="" xmlns:a16="http://schemas.microsoft.com/office/drawing/2014/main" xmlns:p14="http://schemas.microsoft.com/office/powerpoint/2010/main" xmlns:a14="http://schemas.microsoft.com/office/drawing/2010/main" w="9525">
+                  <a14:hiddenLine xmlns:a14="http://schemas.microsoft.com/office/drawing/2010/main" xmlns:p14="http://schemas.microsoft.com/office/powerpoint/2010/main" xmlns:a16="http://schemas.microsoft.com/office/drawing/2014/main" xmlns="" w="9525">
                     <a:solidFill>
                       <a:srgbClr val="000000"/>
                     </a:solidFill>
@@ -27682,7 +27682,7 @@
               </a:ln>
               <a:extLst>
                 <a:ext uri="{91240B29-F687-4f45-9708-019B960494DF}">
-                  <a14:hiddenLine xmlns="" xmlns:a16="http://schemas.microsoft.com/office/drawing/2014/main" xmlns:p14="http://schemas.microsoft.com/office/powerpoint/2010/main" xmlns:a14="http://schemas.microsoft.com/office/drawing/2010/main" w="9525">
+                  <a14:hiddenLine xmlns:a14="http://schemas.microsoft.com/office/drawing/2010/main" xmlns:p14="http://schemas.microsoft.com/office/powerpoint/2010/main" xmlns:a16="http://schemas.microsoft.com/office/drawing/2014/main" xmlns="" w="9525">
                     <a:solidFill>
                       <a:srgbClr val="000000"/>
                     </a:solidFill>
@@ -27762,7 +27762,7 @@
               </a:ln>
               <a:extLst>
                 <a:ext uri="{91240B29-F687-4f45-9708-019B960494DF}">
-                  <a14:hiddenLine xmlns="" xmlns:a16="http://schemas.microsoft.com/office/drawing/2014/main" xmlns:p14="http://schemas.microsoft.com/office/powerpoint/2010/main" xmlns:a14="http://schemas.microsoft.com/office/drawing/2010/main" w="9525">
+                  <a14:hiddenLine xmlns:a14="http://schemas.microsoft.com/office/drawing/2010/main" xmlns:p14="http://schemas.microsoft.com/office/powerpoint/2010/main" xmlns:a16="http://schemas.microsoft.com/office/drawing/2014/main" xmlns="" w="9525">
                     <a:solidFill>
                       <a:srgbClr val="000000"/>
                     </a:solidFill>
@@ -27839,7 +27839,7 @@
               </a:ln>
               <a:extLst>
                 <a:ext uri="{91240B29-F687-4f45-9708-019B960494DF}">
-                  <a14:hiddenLine xmlns="" xmlns:a16="http://schemas.microsoft.com/office/drawing/2014/main" xmlns:p14="http://schemas.microsoft.com/office/powerpoint/2010/main" xmlns:a14="http://schemas.microsoft.com/office/drawing/2010/main" w="9525">
+                  <a14:hiddenLine xmlns:a14="http://schemas.microsoft.com/office/drawing/2010/main" xmlns:p14="http://schemas.microsoft.com/office/powerpoint/2010/main" xmlns:a16="http://schemas.microsoft.com/office/drawing/2014/main" xmlns="" w="9525">
                     <a:solidFill>
                       <a:srgbClr val="000000"/>
                     </a:solidFill>
@@ -27944,7 +27944,7 @@
               </a:ln>
               <a:extLst>
                 <a:ext uri="{91240B29-F687-4f45-9708-019B960494DF}">
-                  <a14:hiddenLine xmlns="" xmlns:a16="http://schemas.microsoft.com/office/drawing/2014/main" xmlns:p14="http://schemas.microsoft.com/office/powerpoint/2010/main" xmlns:a14="http://schemas.microsoft.com/office/drawing/2010/main" w="9525">
+                  <a14:hiddenLine xmlns:a14="http://schemas.microsoft.com/office/drawing/2010/main" xmlns:p14="http://schemas.microsoft.com/office/powerpoint/2010/main" xmlns:a16="http://schemas.microsoft.com/office/drawing/2014/main" xmlns="" w="9525">
                     <a:solidFill>
                       <a:srgbClr val="000000"/>
                     </a:solidFill>
@@ -28049,7 +28049,7 @@
               </a:ln>
               <a:extLst>
                 <a:ext uri="{91240B29-F687-4f45-9708-019B960494DF}">
-                  <a14:hiddenLine xmlns="" xmlns:a16="http://schemas.microsoft.com/office/drawing/2014/main" xmlns:p14="http://schemas.microsoft.com/office/powerpoint/2010/main" xmlns:a14="http://schemas.microsoft.com/office/drawing/2010/main" w="9525">
+                  <a14:hiddenLine xmlns:a14="http://schemas.microsoft.com/office/drawing/2010/main" xmlns:p14="http://schemas.microsoft.com/office/powerpoint/2010/main" xmlns:a16="http://schemas.microsoft.com/office/drawing/2014/main" xmlns="" w="9525">
                     <a:solidFill>
                       <a:srgbClr val="000000"/>
                     </a:solidFill>
@@ -28129,7 +28129,7 @@
               </a:ln>
               <a:extLst>
                 <a:ext uri="{91240B29-F687-4f45-9708-019B960494DF}">
-                  <a14:hiddenLine xmlns="" xmlns:a16="http://schemas.microsoft.com/office/drawing/2014/main" xmlns:p14="http://schemas.microsoft.com/office/powerpoint/2010/main" xmlns:a14="http://schemas.microsoft.com/office/drawing/2010/main" w="9525">
+                  <a14:hiddenLine xmlns:a14="http://schemas.microsoft.com/office/drawing/2010/main" xmlns:p14="http://schemas.microsoft.com/office/powerpoint/2010/main" xmlns:a16="http://schemas.microsoft.com/office/drawing/2014/main" xmlns="" w="9525">
                     <a:solidFill>
                       <a:srgbClr val="000000"/>
                     </a:solidFill>
@@ -28264,7 +28264,7 @@
               </a:ln>
               <a:extLst>
                 <a:ext uri="{91240B29-F687-4f45-9708-019B960494DF}">
-                  <a14:hiddenLine xmlns="" xmlns:a16="http://schemas.microsoft.com/office/drawing/2014/main" xmlns:p14="http://schemas.microsoft.com/office/powerpoint/2010/main" xmlns:a14="http://schemas.microsoft.com/office/drawing/2010/main" w="9525">
+                  <a14:hiddenLine xmlns:a14="http://schemas.microsoft.com/office/drawing/2010/main" xmlns:p14="http://schemas.microsoft.com/office/powerpoint/2010/main" xmlns:a16="http://schemas.microsoft.com/office/drawing/2014/main" xmlns="" w="9525">
                     <a:solidFill>
                       <a:srgbClr val="000000"/>
                     </a:solidFill>
@@ -28392,7 +28392,7 @@
               </a:ln>
               <a:extLst>
                 <a:ext uri="{91240B29-F687-4f45-9708-019B960494DF}">
-                  <a14:hiddenLine xmlns="" xmlns:a16="http://schemas.microsoft.com/office/drawing/2014/main" xmlns:p14="http://schemas.microsoft.com/office/powerpoint/2010/main" xmlns:a14="http://schemas.microsoft.com/office/drawing/2010/main" w="9525">
+                  <a14:hiddenLine xmlns:a14="http://schemas.microsoft.com/office/drawing/2010/main" xmlns:p14="http://schemas.microsoft.com/office/powerpoint/2010/main" xmlns:a16="http://schemas.microsoft.com/office/drawing/2014/main" xmlns="" w="9525">
                     <a:solidFill>
                       <a:srgbClr val="000000"/>
                     </a:solidFill>
@@ -28522,7 +28522,7 @@
               </a:ln>
               <a:extLst>
                 <a:ext uri="{91240B29-F687-4f45-9708-019B960494DF}">
-                  <a14:hiddenLine xmlns="" xmlns:a16="http://schemas.microsoft.com/office/drawing/2014/main" xmlns:p14="http://schemas.microsoft.com/office/powerpoint/2010/main" xmlns:a14="http://schemas.microsoft.com/office/drawing/2010/main" w="9525">
+                  <a14:hiddenLine xmlns:a14="http://schemas.microsoft.com/office/drawing/2010/main" xmlns:p14="http://schemas.microsoft.com/office/powerpoint/2010/main" xmlns:a16="http://schemas.microsoft.com/office/drawing/2014/main" xmlns="" w="9525">
                     <a:solidFill>
                       <a:srgbClr val="000000"/>
                     </a:solidFill>
@@ -28627,7 +28627,7 @@
               </a:ln>
               <a:extLst>
                 <a:ext uri="{91240B29-F687-4f45-9708-019B960494DF}">
-                  <a14:hiddenLine xmlns="" xmlns:a16="http://schemas.microsoft.com/office/drawing/2014/main" xmlns:p14="http://schemas.microsoft.com/office/powerpoint/2010/main" xmlns:a14="http://schemas.microsoft.com/office/drawing/2010/main" w="9525">
+                  <a14:hiddenLine xmlns:a14="http://schemas.microsoft.com/office/drawing/2010/main" xmlns:p14="http://schemas.microsoft.com/office/powerpoint/2010/main" xmlns:a16="http://schemas.microsoft.com/office/drawing/2014/main" xmlns="" w="9525">
                     <a:solidFill>
                       <a:srgbClr val="000000"/>
                     </a:solidFill>
@@ -28707,7 +28707,7 @@
               </a:ln>
               <a:extLst>
                 <a:ext uri="{91240B29-F687-4f45-9708-019B960494DF}">
-                  <a14:hiddenLine xmlns="" xmlns:a16="http://schemas.microsoft.com/office/drawing/2014/main" xmlns:p14="http://schemas.microsoft.com/office/powerpoint/2010/main" xmlns:a14="http://schemas.microsoft.com/office/drawing/2010/main" w="9525">
+                  <a14:hiddenLine xmlns:a14="http://schemas.microsoft.com/office/drawing/2010/main" xmlns:p14="http://schemas.microsoft.com/office/powerpoint/2010/main" xmlns:a16="http://schemas.microsoft.com/office/drawing/2014/main" xmlns="" w="9525">
                     <a:solidFill>
                       <a:srgbClr val="000000"/>
                     </a:solidFill>
@@ -28812,7 +28812,7 @@
               </a:ln>
               <a:extLst>
                 <a:ext uri="{91240B29-F687-4f45-9708-019B960494DF}">
-                  <a14:hiddenLine xmlns="" xmlns:a16="http://schemas.microsoft.com/office/drawing/2014/main" xmlns:p14="http://schemas.microsoft.com/office/powerpoint/2010/main" xmlns:a14="http://schemas.microsoft.com/office/drawing/2010/main" w="9525">
+                  <a14:hiddenLine xmlns:a14="http://schemas.microsoft.com/office/drawing/2010/main" xmlns:p14="http://schemas.microsoft.com/office/powerpoint/2010/main" xmlns:a16="http://schemas.microsoft.com/office/drawing/2014/main" xmlns="" w="9525">
                     <a:solidFill>
                       <a:srgbClr val="000000"/>
                     </a:solidFill>
@@ -28895,7 +28895,7 @@
               </a:ln>
               <a:extLst>
                 <a:ext uri="{91240B29-F687-4f45-9708-019B960494DF}">
-                  <a14:hiddenLine xmlns="" xmlns:a16="http://schemas.microsoft.com/office/drawing/2014/main" xmlns:p14="http://schemas.microsoft.com/office/powerpoint/2010/main" xmlns:a14="http://schemas.microsoft.com/office/drawing/2010/main" w="9525">
+                  <a14:hiddenLine xmlns:a14="http://schemas.microsoft.com/office/drawing/2010/main" xmlns:p14="http://schemas.microsoft.com/office/powerpoint/2010/main" xmlns:a16="http://schemas.microsoft.com/office/drawing/2014/main" xmlns="" w="9525">
                     <a:solidFill>
                       <a:srgbClr val="000000"/>
                     </a:solidFill>
@@ -29000,7 +29000,7 @@
               </a:ln>
               <a:extLst>
                 <a:ext uri="{91240B29-F687-4f45-9708-019B960494DF}">
-                  <a14:hiddenLine xmlns="" xmlns:a16="http://schemas.microsoft.com/office/drawing/2014/main" xmlns:p14="http://schemas.microsoft.com/office/powerpoint/2010/main" xmlns:a14="http://schemas.microsoft.com/office/drawing/2010/main" w="9525">
+                  <a14:hiddenLine xmlns:a14="http://schemas.microsoft.com/office/drawing/2010/main" xmlns:p14="http://schemas.microsoft.com/office/powerpoint/2010/main" xmlns:a16="http://schemas.microsoft.com/office/drawing/2014/main" xmlns="" w="9525">
                     <a:solidFill>
                       <a:srgbClr val="000000"/>
                     </a:solidFill>
@@ -29083,7 +29083,7 @@
               </a:ln>
               <a:extLst>
                 <a:ext uri="{91240B29-F687-4f45-9708-019B960494DF}">
-                  <a14:hiddenLine xmlns="" xmlns:a16="http://schemas.microsoft.com/office/drawing/2014/main" xmlns:p14="http://schemas.microsoft.com/office/powerpoint/2010/main" xmlns:a14="http://schemas.microsoft.com/office/drawing/2010/main" w="9525">
+                  <a14:hiddenLine xmlns:a14="http://schemas.microsoft.com/office/drawing/2010/main" xmlns:p14="http://schemas.microsoft.com/office/powerpoint/2010/main" xmlns:a16="http://schemas.microsoft.com/office/drawing/2014/main" xmlns="" w="9525">
                     <a:solidFill>
                       <a:srgbClr val="000000"/>
                     </a:solidFill>
@@ -29188,7 +29188,7 @@
               </a:ln>
               <a:extLst>
                 <a:ext uri="{91240B29-F687-4f45-9708-019B960494DF}">
-                  <a14:hiddenLine xmlns="" xmlns:a16="http://schemas.microsoft.com/office/drawing/2014/main" xmlns:p14="http://schemas.microsoft.com/office/powerpoint/2010/main" xmlns:a14="http://schemas.microsoft.com/office/drawing/2010/main" w="9525">
+                  <a14:hiddenLine xmlns:a14="http://schemas.microsoft.com/office/drawing/2010/main" xmlns:p14="http://schemas.microsoft.com/office/powerpoint/2010/main" xmlns:a16="http://schemas.microsoft.com/office/drawing/2014/main" xmlns="" w="9525">
                     <a:solidFill>
                       <a:srgbClr val="000000"/>
                     </a:solidFill>
@@ -29237,7 +29237,7 @@
               </a:ln>
               <a:extLst>
                 <a:ext uri="{91240B29-F687-4f45-9708-019B960494DF}">
-                  <a14:hiddenLine xmlns="" xmlns:a16="http://schemas.microsoft.com/office/drawing/2014/main" xmlns:p14="http://schemas.microsoft.com/office/powerpoint/2010/main" xmlns:a14="http://schemas.microsoft.com/office/drawing/2010/main" w="9525">
+                  <a14:hiddenLine xmlns:a14="http://schemas.microsoft.com/office/drawing/2010/main" xmlns:p14="http://schemas.microsoft.com/office/powerpoint/2010/main" xmlns:a16="http://schemas.microsoft.com/office/drawing/2014/main" xmlns="" w="9525">
                     <a:solidFill>
                       <a:srgbClr val="000000"/>
                     </a:solidFill>
@@ -29357,7 +29357,7 @@
           </a:prstGeom>
           <a:extLst>
             <a:ext uri="{909E8E84-426E-40dd-AFC4-6F175D3DCCD1}">
-              <a14:hiddenFill xmlns="" xmlns:a16="http://schemas.microsoft.com/office/drawing/2014/main" xmlns:p14="http://schemas.microsoft.com/office/powerpoint/2010/main" xmlns:a14="http://schemas.microsoft.com/office/drawing/2010/main">
+              <a14:hiddenFill xmlns:a14="http://schemas.microsoft.com/office/drawing/2010/main" xmlns:p14="http://schemas.microsoft.com/office/powerpoint/2010/main" xmlns:a16="http://schemas.microsoft.com/office/drawing/2014/main" xmlns="">
                 <a:solidFill>
                   <a:srgbClr val="FFFFFF"/>
                 </a:solidFill>
@@ -29481,7 +29481,7 @@
           <a:noFill/>
           <a:extLst>
             <a:ext uri="{909E8E84-426E-40dd-AFC4-6F175D3DCCD1}">
-              <a14:hiddenFill xmlns="" xmlns:a16="http://schemas.microsoft.com/office/drawing/2014/main" xmlns:p14="http://schemas.microsoft.com/office/powerpoint/2010/main" xmlns:a14="http://schemas.microsoft.com/office/drawing/2010/main">
+              <a14:hiddenFill xmlns:a14="http://schemas.microsoft.com/office/drawing/2010/main" xmlns:p14="http://schemas.microsoft.com/office/powerpoint/2010/main" xmlns:a16="http://schemas.microsoft.com/office/drawing/2014/main" xmlns="">
                 <a:solidFill>
                   <a:srgbClr val="FFFFFF"/>
                 </a:solidFill>
@@ -29672,7 +29672,7 @@
             </a:ln>
             <a:extLst>
               <a:ext uri="{91240B29-F687-4f45-9708-019B960494DF}">
-                <a14:hiddenLine xmlns="" xmlns:a16="http://schemas.microsoft.com/office/drawing/2014/main" xmlns:p14="http://schemas.microsoft.com/office/powerpoint/2010/main" xmlns:a14="http://schemas.microsoft.com/office/drawing/2010/main" w="9525">
+                <a14:hiddenLine xmlns:a14="http://schemas.microsoft.com/office/drawing/2010/main" xmlns:p14="http://schemas.microsoft.com/office/powerpoint/2010/main" xmlns:a16="http://schemas.microsoft.com/office/drawing/2014/main" xmlns="" w="9525">
                   <a:solidFill>
                     <a:srgbClr val="000000"/>
                   </a:solidFill>
@@ -29777,7 +29777,7 @@
             </a:ln>
             <a:extLst>
               <a:ext uri="{91240B29-F687-4f45-9708-019B960494DF}">
-                <a14:hiddenLine xmlns="" xmlns:a16="http://schemas.microsoft.com/office/drawing/2014/main" xmlns:p14="http://schemas.microsoft.com/office/powerpoint/2010/main" xmlns:a14="http://schemas.microsoft.com/office/drawing/2010/main" w="9525">
+                <a14:hiddenLine xmlns:a14="http://schemas.microsoft.com/office/drawing/2010/main" xmlns:p14="http://schemas.microsoft.com/office/powerpoint/2010/main" xmlns:a16="http://schemas.microsoft.com/office/drawing/2014/main" xmlns="" w="9525">
                   <a:solidFill>
                     <a:srgbClr val="000000"/>
                   </a:solidFill>
@@ -29882,7 +29882,7 @@
             </a:ln>
             <a:extLst>
               <a:ext uri="{91240B29-F687-4f45-9708-019B960494DF}">
-                <a14:hiddenLine xmlns="" xmlns:a16="http://schemas.microsoft.com/office/drawing/2014/main" xmlns:p14="http://schemas.microsoft.com/office/powerpoint/2010/main" xmlns:a14="http://schemas.microsoft.com/office/drawing/2010/main" w="9525">
+                <a14:hiddenLine xmlns:a14="http://schemas.microsoft.com/office/drawing/2010/main" xmlns:p14="http://schemas.microsoft.com/office/powerpoint/2010/main" xmlns:a16="http://schemas.microsoft.com/office/drawing/2014/main" xmlns="" w="9525">
                   <a:solidFill>
                     <a:srgbClr val="000000"/>
                   </a:solidFill>
@@ -29959,7 +29959,7 @@
             </a:ln>
             <a:extLst>
               <a:ext uri="{91240B29-F687-4f45-9708-019B960494DF}">
-                <a14:hiddenLine xmlns="" xmlns:a16="http://schemas.microsoft.com/office/drawing/2014/main" xmlns:p14="http://schemas.microsoft.com/office/powerpoint/2010/main" xmlns:a14="http://schemas.microsoft.com/office/drawing/2010/main" w="9525">
+                <a14:hiddenLine xmlns:a14="http://schemas.microsoft.com/office/drawing/2010/main" xmlns:p14="http://schemas.microsoft.com/office/powerpoint/2010/main" xmlns:a16="http://schemas.microsoft.com/office/drawing/2014/main" xmlns="" w="9525">
                   <a:solidFill>
                     <a:srgbClr val="000000"/>
                   </a:solidFill>
@@ -30064,7 +30064,7 @@
             </a:ln>
             <a:extLst>
               <a:ext uri="{91240B29-F687-4f45-9708-019B960494DF}">
-                <a14:hiddenLine xmlns="" xmlns:a16="http://schemas.microsoft.com/office/drawing/2014/main" xmlns:p14="http://schemas.microsoft.com/office/powerpoint/2010/main" xmlns:a14="http://schemas.microsoft.com/office/drawing/2010/main" w="9525">
+                <a14:hiddenLine xmlns:a14="http://schemas.microsoft.com/office/drawing/2010/main" xmlns:p14="http://schemas.microsoft.com/office/powerpoint/2010/main" xmlns:a16="http://schemas.microsoft.com/office/drawing/2014/main" xmlns="" w="9525">
                   <a:solidFill>
                     <a:srgbClr val="000000"/>
                   </a:solidFill>
@@ -30141,7 +30141,7 @@
             </a:ln>
             <a:extLst>
               <a:ext uri="{91240B29-F687-4f45-9708-019B960494DF}">
-                <a14:hiddenLine xmlns="" xmlns:a16="http://schemas.microsoft.com/office/drawing/2014/main" xmlns:p14="http://schemas.microsoft.com/office/powerpoint/2010/main" xmlns:a14="http://schemas.microsoft.com/office/drawing/2010/main" w="9525">
+                <a14:hiddenLine xmlns:a14="http://schemas.microsoft.com/office/drawing/2010/main" xmlns:p14="http://schemas.microsoft.com/office/powerpoint/2010/main" xmlns:a16="http://schemas.microsoft.com/office/drawing/2014/main" xmlns="" w="9525">
                   <a:solidFill>
                     <a:srgbClr val="000000"/>
                   </a:solidFill>
@@ -30218,7 +30218,7 @@
             </a:ln>
             <a:extLst>
               <a:ext uri="{91240B29-F687-4f45-9708-019B960494DF}">
-                <a14:hiddenLine xmlns="" xmlns:a16="http://schemas.microsoft.com/office/drawing/2014/main" xmlns:p14="http://schemas.microsoft.com/office/powerpoint/2010/main" xmlns:a14="http://schemas.microsoft.com/office/drawing/2010/main" w="9525">
+                <a14:hiddenLine xmlns:a14="http://schemas.microsoft.com/office/drawing/2010/main" xmlns:p14="http://schemas.microsoft.com/office/powerpoint/2010/main" xmlns:a16="http://schemas.microsoft.com/office/drawing/2014/main" xmlns="" w="9525">
                   <a:solidFill>
                     <a:srgbClr val="000000"/>
                   </a:solidFill>
@@ -30323,7 +30323,7 @@
             </a:ln>
             <a:extLst>
               <a:ext uri="{91240B29-F687-4f45-9708-019B960494DF}">
-                <a14:hiddenLine xmlns="" xmlns:a16="http://schemas.microsoft.com/office/drawing/2014/main" xmlns:p14="http://schemas.microsoft.com/office/powerpoint/2010/main" xmlns:a14="http://schemas.microsoft.com/office/drawing/2010/main" w="9525">
+                <a14:hiddenLine xmlns:a14="http://schemas.microsoft.com/office/drawing/2010/main" xmlns:p14="http://schemas.microsoft.com/office/powerpoint/2010/main" xmlns:a16="http://schemas.microsoft.com/office/drawing/2014/main" xmlns="" w="9525">
                   <a:solidFill>
                     <a:srgbClr val="000000"/>
                   </a:solidFill>
@@ -30428,7 +30428,7 @@
             </a:ln>
             <a:extLst>
               <a:ext uri="{91240B29-F687-4f45-9708-019B960494DF}">
-                <a14:hiddenLine xmlns="" xmlns:a16="http://schemas.microsoft.com/office/drawing/2014/main" xmlns:p14="http://schemas.microsoft.com/office/powerpoint/2010/main" xmlns:a14="http://schemas.microsoft.com/office/drawing/2010/main" w="9525">
+                <a14:hiddenLine xmlns:a14="http://schemas.microsoft.com/office/drawing/2010/main" xmlns:p14="http://schemas.microsoft.com/office/powerpoint/2010/main" xmlns:a16="http://schemas.microsoft.com/office/drawing/2014/main" xmlns="" w="9525">
                   <a:solidFill>
                     <a:srgbClr val="000000"/>
                   </a:solidFill>
@@ -30505,7 +30505,7 @@
             </a:ln>
             <a:extLst>
               <a:ext uri="{91240B29-F687-4f45-9708-019B960494DF}">
-                <a14:hiddenLine xmlns="" xmlns:a16="http://schemas.microsoft.com/office/drawing/2014/main" xmlns:p14="http://schemas.microsoft.com/office/powerpoint/2010/main" xmlns:a14="http://schemas.microsoft.com/office/drawing/2010/main" w="9525">
+                <a14:hiddenLine xmlns:a14="http://schemas.microsoft.com/office/drawing/2010/main" xmlns:p14="http://schemas.microsoft.com/office/powerpoint/2010/main" xmlns:a16="http://schemas.microsoft.com/office/drawing/2014/main" xmlns="" w="9525">
                   <a:solidFill>
                     <a:srgbClr val="000000"/>
                   </a:solidFill>
@@ -30630,7 +30630,7 @@
             </a:ln>
             <a:extLst>
               <a:ext uri="{91240B29-F687-4f45-9708-019B960494DF}">
-                <a14:hiddenLine xmlns="" xmlns:a16="http://schemas.microsoft.com/office/drawing/2014/main" xmlns:p14="http://schemas.microsoft.com/office/powerpoint/2010/main" xmlns:a14="http://schemas.microsoft.com/office/drawing/2010/main" w="9525">
+                <a14:hiddenLine xmlns:a14="http://schemas.microsoft.com/office/drawing/2010/main" xmlns:p14="http://schemas.microsoft.com/office/powerpoint/2010/main" xmlns:a16="http://schemas.microsoft.com/office/drawing/2014/main" xmlns="" w="9525">
                   <a:solidFill>
                     <a:srgbClr val="000000"/>
                   </a:solidFill>
@@ -30744,7 +30744,7 @@
             </a:ln>
             <a:extLst>
               <a:ext uri="{91240B29-F687-4f45-9708-019B960494DF}">
-                <a14:hiddenLine xmlns="" xmlns:a16="http://schemas.microsoft.com/office/drawing/2014/main" xmlns:p14="http://schemas.microsoft.com/office/powerpoint/2010/main" xmlns:a14="http://schemas.microsoft.com/office/drawing/2010/main" w="9525">
+                <a14:hiddenLine xmlns:a14="http://schemas.microsoft.com/office/drawing/2010/main" xmlns:p14="http://schemas.microsoft.com/office/powerpoint/2010/main" xmlns:a16="http://schemas.microsoft.com/office/drawing/2014/main" xmlns="" w="9525">
                   <a:solidFill>
                     <a:srgbClr val="000000"/>
                   </a:solidFill>
@@ -30821,7 +30821,7 @@
             </a:ln>
             <a:extLst>
               <a:ext uri="{91240B29-F687-4f45-9708-019B960494DF}">
-                <a14:hiddenLine xmlns="" xmlns:a16="http://schemas.microsoft.com/office/drawing/2014/main" xmlns:p14="http://schemas.microsoft.com/office/powerpoint/2010/main" xmlns:a14="http://schemas.microsoft.com/office/drawing/2010/main" w="9525">
+                <a14:hiddenLine xmlns:a14="http://schemas.microsoft.com/office/drawing/2010/main" xmlns:p14="http://schemas.microsoft.com/office/powerpoint/2010/main" xmlns:a16="http://schemas.microsoft.com/office/drawing/2014/main" xmlns="" w="9525">
                   <a:solidFill>
                     <a:srgbClr val="000000"/>
                   </a:solidFill>
@@ -30898,7 +30898,7 @@
             </a:ln>
             <a:extLst>
               <a:ext uri="{91240B29-F687-4f45-9708-019B960494DF}">
-                <a14:hiddenLine xmlns="" xmlns:a16="http://schemas.microsoft.com/office/drawing/2014/main" xmlns:p14="http://schemas.microsoft.com/office/powerpoint/2010/main" xmlns:a14="http://schemas.microsoft.com/office/drawing/2010/main" w="9525">
+                <a14:hiddenLine xmlns:a14="http://schemas.microsoft.com/office/drawing/2010/main" xmlns:p14="http://schemas.microsoft.com/office/powerpoint/2010/main" xmlns:a16="http://schemas.microsoft.com/office/drawing/2014/main" xmlns="" w="9525">
                   <a:solidFill>
                     <a:srgbClr val="000000"/>
                   </a:solidFill>
@@ -31003,7 +31003,7 @@
             </a:ln>
             <a:extLst>
               <a:ext uri="{91240B29-F687-4f45-9708-019B960494DF}">
-                <a14:hiddenLine xmlns="" xmlns:a16="http://schemas.microsoft.com/office/drawing/2014/main" xmlns:p14="http://schemas.microsoft.com/office/powerpoint/2010/main" xmlns:a14="http://schemas.microsoft.com/office/drawing/2010/main" w="9525">
+                <a14:hiddenLine xmlns:a14="http://schemas.microsoft.com/office/drawing/2010/main" xmlns:p14="http://schemas.microsoft.com/office/powerpoint/2010/main" xmlns:a16="http://schemas.microsoft.com/office/drawing/2014/main" xmlns="" w="9525">
                   <a:solidFill>
                     <a:srgbClr val="000000"/>
                   </a:solidFill>
@@ -31052,7 +31052,7 @@
             </a:ln>
             <a:extLst>
               <a:ext uri="{91240B29-F687-4f45-9708-019B960494DF}">
-                <a14:hiddenLine xmlns="" xmlns:a16="http://schemas.microsoft.com/office/drawing/2014/main" xmlns:p14="http://schemas.microsoft.com/office/powerpoint/2010/main" xmlns:a14="http://schemas.microsoft.com/office/drawing/2010/main" w="9525">
+                <a14:hiddenLine xmlns:a14="http://schemas.microsoft.com/office/drawing/2010/main" xmlns:p14="http://schemas.microsoft.com/office/powerpoint/2010/main" xmlns:a16="http://schemas.microsoft.com/office/drawing/2014/main" xmlns="" w="9525">
                   <a:solidFill>
                     <a:srgbClr val="000000"/>
                   </a:solidFill>
@@ -31132,7 +31132,7 @@
             </a:ln>
             <a:extLst>
               <a:ext uri="{91240B29-F687-4f45-9708-019B960494DF}">
-                <a14:hiddenLine xmlns="" xmlns:a16="http://schemas.microsoft.com/office/drawing/2014/main" xmlns:p14="http://schemas.microsoft.com/office/powerpoint/2010/main" xmlns:a14="http://schemas.microsoft.com/office/drawing/2010/main" w="9525">
+                <a14:hiddenLine xmlns:a14="http://schemas.microsoft.com/office/drawing/2010/main" xmlns:p14="http://schemas.microsoft.com/office/powerpoint/2010/main" xmlns:a16="http://schemas.microsoft.com/office/drawing/2014/main" xmlns="" w="9525">
                   <a:solidFill>
                     <a:srgbClr val="000000"/>
                   </a:solidFill>
@@ -31237,7 +31237,7 @@
             </a:ln>
             <a:extLst>
               <a:ext uri="{91240B29-F687-4f45-9708-019B960494DF}">
-                <a14:hiddenLine xmlns="" xmlns:a16="http://schemas.microsoft.com/office/drawing/2014/main" xmlns:p14="http://schemas.microsoft.com/office/powerpoint/2010/main" xmlns:a14="http://schemas.microsoft.com/office/drawing/2010/main" w="9525">
+                <a14:hiddenLine xmlns:a14="http://schemas.microsoft.com/office/drawing/2010/main" xmlns:p14="http://schemas.microsoft.com/office/powerpoint/2010/main" xmlns:a16="http://schemas.microsoft.com/office/drawing/2014/main" xmlns="" w="9525">
                   <a:solidFill>
                     <a:srgbClr val="000000"/>
                   </a:solidFill>
@@ -31314,7 +31314,7 @@
             </a:ln>
             <a:extLst>
               <a:ext uri="{91240B29-F687-4f45-9708-019B960494DF}">
-                <a14:hiddenLine xmlns="" xmlns:a16="http://schemas.microsoft.com/office/drawing/2014/main" xmlns:p14="http://schemas.microsoft.com/office/powerpoint/2010/main" xmlns:a14="http://schemas.microsoft.com/office/drawing/2010/main" w="9525">
+                <a14:hiddenLine xmlns:a14="http://schemas.microsoft.com/office/drawing/2010/main" xmlns:p14="http://schemas.microsoft.com/office/powerpoint/2010/main" xmlns:a16="http://schemas.microsoft.com/office/drawing/2014/main" xmlns="" w="9525">
                   <a:solidFill>
                     <a:srgbClr val="000000"/>
                   </a:solidFill>
@@ -31419,7 +31419,7 @@
             </a:ln>
             <a:extLst>
               <a:ext uri="{91240B29-F687-4f45-9708-019B960494DF}">
-                <a14:hiddenLine xmlns="" xmlns:a16="http://schemas.microsoft.com/office/drawing/2014/main" xmlns:p14="http://schemas.microsoft.com/office/powerpoint/2010/main" xmlns:a14="http://schemas.microsoft.com/office/drawing/2010/main" w="9525">
+                <a14:hiddenLine xmlns:a14="http://schemas.microsoft.com/office/drawing/2010/main" xmlns:p14="http://schemas.microsoft.com/office/powerpoint/2010/main" xmlns:a16="http://schemas.microsoft.com/office/drawing/2014/main" xmlns="" w="9525">
                   <a:solidFill>
                     <a:srgbClr val="000000"/>
                   </a:solidFill>
@@ -31499,7 +31499,7 @@
             </a:ln>
             <a:extLst>
               <a:ext uri="{91240B29-F687-4f45-9708-019B960494DF}">
-                <a14:hiddenLine xmlns="" xmlns:a16="http://schemas.microsoft.com/office/drawing/2014/main" xmlns:p14="http://schemas.microsoft.com/office/powerpoint/2010/main" xmlns:a14="http://schemas.microsoft.com/office/drawing/2010/main" w="9525">
+                <a14:hiddenLine xmlns:a14="http://schemas.microsoft.com/office/drawing/2010/main" xmlns:p14="http://schemas.microsoft.com/office/powerpoint/2010/main" xmlns:a16="http://schemas.microsoft.com/office/drawing/2014/main" xmlns="" w="9525">
                   <a:solidFill>
                     <a:srgbClr val="000000"/>
                   </a:solidFill>
@@ -31576,7 +31576,7 @@
             </a:ln>
             <a:extLst>
               <a:ext uri="{91240B29-F687-4f45-9708-019B960494DF}">
-                <a14:hiddenLine xmlns="" xmlns:a16="http://schemas.microsoft.com/office/drawing/2014/main" xmlns:p14="http://schemas.microsoft.com/office/powerpoint/2010/main" xmlns:a14="http://schemas.microsoft.com/office/drawing/2010/main" w="9525">
+                <a14:hiddenLine xmlns:a14="http://schemas.microsoft.com/office/drawing/2010/main" xmlns:p14="http://schemas.microsoft.com/office/powerpoint/2010/main" xmlns:a16="http://schemas.microsoft.com/office/drawing/2014/main" xmlns="" w="9525">
                   <a:solidFill>
                     <a:srgbClr val="000000"/>
                   </a:solidFill>
@@ -31681,7 +31681,7 @@
             </a:ln>
             <a:extLst>
               <a:ext uri="{91240B29-F687-4f45-9708-019B960494DF}">
-                <a14:hiddenLine xmlns="" xmlns:a16="http://schemas.microsoft.com/office/drawing/2014/main" xmlns:p14="http://schemas.microsoft.com/office/powerpoint/2010/main" xmlns:a14="http://schemas.microsoft.com/office/drawing/2010/main" w="9525">
+                <a14:hiddenLine xmlns:a14="http://schemas.microsoft.com/office/drawing/2010/main" xmlns:p14="http://schemas.microsoft.com/office/powerpoint/2010/main" xmlns:a16="http://schemas.microsoft.com/office/drawing/2014/main" xmlns="" w="9525">
                   <a:solidFill>
                     <a:srgbClr val="000000"/>
                   </a:solidFill>
@@ -31786,7 +31786,7 @@
             </a:ln>
             <a:extLst>
               <a:ext uri="{91240B29-F687-4f45-9708-019B960494DF}">
-                <a14:hiddenLine xmlns="" xmlns:a16="http://schemas.microsoft.com/office/drawing/2014/main" xmlns:p14="http://schemas.microsoft.com/office/powerpoint/2010/main" xmlns:a14="http://schemas.microsoft.com/office/drawing/2010/main" w="9525">
+                <a14:hiddenLine xmlns:a14="http://schemas.microsoft.com/office/drawing/2010/main" xmlns:p14="http://schemas.microsoft.com/office/powerpoint/2010/main" xmlns:a16="http://schemas.microsoft.com/office/drawing/2014/main" xmlns="" w="9525">
                   <a:solidFill>
                     <a:srgbClr val="000000"/>
                   </a:solidFill>
@@ -31866,7 +31866,7 @@
             </a:ln>
             <a:extLst>
               <a:ext uri="{91240B29-F687-4f45-9708-019B960494DF}">
-                <a14:hiddenLine xmlns="" xmlns:a16="http://schemas.microsoft.com/office/drawing/2014/main" xmlns:p14="http://schemas.microsoft.com/office/powerpoint/2010/main" xmlns:a14="http://schemas.microsoft.com/office/drawing/2010/main" w="9525">
+                <a14:hiddenLine xmlns:a14="http://schemas.microsoft.com/office/drawing/2010/main" xmlns:p14="http://schemas.microsoft.com/office/powerpoint/2010/main" xmlns:a16="http://schemas.microsoft.com/office/drawing/2014/main" xmlns="" w="9525">
                   <a:solidFill>
                     <a:srgbClr val="000000"/>
                   </a:solidFill>
@@ -32001,7 +32001,7 @@
             </a:ln>
             <a:extLst>
               <a:ext uri="{91240B29-F687-4f45-9708-019B960494DF}">
-                <a14:hiddenLine xmlns="" xmlns:a16="http://schemas.microsoft.com/office/drawing/2014/main" xmlns:p14="http://schemas.microsoft.com/office/powerpoint/2010/main" xmlns:a14="http://schemas.microsoft.com/office/drawing/2010/main" w="9525">
+                <a14:hiddenLine xmlns:a14="http://schemas.microsoft.com/office/drawing/2010/main" xmlns:p14="http://schemas.microsoft.com/office/powerpoint/2010/main" xmlns:a16="http://schemas.microsoft.com/office/drawing/2014/main" xmlns="" w="9525">
                   <a:solidFill>
                     <a:srgbClr val="000000"/>
                   </a:solidFill>
@@ -32016,7 +32016,7 @@
       </p:grpSp>
       <p:pic>
         <p:nvPicPr>
-          <p:cNvPr id="6" name="Content Placeholder 5" descr="A screenshot of a cell phone&#13;&#10;&#13;&#10;Description automatically generated">
+          <p:cNvPr id="6" name="Content Placeholder 5" descr="A screenshot of a cell phone&#10;&#10;Description automatically generated">
             <a:extLst>
               <a:ext uri="{FF2B5EF4-FFF2-40B4-BE49-F238E27FC236}">
                 <a16:creationId xmlns:a16="http://schemas.microsoft.com/office/drawing/2014/main" id="{B1283383-0A61-7D4D-BA8E-4DF4913C0EB5}"/>
@@ -32048,7 +32048,7 @@
       </p:pic>
       <p:pic>
         <p:nvPicPr>
-          <p:cNvPr id="8" name="Picture 7" descr="A screenshot of a cell phone&#13;&#10;&#13;&#10;Description automatically generated">
+          <p:cNvPr id="8" name="Picture 7" descr="A screenshot of a cell phone&#10;&#10;Description automatically generated">
             <a:extLst>
               <a:ext uri="{FF2B5EF4-FFF2-40B4-BE49-F238E27FC236}">
                 <a16:creationId xmlns:a16="http://schemas.microsoft.com/office/drawing/2014/main" id="{FA07B1B6-13DE-2446-99B5-95BF883B8FF5}"/>
@@ -32078,7 +32078,7 @@
       </p:pic>
       <p:pic>
         <p:nvPicPr>
-          <p:cNvPr id="10" name="Picture 9" descr="A screenshot of a cell phone&#13;&#10;&#13;&#10;Description automatically generated">
+          <p:cNvPr id="10" name="Picture 9" descr="A screenshot of a cell phone&#10;&#10;Description automatically generated">
             <a:extLst>
               <a:ext uri="{FF2B5EF4-FFF2-40B4-BE49-F238E27FC236}">
                 <a16:creationId xmlns:a16="http://schemas.microsoft.com/office/drawing/2014/main" id="{683D336B-F397-EC48-B03B-2138057086A7}"/>
@@ -32192,7 +32192,7 @@
           <a:noFill/>
           <a:extLst>
             <a:ext uri="{909E8E84-426E-40dd-AFC4-6F175D3DCCD1}">
-              <a14:hiddenFill xmlns="" xmlns:a16="http://schemas.microsoft.com/office/drawing/2014/main" xmlns:p14="http://schemas.microsoft.com/office/powerpoint/2010/main" xmlns:a14="http://schemas.microsoft.com/office/drawing/2010/main">
+              <a14:hiddenFill xmlns:a14="http://schemas.microsoft.com/office/drawing/2010/main" xmlns:p14="http://schemas.microsoft.com/office/powerpoint/2010/main" xmlns:a16="http://schemas.microsoft.com/office/drawing/2014/main" xmlns="">
                 <a:solidFill>
                   <a:srgbClr val="FFFFFF"/>
                 </a:solidFill>
@@ -32313,7 +32313,7 @@
               </a:ln>
               <a:extLst>
                 <a:ext uri="{91240B29-F687-4f45-9708-019B960494DF}">
-                  <a14:hiddenLine xmlns="" xmlns:a16="http://schemas.microsoft.com/office/drawing/2014/main" xmlns:p14="http://schemas.microsoft.com/office/powerpoint/2010/main" xmlns:a14="http://schemas.microsoft.com/office/drawing/2010/main" w="9525">
+                  <a14:hiddenLine xmlns:a14="http://schemas.microsoft.com/office/drawing/2010/main" xmlns:p14="http://schemas.microsoft.com/office/powerpoint/2010/main" xmlns:a16="http://schemas.microsoft.com/office/drawing/2014/main" xmlns="" w="9525">
                     <a:solidFill>
                       <a:srgbClr val="000000"/>
                     </a:solidFill>
@@ -32418,7 +32418,7 @@
               </a:ln>
               <a:extLst>
                 <a:ext uri="{91240B29-F687-4f45-9708-019B960494DF}">
-                  <a14:hiddenLine xmlns="" xmlns:a16="http://schemas.microsoft.com/office/drawing/2014/main" xmlns:p14="http://schemas.microsoft.com/office/powerpoint/2010/main" xmlns:a14="http://schemas.microsoft.com/office/drawing/2010/main" w="9525">
+                  <a14:hiddenLine xmlns:a14="http://schemas.microsoft.com/office/drawing/2010/main" xmlns:p14="http://schemas.microsoft.com/office/powerpoint/2010/main" xmlns:a16="http://schemas.microsoft.com/office/drawing/2014/main" xmlns="" w="9525">
                     <a:solidFill>
                       <a:srgbClr val="000000"/>
                     </a:solidFill>
@@ -32523,7 +32523,7 @@
               </a:ln>
               <a:extLst>
                 <a:ext uri="{91240B29-F687-4f45-9708-019B960494DF}">
-                  <a14:hiddenLine xmlns="" xmlns:a16="http://schemas.microsoft.com/office/drawing/2014/main" xmlns:p14="http://schemas.microsoft.com/office/powerpoint/2010/main" xmlns:a14="http://schemas.microsoft.com/office/drawing/2010/main" w="9525">
+                  <a14:hiddenLine xmlns:a14="http://schemas.microsoft.com/office/drawing/2010/main" xmlns:p14="http://schemas.microsoft.com/office/powerpoint/2010/main" xmlns:a16="http://schemas.microsoft.com/office/drawing/2014/main" xmlns="" w="9525">
                     <a:solidFill>
                       <a:srgbClr val="000000"/>
                     </a:solidFill>
@@ -32600,7 +32600,7 @@
               </a:ln>
               <a:extLst>
                 <a:ext uri="{91240B29-F687-4f45-9708-019B960494DF}">
-                  <a14:hiddenLine xmlns="" xmlns:a16="http://schemas.microsoft.com/office/drawing/2014/main" xmlns:p14="http://schemas.microsoft.com/office/powerpoint/2010/main" xmlns:a14="http://schemas.microsoft.com/office/drawing/2010/main" w="9525">
+                  <a14:hiddenLine xmlns:a14="http://schemas.microsoft.com/office/drawing/2010/main" xmlns:p14="http://schemas.microsoft.com/office/powerpoint/2010/main" xmlns:a16="http://schemas.microsoft.com/office/drawing/2014/main" xmlns="" w="9525">
                     <a:solidFill>
                       <a:srgbClr val="000000"/>
                     </a:solidFill>
@@ -32705,7 +32705,7 @@
               </a:ln>
               <a:extLst>
                 <a:ext uri="{91240B29-F687-4f45-9708-019B960494DF}">
-                  <a14:hiddenLine xmlns="" xmlns:a16="http://schemas.microsoft.com/office/drawing/2014/main" xmlns:p14="http://schemas.microsoft.com/office/powerpoint/2010/main" xmlns:a14="http://schemas.microsoft.com/office/drawing/2010/main" w="9525">
+                  <a14:hiddenLine xmlns:a14="http://schemas.microsoft.com/office/drawing/2010/main" xmlns:p14="http://schemas.microsoft.com/office/powerpoint/2010/main" xmlns:a16="http://schemas.microsoft.com/office/drawing/2014/main" xmlns="" w="9525">
                     <a:solidFill>
                       <a:srgbClr val="000000"/>
                     </a:solidFill>
@@ -32782,7 +32782,7 @@
               </a:ln>
               <a:extLst>
                 <a:ext uri="{91240B29-F687-4f45-9708-019B960494DF}">
-                  <a14:hiddenLine xmlns="" xmlns:a16="http://schemas.microsoft.com/office/drawing/2014/main" xmlns:p14="http://schemas.microsoft.com/office/powerpoint/2010/main" xmlns:a14="http://schemas.microsoft.com/office/drawing/2010/main" w="9525">
+                  <a14:hiddenLine xmlns:a14="http://schemas.microsoft.com/office/drawing/2010/main" xmlns:p14="http://schemas.microsoft.com/office/powerpoint/2010/main" xmlns:a16="http://schemas.microsoft.com/office/drawing/2014/main" xmlns="" w="9525">
                     <a:solidFill>
                       <a:srgbClr val="000000"/>
                     </a:solidFill>
@@ -32859,7 +32859,7 @@
               </a:ln>
               <a:extLst>
                 <a:ext uri="{91240B29-F687-4f45-9708-019B960494DF}">
-                  <a14:hiddenLine xmlns="" xmlns:a16="http://schemas.microsoft.com/office/drawing/2014/main" xmlns:p14="http://schemas.microsoft.com/office/powerpoint/2010/main" xmlns:a14="http://schemas.microsoft.com/office/drawing/2010/main" w="9525">
+                  <a14:hiddenLine xmlns:a14="http://schemas.microsoft.com/office/drawing/2010/main" xmlns:p14="http://schemas.microsoft.com/office/powerpoint/2010/main" xmlns:a16="http://schemas.microsoft.com/office/drawing/2014/main" xmlns="" w="9525">
                     <a:solidFill>
                       <a:srgbClr val="000000"/>
                     </a:solidFill>
@@ -32964,7 +32964,7 @@
               </a:ln>
               <a:extLst>
                 <a:ext uri="{91240B29-F687-4f45-9708-019B960494DF}">
-                  <a14:hiddenLine xmlns="" xmlns:a16="http://schemas.microsoft.com/office/drawing/2014/main" xmlns:p14="http://schemas.microsoft.com/office/powerpoint/2010/main" xmlns:a14="http://schemas.microsoft.com/office/drawing/2010/main" w="9525">
+                  <a14:hiddenLine xmlns:a14="http://schemas.microsoft.com/office/drawing/2010/main" xmlns:p14="http://schemas.microsoft.com/office/powerpoint/2010/main" xmlns:a16="http://schemas.microsoft.com/office/drawing/2014/main" xmlns="" w="9525">
                     <a:solidFill>
                       <a:srgbClr val="000000"/>
                     </a:solidFill>
@@ -33069,7 +33069,7 @@
               </a:ln>
               <a:extLst>
                 <a:ext uri="{91240B29-F687-4f45-9708-019B960494DF}">
-                  <a14:hiddenLine xmlns="" xmlns:a16="http://schemas.microsoft.com/office/drawing/2014/main" xmlns:p14="http://schemas.microsoft.com/office/powerpoint/2010/main" xmlns:a14="http://schemas.microsoft.com/office/drawing/2010/main" w="9525">
+                  <a14:hiddenLine xmlns:a14="http://schemas.microsoft.com/office/drawing/2010/main" xmlns:p14="http://schemas.microsoft.com/office/powerpoint/2010/main" xmlns:a16="http://schemas.microsoft.com/office/drawing/2014/main" xmlns="" w="9525">
                     <a:solidFill>
                       <a:srgbClr val="000000"/>
                     </a:solidFill>
@@ -33146,7 +33146,7 @@
               </a:ln>
               <a:extLst>
                 <a:ext uri="{91240B29-F687-4f45-9708-019B960494DF}">
-                  <a14:hiddenLine xmlns="" xmlns:a16="http://schemas.microsoft.com/office/drawing/2014/main" xmlns:p14="http://schemas.microsoft.com/office/powerpoint/2010/main" xmlns:a14="http://schemas.microsoft.com/office/drawing/2010/main" w="9525">
+                  <a14:hiddenLine xmlns:a14="http://schemas.microsoft.com/office/drawing/2010/main" xmlns:p14="http://schemas.microsoft.com/office/powerpoint/2010/main" xmlns:a16="http://schemas.microsoft.com/office/drawing/2014/main" xmlns="" w="9525">
                     <a:solidFill>
                       <a:srgbClr val="000000"/>
                     </a:solidFill>
@@ -33271,7 +33271,7 @@
               </a:ln>
               <a:extLst>
                 <a:ext uri="{91240B29-F687-4f45-9708-019B960494DF}">
-                  <a14:hiddenLine xmlns="" xmlns:a16="http://schemas.microsoft.com/office/drawing/2014/main" xmlns:p14="http://schemas.microsoft.com/office/powerpoint/2010/main" xmlns:a14="http://schemas.microsoft.com/office/drawing/2010/main" w="9525">
+                  <a14:hiddenLine xmlns:a14="http://schemas.microsoft.com/office/drawing/2010/main" xmlns:p14="http://schemas.microsoft.com/office/powerpoint/2010/main" xmlns:a16="http://schemas.microsoft.com/office/drawing/2014/main" xmlns="" w="9525">
                     <a:solidFill>
                       <a:srgbClr val="000000"/>
                     </a:solidFill>
@@ -33385,7 +33385,7 @@
               </a:ln>
               <a:extLst>
                 <a:ext uri="{91240B29-F687-4f45-9708-019B960494DF}">
-                  <a14:hiddenLine xmlns="" xmlns:a16="http://schemas.microsoft.com/office/drawing/2014/main" xmlns:p14="http://schemas.microsoft.com/office/powerpoint/2010/main" xmlns:a14="http://schemas.microsoft.com/office/drawing/2010/main" w="9525">
+                  <a14:hiddenLine xmlns:a14="http://schemas.microsoft.com/office/drawing/2010/main" xmlns:p14="http://schemas.microsoft.com/office/powerpoint/2010/main" xmlns:a16="http://schemas.microsoft.com/office/drawing/2014/main" xmlns="" w="9525">
                     <a:solidFill>
                       <a:srgbClr val="000000"/>
                     </a:solidFill>
@@ -33462,7 +33462,7 @@
               </a:ln>
               <a:extLst>
                 <a:ext uri="{91240B29-F687-4f45-9708-019B960494DF}">
-                  <a14:hiddenLine xmlns="" xmlns:a16="http://schemas.microsoft.com/office/drawing/2014/main" xmlns:p14="http://schemas.microsoft.com/office/powerpoint/2010/main" xmlns:a14="http://schemas.microsoft.com/office/drawing/2010/main" w="9525">
+                  <a14:hiddenLine xmlns:a14="http://schemas.microsoft.com/office/drawing/2010/main" xmlns:p14="http://schemas.microsoft.com/office/powerpoint/2010/main" xmlns:a16="http://schemas.microsoft.com/office/drawing/2014/main" xmlns="" w="9525">
                     <a:solidFill>
                       <a:srgbClr val="000000"/>
                     </a:solidFill>
@@ -33539,7 +33539,7 @@
               </a:ln>
               <a:extLst>
                 <a:ext uri="{91240B29-F687-4f45-9708-019B960494DF}">
-                  <a14:hiddenLine xmlns="" xmlns:a16="http://schemas.microsoft.com/office/drawing/2014/main" xmlns:p14="http://schemas.microsoft.com/office/powerpoint/2010/main" xmlns:a14="http://schemas.microsoft.com/office/drawing/2010/main" w="9525">
+                  <a14:hiddenLine xmlns:a14="http://schemas.microsoft.com/office/drawing/2010/main" xmlns:p14="http://schemas.microsoft.com/office/powerpoint/2010/main" xmlns:a16="http://schemas.microsoft.com/office/drawing/2014/main" xmlns="" w="9525">
                     <a:solidFill>
                       <a:srgbClr val="000000"/>
                     </a:solidFill>
@@ -33644,7 +33644,7 @@
               </a:ln>
               <a:extLst>
                 <a:ext uri="{91240B29-F687-4f45-9708-019B960494DF}">
-                  <a14:hiddenLine xmlns="" xmlns:a16="http://schemas.microsoft.com/office/drawing/2014/main" xmlns:p14="http://schemas.microsoft.com/office/powerpoint/2010/main" xmlns:a14="http://schemas.microsoft.com/office/drawing/2010/main" w="9525">
+                  <a14:hiddenLine xmlns:a14="http://schemas.microsoft.com/office/drawing/2010/main" xmlns:p14="http://schemas.microsoft.com/office/powerpoint/2010/main" xmlns:a16="http://schemas.microsoft.com/office/drawing/2014/main" xmlns="" w="9525">
                     <a:solidFill>
                       <a:srgbClr val="000000"/>
                     </a:solidFill>
@@ -33693,7 +33693,7 @@
               </a:ln>
               <a:extLst>
                 <a:ext uri="{91240B29-F687-4f45-9708-019B960494DF}">
-                  <a14:hiddenLine xmlns="" xmlns:a16="http://schemas.microsoft.com/office/drawing/2014/main" xmlns:p14="http://schemas.microsoft.com/office/powerpoint/2010/main" xmlns:a14="http://schemas.microsoft.com/office/drawing/2010/main" w="9525">
+                  <a14:hiddenLine xmlns:a14="http://schemas.microsoft.com/office/drawing/2010/main" xmlns:p14="http://schemas.microsoft.com/office/powerpoint/2010/main" xmlns:a16="http://schemas.microsoft.com/office/drawing/2014/main" xmlns="" w="9525">
                     <a:solidFill>
                       <a:srgbClr val="000000"/>
                     </a:solidFill>
@@ -33773,7 +33773,7 @@
               </a:ln>
               <a:extLst>
                 <a:ext uri="{91240B29-F687-4f45-9708-019B960494DF}">
-                  <a14:hiddenLine xmlns="" xmlns:a16="http://schemas.microsoft.com/office/drawing/2014/main" xmlns:p14="http://schemas.microsoft.com/office/powerpoint/2010/main" xmlns:a14="http://schemas.microsoft.com/office/drawing/2010/main" w="9525">
+                  <a14:hiddenLine xmlns:a14="http://schemas.microsoft.com/office/drawing/2010/main" xmlns:p14="http://schemas.microsoft.com/office/powerpoint/2010/main" xmlns:a16="http://schemas.microsoft.com/office/drawing/2014/main" xmlns="" w="9525">
                     <a:solidFill>
                       <a:srgbClr val="000000"/>
                     </a:solidFill>
@@ -33878,7 +33878,7 @@
               </a:ln>
               <a:extLst>
                 <a:ext uri="{91240B29-F687-4f45-9708-019B960494DF}">
-                  <a14:hiddenLine xmlns="" xmlns:a16="http://schemas.microsoft.com/office/drawing/2014/main" xmlns:p14="http://schemas.microsoft.com/office/powerpoint/2010/main" xmlns:a14="http://schemas.microsoft.com/office/drawing/2010/main" w="9525">
+                  <a14:hiddenLine xmlns:a14="http://schemas.microsoft.com/office/drawing/2010/main" xmlns:p14="http://schemas.microsoft.com/office/powerpoint/2010/main" xmlns:a16="http://schemas.microsoft.com/office/drawing/2014/main" xmlns="" w="9525">
                     <a:solidFill>
                       <a:srgbClr val="000000"/>
                     </a:solidFill>
@@ -33955,7 +33955,7 @@
               </a:ln>
               <a:extLst>
                 <a:ext uri="{91240B29-F687-4f45-9708-019B960494DF}">
-                  <a14:hiddenLine xmlns="" xmlns:a16="http://schemas.microsoft.com/office/drawing/2014/main" xmlns:p14="http://schemas.microsoft.com/office/powerpoint/2010/main" xmlns:a14="http://schemas.microsoft.com/office/drawing/2010/main" w="9525">
+                  <a14:hiddenLine xmlns:a14="http://schemas.microsoft.com/office/drawing/2010/main" xmlns:p14="http://schemas.microsoft.com/office/powerpoint/2010/main" xmlns:a16="http://schemas.microsoft.com/office/drawing/2014/main" xmlns="" w="9525">
                     <a:solidFill>
                       <a:srgbClr val="000000"/>
                     </a:solidFill>
@@ -34060,7 +34060,7 @@
               </a:ln>
               <a:extLst>
                 <a:ext uri="{91240B29-F687-4f45-9708-019B960494DF}">
-                  <a14:hiddenLine xmlns="" xmlns:a16="http://schemas.microsoft.com/office/drawing/2014/main" xmlns:p14="http://schemas.microsoft.com/office/powerpoint/2010/main" xmlns:a14="http://schemas.microsoft.com/office/drawing/2010/main" w="9525">
+                  <a14:hiddenLine xmlns:a14="http://schemas.microsoft.com/office/drawing/2010/main" xmlns:p14="http://schemas.microsoft.com/office/powerpoint/2010/main" xmlns:a16="http://schemas.microsoft.com/office/drawing/2014/main" xmlns="" w="9525">
                     <a:solidFill>
                       <a:srgbClr val="000000"/>
                     </a:solidFill>
@@ -34140,7 +34140,7 @@
               </a:ln>
               <a:extLst>
                 <a:ext uri="{91240B29-F687-4f45-9708-019B960494DF}">
-                  <a14:hiddenLine xmlns="" xmlns:a16="http://schemas.microsoft.com/office/drawing/2014/main" xmlns:p14="http://schemas.microsoft.com/office/powerpoint/2010/main" xmlns:a14="http://schemas.microsoft.com/office/drawing/2010/main" w="9525">
+                  <a14:hiddenLine xmlns:a14="http://schemas.microsoft.com/office/drawing/2010/main" xmlns:p14="http://schemas.microsoft.com/office/powerpoint/2010/main" xmlns:a16="http://schemas.microsoft.com/office/drawing/2014/main" xmlns="" w="9525">
                     <a:solidFill>
                       <a:srgbClr val="000000"/>
                     </a:solidFill>
@@ -34217,7 +34217,7 @@
               </a:ln>
               <a:extLst>
                 <a:ext uri="{91240B29-F687-4f45-9708-019B960494DF}">
-                  <a14:hiddenLine xmlns="" xmlns:a16="http://schemas.microsoft.com/office/drawing/2014/main" xmlns:p14="http://schemas.microsoft.com/office/powerpoint/2010/main" xmlns:a14="http://schemas.microsoft.com/office/drawing/2010/main" w="9525">
+                  <a14:hiddenLine xmlns:a14="http://schemas.microsoft.com/office/drawing/2010/main" xmlns:p14="http://schemas.microsoft.com/office/powerpoint/2010/main" xmlns:a16="http://schemas.microsoft.com/office/drawing/2014/main" xmlns="" w="9525">
                     <a:solidFill>
                       <a:srgbClr val="000000"/>
                     </a:solidFill>
@@ -34322,7 +34322,7 @@
               </a:ln>
               <a:extLst>
                 <a:ext uri="{91240B29-F687-4f45-9708-019B960494DF}">
-                  <a14:hiddenLine xmlns="" xmlns:a16="http://schemas.microsoft.com/office/drawing/2014/main" xmlns:p14="http://schemas.microsoft.com/office/powerpoint/2010/main" xmlns:a14="http://schemas.microsoft.com/office/drawing/2010/main" w="9525">
+                  <a14:hiddenLine xmlns:a14="http://schemas.microsoft.com/office/drawing/2010/main" xmlns:p14="http://schemas.microsoft.com/office/powerpoint/2010/main" xmlns:a16="http://schemas.microsoft.com/office/drawing/2014/main" xmlns="" w="9525">
                     <a:solidFill>
                       <a:srgbClr val="000000"/>
                     </a:solidFill>
@@ -34427,7 +34427,7 @@
               </a:ln>
               <a:extLst>
                 <a:ext uri="{91240B29-F687-4f45-9708-019B960494DF}">
-                  <a14:hiddenLine xmlns="" xmlns:a16="http://schemas.microsoft.com/office/drawing/2014/main" xmlns:p14="http://schemas.microsoft.com/office/powerpoint/2010/main" xmlns:a14="http://schemas.microsoft.com/office/drawing/2010/main" w="9525">
+                  <a14:hiddenLine xmlns:a14="http://schemas.microsoft.com/office/drawing/2010/main" xmlns:p14="http://schemas.microsoft.com/office/powerpoint/2010/main" xmlns:a16="http://schemas.microsoft.com/office/drawing/2014/main" xmlns="" w="9525">
                     <a:solidFill>
                       <a:srgbClr val="000000"/>
                     </a:solidFill>
@@ -34507,7 +34507,7 @@
               </a:ln>
               <a:extLst>
                 <a:ext uri="{91240B29-F687-4f45-9708-019B960494DF}">
-                  <a14:hiddenLine xmlns="" xmlns:a16="http://schemas.microsoft.com/office/drawing/2014/main" xmlns:p14="http://schemas.microsoft.com/office/powerpoint/2010/main" xmlns:a14="http://schemas.microsoft.com/office/drawing/2010/main" w="9525">
+                  <a14:hiddenLine xmlns:a14="http://schemas.microsoft.com/office/drawing/2010/main" xmlns:p14="http://schemas.microsoft.com/office/powerpoint/2010/main" xmlns:a16="http://schemas.microsoft.com/office/drawing/2014/main" xmlns="" w="9525">
                     <a:solidFill>
                       <a:srgbClr val="000000"/>
                     </a:solidFill>
@@ -34642,7 +34642,7 @@
               </a:ln>
               <a:extLst>
                 <a:ext uri="{91240B29-F687-4f45-9708-019B960494DF}">
-                  <a14:hiddenLine xmlns="" xmlns:a16="http://schemas.microsoft.com/office/drawing/2014/main" xmlns:p14="http://schemas.microsoft.com/office/powerpoint/2010/main" xmlns:a14="http://schemas.microsoft.com/office/drawing/2010/main" w="9525">
+                  <a14:hiddenLine xmlns:a14="http://schemas.microsoft.com/office/drawing/2010/main" xmlns:p14="http://schemas.microsoft.com/office/powerpoint/2010/main" xmlns:a16="http://schemas.microsoft.com/office/drawing/2014/main" xmlns="" w="9525">
                     <a:solidFill>
                       <a:srgbClr val="000000"/>
                     </a:solidFill>
@@ -34770,7 +34770,7 @@
               </a:ln>
               <a:extLst>
                 <a:ext uri="{91240B29-F687-4f45-9708-019B960494DF}">
-                  <a14:hiddenLine xmlns="" xmlns:a16="http://schemas.microsoft.com/office/drawing/2014/main" xmlns:p14="http://schemas.microsoft.com/office/powerpoint/2010/main" xmlns:a14="http://schemas.microsoft.com/office/drawing/2010/main" w="9525">
+                  <a14:hiddenLine xmlns:a14="http://schemas.microsoft.com/office/drawing/2010/main" xmlns:p14="http://schemas.microsoft.com/office/powerpoint/2010/main" xmlns:a16="http://schemas.microsoft.com/office/drawing/2014/main" xmlns="" w="9525">
                     <a:solidFill>
                       <a:srgbClr val="000000"/>
                     </a:solidFill>
@@ -34900,7 +34900,7 @@
               </a:ln>
               <a:extLst>
                 <a:ext uri="{91240B29-F687-4f45-9708-019B960494DF}">
-                  <a14:hiddenLine xmlns="" xmlns:a16="http://schemas.microsoft.com/office/drawing/2014/main" xmlns:p14="http://schemas.microsoft.com/office/powerpoint/2010/main" xmlns:a14="http://schemas.microsoft.com/office/drawing/2010/main" w="9525">
+                  <a14:hiddenLine xmlns:a14="http://schemas.microsoft.com/office/drawing/2010/main" xmlns:p14="http://schemas.microsoft.com/office/powerpoint/2010/main" xmlns:a16="http://schemas.microsoft.com/office/drawing/2014/main" xmlns="" w="9525">
                     <a:solidFill>
                       <a:srgbClr val="000000"/>
                     </a:solidFill>
@@ -35005,7 +35005,7 @@
               </a:ln>
               <a:extLst>
                 <a:ext uri="{91240B29-F687-4f45-9708-019B960494DF}">
-                  <a14:hiddenLine xmlns="" xmlns:a16="http://schemas.microsoft.com/office/drawing/2014/main" xmlns:p14="http://schemas.microsoft.com/office/powerpoint/2010/main" xmlns:a14="http://schemas.microsoft.com/office/drawing/2010/main" w="9525">
+                  <a14:hiddenLine xmlns:a14="http://schemas.microsoft.com/office/drawing/2010/main" xmlns:p14="http://schemas.microsoft.com/office/powerpoint/2010/main" xmlns:a16="http://schemas.microsoft.com/office/drawing/2014/main" xmlns="" w="9525">
                     <a:solidFill>
                       <a:srgbClr val="000000"/>
                     </a:solidFill>
@@ -35085,7 +35085,7 @@
               </a:ln>
               <a:extLst>
                 <a:ext uri="{91240B29-F687-4f45-9708-019B960494DF}">
-                  <a14:hiddenLine xmlns="" xmlns:a16="http://schemas.microsoft.com/office/drawing/2014/main" xmlns:p14="http://schemas.microsoft.com/office/powerpoint/2010/main" xmlns:a14="http://schemas.microsoft.com/office/drawing/2010/main" w="9525">
+                  <a14:hiddenLine xmlns:a14="http://schemas.microsoft.com/office/drawing/2010/main" xmlns:p14="http://schemas.microsoft.com/office/powerpoint/2010/main" xmlns:a16="http://schemas.microsoft.com/office/drawing/2014/main" xmlns="" w="9525">
                     <a:solidFill>
                       <a:srgbClr val="000000"/>
                     </a:solidFill>
@@ -35190,7 +35190,7 @@
               </a:ln>
               <a:extLst>
                 <a:ext uri="{91240B29-F687-4f45-9708-019B960494DF}">
-                  <a14:hiddenLine xmlns="" xmlns:a16="http://schemas.microsoft.com/office/drawing/2014/main" xmlns:p14="http://schemas.microsoft.com/office/powerpoint/2010/main" xmlns:a14="http://schemas.microsoft.com/office/drawing/2010/main" w="9525">
+                  <a14:hiddenLine xmlns:a14="http://schemas.microsoft.com/office/drawing/2010/main" xmlns:p14="http://schemas.microsoft.com/office/powerpoint/2010/main" xmlns:a16="http://schemas.microsoft.com/office/drawing/2014/main" xmlns="" w="9525">
                     <a:solidFill>
                       <a:srgbClr val="000000"/>
                     </a:solidFill>
@@ -35273,7 +35273,7 @@
               </a:ln>
               <a:extLst>
                 <a:ext uri="{91240B29-F687-4f45-9708-019B960494DF}">
-                  <a14:hiddenLine xmlns="" xmlns:a16="http://schemas.microsoft.com/office/drawing/2014/main" xmlns:p14="http://schemas.microsoft.com/office/powerpoint/2010/main" xmlns:a14="http://schemas.microsoft.com/office/drawing/2010/main" w="9525">
+                  <a14:hiddenLine xmlns:a14="http://schemas.microsoft.com/office/drawing/2010/main" xmlns:p14="http://schemas.microsoft.com/office/powerpoint/2010/main" xmlns:a16="http://schemas.microsoft.com/office/drawing/2014/main" xmlns="" w="9525">
                     <a:solidFill>
                       <a:srgbClr val="000000"/>
                     </a:solidFill>
@@ -35378,7 +35378,7 @@
               </a:ln>
               <a:extLst>
                 <a:ext uri="{91240B29-F687-4f45-9708-019B960494DF}">
-                  <a14:hiddenLine xmlns="" xmlns:a16="http://schemas.microsoft.com/office/drawing/2014/main" xmlns:p14="http://schemas.microsoft.com/office/powerpoint/2010/main" xmlns:a14="http://schemas.microsoft.com/office/drawing/2010/main" w="9525">
+                  <a14:hiddenLine xmlns:a14="http://schemas.microsoft.com/office/drawing/2010/main" xmlns:p14="http://schemas.microsoft.com/office/powerpoint/2010/main" xmlns:a16="http://schemas.microsoft.com/office/drawing/2014/main" xmlns="" w="9525">
                     <a:solidFill>
                       <a:srgbClr val="000000"/>
                     </a:solidFill>
@@ -35461,7 +35461,7 @@
               </a:ln>
               <a:extLst>
                 <a:ext uri="{91240B29-F687-4f45-9708-019B960494DF}">
-                  <a14:hiddenLine xmlns="" xmlns:a16="http://schemas.microsoft.com/office/drawing/2014/main" xmlns:p14="http://schemas.microsoft.com/office/powerpoint/2010/main" xmlns:a14="http://schemas.microsoft.com/office/drawing/2010/main" w="9525">
+                  <a14:hiddenLine xmlns:a14="http://schemas.microsoft.com/office/drawing/2010/main" xmlns:p14="http://schemas.microsoft.com/office/powerpoint/2010/main" xmlns:a16="http://schemas.microsoft.com/office/drawing/2014/main" xmlns="" w="9525">
                     <a:solidFill>
                       <a:srgbClr val="000000"/>
                     </a:solidFill>
@@ -35566,7 +35566,7 @@
               </a:ln>
               <a:extLst>
                 <a:ext uri="{91240B29-F687-4f45-9708-019B960494DF}">
-                  <a14:hiddenLine xmlns="" xmlns:a16="http://schemas.microsoft.com/office/drawing/2014/main" xmlns:p14="http://schemas.microsoft.com/office/powerpoint/2010/main" xmlns:a14="http://schemas.microsoft.com/office/drawing/2010/main" w="9525">
+                  <a14:hiddenLine xmlns:a14="http://schemas.microsoft.com/office/drawing/2010/main" xmlns:p14="http://schemas.microsoft.com/office/powerpoint/2010/main" xmlns:a16="http://schemas.microsoft.com/office/drawing/2014/main" xmlns="" w="9525">
                     <a:solidFill>
                       <a:srgbClr val="000000"/>
                     </a:solidFill>
@@ -35615,7 +35615,7 @@
               </a:ln>
               <a:extLst>
                 <a:ext uri="{91240B29-F687-4f45-9708-019B960494DF}">
-                  <a14:hiddenLine xmlns="" xmlns:a16="http://schemas.microsoft.com/office/drawing/2014/main" xmlns:p14="http://schemas.microsoft.com/office/powerpoint/2010/main" xmlns:a14="http://schemas.microsoft.com/office/drawing/2010/main" w="9525">
+                  <a14:hiddenLine xmlns:a14="http://schemas.microsoft.com/office/drawing/2010/main" xmlns:p14="http://schemas.microsoft.com/office/powerpoint/2010/main" xmlns:a16="http://schemas.microsoft.com/office/drawing/2014/main" xmlns="" w="9525">
                     <a:solidFill>
                       <a:srgbClr val="000000"/>
                     </a:solidFill>
@@ -35735,7 +35735,7 @@
           </a:prstGeom>
           <a:extLst>
             <a:ext uri="{909E8E84-426E-40dd-AFC4-6F175D3DCCD1}">
-              <a14:hiddenFill xmlns="" xmlns:a16="http://schemas.microsoft.com/office/drawing/2014/main" xmlns:p14="http://schemas.microsoft.com/office/powerpoint/2010/main" xmlns:a14="http://schemas.microsoft.com/office/drawing/2010/main">
+              <a14:hiddenFill xmlns:a14="http://schemas.microsoft.com/office/drawing/2010/main" xmlns:p14="http://schemas.microsoft.com/office/powerpoint/2010/main" xmlns:a16="http://schemas.microsoft.com/office/drawing/2014/main" xmlns="">
                 <a:solidFill>
                   <a:srgbClr val="FFFFFF"/>
                 </a:solidFill>
@@ -35859,7 +35859,7 @@
           <a:noFill/>
           <a:extLst>
             <a:ext uri="{909E8E84-426E-40dd-AFC4-6F175D3DCCD1}">
-              <a14:hiddenFill xmlns="" xmlns:a16="http://schemas.microsoft.com/office/drawing/2014/main" xmlns:p14="http://schemas.microsoft.com/office/powerpoint/2010/main" xmlns:a14="http://schemas.microsoft.com/office/drawing/2010/main">
+              <a14:hiddenFill xmlns:a14="http://schemas.microsoft.com/office/drawing/2010/main" xmlns:p14="http://schemas.microsoft.com/office/powerpoint/2010/main" xmlns:a16="http://schemas.microsoft.com/office/drawing/2014/main" xmlns="">
                 <a:solidFill>
                   <a:srgbClr val="FFFFFF"/>
                 </a:solidFill>
@@ -36050,7 +36050,7 @@
             </a:ln>
             <a:extLst>
               <a:ext uri="{91240B29-F687-4f45-9708-019B960494DF}">
-                <a14:hiddenLine xmlns="" xmlns:a16="http://schemas.microsoft.com/office/drawing/2014/main" xmlns:p14="http://schemas.microsoft.com/office/powerpoint/2010/main" xmlns:a14="http://schemas.microsoft.com/office/drawing/2010/main" w="9525">
+                <a14:hiddenLine xmlns:a14="http://schemas.microsoft.com/office/drawing/2010/main" xmlns:p14="http://schemas.microsoft.com/office/powerpoint/2010/main" xmlns:a16="http://schemas.microsoft.com/office/drawing/2014/main" xmlns="" w="9525">
                   <a:solidFill>
                     <a:srgbClr val="000000"/>
                   </a:solidFill>
@@ -36155,7 +36155,7 @@
             </a:ln>
             <a:extLst>
               <a:ext uri="{91240B29-F687-4f45-9708-019B960494DF}">
-                <a14:hiddenLine xmlns="" xmlns:a16="http://schemas.microsoft.com/office/drawing/2014/main" xmlns:p14="http://schemas.microsoft.com/office/powerpoint/2010/main" xmlns:a14="http://schemas.microsoft.com/office/drawing/2010/main" w="9525">
+                <a14:hiddenLine xmlns:a14="http://schemas.microsoft.com/office/drawing/2010/main" xmlns:p14="http://schemas.microsoft.com/office/powerpoint/2010/main" xmlns:a16="http://schemas.microsoft.com/office/drawing/2014/main" xmlns="" w="9525">
                   <a:solidFill>
                     <a:srgbClr val="000000"/>
                   </a:solidFill>
@@ -36260,7 +36260,7 @@
             </a:ln>
             <a:extLst>
               <a:ext uri="{91240B29-F687-4f45-9708-019B960494DF}">
-                <a14:hiddenLine xmlns="" xmlns:a16="http://schemas.microsoft.com/office/drawing/2014/main" xmlns:p14="http://schemas.microsoft.com/office/powerpoint/2010/main" xmlns:a14="http://schemas.microsoft.com/office/drawing/2010/main" w="9525">
+                <a14:hiddenLine xmlns:a14="http://schemas.microsoft.com/office/drawing/2010/main" xmlns:p14="http://schemas.microsoft.com/office/powerpoint/2010/main" xmlns:a16="http://schemas.microsoft.com/office/drawing/2014/main" xmlns="" w="9525">
                   <a:solidFill>
                     <a:srgbClr val="000000"/>
                   </a:solidFill>
@@ -36337,7 +36337,7 @@
             </a:ln>
             <a:extLst>
               <a:ext uri="{91240B29-F687-4f45-9708-019B960494DF}">
-                <a14:hiddenLine xmlns="" xmlns:a16="http://schemas.microsoft.com/office/drawing/2014/main" xmlns:p14="http://schemas.microsoft.com/office/powerpoint/2010/main" xmlns:a14="http://schemas.microsoft.com/office/drawing/2010/main" w="9525">
+                <a14:hiddenLine xmlns:a14="http://schemas.microsoft.com/office/drawing/2010/main" xmlns:p14="http://schemas.microsoft.com/office/powerpoint/2010/main" xmlns:a16="http://schemas.microsoft.com/office/drawing/2014/main" xmlns="" w="9525">
                   <a:solidFill>
                     <a:srgbClr val="000000"/>
                   </a:solidFill>
@@ -36442,7 +36442,7 @@
             </a:ln>
             <a:extLst>
               <a:ext uri="{91240B29-F687-4f45-9708-019B960494DF}">
-                <a14:hiddenLine xmlns="" xmlns:a16="http://schemas.microsoft.com/office/drawing/2014/main" xmlns:p14="http://schemas.microsoft.com/office/powerpoint/2010/main" xmlns:a14="http://schemas.microsoft.com/office/drawing/2010/main" w="9525">
+                <a14:hiddenLine xmlns:a14="http://schemas.microsoft.com/office/drawing/2010/main" xmlns:p14="http://schemas.microsoft.com/office/powerpoint/2010/main" xmlns:a16="http://schemas.microsoft.com/office/drawing/2014/main" xmlns="" w="9525">
                   <a:solidFill>
                     <a:srgbClr val="000000"/>
                   </a:solidFill>
@@ -36519,7 +36519,7 @@
             </a:ln>
             <a:extLst>
               <a:ext uri="{91240B29-F687-4f45-9708-019B960494DF}">
-                <a14:hiddenLine xmlns="" xmlns:a16="http://schemas.microsoft.com/office/drawing/2014/main" xmlns:p14="http://schemas.microsoft.com/office/powerpoint/2010/main" xmlns:a14="http://schemas.microsoft.com/office/drawing/2010/main" w="9525">
+                <a14:hiddenLine xmlns:a14="http://schemas.microsoft.com/office/drawing/2010/main" xmlns:p14="http://schemas.microsoft.com/office/powerpoint/2010/main" xmlns:a16="http://schemas.microsoft.com/office/drawing/2014/main" xmlns="" w="9525">
                   <a:solidFill>
                     <a:srgbClr val="000000"/>
                   </a:solidFill>
@@ -36596,7 +36596,7 @@
             </a:ln>
             <a:extLst>
               <a:ext uri="{91240B29-F687-4f45-9708-019B960494DF}">
-                <a14:hiddenLine xmlns="" xmlns:a16="http://schemas.microsoft.com/office/drawing/2014/main" xmlns:p14="http://schemas.microsoft.com/office/powerpoint/2010/main" xmlns:a14="http://schemas.microsoft.com/office/drawing/2010/main" w="9525">
+                <a14:hiddenLine xmlns:a14="http://schemas.microsoft.com/office/drawing/2010/main" xmlns:p14="http://schemas.microsoft.com/office/powerpoint/2010/main" xmlns:a16="http://schemas.microsoft.com/office/drawing/2014/main" xmlns="" w="9525">
                   <a:solidFill>
                     <a:srgbClr val="000000"/>
                   </a:solidFill>
@@ -36701,7 +36701,7 @@
             </a:ln>
             <a:extLst>
               <a:ext uri="{91240B29-F687-4f45-9708-019B960494DF}">
-                <a14:hiddenLine xmlns="" xmlns:a16="http://schemas.microsoft.com/office/drawing/2014/main" xmlns:p14="http://schemas.microsoft.com/office/powerpoint/2010/main" xmlns:a14="http://schemas.microsoft.com/office/drawing/2010/main" w="9525">
+                <a14:hiddenLine xmlns:a14="http://schemas.microsoft.com/office/drawing/2010/main" xmlns:p14="http://schemas.microsoft.com/office/powerpoint/2010/main" xmlns:a16="http://schemas.microsoft.com/office/drawing/2014/main" xmlns="" w="9525">
                   <a:solidFill>
                     <a:srgbClr val="000000"/>
                   </a:solidFill>
@@ -36806,7 +36806,7 @@
             </a:ln>
             <a:extLst>
               <a:ext uri="{91240B29-F687-4f45-9708-019B960494DF}">
-                <a14:hiddenLine xmlns="" xmlns:a16="http://schemas.microsoft.com/office/drawing/2014/main" xmlns:p14="http://schemas.microsoft.com/office/powerpoint/2010/main" xmlns:a14="http://schemas.microsoft.com/office/drawing/2010/main" w="9525">
+                <a14:hiddenLine xmlns:a14="http://schemas.microsoft.com/office/drawing/2010/main" xmlns:p14="http://schemas.microsoft.com/office/powerpoint/2010/main" xmlns:a16="http://schemas.microsoft.com/office/drawing/2014/main" xmlns="" w="9525">
                   <a:solidFill>
                     <a:srgbClr val="000000"/>
                   </a:solidFill>
@@ -36883,7 +36883,7 @@
             </a:ln>
             <a:extLst>
               <a:ext uri="{91240B29-F687-4f45-9708-019B960494DF}">
-                <a14:hiddenLine xmlns="" xmlns:a16="http://schemas.microsoft.com/office/drawing/2014/main" xmlns:p14="http://schemas.microsoft.com/office/powerpoint/2010/main" xmlns:a14="http://schemas.microsoft.com/office/drawing/2010/main" w="9525">
+                <a14:hiddenLine xmlns:a14="http://schemas.microsoft.com/office/drawing/2010/main" xmlns:p14="http://schemas.microsoft.com/office/powerpoint/2010/main" xmlns:a16="http://schemas.microsoft.com/office/drawing/2014/main" xmlns="" w="9525">
                   <a:solidFill>
                     <a:srgbClr val="000000"/>
                   </a:solidFill>
@@ -37008,7 +37008,7 @@
             </a:ln>
             <a:extLst>
               <a:ext uri="{91240B29-F687-4f45-9708-019B960494DF}">
-                <a14:hiddenLine xmlns="" xmlns:a16="http://schemas.microsoft.com/office/drawing/2014/main" xmlns:p14="http://schemas.microsoft.com/office/powerpoint/2010/main" xmlns:a14="http://schemas.microsoft.com/office/drawing/2010/main" w="9525">
+                <a14:hiddenLine xmlns:a14="http://schemas.microsoft.com/office/drawing/2010/main" xmlns:p14="http://schemas.microsoft.com/office/powerpoint/2010/main" xmlns:a16="http://schemas.microsoft.com/office/drawing/2014/main" xmlns="" w="9525">
                   <a:solidFill>
                     <a:srgbClr val="000000"/>
                   </a:solidFill>
@@ -37122,7 +37122,7 @@
             </a:ln>
             <a:extLst>
               <a:ext uri="{91240B29-F687-4f45-9708-019B960494DF}">
-                <a14:hiddenLine xmlns="" xmlns:a16="http://schemas.microsoft.com/office/drawing/2014/main" xmlns:p14="http://schemas.microsoft.com/office/powerpoint/2010/main" xmlns:a14="http://schemas.microsoft.com/office/drawing/2010/main" w="9525">
+                <a14:hiddenLine xmlns:a14="http://schemas.microsoft.com/office/drawing/2010/main" xmlns:p14="http://schemas.microsoft.com/office/powerpoint/2010/main" xmlns:a16="http://schemas.microsoft.com/office/drawing/2014/main" xmlns="" w="9525">
                   <a:solidFill>
                     <a:srgbClr val="000000"/>
                   </a:solidFill>
@@ -37199,7 +37199,7 @@
             </a:ln>
             <a:extLst>
               <a:ext uri="{91240B29-F687-4f45-9708-019B960494DF}">
-                <a14:hiddenLine xmlns="" xmlns:a16="http://schemas.microsoft.com/office/drawing/2014/main" xmlns:p14="http://schemas.microsoft.com/office/powerpoint/2010/main" xmlns:a14="http://schemas.microsoft.com/office/drawing/2010/main" w="9525">
+                <a14:hiddenLine xmlns:a14="http://schemas.microsoft.com/office/drawing/2010/main" xmlns:p14="http://schemas.microsoft.com/office/powerpoint/2010/main" xmlns:a16="http://schemas.microsoft.com/office/drawing/2014/main" xmlns="" w="9525">
                   <a:solidFill>
                     <a:srgbClr val="000000"/>
                   </a:solidFill>
@@ -37276,7 +37276,7 @@
             </a:ln>
             <a:extLst>
               <a:ext uri="{91240B29-F687-4f45-9708-019B960494DF}">
-                <a14:hiddenLine xmlns="" xmlns:a16="http://schemas.microsoft.com/office/drawing/2014/main" xmlns:p14="http://schemas.microsoft.com/office/powerpoint/2010/main" xmlns:a14="http://schemas.microsoft.com/office/drawing/2010/main" w="9525">
+                <a14:hiddenLine xmlns:a14="http://schemas.microsoft.com/office/drawing/2010/main" xmlns:p14="http://schemas.microsoft.com/office/powerpoint/2010/main" xmlns:a16="http://schemas.microsoft.com/office/drawing/2014/main" xmlns="" w="9525">
                   <a:solidFill>
                     <a:srgbClr val="000000"/>
                   </a:solidFill>
@@ -37381,7 +37381,7 @@
             </a:ln>
             <a:extLst>
               <a:ext uri="{91240B29-F687-4f45-9708-019B960494DF}">
-                <a14:hiddenLine xmlns="" xmlns:a16="http://schemas.microsoft.com/office/drawing/2014/main" xmlns:p14="http://schemas.microsoft.com/office/powerpoint/2010/main" xmlns:a14="http://schemas.microsoft.com/office/drawing/2010/main" w="9525">
+                <a14:hiddenLine xmlns:a14="http://schemas.microsoft.com/office/drawing/2010/main" xmlns:p14="http://schemas.microsoft.com/office/powerpoint/2010/main" xmlns:a16="http://schemas.microsoft.com/office/drawing/2014/main" xmlns="" w="9525">
                   <a:solidFill>
                     <a:srgbClr val="000000"/>
                   </a:solidFill>
@@ -37430,7 +37430,7 @@
             </a:ln>
             <a:extLst>
               <a:ext uri="{91240B29-F687-4f45-9708-019B960494DF}">
-                <a14:hiddenLine xmlns="" xmlns:a16="http://schemas.microsoft.com/office/drawing/2014/main" xmlns:p14="http://schemas.microsoft.com/office/powerpoint/2010/main" xmlns:a14="http://schemas.microsoft.com/office/drawing/2010/main" w="9525">
+                <a14:hiddenLine xmlns:a14="http://schemas.microsoft.com/office/drawing/2010/main" xmlns:p14="http://schemas.microsoft.com/office/powerpoint/2010/main" xmlns:a16="http://schemas.microsoft.com/office/drawing/2014/main" xmlns="" w="9525">
                   <a:solidFill>
                     <a:srgbClr val="000000"/>
                   </a:solidFill>
@@ -37510,7 +37510,7 @@
             </a:ln>
             <a:extLst>
               <a:ext uri="{91240B29-F687-4f45-9708-019B960494DF}">
-                <a14:hiddenLine xmlns="" xmlns:a16="http://schemas.microsoft.com/office/drawing/2014/main" xmlns:p14="http://schemas.microsoft.com/office/powerpoint/2010/main" xmlns:a14="http://schemas.microsoft.com/office/drawing/2010/main" w="9525">
+                <a14:hiddenLine xmlns:a14="http://schemas.microsoft.com/office/drawing/2010/main" xmlns:p14="http://schemas.microsoft.com/office/powerpoint/2010/main" xmlns:a16="http://schemas.microsoft.com/office/drawing/2014/main" xmlns="" w="9525">
                   <a:solidFill>
                     <a:srgbClr val="000000"/>
                   </a:solidFill>
@@ -37615,7 +37615,7 @@
             </a:ln>
             <a:extLst>
               <a:ext uri="{91240B29-F687-4f45-9708-019B960494DF}">
-                <a14:hiddenLine xmlns="" xmlns:a16="http://schemas.microsoft.com/office/drawing/2014/main" xmlns:p14="http://schemas.microsoft.com/office/powerpoint/2010/main" xmlns:a14="http://schemas.microsoft.com/office/drawing/2010/main" w="9525">
+                <a14:hiddenLine xmlns:a14="http://schemas.microsoft.com/office/drawing/2010/main" xmlns:p14="http://schemas.microsoft.com/office/powerpoint/2010/main" xmlns:a16="http://schemas.microsoft.com/office/drawing/2014/main" xmlns="" w="9525">
                   <a:solidFill>
                     <a:srgbClr val="000000"/>
                   </a:solidFill>
@@ -37692,7 +37692,7 @@
             </a:ln>
             <a:extLst>
               <a:ext uri="{91240B29-F687-4f45-9708-019B960494DF}">
-                <a14:hiddenLine xmlns="" xmlns:a16="http://schemas.microsoft.com/office/drawing/2014/main" xmlns:p14="http://schemas.microsoft.com/office/powerpoint/2010/main" xmlns:a14="http://schemas.microsoft.com/office/drawing/2010/main" w="9525">
+                <a14:hiddenLine xmlns:a14="http://schemas.microsoft.com/office/drawing/2010/main" xmlns:p14="http://schemas.microsoft.com/office/powerpoint/2010/main" xmlns:a16="http://schemas.microsoft.com/office/drawing/2014/main" xmlns="" w="9525">
                   <a:solidFill>
                     <a:srgbClr val="000000"/>
                   </a:solidFill>
@@ -37797,7 +37797,7 @@
             </a:ln>
             <a:extLst>
               <a:ext uri="{91240B29-F687-4f45-9708-019B960494DF}">
-                <a14:hiddenLine xmlns="" xmlns:a16="http://schemas.microsoft.com/office/drawing/2014/main" xmlns:p14="http://schemas.microsoft.com/office/powerpoint/2010/main" xmlns:a14="http://schemas.microsoft.com/office/drawing/2010/main" w="9525">
+                <a14:hiddenLine xmlns:a14="http://schemas.microsoft.com/office/drawing/2010/main" xmlns:p14="http://schemas.microsoft.com/office/powerpoint/2010/main" xmlns:a16="http://schemas.microsoft.com/office/drawing/2014/main" xmlns="" w="9525">
                   <a:solidFill>
                     <a:srgbClr val="000000"/>
                   </a:solidFill>
@@ -37877,7 +37877,7 @@
             </a:ln>
             <a:extLst>
               <a:ext uri="{91240B29-F687-4f45-9708-019B960494DF}">
-                <a14:hiddenLine xmlns="" xmlns:a16="http://schemas.microsoft.com/office/drawing/2014/main" xmlns:p14="http://schemas.microsoft.com/office/powerpoint/2010/main" xmlns:a14="http://schemas.microsoft.com/office/drawing/2010/main" w="9525">
+                <a14:hiddenLine xmlns:a14="http://schemas.microsoft.com/office/drawing/2010/main" xmlns:p14="http://schemas.microsoft.com/office/powerpoint/2010/main" xmlns:a16="http://schemas.microsoft.com/office/drawing/2014/main" xmlns="" w="9525">
                   <a:solidFill>
                     <a:srgbClr val="000000"/>
                   </a:solidFill>
@@ -37954,7 +37954,7 @@
             </a:ln>
             <a:extLst>
               <a:ext uri="{91240B29-F687-4f45-9708-019B960494DF}">
-                <a14:hiddenLine xmlns="" xmlns:a16="http://schemas.microsoft.com/office/drawing/2014/main" xmlns:p14="http://schemas.microsoft.com/office/powerpoint/2010/main" xmlns:a14="http://schemas.microsoft.com/office/drawing/2010/main" w="9525">
+                <a14:hiddenLine xmlns:a14="http://schemas.microsoft.com/office/drawing/2010/main" xmlns:p14="http://schemas.microsoft.com/office/powerpoint/2010/main" xmlns:a16="http://schemas.microsoft.com/office/drawing/2014/main" xmlns="" w="9525">
                   <a:solidFill>
                     <a:srgbClr val="000000"/>
                   </a:solidFill>
@@ -38059,7 +38059,7 @@
             </a:ln>
             <a:extLst>
               <a:ext uri="{91240B29-F687-4f45-9708-019B960494DF}">
-                <a14:hiddenLine xmlns="" xmlns:a16="http://schemas.microsoft.com/office/drawing/2014/main" xmlns:p14="http://schemas.microsoft.com/office/powerpoint/2010/main" xmlns:a14="http://schemas.microsoft.com/office/drawing/2010/main" w="9525">
+                <a14:hiddenLine xmlns:a14="http://schemas.microsoft.com/office/drawing/2010/main" xmlns:p14="http://schemas.microsoft.com/office/powerpoint/2010/main" xmlns:a16="http://schemas.microsoft.com/office/drawing/2014/main" xmlns="" w="9525">
                   <a:solidFill>
                     <a:srgbClr val="000000"/>
                   </a:solidFill>
@@ -38164,7 +38164,7 @@
             </a:ln>
             <a:extLst>
               <a:ext uri="{91240B29-F687-4f45-9708-019B960494DF}">
-                <a14:hiddenLine xmlns="" xmlns:a16="http://schemas.microsoft.com/office/drawing/2014/main" xmlns:p14="http://schemas.microsoft.com/office/powerpoint/2010/main" xmlns:a14="http://schemas.microsoft.com/office/drawing/2010/main" w="9525">
+                <a14:hiddenLine xmlns:a14="http://schemas.microsoft.com/office/drawing/2010/main" xmlns:p14="http://schemas.microsoft.com/office/powerpoint/2010/main" xmlns:a16="http://schemas.microsoft.com/office/drawing/2014/main" xmlns="" w="9525">
                   <a:solidFill>
                     <a:srgbClr val="000000"/>
                   </a:solidFill>
@@ -38244,7 +38244,7 @@
             </a:ln>
             <a:extLst>
               <a:ext uri="{91240B29-F687-4f45-9708-019B960494DF}">
-                <a14:hiddenLine xmlns="" xmlns:a16="http://schemas.microsoft.com/office/drawing/2014/main" xmlns:p14="http://schemas.microsoft.com/office/powerpoint/2010/main" xmlns:a14="http://schemas.microsoft.com/office/drawing/2010/main" w="9525">
+                <a14:hiddenLine xmlns:a14="http://schemas.microsoft.com/office/drawing/2010/main" xmlns:p14="http://schemas.microsoft.com/office/powerpoint/2010/main" xmlns:a16="http://schemas.microsoft.com/office/drawing/2014/main" xmlns="" w="9525">
                   <a:solidFill>
                     <a:srgbClr val="000000"/>
                   </a:solidFill>
@@ -38379,7 +38379,7 @@
             </a:ln>
             <a:extLst>
               <a:ext uri="{91240B29-F687-4f45-9708-019B960494DF}">
-                <a14:hiddenLine xmlns="" xmlns:a16="http://schemas.microsoft.com/office/drawing/2014/main" xmlns:p14="http://schemas.microsoft.com/office/powerpoint/2010/main" xmlns:a14="http://schemas.microsoft.com/office/drawing/2010/main" w="9525">
+                <a14:hiddenLine xmlns:a14="http://schemas.microsoft.com/office/drawing/2010/main" xmlns:p14="http://schemas.microsoft.com/office/powerpoint/2010/main" xmlns:a16="http://schemas.microsoft.com/office/drawing/2014/main" xmlns="" w="9525">
                   <a:solidFill>
                     <a:srgbClr val="000000"/>
                   </a:solidFill>
@@ -38394,7 +38394,7 @@
       </p:grpSp>
       <p:pic>
         <p:nvPicPr>
-          <p:cNvPr id="6" name="Content Placeholder 5" descr="A screenshot of a cell phone&#13;&#10;&#13;&#10;Description automatically generated">
+          <p:cNvPr id="6" name="Content Placeholder 5" descr="A screenshot of a cell phone&#10;&#10;Description automatically generated">
             <a:extLst>
               <a:ext uri="{FF2B5EF4-FFF2-40B4-BE49-F238E27FC236}">
                 <a16:creationId xmlns:a16="http://schemas.microsoft.com/office/drawing/2014/main" id="{0D01F4DD-1176-F940-95F8-E41DC4C17D87}"/>
@@ -38426,7 +38426,7 @@
       </p:pic>
       <p:pic>
         <p:nvPicPr>
-          <p:cNvPr id="8" name="Picture 7" descr="A screenshot of a social media post&#13;&#10;&#13;&#10;Description automatically generated">
+          <p:cNvPr id="8" name="Picture 7" descr="A screenshot of a social media post&#10;&#10;Description automatically generated">
             <a:extLst>
               <a:ext uri="{FF2B5EF4-FFF2-40B4-BE49-F238E27FC236}">
                 <a16:creationId xmlns:a16="http://schemas.microsoft.com/office/drawing/2014/main" id="{27324692-820E-D64F-B61F-B7D332AE09E4}"/>
@@ -38540,7 +38540,7 @@
           <a:noFill/>
           <a:extLst>
             <a:ext uri="{909E8E84-426E-40dd-AFC4-6F175D3DCCD1}">
-              <a14:hiddenFill xmlns="" xmlns:a16="http://schemas.microsoft.com/office/drawing/2014/main" xmlns:p14="http://schemas.microsoft.com/office/powerpoint/2010/main" xmlns:a14="http://schemas.microsoft.com/office/drawing/2010/main">
+              <a14:hiddenFill xmlns:a14="http://schemas.microsoft.com/office/drawing/2010/main" xmlns:p14="http://schemas.microsoft.com/office/powerpoint/2010/main" xmlns:a16="http://schemas.microsoft.com/office/drawing/2014/main" xmlns="">
                 <a:solidFill>
                   <a:srgbClr val="FFFFFF"/>
                 </a:solidFill>
@@ -38661,7 +38661,7 @@
               </a:ln>
               <a:extLst>
                 <a:ext uri="{91240B29-F687-4f45-9708-019B960494DF}">
-                  <a14:hiddenLine xmlns="" xmlns:a16="http://schemas.microsoft.com/office/drawing/2014/main" xmlns:p14="http://schemas.microsoft.com/office/powerpoint/2010/main" xmlns:a14="http://schemas.microsoft.com/office/drawing/2010/main" w="9525">
+                  <a14:hiddenLine xmlns:a14="http://schemas.microsoft.com/office/drawing/2010/main" xmlns:p14="http://schemas.microsoft.com/office/powerpoint/2010/main" xmlns:a16="http://schemas.microsoft.com/office/drawing/2014/main" xmlns="" w="9525">
                     <a:solidFill>
                       <a:srgbClr val="000000"/>
                     </a:solidFill>
@@ -38766,7 +38766,7 @@
               </a:ln>
               <a:extLst>
                 <a:ext uri="{91240B29-F687-4f45-9708-019B960494DF}">
-                  <a14:hiddenLine xmlns="" xmlns:a16="http://schemas.microsoft.com/office/drawing/2014/main" xmlns:p14="http://schemas.microsoft.com/office/powerpoint/2010/main" xmlns:a14="http://schemas.microsoft.com/office/drawing/2010/main" w="9525">
+                  <a14:hiddenLine xmlns:a14="http://schemas.microsoft.com/office/drawing/2010/main" xmlns:p14="http://schemas.microsoft.com/office/powerpoint/2010/main" xmlns:a16="http://schemas.microsoft.com/office/drawing/2014/main" xmlns="" w="9525">
                     <a:solidFill>
                       <a:srgbClr val="000000"/>
                     </a:solidFill>
@@ -38871,7 +38871,7 @@
               </a:ln>
               <a:extLst>
                 <a:ext uri="{91240B29-F687-4f45-9708-019B960494DF}">
-                  <a14:hiddenLine xmlns="" xmlns:a16="http://schemas.microsoft.com/office/drawing/2014/main" xmlns:p14="http://schemas.microsoft.com/office/powerpoint/2010/main" xmlns:a14="http://schemas.microsoft.com/office/drawing/2010/main" w="9525">
+                  <a14:hiddenLine xmlns:a14="http://schemas.microsoft.com/office/drawing/2010/main" xmlns:p14="http://schemas.microsoft.com/office/powerpoint/2010/main" xmlns:a16="http://schemas.microsoft.com/office/drawing/2014/main" xmlns="" w="9525">
                     <a:solidFill>
                       <a:srgbClr val="000000"/>
                     </a:solidFill>
@@ -38948,7 +38948,7 @@
               </a:ln>
               <a:extLst>
                 <a:ext uri="{91240B29-F687-4f45-9708-019B960494DF}">
-                  <a14:hiddenLine xmlns="" xmlns:a16="http://schemas.microsoft.com/office/drawing/2014/main" xmlns:p14="http://schemas.microsoft.com/office/powerpoint/2010/main" xmlns:a14="http://schemas.microsoft.com/office/drawing/2010/main" w="9525">
+                  <a14:hiddenLine xmlns:a14="http://schemas.microsoft.com/office/drawing/2010/main" xmlns:p14="http://schemas.microsoft.com/office/powerpoint/2010/main" xmlns:a16="http://schemas.microsoft.com/office/drawing/2014/main" xmlns="" w="9525">
                     <a:solidFill>
                       <a:srgbClr val="000000"/>
                     </a:solidFill>
@@ -39053,7 +39053,7 @@
               </a:ln>
               <a:extLst>
                 <a:ext uri="{91240B29-F687-4f45-9708-019B960494DF}">
-                  <a14:hiddenLine xmlns="" xmlns:a16="http://schemas.microsoft.com/office/drawing/2014/main" xmlns:p14="http://schemas.microsoft.com/office/powerpoint/2010/main" xmlns:a14="http://schemas.microsoft.com/office/drawing/2010/main" w="9525">
+                  <a14:hiddenLine xmlns:a14="http://schemas.microsoft.com/office/drawing/2010/main" xmlns:p14="http://schemas.microsoft.com/office/powerpoint/2010/main" xmlns:a16="http://schemas.microsoft.com/office/drawing/2014/main" xmlns="" w="9525">
                     <a:solidFill>
                       <a:srgbClr val="000000"/>
                     </a:solidFill>
@@ -39130,7 +39130,7 @@
               </a:ln>
               <a:extLst>
                 <a:ext uri="{91240B29-F687-4f45-9708-019B960494DF}">
-                  <a14:hiddenLine xmlns="" xmlns:a16="http://schemas.microsoft.com/office/drawing/2014/main" xmlns:p14="http://schemas.microsoft.com/office/powerpoint/2010/main" xmlns:a14="http://schemas.microsoft.com/office/drawing/2010/main" w="9525">
+                  <a14:hiddenLine xmlns:a14="http://schemas.microsoft.com/office/drawing/2010/main" xmlns:p14="http://schemas.microsoft.com/office/powerpoint/2010/main" xmlns:a16="http://schemas.microsoft.com/office/drawing/2014/main" xmlns="" w="9525">
                     <a:solidFill>
                       <a:srgbClr val="000000"/>
                     </a:solidFill>
@@ -39207,7 +39207,7 @@
               </a:ln>
               <a:extLst>
                 <a:ext uri="{91240B29-F687-4f45-9708-019B960494DF}">
-                  <a14:hiddenLine xmlns="" xmlns:a16="http://schemas.microsoft.com/office/drawing/2014/main" xmlns:p14="http://schemas.microsoft.com/office/powerpoint/2010/main" xmlns:a14="http://schemas.microsoft.com/office/drawing/2010/main" w="9525">
+                  <a14:hiddenLine xmlns:a14="http://schemas.microsoft.com/office/drawing/2010/main" xmlns:p14="http://schemas.microsoft.com/office/powerpoint/2010/main" xmlns:a16="http://schemas.microsoft.com/office/drawing/2014/main" xmlns="" w="9525">
                     <a:solidFill>
                       <a:srgbClr val="000000"/>
                     </a:solidFill>
@@ -39312,7 +39312,7 @@
               </a:ln>
               <a:extLst>
                 <a:ext uri="{91240B29-F687-4f45-9708-019B960494DF}">
-                  <a14:hiddenLine xmlns="" xmlns:a16="http://schemas.microsoft.com/office/drawing/2014/main" xmlns:p14="http://schemas.microsoft.com/office/powerpoint/2010/main" xmlns:a14="http://schemas.microsoft.com/office/drawing/2010/main" w="9525">
+                  <a14:hiddenLine xmlns:a14="http://schemas.microsoft.com/office/drawing/2010/main" xmlns:p14="http://schemas.microsoft.com/office/powerpoint/2010/main" xmlns:a16="http://schemas.microsoft.com/office/drawing/2014/main" xmlns="" w="9525">
                     <a:solidFill>
                       <a:srgbClr val="000000"/>
                     </a:solidFill>
@@ -39417,7 +39417,7 @@
               </a:ln>
               <a:extLst>
                 <a:ext uri="{91240B29-F687-4f45-9708-019B960494DF}">
-                  <a14:hiddenLine xmlns="" xmlns:a16="http://schemas.microsoft.com/office/drawing/2014/main" xmlns:p14="http://schemas.microsoft.com/office/powerpoint/2010/main" xmlns:a14="http://schemas.microsoft.com/office/drawing/2010/main" w="9525">
+                  <a14:hiddenLine xmlns:a14="http://schemas.microsoft.com/office/drawing/2010/main" xmlns:p14="http://schemas.microsoft.com/office/powerpoint/2010/main" xmlns:a16="http://schemas.microsoft.com/office/drawing/2014/main" xmlns="" w="9525">
                     <a:solidFill>
                       <a:srgbClr val="000000"/>
                     </a:solidFill>
@@ -39494,7 +39494,7 @@
               </a:ln>
               <a:extLst>
                 <a:ext uri="{91240B29-F687-4f45-9708-019B960494DF}">
-                  <a14:hiddenLine xmlns="" xmlns:a16="http://schemas.microsoft.com/office/drawing/2014/main" xmlns:p14="http://schemas.microsoft.com/office/powerpoint/2010/main" xmlns:a14="http://schemas.microsoft.com/office/drawing/2010/main" w="9525">
+                  <a14:hiddenLine xmlns:a14="http://schemas.microsoft.com/office/drawing/2010/main" xmlns:p14="http://schemas.microsoft.com/office/powerpoint/2010/main" xmlns:a16="http://schemas.microsoft.com/office/drawing/2014/main" xmlns="" w="9525">
                     <a:solidFill>
                       <a:srgbClr val="000000"/>
                     </a:solidFill>
@@ -39619,7 +39619,7 @@
               </a:ln>
               <a:extLst>
                 <a:ext uri="{91240B29-F687-4f45-9708-019B960494DF}">
-                  <a14:hiddenLine xmlns="" xmlns:a16="http://schemas.microsoft.com/office/drawing/2014/main" xmlns:p14="http://schemas.microsoft.com/office/powerpoint/2010/main" xmlns:a14="http://schemas.microsoft.com/office/drawing/2010/main" w="9525">
+                  <a14:hiddenLine xmlns:a14="http://schemas.microsoft.com/office/drawing/2010/main" xmlns:p14="http://schemas.microsoft.com/office/powerpoint/2010/main" xmlns:a16="http://schemas.microsoft.com/office/drawing/2014/main" xmlns="" w="9525">
                     <a:solidFill>
                       <a:srgbClr val="000000"/>
                     </a:solidFill>
@@ -39733,7 +39733,7 @@
               </a:ln>
               <a:extLst>
                 <a:ext uri="{91240B29-F687-4f45-9708-019B960494DF}">
-                  <a14:hiddenLine xmlns="" xmlns:a16="http://schemas.microsoft.com/office/drawing/2014/main" xmlns:p14="http://schemas.microsoft.com/office/powerpoint/2010/main" xmlns:a14="http://schemas.microsoft.com/office/drawing/2010/main" w="9525">
+                  <a14:hiddenLine xmlns:a14="http://schemas.microsoft.com/office/drawing/2010/main" xmlns:p14="http://schemas.microsoft.com/office/powerpoint/2010/main" xmlns:a16="http://schemas.microsoft.com/office/drawing/2014/main" xmlns="" w="9525">
                     <a:solidFill>
                       <a:srgbClr val="000000"/>
                     </a:solidFill>
@@ -39810,7 +39810,7 @@
               </a:ln>
               <a:extLst>
                 <a:ext uri="{91240B29-F687-4f45-9708-019B960494DF}">
-                  <a14:hiddenLine xmlns="" xmlns:a16="http://schemas.microsoft.com/office/drawing/2014/main" xmlns:p14="http://schemas.microsoft.com/office/powerpoint/2010/main" xmlns:a14="http://schemas.microsoft.com/office/drawing/2010/main" w="9525">
+                  <a14:hiddenLine xmlns:a14="http://schemas.microsoft.com/office/drawing/2010/main" xmlns:p14="http://schemas.microsoft.com/office/powerpoint/2010/main" xmlns:a16="http://schemas.microsoft.com/office/drawing/2014/main" xmlns="" w="9525">
                     <a:solidFill>
                       <a:srgbClr val="000000"/>
                     </a:solidFill>
@@ -39887,7 +39887,7 @@
               </a:ln>
               <a:extLst>
                 <a:ext uri="{91240B29-F687-4f45-9708-019B960494DF}">
-                  <a14:hiddenLine xmlns="" xmlns:a16="http://schemas.microsoft.com/office/drawing/2014/main" xmlns:p14="http://schemas.microsoft.com/office/powerpoint/2010/main" xmlns:a14="http://schemas.microsoft.com/office/drawing/2010/main" w="9525">
+                  <a14:hiddenLine xmlns:a14="http://schemas.microsoft.com/office/drawing/2010/main" xmlns:p14="http://schemas.microsoft.com/office/powerpoint/2010/main" xmlns:a16="http://schemas.microsoft.com/office/drawing/2014/main" xmlns="" w="9525">
                     <a:solidFill>
                       <a:srgbClr val="000000"/>
                     </a:solidFill>
@@ -39992,7 +39992,7 @@
               </a:ln>
               <a:extLst>
                 <a:ext uri="{91240B29-F687-4f45-9708-019B960494DF}">
-                  <a14:hiddenLine xmlns="" xmlns:a16="http://schemas.microsoft.com/office/drawing/2014/main" xmlns:p14="http://schemas.microsoft.com/office/powerpoint/2010/main" xmlns:a14="http://schemas.microsoft.com/office/drawing/2010/main" w="9525">
+                  <a14:hiddenLine xmlns:a14="http://schemas.microsoft.com/office/drawing/2010/main" xmlns:p14="http://schemas.microsoft.com/office/powerpoint/2010/main" xmlns:a16="http://schemas.microsoft.com/office/drawing/2014/main" xmlns="" w="9525">
                     <a:solidFill>
                       <a:srgbClr val="000000"/>
                     </a:solidFill>
@@ -40041,7 +40041,7 @@
               </a:ln>
               <a:extLst>
                 <a:ext uri="{91240B29-F687-4f45-9708-019B960494DF}">
-                  <a14:hiddenLine xmlns="" xmlns:a16="http://schemas.microsoft.com/office/drawing/2014/main" xmlns:p14="http://schemas.microsoft.com/office/powerpoint/2010/main" xmlns:a14="http://schemas.microsoft.com/office/drawing/2010/main" w="9525">
+                  <a14:hiddenLine xmlns:a14="http://schemas.microsoft.com/office/drawing/2010/main" xmlns:p14="http://schemas.microsoft.com/office/powerpoint/2010/main" xmlns:a16="http://schemas.microsoft.com/office/drawing/2014/main" xmlns="" w="9525">
                     <a:solidFill>
                       <a:srgbClr val="000000"/>
                     </a:solidFill>
@@ -40121,7 +40121,7 @@
               </a:ln>
               <a:extLst>
                 <a:ext uri="{91240B29-F687-4f45-9708-019B960494DF}">
-                  <a14:hiddenLine xmlns="" xmlns:a16="http://schemas.microsoft.com/office/drawing/2014/main" xmlns:p14="http://schemas.microsoft.com/office/powerpoint/2010/main" xmlns:a14="http://schemas.microsoft.com/office/drawing/2010/main" w="9525">
+                  <a14:hiddenLine xmlns:a14="http://schemas.microsoft.com/office/drawing/2010/main" xmlns:p14="http://schemas.microsoft.com/office/powerpoint/2010/main" xmlns:a16="http://schemas.microsoft.com/office/drawing/2014/main" xmlns="" w="9525">
                     <a:solidFill>
                       <a:srgbClr val="000000"/>
                     </a:solidFill>
@@ -40226,7 +40226,7 @@
               </a:ln>
               <a:extLst>
                 <a:ext uri="{91240B29-F687-4f45-9708-019B960494DF}">
-                  <a14:hiddenLine xmlns="" xmlns:a16="http://schemas.microsoft.com/office/drawing/2014/main" xmlns:p14="http://schemas.microsoft.com/office/powerpoint/2010/main" xmlns:a14="http://schemas.microsoft.com/office/drawing/2010/main" w="9525">
+                  <a14:hiddenLine xmlns:a14="http://schemas.microsoft.com/office/drawing/2010/main" xmlns:p14="http://schemas.microsoft.com/office/powerpoint/2010/main" xmlns:a16="http://schemas.microsoft.com/office/drawing/2014/main" xmlns="" w="9525">
                     <a:solidFill>
                       <a:srgbClr val="000000"/>
                     </a:solidFill>
@@ -40303,7 +40303,7 @@
               </a:ln>
               <a:extLst>
                 <a:ext uri="{91240B29-F687-4f45-9708-019B960494DF}">
-                  <a14:hiddenLine xmlns="" xmlns:a16="http://schemas.microsoft.com/office/drawing/2014/main" xmlns:p14="http://schemas.microsoft.com/office/powerpoint/2010/main" xmlns:a14="http://schemas.microsoft.com/office/drawing/2010/main" w="9525">
+                  <a14:hiddenLine xmlns:a14="http://schemas.microsoft.com/office/drawing/2010/main" xmlns:p14="http://schemas.microsoft.com/office/powerpoint/2010/main" xmlns:a16="http://schemas.microsoft.com/office/drawing/2014/main" xmlns="" w="9525">
                     <a:solidFill>
                       <a:srgbClr val="000000"/>
                     </a:solidFill>
@@ -40408,7 +40408,7 @@
               </a:ln>
               <a:extLst>
                 <a:ext uri="{91240B29-F687-4f45-9708-019B960494DF}">
-                  <a14:hiddenLine xmlns="" xmlns:a16="http://schemas.microsoft.com/office/drawing/2014/main" xmlns:p14="http://schemas.microsoft.com/office/powerpoint/2010/main" xmlns:a14="http://schemas.microsoft.com/office/drawing/2010/main" w="9525">
+                  <a14:hiddenLine xmlns:a14="http://schemas.microsoft.com/office/drawing/2010/main" xmlns:p14="http://schemas.microsoft.com/office/powerpoint/2010/main" xmlns:a16="http://schemas.microsoft.com/office/drawing/2014/main" xmlns="" w="9525">
                     <a:solidFill>
                       <a:srgbClr val="000000"/>
                     </a:solidFill>
@@ -40488,7 +40488,7 @@
               </a:ln>
               <a:extLst>
                 <a:ext uri="{91240B29-F687-4f45-9708-019B960494DF}">
-                  <a14:hiddenLine xmlns="" xmlns:a16="http://schemas.microsoft.com/office/drawing/2014/main" xmlns:p14="http://schemas.microsoft.com/office/powerpoint/2010/main" xmlns:a14="http://schemas.microsoft.com/office/drawing/2010/main" w="9525">
+                  <a14:hiddenLine xmlns:a14="http://schemas.microsoft.com/office/drawing/2010/main" xmlns:p14="http://schemas.microsoft.com/office/powerpoint/2010/main" xmlns:a16="http://schemas.microsoft.com/office/drawing/2014/main" xmlns="" w="9525">
                     <a:solidFill>
                       <a:srgbClr val="000000"/>
                     </a:solidFill>
@@ -40565,7 +40565,7 @@
               </a:ln>
               <a:extLst>
                 <a:ext uri="{91240B29-F687-4f45-9708-019B960494DF}">
-                  <a14:hiddenLine xmlns="" xmlns:a16="http://schemas.microsoft.com/office/drawing/2014/main" xmlns:p14="http://schemas.microsoft.com/office/powerpoint/2010/main" xmlns:a14="http://schemas.microsoft.com/office/drawing/2010/main" w="9525">
+                  <a14:hiddenLine xmlns:a14="http://schemas.microsoft.com/office/drawing/2010/main" xmlns:p14="http://schemas.microsoft.com/office/powerpoint/2010/main" xmlns:a16="http://schemas.microsoft.com/office/drawing/2014/main" xmlns="" w="9525">
                     <a:solidFill>
                       <a:srgbClr val="000000"/>
                     </a:solidFill>
@@ -40670,7 +40670,7 @@
               </a:ln>
               <a:extLst>
                 <a:ext uri="{91240B29-F687-4f45-9708-019B960494DF}">
-                  <a14:hiddenLine xmlns="" xmlns:a16="http://schemas.microsoft.com/office/drawing/2014/main" xmlns:p14="http://schemas.microsoft.com/office/powerpoint/2010/main" xmlns:a14="http://schemas.microsoft.com/office/drawing/2010/main" w="9525">
+                  <a14:hiddenLine xmlns:a14="http://schemas.microsoft.com/office/drawing/2010/main" xmlns:p14="http://schemas.microsoft.com/office/powerpoint/2010/main" xmlns:a16="http://schemas.microsoft.com/office/drawing/2014/main" xmlns="" w="9525">
                     <a:solidFill>
                       <a:srgbClr val="000000"/>
                     </a:solidFill>
@@ -40775,7 +40775,7 @@
               </a:ln>
               <a:extLst>
                 <a:ext uri="{91240B29-F687-4f45-9708-019B960494DF}">
-                  <a14:hiddenLine xmlns="" xmlns:a16="http://schemas.microsoft.com/office/drawing/2014/main" xmlns:p14="http://schemas.microsoft.com/office/powerpoint/2010/main" xmlns:a14="http://schemas.microsoft.com/office/drawing/2010/main" w="9525">
+                  <a14:hiddenLine xmlns:a14="http://schemas.microsoft.com/office/drawing/2010/main" xmlns:p14="http://schemas.microsoft.com/office/powerpoint/2010/main" xmlns:a16="http://schemas.microsoft.com/office/drawing/2014/main" xmlns="" w="9525">
                     <a:solidFill>
                       <a:srgbClr val="000000"/>
                     </a:solidFill>
@@ -40855,7 +40855,7 @@
               </a:ln>
               <a:extLst>
                 <a:ext uri="{91240B29-F687-4f45-9708-019B960494DF}">
-                  <a14:hiddenLine xmlns="" xmlns:a16="http://schemas.microsoft.com/office/drawing/2014/main" xmlns:p14="http://schemas.microsoft.com/office/powerpoint/2010/main" xmlns:a14="http://schemas.microsoft.com/office/drawing/2010/main" w="9525">
+                  <a14:hiddenLine xmlns:a14="http://schemas.microsoft.com/office/drawing/2010/main" xmlns:p14="http://schemas.microsoft.com/office/powerpoint/2010/main" xmlns:a16="http://schemas.microsoft.com/office/drawing/2014/main" xmlns="" w="9525">
                     <a:solidFill>
                       <a:srgbClr val="000000"/>
                     </a:solidFill>
@@ -40990,7 +40990,7 @@
               </a:ln>
               <a:extLst>
                 <a:ext uri="{91240B29-F687-4f45-9708-019B960494DF}">
-                  <a14:hiddenLine xmlns="" xmlns:a16="http://schemas.microsoft.com/office/drawing/2014/main" xmlns:p14="http://schemas.microsoft.com/office/powerpoint/2010/main" xmlns:a14="http://schemas.microsoft.com/office/drawing/2010/main" w="9525">
+                  <a14:hiddenLine xmlns:a14="http://schemas.microsoft.com/office/drawing/2010/main" xmlns:p14="http://schemas.microsoft.com/office/powerpoint/2010/main" xmlns:a16="http://schemas.microsoft.com/office/drawing/2014/main" xmlns="" w="9525">
                     <a:solidFill>
                       <a:srgbClr val="000000"/>
                     </a:solidFill>
@@ -41118,7 +41118,7 @@
               </a:ln>
               <a:extLst>
                 <a:ext uri="{91240B29-F687-4f45-9708-019B960494DF}">
-                  <a14:hiddenLine xmlns="" xmlns:a16="http://schemas.microsoft.com/office/drawing/2014/main" xmlns:p14="http://schemas.microsoft.com/office/powerpoint/2010/main" xmlns:a14="http://schemas.microsoft.com/office/drawing/2010/main" w="9525">
+                  <a14:hiddenLine xmlns:a14="http://schemas.microsoft.com/office/drawing/2010/main" xmlns:p14="http://schemas.microsoft.com/office/powerpoint/2010/main" xmlns:a16="http://schemas.microsoft.com/office/drawing/2014/main" xmlns="" w="9525">
                     <a:solidFill>
                       <a:srgbClr val="000000"/>
                     </a:solidFill>
@@ -41248,7 +41248,7 @@
               </a:ln>
               <a:extLst>
                 <a:ext uri="{91240B29-F687-4f45-9708-019B960494DF}">
-                  <a14:hiddenLine xmlns="" xmlns:a16="http://schemas.microsoft.com/office/drawing/2014/main" xmlns:p14="http://schemas.microsoft.com/office/powerpoint/2010/main" xmlns:a14="http://schemas.microsoft.com/office/drawing/2010/main" w="9525">
+                  <a14:hiddenLine xmlns:a14="http://schemas.microsoft.com/office/drawing/2010/main" xmlns:p14="http://schemas.microsoft.com/office/powerpoint/2010/main" xmlns:a16="http://schemas.microsoft.com/office/drawing/2014/main" xmlns="" w="9525">
                     <a:solidFill>
                       <a:srgbClr val="000000"/>
                     </a:solidFill>
@@ -41353,7 +41353,7 @@
               </a:ln>
               <a:extLst>
                 <a:ext uri="{91240B29-F687-4f45-9708-019B960494DF}">
-                  <a14:hiddenLine xmlns="" xmlns:a16="http://schemas.microsoft.com/office/drawing/2014/main" xmlns:p14="http://schemas.microsoft.com/office/powerpoint/2010/main" xmlns:a14="http://schemas.microsoft.com/office/drawing/2010/main" w="9525">
+                  <a14:hiddenLine xmlns:a14="http://schemas.microsoft.com/office/drawing/2010/main" xmlns:p14="http://schemas.microsoft.com/office/powerpoint/2010/main" xmlns:a16="http://schemas.microsoft.com/office/drawing/2014/main" xmlns="" w="9525">
                     <a:solidFill>
                       <a:srgbClr val="000000"/>
                     </a:solidFill>
@@ -41433,7 +41433,7 @@
               </a:ln>
               <a:extLst>
                 <a:ext uri="{91240B29-F687-4f45-9708-019B960494DF}">
-                  <a14:hiddenLine xmlns="" xmlns:a16="http://schemas.microsoft.com/office/drawing/2014/main" xmlns:p14="http://schemas.microsoft.com/office/powerpoint/2010/main" xmlns:a14="http://schemas.microsoft.com/office/drawing/2010/main" w="9525">
+                  <a14:hiddenLine xmlns:a14="http://schemas.microsoft.com/office/drawing/2010/main" xmlns:p14="http://schemas.microsoft.com/office/powerpoint/2010/main" xmlns:a16="http://schemas.microsoft.com/office/drawing/2014/main" xmlns="" w="9525">
                     <a:solidFill>
                       <a:srgbClr val="000000"/>
                     </a:solidFill>
@@ -41538,7 +41538,7 @@
               </a:ln>
               <a:extLst>
                 <a:ext uri="{91240B29-F687-4f45-9708-019B960494DF}">
-                  <a14:hiddenLine xmlns="" xmlns:a16="http://schemas.microsoft.com/office/drawing/2014/main" xmlns:p14="http://schemas.microsoft.com/office/powerpoint/2010/main" xmlns:a14="http://schemas.microsoft.com/office/drawing/2010/main" w="9525">
+                  <a14:hiddenLine xmlns:a14="http://schemas.microsoft.com/office/drawing/2010/main" xmlns:p14="http://schemas.microsoft.com/office/powerpoint/2010/main" xmlns:a16="http://schemas.microsoft.com/office/drawing/2014/main" xmlns="" w="9525">
                     <a:solidFill>
                       <a:srgbClr val="000000"/>
                     </a:solidFill>
@@ -41621,7 +41621,7 @@
               </a:ln>
               <a:extLst>
                 <a:ext uri="{91240B29-F687-4f45-9708-019B960494DF}">
-                  <a14:hiddenLine xmlns="" xmlns:a16="http://schemas.microsoft.com/office/drawing/2014/main" xmlns:p14="http://schemas.microsoft.com/office/powerpoint/2010/main" xmlns:a14="http://schemas.microsoft.com/office/drawing/2010/main" w="9525">
+                  <a14:hiddenLine xmlns:a14="http://schemas.microsoft.com/office/drawing/2010/main" xmlns:p14="http://schemas.microsoft.com/office/powerpoint/2010/main" xmlns:a16="http://schemas.microsoft.com/office/drawing/2014/main" xmlns="" w="9525">
                     <a:solidFill>
                       <a:srgbClr val="000000"/>
                     </a:solidFill>
@@ -41726,7 +41726,7 @@
               </a:ln>
               <a:extLst>
                 <a:ext uri="{91240B29-F687-4f45-9708-019B960494DF}">
-                  <a14:hiddenLine xmlns="" xmlns:a16="http://schemas.microsoft.com/office/drawing/2014/main" xmlns:p14="http://schemas.microsoft.com/office/powerpoint/2010/main" xmlns:a14="http://schemas.microsoft.com/office/drawing/2010/main" w="9525">
+                  <a14:hiddenLine xmlns:a14="http://schemas.microsoft.com/office/drawing/2010/main" xmlns:p14="http://schemas.microsoft.com/office/powerpoint/2010/main" xmlns:a16="http://schemas.microsoft.com/office/drawing/2014/main" xmlns="" w="9525">
                     <a:solidFill>
                       <a:srgbClr val="000000"/>
                     </a:solidFill>
@@ -41809,7 +41809,7 @@
               </a:ln>
               <a:extLst>
                 <a:ext uri="{91240B29-F687-4f45-9708-019B960494DF}">
-                  <a14:hiddenLine xmlns="" xmlns:a16="http://schemas.microsoft.com/office/drawing/2014/main" xmlns:p14="http://schemas.microsoft.com/office/powerpoint/2010/main" xmlns:a14="http://schemas.microsoft.com/office/drawing/2010/main" w="9525">
+                  <a14:hiddenLine xmlns:a14="http://schemas.microsoft.com/office/drawing/2010/main" xmlns:p14="http://schemas.microsoft.com/office/powerpoint/2010/main" xmlns:a16="http://schemas.microsoft.com/office/drawing/2014/main" xmlns="" w="9525">
                     <a:solidFill>
                       <a:srgbClr val="000000"/>
                     </a:solidFill>
@@ -41914,7 +41914,7 @@
               </a:ln>
               <a:extLst>
                 <a:ext uri="{91240B29-F687-4f45-9708-019B960494DF}">
-                  <a14:hiddenLine xmlns="" xmlns:a16="http://schemas.microsoft.com/office/drawing/2014/main" xmlns:p14="http://schemas.microsoft.com/office/powerpoint/2010/main" xmlns:a14="http://schemas.microsoft.com/office/drawing/2010/main" w="9525">
+                  <a14:hiddenLine xmlns:a14="http://schemas.microsoft.com/office/drawing/2010/main" xmlns:p14="http://schemas.microsoft.com/office/powerpoint/2010/main" xmlns:a16="http://schemas.microsoft.com/office/drawing/2014/main" xmlns="" w="9525">
                     <a:solidFill>
                       <a:srgbClr val="000000"/>
                     </a:solidFill>
@@ -41963,7 +41963,7 @@
               </a:ln>
               <a:extLst>
                 <a:ext uri="{91240B29-F687-4f45-9708-019B960494DF}">
-                  <a14:hiddenLine xmlns="" xmlns:a16="http://schemas.microsoft.com/office/drawing/2014/main" xmlns:p14="http://schemas.microsoft.com/office/powerpoint/2010/main" xmlns:a14="http://schemas.microsoft.com/office/drawing/2010/main" w="9525">
+                  <a14:hiddenLine xmlns:a14="http://schemas.microsoft.com/office/drawing/2010/main" xmlns:p14="http://schemas.microsoft.com/office/powerpoint/2010/main" xmlns:a16="http://schemas.microsoft.com/office/drawing/2014/main" xmlns="" w="9525">
                     <a:solidFill>
                       <a:srgbClr val="000000"/>
                     </a:solidFill>
@@ -42083,7 +42083,7 @@
           </a:prstGeom>
           <a:extLst>
             <a:ext uri="{909E8E84-426E-40dd-AFC4-6F175D3DCCD1}">
-              <a14:hiddenFill xmlns="" xmlns:a16="http://schemas.microsoft.com/office/drawing/2014/main" xmlns:p14="http://schemas.microsoft.com/office/powerpoint/2010/main" xmlns:a14="http://schemas.microsoft.com/office/drawing/2010/main">
+              <a14:hiddenFill xmlns:a14="http://schemas.microsoft.com/office/drawing/2010/main" xmlns:p14="http://schemas.microsoft.com/office/powerpoint/2010/main" xmlns:a16="http://schemas.microsoft.com/office/drawing/2014/main" xmlns="">
                 <a:solidFill>
                   <a:srgbClr val="FFFFFF"/>
                 </a:solidFill>
@@ -42207,7 +42207,7 @@
           <a:noFill/>
           <a:extLst>
             <a:ext uri="{909E8E84-426E-40dd-AFC4-6F175D3DCCD1}">
-              <a14:hiddenFill xmlns="" xmlns:a16="http://schemas.microsoft.com/office/drawing/2014/main" xmlns:p14="http://schemas.microsoft.com/office/powerpoint/2010/main" xmlns:a14="http://schemas.microsoft.com/office/drawing/2010/main">
+              <a14:hiddenFill xmlns:a14="http://schemas.microsoft.com/office/drawing/2010/main" xmlns:p14="http://schemas.microsoft.com/office/powerpoint/2010/main" xmlns:a16="http://schemas.microsoft.com/office/drawing/2014/main" xmlns="">
                 <a:solidFill>
                   <a:srgbClr val="FFFFFF"/>
                 </a:solidFill>
@@ -42398,7 +42398,7 @@
             </a:ln>
             <a:extLst>
               <a:ext uri="{91240B29-F687-4f45-9708-019B960494DF}">
-                <a14:hiddenLine xmlns="" xmlns:a16="http://schemas.microsoft.com/office/drawing/2014/main" xmlns:p14="http://schemas.microsoft.com/office/powerpoint/2010/main" xmlns:a14="http://schemas.microsoft.com/office/drawing/2010/main" w="9525">
+                <a14:hiddenLine xmlns:a14="http://schemas.microsoft.com/office/drawing/2010/main" xmlns:p14="http://schemas.microsoft.com/office/powerpoint/2010/main" xmlns:a16="http://schemas.microsoft.com/office/drawing/2014/main" xmlns="" w="9525">
                   <a:solidFill>
                     <a:srgbClr val="000000"/>
                   </a:solidFill>
@@ -42503,7 +42503,7 @@
             </a:ln>
             <a:extLst>
               <a:ext uri="{91240B29-F687-4f45-9708-019B960494DF}">
-                <a14:hiddenLine xmlns="" xmlns:a16="http://schemas.microsoft.com/office/drawing/2014/main" xmlns:p14="http://schemas.microsoft.com/office/powerpoint/2010/main" xmlns:a14="http://schemas.microsoft.com/office/drawing/2010/main" w="9525">
+                <a14:hiddenLine xmlns:a14="http://schemas.microsoft.com/office/drawing/2010/main" xmlns:p14="http://schemas.microsoft.com/office/powerpoint/2010/main" xmlns:a16="http://schemas.microsoft.com/office/drawing/2014/main" xmlns="" w="9525">
                   <a:solidFill>
                     <a:srgbClr val="000000"/>
                   </a:solidFill>
@@ -42608,7 +42608,7 @@
             </a:ln>
             <a:extLst>
               <a:ext uri="{91240B29-F687-4f45-9708-019B960494DF}">
-                <a14:hiddenLine xmlns="" xmlns:a16="http://schemas.microsoft.com/office/drawing/2014/main" xmlns:p14="http://schemas.microsoft.com/office/powerpoint/2010/main" xmlns:a14="http://schemas.microsoft.com/office/drawing/2010/main" w="9525">
+                <a14:hiddenLine xmlns:a14="http://schemas.microsoft.com/office/drawing/2010/main" xmlns:p14="http://schemas.microsoft.com/office/powerpoint/2010/main" xmlns:a16="http://schemas.microsoft.com/office/drawing/2014/main" xmlns="" w="9525">
                   <a:solidFill>
                     <a:srgbClr val="000000"/>
                   </a:solidFill>
@@ -42685,7 +42685,7 @@
             </a:ln>
             <a:extLst>
               <a:ext uri="{91240B29-F687-4f45-9708-019B960494DF}">
-                <a14:hiddenLine xmlns="" xmlns:a16="http://schemas.microsoft.com/office/drawing/2014/main" xmlns:p14="http://schemas.microsoft.com/office/powerpoint/2010/main" xmlns:a14="http://schemas.microsoft.com/office/drawing/2010/main" w="9525">
+                <a14:hiddenLine xmlns:a14="http://schemas.microsoft.com/office/drawing/2010/main" xmlns:p14="http://schemas.microsoft.com/office/powerpoint/2010/main" xmlns:a16="http://schemas.microsoft.com/office/drawing/2014/main" xmlns="" w="9525">
                   <a:solidFill>
                     <a:srgbClr val="000000"/>
                   </a:solidFill>
@@ -42790,7 +42790,7 @@
             </a:ln>
             <a:extLst>
               <a:ext uri="{91240B29-F687-4f45-9708-019B960494DF}">
-                <a14:hiddenLine xmlns="" xmlns:a16="http://schemas.microsoft.com/office/drawing/2014/main" xmlns:p14="http://schemas.microsoft.com/office/powerpoint/2010/main" xmlns:a14="http://schemas.microsoft.com/office/drawing/2010/main" w="9525">
+                <a14:hiddenLine xmlns:a14="http://schemas.microsoft.com/office/drawing/2010/main" xmlns:p14="http://schemas.microsoft.com/office/powerpoint/2010/main" xmlns:a16="http://schemas.microsoft.com/office/drawing/2014/main" xmlns="" w="9525">
                   <a:solidFill>
                     <a:srgbClr val="000000"/>
                   </a:solidFill>
@@ -42867,7 +42867,7 @@
             </a:ln>
             <a:extLst>
               <a:ext uri="{91240B29-F687-4f45-9708-019B960494DF}">
-                <a14:hiddenLine xmlns="" xmlns:a16="http://schemas.microsoft.com/office/drawing/2014/main" xmlns:p14="http://schemas.microsoft.com/office/powerpoint/2010/main" xmlns:a14="http://schemas.microsoft.com/office/drawing/2010/main" w="9525">
+                <a14:hiddenLine xmlns:a14="http://schemas.microsoft.com/office/drawing/2010/main" xmlns:p14="http://schemas.microsoft.com/office/powerpoint/2010/main" xmlns:a16="http://schemas.microsoft.com/office/drawing/2014/main" xmlns="" w="9525">
                   <a:solidFill>
                     <a:srgbClr val="000000"/>
                   </a:solidFill>
@@ -42944,7 +42944,7 @@
             </a:ln>
             <a:extLst>
               <a:ext uri="{91240B29-F687-4f45-9708-019B960494DF}">
-                <a14:hiddenLine xmlns="" xmlns:a16="http://schemas.microsoft.com/office/drawing/2014/main" xmlns:p14="http://schemas.microsoft.com/office/powerpoint/2010/main" xmlns:a14="http://schemas.microsoft.com/office/drawing/2010/main" w="9525">
+                <a14:hiddenLine xmlns:a14="http://schemas.microsoft.com/office/drawing/2010/main" xmlns:p14="http://schemas.microsoft.com/office/powerpoint/2010/main" xmlns:a16="http://schemas.microsoft.com/office/drawing/2014/main" xmlns="" w="9525">
                   <a:solidFill>
                     <a:srgbClr val="000000"/>
                   </a:solidFill>
@@ -43049,7 +43049,7 @@
             </a:ln>
             <a:extLst>
               <a:ext uri="{91240B29-F687-4f45-9708-019B960494DF}">
-                <a14:hiddenLine xmlns="" xmlns:a16="http://schemas.microsoft.com/office/drawing/2014/main" xmlns:p14="http://schemas.microsoft.com/office/powerpoint/2010/main" xmlns:a14="http://schemas.microsoft.com/office/drawing/2010/main" w="9525">
+                <a14:hiddenLine xmlns:a14="http://schemas.microsoft.com/office/drawing/2010/main" xmlns:p14="http://schemas.microsoft.com/office/powerpoint/2010/main" xmlns:a16="http://schemas.microsoft.com/office/drawing/2014/main" xmlns="" w="9525">
                   <a:solidFill>
                     <a:srgbClr val="000000"/>
                   </a:solidFill>
@@ -43154,7 +43154,7 @@
             </a:ln>
             <a:extLst>
               <a:ext uri="{91240B29-F687-4f45-9708-019B960494DF}">
-                <a14:hiddenLine xmlns="" xmlns:a16="http://schemas.microsoft.com/office/drawing/2014/main" xmlns:p14="http://schemas.microsoft.com/office/powerpoint/2010/main" xmlns:a14="http://schemas.microsoft.com/office/drawing/2010/main" w="9525">
+                <a14:hiddenLine xmlns:a14="http://schemas.microsoft.com/office/drawing/2010/main" xmlns:p14="http://schemas.microsoft.com/office/powerpoint/2010/main" xmlns:a16="http://schemas.microsoft.com/office/drawing/2014/main" xmlns="" w="9525">
                   <a:solidFill>
                     <a:srgbClr val="000000"/>
                   </a:solidFill>
@@ -43231,7 +43231,7 @@
             </a:ln>
             <a:extLst>
               <a:ext uri="{91240B29-F687-4f45-9708-019B960494DF}">
-                <a14:hiddenLine xmlns="" xmlns:a16="http://schemas.microsoft.com/office/drawing/2014/main" xmlns:p14="http://schemas.microsoft.com/office/powerpoint/2010/main" xmlns:a14="http://schemas.microsoft.com/office/drawing/2010/main" w="9525">
+                <a14:hiddenLine xmlns:a14="http://schemas.microsoft.com/office/drawing/2010/main" xmlns:p14="http://schemas.microsoft.com/office/powerpoint/2010/main" xmlns:a16="http://schemas.microsoft.com/office/drawing/2014/main" xmlns="" w="9525">
                   <a:solidFill>
                     <a:srgbClr val="000000"/>
                   </a:solidFill>
@@ -43356,7 +43356,7 @@
             </a:ln>
             <a:extLst>
               <a:ext uri="{91240B29-F687-4f45-9708-019B960494DF}">
-                <a14:hiddenLine xmlns="" xmlns:a16="http://schemas.microsoft.com/office/drawing/2014/main" xmlns:p14="http://schemas.microsoft.com/office/powerpoint/2010/main" xmlns:a14="http://schemas.microsoft.com/office/drawing/2010/main" w="9525">
+                <a14:hiddenLine xmlns:a14="http://schemas.microsoft.com/office/drawing/2010/main" xmlns:p14="http://schemas.microsoft.com/office/powerpoint/2010/main" xmlns:a16="http://schemas.microsoft.com/office/drawing/2014/main" xmlns="" w="9525">
                   <a:solidFill>
                     <a:srgbClr val="000000"/>
                   </a:solidFill>
@@ -43470,7 +43470,7 @@
             </a:ln>
             <a:extLst>
               <a:ext uri="{91240B29-F687-4f45-9708-019B960494DF}">
-                <a14:hiddenLine xmlns="" xmlns:a16="http://schemas.microsoft.com/office/drawing/2014/main" xmlns:p14="http://schemas.microsoft.com/office/powerpoint/2010/main" xmlns:a14="http://schemas.microsoft.com/office/drawing/2010/main" w="9525">
+                <a14:hiddenLine xmlns:a14="http://schemas.microsoft.com/office/drawing/2010/main" xmlns:p14="http://schemas.microsoft.com/office/powerpoint/2010/main" xmlns:a16="http://schemas.microsoft.com/office/drawing/2014/main" xmlns="" w="9525">
                   <a:solidFill>
                     <a:srgbClr val="000000"/>
                   </a:solidFill>
@@ -43547,7 +43547,7 @@
             </a:ln>
             <a:extLst>
               <a:ext uri="{91240B29-F687-4f45-9708-019B960494DF}">
-                <a14:hiddenLine xmlns="" xmlns:a16="http://schemas.microsoft.com/office/drawing/2014/main" xmlns:p14="http://schemas.microsoft.com/office/powerpoint/2010/main" xmlns:a14="http://schemas.microsoft.com/office/drawing/2010/main" w="9525">
+                <a14:hiddenLine xmlns:a14="http://schemas.microsoft.com/office/drawing/2010/main" xmlns:p14="http://schemas.microsoft.com/office/powerpoint/2010/main" xmlns:a16="http://schemas.microsoft.com/office/drawing/2014/main" xmlns="" w="9525">
                   <a:solidFill>
                     <a:srgbClr val="000000"/>
                   </a:solidFill>
@@ -43624,7 +43624,7 @@
             </a:ln>
             <a:extLst>
               <a:ext uri="{91240B29-F687-4f45-9708-019B960494DF}">
-                <a14:hiddenLine xmlns="" xmlns:a16="http://schemas.microsoft.com/office/drawing/2014/main" xmlns:p14="http://schemas.microsoft.com/office/powerpoint/2010/main" xmlns:a14="http://schemas.microsoft.com/office/drawing/2010/main" w="9525">
+                <a14:hiddenLine xmlns:a14="http://schemas.microsoft.com/office/drawing/2010/main" xmlns:p14="http://schemas.microsoft.com/office/powerpoint/2010/main" xmlns:a16="http://schemas.microsoft.com/office/drawing/2014/main" xmlns="" w="9525">
                   <a:solidFill>
                     <a:srgbClr val="000000"/>
                   </a:solidFill>
@@ -43729,7 +43729,7 @@
             </a:ln>
             <a:extLst>
               <a:ext uri="{91240B29-F687-4f45-9708-019B960494DF}">
-                <a14:hiddenLine xmlns="" xmlns:a16="http://schemas.microsoft.com/office/drawing/2014/main" xmlns:p14="http://schemas.microsoft.com/office/powerpoint/2010/main" xmlns:a14="http://schemas.microsoft.com/office/drawing/2010/main" w="9525">
+                <a14:hiddenLine xmlns:a14="http://schemas.microsoft.com/office/drawing/2010/main" xmlns:p14="http://schemas.microsoft.com/office/powerpoint/2010/main" xmlns:a16="http://schemas.microsoft.com/office/drawing/2014/main" xmlns="" w="9525">
                   <a:solidFill>
                     <a:srgbClr val="000000"/>
                   </a:solidFill>
@@ -43778,7 +43778,7 @@
             </a:ln>
             <a:extLst>
               <a:ext uri="{91240B29-F687-4f45-9708-019B960494DF}">
-                <a14:hiddenLine xmlns="" xmlns:a16="http://schemas.microsoft.com/office/drawing/2014/main" xmlns:p14="http://schemas.microsoft.com/office/powerpoint/2010/main" xmlns:a14="http://schemas.microsoft.com/office/drawing/2010/main" w="9525">
+                <a14:hiddenLine xmlns:a14="http://schemas.microsoft.com/office/drawing/2010/main" xmlns:p14="http://schemas.microsoft.com/office/powerpoint/2010/main" xmlns:a16="http://schemas.microsoft.com/office/drawing/2014/main" xmlns="" w="9525">
                   <a:solidFill>
                     <a:srgbClr val="000000"/>
                   </a:solidFill>
@@ -43858,7 +43858,7 @@
             </a:ln>
             <a:extLst>
               <a:ext uri="{91240B29-F687-4f45-9708-019B960494DF}">
-                <a14:hiddenLine xmlns="" xmlns:a16="http://schemas.microsoft.com/office/drawing/2014/main" xmlns:p14="http://schemas.microsoft.com/office/powerpoint/2010/main" xmlns:a14="http://schemas.microsoft.com/office/drawing/2010/main" w="9525">
+                <a14:hiddenLine xmlns:a14="http://schemas.microsoft.com/office/drawing/2010/main" xmlns:p14="http://schemas.microsoft.com/office/powerpoint/2010/main" xmlns:a16="http://schemas.microsoft.com/office/drawing/2014/main" xmlns="" w="9525">
                   <a:solidFill>
                     <a:srgbClr val="000000"/>
                   </a:solidFill>
@@ -43963,7 +43963,7 @@
             </a:ln>
             <a:extLst>
               <a:ext uri="{91240B29-F687-4f45-9708-019B960494DF}">
-                <a14:hiddenLine xmlns="" xmlns:a16="http://schemas.microsoft.com/office/drawing/2014/main" xmlns:p14="http://schemas.microsoft.com/office/powerpoint/2010/main" xmlns:a14="http://schemas.microsoft.com/office/drawing/2010/main" w="9525">
+                <a14:hiddenLine xmlns:a14="http://schemas.microsoft.com/office/drawing/2010/main" xmlns:p14="http://schemas.microsoft.com/office/powerpoint/2010/main" xmlns:a16="http://schemas.microsoft.com/office/drawing/2014/main" xmlns="" w="9525">
                   <a:solidFill>
                     <a:srgbClr val="000000"/>
                   </a:solidFill>
@@ -44040,7 +44040,7 @@
             </a:ln>
             <a:extLst>
               <a:ext uri="{91240B29-F687-4f45-9708-019B960494DF}">
-                <a14:hiddenLine xmlns="" xmlns:a16="http://schemas.microsoft.com/office/drawing/2014/main" xmlns:p14="http://schemas.microsoft.com/office/powerpoint/2010/main" xmlns:a14="http://schemas.microsoft.com/office/drawing/2010/main" w="9525">
+                <a14:hiddenLine xmlns:a14="http://schemas.microsoft.com/office/drawing/2010/main" xmlns:p14="http://schemas.microsoft.com/office/powerpoint/2010/main" xmlns:a16="http://schemas.microsoft.com/office/drawing/2014/main" xmlns="" w="9525">
                   <a:solidFill>
                     <a:srgbClr val="000000"/>
                   </a:solidFill>
@@ -44145,7 +44145,7 @@
             </a:ln>
             <a:extLst>
               <a:ext uri="{91240B29-F687-4f45-9708-019B960494DF}">
-                <a14:hiddenLine xmlns="" xmlns:a16="http://schemas.microsoft.com/office/drawing/2014/main" xmlns:p14="http://schemas.microsoft.com/office/powerpoint/2010/main" xmlns:a14="http://schemas.microsoft.com/office/drawing/2010/main" w="9525">
+                <a14:hiddenLine xmlns:a14="http://schemas.microsoft.com/office/drawing/2010/main" xmlns:p14="http://schemas.microsoft.com/office/powerpoint/2010/main" xmlns:a16="http://schemas.microsoft.com/office/drawing/2014/main" xmlns="" w="9525">
                   <a:solidFill>
                     <a:srgbClr val="000000"/>
                   </a:solidFill>
@@ -44225,7 +44225,7 @@
             </a:ln>
             <a:extLst>
               <a:ext uri="{91240B29-F687-4f45-9708-019B960494DF}">
-                <a14:hiddenLine xmlns="" xmlns:a16="http://schemas.microsoft.com/office/drawing/2014/main" xmlns:p14="http://schemas.microsoft.com/office/powerpoint/2010/main" xmlns:a14="http://schemas.microsoft.com/office/drawing/2010/main" w="9525">
+                <a14:hiddenLine xmlns:a14="http://schemas.microsoft.com/office/drawing/2010/main" xmlns:p14="http://schemas.microsoft.com/office/powerpoint/2010/main" xmlns:a16="http://schemas.microsoft.com/office/drawing/2014/main" xmlns="" w="9525">
                   <a:solidFill>
                     <a:srgbClr val="000000"/>
                   </a:solidFill>
@@ -44302,7 +44302,7 @@
             </a:ln>
             <a:extLst>
               <a:ext uri="{91240B29-F687-4f45-9708-019B960494DF}">
-                <a14:hiddenLine xmlns="" xmlns:a16="http://schemas.microsoft.com/office/drawing/2014/main" xmlns:p14="http://schemas.microsoft.com/office/powerpoint/2010/main" xmlns:a14="http://schemas.microsoft.com/office/drawing/2010/main" w="9525">
+                <a14:hiddenLine xmlns:a14="http://schemas.microsoft.com/office/drawing/2010/main" xmlns:p14="http://schemas.microsoft.com/office/powerpoint/2010/main" xmlns:a16="http://schemas.microsoft.com/office/drawing/2014/main" xmlns="" w="9525">
                   <a:solidFill>
                     <a:srgbClr val="000000"/>
                   </a:solidFill>
@@ -44407,7 +44407,7 @@
             </a:ln>
             <a:extLst>
               <a:ext uri="{91240B29-F687-4f45-9708-019B960494DF}">
-                <a14:hiddenLine xmlns="" xmlns:a16="http://schemas.microsoft.com/office/drawing/2014/main" xmlns:p14="http://schemas.microsoft.com/office/powerpoint/2010/main" xmlns:a14="http://schemas.microsoft.com/office/drawing/2010/main" w="9525">
+                <a14:hiddenLine xmlns:a14="http://schemas.microsoft.com/office/drawing/2010/main" xmlns:p14="http://schemas.microsoft.com/office/powerpoint/2010/main" xmlns:a16="http://schemas.microsoft.com/office/drawing/2014/main" xmlns="" w="9525">
                   <a:solidFill>
                     <a:srgbClr val="000000"/>
                   </a:solidFill>
@@ -44512,7 +44512,7 @@
             </a:ln>
             <a:extLst>
               <a:ext uri="{91240B29-F687-4f45-9708-019B960494DF}">
-                <a14:hiddenLine xmlns="" xmlns:a16="http://schemas.microsoft.com/office/drawing/2014/main" xmlns:p14="http://schemas.microsoft.com/office/powerpoint/2010/main" xmlns:a14="http://schemas.microsoft.com/office/drawing/2010/main" w="9525">
+                <a14:hiddenLine xmlns:a14="http://schemas.microsoft.com/office/drawing/2010/main" xmlns:p14="http://schemas.microsoft.com/office/powerpoint/2010/main" xmlns:a16="http://schemas.microsoft.com/office/drawing/2014/main" xmlns="" w="9525">
                   <a:solidFill>
                     <a:srgbClr val="000000"/>
                   </a:solidFill>
@@ -44592,7 +44592,7 @@
             </a:ln>
             <a:extLst>
               <a:ext uri="{91240B29-F687-4f45-9708-019B960494DF}">
-                <a14:hiddenLine xmlns="" xmlns:a16="http://schemas.microsoft.com/office/drawing/2014/main" xmlns:p14="http://schemas.microsoft.com/office/powerpoint/2010/main" xmlns:a14="http://schemas.microsoft.com/office/drawing/2010/main" w="9525">
+                <a14:hiddenLine xmlns:a14="http://schemas.microsoft.com/office/drawing/2010/main" xmlns:p14="http://schemas.microsoft.com/office/powerpoint/2010/main" xmlns:a16="http://schemas.microsoft.com/office/drawing/2014/main" xmlns="" w="9525">
                   <a:solidFill>
                     <a:srgbClr val="000000"/>
                   </a:solidFill>
@@ -44727,7 +44727,7 @@
             </a:ln>
             <a:extLst>
               <a:ext uri="{91240B29-F687-4f45-9708-019B960494DF}">
-                <a14:hiddenLine xmlns="" xmlns:a16="http://schemas.microsoft.com/office/drawing/2014/main" xmlns:p14="http://schemas.microsoft.com/office/powerpoint/2010/main" xmlns:a14="http://schemas.microsoft.com/office/drawing/2010/main" w="9525">
+                <a14:hiddenLine xmlns:a14="http://schemas.microsoft.com/office/drawing/2010/main" xmlns:p14="http://schemas.microsoft.com/office/powerpoint/2010/main" xmlns:a16="http://schemas.microsoft.com/office/drawing/2014/main" xmlns="" w="9525">
                   <a:solidFill>
                     <a:srgbClr val="000000"/>
                   </a:solidFill>
@@ -44742,7 +44742,7 @@
       </p:grpSp>
       <p:pic>
         <p:nvPicPr>
-          <p:cNvPr id="5" name="Content Placeholder 4" descr="A screenshot of a computer&#13;&#10;&#13;&#10;Description automatically generated">
+          <p:cNvPr id="5" name="Content Placeholder 4" descr="A screenshot of a computer&#10;&#10;Description automatically generated">
             <a:extLst>
               <a:ext uri="{FF2B5EF4-FFF2-40B4-BE49-F238E27FC236}">
                 <a16:creationId xmlns:a16="http://schemas.microsoft.com/office/drawing/2014/main" id="{386836D5-51E8-BE47-A193-5381896EAADD}"/>
@@ -44774,7 +44774,7 @@
       </p:pic>
       <p:pic>
         <p:nvPicPr>
-          <p:cNvPr id="7" name="Picture 6" descr="A screenshot of a social media post&#13;&#10;&#13;&#10;Description automatically generated">
+          <p:cNvPr id="7" name="Picture 6" descr="A screenshot of a social media post&#10;&#10;Description automatically generated">
             <a:extLst>
               <a:ext uri="{FF2B5EF4-FFF2-40B4-BE49-F238E27FC236}">
                 <a16:creationId xmlns:a16="http://schemas.microsoft.com/office/drawing/2014/main" id="{8121EF0A-FE58-3246-B29A-2B3E15CB5965}"/>
@@ -45961,7 +45961,7 @@
       </p:cxnSp>
       <p:pic>
         <p:nvPicPr>
-          <p:cNvPr id="7" name="Picture 6" descr="A close up of text on a black background&#13;&#10;&#13;&#10;Description automatically generated">
+          <p:cNvPr id="7" name="Picture 6" descr="A close up of text on a black background&#10;&#10;Description automatically generated">
             <a:extLst>
               <a:ext uri="{FF2B5EF4-FFF2-40B4-BE49-F238E27FC236}">
                 <a16:creationId xmlns:a16="http://schemas.microsoft.com/office/drawing/2014/main" id="{9D4743EB-3583-1C4B-BD7D-0058D678AADF}"/>
@@ -46004,7 +46004,7 @@
         <p:spPr>
           <a:xfrm>
             <a:off x="898357" y="6354308"/>
-            <a:ext cx="5479513" cy="369332"/>
+            <a:ext cx="5479513" cy="646331"/>
           </a:xfrm>
           <a:prstGeom prst="rect">
             <a:avLst/>
@@ -46017,17 +46017,15 @@
           <a:lstStyle/>
           <a:p>
             <a:r>
-              <a:rPr lang="en-US" dirty="0"/>
-              <a:t>https://</a:t>
+              <a:rPr lang="en-US" dirty="0">
+                <a:hlinkClick r:id="rId4"/>
+              </a:rPr>
+              <a:t>https://rapidbi.com/rapidbi-daily-business-cartoon-149/</a:t>
             </a:r>
-            <a:r>
-              <a:rPr lang="en-US" dirty="0" err="1"/>
-              <a:t>rapidbi.com</a:t>
-            </a:r>
-            <a:r>
-              <a:rPr lang="en-US" dirty="0"/>
-              <a:t>/rapidbi-daily-business-cartoon-149/</a:t>
-            </a:r>
+            <a:endParaRPr lang="en-US" dirty="0"/>
+          </a:p>
+          <a:p>
+            <a:endParaRPr lang="en-US" dirty="0"/>
           </a:p>
         </p:txBody>
       </p:sp>
@@ -47338,36 +47336,35 @@
           </a:p>
         </p:txBody>
       </p:sp>
-      <p:sp>
-        <p:nvSpPr>
-          <p:cNvPr id="16" name="Content Placeholder 15">
+      <p:pic>
+        <p:nvPicPr>
+          <p:cNvPr id="4" name="Content Placeholder 3" descr="A screenshot of a cell phone&#10;&#10;Description automatically generated">
             <a:extLst>
               <a:ext uri="{FF2B5EF4-FFF2-40B4-BE49-F238E27FC236}">
-                <a16:creationId xmlns:a16="http://schemas.microsoft.com/office/drawing/2014/main" id="{7A0356F7-F0D1-0045-8684-719605ACA64F}"/>
+                <a16:creationId xmlns:a16="http://schemas.microsoft.com/office/drawing/2014/main" id="{B47EA33D-5B22-4AF2-A8D8-7F8A58C09F36}"/>
               </a:ext>
             </a:extLst>
           </p:cNvPr>
-          <p:cNvSpPr>
-            <a:spLocks noGrp="1"/>
-          </p:cNvSpPr>
+          <p:cNvPicPr>
+            <a:picLocks noGrp="1" noChangeAspect="1"/>
+          </p:cNvPicPr>
           <p:nvPr>
             <p:ph idx="1"/>
           </p:nvPr>
-        </p:nvSpPr>
+        </p:nvPicPr>
+        <p:blipFill>
+          <a:blip r:embed="rId3"/>
+          <a:stretch>
+            <a:fillRect/>
+          </a:stretch>
+        </p:blipFill>
         <p:spPr>
           <a:xfrm>
-            <a:off x="1141412" y="2512585"/>
-            <a:ext cx="9905999" cy="3278615"/>
+            <a:off x="2817458" y="2587071"/>
+            <a:ext cx="4900757" cy="3278187"/>
           </a:xfrm>
         </p:spPr>
-        <p:txBody>
-          <a:bodyPr/>
-          <a:lstStyle/>
-          <a:p>
-            <a:endParaRPr lang="en-US" dirty="0"/>
-          </a:p>
-        </p:txBody>
-      </p:sp>
+      </p:pic>
       <p:sp>
         <p:nvSpPr>
           <p:cNvPr id="7" name="TextBox 6">

</xml_diff>

<commit_message>
Added changes back to powerpoint presentation.
</commit_message>
<xml_diff>
--- a/Presentation/MSDS_7330_Group_Project_Presentation.pptx
+++ b/Presentation/MSDS_7330_Group_Project_Presentation.pptx
@@ -5,7 +5,7 @@
     <p:sldMasterId id="2147483648" r:id="rId1"/>
   </p:sldMasterIdLst>
   <p:notesMasterIdLst>
-    <p:notesMasterId r:id="rId20"/>
+    <p:notesMasterId r:id="rId21"/>
   </p:notesMasterIdLst>
   <p:sldIdLst>
     <p:sldId id="256" r:id="rId2"/>
@@ -22,10 +22,11 @@
     <p:sldId id="273" r:id="rId13"/>
     <p:sldId id="274" r:id="rId14"/>
     <p:sldId id="263" r:id="rId15"/>
-    <p:sldId id="257" r:id="rId16"/>
-    <p:sldId id="258" r:id="rId17"/>
-    <p:sldId id="262" r:id="rId18"/>
-    <p:sldId id="266" r:id="rId19"/>
+    <p:sldId id="275" r:id="rId16"/>
+    <p:sldId id="257" r:id="rId17"/>
+    <p:sldId id="258" r:id="rId18"/>
+    <p:sldId id="262" r:id="rId19"/>
+    <p:sldId id="266" r:id="rId20"/>
   </p:sldIdLst>
   <p:sldSz cx="12192000" cy="6858000"/>
   <p:notesSz cx="6858000" cy="9144000"/>
@@ -6930,7 +6931,7 @@
           <a:p>
             <a:fld id="{2458F96C-EECA-A145-A75D-16DF3B251606}" type="slidenum">
               <a:rPr lang="en-US" smtClean="0"/>
-              <a:t>15</a:t>
+              <a:t>16</a:t>
             </a:fld>
             <a:endParaRPr lang="en-US"/>
           </a:p>
@@ -7014,7 +7015,7 @@
           <a:p>
             <a:fld id="{2458F96C-EECA-A145-A75D-16DF3B251606}" type="slidenum">
               <a:rPr lang="en-US" smtClean="0"/>
-              <a:t>17</a:t>
+              <a:t>18</a:t>
             </a:fld>
             <a:endParaRPr lang="en-US"/>
           </a:p>
@@ -7083,7 +7084,7 @@
           <a:noFill/>
           <a:extLst>
             <a:ext uri="{909E8E84-426E-40dd-AFC4-6F175D3DCCD1}">
-              <a14:hiddenFill xmlns:a14="http://schemas.microsoft.com/office/drawing/2010/main" xmlns="">
+              <a14:hiddenFill xmlns="" xmlns:a14="http://schemas.microsoft.com/office/drawing/2010/main">
                 <a:solidFill>
                   <a:srgbClr val="FFFFFF"/>
                 </a:solidFill>
@@ -7143,7 +7144,7 @@
             </a:ln>
             <a:extLst>
               <a:ext uri="{91240B29-F687-4f45-9708-019B960494DF}">
-                <a14:hiddenLine xmlns:a14="http://schemas.microsoft.com/office/drawing/2010/main" xmlns="" w="9525">
+                <a14:hiddenLine xmlns="" xmlns:a14="http://schemas.microsoft.com/office/drawing/2010/main" w="9525">
                   <a:solidFill>
                     <a:srgbClr val="000000"/>
                   </a:solidFill>
@@ -7233,7 +7234,7 @@
             </a:ln>
             <a:extLst>
               <a:ext uri="{91240B29-F687-4f45-9708-019B960494DF}">
-                <a14:hiddenLine xmlns:a14="http://schemas.microsoft.com/office/drawing/2010/main" xmlns="" w="9525">
+                <a14:hiddenLine xmlns="" xmlns:a14="http://schemas.microsoft.com/office/drawing/2010/main" w="9525">
                   <a:solidFill>
                     <a:srgbClr val="000000"/>
                   </a:solidFill>
@@ -7323,7 +7324,7 @@
             </a:ln>
             <a:extLst>
               <a:ext uri="{91240B29-F687-4f45-9708-019B960494DF}">
-                <a14:hiddenLine xmlns:a14="http://schemas.microsoft.com/office/drawing/2010/main" xmlns="" w="9525">
+                <a14:hiddenLine xmlns="" xmlns:a14="http://schemas.microsoft.com/office/drawing/2010/main" w="9525">
                   <a:solidFill>
                     <a:srgbClr val="000000"/>
                   </a:solidFill>
@@ -7357,7 +7358,7 @@
             </a:ln>
             <a:extLst>
               <a:ext uri="{91240B29-F687-4f45-9708-019B960494DF}">
-                <a14:hiddenLine xmlns:a14="http://schemas.microsoft.com/office/drawing/2010/main" xmlns="" w="9525">
+                <a14:hiddenLine xmlns="" xmlns:a14="http://schemas.microsoft.com/office/drawing/2010/main" w="9525">
                   <a:solidFill>
                     <a:srgbClr val="000000"/>
                   </a:solidFill>
@@ -7447,7 +7448,7 @@
             </a:ln>
             <a:extLst>
               <a:ext uri="{91240B29-F687-4f45-9708-019B960494DF}">
-                <a14:hiddenLine xmlns:a14="http://schemas.microsoft.com/office/drawing/2010/main" xmlns="" w="9525">
+                <a14:hiddenLine xmlns="" xmlns:a14="http://schemas.microsoft.com/office/drawing/2010/main" w="9525">
                   <a:solidFill>
                     <a:srgbClr val="000000"/>
                   </a:solidFill>
@@ -7509,7 +7510,7 @@
             </a:ln>
             <a:extLst>
               <a:ext uri="{91240B29-F687-4f45-9708-019B960494DF}">
-                <a14:hiddenLine xmlns:a14="http://schemas.microsoft.com/office/drawing/2010/main" xmlns="" w="9525">
+                <a14:hiddenLine xmlns="" xmlns:a14="http://schemas.microsoft.com/office/drawing/2010/main" w="9525">
                   <a:solidFill>
                     <a:srgbClr val="000000"/>
                   </a:solidFill>
@@ -7571,7 +7572,7 @@
             </a:ln>
             <a:extLst>
               <a:ext uri="{91240B29-F687-4f45-9708-019B960494DF}">
-                <a14:hiddenLine xmlns:a14="http://schemas.microsoft.com/office/drawing/2010/main" xmlns="" w="9525">
+                <a14:hiddenLine xmlns="" xmlns:a14="http://schemas.microsoft.com/office/drawing/2010/main" w="9525">
                   <a:solidFill>
                     <a:srgbClr val="000000"/>
                   </a:solidFill>
@@ -7661,7 +7662,7 @@
             </a:ln>
             <a:extLst>
               <a:ext uri="{91240B29-F687-4f45-9708-019B960494DF}">
-                <a14:hiddenLine xmlns:a14="http://schemas.microsoft.com/office/drawing/2010/main" xmlns="" w="9525">
+                <a14:hiddenLine xmlns="" xmlns:a14="http://schemas.microsoft.com/office/drawing/2010/main" w="9525">
                   <a:solidFill>
                     <a:srgbClr val="000000"/>
                   </a:solidFill>
@@ -7723,7 +7724,7 @@
             </a:ln>
             <a:extLst>
               <a:ext uri="{91240B29-F687-4f45-9708-019B960494DF}">
-                <a14:hiddenLine xmlns:a14="http://schemas.microsoft.com/office/drawing/2010/main" xmlns="" w="9525">
+                <a14:hiddenLine xmlns="" xmlns:a14="http://schemas.microsoft.com/office/drawing/2010/main" w="9525">
                   <a:solidFill>
                     <a:srgbClr val="000000"/>
                   </a:solidFill>
@@ -7785,7 +7786,7 @@
             </a:ln>
             <a:extLst>
               <a:ext uri="{91240B29-F687-4f45-9708-019B960494DF}">
-                <a14:hiddenLine xmlns:a14="http://schemas.microsoft.com/office/drawing/2010/main" xmlns="" w="9525">
+                <a14:hiddenLine xmlns="" xmlns:a14="http://schemas.microsoft.com/office/drawing/2010/main" w="9525">
                   <a:solidFill>
                     <a:srgbClr val="000000"/>
                   </a:solidFill>
@@ -7875,7 +7876,7 @@
             </a:ln>
             <a:extLst>
               <a:ext uri="{91240B29-F687-4f45-9708-019B960494DF}">
-                <a14:hiddenLine xmlns:a14="http://schemas.microsoft.com/office/drawing/2010/main" xmlns="" w="9525">
+                <a14:hiddenLine xmlns="" xmlns:a14="http://schemas.microsoft.com/office/drawing/2010/main" w="9525">
                   <a:solidFill>
                     <a:srgbClr val="000000"/>
                   </a:solidFill>
@@ -7965,7 +7966,7 @@
             </a:ln>
             <a:extLst>
               <a:ext uri="{91240B29-F687-4f45-9708-019B960494DF}">
-                <a14:hiddenLine xmlns:a14="http://schemas.microsoft.com/office/drawing/2010/main" xmlns="" w="9525">
+                <a14:hiddenLine xmlns="" xmlns:a14="http://schemas.microsoft.com/office/drawing/2010/main" w="9525">
                   <a:solidFill>
                     <a:srgbClr val="000000"/>
                   </a:solidFill>
@@ -8027,7 +8028,7 @@
             </a:ln>
             <a:extLst>
               <a:ext uri="{91240B29-F687-4f45-9708-019B960494DF}">
-                <a14:hiddenLine xmlns:a14="http://schemas.microsoft.com/office/drawing/2010/main" xmlns="" w="9525">
+                <a14:hiddenLine xmlns="" xmlns:a14="http://schemas.microsoft.com/office/drawing/2010/main" w="9525">
                   <a:solidFill>
                     <a:srgbClr val="000000"/>
                   </a:solidFill>
@@ -8137,7 +8138,7 @@
             </a:ln>
             <a:extLst>
               <a:ext uri="{91240B29-F687-4f45-9708-019B960494DF}">
-                <a14:hiddenLine xmlns:a14="http://schemas.microsoft.com/office/drawing/2010/main" xmlns="" w="9525">
+                <a14:hiddenLine xmlns="" xmlns:a14="http://schemas.microsoft.com/office/drawing/2010/main" w="9525">
                   <a:solidFill>
                     <a:srgbClr val="000000"/>
                   </a:solidFill>
@@ -8199,7 +8200,7 @@
             </a:ln>
             <a:extLst>
               <a:ext uri="{91240B29-F687-4f45-9708-019B960494DF}">
-                <a14:hiddenLine xmlns:a14="http://schemas.microsoft.com/office/drawing/2010/main" xmlns="" w="9525">
+                <a14:hiddenLine xmlns="" xmlns:a14="http://schemas.microsoft.com/office/drawing/2010/main" w="9525">
                   <a:solidFill>
                     <a:srgbClr val="000000"/>
                   </a:solidFill>
@@ -8289,7 +8290,7 @@
             </a:ln>
             <a:extLst>
               <a:ext uri="{91240B29-F687-4f45-9708-019B960494DF}">
-                <a14:hiddenLine xmlns:a14="http://schemas.microsoft.com/office/drawing/2010/main" xmlns="" w="9525">
+                <a14:hiddenLine xmlns="" xmlns:a14="http://schemas.microsoft.com/office/drawing/2010/main" w="9525">
                   <a:solidFill>
                     <a:srgbClr val="000000"/>
                   </a:solidFill>
@@ -8379,7 +8380,7 @@
             </a:ln>
             <a:extLst>
               <a:ext uri="{91240B29-F687-4f45-9708-019B960494DF}">
-                <a14:hiddenLine xmlns:a14="http://schemas.microsoft.com/office/drawing/2010/main" xmlns="" w="9525">
+                <a14:hiddenLine xmlns="" xmlns:a14="http://schemas.microsoft.com/office/drawing/2010/main" w="9525">
                   <a:solidFill>
                     <a:srgbClr val="000000"/>
                   </a:solidFill>
@@ -8441,7 +8442,7 @@
             </a:ln>
             <a:extLst>
               <a:ext uri="{91240B29-F687-4f45-9708-019B960494DF}">
-                <a14:hiddenLine xmlns:a14="http://schemas.microsoft.com/office/drawing/2010/main" xmlns="" w="9525">
+                <a14:hiddenLine xmlns="" xmlns:a14="http://schemas.microsoft.com/office/drawing/2010/main" w="9525">
                   <a:solidFill>
                     <a:srgbClr val="000000"/>
                   </a:solidFill>
@@ -8531,7 +8532,7 @@
             </a:ln>
             <a:extLst>
               <a:ext uri="{91240B29-F687-4f45-9708-019B960494DF}">
-                <a14:hiddenLine xmlns:a14="http://schemas.microsoft.com/office/drawing/2010/main" xmlns="" w="9525">
+                <a14:hiddenLine xmlns="" xmlns:a14="http://schemas.microsoft.com/office/drawing/2010/main" w="9525">
                   <a:solidFill>
                     <a:srgbClr val="000000"/>
                   </a:solidFill>
@@ -8621,7 +8622,7 @@
             </a:ln>
             <a:extLst>
               <a:ext uri="{91240B29-F687-4f45-9708-019B960494DF}">
-                <a14:hiddenLine xmlns:a14="http://schemas.microsoft.com/office/drawing/2010/main" xmlns="" w="9525">
+                <a14:hiddenLine xmlns="" xmlns:a14="http://schemas.microsoft.com/office/drawing/2010/main" w="9525">
                   <a:solidFill>
                     <a:srgbClr val="000000"/>
                   </a:solidFill>
@@ -8677,7 +8678,7 @@
             </a:ln>
             <a:extLst>
               <a:ext uri="{91240B29-F687-4f45-9708-019B960494DF}">
-                <a14:hiddenLine xmlns:a14="http://schemas.microsoft.com/office/drawing/2010/main" xmlns="" w="9525">
+                <a14:hiddenLine xmlns="" xmlns:a14="http://schemas.microsoft.com/office/drawing/2010/main" w="9525">
                   <a:solidFill>
                     <a:srgbClr val="000000"/>
                   </a:solidFill>
@@ -8767,7 +8768,7 @@
             </a:ln>
             <a:extLst>
               <a:ext uri="{91240B29-F687-4f45-9708-019B960494DF}">
-                <a14:hiddenLine xmlns:a14="http://schemas.microsoft.com/office/drawing/2010/main" xmlns="" w="9525">
+                <a14:hiddenLine xmlns="" xmlns:a14="http://schemas.microsoft.com/office/drawing/2010/main" w="9525">
                   <a:solidFill>
                     <a:srgbClr val="000000"/>
                   </a:solidFill>
@@ -8823,7 +8824,7 @@
             </a:ln>
             <a:extLst>
               <a:ext uri="{91240B29-F687-4f45-9708-019B960494DF}">
-                <a14:hiddenLine xmlns:a14="http://schemas.microsoft.com/office/drawing/2010/main" xmlns="" w="9525">
+                <a14:hiddenLine xmlns="" xmlns:a14="http://schemas.microsoft.com/office/drawing/2010/main" w="9525">
                   <a:solidFill>
                     <a:srgbClr val="000000"/>
                   </a:solidFill>
@@ -8913,7 +8914,7 @@
             </a:ln>
             <a:extLst>
               <a:ext uri="{91240B29-F687-4f45-9708-019B960494DF}">
-                <a14:hiddenLine xmlns:a14="http://schemas.microsoft.com/office/drawing/2010/main" xmlns="" w="9525">
+                <a14:hiddenLine xmlns="" xmlns:a14="http://schemas.microsoft.com/office/drawing/2010/main" w="9525">
                   <a:solidFill>
                     <a:srgbClr val="000000"/>
                   </a:solidFill>
@@ -8981,7 +8982,7 @@
             </a:ln>
             <a:extLst>
               <a:ext uri="{91240B29-F687-4f45-9708-019B960494DF}">
-                <a14:hiddenLine xmlns:a14="http://schemas.microsoft.com/office/drawing/2010/main" xmlns="" w="9525">
+                <a14:hiddenLine xmlns="" xmlns:a14="http://schemas.microsoft.com/office/drawing/2010/main" w="9525">
                   <a:solidFill>
                     <a:srgbClr val="000000"/>
                   </a:solidFill>
@@ -9071,7 +9072,7 @@
             </a:ln>
             <a:extLst>
               <a:ext uri="{91240B29-F687-4f45-9708-019B960494DF}">
-                <a14:hiddenLine xmlns:a14="http://schemas.microsoft.com/office/drawing/2010/main" xmlns="" w="9525">
+                <a14:hiddenLine xmlns="" xmlns:a14="http://schemas.microsoft.com/office/drawing/2010/main" w="9525">
                   <a:solidFill>
                     <a:srgbClr val="000000"/>
                   </a:solidFill>
@@ -9139,7 +9140,7 @@
             </a:ln>
             <a:extLst>
               <a:ext uri="{91240B29-F687-4f45-9708-019B960494DF}">
-                <a14:hiddenLine xmlns:a14="http://schemas.microsoft.com/office/drawing/2010/main" xmlns="" w="9525">
+                <a14:hiddenLine xmlns="" xmlns:a14="http://schemas.microsoft.com/office/drawing/2010/main" w="9525">
                   <a:solidFill>
                     <a:srgbClr val="000000"/>
                   </a:solidFill>
@@ -9229,7 +9230,7 @@
             </a:ln>
             <a:extLst>
               <a:ext uri="{91240B29-F687-4f45-9708-019B960494DF}">
-                <a14:hiddenLine xmlns:a14="http://schemas.microsoft.com/office/drawing/2010/main" xmlns="" w="9525">
+                <a14:hiddenLine xmlns="" xmlns:a14="http://schemas.microsoft.com/office/drawing/2010/main" w="9525">
                   <a:solidFill>
                     <a:srgbClr val="000000"/>
                   </a:solidFill>
@@ -9263,7 +9264,7 @@
             </a:ln>
             <a:extLst>
               <a:ext uri="{91240B29-F687-4f45-9708-019B960494DF}">
-                <a14:hiddenLine xmlns:a14="http://schemas.microsoft.com/office/drawing/2010/main" xmlns="" w="9525">
+                <a14:hiddenLine xmlns="" xmlns:a14="http://schemas.microsoft.com/office/drawing/2010/main" w="9525">
                   <a:solidFill>
                     <a:srgbClr val="000000"/>
                   </a:solidFill>
@@ -9353,7 +9354,7 @@
             </a:ln>
             <a:extLst>
               <a:ext uri="{91240B29-F687-4f45-9708-019B960494DF}">
-                <a14:hiddenLine xmlns:a14="http://schemas.microsoft.com/office/drawing/2010/main" xmlns="" w="9525">
+                <a14:hiddenLine xmlns="" xmlns:a14="http://schemas.microsoft.com/office/drawing/2010/main" w="9525">
                   <a:solidFill>
                     <a:srgbClr val="000000"/>
                   </a:solidFill>
@@ -9415,7 +9416,7 @@
             </a:ln>
             <a:extLst>
               <a:ext uri="{91240B29-F687-4f45-9708-019B960494DF}">
-                <a14:hiddenLine xmlns:a14="http://schemas.microsoft.com/office/drawing/2010/main" xmlns="" w="9525">
+                <a14:hiddenLine xmlns="" xmlns:a14="http://schemas.microsoft.com/office/drawing/2010/main" w="9525">
                   <a:solidFill>
                     <a:srgbClr val="000000"/>
                   </a:solidFill>
@@ -9477,7 +9478,7 @@
             </a:ln>
             <a:extLst>
               <a:ext uri="{91240B29-F687-4f45-9708-019B960494DF}">
-                <a14:hiddenLine xmlns:a14="http://schemas.microsoft.com/office/drawing/2010/main" xmlns="" w="9525">
+                <a14:hiddenLine xmlns="" xmlns:a14="http://schemas.microsoft.com/office/drawing/2010/main" w="9525">
                   <a:solidFill>
                     <a:srgbClr val="000000"/>
                   </a:solidFill>
@@ -9567,7 +9568,7 @@
             </a:ln>
             <a:extLst>
               <a:ext uri="{91240B29-F687-4f45-9708-019B960494DF}">
-                <a14:hiddenLine xmlns:a14="http://schemas.microsoft.com/office/drawing/2010/main" xmlns="" w="9525">
+                <a14:hiddenLine xmlns="" xmlns:a14="http://schemas.microsoft.com/office/drawing/2010/main" w="9525">
                   <a:solidFill>
                     <a:srgbClr val="000000"/>
                   </a:solidFill>
@@ -9635,7 +9636,7 @@
             </a:ln>
             <a:extLst>
               <a:ext uri="{91240B29-F687-4f45-9708-019B960494DF}">
-                <a14:hiddenLine xmlns:a14="http://schemas.microsoft.com/office/drawing/2010/main" xmlns="" w="9525">
+                <a14:hiddenLine xmlns="" xmlns:a14="http://schemas.microsoft.com/office/drawing/2010/main" w="9525">
                   <a:solidFill>
                     <a:srgbClr val="000000"/>
                   </a:solidFill>
@@ -9697,7 +9698,7 @@
             </a:ln>
             <a:extLst>
               <a:ext uri="{91240B29-F687-4f45-9708-019B960494DF}">
-                <a14:hiddenLine xmlns:a14="http://schemas.microsoft.com/office/drawing/2010/main" xmlns="" w="9525">
+                <a14:hiddenLine xmlns="" xmlns:a14="http://schemas.microsoft.com/office/drawing/2010/main" w="9525">
                   <a:solidFill>
                     <a:srgbClr val="000000"/>
                   </a:solidFill>
@@ -9787,7 +9788,7 @@
             </a:ln>
             <a:extLst>
               <a:ext uri="{91240B29-F687-4f45-9708-019B960494DF}">
-                <a14:hiddenLine xmlns:a14="http://schemas.microsoft.com/office/drawing/2010/main" xmlns="" w="9525">
+                <a14:hiddenLine xmlns="" xmlns:a14="http://schemas.microsoft.com/office/drawing/2010/main" w="9525">
                   <a:solidFill>
                     <a:srgbClr val="000000"/>
                   </a:solidFill>
@@ -9849,7 +9850,7 @@
             </a:ln>
             <a:extLst>
               <a:ext uri="{91240B29-F687-4f45-9708-019B960494DF}">
-                <a14:hiddenLine xmlns:a14="http://schemas.microsoft.com/office/drawing/2010/main" xmlns="" w="9525">
+                <a14:hiddenLine xmlns="" xmlns:a14="http://schemas.microsoft.com/office/drawing/2010/main" w="9525">
                   <a:solidFill>
                     <a:srgbClr val="000000"/>
                   </a:solidFill>
@@ -9939,7 +9940,7 @@
             </a:ln>
             <a:extLst>
               <a:ext uri="{91240B29-F687-4f45-9708-019B960494DF}">
-                <a14:hiddenLine xmlns:a14="http://schemas.microsoft.com/office/drawing/2010/main" xmlns="" w="9525">
+                <a14:hiddenLine xmlns="" xmlns:a14="http://schemas.microsoft.com/office/drawing/2010/main" w="9525">
                   <a:solidFill>
                     <a:srgbClr val="000000"/>
                   </a:solidFill>
@@ -10001,7 +10002,7 @@
             </a:ln>
             <a:extLst>
               <a:ext uri="{91240B29-F687-4f45-9708-019B960494DF}">
-                <a14:hiddenLine xmlns:a14="http://schemas.microsoft.com/office/drawing/2010/main" xmlns="" w="9525">
+                <a14:hiddenLine xmlns="" xmlns:a14="http://schemas.microsoft.com/office/drawing/2010/main" w="9525">
                   <a:solidFill>
                     <a:srgbClr val="000000"/>
                   </a:solidFill>
@@ -10091,7 +10092,7 @@
             </a:ln>
             <a:extLst>
               <a:ext uri="{91240B29-F687-4f45-9708-019B960494DF}">
-                <a14:hiddenLine xmlns:a14="http://schemas.microsoft.com/office/drawing/2010/main" xmlns="" w="9525">
+                <a14:hiddenLine xmlns="" xmlns:a14="http://schemas.microsoft.com/office/drawing/2010/main" w="9525">
                   <a:solidFill>
                     <a:srgbClr val="000000"/>
                   </a:solidFill>
@@ -10125,7 +10126,7 @@
             </a:ln>
             <a:extLst>
               <a:ext uri="{91240B29-F687-4f45-9708-019B960494DF}">
-                <a14:hiddenLine xmlns:a14="http://schemas.microsoft.com/office/drawing/2010/main" xmlns="" w="9525">
+                <a14:hiddenLine xmlns="" xmlns:a14="http://schemas.microsoft.com/office/drawing/2010/main" w="9525">
                   <a:solidFill>
                     <a:srgbClr val="000000"/>
                   </a:solidFill>
@@ -10190,7 +10191,7 @@
             </a:ln>
             <a:extLst>
               <a:ext uri="{91240B29-F687-4f45-9708-019B960494DF}">
-                <a14:hiddenLine xmlns:a14="http://schemas.microsoft.com/office/drawing/2010/main" xmlns="" w="9525">
+                <a14:hiddenLine xmlns="" xmlns:a14="http://schemas.microsoft.com/office/drawing/2010/main" w="9525">
                   <a:solidFill>
                     <a:srgbClr val="000000"/>
                   </a:solidFill>
@@ -10280,7 +10281,7 @@
             </a:ln>
             <a:extLst>
               <a:ext uri="{91240B29-F687-4f45-9708-019B960494DF}">
-                <a14:hiddenLine xmlns:a14="http://schemas.microsoft.com/office/drawing/2010/main" xmlns="" w="9525">
+                <a14:hiddenLine xmlns="" xmlns:a14="http://schemas.microsoft.com/office/drawing/2010/main" w="9525">
                   <a:solidFill>
                     <a:srgbClr val="000000"/>
                   </a:solidFill>
@@ -10342,7 +10343,7 @@
             </a:ln>
             <a:extLst>
               <a:ext uri="{91240B29-F687-4f45-9708-019B960494DF}">
-                <a14:hiddenLine xmlns:a14="http://schemas.microsoft.com/office/drawing/2010/main" xmlns="" w="9525">
+                <a14:hiddenLine xmlns="" xmlns:a14="http://schemas.microsoft.com/office/drawing/2010/main" w="9525">
                   <a:solidFill>
                     <a:srgbClr val="000000"/>
                   </a:solidFill>
@@ -10432,7 +10433,7 @@
             </a:ln>
             <a:extLst>
               <a:ext uri="{91240B29-F687-4f45-9708-019B960494DF}">
-                <a14:hiddenLine xmlns:a14="http://schemas.microsoft.com/office/drawing/2010/main" xmlns="" w="9525">
+                <a14:hiddenLine xmlns="" xmlns:a14="http://schemas.microsoft.com/office/drawing/2010/main" w="9525">
                   <a:solidFill>
                     <a:srgbClr val="000000"/>
                   </a:solidFill>
@@ -10522,7 +10523,7 @@
             </a:ln>
             <a:extLst>
               <a:ext uri="{91240B29-F687-4f45-9708-019B960494DF}">
-                <a14:hiddenLine xmlns:a14="http://schemas.microsoft.com/office/drawing/2010/main" xmlns="" w="9525">
+                <a14:hiddenLine xmlns="" xmlns:a14="http://schemas.microsoft.com/office/drawing/2010/main" w="9525">
                   <a:solidFill>
                     <a:srgbClr val="000000"/>
                   </a:solidFill>
@@ -10587,7 +10588,7 @@
             </a:ln>
             <a:extLst>
               <a:ext uri="{91240B29-F687-4f45-9708-019B960494DF}">
-                <a14:hiddenLine xmlns:a14="http://schemas.microsoft.com/office/drawing/2010/main" xmlns="" w="9525">
+                <a14:hiddenLine xmlns="" xmlns:a14="http://schemas.microsoft.com/office/drawing/2010/main" w="9525">
                   <a:solidFill>
                     <a:srgbClr val="000000"/>
                   </a:solidFill>
@@ -10649,7 +10650,7 @@
             </a:ln>
             <a:extLst>
               <a:ext uri="{91240B29-F687-4f45-9708-019B960494DF}">
-                <a14:hiddenLine xmlns:a14="http://schemas.microsoft.com/office/drawing/2010/main" xmlns="" w="9525">
+                <a14:hiddenLine xmlns="" xmlns:a14="http://schemas.microsoft.com/office/drawing/2010/main" w="9525">
                   <a:solidFill>
                     <a:srgbClr val="000000"/>
                   </a:solidFill>
@@ -10739,7 +10740,7 @@
             </a:ln>
             <a:extLst>
               <a:ext uri="{91240B29-F687-4f45-9708-019B960494DF}">
-                <a14:hiddenLine xmlns:a14="http://schemas.microsoft.com/office/drawing/2010/main" xmlns="" w="9525">
+                <a14:hiddenLine xmlns="" xmlns:a14="http://schemas.microsoft.com/office/drawing/2010/main" w="9525">
                   <a:solidFill>
                     <a:srgbClr val="000000"/>
                   </a:solidFill>
@@ -10829,7 +10830,7 @@
             </a:ln>
             <a:extLst>
               <a:ext uri="{91240B29-F687-4f45-9708-019B960494DF}">
-                <a14:hiddenLine xmlns:a14="http://schemas.microsoft.com/office/drawing/2010/main" xmlns="" w="9525">
+                <a14:hiddenLine xmlns="" xmlns:a14="http://schemas.microsoft.com/office/drawing/2010/main" w="9525">
                   <a:solidFill>
                     <a:srgbClr val="000000"/>
                   </a:solidFill>
@@ -10891,7 +10892,7 @@
             </a:ln>
             <a:extLst>
               <a:ext uri="{91240B29-F687-4f45-9708-019B960494DF}">
-                <a14:hiddenLine xmlns:a14="http://schemas.microsoft.com/office/drawing/2010/main" xmlns="" w="9525">
+                <a14:hiddenLine xmlns="" xmlns:a14="http://schemas.microsoft.com/office/drawing/2010/main" w="9525">
                   <a:solidFill>
                     <a:srgbClr val="000000"/>
                   </a:solidFill>
@@ -11011,7 +11012,7 @@
             </a:ln>
             <a:extLst>
               <a:ext uri="{91240B29-F687-4f45-9708-019B960494DF}">
-                <a14:hiddenLine xmlns:a14="http://schemas.microsoft.com/office/drawing/2010/main" xmlns="" w="9525">
+                <a14:hiddenLine xmlns="" xmlns:a14="http://schemas.microsoft.com/office/drawing/2010/main" w="9525">
                   <a:solidFill>
                     <a:srgbClr val="000000"/>
                   </a:solidFill>
@@ -11079,7 +11080,7 @@
             </a:ln>
             <a:extLst>
               <a:ext uri="{91240B29-F687-4f45-9708-019B960494DF}">
-                <a14:hiddenLine xmlns:a14="http://schemas.microsoft.com/office/drawing/2010/main" xmlns="" w="9525">
+                <a14:hiddenLine xmlns="" xmlns:a14="http://schemas.microsoft.com/office/drawing/2010/main" w="9525">
                   <a:solidFill>
                     <a:srgbClr val="000000"/>
                   </a:solidFill>
@@ -11169,7 +11170,7 @@
             </a:ln>
             <a:extLst>
               <a:ext uri="{91240B29-F687-4f45-9708-019B960494DF}">
-                <a14:hiddenLine xmlns:a14="http://schemas.microsoft.com/office/drawing/2010/main" xmlns="" w="9525">
+                <a14:hiddenLine xmlns="" xmlns:a14="http://schemas.microsoft.com/office/drawing/2010/main" w="9525">
                   <a:solidFill>
                     <a:srgbClr val="000000"/>
                   </a:solidFill>
@@ -15891,7 +15892,7 @@
           <a:noFill/>
           <a:extLst>
             <a:ext uri="{909E8E84-426E-40dd-AFC4-6F175D3DCCD1}">
-              <a14:hiddenFill xmlns:a14="http://schemas.microsoft.com/office/drawing/2010/main" xmlns="">
+              <a14:hiddenFill xmlns="" xmlns:a14="http://schemas.microsoft.com/office/drawing/2010/main">
                 <a:solidFill>
                   <a:srgbClr val="FFFFFF"/>
                 </a:solidFill>
@@ -15965,7 +15966,7 @@
               </a:ln>
               <a:extLst>
                 <a:ext uri="{91240B29-F687-4f45-9708-019B960494DF}">
-                  <a14:hiddenLine xmlns:a14="http://schemas.microsoft.com/office/drawing/2010/main" xmlns="" w="9525">
+                  <a14:hiddenLine xmlns="" xmlns:a14="http://schemas.microsoft.com/office/drawing/2010/main" w="9525">
                     <a:solidFill>
                       <a:srgbClr val="000000"/>
                     </a:solidFill>
@@ -16055,7 +16056,7 @@
               </a:ln>
               <a:extLst>
                 <a:ext uri="{91240B29-F687-4f45-9708-019B960494DF}">
-                  <a14:hiddenLine xmlns:a14="http://schemas.microsoft.com/office/drawing/2010/main" xmlns="" w="9525">
+                  <a14:hiddenLine xmlns="" xmlns:a14="http://schemas.microsoft.com/office/drawing/2010/main" w="9525">
                     <a:solidFill>
                       <a:srgbClr val="000000"/>
                     </a:solidFill>
@@ -16145,7 +16146,7 @@
               </a:ln>
               <a:extLst>
                 <a:ext uri="{91240B29-F687-4f45-9708-019B960494DF}">
-                  <a14:hiddenLine xmlns:a14="http://schemas.microsoft.com/office/drawing/2010/main" xmlns="" w="9525">
+                  <a14:hiddenLine xmlns="" xmlns:a14="http://schemas.microsoft.com/office/drawing/2010/main" w="9525">
                     <a:solidFill>
                       <a:srgbClr val="000000"/>
                     </a:solidFill>
@@ -16207,7 +16208,7 @@
               </a:ln>
               <a:extLst>
                 <a:ext uri="{91240B29-F687-4f45-9708-019B960494DF}">
-                  <a14:hiddenLine xmlns:a14="http://schemas.microsoft.com/office/drawing/2010/main" xmlns="" w="9525">
+                  <a14:hiddenLine xmlns="" xmlns:a14="http://schemas.microsoft.com/office/drawing/2010/main" w="9525">
                     <a:solidFill>
                       <a:srgbClr val="000000"/>
                     </a:solidFill>
@@ -16297,7 +16298,7 @@
               </a:ln>
               <a:extLst>
                 <a:ext uri="{91240B29-F687-4f45-9708-019B960494DF}">
-                  <a14:hiddenLine xmlns:a14="http://schemas.microsoft.com/office/drawing/2010/main" xmlns="" w="9525">
+                  <a14:hiddenLine xmlns="" xmlns:a14="http://schemas.microsoft.com/office/drawing/2010/main" w="9525">
                     <a:solidFill>
                       <a:srgbClr val="000000"/>
                     </a:solidFill>
@@ -16359,7 +16360,7 @@
               </a:ln>
               <a:extLst>
                 <a:ext uri="{91240B29-F687-4f45-9708-019B960494DF}">
-                  <a14:hiddenLine xmlns:a14="http://schemas.microsoft.com/office/drawing/2010/main" xmlns="" w="9525">
+                  <a14:hiddenLine xmlns="" xmlns:a14="http://schemas.microsoft.com/office/drawing/2010/main" w="9525">
                     <a:solidFill>
                       <a:srgbClr val="000000"/>
                     </a:solidFill>
@@ -16421,7 +16422,7 @@
               </a:ln>
               <a:extLst>
                 <a:ext uri="{91240B29-F687-4f45-9708-019B960494DF}">
-                  <a14:hiddenLine xmlns:a14="http://schemas.microsoft.com/office/drawing/2010/main" xmlns="" w="9525">
+                  <a14:hiddenLine xmlns="" xmlns:a14="http://schemas.microsoft.com/office/drawing/2010/main" w="9525">
                     <a:solidFill>
                       <a:srgbClr val="000000"/>
                     </a:solidFill>
@@ -16511,7 +16512,7 @@
               </a:ln>
               <a:extLst>
                 <a:ext uri="{91240B29-F687-4f45-9708-019B960494DF}">
-                  <a14:hiddenLine xmlns:a14="http://schemas.microsoft.com/office/drawing/2010/main" xmlns="" w="9525">
+                  <a14:hiddenLine xmlns="" xmlns:a14="http://schemas.microsoft.com/office/drawing/2010/main" w="9525">
                     <a:solidFill>
                       <a:srgbClr val="000000"/>
                     </a:solidFill>
@@ -16601,7 +16602,7 @@
               </a:ln>
               <a:extLst>
                 <a:ext uri="{91240B29-F687-4f45-9708-019B960494DF}">
-                  <a14:hiddenLine xmlns:a14="http://schemas.microsoft.com/office/drawing/2010/main" xmlns="" w="9525">
+                  <a14:hiddenLine xmlns="" xmlns:a14="http://schemas.microsoft.com/office/drawing/2010/main" w="9525">
                     <a:solidFill>
                       <a:srgbClr val="000000"/>
                     </a:solidFill>
@@ -16663,7 +16664,7 @@
               </a:ln>
               <a:extLst>
                 <a:ext uri="{91240B29-F687-4f45-9708-019B960494DF}">
-                  <a14:hiddenLine xmlns:a14="http://schemas.microsoft.com/office/drawing/2010/main" xmlns="" w="9525">
+                  <a14:hiddenLine xmlns="" xmlns:a14="http://schemas.microsoft.com/office/drawing/2010/main" w="9525">
                     <a:solidFill>
                       <a:srgbClr val="000000"/>
                     </a:solidFill>
@@ -16773,7 +16774,7 @@
               </a:ln>
               <a:extLst>
                 <a:ext uri="{91240B29-F687-4f45-9708-019B960494DF}">
-                  <a14:hiddenLine xmlns:a14="http://schemas.microsoft.com/office/drawing/2010/main" xmlns="" w="9525">
+                  <a14:hiddenLine xmlns="" xmlns:a14="http://schemas.microsoft.com/office/drawing/2010/main" w="9525">
                     <a:solidFill>
                       <a:srgbClr val="000000"/>
                     </a:solidFill>
@@ -16857,7 +16858,7 @@
               </a:ln>
               <a:extLst>
                 <a:ext uri="{91240B29-F687-4f45-9708-019B960494DF}">
-                  <a14:hiddenLine xmlns:a14="http://schemas.microsoft.com/office/drawing/2010/main" xmlns="" w="9525">
+                  <a14:hiddenLine xmlns="" xmlns:a14="http://schemas.microsoft.com/office/drawing/2010/main" w="9525">
                     <a:solidFill>
                       <a:srgbClr val="000000"/>
                     </a:solidFill>
@@ -16919,7 +16920,7 @@
               </a:ln>
               <a:extLst>
                 <a:ext uri="{91240B29-F687-4f45-9708-019B960494DF}">
-                  <a14:hiddenLine xmlns:a14="http://schemas.microsoft.com/office/drawing/2010/main" xmlns="" w="9525">
+                  <a14:hiddenLine xmlns="" xmlns:a14="http://schemas.microsoft.com/office/drawing/2010/main" w="9525">
                     <a:solidFill>
                       <a:srgbClr val="000000"/>
                     </a:solidFill>
@@ -16981,7 +16982,7 @@
               </a:ln>
               <a:extLst>
                 <a:ext uri="{91240B29-F687-4f45-9708-019B960494DF}">
-                  <a14:hiddenLine xmlns:a14="http://schemas.microsoft.com/office/drawing/2010/main" xmlns="" w="9525">
+                  <a14:hiddenLine xmlns="" xmlns:a14="http://schemas.microsoft.com/office/drawing/2010/main" w="9525">
                     <a:solidFill>
                       <a:srgbClr val="000000"/>
                     </a:solidFill>
@@ -17071,7 +17072,7 @@
               </a:ln>
               <a:extLst>
                 <a:ext uri="{91240B29-F687-4f45-9708-019B960494DF}">
-                  <a14:hiddenLine xmlns:a14="http://schemas.microsoft.com/office/drawing/2010/main" xmlns="" w="9525">
+                  <a14:hiddenLine xmlns="" xmlns:a14="http://schemas.microsoft.com/office/drawing/2010/main" w="9525">
                     <a:solidFill>
                       <a:srgbClr val="000000"/>
                     </a:solidFill>
@@ -17105,7 +17106,7 @@
               </a:ln>
               <a:extLst>
                 <a:ext uri="{91240B29-F687-4f45-9708-019B960494DF}">
-                  <a14:hiddenLine xmlns:a14="http://schemas.microsoft.com/office/drawing/2010/main" xmlns="" w="9525">
+                  <a14:hiddenLine xmlns="" xmlns:a14="http://schemas.microsoft.com/office/drawing/2010/main" w="9525">
                     <a:solidFill>
                       <a:srgbClr val="000000"/>
                     </a:solidFill>
@@ -17170,7 +17171,7 @@
               </a:ln>
               <a:extLst>
                 <a:ext uri="{91240B29-F687-4f45-9708-019B960494DF}">
-                  <a14:hiddenLine xmlns:a14="http://schemas.microsoft.com/office/drawing/2010/main" xmlns="" w="9525">
+                  <a14:hiddenLine xmlns="" xmlns:a14="http://schemas.microsoft.com/office/drawing/2010/main" w="9525">
                     <a:solidFill>
                       <a:srgbClr val="000000"/>
                     </a:solidFill>
@@ -17260,7 +17261,7 @@
               </a:ln>
               <a:extLst>
                 <a:ext uri="{91240B29-F687-4f45-9708-019B960494DF}">
-                  <a14:hiddenLine xmlns:a14="http://schemas.microsoft.com/office/drawing/2010/main" xmlns="" w="9525">
+                  <a14:hiddenLine xmlns="" xmlns:a14="http://schemas.microsoft.com/office/drawing/2010/main" w="9525">
                     <a:solidFill>
                       <a:srgbClr val="000000"/>
                     </a:solidFill>
@@ -17322,7 +17323,7 @@
               </a:ln>
               <a:extLst>
                 <a:ext uri="{91240B29-F687-4f45-9708-019B960494DF}">
-                  <a14:hiddenLine xmlns:a14="http://schemas.microsoft.com/office/drawing/2010/main" xmlns="" w="9525">
+                  <a14:hiddenLine xmlns="" xmlns:a14="http://schemas.microsoft.com/office/drawing/2010/main" w="9525">
                     <a:solidFill>
                       <a:srgbClr val="000000"/>
                     </a:solidFill>
@@ -17412,7 +17413,7 @@
               </a:ln>
               <a:extLst>
                 <a:ext uri="{91240B29-F687-4f45-9708-019B960494DF}">
-                  <a14:hiddenLine xmlns:a14="http://schemas.microsoft.com/office/drawing/2010/main" xmlns="" w="9525">
+                  <a14:hiddenLine xmlns="" xmlns:a14="http://schemas.microsoft.com/office/drawing/2010/main" w="9525">
                     <a:solidFill>
                       <a:srgbClr val="000000"/>
                     </a:solidFill>
@@ -17477,7 +17478,7 @@
               </a:ln>
               <a:extLst>
                 <a:ext uri="{91240B29-F687-4f45-9708-019B960494DF}">
-                  <a14:hiddenLine xmlns:a14="http://schemas.microsoft.com/office/drawing/2010/main" xmlns="" w="9525">
+                  <a14:hiddenLine xmlns="" xmlns:a14="http://schemas.microsoft.com/office/drawing/2010/main" w="9525">
                     <a:solidFill>
                       <a:srgbClr val="000000"/>
                     </a:solidFill>
@@ -17539,7 +17540,7 @@
               </a:ln>
               <a:extLst>
                 <a:ext uri="{91240B29-F687-4f45-9708-019B960494DF}">
-                  <a14:hiddenLine xmlns:a14="http://schemas.microsoft.com/office/drawing/2010/main" xmlns="" w="9525">
+                  <a14:hiddenLine xmlns="" xmlns:a14="http://schemas.microsoft.com/office/drawing/2010/main" w="9525">
                     <a:solidFill>
                       <a:srgbClr val="000000"/>
                     </a:solidFill>
@@ -17629,7 +17630,7 @@
               </a:ln>
               <a:extLst>
                 <a:ext uri="{91240B29-F687-4f45-9708-019B960494DF}">
-                  <a14:hiddenLine xmlns:a14="http://schemas.microsoft.com/office/drawing/2010/main" xmlns="" w="9525">
+                  <a14:hiddenLine xmlns="" xmlns:a14="http://schemas.microsoft.com/office/drawing/2010/main" w="9525">
                     <a:solidFill>
                       <a:srgbClr val="000000"/>
                     </a:solidFill>
@@ -17719,7 +17720,7 @@
               </a:ln>
               <a:extLst>
                 <a:ext uri="{91240B29-F687-4f45-9708-019B960494DF}">
-                  <a14:hiddenLine xmlns:a14="http://schemas.microsoft.com/office/drawing/2010/main" xmlns="" w="9525">
+                  <a14:hiddenLine xmlns="" xmlns:a14="http://schemas.microsoft.com/office/drawing/2010/main" w="9525">
                     <a:solidFill>
                       <a:srgbClr val="000000"/>
                     </a:solidFill>
@@ -17784,7 +17785,7 @@
               </a:ln>
               <a:extLst>
                 <a:ext uri="{91240B29-F687-4f45-9708-019B960494DF}">
-                  <a14:hiddenLine xmlns:a14="http://schemas.microsoft.com/office/drawing/2010/main" xmlns="" w="9525">
+                  <a14:hiddenLine xmlns="" xmlns:a14="http://schemas.microsoft.com/office/drawing/2010/main" w="9525">
                     <a:solidFill>
                       <a:srgbClr val="000000"/>
                     </a:solidFill>
@@ -17904,7 +17905,7 @@
               </a:ln>
               <a:extLst>
                 <a:ext uri="{91240B29-F687-4f45-9708-019B960494DF}">
-                  <a14:hiddenLine xmlns:a14="http://schemas.microsoft.com/office/drawing/2010/main" xmlns="" w="9525">
+                  <a14:hiddenLine xmlns="" xmlns:a14="http://schemas.microsoft.com/office/drawing/2010/main" w="9525">
                     <a:solidFill>
                       <a:srgbClr val="000000"/>
                     </a:solidFill>
@@ -18002,7 +18003,7 @@
               </a:ln>
               <a:extLst>
                 <a:ext uri="{91240B29-F687-4f45-9708-019B960494DF}">
-                  <a14:hiddenLine xmlns:a14="http://schemas.microsoft.com/office/drawing/2010/main" xmlns="" w="9525">
+                  <a14:hiddenLine xmlns="" xmlns:a14="http://schemas.microsoft.com/office/drawing/2010/main" w="9525">
                     <a:solidFill>
                       <a:srgbClr val="000000"/>
                     </a:solidFill>
@@ -18117,7 +18118,7 @@
               </a:ln>
               <a:extLst>
                 <a:ext uri="{91240B29-F687-4f45-9708-019B960494DF}">
-                  <a14:hiddenLine xmlns:a14="http://schemas.microsoft.com/office/drawing/2010/main" xmlns="" w="9525">
+                  <a14:hiddenLine xmlns="" xmlns:a14="http://schemas.microsoft.com/office/drawing/2010/main" w="9525">
                     <a:solidFill>
                       <a:srgbClr val="000000"/>
                     </a:solidFill>
@@ -18207,7 +18208,7 @@
               </a:ln>
               <a:extLst>
                 <a:ext uri="{91240B29-F687-4f45-9708-019B960494DF}">
-                  <a14:hiddenLine xmlns:a14="http://schemas.microsoft.com/office/drawing/2010/main" xmlns="" w="9525">
+                  <a14:hiddenLine xmlns="" xmlns:a14="http://schemas.microsoft.com/office/drawing/2010/main" w="9525">
                     <a:solidFill>
                       <a:srgbClr val="000000"/>
                     </a:solidFill>
@@ -18272,7 +18273,7 @@
               </a:ln>
               <a:extLst>
                 <a:ext uri="{91240B29-F687-4f45-9708-019B960494DF}">
-                  <a14:hiddenLine xmlns:a14="http://schemas.microsoft.com/office/drawing/2010/main" xmlns="" w="9525">
+                  <a14:hiddenLine xmlns="" xmlns:a14="http://schemas.microsoft.com/office/drawing/2010/main" w="9525">
                     <a:solidFill>
                       <a:srgbClr val="000000"/>
                     </a:solidFill>
@@ -18362,7 +18363,7 @@
               </a:ln>
               <a:extLst>
                 <a:ext uri="{91240B29-F687-4f45-9708-019B960494DF}">
-                  <a14:hiddenLine xmlns:a14="http://schemas.microsoft.com/office/drawing/2010/main" xmlns="" w="9525">
+                  <a14:hiddenLine xmlns="" xmlns:a14="http://schemas.microsoft.com/office/drawing/2010/main" w="9525">
                     <a:solidFill>
                       <a:srgbClr val="000000"/>
                     </a:solidFill>
@@ -18430,7 +18431,7 @@
               </a:ln>
               <a:extLst>
                 <a:ext uri="{91240B29-F687-4f45-9708-019B960494DF}">
-                  <a14:hiddenLine xmlns:a14="http://schemas.microsoft.com/office/drawing/2010/main" xmlns="" w="9525">
+                  <a14:hiddenLine xmlns="" xmlns:a14="http://schemas.microsoft.com/office/drawing/2010/main" w="9525">
                     <a:solidFill>
                       <a:srgbClr val="000000"/>
                     </a:solidFill>
@@ -18520,7 +18521,7 @@
               </a:ln>
               <a:extLst>
                 <a:ext uri="{91240B29-F687-4f45-9708-019B960494DF}">
-                  <a14:hiddenLine xmlns:a14="http://schemas.microsoft.com/office/drawing/2010/main" xmlns="" w="9525">
+                  <a14:hiddenLine xmlns="" xmlns:a14="http://schemas.microsoft.com/office/drawing/2010/main" w="9525">
                     <a:solidFill>
                       <a:srgbClr val="000000"/>
                     </a:solidFill>
@@ -18588,7 +18589,7 @@
               </a:ln>
               <a:extLst>
                 <a:ext uri="{91240B29-F687-4f45-9708-019B960494DF}">
-                  <a14:hiddenLine xmlns:a14="http://schemas.microsoft.com/office/drawing/2010/main" xmlns="" w="9525">
+                  <a14:hiddenLine xmlns="" xmlns:a14="http://schemas.microsoft.com/office/drawing/2010/main" w="9525">
                     <a:solidFill>
                       <a:srgbClr val="000000"/>
                     </a:solidFill>
@@ -18678,7 +18679,7 @@
               </a:ln>
               <a:extLst>
                 <a:ext uri="{91240B29-F687-4f45-9708-019B960494DF}">
-                  <a14:hiddenLine xmlns:a14="http://schemas.microsoft.com/office/drawing/2010/main" xmlns="" w="9525">
+                  <a14:hiddenLine xmlns="" xmlns:a14="http://schemas.microsoft.com/office/drawing/2010/main" w="9525">
                     <a:solidFill>
                       <a:srgbClr val="000000"/>
                     </a:solidFill>
@@ -18712,7 +18713,7 @@
               </a:ln>
               <a:extLst>
                 <a:ext uri="{91240B29-F687-4f45-9708-019B960494DF}">
-                  <a14:hiddenLine xmlns:a14="http://schemas.microsoft.com/office/drawing/2010/main" xmlns="" w="9525">
+                  <a14:hiddenLine xmlns="" xmlns:a14="http://schemas.microsoft.com/office/drawing/2010/main" w="9525">
                     <a:solidFill>
                       <a:srgbClr val="000000"/>
                     </a:solidFill>
@@ -19463,7 +19464,7 @@
           <a:noFill/>
           <a:extLst>
             <a:ext uri="{909E8E84-426E-40dd-AFC4-6F175D3DCCD1}">
-              <a14:hiddenFill xmlns="" xmlns:a16="http://schemas.microsoft.com/office/drawing/2014/main" xmlns:p14="http://schemas.microsoft.com/office/powerpoint/2010/main" xmlns:a14="http://schemas.microsoft.com/office/drawing/2010/main">
+              <a14:hiddenFill xmlns:a14="http://schemas.microsoft.com/office/drawing/2010/main" xmlns:p14="http://schemas.microsoft.com/office/powerpoint/2010/main" xmlns:a16="http://schemas.microsoft.com/office/drawing/2014/main" xmlns="">
                 <a:solidFill>
                   <a:srgbClr val="FFFFFF"/>
                 </a:solidFill>
@@ -19584,7 +19585,7 @@
               </a:ln>
               <a:extLst>
                 <a:ext uri="{91240B29-F687-4f45-9708-019B960494DF}">
-                  <a14:hiddenLine xmlns="" xmlns:a16="http://schemas.microsoft.com/office/drawing/2014/main" xmlns:p14="http://schemas.microsoft.com/office/powerpoint/2010/main" xmlns:a14="http://schemas.microsoft.com/office/drawing/2010/main" w="9525">
+                  <a14:hiddenLine xmlns:a14="http://schemas.microsoft.com/office/drawing/2010/main" xmlns:p14="http://schemas.microsoft.com/office/powerpoint/2010/main" xmlns:a16="http://schemas.microsoft.com/office/drawing/2014/main" xmlns="" w="9525">
                     <a:solidFill>
                       <a:srgbClr val="000000"/>
                     </a:solidFill>
@@ -19689,7 +19690,7 @@
               </a:ln>
               <a:extLst>
                 <a:ext uri="{91240B29-F687-4f45-9708-019B960494DF}">
-                  <a14:hiddenLine xmlns="" xmlns:a16="http://schemas.microsoft.com/office/drawing/2014/main" xmlns:p14="http://schemas.microsoft.com/office/powerpoint/2010/main" xmlns:a14="http://schemas.microsoft.com/office/drawing/2010/main" w="9525">
+                  <a14:hiddenLine xmlns:a14="http://schemas.microsoft.com/office/drawing/2010/main" xmlns:p14="http://schemas.microsoft.com/office/powerpoint/2010/main" xmlns:a16="http://schemas.microsoft.com/office/drawing/2014/main" xmlns="" w="9525">
                     <a:solidFill>
                       <a:srgbClr val="000000"/>
                     </a:solidFill>
@@ -19794,7 +19795,7 @@
               </a:ln>
               <a:extLst>
                 <a:ext uri="{91240B29-F687-4f45-9708-019B960494DF}">
-                  <a14:hiddenLine xmlns="" xmlns:a16="http://schemas.microsoft.com/office/drawing/2014/main" xmlns:p14="http://schemas.microsoft.com/office/powerpoint/2010/main" xmlns:a14="http://schemas.microsoft.com/office/drawing/2010/main" w="9525">
+                  <a14:hiddenLine xmlns:a14="http://schemas.microsoft.com/office/drawing/2010/main" xmlns:p14="http://schemas.microsoft.com/office/powerpoint/2010/main" xmlns:a16="http://schemas.microsoft.com/office/drawing/2014/main" xmlns="" w="9525">
                     <a:solidFill>
                       <a:srgbClr val="000000"/>
                     </a:solidFill>
@@ -19871,7 +19872,7 @@
               </a:ln>
               <a:extLst>
                 <a:ext uri="{91240B29-F687-4f45-9708-019B960494DF}">
-                  <a14:hiddenLine xmlns="" xmlns:a16="http://schemas.microsoft.com/office/drawing/2014/main" xmlns:p14="http://schemas.microsoft.com/office/powerpoint/2010/main" xmlns:a14="http://schemas.microsoft.com/office/drawing/2010/main" w="9525">
+                  <a14:hiddenLine xmlns:a14="http://schemas.microsoft.com/office/drawing/2010/main" xmlns:p14="http://schemas.microsoft.com/office/powerpoint/2010/main" xmlns:a16="http://schemas.microsoft.com/office/drawing/2014/main" xmlns="" w="9525">
                     <a:solidFill>
                       <a:srgbClr val="000000"/>
                     </a:solidFill>
@@ -19976,7 +19977,7 @@
               </a:ln>
               <a:extLst>
                 <a:ext uri="{91240B29-F687-4f45-9708-019B960494DF}">
-                  <a14:hiddenLine xmlns="" xmlns:a16="http://schemas.microsoft.com/office/drawing/2014/main" xmlns:p14="http://schemas.microsoft.com/office/powerpoint/2010/main" xmlns:a14="http://schemas.microsoft.com/office/drawing/2010/main" w="9525">
+                  <a14:hiddenLine xmlns:a14="http://schemas.microsoft.com/office/drawing/2010/main" xmlns:p14="http://schemas.microsoft.com/office/powerpoint/2010/main" xmlns:a16="http://schemas.microsoft.com/office/drawing/2014/main" xmlns="" w="9525">
                     <a:solidFill>
                       <a:srgbClr val="000000"/>
                     </a:solidFill>
@@ -20053,7 +20054,7 @@
               </a:ln>
               <a:extLst>
                 <a:ext uri="{91240B29-F687-4f45-9708-019B960494DF}">
-                  <a14:hiddenLine xmlns="" xmlns:a16="http://schemas.microsoft.com/office/drawing/2014/main" xmlns:p14="http://schemas.microsoft.com/office/powerpoint/2010/main" xmlns:a14="http://schemas.microsoft.com/office/drawing/2010/main" w="9525">
+                  <a14:hiddenLine xmlns:a14="http://schemas.microsoft.com/office/drawing/2010/main" xmlns:p14="http://schemas.microsoft.com/office/powerpoint/2010/main" xmlns:a16="http://schemas.microsoft.com/office/drawing/2014/main" xmlns="" w="9525">
                     <a:solidFill>
                       <a:srgbClr val="000000"/>
                     </a:solidFill>
@@ -20130,7 +20131,7 @@
               </a:ln>
               <a:extLst>
                 <a:ext uri="{91240B29-F687-4f45-9708-019B960494DF}">
-                  <a14:hiddenLine xmlns="" xmlns:a16="http://schemas.microsoft.com/office/drawing/2014/main" xmlns:p14="http://schemas.microsoft.com/office/powerpoint/2010/main" xmlns:a14="http://schemas.microsoft.com/office/drawing/2010/main" w="9525">
+                  <a14:hiddenLine xmlns:a14="http://schemas.microsoft.com/office/drawing/2010/main" xmlns:p14="http://schemas.microsoft.com/office/powerpoint/2010/main" xmlns:a16="http://schemas.microsoft.com/office/drawing/2014/main" xmlns="" w="9525">
                     <a:solidFill>
                       <a:srgbClr val="000000"/>
                     </a:solidFill>
@@ -20235,7 +20236,7 @@
               </a:ln>
               <a:extLst>
                 <a:ext uri="{91240B29-F687-4f45-9708-019B960494DF}">
-                  <a14:hiddenLine xmlns="" xmlns:a16="http://schemas.microsoft.com/office/drawing/2014/main" xmlns:p14="http://schemas.microsoft.com/office/powerpoint/2010/main" xmlns:a14="http://schemas.microsoft.com/office/drawing/2010/main" w="9525">
+                  <a14:hiddenLine xmlns:a14="http://schemas.microsoft.com/office/drawing/2010/main" xmlns:p14="http://schemas.microsoft.com/office/powerpoint/2010/main" xmlns:a16="http://schemas.microsoft.com/office/drawing/2014/main" xmlns="" w="9525">
                     <a:solidFill>
                       <a:srgbClr val="000000"/>
                     </a:solidFill>
@@ -20340,7 +20341,7 @@
               </a:ln>
               <a:extLst>
                 <a:ext uri="{91240B29-F687-4f45-9708-019B960494DF}">
-                  <a14:hiddenLine xmlns="" xmlns:a16="http://schemas.microsoft.com/office/drawing/2014/main" xmlns:p14="http://schemas.microsoft.com/office/powerpoint/2010/main" xmlns:a14="http://schemas.microsoft.com/office/drawing/2010/main" w="9525">
+                  <a14:hiddenLine xmlns:a14="http://schemas.microsoft.com/office/drawing/2010/main" xmlns:p14="http://schemas.microsoft.com/office/powerpoint/2010/main" xmlns:a16="http://schemas.microsoft.com/office/drawing/2014/main" xmlns="" w="9525">
                     <a:solidFill>
                       <a:srgbClr val="000000"/>
                     </a:solidFill>
@@ -20417,7 +20418,7 @@
               </a:ln>
               <a:extLst>
                 <a:ext uri="{91240B29-F687-4f45-9708-019B960494DF}">
-                  <a14:hiddenLine xmlns="" xmlns:a16="http://schemas.microsoft.com/office/drawing/2014/main" xmlns:p14="http://schemas.microsoft.com/office/powerpoint/2010/main" xmlns:a14="http://schemas.microsoft.com/office/drawing/2010/main" w="9525">
+                  <a14:hiddenLine xmlns:a14="http://schemas.microsoft.com/office/drawing/2010/main" xmlns:p14="http://schemas.microsoft.com/office/powerpoint/2010/main" xmlns:a16="http://schemas.microsoft.com/office/drawing/2014/main" xmlns="" w="9525">
                     <a:solidFill>
                       <a:srgbClr val="000000"/>
                     </a:solidFill>
@@ -20542,7 +20543,7 @@
               </a:ln>
               <a:extLst>
                 <a:ext uri="{91240B29-F687-4f45-9708-019B960494DF}">
-                  <a14:hiddenLine xmlns="" xmlns:a16="http://schemas.microsoft.com/office/drawing/2014/main" xmlns:p14="http://schemas.microsoft.com/office/powerpoint/2010/main" xmlns:a14="http://schemas.microsoft.com/office/drawing/2010/main" w="9525">
+                  <a14:hiddenLine xmlns:a14="http://schemas.microsoft.com/office/drawing/2010/main" xmlns:p14="http://schemas.microsoft.com/office/powerpoint/2010/main" xmlns:a16="http://schemas.microsoft.com/office/drawing/2014/main" xmlns="" w="9525">
                     <a:solidFill>
                       <a:srgbClr val="000000"/>
                     </a:solidFill>
@@ -20656,7 +20657,7 @@
               </a:ln>
               <a:extLst>
                 <a:ext uri="{91240B29-F687-4f45-9708-019B960494DF}">
-                  <a14:hiddenLine xmlns="" xmlns:a16="http://schemas.microsoft.com/office/drawing/2014/main" xmlns:p14="http://schemas.microsoft.com/office/powerpoint/2010/main" xmlns:a14="http://schemas.microsoft.com/office/drawing/2010/main" w="9525">
+                  <a14:hiddenLine xmlns:a14="http://schemas.microsoft.com/office/drawing/2010/main" xmlns:p14="http://schemas.microsoft.com/office/powerpoint/2010/main" xmlns:a16="http://schemas.microsoft.com/office/drawing/2014/main" xmlns="" w="9525">
                     <a:solidFill>
                       <a:srgbClr val="000000"/>
                     </a:solidFill>
@@ -20733,7 +20734,7 @@
               </a:ln>
               <a:extLst>
                 <a:ext uri="{91240B29-F687-4f45-9708-019B960494DF}">
-                  <a14:hiddenLine xmlns="" xmlns:a16="http://schemas.microsoft.com/office/drawing/2014/main" xmlns:p14="http://schemas.microsoft.com/office/powerpoint/2010/main" xmlns:a14="http://schemas.microsoft.com/office/drawing/2010/main" w="9525">
+                  <a14:hiddenLine xmlns:a14="http://schemas.microsoft.com/office/drawing/2010/main" xmlns:p14="http://schemas.microsoft.com/office/powerpoint/2010/main" xmlns:a16="http://schemas.microsoft.com/office/drawing/2014/main" xmlns="" w="9525">
                     <a:solidFill>
                       <a:srgbClr val="000000"/>
                     </a:solidFill>
@@ -20810,7 +20811,7 @@
               </a:ln>
               <a:extLst>
                 <a:ext uri="{91240B29-F687-4f45-9708-019B960494DF}">
-                  <a14:hiddenLine xmlns="" xmlns:a16="http://schemas.microsoft.com/office/drawing/2014/main" xmlns:p14="http://schemas.microsoft.com/office/powerpoint/2010/main" xmlns:a14="http://schemas.microsoft.com/office/drawing/2010/main" w="9525">
+                  <a14:hiddenLine xmlns:a14="http://schemas.microsoft.com/office/drawing/2010/main" xmlns:p14="http://schemas.microsoft.com/office/powerpoint/2010/main" xmlns:a16="http://schemas.microsoft.com/office/drawing/2014/main" xmlns="" w="9525">
                     <a:solidFill>
                       <a:srgbClr val="000000"/>
                     </a:solidFill>
@@ -20915,7 +20916,7 @@
               </a:ln>
               <a:extLst>
                 <a:ext uri="{91240B29-F687-4f45-9708-019B960494DF}">
-                  <a14:hiddenLine xmlns="" xmlns:a16="http://schemas.microsoft.com/office/drawing/2014/main" xmlns:p14="http://schemas.microsoft.com/office/powerpoint/2010/main" xmlns:a14="http://schemas.microsoft.com/office/drawing/2010/main" w="9525">
+                  <a14:hiddenLine xmlns:a14="http://schemas.microsoft.com/office/drawing/2010/main" xmlns:p14="http://schemas.microsoft.com/office/powerpoint/2010/main" xmlns:a16="http://schemas.microsoft.com/office/drawing/2014/main" xmlns="" w="9525">
                     <a:solidFill>
                       <a:srgbClr val="000000"/>
                     </a:solidFill>
@@ -20964,7 +20965,7 @@
               </a:ln>
               <a:extLst>
                 <a:ext uri="{91240B29-F687-4f45-9708-019B960494DF}">
-                  <a14:hiddenLine xmlns="" xmlns:a16="http://schemas.microsoft.com/office/drawing/2014/main" xmlns:p14="http://schemas.microsoft.com/office/powerpoint/2010/main" xmlns:a14="http://schemas.microsoft.com/office/drawing/2010/main" w="9525">
+                  <a14:hiddenLine xmlns:a14="http://schemas.microsoft.com/office/drawing/2010/main" xmlns:p14="http://schemas.microsoft.com/office/powerpoint/2010/main" xmlns:a16="http://schemas.microsoft.com/office/drawing/2014/main" xmlns="" w="9525">
                     <a:solidFill>
                       <a:srgbClr val="000000"/>
                     </a:solidFill>
@@ -21044,7 +21045,7 @@
               </a:ln>
               <a:extLst>
                 <a:ext uri="{91240B29-F687-4f45-9708-019B960494DF}">
-                  <a14:hiddenLine xmlns="" xmlns:a16="http://schemas.microsoft.com/office/drawing/2014/main" xmlns:p14="http://schemas.microsoft.com/office/powerpoint/2010/main" xmlns:a14="http://schemas.microsoft.com/office/drawing/2010/main" w="9525">
+                  <a14:hiddenLine xmlns:a14="http://schemas.microsoft.com/office/drawing/2010/main" xmlns:p14="http://schemas.microsoft.com/office/powerpoint/2010/main" xmlns:a16="http://schemas.microsoft.com/office/drawing/2014/main" xmlns="" w="9525">
                     <a:solidFill>
                       <a:srgbClr val="000000"/>
                     </a:solidFill>
@@ -21149,7 +21150,7 @@
               </a:ln>
               <a:extLst>
                 <a:ext uri="{91240B29-F687-4f45-9708-019B960494DF}">
-                  <a14:hiddenLine xmlns="" xmlns:a16="http://schemas.microsoft.com/office/drawing/2014/main" xmlns:p14="http://schemas.microsoft.com/office/powerpoint/2010/main" xmlns:a14="http://schemas.microsoft.com/office/drawing/2010/main" w="9525">
+                  <a14:hiddenLine xmlns:a14="http://schemas.microsoft.com/office/drawing/2010/main" xmlns:p14="http://schemas.microsoft.com/office/powerpoint/2010/main" xmlns:a16="http://schemas.microsoft.com/office/drawing/2014/main" xmlns="" w="9525">
                     <a:solidFill>
                       <a:srgbClr val="000000"/>
                     </a:solidFill>
@@ -21226,7 +21227,7 @@
               </a:ln>
               <a:extLst>
                 <a:ext uri="{91240B29-F687-4f45-9708-019B960494DF}">
-                  <a14:hiddenLine xmlns="" xmlns:a16="http://schemas.microsoft.com/office/drawing/2014/main" xmlns:p14="http://schemas.microsoft.com/office/powerpoint/2010/main" xmlns:a14="http://schemas.microsoft.com/office/drawing/2010/main" w="9525">
+                  <a14:hiddenLine xmlns:a14="http://schemas.microsoft.com/office/drawing/2010/main" xmlns:p14="http://schemas.microsoft.com/office/powerpoint/2010/main" xmlns:a16="http://schemas.microsoft.com/office/drawing/2014/main" xmlns="" w="9525">
                     <a:solidFill>
                       <a:srgbClr val="000000"/>
                     </a:solidFill>
@@ -21331,7 +21332,7 @@
               </a:ln>
               <a:extLst>
                 <a:ext uri="{91240B29-F687-4f45-9708-019B960494DF}">
-                  <a14:hiddenLine xmlns="" xmlns:a16="http://schemas.microsoft.com/office/drawing/2014/main" xmlns:p14="http://schemas.microsoft.com/office/powerpoint/2010/main" xmlns:a14="http://schemas.microsoft.com/office/drawing/2010/main" w="9525">
+                  <a14:hiddenLine xmlns:a14="http://schemas.microsoft.com/office/drawing/2010/main" xmlns:p14="http://schemas.microsoft.com/office/powerpoint/2010/main" xmlns:a16="http://schemas.microsoft.com/office/drawing/2014/main" xmlns="" w="9525">
                     <a:solidFill>
                       <a:srgbClr val="000000"/>
                     </a:solidFill>
@@ -21411,7 +21412,7 @@
               </a:ln>
               <a:extLst>
                 <a:ext uri="{91240B29-F687-4f45-9708-019B960494DF}">
-                  <a14:hiddenLine xmlns="" xmlns:a16="http://schemas.microsoft.com/office/drawing/2014/main" xmlns:p14="http://schemas.microsoft.com/office/powerpoint/2010/main" xmlns:a14="http://schemas.microsoft.com/office/drawing/2010/main" w="9525">
+                  <a14:hiddenLine xmlns:a14="http://schemas.microsoft.com/office/drawing/2010/main" xmlns:p14="http://schemas.microsoft.com/office/powerpoint/2010/main" xmlns:a16="http://schemas.microsoft.com/office/drawing/2014/main" xmlns="" w="9525">
                     <a:solidFill>
                       <a:srgbClr val="000000"/>
                     </a:solidFill>
@@ -21488,7 +21489,7 @@
               </a:ln>
               <a:extLst>
                 <a:ext uri="{91240B29-F687-4f45-9708-019B960494DF}">
-                  <a14:hiddenLine xmlns="" xmlns:a16="http://schemas.microsoft.com/office/drawing/2014/main" xmlns:p14="http://schemas.microsoft.com/office/powerpoint/2010/main" xmlns:a14="http://schemas.microsoft.com/office/drawing/2010/main" w="9525">
+                  <a14:hiddenLine xmlns:a14="http://schemas.microsoft.com/office/drawing/2010/main" xmlns:p14="http://schemas.microsoft.com/office/powerpoint/2010/main" xmlns:a16="http://schemas.microsoft.com/office/drawing/2014/main" xmlns="" w="9525">
                     <a:solidFill>
                       <a:srgbClr val="000000"/>
                     </a:solidFill>
@@ -21593,7 +21594,7 @@
               </a:ln>
               <a:extLst>
                 <a:ext uri="{91240B29-F687-4f45-9708-019B960494DF}">
-                  <a14:hiddenLine xmlns="" xmlns:a16="http://schemas.microsoft.com/office/drawing/2014/main" xmlns:p14="http://schemas.microsoft.com/office/powerpoint/2010/main" xmlns:a14="http://schemas.microsoft.com/office/drawing/2010/main" w="9525">
+                  <a14:hiddenLine xmlns:a14="http://schemas.microsoft.com/office/drawing/2010/main" xmlns:p14="http://schemas.microsoft.com/office/powerpoint/2010/main" xmlns:a16="http://schemas.microsoft.com/office/drawing/2014/main" xmlns="" w="9525">
                     <a:solidFill>
                       <a:srgbClr val="000000"/>
                     </a:solidFill>
@@ -21698,7 +21699,7 @@
               </a:ln>
               <a:extLst>
                 <a:ext uri="{91240B29-F687-4f45-9708-019B960494DF}">
-                  <a14:hiddenLine xmlns="" xmlns:a16="http://schemas.microsoft.com/office/drawing/2014/main" xmlns:p14="http://schemas.microsoft.com/office/powerpoint/2010/main" xmlns:a14="http://schemas.microsoft.com/office/drawing/2010/main" w="9525">
+                  <a14:hiddenLine xmlns:a14="http://schemas.microsoft.com/office/drawing/2010/main" xmlns:p14="http://schemas.microsoft.com/office/powerpoint/2010/main" xmlns:a16="http://schemas.microsoft.com/office/drawing/2014/main" xmlns="" w="9525">
                     <a:solidFill>
                       <a:srgbClr val="000000"/>
                     </a:solidFill>
@@ -21778,7 +21779,7 @@
               </a:ln>
               <a:extLst>
                 <a:ext uri="{91240B29-F687-4f45-9708-019B960494DF}">
-                  <a14:hiddenLine xmlns="" xmlns:a16="http://schemas.microsoft.com/office/drawing/2014/main" xmlns:p14="http://schemas.microsoft.com/office/powerpoint/2010/main" xmlns:a14="http://schemas.microsoft.com/office/drawing/2010/main" w="9525">
+                  <a14:hiddenLine xmlns:a14="http://schemas.microsoft.com/office/drawing/2010/main" xmlns:p14="http://schemas.microsoft.com/office/powerpoint/2010/main" xmlns:a16="http://schemas.microsoft.com/office/drawing/2014/main" xmlns="" w="9525">
                     <a:solidFill>
                       <a:srgbClr val="000000"/>
                     </a:solidFill>
@@ -21913,7 +21914,7 @@
               </a:ln>
               <a:extLst>
                 <a:ext uri="{91240B29-F687-4f45-9708-019B960494DF}">
-                  <a14:hiddenLine xmlns="" xmlns:a16="http://schemas.microsoft.com/office/drawing/2014/main" xmlns:p14="http://schemas.microsoft.com/office/powerpoint/2010/main" xmlns:a14="http://schemas.microsoft.com/office/drawing/2010/main" w="9525">
+                  <a14:hiddenLine xmlns:a14="http://schemas.microsoft.com/office/drawing/2010/main" xmlns:p14="http://schemas.microsoft.com/office/powerpoint/2010/main" xmlns:a16="http://schemas.microsoft.com/office/drawing/2014/main" xmlns="" w="9525">
                     <a:solidFill>
                       <a:srgbClr val="000000"/>
                     </a:solidFill>
@@ -22041,7 +22042,7 @@
               </a:ln>
               <a:extLst>
                 <a:ext uri="{91240B29-F687-4f45-9708-019B960494DF}">
-                  <a14:hiddenLine xmlns="" xmlns:a16="http://schemas.microsoft.com/office/drawing/2014/main" xmlns:p14="http://schemas.microsoft.com/office/powerpoint/2010/main" xmlns:a14="http://schemas.microsoft.com/office/drawing/2010/main" w="9525">
+                  <a14:hiddenLine xmlns:a14="http://schemas.microsoft.com/office/drawing/2010/main" xmlns:p14="http://schemas.microsoft.com/office/powerpoint/2010/main" xmlns:a16="http://schemas.microsoft.com/office/drawing/2014/main" xmlns="" w="9525">
                     <a:solidFill>
                       <a:srgbClr val="000000"/>
                     </a:solidFill>
@@ -22171,7 +22172,7 @@
               </a:ln>
               <a:extLst>
                 <a:ext uri="{91240B29-F687-4f45-9708-019B960494DF}">
-                  <a14:hiddenLine xmlns="" xmlns:a16="http://schemas.microsoft.com/office/drawing/2014/main" xmlns:p14="http://schemas.microsoft.com/office/powerpoint/2010/main" xmlns:a14="http://schemas.microsoft.com/office/drawing/2010/main" w="9525">
+                  <a14:hiddenLine xmlns:a14="http://schemas.microsoft.com/office/drawing/2010/main" xmlns:p14="http://schemas.microsoft.com/office/powerpoint/2010/main" xmlns:a16="http://schemas.microsoft.com/office/drawing/2014/main" xmlns="" w="9525">
                     <a:solidFill>
                       <a:srgbClr val="000000"/>
                     </a:solidFill>
@@ -22276,7 +22277,7 @@
               </a:ln>
               <a:extLst>
                 <a:ext uri="{91240B29-F687-4f45-9708-019B960494DF}">
-                  <a14:hiddenLine xmlns="" xmlns:a16="http://schemas.microsoft.com/office/drawing/2014/main" xmlns:p14="http://schemas.microsoft.com/office/powerpoint/2010/main" xmlns:a14="http://schemas.microsoft.com/office/drawing/2010/main" w="9525">
+                  <a14:hiddenLine xmlns:a14="http://schemas.microsoft.com/office/drawing/2010/main" xmlns:p14="http://schemas.microsoft.com/office/powerpoint/2010/main" xmlns:a16="http://schemas.microsoft.com/office/drawing/2014/main" xmlns="" w="9525">
                     <a:solidFill>
                       <a:srgbClr val="000000"/>
                     </a:solidFill>
@@ -22356,7 +22357,7 @@
               </a:ln>
               <a:extLst>
                 <a:ext uri="{91240B29-F687-4f45-9708-019B960494DF}">
-                  <a14:hiddenLine xmlns="" xmlns:a16="http://schemas.microsoft.com/office/drawing/2014/main" xmlns:p14="http://schemas.microsoft.com/office/powerpoint/2010/main" xmlns:a14="http://schemas.microsoft.com/office/drawing/2010/main" w="9525">
+                  <a14:hiddenLine xmlns:a14="http://schemas.microsoft.com/office/drawing/2010/main" xmlns:p14="http://schemas.microsoft.com/office/powerpoint/2010/main" xmlns:a16="http://schemas.microsoft.com/office/drawing/2014/main" xmlns="" w="9525">
                     <a:solidFill>
                       <a:srgbClr val="000000"/>
                     </a:solidFill>
@@ -22461,7 +22462,7 @@
               </a:ln>
               <a:extLst>
                 <a:ext uri="{91240B29-F687-4f45-9708-019B960494DF}">
-                  <a14:hiddenLine xmlns="" xmlns:a16="http://schemas.microsoft.com/office/drawing/2014/main" xmlns:p14="http://schemas.microsoft.com/office/powerpoint/2010/main" xmlns:a14="http://schemas.microsoft.com/office/drawing/2010/main" w="9525">
+                  <a14:hiddenLine xmlns:a14="http://schemas.microsoft.com/office/drawing/2010/main" xmlns:p14="http://schemas.microsoft.com/office/powerpoint/2010/main" xmlns:a16="http://schemas.microsoft.com/office/drawing/2014/main" xmlns="" w="9525">
                     <a:solidFill>
                       <a:srgbClr val="000000"/>
                     </a:solidFill>
@@ -22544,7 +22545,7 @@
               </a:ln>
               <a:extLst>
                 <a:ext uri="{91240B29-F687-4f45-9708-019B960494DF}">
-                  <a14:hiddenLine xmlns="" xmlns:a16="http://schemas.microsoft.com/office/drawing/2014/main" xmlns:p14="http://schemas.microsoft.com/office/powerpoint/2010/main" xmlns:a14="http://schemas.microsoft.com/office/drawing/2010/main" w="9525">
+                  <a14:hiddenLine xmlns:a14="http://schemas.microsoft.com/office/drawing/2010/main" xmlns:p14="http://schemas.microsoft.com/office/powerpoint/2010/main" xmlns:a16="http://schemas.microsoft.com/office/drawing/2014/main" xmlns="" w="9525">
                     <a:solidFill>
                       <a:srgbClr val="000000"/>
                     </a:solidFill>
@@ -22649,7 +22650,7 @@
               </a:ln>
               <a:extLst>
                 <a:ext uri="{91240B29-F687-4f45-9708-019B960494DF}">
-                  <a14:hiddenLine xmlns="" xmlns:a16="http://schemas.microsoft.com/office/drawing/2014/main" xmlns:p14="http://schemas.microsoft.com/office/powerpoint/2010/main" xmlns:a14="http://schemas.microsoft.com/office/drawing/2010/main" w="9525">
+                  <a14:hiddenLine xmlns:a14="http://schemas.microsoft.com/office/drawing/2010/main" xmlns:p14="http://schemas.microsoft.com/office/powerpoint/2010/main" xmlns:a16="http://schemas.microsoft.com/office/drawing/2014/main" xmlns="" w="9525">
                     <a:solidFill>
                       <a:srgbClr val="000000"/>
                     </a:solidFill>
@@ -22732,7 +22733,7 @@
               </a:ln>
               <a:extLst>
                 <a:ext uri="{91240B29-F687-4f45-9708-019B960494DF}">
-                  <a14:hiddenLine xmlns="" xmlns:a16="http://schemas.microsoft.com/office/drawing/2014/main" xmlns:p14="http://schemas.microsoft.com/office/powerpoint/2010/main" xmlns:a14="http://schemas.microsoft.com/office/drawing/2010/main" w="9525">
+                  <a14:hiddenLine xmlns:a14="http://schemas.microsoft.com/office/drawing/2010/main" xmlns:p14="http://schemas.microsoft.com/office/powerpoint/2010/main" xmlns:a16="http://schemas.microsoft.com/office/drawing/2014/main" xmlns="" w="9525">
                     <a:solidFill>
                       <a:srgbClr val="000000"/>
                     </a:solidFill>
@@ -22837,7 +22838,7 @@
               </a:ln>
               <a:extLst>
                 <a:ext uri="{91240B29-F687-4f45-9708-019B960494DF}">
-                  <a14:hiddenLine xmlns="" xmlns:a16="http://schemas.microsoft.com/office/drawing/2014/main" xmlns:p14="http://schemas.microsoft.com/office/powerpoint/2010/main" xmlns:a14="http://schemas.microsoft.com/office/drawing/2010/main" w="9525">
+                  <a14:hiddenLine xmlns:a14="http://schemas.microsoft.com/office/drawing/2010/main" xmlns:p14="http://schemas.microsoft.com/office/powerpoint/2010/main" xmlns:a16="http://schemas.microsoft.com/office/drawing/2014/main" xmlns="" w="9525">
                     <a:solidFill>
                       <a:srgbClr val="000000"/>
                     </a:solidFill>
@@ -22886,7 +22887,7 @@
               </a:ln>
               <a:extLst>
                 <a:ext uri="{91240B29-F687-4f45-9708-019B960494DF}">
-                  <a14:hiddenLine xmlns="" xmlns:a16="http://schemas.microsoft.com/office/drawing/2014/main" xmlns:p14="http://schemas.microsoft.com/office/powerpoint/2010/main" xmlns:a14="http://schemas.microsoft.com/office/drawing/2010/main" w="9525">
+                  <a14:hiddenLine xmlns:a14="http://schemas.microsoft.com/office/drawing/2010/main" xmlns:p14="http://schemas.microsoft.com/office/powerpoint/2010/main" xmlns:a16="http://schemas.microsoft.com/office/drawing/2014/main" xmlns="" w="9525">
                     <a:solidFill>
                       <a:srgbClr val="000000"/>
                     </a:solidFill>
@@ -23006,7 +23007,7 @@
           </a:prstGeom>
           <a:extLst>
             <a:ext uri="{909E8E84-426E-40dd-AFC4-6F175D3DCCD1}">
-              <a14:hiddenFill xmlns="" xmlns:a16="http://schemas.microsoft.com/office/drawing/2014/main" xmlns:p14="http://schemas.microsoft.com/office/powerpoint/2010/main" xmlns:a14="http://schemas.microsoft.com/office/drawing/2010/main">
+              <a14:hiddenFill xmlns:a14="http://schemas.microsoft.com/office/drawing/2010/main" xmlns:p14="http://schemas.microsoft.com/office/powerpoint/2010/main" xmlns:a16="http://schemas.microsoft.com/office/drawing/2014/main" xmlns="">
                 <a:solidFill>
                   <a:srgbClr val="FFFFFF"/>
                 </a:solidFill>
@@ -23130,7 +23131,7 @@
           <a:noFill/>
           <a:extLst>
             <a:ext uri="{909E8E84-426E-40dd-AFC4-6F175D3DCCD1}">
-              <a14:hiddenFill xmlns="" xmlns:a16="http://schemas.microsoft.com/office/drawing/2014/main" xmlns:p14="http://schemas.microsoft.com/office/powerpoint/2010/main" xmlns:a14="http://schemas.microsoft.com/office/drawing/2010/main">
+              <a14:hiddenFill xmlns:a14="http://schemas.microsoft.com/office/drawing/2010/main" xmlns:p14="http://schemas.microsoft.com/office/powerpoint/2010/main" xmlns:a16="http://schemas.microsoft.com/office/drawing/2014/main" xmlns="">
                 <a:solidFill>
                   <a:srgbClr val="FFFFFF"/>
                 </a:solidFill>
@@ -23324,7 +23325,7 @@
             </a:ln>
             <a:extLst>
               <a:ext uri="{91240B29-F687-4f45-9708-019B960494DF}">
-                <a14:hiddenLine xmlns="" xmlns:a16="http://schemas.microsoft.com/office/drawing/2014/main" xmlns:p14="http://schemas.microsoft.com/office/powerpoint/2010/main" xmlns:a14="http://schemas.microsoft.com/office/drawing/2010/main" w="9525">
+                <a14:hiddenLine xmlns:a14="http://schemas.microsoft.com/office/drawing/2010/main" xmlns:p14="http://schemas.microsoft.com/office/powerpoint/2010/main" xmlns:a16="http://schemas.microsoft.com/office/drawing/2014/main" xmlns="" w="9525">
                   <a:solidFill>
                     <a:srgbClr val="000000"/>
                   </a:solidFill>
@@ -23429,7 +23430,7 @@
             </a:ln>
             <a:extLst>
               <a:ext uri="{91240B29-F687-4f45-9708-019B960494DF}">
-                <a14:hiddenLine xmlns="" xmlns:a16="http://schemas.microsoft.com/office/drawing/2014/main" xmlns:p14="http://schemas.microsoft.com/office/powerpoint/2010/main" xmlns:a14="http://schemas.microsoft.com/office/drawing/2010/main" w="9525">
+                <a14:hiddenLine xmlns:a14="http://schemas.microsoft.com/office/drawing/2010/main" xmlns:p14="http://schemas.microsoft.com/office/powerpoint/2010/main" xmlns:a16="http://schemas.microsoft.com/office/drawing/2014/main" xmlns="" w="9525">
                   <a:solidFill>
                     <a:srgbClr val="000000"/>
                   </a:solidFill>
@@ -23534,7 +23535,7 @@
             </a:ln>
             <a:extLst>
               <a:ext uri="{91240B29-F687-4f45-9708-019B960494DF}">
-                <a14:hiddenLine xmlns="" xmlns:a16="http://schemas.microsoft.com/office/drawing/2014/main" xmlns:p14="http://schemas.microsoft.com/office/powerpoint/2010/main" xmlns:a14="http://schemas.microsoft.com/office/drawing/2010/main" w="9525">
+                <a14:hiddenLine xmlns:a14="http://schemas.microsoft.com/office/drawing/2010/main" xmlns:p14="http://schemas.microsoft.com/office/powerpoint/2010/main" xmlns:a16="http://schemas.microsoft.com/office/drawing/2014/main" xmlns="" w="9525">
                   <a:solidFill>
                     <a:srgbClr val="000000"/>
                   </a:solidFill>
@@ -23611,7 +23612,7 @@
             </a:ln>
             <a:extLst>
               <a:ext uri="{91240B29-F687-4f45-9708-019B960494DF}">
-                <a14:hiddenLine xmlns="" xmlns:a16="http://schemas.microsoft.com/office/drawing/2014/main" xmlns:p14="http://schemas.microsoft.com/office/powerpoint/2010/main" xmlns:a14="http://schemas.microsoft.com/office/drawing/2010/main" w="9525">
+                <a14:hiddenLine xmlns:a14="http://schemas.microsoft.com/office/drawing/2010/main" xmlns:p14="http://schemas.microsoft.com/office/powerpoint/2010/main" xmlns:a16="http://schemas.microsoft.com/office/drawing/2014/main" xmlns="" w="9525">
                   <a:solidFill>
                     <a:srgbClr val="000000"/>
                   </a:solidFill>
@@ -23716,7 +23717,7 @@
             </a:ln>
             <a:extLst>
               <a:ext uri="{91240B29-F687-4f45-9708-019B960494DF}">
-                <a14:hiddenLine xmlns="" xmlns:a16="http://schemas.microsoft.com/office/drawing/2014/main" xmlns:p14="http://schemas.microsoft.com/office/powerpoint/2010/main" xmlns:a14="http://schemas.microsoft.com/office/drawing/2010/main" w="9525">
+                <a14:hiddenLine xmlns:a14="http://schemas.microsoft.com/office/drawing/2010/main" xmlns:p14="http://schemas.microsoft.com/office/powerpoint/2010/main" xmlns:a16="http://schemas.microsoft.com/office/drawing/2014/main" xmlns="" w="9525">
                   <a:solidFill>
                     <a:srgbClr val="000000"/>
                   </a:solidFill>
@@ -23793,7 +23794,7 @@
             </a:ln>
             <a:extLst>
               <a:ext uri="{91240B29-F687-4f45-9708-019B960494DF}">
-                <a14:hiddenLine xmlns="" xmlns:a16="http://schemas.microsoft.com/office/drawing/2014/main" xmlns:p14="http://schemas.microsoft.com/office/powerpoint/2010/main" xmlns:a14="http://schemas.microsoft.com/office/drawing/2010/main" w="9525">
+                <a14:hiddenLine xmlns:a14="http://schemas.microsoft.com/office/drawing/2010/main" xmlns:p14="http://schemas.microsoft.com/office/powerpoint/2010/main" xmlns:a16="http://schemas.microsoft.com/office/drawing/2014/main" xmlns="" w="9525">
                   <a:solidFill>
                     <a:srgbClr val="000000"/>
                   </a:solidFill>
@@ -23870,7 +23871,7 @@
             </a:ln>
             <a:extLst>
               <a:ext uri="{91240B29-F687-4f45-9708-019B960494DF}">
-                <a14:hiddenLine xmlns="" xmlns:a16="http://schemas.microsoft.com/office/drawing/2014/main" xmlns:p14="http://schemas.microsoft.com/office/powerpoint/2010/main" xmlns:a14="http://schemas.microsoft.com/office/drawing/2010/main" w="9525">
+                <a14:hiddenLine xmlns:a14="http://schemas.microsoft.com/office/drawing/2010/main" xmlns:p14="http://schemas.microsoft.com/office/powerpoint/2010/main" xmlns:a16="http://schemas.microsoft.com/office/drawing/2014/main" xmlns="" w="9525">
                   <a:solidFill>
                     <a:srgbClr val="000000"/>
                   </a:solidFill>
@@ -23975,7 +23976,7 @@
             </a:ln>
             <a:extLst>
               <a:ext uri="{91240B29-F687-4f45-9708-019B960494DF}">
-                <a14:hiddenLine xmlns="" xmlns:a16="http://schemas.microsoft.com/office/drawing/2014/main" xmlns:p14="http://schemas.microsoft.com/office/powerpoint/2010/main" xmlns:a14="http://schemas.microsoft.com/office/drawing/2010/main" w="9525">
+                <a14:hiddenLine xmlns:a14="http://schemas.microsoft.com/office/drawing/2010/main" xmlns:p14="http://schemas.microsoft.com/office/powerpoint/2010/main" xmlns:a16="http://schemas.microsoft.com/office/drawing/2014/main" xmlns="" w="9525">
                   <a:solidFill>
                     <a:srgbClr val="000000"/>
                   </a:solidFill>
@@ -24080,7 +24081,7 @@
             </a:ln>
             <a:extLst>
               <a:ext uri="{91240B29-F687-4f45-9708-019B960494DF}">
-                <a14:hiddenLine xmlns="" xmlns:a16="http://schemas.microsoft.com/office/drawing/2014/main" xmlns:p14="http://schemas.microsoft.com/office/powerpoint/2010/main" xmlns:a14="http://schemas.microsoft.com/office/drawing/2010/main" w="9525">
+                <a14:hiddenLine xmlns:a14="http://schemas.microsoft.com/office/drawing/2010/main" xmlns:p14="http://schemas.microsoft.com/office/powerpoint/2010/main" xmlns:a16="http://schemas.microsoft.com/office/drawing/2014/main" xmlns="" w="9525">
                   <a:solidFill>
                     <a:srgbClr val="000000"/>
                   </a:solidFill>
@@ -24157,7 +24158,7 @@
             </a:ln>
             <a:extLst>
               <a:ext uri="{91240B29-F687-4f45-9708-019B960494DF}">
-                <a14:hiddenLine xmlns="" xmlns:a16="http://schemas.microsoft.com/office/drawing/2014/main" xmlns:p14="http://schemas.microsoft.com/office/powerpoint/2010/main" xmlns:a14="http://schemas.microsoft.com/office/drawing/2010/main" w="9525">
+                <a14:hiddenLine xmlns:a14="http://schemas.microsoft.com/office/drawing/2010/main" xmlns:p14="http://schemas.microsoft.com/office/powerpoint/2010/main" xmlns:a16="http://schemas.microsoft.com/office/drawing/2014/main" xmlns="" w="9525">
                   <a:solidFill>
                     <a:srgbClr val="000000"/>
                   </a:solidFill>
@@ -24282,7 +24283,7 @@
             </a:ln>
             <a:extLst>
               <a:ext uri="{91240B29-F687-4f45-9708-019B960494DF}">
-                <a14:hiddenLine xmlns="" xmlns:a16="http://schemas.microsoft.com/office/drawing/2014/main" xmlns:p14="http://schemas.microsoft.com/office/powerpoint/2010/main" xmlns:a14="http://schemas.microsoft.com/office/drawing/2010/main" w="9525">
+                <a14:hiddenLine xmlns:a14="http://schemas.microsoft.com/office/drawing/2010/main" xmlns:p14="http://schemas.microsoft.com/office/powerpoint/2010/main" xmlns:a16="http://schemas.microsoft.com/office/drawing/2014/main" xmlns="" w="9525">
                   <a:solidFill>
                     <a:srgbClr val="000000"/>
                   </a:solidFill>
@@ -24396,7 +24397,7 @@
             </a:ln>
             <a:extLst>
               <a:ext uri="{91240B29-F687-4f45-9708-019B960494DF}">
-                <a14:hiddenLine xmlns="" xmlns:a16="http://schemas.microsoft.com/office/drawing/2014/main" xmlns:p14="http://schemas.microsoft.com/office/powerpoint/2010/main" xmlns:a14="http://schemas.microsoft.com/office/drawing/2010/main" w="9525">
+                <a14:hiddenLine xmlns:a14="http://schemas.microsoft.com/office/drawing/2010/main" xmlns:p14="http://schemas.microsoft.com/office/powerpoint/2010/main" xmlns:a16="http://schemas.microsoft.com/office/drawing/2014/main" xmlns="" w="9525">
                   <a:solidFill>
                     <a:srgbClr val="000000"/>
                   </a:solidFill>
@@ -24473,7 +24474,7 @@
             </a:ln>
             <a:extLst>
               <a:ext uri="{91240B29-F687-4f45-9708-019B960494DF}">
-                <a14:hiddenLine xmlns="" xmlns:a16="http://schemas.microsoft.com/office/drawing/2014/main" xmlns:p14="http://schemas.microsoft.com/office/powerpoint/2010/main" xmlns:a14="http://schemas.microsoft.com/office/drawing/2010/main" w="9525">
+                <a14:hiddenLine xmlns:a14="http://schemas.microsoft.com/office/drawing/2010/main" xmlns:p14="http://schemas.microsoft.com/office/powerpoint/2010/main" xmlns:a16="http://schemas.microsoft.com/office/drawing/2014/main" xmlns="" w="9525">
                   <a:solidFill>
                     <a:srgbClr val="000000"/>
                   </a:solidFill>
@@ -24550,7 +24551,7 @@
             </a:ln>
             <a:extLst>
               <a:ext uri="{91240B29-F687-4f45-9708-019B960494DF}">
-                <a14:hiddenLine xmlns="" xmlns:a16="http://schemas.microsoft.com/office/drawing/2014/main" xmlns:p14="http://schemas.microsoft.com/office/powerpoint/2010/main" xmlns:a14="http://schemas.microsoft.com/office/drawing/2010/main" w="9525">
+                <a14:hiddenLine xmlns:a14="http://schemas.microsoft.com/office/drawing/2010/main" xmlns:p14="http://schemas.microsoft.com/office/powerpoint/2010/main" xmlns:a16="http://schemas.microsoft.com/office/drawing/2014/main" xmlns="" w="9525">
                   <a:solidFill>
                     <a:srgbClr val="000000"/>
                   </a:solidFill>
@@ -24655,7 +24656,7 @@
             </a:ln>
             <a:extLst>
               <a:ext uri="{91240B29-F687-4f45-9708-019B960494DF}">
-                <a14:hiddenLine xmlns="" xmlns:a16="http://schemas.microsoft.com/office/drawing/2014/main" xmlns:p14="http://schemas.microsoft.com/office/powerpoint/2010/main" xmlns:a14="http://schemas.microsoft.com/office/drawing/2010/main" w="9525">
+                <a14:hiddenLine xmlns:a14="http://schemas.microsoft.com/office/drawing/2010/main" xmlns:p14="http://schemas.microsoft.com/office/powerpoint/2010/main" xmlns:a16="http://schemas.microsoft.com/office/drawing/2014/main" xmlns="" w="9525">
                   <a:solidFill>
                     <a:srgbClr val="000000"/>
                   </a:solidFill>
@@ -24704,7 +24705,7 @@
             </a:ln>
             <a:extLst>
               <a:ext uri="{91240B29-F687-4f45-9708-019B960494DF}">
-                <a14:hiddenLine xmlns="" xmlns:a16="http://schemas.microsoft.com/office/drawing/2014/main" xmlns:p14="http://schemas.microsoft.com/office/powerpoint/2010/main" xmlns:a14="http://schemas.microsoft.com/office/drawing/2010/main" w="9525">
+                <a14:hiddenLine xmlns:a14="http://schemas.microsoft.com/office/drawing/2010/main" xmlns:p14="http://schemas.microsoft.com/office/powerpoint/2010/main" xmlns:a16="http://schemas.microsoft.com/office/drawing/2014/main" xmlns="" w="9525">
                   <a:solidFill>
                     <a:srgbClr val="000000"/>
                   </a:solidFill>
@@ -24784,7 +24785,7 @@
             </a:ln>
             <a:extLst>
               <a:ext uri="{91240B29-F687-4f45-9708-019B960494DF}">
-                <a14:hiddenLine xmlns="" xmlns:a16="http://schemas.microsoft.com/office/drawing/2014/main" xmlns:p14="http://schemas.microsoft.com/office/powerpoint/2010/main" xmlns:a14="http://schemas.microsoft.com/office/drawing/2010/main" w="9525">
+                <a14:hiddenLine xmlns:a14="http://schemas.microsoft.com/office/drawing/2010/main" xmlns:p14="http://schemas.microsoft.com/office/powerpoint/2010/main" xmlns:a16="http://schemas.microsoft.com/office/drawing/2014/main" xmlns="" w="9525">
                   <a:solidFill>
                     <a:srgbClr val="000000"/>
                   </a:solidFill>
@@ -24889,7 +24890,7 @@
             </a:ln>
             <a:extLst>
               <a:ext uri="{91240B29-F687-4f45-9708-019B960494DF}">
-                <a14:hiddenLine xmlns="" xmlns:a16="http://schemas.microsoft.com/office/drawing/2014/main" xmlns:p14="http://schemas.microsoft.com/office/powerpoint/2010/main" xmlns:a14="http://schemas.microsoft.com/office/drawing/2010/main" w="9525">
+                <a14:hiddenLine xmlns:a14="http://schemas.microsoft.com/office/drawing/2010/main" xmlns:p14="http://schemas.microsoft.com/office/powerpoint/2010/main" xmlns:a16="http://schemas.microsoft.com/office/drawing/2014/main" xmlns="" w="9525">
                   <a:solidFill>
                     <a:srgbClr val="000000"/>
                   </a:solidFill>
@@ -24966,7 +24967,7 @@
             </a:ln>
             <a:extLst>
               <a:ext uri="{91240B29-F687-4f45-9708-019B960494DF}">
-                <a14:hiddenLine xmlns="" xmlns:a16="http://schemas.microsoft.com/office/drawing/2014/main" xmlns:p14="http://schemas.microsoft.com/office/powerpoint/2010/main" xmlns:a14="http://schemas.microsoft.com/office/drawing/2010/main" w="9525">
+                <a14:hiddenLine xmlns:a14="http://schemas.microsoft.com/office/drawing/2010/main" xmlns:p14="http://schemas.microsoft.com/office/powerpoint/2010/main" xmlns:a16="http://schemas.microsoft.com/office/drawing/2014/main" xmlns="" w="9525">
                   <a:solidFill>
                     <a:srgbClr val="000000"/>
                   </a:solidFill>
@@ -25071,7 +25072,7 @@
             </a:ln>
             <a:extLst>
               <a:ext uri="{91240B29-F687-4f45-9708-019B960494DF}">
-                <a14:hiddenLine xmlns="" xmlns:a16="http://schemas.microsoft.com/office/drawing/2014/main" xmlns:p14="http://schemas.microsoft.com/office/powerpoint/2010/main" xmlns:a14="http://schemas.microsoft.com/office/drawing/2010/main" w="9525">
+                <a14:hiddenLine xmlns:a14="http://schemas.microsoft.com/office/drawing/2010/main" xmlns:p14="http://schemas.microsoft.com/office/powerpoint/2010/main" xmlns:a16="http://schemas.microsoft.com/office/drawing/2014/main" xmlns="" w="9525">
                   <a:solidFill>
                     <a:srgbClr val="000000"/>
                   </a:solidFill>
@@ -25151,7 +25152,7 @@
             </a:ln>
             <a:extLst>
               <a:ext uri="{91240B29-F687-4f45-9708-019B960494DF}">
-                <a14:hiddenLine xmlns="" xmlns:a16="http://schemas.microsoft.com/office/drawing/2014/main" xmlns:p14="http://schemas.microsoft.com/office/powerpoint/2010/main" xmlns:a14="http://schemas.microsoft.com/office/drawing/2010/main" w="9525">
+                <a14:hiddenLine xmlns:a14="http://schemas.microsoft.com/office/drawing/2010/main" xmlns:p14="http://schemas.microsoft.com/office/powerpoint/2010/main" xmlns:a16="http://schemas.microsoft.com/office/drawing/2014/main" xmlns="" w="9525">
                   <a:solidFill>
                     <a:srgbClr val="000000"/>
                   </a:solidFill>
@@ -25228,7 +25229,7 @@
             </a:ln>
             <a:extLst>
               <a:ext uri="{91240B29-F687-4f45-9708-019B960494DF}">
-                <a14:hiddenLine xmlns="" xmlns:a16="http://schemas.microsoft.com/office/drawing/2014/main" xmlns:p14="http://schemas.microsoft.com/office/powerpoint/2010/main" xmlns:a14="http://schemas.microsoft.com/office/drawing/2010/main" w="9525">
+                <a14:hiddenLine xmlns:a14="http://schemas.microsoft.com/office/drawing/2010/main" xmlns:p14="http://schemas.microsoft.com/office/powerpoint/2010/main" xmlns:a16="http://schemas.microsoft.com/office/drawing/2014/main" xmlns="" w="9525">
                   <a:solidFill>
                     <a:srgbClr val="000000"/>
                   </a:solidFill>
@@ -25333,7 +25334,7 @@
             </a:ln>
             <a:extLst>
               <a:ext uri="{91240B29-F687-4f45-9708-019B960494DF}">
-                <a14:hiddenLine xmlns="" xmlns:a16="http://schemas.microsoft.com/office/drawing/2014/main" xmlns:p14="http://schemas.microsoft.com/office/powerpoint/2010/main" xmlns:a14="http://schemas.microsoft.com/office/drawing/2010/main" w="9525">
+                <a14:hiddenLine xmlns:a14="http://schemas.microsoft.com/office/drawing/2010/main" xmlns:p14="http://schemas.microsoft.com/office/powerpoint/2010/main" xmlns:a16="http://schemas.microsoft.com/office/drawing/2014/main" xmlns="" w="9525">
                   <a:solidFill>
                     <a:srgbClr val="000000"/>
                   </a:solidFill>
@@ -25438,7 +25439,7 @@
             </a:ln>
             <a:extLst>
               <a:ext uri="{91240B29-F687-4f45-9708-019B960494DF}">
-                <a14:hiddenLine xmlns="" xmlns:a16="http://schemas.microsoft.com/office/drawing/2014/main" xmlns:p14="http://schemas.microsoft.com/office/powerpoint/2010/main" xmlns:a14="http://schemas.microsoft.com/office/drawing/2010/main" w="9525">
+                <a14:hiddenLine xmlns:a14="http://schemas.microsoft.com/office/drawing/2010/main" xmlns:p14="http://schemas.microsoft.com/office/powerpoint/2010/main" xmlns:a16="http://schemas.microsoft.com/office/drawing/2014/main" xmlns="" w="9525">
                   <a:solidFill>
                     <a:srgbClr val="000000"/>
                   </a:solidFill>
@@ -25518,7 +25519,7 @@
             </a:ln>
             <a:extLst>
               <a:ext uri="{91240B29-F687-4f45-9708-019B960494DF}">
-                <a14:hiddenLine xmlns="" xmlns:a16="http://schemas.microsoft.com/office/drawing/2014/main" xmlns:p14="http://schemas.microsoft.com/office/powerpoint/2010/main" xmlns:a14="http://schemas.microsoft.com/office/drawing/2010/main" w="9525">
+                <a14:hiddenLine xmlns:a14="http://schemas.microsoft.com/office/drawing/2010/main" xmlns:p14="http://schemas.microsoft.com/office/powerpoint/2010/main" xmlns:a16="http://schemas.microsoft.com/office/drawing/2014/main" xmlns="" w="9525">
                   <a:solidFill>
                     <a:srgbClr val="000000"/>
                   </a:solidFill>
@@ -25653,7 +25654,7 @@
             </a:ln>
             <a:extLst>
               <a:ext uri="{91240B29-F687-4f45-9708-019B960494DF}">
-                <a14:hiddenLine xmlns="" xmlns:a16="http://schemas.microsoft.com/office/drawing/2014/main" xmlns:p14="http://schemas.microsoft.com/office/powerpoint/2010/main" xmlns:a14="http://schemas.microsoft.com/office/drawing/2010/main" w="9525">
+                <a14:hiddenLine xmlns:a14="http://schemas.microsoft.com/office/drawing/2010/main" xmlns:p14="http://schemas.microsoft.com/office/powerpoint/2010/main" xmlns:a16="http://schemas.microsoft.com/office/drawing/2014/main" xmlns="" w="9525">
                   <a:solidFill>
                     <a:srgbClr val="000000"/>
                   </a:solidFill>
@@ -25814,7 +25815,7 @@
           <a:noFill/>
           <a:extLst>
             <a:ext uri="{909E8E84-426E-40dd-AFC4-6F175D3DCCD1}">
-              <a14:hiddenFill xmlns="" xmlns:a16="http://schemas.microsoft.com/office/drawing/2014/main" xmlns:p14="http://schemas.microsoft.com/office/powerpoint/2010/main" xmlns:a14="http://schemas.microsoft.com/office/drawing/2010/main">
+              <a14:hiddenFill xmlns:a14="http://schemas.microsoft.com/office/drawing/2010/main" xmlns:p14="http://schemas.microsoft.com/office/powerpoint/2010/main" xmlns:a16="http://schemas.microsoft.com/office/drawing/2014/main" xmlns="">
                 <a:solidFill>
                   <a:srgbClr val="FFFFFF"/>
                 </a:solidFill>
@@ -25935,7 +25936,7 @@
               </a:ln>
               <a:extLst>
                 <a:ext uri="{91240B29-F687-4f45-9708-019B960494DF}">
-                  <a14:hiddenLine xmlns="" xmlns:a16="http://schemas.microsoft.com/office/drawing/2014/main" xmlns:p14="http://schemas.microsoft.com/office/powerpoint/2010/main" xmlns:a14="http://schemas.microsoft.com/office/drawing/2010/main" w="9525">
+                  <a14:hiddenLine xmlns:a14="http://schemas.microsoft.com/office/drawing/2010/main" xmlns:p14="http://schemas.microsoft.com/office/powerpoint/2010/main" xmlns:a16="http://schemas.microsoft.com/office/drawing/2014/main" xmlns="" w="9525">
                     <a:solidFill>
                       <a:srgbClr val="000000"/>
                     </a:solidFill>
@@ -26040,7 +26041,7 @@
               </a:ln>
               <a:extLst>
                 <a:ext uri="{91240B29-F687-4f45-9708-019B960494DF}">
-                  <a14:hiddenLine xmlns="" xmlns:a16="http://schemas.microsoft.com/office/drawing/2014/main" xmlns:p14="http://schemas.microsoft.com/office/powerpoint/2010/main" xmlns:a14="http://schemas.microsoft.com/office/drawing/2010/main" w="9525">
+                  <a14:hiddenLine xmlns:a14="http://schemas.microsoft.com/office/drawing/2010/main" xmlns:p14="http://schemas.microsoft.com/office/powerpoint/2010/main" xmlns:a16="http://schemas.microsoft.com/office/drawing/2014/main" xmlns="" w="9525">
                     <a:solidFill>
                       <a:srgbClr val="000000"/>
                     </a:solidFill>
@@ -26145,7 +26146,7 @@
               </a:ln>
               <a:extLst>
                 <a:ext uri="{91240B29-F687-4f45-9708-019B960494DF}">
-                  <a14:hiddenLine xmlns="" xmlns:a16="http://schemas.microsoft.com/office/drawing/2014/main" xmlns:p14="http://schemas.microsoft.com/office/powerpoint/2010/main" xmlns:a14="http://schemas.microsoft.com/office/drawing/2010/main" w="9525">
+                  <a14:hiddenLine xmlns:a14="http://schemas.microsoft.com/office/drawing/2010/main" xmlns:p14="http://schemas.microsoft.com/office/powerpoint/2010/main" xmlns:a16="http://schemas.microsoft.com/office/drawing/2014/main" xmlns="" w="9525">
                     <a:solidFill>
                       <a:srgbClr val="000000"/>
                     </a:solidFill>
@@ -26222,7 +26223,7 @@
               </a:ln>
               <a:extLst>
                 <a:ext uri="{91240B29-F687-4f45-9708-019B960494DF}">
-                  <a14:hiddenLine xmlns="" xmlns:a16="http://schemas.microsoft.com/office/drawing/2014/main" xmlns:p14="http://schemas.microsoft.com/office/powerpoint/2010/main" xmlns:a14="http://schemas.microsoft.com/office/drawing/2010/main" w="9525">
+                  <a14:hiddenLine xmlns:a14="http://schemas.microsoft.com/office/drawing/2010/main" xmlns:p14="http://schemas.microsoft.com/office/powerpoint/2010/main" xmlns:a16="http://schemas.microsoft.com/office/drawing/2014/main" xmlns="" w="9525">
                     <a:solidFill>
                       <a:srgbClr val="000000"/>
                     </a:solidFill>
@@ -26327,7 +26328,7 @@
               </a:ln>
               <a:extLst>
                 <a:ext uri="{91240B29-F687-4f45-9708-019B960494DF}">
-                  <a14:hiddenLine xmlns="" xmlns:a16="http://schemas.microsoft.com/office/drawing/2014/main" xmlns:p14="http://schemas.microsoft.com/office/powerpoint/2010/main" xmlns:a14="http://schemas.microsoft.com/office/drawing/2010/main" w="9525">
+                  <a14:hiddenLine xmlns:a14="http://schemas.microsoft.com/office/drawing/2010/main" xmlns:p14="http://schemas.microsoft.com/office/powerpoint/2010/main" xmlns:a16="http://schemas.microsoft.com/office/drawing/2014/main" xmlns="" w="9525">
                     <a:solidFill>
                       <a:srgbClr val="000000"/>
                     </a:solidFill>
@@ -26404,7 +26405,7 @@
               </a:ln>
               <a:extLst>
                 <a:ext uri="{91240B29-F687-4f45-9708-019B960494DF}">
-                  <a14:hiddenLine xmlns="" xmlns:a16="http://schemas.microsoft.com/office/drawing/2014/main" xmlns:p14="http://schemas.microsoft.com/office/powerpoint/2010/main" xmlns:a14="http://schemas.microsoft.com/office/drawing/2010/main" w="9525">
+                  <a14:hiddenLine xmlns:a14="http://schemas.microsoft.com/office/drawing/2010/main" xmlns:p14="http://schemas.microsoft.com/office/powerpoint/2010/main" xmlns:a16="http://schemas.microsoft.com/office/drawing/2014/main" xmlns="" w="9525">
                     <a:solidFill>
                       <a:srgbClr val="000000"/>
                     </a:solidFill>
@@ -26481,7 +26482,7 @@
               </a:ln>
               <a:extLst>
                 <a:ext uri="{91240B29-F687-4f45-9708-019B960494DF}">
-                  <a14:hiddenLine xmlns="" xmlns:a16="http://schemas.microsoft.com/office/drawing/2014/main" xmlns:p14="http://schemas.microsoft.com/office/powerpoint/2010/main" xmlns:a14="http://schemas.microsoft.com/office/drawing/2010/main" w="9525">
+                  <a14:hiddenLine xmlns:a14="http://schemas.microsoft.com/office/drawing/2010/main" xmlns:p14="http://schemas.microsoft.com/office/powerpoint/2010/main" xmlns:a16="http://schemas.microsoft.com/office/drawing/2014/main" xmlns="" w="9525">
                     <a:solidFill>
                       <a:srgbClr val="000000"/>
                     </a:solidFill>
@@ -26586,7 +26587,7 @@
               </a:ln>
               <a:extLst>
                 <a:ext uri="{91240B29-F687-4f45-9708-019B960494DF}">
-                  <a14:hiddenLine xmlns="" xmlns:a16="http://schemas.microsoft.com/office/drawing/2014/main" xmlns:p14="http://schemas.microsoft.com/office/powerpoint/2010/main" xmlns:a14="http://schemas.microsoft.com/office/drawing/2010/main" w="9525">
+                  <a14:hiddenLine xmlns:a14="http://schemas.microsoft.com/office/drawing/2010/main" xmlns:p14="http://schemas.microsoft.com/office/powerpoint/2010/main" xmlns:a16="http://schemas.microsoft.com/office/drawing/2014/main" xmlns="" w="9525">
                     <a:solidFill>
                       <a:srgbClr val="000000"/>
                     </a:solidFill>
@@ -26691,7 +26692,7 @@
               </a:ln>
               <a:extLst>
                 <a:ext uri="{91240B29-F687-4f45-9708-019B960494DF}">
-                  <a14:hiddenLine xmlns="" xmlns:a16="http://schemas.microsoft.com/office/drawing/2014/main" xmlns:p14="http://schemas.microsoft.com/office/powerpoint/2010/main" xmlns:a14="http://schemas.microsoft.com/office/drawing/2010/main" w="9525">
+                  <a14:hiddenLine xmlns:a14="http://schemas.microsoft.com/office/drawing/2010/main" xmlns:p14="http://schemas.microsoft.com/office/powerpoint/2010/main" xmlns:a16="http://schemas.microsoft.com/office/drawing/2014/main" xmlns="" w="9525">
                     <a:solidFill>
                       <a:srgbClr val="000000"/>
                     </a:solidFill>
@@ -26768,7 +26769,7 @@
               </a:ln>
               <a:extLst>
                 <a:ext uri="{91240B29-F687-4f45-9708-019B960494DF}">
-                  <a14:hiddenLine xmlns="" xmlns:a16="http://schemas.microsoft.com/office/drawing/2014/main" xmlns:p14="http://schemas.microsoft.com/office/powerpoint/2010/main" xmlns:a14="http://schemas.microsoft.com/office/drawing/2010/main" w="9525">
+                  <a14:hiddenLine xmlns:a14="http://schemas.microsoft.com/office/drawing/2010/main" xmlns:p14="http://schemas.microsoft.com/office/powerpoint/2010/main" xmlns:a16="http://schemas.microsoft.com/office/drawing/2014/main" xmlns="" w="9525">
                     <a:solidFill>
                       <a:srgbClr val="000000"/>
                     </a:solidFill>
@@ -26893,7 +26894,7 @@
               </a:ln>
               <a:extLst>
                 <a:ext uri="{91240B29-F687-4f45-9708-019B960494DF}">
-                  <a14:hiddenLine xmlns="" xmlns:a16="http://schemas.microsoft.com/office/drawing/2014/main" xmlns:p14="http://schemas.microsoft.com/office/powerpoint/2010/main" xmlns:a14="http://schemas.microsoft.com/office/drawing/2010/main" w="9525">
+                  <a14:hiddenLine xmlns:a14="http://schemas.microsoft.com/office/drawing/2010/main" xmlns:p14="http://schemas.microsoft.com/office/powerpoint/2010/main" xmlns:a16="http://schemas.microsoft.com/office/drawing/2014/main" xmlns="" w="9525">
                     <a:solidFill>
                       <a:srgbClr val="000000"/>
                     </a:solidFill>
@@ -27007,7 +27008,7 @@
               </a:ln>
               <a:extLst>
                 <a:ext uri="{91240B29-F687-4f45-9708-019B960494DF}">
-                  <a14:hiddenLine xmlns="" xmlns:a16="http://schemas.microsoft.com/office/drawing/2014/main" xmlns:p14="http://schemas.microsoft.com/office/powerpoint/2010/main" xmlns:a14="http://schemas.microsoft.com/office/drawing/2010/main" w="9525">
+                  <a14:hiddenLine xmlns:a14="http://schemas.microsoft.com/office/drawing/2010/main" xmlns:p14="http://schemas.microsoft.com/office/powerpoint/2010/main" xmlns:a16="http://schemas.microsoft.com/office/drawing/2014/main" xmlns="" w="9525">
                     <a:solidFill>
                       <a:srgbClr val="000000"/>
                     </a:solidFill>
@@ -27084,7 +27085,7 @@
               </a:ln>
               <a:extLst>
                 <a:ext uri="{91240B29-F687-4f45-9708-019B960494DF}">
-                  <a14:hiddenLine xmlns="" xmlns:a16="http://schemas.microsoft.com/office/drawing/2014/main" xmlns:p14="http://schemas.microsoft.com/office/powerpoint/2010/main" xmlns:a14="http://schemas.microsoft.com/office/drawing/2010/main" w="9525">
+                  <a14:hiddenLine xmlns:a14="http://schemas.microsoft.com/office/drawing/2010/main" xmlns:p14="http://schemas.microsoft.com/office/powerpoint/2010/main" xmlns:a16="http://schemas.microsoft.com/office/drawing/2014/main" xmlns="" w="9525">
                     <a:solidFill>
                       <a:srgbClr val="000000"/>
                     </a:solidFill>
@@ -27161,7 +27162,7 @@
               </a:ln>
               <a:extLst>
                 <a:ext uri="{91240B29-F687-4f45-9708-019B960494DF}">
-                  <a14:hiddenLine xmlns="" xmlns:a16="http://schemas.microsoft.com/office/drawing/2014/main" xmlns:p14="http://schemas.microsoft.com/office/powerpoint/2010/main" xmlns:a14="http://schemas.microsoft.com/office/drawing/2010/main" w="9525">
+                  <a14:hiddenLine xmlns:a14="http://schemas.microsoft.com/office/drawing/2010/main" xmlns:p14="http://schemas.microsoft.com/office/powerpoint/2010/main" xmlns:a16="http://schemas.microsoft.com/office/drawing/2014/main" xmlns="" w="9525">
                     <a:solidFill>
                       <a:srgbClr val="000000"/>
                     </a:solidFill>
@@ -27266,7 +27267,7 @@
               </a:ln>
               <a:extLst>
                 <a:ext uri="{91240B29-F687-4f45-9708-019B960494DF}">
-                  <a14:hiddenLine xmlns="" xmlns:a16="http://schemas.microsoft.com/office/drawing/2014/main" xmlns:p14="http://schemas.microsoft.com/office/powerpoint/2010/main" xmlns:a14="http://schemas.microsoft.com/office/drawing/2010/main" w="9525">
+                  <a14:hiddenLine xmlns:a14="http://schemas.microsoft.com/office/drawing/2010/main" xmlns:p14="http://schemas.microsoft.com/office/powerpoint/2010/main" xmlns:a16="http://schemas.microsoft.com/office/drawing/2014/main" xmlns="" w="9525">
                     <a:solidFill>
                       <a:srgbClr val="000000"/>
                     </a:solidFill>
@@ -27315,7 +27316,7 @@
               </a:ln>
               <a:extLst>
                 <a:ext uri="{91240B29-F687-4f45-9708-019B960494DF}">
-                  <a14:hiddenLine xmlns="" xmlns:a16="http://schemas.microsoft.com/office/drawing/2014/main" xmlns:p14="http://schemas.microsoft.com/office/powerpoint/2010/main" xmlns:a14="http://schemas.microsoft.com/office/drawing/2010/main" w="9525">
+                  <a14:hiddenLine xmlns:a14="http://schemas.microsoft.com/office/drawing/2010/main" xmlns:p14="http://schemas.microsoft.com/office/powerpoint/2010/main" xmlns:a16="http://schemas.microsoft.com/office/drawing/2014/main" xmlns="" w="9525">
                     <a:solidFill>
                       <a:srgbClr val="000000"/>
                     </a:solidFill>
@@ -27395,7 +27396,7 @@
               </a:ln>
               <a:extLst>
                 <a:ext uri="{91240B29-F687-4f45-9708-019B960494DF}">
-                  <a14:hiddenLine xmlns="" xmlns:a16="http://schemas.microsoft.com/office/drawing/2014/main" xmlns:p14="http://schemas.microsoft.com/office/powerpoint/2010/main" xmlns:a14="http://schemas.microsoft.com/office/drawing/2010/main" w="9525">
+                  <a14:hiddenLine xmlns:a14="http://schemas.microsoft.com/office/drawing/2010/main" xmlns:p14="http://schemas.microsoft.com/office/powerpoint/2010/main" xmlns:a16="http://schemas.microsoft.com/office/drawing/2014/main" xmlns="" w="9525">
                     <a:solidFill>
                       <a:srgbClr val="000000"/>
                     </a:solidFill>
@@ -27500,7 +27501,7 @@
               </a:ln>
               <a:extLst>
                 <a:ext uri="{91240B29-F687-4f45-9708-019B960494DF}">
-                  <a14:hiddenLine xmlns="" xmlns:a16="http://schemas.microsoft.com/office/drawing/2014/main" xmlns:p14="http://schemas.microsoft.com/office/powerpoint/2010/main" xmlns:a14="http://schemas.microsoft.com/office/drawing/2010/main" w="9525">
+                  <a14:hiddenLine xmlns:a14="http://schemas.microsoft.com/office/drawing/2010/main" xmlns:p14="http://schemas.microsoft.com/office/powerpoint/2010/main" xmlns:a16="http://schemas.microsoft.com/office/drawing/2014/main" xmlns="" w="9525">
                     <a:solidFill>
                       <a:srgbClr val="000000"/>
                     </a:solidFill>
@@ -27577,7 +27578,7 @@
               </a:ln>
               <a:extLst>
                 <a:ext uri="{91240B29-F687-4f45-9708-019B960494DF}">
-                  <a14:hiddenLine xmlns="" xmlns:a16="http://schemas.microsoft.com/office/drawing/2014/main" xmlns:p14="http://schemas.microsoft.com/office/powerpoint/2010/main" xmlns:a14="http://schemas.microsoft.com/office/drawing/2010/main" w="9525">
+                  <a14:hiddenLine xmlns:a14="http://schemas.microsoft.com/office/drawing/2010/main" xmlns:p14="http://schemas.microsoft.com/office/powerpoint/2010/main" xmlns:a16="http://schemas.microsoft.com/office/drawing/2014/main" xmlns="" w="9525">
                     <a:solidFill>
                       <a:srgbClr val="000000"/>
                     </a:solidFill>
@@ -27682,7 +27683,7 @@
               </a:ln>
               <a:extLst>
                 <a:ext uri="{91240B29-F687-4f45-9708-019B960494DF}">
-                  <a14:hiddenLine xmlns="" xmlns:a16="http://schemas.microsoft.com/office/drawing/2014/main" xmlns:p14="http://schemas.microsoft.com/office/powerpoint/2010/main" xmlns:a14="http://schemas.microsoft.com/office/drawing/2010/main" w="9525">
+                  <a14:hiddenLine xmlns:a14="http://schemas.microsoft.com/office/drawing/2010/main" xmlns:p14="http://schemas.microsoft.com/office/powerpoint/2010/main" xmlns:a16="http://schemas.microsoft.com/office/drawing/2014/main" xmlns="" w="9525">
                     <a:solidFill>
                       <a:srgbClr val="000000"/>
                     </a:solidFill>
@@ -27762,7 +27763,7 @@
               </a:ln>
               <a:extLst>
                 <a:ext uri="{91240B29-F687-4f45-9708-019B960494DF}">
-                  <a14:hiddenLine xmlns="" xmlns:a16="http://schemas.microsoft.com/office/drawing/2014/main" xmlns:p14="http://schemas.microsoft.com/office/powerpoint/2010/main" xmlns:a14="http://schemas.microsoft.com/office/drawing/2010/main" w="9525">
+                  <a14:hiddenLine xmlns:a14="http://schemas.microsoft.com/office/drawing/2010/main" xmlns:p14="http://schemas.microsoft.com/office/powerpoint/2010/main" xmlns:a16="http://schemas.microsoft.com/office/drawing/2014/main" xmlns="" w="9525">
                     <a:solidFill>
                       <a:srgbClr val="000000"/>
                     </a:solidFill>
@@ -27839,7 +27840,7 @@
               </a:ln>
               <a:extLst>
                 <a:ext uri="{91240B29-F687-4f45-9708-019B960494DF}">
-                  <a14:hiddenLine xmlns="" xmlns:a16="http://schemas.microsoft.com/office/drawing/2014/main" xmlns:p14="http://schemas.microsoft.com/office/powerpoint/2010/main" xmlns:a14="http://schemas.microsoft.com/office/drawing/2010/main" w="9525">
+                  <a14:hiddenLine xmlns:a14="http://schemas.microsoft.com/office/drawing/2010/main" xmlns:p14="http://schemas.microsoft.com/office/powerpoint/2010/main" xmlns:a16="http://schemas.microsoft.com/office/drawing/2014/main" xmlns="" w="9525">
                     <a:solidFill>
                       <a:srgbClr val="000000"/>
                     </a:solidFill>
@@ -27944,7 +27945,7 @@
               </a:ln>
               <a:extLst>
                 <a:ext uri="{91240B29-F687-4f45-9708-019B960494DF}">
-                  <a14:hiddenLine xmlns="" xmlns:a16="http://schemas.microsoft.com/office/drawing/2014/main" xmlns:p14="http://schemas.microsoft.com/office/powerpoint/2010/main" xmlns:a14="http://schemas.microsoft.com/office/drawing/2010/main" w="9525">
+                  <a14:hiddenLine xmlns:a14="http://schemas.microsoft.com/office/drawing/2010/main" xmlns:p14="http://schemas.microsoft.com/office/powerpoint/2010/main" xmlns:a16="http://schemas.microsoft.com/office/drawing/2014/main" xmlns="" w="9525">
                     <a:solidFill>
                       <a:srgbClr val="000000"/>
                     </a:solidFill>
@@ -28049,7 +28050,7 @@
               </a:ln>
               <a:extLst>
                 <a:ext uri="{91240B29-F687-4f45-9708-019B960494DF}">
-                  <a14:hiddenLine xmlns="" xmlns:a16="http://schemas.microsoft.com/office/drawing/2014/main" xmlns:p14="http://schemas.microsoft.com/office/powerpoint/2010/main" xmlns:a14="http://schemas.microsoft.com/office/drawing/2010/main" w="9525">
+                  <a14:hiddenLine xmlns:a14="http://schemas.microsoft.com/office/drawing/2010/main" xmlns:p14="http://schemas.microsoft.com/office/powerpoint/2010/main" xmlns:a16="http://schemas.microsoft.com/office/drawing/2014/main" xmlns="" w="9525">
                     <a:solidFill>
                       <a:srgbClr val="000000"/>
                     </a:solidFill>
@@ -28129,7 +28130,7 @@
               </a:ln>
               <a:extLst>
                 <a:ext uri="{91240B29-F687-4f45-9708-019B960494DF}">
-                  <a14:hiddenLine xmlns="" xmlns:a16="http://schemas.microsoft.com/office/drawing/2014/main" xmlns:p14="http://schemas.microsoft.com/office/powerpoint/2010/main" xmlns:a14="http://schemas.microsoft.com/office/drawing/2010/main" w="9525">
+                  <a14:hiddenLine xmlns:a14="http://schemas.microsoft.com/office/drawing/2010/main" xmlns:p14="http://schemas.microsoft.com/office/powerpoint/2010/main" xmlns:a16="http://schemas.microsoft.com/office/drawing/2014/main" xmlns="" w="9525">
                     <a:solidFill>
                       <a:srgbClr val="000000"/>
                     </a:solidFill>
@@ -28264,7 +28265,7 @@
               </a:ln>
               <a:extLst>
                 <a:ext uri="{91240B29-F687-4f45-9708-019B960494DF}">
-                  <a14:hiddenLine xmlns="" xmlns:a16="http://schemas.microsoft.com/office/drawing/2014/main" xmlns:p14="http://schemas.microsoft.com/office/powerpoint/2010/main" xmlns:a14="http://schemas.microsoft.com/office/drawing/2010/main" w="9525">
+                  <a14:hiddenLine xmlns:a14="http://schemas.microsoft.com/office/drawing/2010/main" xmlns:p14="http://schemas.microsoft.com/office/powerpoint/2010/main" xmlns:a16="http://schemas.microsoft.com/office/drawing/2014/main" xmlns="" w="9525">
                     <a:solidFill>
                       <a:srgbClr val="000000"/>
                     </a:solidFill>
@@ -28392,7 +28393,7 @@
               </a:ln>
               <a:extLst>
                 <a:ext uri="{91240B29-F687-4f45-9708-019B960494DF}">
-                  <a14:hiddenLine xmlns="" xmlns:a16="http://schemas.microsoft.com/office/drawing/2014/main" xmlns:p14="http://schemas.microsoft.com/office/powerpoint/2010/main" xmlns:a14="http://schemas.microsoft.com/office/drawing/2010/main" w="9525">
+                  <a14:hiddenLine xmlns:a14="http://schemas.microsoft.com/office/drawing/2010/main" xmlns:p14="http://schemas.microsoft.com/office/powerpoint/2010/main" xmlns:a16="http://schemas.microsoft.com/office/drawing/2014/main" xmlns="" w="9525">
                     <a:solidFill>
                       <a:srgbClr val="000000"/>
                     </a:solidFill>
@@ -28522,7 +28523,7 @@
               </a:ln>
               <a:extLst>
                 <a:ext uri="{91240B29-F687-4f45-9708-019B960494DF}">
-                  <a14:hiddenLine xmlns="" xmlns:a16="http://schemas.microsoft.com/office/drawing/2014/main" xmlns:p14="http://schemas.microsoft.com/office/powerpoint/2010/main" xmlns:a14="http://schemas.microsoft.com/office/drawing/2010/main" w="9525">
+                  <a14:hiddenLine xmlns:a14="http://schemas.microsoft.com/office/drawing/2010/main" xmlns:p14="http://schemas.microsoft.com/office/powerpoint/2010/main" xmlns:a16="http://schemas.microsoft.com/office/drawing/2014/main" xmlns="" w="9525">
                     <a:solidFill>
                       <a:srgbClr val="000000"/>
                     </a:solidFill>
@@ -28627,7 +28628,7 @@
               </a:ln>
               <a:extLst>
                 <a:ext uri="{91240B29-F687-4f45-9708-019B960494DF}">
-                  <a14:hiddenLine xmlns="" xmlns:a16="http://schemas.microsoft.com/office/drawing/2014/main" xmlns:p14="http://schemas.microsoft.com/office/powerpoint/2010/main" xmlns:a14="http://schemas.microsoft.com/office/drawing/2010/main" w="9525">
+                  <a14:hiddenLine xmlns:a14="http://schemas.microsoft.com/office/drawing/2010/main" xmlns:p14="http://schemas.microsoft.com/office/powerpoint/2010/main" xmlns:a16="http://schemas.microsoft.com/office/drawing/2014/main" xmlns="" w="9525">
                     <a:solidFill>
                       <a:srgbClr val="000000"/>
                     </a:solidFill>
@@ -28707,7 +28708,7 @@
               </a:ln>
               <a:extLst>
                 <a:ext uri="{91240B29-F687-4f45-9708-019B960494DF}">
-                  <a14:hiddenLine xmlns="" xmlns:a16="http://schemas.microsoft.com/office/drawing/2014/main" xmlns:p14="http://schemas.microsoft.com/office/powerpoint/2010/main" xmlns:a14="http://schemas.microsoft.com/office/drawing/2010/main" w="9525">
+                  <a14:hiddenLine xmlns:a14="http://schemas.microsoft.com/office/drawing/2010/main" xmlns:p14="http://schemas.microsoft.com/office/powerpoint/2010/main" xmlns:a16="http://schemas.microsoft.com/office/drawing/2014/main" xmlns="" w="9525">
                     <a:solidFill>
                       <a:srgbClr val="000000"/>
                     </a:solidFill>
@@ -28812,7 +28813,7 @@
               </a:ln>
               <a:extLst>
                 <a:ext uri="{91240B29-F687-4f45-9708-019B960494DF}">
-                  <a14:hiddenLine xmlns="" xmlns:a16="http://schemas.microsoft.com/office/drawing/2014/main" xmlns:p14="http://schemas.microsoft.com/office/powerpoint/2010/main" xmlns:a14="http://schemas.microsoft.com/office/drawing/2010/main" w="9525">
+                  <a14:hiddenLine xmlns:a14="http://schemas.microsoft.com/office/drawing/2010/main" xmlns:p14="http://schemas.microsoft.com/office/powerpoint/2010/main" xmlns:a16="http://schemas.microsoft.com/office/drawing/2014/main" xmlns="" w="9525">
                     <a:solidFill>
                       <a:srgbClr val="000000"/>
                     </a:solidFill>
@@ -28895,7 +28896,7 @@
               </a:ln>
               <a:extLst>
                 <a:ext uri="{91240B29-F687-4f45-9708-019B960494DF}">
-                  <a14:hiddenLine xmlns="" xmlns:a16="http://schemas.microsoft.com/office/drawing/2014/main" xmlns:p14="http://schemas.microsoft.com/office/powerpoint/2010/main" xmlns:a14="http://schemas.microsoft.com/office/drawing/2010/main" w="9525">
+                  <a14:hiddenLine xmlns:a14="http://schemas.microsoft.com/office/drawing/2010/main" xmlns:p14="http://schemas.microsoft.com/office/powerpoint/2010/main" xmlns:a16="http://schemas.microsoft.com/office/drawing/2014/main" xmlns="" w="9525">
                     <a:solidFill>
                       <a:srgbClr val="000000"/>
                     </a:solidFill>
@@ -29000,7 +29001,7 @@
               </a:ln>
               <a:extLst>
                 <a:ext uri="{91240B29-F687-4f45-9708-019B960494DF}">
-                  <a14:hiddenLine xmlns="" xmlns:a16="http://schemas.microsoft.com/office/drawing/2014/main" xmlns:p14="http://schemas.microsoft.com/office/powerpoint/2010/main" xmlns:a14="http://schemas.microsoft.com/office/drawing/2010/main" w="9525">
+                  <a14:hiddenLine xmlns:a14="http://schemas.microsoft.com/office/drawing/2010/main" xmlns:p14="http://schemas.microsoft.com/office/powerpoint/2010/main" xmlns:a16="http://schemas.microsoft.com/office/drawing/2014/main" xmlns="" w="9525">
                     <a:solidFill>
                       <a:srgbClr val="000000"/>
                     </a:solidFill>
@@ -29083,7 +29084,7 @@
               </a:ln>
               <a:extLst>
                 <a:ext uri="{91240B29-F687-4f45-9708-019B960494DF}">
-                  <a14:hiddenLine xmlns="" xmlns:a16="http://schemas.microsoft.com/office/drawing/2014/main" xmlns:p14="http://schemas.microsoft.com/office/powerpoint/2010/main" xmlns:a14="http://schemas.microsoft.com/office/drawing/2010/main" w="9525">
+                  <a14:hiddenLine xmlns:a14="http://schemas.microsoft.com/office/drawing/2010/main" xmlns:p14="http://schemas.microsoft.com/office/powerpoint/2010/main" xmlns:a16="http://schemas.microsoft.com/office/drawing/2014/main" xmlns="" w="9525">
                     <a:solidFill>
                       <a:srgbClr val="000000"/>
                     </a:solidFill>
@@ -29188,7 +29189,7 @@
               </a:ln>
               <a:extLst>
                 <a:ext uri="{91240B29-F687-4f45-9708-019B960494DF}">
-                  <a14:hiddenLine xmlns="" xmlns:a16="http://schemas.microsoft.com/office/drawing/2014/main" xmlns:p14="http://schemas.microsoft.com/office/powerpoint/2010/main" xmlns:a14="http://schemas.microsoft.com/office/drawing/2010/main" w="9525">
+                  <a14:hiddenLine xmlns:a14="http://schemas.microsoft.com/office/drawing/2010/main" xmlns:p14="http://schemas.microsoft.com/office/powerpoint/2010/main" xmlns:a16="http://schemas.microsoft.com/office/drawing/2014/main" xmlns="" w="9525">
                     <a:solidFill>
                       <a:srgbClr val="000000"/>
                     </a:solidFill>
@@ -29237,7 +29238,7 @@
               </a:ln>
               <a:extLst>
                 <a:ext uri="{91240B29-F687-4f45-9708-019B960494DF}">
-                  <a14:hiddenLine xmlns="" xmlns:a16="http://schemas.microsoft.com/office/drawing/2014/main" xmlns:p14="http://schemas.microsoft.com/office/powerpoint/2010/main" xmlns:a14="http://schemas.microsoft.com/office/drawing/2010/main" w="9525">
+                  <a14:hiddenLine xmlns:a14="http://schemas.microsoft.com/office/drawing/2010/main" xmlns:p14="http://schemas.microsoft.com/office/powerpoint/2010/main" xmlns:a16="http://schemas.microsoft.com/office/drawing/2014/main" xmlns="" w="9525">
                     <a:solidFill>
                       <a:srgbClr val="000000"/>
                     </a:solidFill>
@@ -29357,7 +29358,7 @@
           </a:prstGeom>
           <a:extLst>
             <a:ext uri="{909E8E84-426E-40dd-AFC4-6F175D3DCCD1}">
-              <a14:hiddenFill xmlns="" xmlns:a16="http://schemas.microsoft.com/office/drawing/2014/main" xmlns:p14="http://schemas.microsoft.com/office/powerpoint/2010/main" xmlns:a14="http://schemas.microsoft.com/office/drawing/2010/main">
+              <a14:hiddenFill xmlns:a14="http://schemas.microsoft.com/office/drawing/2010/main" xmlns:p14="http://schemas.microsoft.com/office/powerpoint/2010/main" xmlns:a16="http://schemas.microsoft.com/office/drawing/2014/main" xmlns="">
                 <a:solidFill>
                   <a:srgbClr val="FFFFFF"/>
                 </a:solidFill>
@@ -29481,7 +29482,7 @@
           <a:noFill/>
           <a:extLst>
             <a:ext uri="{909E8E84-426E-40dd-AFC4-6F175D3DCCD1}">
-              <a14:hiddenFill xmlns="" xmlns:a16="http://schemas.microsoft.com/office/drawing/2014/main" xmlns:p14="http://schemas.microsoft.com/office/powerpoint/2010/main" xmlns:a14="http://schemas.microsoft.com/office/drawing/2010/main">
+              <a14:hiddenFill xmlns:a14="http://schemas.microsoft.com/office/drawing/2010/main" xmlns:p14="http://schemas.microsoft.com/office/powerpoint/2010/main" xmlns:a16="http://schemas.microsoft.com/office/drawing/2014/main" xmlns="">
                 <a:solidFill>
                   <a:srgbClr val="FFFFFF"/>
                 </a:solidFill>
@@ -29672,7 +29673,7 @@
             </a:ln>
             <a:extLst>
               <a:ext uri="{91240B29-F687-4f45-9708-019B960494DF}">
-                <a14:hiddenLine xmlns="" xmlns:a16="http://schemas.microsoft.com/office/drawing/2014/main" xmlns:p14="http://schemas.microsoft.com/office/powerpoint/2010/main" xmlns:a14="http://schemas.microsoft.com/office/drawing/2010/main" w="9525">
+                <a14:hiddenLine xmlns:a14="http://schemas.microsoft.com/office/drawing/2010/main" xmlns:p14="http://schemas.microsoft.com/office/powerpoint/2010/main" xmlns:a16="http://schemas.microsoft.com/office/drawing/2014/main" xmlns="" w="9525">
                   <a:solidFill>
                     <a:srgbClr val="000000"/>
                   </a:solidFill>
@@ -29777,7 +29778,7 @@
             </a:ln>
             <a:extLst>
               <a:ext uri="{91240B29-F687-4f45-9708-019B960494DF}">
-                <a14:hiddenLine xmlns="" xmlns:a16="http://schemas.microsoft.com/office/drawing/2014/main" xmlns:p14="http://schemas.microsoft.com/office/powerpoint/2010/main" xmlns:a14="http://schemas.microsoft.com/office/drawing/2010/main" w="9525">
+                <a14:hiddenLine xmlns:a14="http://schemas.microsoft.com/office/drawing/2010/main" xmlns:p14="http://schemas.microsoft.com/office/powerpoint/2010/main" xmlns:a16="http://schemas.microsoft.com/office/drawing/2014/main" xmlns="" w="9525">
                   <a:solidFill>
                     <a:srgbClr val="000000"/>
                   </a:solidFill>
@@ -29882,7 +29883,7 @@
             </a:ln>
             <a:extLst>
               <a:ext uri="{91240B29-F687-4f45-9708-019B960494DF}">
-                <a14:hiddenLine xmlns="" xmlns:a16="http://schemas.microsoft.com/office/drawing/2014/main" xmlns:p14="http://schemas.microsoft.com/office/powerpoint/2010/main" xmlns:a14="http://schemas.microsoft.com/office/drawing/2010/main" w="9525">
+                <a14:hiddenLine xmlns:a14="http://schemas.microsoft.com/office/drawing/2010/main" xmlns:p14="http://schemas.microsoft.com/office/powerpoint/2010/main" xmlns:a16="http://schemas.microsoft.com/office/drawing/2014/main" xmlns="" w="9525">
                   <a:solidFill>
                     <a:srgbClr val="000000"/>
                   </a:solidFill>
@@ -29959,7 +29960,7 @@
             </a:ln>
             <a:extLst>
               <a:ext uri="{91240B29-F687-4f45-9708-019B960494DF}">
-                <a14:hiddenLine xmlns="" xmlns:a16="http://schemas.microsoft.com/office/drawing/2014/main" xmlns:p14="http://schemas.microsoft.com/office/powerpoint/2010/main" xmlns:a14="http://schemas.microsoft.com/office/drawing/2010/main" w="9525">
+                <a14:hiddenLine xmlns:a14="http://schemas.microsoft.com/office/drawing/2010/main" xmlns:p14="http://schemas.microsoft.com/office/powerpoint/2010/main" xmlns:a16="http://schemas.microsoft.com/office/drawing/2014/main" xmlns="" w="9525">
                   <a:solidFill>
                     <a:srgbClr val="000000"/>
                   </a:solidFill>
@@ -30064,7 +30065,7 @@
             </a:ln>
             <a:extLst>
               <a:ext uri="{91240B29-F687-4f45-9708-019B960494DF}">
-                <a14:hiddenLine xmlns="" xmlns:a16="http://schemas.microsoft.com/office/drawing/2014/main" xmlns:p14="http://schemas.microsoft.com/office/powerpoint/2010/main" xmlns:a14="http://schemas.microsoft.com/office/drawing/2010/main" w="9525">
+                <a14:hiddenLine xmlns:a14="http://schemas.microsoft.com/office/drawing/2010/main" xmlns:p14="http://schemas.microsoft.com/office/powerpoint/2010/main" xmlns:a16="http://schemas.microsoft.com/office/drawing/2014/main" xmlns="" w="9525">
                   <a:solidFill>
                     <a:srgbClr val="000000"/>
                   </a:solidFill>
@@ -30141,7 +30142,7 @@
             </a:ln>
             <a:extLst>
               <a:ext uri="{91240B29-F687-4f45-9708-019B960494DF}">
-                <a14:hiddenLine xmlns="" xmlns:a16="http://schemas.microsoft.com/office/drawing/2014/main" xmlns:p14="http://schemas.microsoft.com/office/powerpoint/2010/main" xmlns:a14="http://schemas.microsoft.com/office/drawing/2010/main" w="9525">
+                <a14:hiddenLine xmlns:a14="http://schemas.microsoft.com/office/drawing/2010/main" xmlns:p14="http://schemas.microsoft.com/office/powerpoint/2010/main" xmlns:a16="http://schemas.microsoft.com/office/drawing/2014/main" xmlns="" w="9525">
                   <a:solidFill>
                     <a:srgbClr val="000000"/>
                   </a:solidFill>
@@ -30218,7 +30219,7 @@
             </a:ln>
             <a:extLst>
               <a:ext uri="{91240B29-F687-4f45-9708-019B960494DF}">
-                <a14:hiddenLine xmlns="" xmlns:a16="http://schemas.microsoft.com/office/drawing/2014/main" xmlns:p14="http://schemas.microsoft.com/office/powerpoint/2010/main" xmlns:a14="http://schemas.microsoft.com/office/drawing/2010/main" w="9525">
+                <a14:hiddenLine xmlns:a14="http://schemas.microsoft.com/office/drawing/2010/main" xmlns:p14="http://schemas.microsoft.com/office/powerpoint/2010/main" xmlns:a16="http://schemas.microsoft.com/office/drawing/2014/main" xmlns="" w="9525">
                   <a:solidFill>
                     <a:srgbClr val="000000"/>
                   </a:solidFill>
@@ -30323,7 +30324,7 @@
             </a:ln>
             <a:extLst>
               <a:ext uri="{91240B29-F687-4f45-9708-019B960494DF}">
-                <a14:hiddenLine xmlns="" xmlns:a16="http://schemas.microsoft.com/office/drawing/2014/main" xmlns:p14="http://schemas.microsoft.com/office/powerpoint/2010/main" xmlns:a14="http://schemas.microsoft.com/office/drawing/2010/main" w="9525">
+                <a14:hiddenLine xmlns:a14="http://schemas.microsoft.com/office/drawing/2010/main" xmlns:p14="http://schemas.microsoft.com/office/powerpoint/2010/main" xmlns:a16="http://schemas.microsoft.com/office/drawing/2014/main" xmlns="" w="9525">
                   <a:solidFill>
                     <a:srgbClr val="000000"/>
                   </a:solidFill>
@@ -30428,7 +30429,7 @@
             </a:ln>
             <a:extLst>
               <a:ext uri="{91240B29-F687-4f45-9708-019B960494DF}">
-                <a14:hiddenLine xmlns="" xmlns:a16="http://schemas.microsoft.com/office/drawing/2014/main" xmlns:p14="http://schemas.microsoft.com/office/powerpoint/2010/main" xmlns:a14="http://schemas.microsoft.com/office/drawing/2010/main" w="9525">
+                <a14:hiddenLine xmlns:a14="http://schemas.microsoft.com/office/drawing/2010/main" xmlns:p14="http://schemas.microsoft.com/office/powerpoint/2010/main" xmlns:a16="http://schemas.microsoft.com/office/drawing/2014/main" xmlns="" w="9525">
                   <a:solidFill>
                     <a:srgbClr val="000000"/>
                   </a:solidFill>
@@ -30505,7 +30506,7 @@
             </a:ln>
             <a:extLst>
               <a:ext uri="{91240B29-F687-4f45-9708-019B960494DF}">
-                <a14:hiddenLine xmlns="" xmlns:a16="http://schemas.microsoft.com/office/drawing/2014/main" xmlns:p14="http://schemas.microsoft.com/office/powerpoint/2010/main" xmlns:a14="http://schemas.microsoft.com/office/drawing/2010/main" w="9525">
+                <a14:hiddenLine xmlns:a14="http://schemas.microsoft.com/office/drawing/2010/main" xmlns:p14="http://schemas.microsoft.com/office/powerpoint/2010/main" xmlns:a16="http://schemas.microsoft.com/office/drawing/2014/main" xmlns="" w="9525">
                   <a:solidFill>
                     <a:srgbClr val="000000"/>
                   </a:solidFill>
@@ -30630,7 +30631,7 @@
             </a:ln>
             <a:extLst>
               <a:ext uri="{91240B29-F687-4f45-9708-019B960494DF}">
-                <a14:hiddenLine xmlns="" xmlns:a16="http://schemas.microsoft.com/office/drawing/2014/main" xmlns:p14="http://schemas.microsoft.com/office/powerpoint/2010/main" xmlns:a14="http://schemas.microsoft.com/office/drawing/2010/main" w="9525">
+                <a14:hiddenLine xmlns:a14="http://schemas.microsoft.com/office/drawing/2010/main" xmlns:p14="http://schemas.microsoft.com/office/powerpoint/2010/main" xmlns:a16="http://schemas.microsoft.com/office/drawing/2014/main" xmlns="" w="9525">
                   <a:solidFill>
                     <a:srgbClr val="000000"/>
                   </a:solidFill>
@@ -30744,7 +30745,7 @@
             </a:ln>
             <a:extLst>
               <a:ext uri="{91240B29-F687-4f45-9708-019B960494DF}">
-                <a14:hiddenLine xmlns="" xmlns:a16="http://schemas.microsoft.com/office/drawing/2014/main" xmlns:p14="http://schemas.microsoft.com/office/powerpoint/2010/main" xmlns:a14="http://schemas.microsoft.com/office/drawing/2010/main" w="9525">
+                <a14:hiddenLine xmlns:a14="http://schemas.microsoft.com/office/drawing/2010/main" xmlns:p14="http://schemas.microsoft.com/office/powerpoint/2010/main" xmlns:a16="http://schemas.microsoft.com/office/drawing/2014/main" xmlns="" w="9525">
                   <a:solidFill>
                     <a:srgbClr val="000000"/>
                   </a:solidFill>
@@ -30821,7 +30822,7 @@
             </a:ln>
             <a:extLst>
               <a:ext uri="{91240B29-F687-4f45-9708-019B960494DF}">
-                <a14:hiddenLine xmlns="" xmlns:a16="http://schemas.microsoft.com/office/drawing/2014/main" xmlns:p14="http://schemas.microsoft.com/office/powerpoint/2010/main" xmlns:a14="http://schemas.microsoft.com/office/drawing/2010/main" w="9525">
+                <a14:hiddenLine xmlns:a14="http://schemas.microsoft.com/office/drawing/2010/main" xmlns:p14="http://schemas.microsoft.com/office/powerpoint/2010/main" xmlns:a16="http://schemas.microsoft.com/office/drawing/2014/main" xmlns="" w="9525">
                   <a:solidFill>
                     <a:srgbClr val="000000"/>
                   </a:solidFill>
@@ -30898,7 +30899,7 @@
             </a:ln>
             <a:extLst>
               <a:ext uri="{91240B29-F687-4f45-9708-019B960494DF}">
-                <a14:hiddenLine xmlns="" xmlns:a16="http://schemas.microsoft.com/office/drawing/2014/main" xmlns:p14="http://schemas.microsoft.com/office/powerpoint/2010/main" xmlns:a14="http://schemas.microsoft.com/office/drawing/2010/main" w="9525">
+                <a14:hiddenLine xmlns:a14="http://schemas.microsoft.com/office/drawing/2010/main" xmlns:p14="http://schemas.microsoft.com/office/powerpoint/2010/main" xmlns:a16="http://schemas.microsoft.com/office/drawing/2014/main" xmlns="" w="9525">
                   <a:solidFill>
                     <a:srgbClr val="000000"/>
                   </a:solidFill>
@@ -31003,7 +31004,7 @@
             </a:ln>
             <a:extLst>
               <a:ext uri="{91240B29-F687-4f45-9708-019B960494DF}">
-                <a14:hiddenLine xmlns="" xmlns:a16="http://schemas.microsoft.com/office/drawing/2014/main" xmlns:p14="http://schemas.microsoft.com/office/powerpoint/2010/main" xmlns:a14="http://schemas.microsoft.com/office/drawing/2010/main" w="9525">
+                <a14:hiddenLine xmlns:a14="http://schemas.microsoft.com/office/drawing/2010/main" xmlns:p14="http://schemas.microsoft.com/office/powerpoint/2010/main" xmlns:a16="http://schemas.microsoft.com/office/drawing/2014/main" xmlns="" w="9525">
                   <a:solidFill>
                     <a:srgbClr val="000000"/>
                   </a:solidFill>
@@ -31052,7 +31053,7 @@
             </a:ln>
             <a:extLst>
               <a:ext uri="{91240B29-F687-4f45-9708-019B960494DF}">
-                <a14:hiddenLine xmlns="" xmlns:a16="http://schemas.microsoft.com/office/drawing/2014/main" xmlns:p14="http://schemas.microsoft.com/office/powerpoint/2010/main" xmlns:a14="http://schemas.microsoft.com/office/drawing/2010/main" w="9525">
+                <a14:hiddenLine xmlns:a14="http://schemas.microsoft.com/office/drawing/2010/main" xmlns:p14="http://schemas.microsoft.com/office/powerpoint/2010/main" xmlns:a16="http://schemas.microsoft.com/office/drawing/2014/main" xmlns="" w="9525">
                   <a:solidFill>
                     <a:srgbClr val="000000"/>
                   </a:solidFill>
@@ -31132,7 +31133,7 @@
             </a:ln>
             <a:extLst>
               <a:ext uri="{91240B29-F687-4f45-9708-019B960494DF}">
-                <a14:hiddenLine xmlns="" xmlns:a16="http://schemas.microsoft.com/office/drawing/2014/main" xmlns:p14="http://schemas.microsoft.com/office/powerpoint/2010/main" xmlns:a14="http://schemas.microsoft.com/office/drawing/2010/main" w="9525">
+                <a14:hiddenLine xmlns:a14="http://schemas.microsoft.com/office/drawing/2010/main" xmlns:p14="http://schemas.microsoft.com/office/powerpoint/2010/main" xmlns:a16="http://schemas.microsoft.com/office/drawing/2014/main" xmlns="" w="9525">
                   <a:solidFill>
                     <a:srgbClr val="000000"/>
                   </a:solidFill>
@@ -31237,7 +31238,7 @@
             </a:ln>
             <a:extLst>
               <a:ext uri="{91240B29-F687-4f45-9708-019B960494DF}">
-                <a14:hiddenLine xmlns="" xmlns:a16="http://schemas.microsoft.com/office/drawing/2014/main" xmlns:p14="http://schemas.microsoft.com/office/powerpoint/2010/main" xmlns:a14="http://schemas.microsoft.com/office/drawing/2010/main" w="9525">
+                <a14:hiddenLine xmlns:a14="http://schemas.microsoft.com/office/drawing/2010/main" xmlns:p14="http://schemas.microsoft.com/office/powerpoint/2010/main" xmlns:a16="http://schemas.microsoft.com/office/drawing/2014/main" xmlns="" w="9525">
                   <a:solidFill>
                     <a:srgbClr val="000000"/>
                   </a:solidFill>
@@ -31314,7 +31315,7 @@
             </a:ln>
             <a:extLst>
               <a:ext uri="{91240B29-F687-4f45-9708-019B960494DF}">
-                <a14:hiddenLine xmlns="" xmlns:a16="http://schemas.microsoft.com/office/drawing/2014/main" xmlns:p14="http://schemas.microsoft.com/office/powerpoint/2010/main" xmlns:a14="http://schemas.microsoft.com/office/drawing/2010/main" w="9525">
+                <a14:hiddenLine xmlns:a14="http://schemas.microsoft.com/office/drawing/2010/main" xmlns:p14="http://schemas.microsoft.com/office/powerpoint/2010/main" xmlns:a16="http://schemas.microsoft.com/office/drawing/2014/main" xmlns="" w="9525">
                   <a:solidFill>
                     <a:srgbClr val="000000"/>
                   </a:solidFill>
@@ -31419,7 +31420,7 @@
             </a:ln>
             <a:extLst>
               <a:ext uri="{91240B29-F687-4f45-9708-019B960494DF}">
-                <a14:hiddenLine xmlns="" xmlns:a16="http://schemas.microsoft.com/office/drawing/2014/main" xmlns:p14="http://schemas.microsoft.com/office/powerpoint/2010/main" xmlns:a14="http://schemas.microsoft.com/office/drawing/2010/main" w="9525">
+                <a14:hiddenLine xmlns:a14="http://schemas.microsoft.com/office/drawing/2010/main" xmlns:p14="http://schemas.microsoft.com/office/powerpoint/2010/main" xmlns:a16="http://schemas.microsoft.com/office/drawing/2014/main" xmlns="" w="9525">
                   <a:solidFill>
                     <a:srgbClr val="000000"/>
                   </a:solidFill>
@@ -31499,7 +31500,7 @@
             </a:ln>
             <a:extLst>
               <a:ext uri="{91240B29-F687-4f45-9708-019B960494DF}">
-                <a14:hiddenLine xmlns="" xmlns:a16="http://schemas.microsoft.com/office/drawing/2014/main" xmlns:p14="http://schemas.microsoft.com/office/powerpoint/2010/main" xmlns:a14="http://schemas.microsoft.com/office/drawing/2010/main" w="9525">
+                <a14:hiddenLine xmlns:a14="http://schemas.microsoft.com/office/drawing/2010/main" xmlns:p14="http://schemas.microsoft.com/office/powerpoint/2010/main" xmlns:a16="http://schemas.microsoft.com/office/drawing/2014/main" xmlns="" w="9525">
                   <a:solidFill>
                     <a:srgbClr val="000000"/>
                   </a:solidFill>
@@ -31576,7 +31577,7 @@
             </a:ln>
             <a:extLst>
               <a:ext uri="{91240B29-F687-4f45-9708-019B960494DF}">
-                <a14:hiddenLine xmlns="" xmlns:a16="http://schemas.microsoft.com/office/drawing/2014/main" xmlns:p14="http://schemas.microsoft.com/office/powerpoint/2010/main" xmlns:a14="http://schemas.microsoft.com/office/drawing/2010/main" w="9525">
+                <a14:hiddenLine xmlns:a14="http://schemas.microsoft.com/office/drawing/2010/main" xmlns:p14="http://schemas.microsoft.com/office/powerpoint/2010/main" xmlns:a16="http://schemas.microsoft.com/office/drawing/2014/main" xmlns="" w="9525">
                   <a:solidFill>
                     <a:srgbClr val="000000"/>
                   </a:solidFill>
@@ -31681,7 +31682,7 @@
             </a:ln>
             <a:extLst>
               <a:ext uri="{91240B29-F687-4f45-9708-019B960494DF}">
-                <a14:hiddenLine xmlns="" xmlns:a16="http://schemas.microsoft.com/office/drawing/2014/main" xmlns:p14="http://schemas.microsoft.com/office/powerpoint/2010/main" xmlns:a14="http://schemas.microsoft.com/office/drawing/2010/main" w="9525">
+                <a14:hiddenLine xmlns:a14="http://schemas.microsoft.com/office/drawing/2010/main" xmlns:p14="http://schemas.microsoft.com/office/powerpoint/2010/main" xmlns:a16="http://schemas.microsoft.com/office/drawing/2014/main" xmlns="" w="9525">
                   <a:solidFill>
                     <a:srgbClr val="000000"/>
                   </a:solidFill>
@@ -31786,7 +31787,7 @@
             </a:ln>
             <a:extLst>
               <a:ext uri="{91240B29-F687-4f45-9708-019B960494DF}">
-                <a14:hiddenLine xmlns="" xmlns:a16="http://schemas.microsoft.com/office/drawing/2014/main" xmlns:p14="http://schemas.microsoft.com/office/powerpoint/2010/main" xmlns:a14="http://schemas.microsoft.com/office/drawing/2010/main" w="9525">
+                <a14:hiddenLine xmlns:a14="http://schemas.microsoft.com/office/drawing/2010/main" xmlns:p14="http://schemas.microsoft.com/office/powerpoint/2010/main" xmlns:a16="http://schemas.microsoft.com/office/drawing/2014/main" xmlns="" w="9525">
                   <a:solidFill>
                     <a:srgbClr val="000000"/>
                   </a:solidFill>
@@ -31866,7 +31867,7 @@
             </a:ln>
             <a:extLst>
               <a:ext uri="{91240B29-F687-4f45-9708-019B960494DF}">
-                <a14:hiddenLine xmlns="" xmlns:a16="http://schemas.microsoft.com/office/drawing/2014/main" xmlns:p14="http://schemas.microsoft.com/office/powerpoint/2010/main" xmlns:a14="http://schemas.microsoft.com/office/drawing/2010/main" w="9525">
+                <a14:hiddenLine xmlns:a14="http://schemas.microsoft.com/office/drawing/2010/main" xmlns:p14="http://schemas.microsoft.com/office/powerpoint/2010/main" xmlns:a16="http://schemas.microsoft.com/office/drawing/2014/main" xmlns="" w="9525">
                   <a:solidFill>
                     <a:srgbClr val="000000"/>
                   </a:solidFill>
@@ -32001,7 +32002,7 @@
             </a:ln>
             <a:extLst>
               <a:ext uri="{91240B29-F687-4f45-9708-019B960494DF}">
-                <a14:hiddenLine xmlns="" xmlns:a16="http://schemas.microsoft.com/office/drawing/2014/main" xmlns:p14="http://schemas.microsoft.com/office/powerpoint/2010/main" xmlns:a14="http://schemas.microsoft.com/office/drawing/2010/main" w="9525">
+                <a14:hiddenLine xmlns:a14="http://schemas.microsoft.com/office/drawing/2010/main" xmlns:p14="http://schemas.microsoft.com/office/powerpoint/2010/main" xmlns:a16="http://schemas.microsoft.com/office/drawing/2014/main" xmlns="" w="9525">
                   <a:solidFill>
                     <a:srgbClr val="000000"/>
                   </a:solidFill>
@@ -32192,7 +32193,7 @@
           <a:noFill/>
           <a:extLst>
             <a:ext uri="{909E8E84-426E-40dd-AFC4-6F175D3DCCD1}">
-              <a14:hiddenFill xmlns="" xmlns:a16="http://schemas.microsoft.com/office/drawing/2014/main" xmlns:p14="http://schemas.microsoft.com/office/powerpoint/2010/main" xmlns:a14="http://schemas.microsoft.com/office/drawing/2010/main">
+              <a14:hiddenFill xmlns:a14="http://schemas.microsoft.com/office/drawing/2010/main" xmlns:p14="http://schemas.microsoft.com/office/powerpoint/2010/main" xmlns:a16="http://schemas.microsoft.com/office/drawing/2014/main" xmlns="">
                 <a:solidFill>
                   <a:srgbClr val="FFFFFF"/>
                 </a:solidFill>
@@ -32313,7 +32314,7 @@
               </a:ln>
               <a:extLst>
                 <a:ext uri="{91240B29-F687-4f45-9708-019B960494DF}">
-                  <a14:hiddenLine xmlns="" xmlns:a16="http://schemas.microsoft.com/office/drawing/2014/main" xmlns:p14="http://schemas.microsoft.com/office/powerpoint/2010/main" xmlns:a14="http://schemas.microsoft.com/office/drawing/2010/main" w="9525">
+                  <a14:hiddenLine xmlns:a14="http://schemas.microsoft.com/office/drawing/2010/main" xmlns:p14="http://schemas.microsoft.com/office/powerpoint/2010/main" xmlns:a16="http://schemas.microsoft.com/office/drawing/2014/main" xmlns="" w="9525">
                     <a:solidFill>
                       <a:srgbClr val="000000"/>
                     </a:solidFill>
@@ -32418,7 +32419,7 @@
               </a:ln>
               <a:extLst>
                 <a:ext uri="{91240B29-F687-4f45-9708-019B960494DF}">
-                  <a14:hiddenLine xmlns="" xmlns:a16="http://schemas.microsoft.com/office/drawing/2014/main" xmlns:p14="http://schemas.microsoft.com/office/powerpoint/2010/main" xmlns:a14="http://schemas.microsoft.com/office/drawing/2010/main" w="9525">
+                  <a14:hiddenLine xmlns:a14="http://schemas.microsoft.com/office/drawing/2010/main" xmlns:p14="http://schemas.microsoft.com/office/powerpoint/2010/main" xmlns:a16="http://schemas.microsoft.com/office/drawing/2014/main" xmlns="" w="9525">
                     <a:solidFill>
                       <a:srgbClr val="000000"/>
                     </a:solidFill>
@@ -32523,7 +32524,7 @@
               </a:ln>
               <a:extLst>
                 <a:ext uri="{91240B29-F687-4f45-9708-019B960494DF}">
-                  <a14:hiddenLine xmlns="" xmlns:a16="http://schemas.microsoft.com/office/drawing/2014/main" xmlns:p14="http://schemas.microsoft.com/office/powerpoint/2010/main" xmlns:a14="http://schemas.microsoft.com/office/drawing/2010/main" w="9525">
+                  <a14:hiddenLine xmlns:a14="http://schemas.microsoft.com/office/drawing/2010/main" xmlns:p14="http://schemas.microsoft.com/office/powerpoint/2010/main" xmlns:a16="http://schemas.microsoft.com/office/drawing/2014/main" xmlns="" w="9525">
                     <a:solidFill>
                       <a:srgbClr val="000000"/>
                     </a:solidFill>
@@ -32600,7 +32601,7 @@
               </a:ln>
               <a:extLst>
                 <a:ext uri="{91240B29-F687-4f45-9708-019B960494DF}">
-                  <a14:hiddenLine xmlns="" xmlns:a16="http://schemas.microsoft.com/office/drawing/2014/main" xmlns:p14="http://schemas.microsoft.com/office/powerpoint/2010/main" xmlns:a14="http://schemas.microsoft.com/office/drawing/2010/main" w="9525">
+                  <a14:hiddenLine xmlns:a14="http://schemas.microsoft.com/office/drawing/2010/main" xmlns:p14="http://schemas.microsoft.com/office/powerpoint/2010/main" xmlns:a16="http://schemas.microsoft.com/office/drawing/2014/main" xmlns="" w="9525">
                     <a:solidFill>
                       <a:srgbClr val="000000"/>
                     </a:solidFill>
@@ -32705,7 +32706,7 @@
               </a:ln>
               <a:extLst>
                 <a:ext uri="{91240B29-F687-4f45-9708-019B960494DF}">
-                  <a14:hiddenLine xmlns="" xmlns:a16="http://schemas.microsoft.com/office/drawing/2014/main" xmlns:p14="http://schemas.microsoft.com/office/powerpoint/2010/main" xmlns:a14="http://schemas.microsoft.com/office/drawing/2010/main" w="9525">
+                  <a14:hiddenLine xmlns:a14="http://schemas.microsoft.com/office/drawing/2010/main" xmlns:p14="http://schemas.microsoft.com/office/powerpoint/2010/main" xmlns:a16="http://schemas.microsoft.com/office/drawing/2014/main" xmlns="" w="9525">
                     <a:solidFill>
                       <a:srgbClr val="000000"/>
                     </a:solidFill>
@@ -32782,7 +32783,7 @@
               </a:ln>
               <a:extLst>
                 <a:ext uri="{91240B29-F687-4f45-9708-019B960494DF}">
-                  <a14:hiddenLine xmlns="" xmlns:a16="http://schemas.microsoft.com/office/drawing/2014/main" xmlns:p14="http://schemas.microsoft.com/office/powerpoint/2010/main" xmlns:a14="http://schemas.microsoft.com/office/drawing/2010/main" w="9525">
+                  <a14:hiddenLine xmlns:a14="http://schemas.microsoft.com/office/drawing/2010/main" xmlns:p14="http://schemas.microsoft.com/office/powerpoint/2010/main" xmlns:a16="http://schemas.microsoft.com/office/drawing/2014/main" xmlns="" w="9525">
                     <a:solidFill>
                       <a:srgbClr val="000000"/>
                     </a:solidFill>
@@ -32859,7 +32860,7 @@
               </a:ln>
               <a:extLst>
                 <a:ext uri="{91240B29-F687-4f45-9708-019B960494DF}">
-                  <a14:hiddenLine xmlns="" xmlns:a16="http://schemas.microsoft.com/office/drawing/2014/main" xmlns:p14="http://schemas.microsoft.com/office/powerpoint/2010/main" xmlns:a14="http://schemas.microsoft.com/office/drawing/2010/main" w="9525">
+                  <a14:hiddenLine xmlns:a14="http://schemas.microsoft.com/office/drawing/2010/main" xmlns:p14="http://schemas.microsoft.com/office/powerpoint/2010/main" xmlns:a16="http://schemas.microsoft.com/office/drawing/2014/main" xmlns="" w="9525">
                     <a:solidFill>
                       <a:srgbClr val="000000"/>
                     </a:solidFill>
@@ -32964,7 +32965,7 @@
               </a:ln>
               <a:extLst>
                 <a:ext uri="{91240B29-F687-4f45-9708-019B960494DF}">
-                  <a14:hiddenLine xmlns="" xmlns:a16="http://schemas.microsoft.com/office/drawing/2014/main" xmlns:p14="http://schemas.microsoft.com/office/powerpoint/2010/main" xmlns:a14="http://schemas.microsoft.com/office/drawing/2010/main" w="9525">
+                  <a14:hiddenLine xmlns:a14="http://schemas.microsoft.com/office/drawing/2010/main" xmlns:p14="http://schemas.microsoft.com/office/powerpoint/2010/main" xmlns:a16="http://schemas.microsoft.com/office/drawing/2014/main" xmlns="" w="9525">
                     <a:solidFill>
                       <a:srgbClr val="000000"/>
                     </a:solidFill>
@@ -33069,7 +33070,7 @@
               </a:ln>
               <a:extLst>
                 <a:ext uri="{91240B29-F687-4f45-9708-019B960494DF}">
-                  <a14:hiddenLine xmlns="" xmlns:a16="http://schemas.microsoft.com/office/drawing/2014/main" xmlns:p14="http://schemas.microsoft.com/office/powerpoint/2010/main" xmlns:a14="http://schemas.microsoft.com/office/drawing/2010/main" w="9525">
+                  <a14:hiddenLine xmlns:a14="http://schemas.microsoft.com/office/drawing/2010/main" xmlns:p14="http://schemas.microsoft.com/office/powerpoint/2010/main" xmlns:a16="http://schemas.microsoft.com/office/drawing/2014/main" xmlns="" w="9525">
                     <a:solidFill>
                       <a:srgbClr val="000000"/>
                     </a:solidFill>
@@ -33146,7 +33147,7 @@
               </a:ln>
               <a:extLst>
                 <a:ext uri="{91240B29-F687-4f45-9708-019B960494DF}">
-                  <a14:hiddenLine xmlns="" xmlns:a16="http://schemas.microsoft.com/office/drawing/2014/main" xmlns:p14="http://schemas.microsoft.com/office/powerpoint/2010/main" xmlns:a14="http://schemas.microsoft.com/office/drawing/2010/main" w="9525">
+                  <a14:hiddenLine xmlns:a14="http://schemas.microsoft.com/office/drawing/2010/main" xmlns:p14="http://schemas.microsoft.com/office/powerpoint/2010/main" xmlns:a16="http://schemas.microsoft.com/office/drawing/2014/main" xmlns="" w="9525">
                     <a:solidFill>
                       <a:srgbClr val="000000"/>
                     </a:solidFill>
@@ -33271,7 +33272,7 @@
               </a:ln>
               <a:extLst>
                 <a:ext uri="{91240B29-F687-4f45-9708-019B960494DF}">
-                  <a14:hiddenLine xmlns="" xmlns:a16="http://schemas.microsoft.com/office/drawing/2014/main" xmlns:p14="http://schemas.microsoft.com/office/powerpoint/2010/main" xmlns:a14="http://schemas.microsoft.com/office/drawing/2010/main" w="9525">
+                  <a14:hiddenLine xmlns:a14="http://schemas.microsoft.com/office/drawing/2010/main" xmlns:p14="http://schemas.microsoft.com/office/powerpoint/2010/main" xmlns:a16="http://schemas.microsoft.com/office/drawing/2014/main" xmlns="" w="9525">
                     <a:solidFill>
                       <a:srgbClr val="000000"/>
                     </a:solidFill>
@@ -33385,7 +33386,7 @@
               </a:ln>
               <a:extLst>
                 <a:ext uri="{91240B29-F687-4f45-9708-019B960494DF}">
-                  <a14:hiddenLine xmlns="" xmlns:a16="http://schemas.microsoft.com/office/drawing/2014/main" xmlns:p14="http://schemas.microsoft.com/office/powerpoint/2010/main" xmlns:a14="http://schemas.microsoft.com/office/drawing/2010/main" w="9525">
+                  <a14:hiddenLine xmlns:a14="http://schemas.microsoft.com/office/drawing/2010/main" xmlns:p14="http://schemas.microsoft.com/office/powerpoint/2010/main" xmlns:a16="http://schemas.microsoft.com/office/drawing/2014/main" xmlns="" w="9525">
                     <a:solidFill>
                       <a:srgbClr val="000000"/>
                     </a:solidFill>
@@ -33462,7 +33463,7 @@
               </a:ln>
               <a:extLst>
                 <a:ext uri="{91240B29-F687-4f45-9708-019B960494DF}">
-                  <a14:hiddenLine xmlns="" xmlns:a16="http://schemas.microsoft.com/office/drawing/2014/main" xmlns:p14="http://schemas.microsoft.com/office/powerpoint/2010/main" xmlns:a14="http://schemas.microsoft.com/office/drawing/2010/main" w="9525">
+                  <a14:hiddenLine xmlns:a14="http://schemas.microsoft.com/office/drawing/2010/main" xmlns:p14="http://schemas.microsoft.com/office/powerpoint/2010/main" xmlns:a16="http://schemas.microsoft.com/office/drawing/2014/main" xmlns="" w="9525">
                     <a:solidFill>
                       <a:srgbClr val="000000"/>
                     </a:solidFill>
@@ -33539,7 +33540,7 @@
               </a:ln>
               <a:extLst>
                 <a:ext uri="{91240B29-F687-4f45-9708-019B960494DF}">
-                  <a14:hiddenLine xmlns="" xmlns:a16="http://schemas.microsoft.com/office/drawing/2014/main" xmlns:p14="http://schemas.microsoft.com/office/powerpoint/2010/main" xmlns:a14="http://schemas.microsoft.com/office/drawing/2010/main" w="9525">
+                  <a14:hiddenLine xmlns:a14="http://schemas.microsoft.com/office/drawing/2010/main" xmlns:p14="http://schemas.microsoft.com/office/powerpoint/2010/main" xmlns:a16="http://schemas.microsoft.com/office/drawing/2014/main" xmlns="" w="9525">
                     <a:solidFill>
                       <a:srgbClr val="000000"/>
                     </a:solidFill>
@@ -33644,7 +33645,7 @@
               </a:ln>
               <a:extLst>
                 <a:ext uri="{91240B29-F687-4f45-9708-019B960494DF}">
-                  <a14:hiddenLine xmlns="" xmlns:a16="http://schemas.microsoft.com/office/drawing/2014/main" xmlns:p14="http://schemas.microsoft.com/office/powerpoint/2010/main" xmlns:a14="http://schemas.microsoft.com/office/drawing/2010/main" w="9525">
+                  <a14:hiddenLine xmlns:a14="http://schemas.microsoft.com/office/drawing/2010/main" xmlns:p14="http://schemas.microsoft.com/office/powerpoint/2010/main" xmlns:a16="http://schemas.microsoft.com/office/drawing/2014/main" xmlns="" w="9525">
                     <a:solidFill>
                       <a:srgbClr val="000000"/>
                     </a:solidFill>
@@ -33693,7 +33694,7 @@
               </a:ln>
               <a:extLst>
                 <a:ext uri="{91240B29-F687-4f45-9708-019B960494DF}">
-                  <a14:hiddenLine xmlns="" xmlns:a16="http://schemas.microsoft.com/office/drawing/2014/main" xmlns:p14="http://schemas.microsoft.com/office/powerpoint/2010/main" xmlns:a14="http://schemas.microsoft.com/office/drawing/2010/main" w="9525">
+                  <a14:hiddenLine xmlns:a14="http://schemas.microsoft.com/office/drawing/2010/main" xmlns:p14="http://schemas.microsoft.com/office/powerpoint/2010/main" xmlns:a16="http://schemas.microsoft.com/office/drawing/2014/main" xmlns="" w="9525">
                     <a:solidFill>
                       <a:srgbClr val="000000"/>
                     </a:solidFill>
@@ -33773,7 +33774,7 @@
               </a:ln>
               <a:extLst>
                 <a:ext uri="{91240B29-F687-4f45-9708-019B960494DF}">
-                  <a14:hiddenLine xmlns="" xmlns:a16="http://schemas.microsoft.com/office/drawing/2014/main" xmlns:p14="http://schemas.microsoft.com/office/powerpoint/2010/main" xmlns:a14="http://schemas.microsoft.com/office/drawing/2010/main" w="9525">
+                  <a14:hiddenLine xmlns:a14="http://schemas.microsoft.com/office/drawing/2010/main" xmlns:p14="http://schemas.microsoft.com/office/powerpoint/2010/main" xmlns:a16="http://schemas.microsoft.com/office/drawing/2014/main" xmlns="" w="9525">
                     <a:solidFill>
                       <a:srgbClr val="000000"/>
                     </a:solidFill>
@@ -33878,7 +33879,7 @@
               </a:ln>
               <a:extLst>
                 <a:ext uri="{91240B29-F687-4f45-9708-019B960494DF}">
-                  <a14:hiddenLine xmlns="" xmlns:a16="http://schemas.microsoft.com/office/drawing/2014/main" xmlns:p14="http://schemas.microsoft.com/office/powerpoint/2010/main" xmlns:a14="http://schemas.microsoft.com/office/drawing/2010/main" w="9525">
+                  <a14:hiddenLine xmlns:a14="http://schemas.microsoft.com/office/drawing/2010/main" xmlns:p14="http://schemas.microsoft.com/office/powerpoint/2010/main" xmlns:a16="http://schemas.microsoft.com/office/drawing/2014/main" xmlns="" w="9525">
                     <a:solidFill>
                       <a:srgbClr val="000000"/>
                     </a:solidFill>
@@ -33955,7 +33956,7 @@
               </a:ln>
               <a:extLst>
                 <a:ext uri="{91240B29-F687-4f45-9708-019B960494DF}">
-                  <a14:hiddenLine xmlns="" xmlns:a16="http://schemas.microsoft.com/office/drawing/2014/main" xmlns:p14="http://schemas.microsoft.com/office/powerpoint/2010/main" xmlns:a14="http://schemas.microsoft.com/office/drawing/2010/main" w="9525">
+                  <a14:hiddenLine xmlns:a14="http://schemas.microsoft.com/office/drawing/2010/main" xmlns:p14="http://schemas.microsoft.com/office/powerpoint/2010/main" xmlns:a16="http://schemas.microsoft.com/office/drawing/2014/main" xmlns="" w="9525">
                     <a:solidFill>
                       <a:srgbClr val="000000"/>
                     </a:solidFill>
@@ -34060,7 +34061,7 @@
               </a:ln>
               <a:extLst>
                 <a:ext uri="{91240B29-F687-4f45-9708-019B960494DF}">
-                  <a14:hiddenLine xmlns="" xmlns:a16="http://schemas.microsoft.com/office/drawing/2014/main" xmlns:p14="http://schemas.microsoft.com/office/powerpoint/2010/main" xmlns:a14="http://schemas.microsoft.com/office/drawing/2010/main" w="9525">
+                  <a14:hiddenLine xmlns:a14="http://schemas.microsoft.com/office/drawing/2010/main" xmlns:p14="http://schemas.microsoft.com/office/powerpoint/2010/main" xmlns:a16="http://schemas.microsoft.com/office/drawing/2014/main" xmlns="" w="9525">
                     <a:solidFill>
                       <a:srgbClr val="000000"/>
                     </a:solidFill>
@@ -34140,7 +34141,7 @@
               </a:ln>
               <a:extLst>
                 <a:ext uri="{91240B29-F687-4f45-9708-019B960494DF}">
-                  <a14:hiddenLine xmlns="" xmlns:a16="http://schemas.microsoft.com/office/drawing/2014/main" xmlns:p14="http://schemas.microsoft.com/office/powerpoint/2010/main" xmlns:a14="http://schemas.microsoft.com/office/drawing/2010/main" w="9525">
+                  <a14:hiddenLine xmlns:a14="http://schemas.microsoft.com/office/drawing/2010/main" xmlns:p14="http://schemas.microsoft.com/office/powerpoint/2010/main" xmlns:a16="http://schemas.microsoft.com/office/drawing/2014/main" xmlns="" w="9525">
                     <a:solidFill>
                       <a:srgbClr val="000000"/>
                     </a:solidFill>
@@ -34217,7 +34218,7 @@
               </a:ln>
               <a:extLst>
                 <a:ext uri="{91240B29-F687-4f45-9708-019B960494DF}">
-                  <a14:hiddenLine xmlns="" xmlns:a16="http://schemas.microsoft.com/office/drawing/2014/main" xmlns:p14="http://schemas.microsoft.com/office/powerpoint/2010/main" xmlns:a14="http://schemas.microsoft.com/office/drawing/2010/main" w="9525">
+                  <a14:hiddenLine xmlns:a14="http://schemas.microsoft.com/office/drawing/2010/main" xmlns:p14="http://schemas.microsoft.com/office/powerpoint/2010/main" xmlns:a16="http://schemas.microsoft.com/office/drawing/2014/main" xmlns="" w="9525">
                     <a:solidFill>
                       <a:srgbClr val="000000"/>
                     </a:solidFill>
@@ -34322,7 +34323,7 @@
               </a:ln>
               <a:extLst>
                 <a:ext uri="{91240B29-F687-4f45-9708-019B960494DF}">
-                  <a14:hiddenLine xmlns="" xmlns:a16="http://schemas.microsoft.com/office/drawing/2014/main" xmlns:p14="http://schemas.microsoft.com/office/powerpoint/2010/main" xmlns:a14="http://schemas.microsoft.com/office/drawing/2010/main" w="9525">
+                  <a14:hiddenLine xmlns:a14="http://schemas.microsoft.com/office/drawing/2010/main" xmlns:p14="http://schemas.microsoft.com/office/powerpoint/2010/main" xmlns:a16="http://schemas.microsoft.com/office/drawing/2014/main" xmlns="" w="9525">
                     <a:solidFill>
                       <a:srgbClr val="000000"/>
                     </a:solidFill>
@@ -34427,7 +34428,7 @@
               </a:ln>
               <a:extLst>
                 <a:ext uri="{91240B29-F687-4f45-9708-019B960494DF}">
-                  <a14:hiddenLine xmlns="" xmlns:a16="http://schemas.microsoft.com/office/drawing/2014/main" xmlns:p14="http://schemas.microsoft.com/office/powerpoint/2010/main" xmlns:a14="http://schemas.microsoft.com/office/drawing/2010/main" w="9525">
+                  <a14:hiddenLine xmlns:a14="http://schemas.microsoft.com/office/drawing/2010/main" xmlns:p14="http://schemas.microsoft.com/office/powerpoint/2010/main" xmlns:a16="http://schemas.microsoft.com/office/drawing/2014/main" xmlns="" w="9525">
                     <a:solidFill>
                       <a:srgbClr val="000000"/>
                     </a:solidFill>
@@ -34507,7 +34508,7 @@
               </a:ln>
               <a:extLst>
                 <a:ext uri="{91240B29-F687-4f45-9708-019B960494DF}">
-                  <a14:hiddenLine xmlns="" xmlns:a16="http://schemas.microsoft.com/office/drawing/2014/main" xmlns:p14="http://schemas.microsoft.com/office/powerpoint/2010/main" xmlns:a14="http://schemas.microsoft.com/office/drawing/2010/main" w="9525">
+                  <a14:hiddenLine xmlns:a14="http://schemas.microsoft.com/office/drawing/2010/main" xmlns:p14="http://schemas.microsoft.com/office/powerpoint/2010/main" xmlns:a16="http://schemas.microsoft.com/office/drawing/2014/main" xmlns="" w="9525">
                     <a:solidFill>
                       <a:srgbClr val="000000"/>
                     </a:solidFill>
@@ -34642,7 +34643,7 @@
               </a:ln>
               <a:extLst>
                 <a:ext uri="{91240B29-F687-4f45-9708-019B960494DF}">
-                  <a14:hiddenLine xmlns="" xmlns:a16="http://schemas.microsoft.com/office/drawing/2014/main" xmlns:p14="http://schemas.microsoft.com/office/powerpoint/2010/main" xmlns:a14="http://schemas.microsoft.com/office/drawing/2010/main" w="9525">
+                  <a14:hiddenLine xmlns:a14="http://schemas.microsoft.com/office/drawing/2010/main" xmlns:p14="http://schemas.microsoft.com/office/powerpoint/2010/main" xmlns:a16="http://schemas.microsoft.com/office/drawing/2014/main" xmlns="" w="9525">
                     <a:solidFill>
                       <a:srgbClr val="000000"/>
                     </a:solidFill>
@@ -34770,7 +34771,7 @@
               </a:ln>
               <a:extLst>
                 <a:ext uri="{91240B29-F687-4f45-9708-019B960494DF}">
-                  <a14:hiddenLine xmlns="" xmlns:a16="http://schemas.microsoft.com/office/drawing/2014/main" xmlns:p14="http://schemas.microsoft.com/office/powerpoint/2010/main" xmlns:a14="http://schemas.microsoft.com/office/drawing/2010/main" w="9525">
+                  <a14:hiddenLine xmlns:a14="http://schemas.microsoft.com/office/drawing/2010/main" xmlns:p14="http://schemas.microsoft.com/office/powerpoint/2010/main" xmlns:a16="http://schemas.microsoft.com/office/drawing/2014/main" xmlns="" w="9525">
                     <a:solidFill>
                       <a:srgbClr val="000000"/>
                     </a:solidFill>
@@ -34900,7 +34901,7 @@
               </a:ln>
               <a:extLst>
                 <a:ext uri="{91240B29-F687-4f45-9708-019B960494DF}">
-                  <a14:hiddenLine xmlns="" xmlns:a16="http://schemas.microsoft.com/office/drawing/2014/main" xmlns:p14="http://schemas.microsoft.com/office/powerpoint/2010/main" xmlns:a14="http://schemas.microsoft.com/office/drawing/2010/main" w="9525">
+                  <a14:hiddenLine xmlns:a14="http://schemas.microsoft.com/office/drawing/2010/main" xmlns:p14="http://schemas.microsoft.com/office/powerpoint/2010/main" xmlns:a16="http://schemas.microsoft.com/office/drawing/2014/main" xmlns="" w="9525">
                     <a:solidFill>
                       <a:srgbClr val="000000"/>
                     </a:solidFill>
@@ -35005,7 +35006,7 @@
               </a:ln>
               <a:extLst>
                 <a:ext uri="{91240B29-F687-4f45-9708-019B960494DF}">
-                  <a14:hiddenLine xmlns="" xmlns:a16="http://schemas.microsoft.com/office/drawing/2014/main" xmlns:p14="http://schemas.microsoft.com/office/powerpoint/2010/main" xmlns:a14="http://schemas.microsoft.com/office/drawing/2010/main" w="9525">
+                  <a14:hiddenLine xmlns:a14="http://schemas.microsoft.com/office/drawing/2010/main" xmlns:p14="http://schemas.microsoft.com/office/powerpoint/2010/main" xmlns:a16="http://schemas.microsoft.com/office/drawing/2014/main" xmlns="" w="9525">
                     <a:solidFill>
                       <a:srgbClr val="000000"/>
                     </a:solidFill>
@@ -35085,7 +35086,7 @@
               </a:ln>
               <a:extLst>
                 <a:ext uri="{91240B29-F687-4f45-9708-019B960494DF}">
-                  <a14:hiddenLine xmlns="" xmlns:a16="http://schemas.microsoft.com/office/drawing/2014/main" xmlns:p14="http://schemas.microsoft.com/office/powerpoint/2010/main" xmlns:a14="http://schemas.microsoft.com/office/drawing/2010/main" w="9525">
+                  <a14:hiddenLine xmlns:a14="http://schemas.microsoft.com/office/drawing/2010/main" xmlns:p14="http://schemas.microsoft.com/office/powerpoint/2010/main" xmlns:a16="http://schemas.microsoft.com/office/drawing/2014/main" xmlns="" w="9525">
                     <a:solidFill>
                       <a:srgbClr val="000000"/>
                     </a:solidFill>
@@ -35190,7 +35191,7 @@
               </a:ln>
               <a:extLst>
                 <a:ext uri="{91240B29-F687-4f45-9708-019B960494DF}">
-                  <a14:hiddenLine xmlns="" xmlns:a16="http://schemas.microsoft.com/office/drawing/2014/main" xmlns:p14="http://schemas.microsoft.com/office/powerpoint/2010/main" xmlns:a14="http://schemas.microsoft.com/office/drawing/2010/main" w="9525">
+                  <a14:hiddenLine xmlns:a14="http://schemas.microsoft.com/office/drawing/2010/main" xmlns:p14="http://schemas.microsoft.com/office/powerpoint/2010/main" xmlns:a16="http://schemas.microsoft.com/office/drawing/2014/main" xmlns="" w="9525">
                     <a:solidFill>
                       <a:srgbClr val="000000"/>
                     </a:solidFill>
@@ -35273,7 +35274,7 @@
               </a:ln>
               <a:extLst>
                 <a:ext uri="{91240B29-F687-4f45-9708-019B960494DF}">
-                  <a14:hiddenLine xmlns="" xmlns:a16="http://schemas.microsoft.com/office/drawing/2014/main" xmlns:p14="http://schemas.microsoft.com/office/powerpoint/2010/main" xmlns:a14="http://schemas.microsoft.com/office/drawing/2010/main" w="9525">
+                  <a14:hiddenLine xmlns:a14="http://schemas.microsoft.com/office/drawing/2010/main" xmlns:p14="http://schemas.microsoft.com/office/powerpoint/2010/main" xmlns:a16="http://schemas.microsoft.com/office/drawing/2014/main" xmlns="" w="9525">
                     <a:solidFill>
                       <a:srgbClr val="000000"/>
                     </a:solidFill>
@@ -35378,7 +35379,7 @@
               </a:ln>
               <a:extLst>
                 <a:ext uri="{91240B29-F687-4f45-9708-019B960494DF}">
-                  <a14:hiddenLine xmlns="" xmlns:a16="http://schemas.microsoft.com/office/drawing/2014/main" xmlns:p14="http://schemas.microsoft.com/office/powerpoint/2010/main" xmlns:a14="http://schemas.microsoft.com/office/drawing/2010/main" w="9525">
+                  <a14:hiddenLine xmlns:a14="http://schemas.microsoft.com/office/drawing/2010/main" xmlns:p14="http://schemas.microsoft.com/office/powerpoint/2010/main" xmlns:a16="http://schemas.microsoft.com/office/drawing/2014/main" xmlns="" w="9525">
                     <a:solidFill>
                       <a:srgbClr val="000000"/>
                     </a:solidFill>
@@ -35461,7 +35462,7 @@
               </a:ln>
               <a:extLst>
                 <a:ext uri="{91240B29-F687-4f45-9708-019B960494DF}">
-                  <a14:hiddenLine xmlns="" xmlns:a16="http://schemas.microsoft.com/office/drawing/2014/main" xmlns:p14="http://schemas.microsoft.com/office/powerpoint/2010/main" xmlns:a14="http://schemas.microsoft.com/office/drawing/2010/main" w="9525">
+                  <a14:hiddenLine xmlns:a14="http://schemas.microsoft.com/office/drawing/2010/main" xmlns:p14="http://schemas.microsoft.com/office/powerpoint/2010/main" xmlns:a16="http://schemas.microsoft.com/office/drawing/2014/main" xmlns="" w="9525">
                     <a:solidFill>
                       <a:srgbClr val="000000"/>
                     </a:solidFill>
@@ -35566,7 +35567,7 @@
               </a:ln>
               <a:extLst>
                 <a:ext uri="{91240B29-F687-4f45-9708-019B960494DF}">
-                  <a14:hiddenLine xmlns="" xmlns:a16="http://schemas.microsoft.com/office/drawing/2014/main" xmlns:p14="http://schemas.microsoft.com/office/powerpoint/2010/main" xmlns:a14="http://schemas.microsoft.com/office/drawing/2010/main" w="9525">
+                  <a14:hiddenLine xmlns:a14="http://schemas.microsoft.com/office/drawing/2010/main" xmlns:p14="http://schemas.microsoft.com/office/powerpoint/2010/main" xmlns:a16="http://schemas.microsoft.com/office/drawing/2014/main" xmlns="" w="9525">
                     <a:solidFill>
                       <a:srgbClr val="000000"/>
                     </a:solidFill>
@@ -35615,7 +35616,7 @@
               </a:ln>
               <a:extLst>
                 <a:ext uri="{91240B29-F687-4f45-9708-019B960494DF}">
-                  <a14:hiddenLine xmlns="" xmlns:a16="http://schemas.microsoft.com/office/drawing/2014/main" xmlns:p14="http://schemas.microsoft.com/office/powerpoint/2010/main" xmlns:a14="http://schemas.microsoft.com/office/drawing/2010/main" w="9525">
+                  <a14:hiddenLine xmlns:a14="http://schemas.microsoft.com/office/drawing/2010/main" xmlns:p14="http://schemas.microsoft.com/office/powerpoint/2010/main" xmlns:a16="http://schemas.microsoft.com/office/drawing/2014/main" xmlns="" w="9525">
                     <a:solidFill>
                       <a:srgbClr val="000000"/>
                     </a:solidFill>
@@ -35735,7 +35736,7 @@
           </a:prstGeom>
           <a:extLst>
             <a:ext uri="{909E8E84-426E-40dd-AFC4-6F175D3DCCD1}">
-              <a14:hiddenFill xmlns="" xmlns:a16="http://schemas.microsoft.com/office/drawing/2014/main" xmlns:p14="http://schemas.microsoft.com/office/powerpoint/2010/main" xmlns:a14="http://schemas.microsoft.com/office/drawing/2010/main">
+              <a14:hiddenFill xmlns:a14="http://schemas.microsoft.com/office/drawing/2010/main" xmlns:p14="http://schemas.microsoft.com/office/powerpoint/2010/main" xmlns:a16="http://schemas.microsoft.com/office/drawing/2014/main" xmlns="">
                 <a:solidFill>
                   <a:srgbClr val="FFFFFF"/>
                 </a:solidFill>
@@ -35859,7 +35860,7 @@
           <a:noFill/>
           <a:extLst>
             <a:ext uri="{909E8E84-426E-40dd-AFC4-6F175D3DCCD1}">
-              <a14:hiddenFill xmlns="" xmlns:a16="http://schemas.microsoft.com/office/drawing/2014/main" xmlns:p14="http://schemas.microsoft.com/office/powerpoint/2010/main" xmlns:a14="http://schemas.microsoft.com/office/drawing/2010/main">
+              <a14:hiddenFill xmlns:a14="http://schemas.microsoft.com/office/drawing/2010/main" xmlns:p14="http://schemas.microsoft.com/office/powerpoint/2010/main" xmlns:a16="http://schemas.microsoft.com/office/drawing/2014/main" xmlns="">
                 <a:solidFill>
                   <a:srgbClr val="FFFFFF"/>
                 </a:solidFill>
@@ -36050,7 +36051,7 @@
             </a:ln>
             <a:extLst>
               <a:ext uri="{91240B29-F687-4f45-9708-019B960494DF}">
-                <a14:hiddenLine xmlns="" xmlns:a16="http://schemas.microsoft.com/office/drawing/2014/main" xmlns:p14="http://schemas.microsoft.com/office/powerpoint/2010/main" xmlns:a14="http://schemas.microsoft.com/office/drawing/2010/main" w="9525">
+                <a14:hiddenLine xmlns:a14="http://schemas.microsoft.com/office/drawing/2010/main" xmlns:p14="http://schemas.microsoft.com/office/powerpoint/2010/main" xmlns:a16="http://schemas.microsoft.com/office/drawing/2014/main" xmlns="" w="9525">
                   <a:solidFill>
                     <a:srgbClr val="000000"/>
                   </a:solidFill>
@@ -36155,7 +36156,7 @@
             </a:ln>
             <a:extLst>
               <a:ext uri="{91240B29-F687-4f45-9708-019B960494DF}">
-                <a14:hiddenLine xmlns="" xmlns:a16="http://schemas.microsoft.com/office/drawing/2014/main" xmlns:p14="http://schemas.microsoft.com/office/powerpoint/2010/main" xmlns:a14="http://schemas.microsoft.com/office/drawing/2010/main" w="9525">
+                <a14:hiddenLine xmlns:a14="http://schemas.microsoft.com/office/drawing/2010/main" xmlns:p14="http://schemas.microsoft.com/office/powerpoint/2010/main" xmlns:a16="http://schemas.microsoft.com/office/drawing/2014/main" xmlns="" w="9525">
                   <a:solidFill>
                     <a:srgbClr val="000000"/>
                   </a:solidFill>
@@ -36260,7 +36261,7 @@
             </a:ln>
             <a:extLst>
               <a:ext uri="{91240B29-F687-4f45-9708-019B960494DF}">
-                <a14:hiddenLine xmlns="" xmlns:a16="http://schemas.microsoft.com/office/drawing/2014/main" xmlns:p14="http://schemas.microsoft.com/office/powerpoint/2010/main" xmlns:a14="http://schemas.microsoft.com/office/drawing/2010/main" w="9525">
+                <a14:hiddenLine xmlns:a14="http://schemas.microsoft.com/office/drawing/2010/main" xmlns:p14="http://schemas.microsoft.com/office/powerpoint/2010/main" xmlns:a16="http://schemas.microsoft.com/office/drawing/2014/main" xmlns="" w="9525">
                   <a:solidFill>
                     <a:srgbClr val="000000"/>
                   </a:solidFill>
@@ -36337,7 +36338,7 @@
             </a:ln>
             <a:extLst>
               <a:ext uri="{91240B29-F687-4f45-9708-019B960494DF}">
-                <a14:hiddenLine xmlns="" xmlns:a16="http://schemas.microsoft.com/office/drawing/2014/main" xmlns:p14="http://schemas.microsoft.com/office/powerpoint/2010/main" xmlns:a14="http://schemas.microsoft.com/office/drawing/2010/main" w="9525">
+                <a14:hiddenLine xmlns:a14="http://schemas.microsoft.com/office/drawing/2010/main" xmlns:p14="http://schemas.microsoft.com/office/powerpoint/2010/main" xmlns:a16="http://schemas.microsoft.com/office/drawing/2014/main" xmlns="" w="9525">
                   <a:solidFill>
                     <a:srgbClr val="000000"/>
                   </a:solidFill>
@@ -36442,7 +36443,7 @@
             </a:ln>
             <a:extLst>
               <a:ext uri="{91240B29-F687-4f45-9708-019B960494DF}">
-                <a14:hiddenLine xmlns="" xmlns:a16="http://schemas.microsoft.com/office/drawing/2014/main" xmlns:p14="http://schemas.microsoft.com/office/powerpoint/2010/main" xmlns:a14="http://schemas.microsoft.com/office/drawing/2010/main" w="9525">
+                <a14:hiddenLine xmlns:a14="http://schemas.microsoft.com/office/drawing/2010/main" xmlns:p14="http://schemas.microsoft.com/office/powerpoint/2010/main" xmlns:a16="http://schemas.microsoft.com/office/drawing/2014/main" xmlns="" w="9525">
                   <a:solidFill>
                     <a:srgbClr val="000000"/>
                   </a:solidFill>
@@ -36519,7 +36520,7 @@
             </a:ln>
             <a:extLst>
               <a:ext uri="{91240B29-F687-4f45-9708-019B960494DF}">
-                <a14:hiddenLine xmlns="" xmlns:a16="http://schemas.microsoft.com/office/drawing/2014/main" xmlns:p14="http://schemas.microsoft.com/office/powerpoint/2010/main" xmlns:a14="http://schemas.microsoft.com/office/drawing/2010/main" w="9525">
+                <a14:hiddenLine xmlns:a14="http://schemas.microsoft.com/office/drawing/2010/main" xmlns:p14="http://schemas.microsoft.com/office/powerpoint/2010/main" xmlns:a16="http://schemas.microsoft.com/office/drawing/2014/main" xmlns="" w="9525">
                   <a:solidFill>
                     <a:srgbClr val="000000"/>
                   </a:solidFill>
@@ -36596,7 +36597,7 @@
             </a:ln>
             <a:extLst>
               <a:ext uri="{91240B29-F687-4f45-9708-019B960494DF}">
-                <a14:hiddenLine xmlns="" xmlns:a16="http://schemas.microsoft.com/office/drawing/2014/main" xmlns:p14="http://schemas.microsoft.com/office/powerpoint/2010/main" xmlns:a14="http://schemas.microsoft.com/office/drawing/2010/main" w="9525">
+                <a14:hiddenLine xmlns:a14="http://schemas.microsoft.com/office/drawing/2010/main" xmlns:p14="http://schemas.microsoft.com/office/powerpoint/2010/main" xmlns:a16="http://schemas.microsoft.com/office/drawing/2014/main" xmlns="" w="9525">
                   <a:solidFill>
                     <a:srgbClr val="000000"/>
                   </a:solidFill>
@@ -36701,7 +36702,7 @@
             </a:ln>
             <a:extLst>
               <a:ext uri="{91240B29-F687-4f45-9708-019B960494DF}">
-                <a14:hiddenLine xmlns="" xmlns:a16="http://schemas.microsoft.com/office/drawing/2014/main" xmlns:p14="http://schemas.microsoft.com/office/powerpoint/2010/main" xmlns:a14="http://schemas.microsoft.com/office/drawing/2010/main" w="9525">
+                <a14:hiddenLine xmlns:a14="http://schemas.microsoft.com/office/drawing/2010/main" xmlns:p14="http://schemas.microsoft.com/office/powerpoint/2010/main" xmlns:a16="http://schemas.microsoft.com/office/drawing/2014/main" xmlns="" w="9525">
                   <a:solidFill>
                     <a:srgbClr val="000000"/>
                   </a:solidFill>
@@ -36806,7 +36807,7 @@
             </a:ln>
             <a:extLst>
               <a:ext uri="{91240B29-F687-4f45-9708-019B960494DF}">
-                <a14:hiddenLine xmlns="" xmlns:a16="http://schemas.microsoft.com/office/drawing/2014/main" xmlns:p14="http://schemas.microsoft.com/office/powerpoint/2010/main" xmlns:a14="http://schemas.microsoft.com/office/drawing/2010/main" w="9525">
+                <a14:hiddenLine xmlns:a14="http://schemas.microsoft.com/office/drawing/2010/main" xmlns:p14="http://schemas.microsoft.com/office/powerpoint/2010/main" xmlns:a16="http://schemas.microsoft.com/office/drawing/2014/main" xmlns="" w="9525">
                   <a:solidFill>
                     <a:srgbClr val="000000"/>
                   </a:solidFill>
@@ -36883,7 +36884,7 @@
             </a:ln>
             <a:extLst>
               <a:ext uri="{91240B29-F687-4f45-9708-019B960494DF}">
-                <a14:hiddenLine xmlns="" xmlns:a16="http://schemas.microsoft.com/office/drawing/2014/main" xmlns:p14="http://schemas.microsoft.com/office/powerpoint/2010/main" xmlns:a14="http://schemas.microsoft.com/office/drawing/2010/main" w="9525">
+                <a14:hiddenLine xmlns:a14="http://schemas.microsoft.com/office/drawing/2010/main" xmlns:p14="http://schemas.microsoft.com/office/powerpoint/2010/main" xmlns:a16="http://schemas.microsoft.com/office/drawing/2014/main" xmlns="" w="9525">
                   <a:solidFill>
                     <a:srgbClr val="000000"/>
                   </a:solidFill>
@@ -37008,7 +37009,7 @@
             </a:ln>
             <a:extLst>
               <a:ext uri="{91240B29-F687-4f45-9708-019B960494DF}">
-                <a14:hiddenLine xmlns="" xmlns:a16="http://schemas.microsoft.com/office/drawing/2014/main" xmlns:p14="http://schemas.microsoft.com/office/powerpoint/2010/main" xmlns:a14="http://schemas.microsoft.com/office/drawing/2010/main" w="9525">
+                <a14:hiddenLine xmlns:a14="http://schemas.microsoft.com/office/drawing/2010/main" xmlns:p14="http://schemas.microsoft.com/office/powerpoint/2010/main" xmlns:a16="http://schemas.microsoft.com/office/drawing/2014/main" xmlns="" w="9525">
                   <a:solidFill>
                     <a:srgbClr val="000000"/>
                   </a:solidFill>
@@ -37122,7 +37123,7 @@
             </a:ln>
             <a:extLst>
               <a:ext uri="{91240B29-F687-4f45-9708-019B960494DF}">
-                <a14:hiddenLine xmlns="" xmlns:a16="http://schemas.microsoft.com/office/drawing/2014/main" xmlns:p14="http://schemas.microsoft.com/office/powerpoint/2010/main" xmlns:a14="http://schemas.microsoft.com/office/drawing/2010/main" w="9525">
+                <a14:hiddenLine xmlns:a14="http://schemas.microsoft.com/office/drawing/2010/main" xmlns:p14="http://schemas.microsoft.com/office/powerpoint/2010/main" xmlns:a16="http://schemas.microsoft.com/office/drawing/2014/main" xmlns="" w="9525">
                   <a:solidFill>
                     <a:srgbClr val="000000"/>
                   </a:solidFill>
@@ -37199,7 +37200,7 @@
             </a:ln>
             <a:extLst>
               <a:ext uri="{91240B29-F687-4f45-9708-019B960494DF}">
-                <a14:hiddenLine xmlns="" xmlns:a16="http://schemas.microsoft.com/office/drawing/2014/main" xmlns:p14="http://schemas.microsoft.com/office/powerpoint/2010/main" xmlns:a14="http://schemas.microsoft.com/office/drawing/2010/main" w="9525">
+                <a14:hiddenLine xmlns:a14="http://schemas.microsoft.com/office/drawing/2010/main" xmlns:p14="http://schemas.microsoft.com/office/powerpoint/2010/main" xmlns:a16="http://schemas.microsoft.com/office/drawing/2014/main" xmlns="" w="9525">
                   <a:solidFill>
                     <a:srgbClr val="000000"/>
                   </a:solidFill>
@@ -37276,7 +37277,7 @@
             </a:ln>
             <a:extLst>
               <a:ext uri="{91240B29-F687-4f45-9708-019B960494DF}">
-                <a14:hiddenLine xmlns="" xmlns:a16="http://schemas.microsoft.com/office/drawing/2014/main" xmlns:p14="http://schemas.microsoft.com/office/powerpoint/2010/main" xmlns:a14="http://schemas.microsoft.com/office/drawing/2010/main" w="9525">
+                <a14:hiddenLine xmlns:a14="http://schemas.microsoft.com/office/drawing/2010/main" xmlns:p14="http://schemas.microsoft.com/office/powerpoint/2010/main" xmlns:a16="http://schemas.microsoft.com/office/drawing/2014/main" xmlns="" w="9525">
                   <a:solidFill>
                     <a:srgbClr val="000000"/>
                   </a:solidFill>
@@ -37381,7 +37382,7 @@
             </a:ln>
             <a:extLst>
               <a:ext uri="{91240B29-F687-4f45-9708-019B960494DF}">
-                <a14:hiddenLine xmlns="" xmlns:a16="http://schemas.microsoft.com/office/drawing/2014/main" xmlns:p14="http://schemas.microsoft.com/office/powerpoint/2010/main" xmlns:a14="http://schemas.microsoft.com/office/drawing/2010/main" w="9525">
+                <a14:hiddenLine xmlns:a14="http://schemas.microsoft.com/office/drawing/2010/main" xmlns:p14="http://schemas.microsoft.com/office/powerpoint/2010/main" xmlns:a16="http://schemas.microsoft.com/office/drawing/2014/main" xmlns="" w="9525">
                   <a:solidFill>
                     <a:srgbClr val="000000"/>
                   </a:solidFill>
@@ -37430,7 +37431,7 @@
             </a:ln>
             <a:extLst>
               <a:ext uri="{91240B29-F687-4f45-9708-019B960494DF}">
-                <a14:hiddenLine xmlns="" xmlns:a16="http://schemas.microsoft.com/office/drawing/2014/main" xmlns:p14="http://schemas.microsoft.com/office/powerpoint/2010/main" xmlns:a14="http://schemas.microsoft.com/office/drawing/2010/main" w="9525">
+                <a14:hiddenLine xmlns:a14="http://schemas.microsoft.com/office/drawing/2010/main" xmlns:p14="http://schemas.microsoft.com/office/powerpoint/2010/main" xmlns:a16="http://schemas.microsoft.com/office/drawing/2014/main" xmlns="" w="9525">
                   <a:solidFill>
                     <a:srgbClr val="000000"/>
                   </a:solidFill>
@@ -37510,7 +37511,7 @@
             </a:ln>
             <a:extLst>
               <a:ext uri="{91240B29-F687-4f45-9708-019B960494DF}">
-                <a14:hiddenLine xmlns="" xmlns:a16="http://schemas.microsoft.com/office/drawing/2014/main" xmlns:p14="http://schemas.microsoft.com/office/powerpoint/2010/main" xmlns:a14="http://schemas.microsoft.com/office/drawing/2010/main" w="9525">
+                <a14:hiddenLine xmlns:a14="http://schemas.microsoft.com/office/drawing/2010/main" xmlns:p14="http://schemas.microsoft.com/office/powerpoint/2010/main" xmlns:a16="http://schemas.microsoft.com/office/drawing/2014/main" xmlns="" w="9525">
                   <a:solidFill>
                     <a:srgbClr val="000000"/>
                   </a:solidFill>
@@ -37615,7 +37616,7 @@
             </a:ln>
             <a:extLst>
               <a:ext uri="{91240B29-F687-4f45-9708-019B960494DF}">
-                <a14:hiddenLine xmlns="" xmlns:a16="http://schemas.microsoft.com/office/drawing/2014/main" xmlns:p14="http://schemas.microsoft.com/office/powerpoint/2010/main" xmlns:a14="http://schemas.microsoft.com/office/drawing/2010/main" w="9525">
+                <a14:hiddenLine xmlns:a14="http://schemas.microsoft.com/office/drawing/2010/main" xmlns:p14="http://schemas.microsoft.com/office/powerpoint/2010/main" xmlns:a16="http://schemas.microsoft.com/office/drawing/2014/main" xmlns="" w="9525">
                   <a:solidFill>
                     <a:srgbClr val="000000"/>
                   </a:solidFill>
@@ -37692,7 +37693,7 @@
             </a:ln>
             <a:extLst>
               <a:ext uri="{91240B29-F687-4f45-9708-019B960494DF}">
-                <a14:hiddenLine xmlns="" xmlns:a16="http://schemas.microsoft.com/office/drawing/2014/main" xmlns:p14="http://schemas.microsoft.com/office/powerpoint/2010/main" xmlns:a14="http://schemas.microsoft.com/office/drawing/2010/main" w="9525">
+                <a14:hiddenLine xmlns:a14="http://schemas.microsoft.com/office/drawing/2010/main" xmlns:p14="http://schemas.microsoft.com/office/powerpoint/2010/main" xmlns:a16="http://schemas.microsoft.com/office/drawing/2014/main" xmlns="" w="9525">
                   <a:solidFill>
                     <a:srgbClr val="000000"/>
                   </a:solidFill>
@@ -37797,7 +37798,7 @@
             </a:ln>
             <a:extLst>
               <a:ext uri="{91240B29-F687-4f45-9708-019B960494DF}">
-                <a14:hiddenLine xmlns="" xmlns:a16="http://schemas.microsoft.com/office/drawing/2014/main" xmlns:p14="http://schemas.microsoft.com/office/powerpoint/2010/main" xmlns:a14="http://schemas.microsoft.com/office/drawing/2010/main" w="9525">
+                <a14:hiddenLine xmlns:a14="http://schemas.microsoft.com/office/drawing/2010/main" xmlns:p14="http://schemas.microsoft.com/office/powerpoint/2010/main" xmlns:a16="http://schemas.microsoft.com/office/drawing/2014/main" xmlns="" w="9525">
                   <a:solidFill>
                     <a:srgbClr val="000000"/>
                   </a:solidFill>
@@ -37877,7 +37878,7 @@
             </a:ln>
             <a:extLst>
               <a:ext uri="{91240B29-F687-4f45-9708-019B960494DF}">
-                <a14:hiddenLine xmlns="" xmlns:a16="http://schemas.microsoft.com/office/drawing/2014/main" xmlns:p14="http://schemas.microsoft.com/office/powerpoint/2010/main" xmlns:a14="http://schemas.microsoft.com/office/drawing/2010/main" w="9525">
+                <a14:hiddenLine xmlns:a14="http://schemas.microsoft.com/office/drawing/2010/main" xmlns:p14="http://schemas.microsoft.com/office/powerpoint/2010/main" xmlns:a16="http://schemas.microsoft.com/office/drawing/2014/main" xmlns="" w="9525">
                   <a:solidFill>
                     <a:srgbClr val="000000"/>
                   </a:solidFill>
@@ -37954,7 +37955,7 @@
             </a:ln>
             <a:extLst>
               <a:ext uri="{91240B29-F687-4f45-9708-019B960494DF}">
-                <a14:hiddenLine xmlns="" xmlns:a16="http://schemas.microsoft.com/office/drawing/2014/main" xmlns:p14="http://schemas.microsoft.com/office/powerpoint/2010/main" xmlns:a14="http://schemas.microsoft.com/office/drawing/2010/main" w="9525">
+                <a14:hiddenLine xmlns:a14="http://schemas.microsoft.com/office/drawing/2010/main" xmlns:p14="http://schemas.microsoft.com/office/powerpoint/2010/main" xmlns:a16="http://schemas.microsoft.com/office/drawing/2014/main" xmlns="" w="9525">
                   <a:solidFill>
                     <a:srgbClr val="000000"/>
                   </a:solidFill>
@@ -38059,7 +38060,7 @@
             </a:ln>
             <a:extLst>
               <a:ext uri="{91240B29-F687-4f45-9708-019B960494DF}">
-                <a14:hiddenLine xmlns="" xmlns:a16="http://schemas.microsoft.com/office/drawing/2014/main" xmlns:p14="http://schemas.microsoft.com/office/powerpoint/2010/main" xmlns:a14="http://schemas.microsoft.com/office/drawing/2010/main" w="9525">
+                <a14:hiddenLine xmlns:a14="http://schemas.microsoft.com/office/drawing/2010/main" xmlns:p14="http://schemas.microsoft.com/office/powerpoint/2010/main" xmlns:a16="http://schemas.microsoft.com/office/drawing/2014/main" xmlns="" w="9525">
                   <a:solidFill>
                     <a:srgbClr val="000000"/>
                   </a:solidFill>
@@ -38164,7 +38165,7 @@
             </a:ln>
             <a:extLst>
               <a:ext uri="{91240B29-F687-4f45-9708-019B960494DF}">
-                <a14:hiddenLine xmlns="" xmlns:a16="http://schemas.microsoft.com/office/drawing/2014/main" xmlns:p14="http://schemas.microsoft.com/office/powerpoint/2010/main" xmlns:a14="http://schemas.microsoft.com/office/drawing/2010/main" w="9525">
+                <a14:hiddenLine xmlns:a14="http://schemas.microsoft.com/office/drawing/2010/main" xmlns:p14="http://schemas.microsoft.com/office/powerpoint/2010/main" xmlns:a16="http://schemas.microsoft.com/office/drawing/2014/main" xmlns="" w="9525">
                   <a:solidFill>
                     <a:srgbClr val="000000"/>
                   </a:solidFill>
@@ -38244,7 +38245,7 @@
             </a:ln>
             <a:extLst>
               <a:ext uri="{91240B29-F687-4f45-9708-019B960494DF}">
-                <a14:hiddenLine xmlns="" xmlns:a16="http://schemas.microsoft.com/office/drawing/2014/main" xmlns:p14="http://schemas.microsoft.com/office/powerpoint/2010/main" xmlns:a14="http://schemas.microsoft.com/office/drawing/2010/main" w="9525">
+                <a14:hiddenLine xmlns:a14="http://schemas.microsoft.com/office/drawing/2010/main" xmlns:p14="http://schemas.microsoft.com/office/powerpoint/2010/main" xmlns:a16="http://schemas.microsoft.com/office/drawing/2014/main" xmlns="" w="9525">
                   <a:solidFill>
                     <a:srgbClr val="000000"/>
                   </a:solidFill>
@@ -38379,7 +38380,7 @@
             </a:ln>
             <a:extLst>
               <a:ext uri="{91240B29-F687-4f45-9708-019B960494DF}">
-                <a14:hiddenLine xmlns="" xmlns:a16="http://schemas.microsoft.com/office/drawing/2014/main" xmlns:p14="http://schemas.microsoft.com/office/powerpoint/2010/main" xmlns:a14="http://schemas.microsoft.com/office/drawing/2010/main" w="9525">
+                <a14:hiddenLine xmlns:a14="http://schemas.microsoft.com/office/drawing/2010/main" xmlns:p14="http://schemas.microsoft.com/office/powerpoint/2010/main" xmlns:a16="http://schemas.microsoft.com/office/drawing/2014/main" xmlns="" w="9525">
                   <a:solidFill>
                     <a:srgbClr val="000000"/>
                   </a:solidFill>
@@ -38540,7 +38541,7 @@
           <a:noFill/>
           <a:extLst>
             <a:ext uri="{909E8E84-426E-40dd-AFC4-6F175D3DCCD1}">
-              <a14:hiddenFill xmlns="" xmlns:a16="http://schemas.microsoft.com/office/drawing/2014/main" xmlns:p14="http://schemas.microsoft.com/office/powerpoint/2010/main" xmlns:a14="http://schemas.microsoft.com/office/drawing/2010/main">
+              <a14:hiddenFill xmlns:a14="http://schemas.microsoft.com/office/drawing/2010/main" xmlns:p14="http://schemas.microsoft.com/office/powerpoint/2010/main" xmlns:a16="http://schemas.microsoft.com/office/drawing/2014/main" xmlns="">
                 <a:solidFill>
                   <a:srgbClr val="FFFFFF"/>
                 </a:solidFill>
@@ -38661,7 +38662,7 @@
               </a:ln>
               <a:extLst>
                 <a:ext uri="{91240B29-F687-4f45-9708-019B960494DF}">
-                  <a14:hiddenLine xmlns="" xmlns:a16="http://schemas.microsoft.com/office/drawing/2014/main" xmlns:p14="http://schemas.microsoft.com/office/powerpoint/2010/main" xmlns:a14="http://schemas.microsoft.com/office/drawing/2010/main" w="9525">
+                  <a14:hiddenLine xmlns:a14="http://schemas.microsoft.com/office/drawing/2010/main" xmlns:p14="http://schemas.microsoft.com/office/powerpoint/2010/main" xmlns:a16="http://schemas.microsoft.com/office/drawing/2014/main" xmlns="" w="9525">
                     <a:solidFill>
                       <a:srgbClr val="000000"/>
                     </a:solidFill>
@@ -38766,7 +38767,7 @@
               </a:ln>
               <a:extLst>
                 <a:ext uri="{91240B29-F687-4f45-9708-019B960494DF}">
-                  <a14:hiddenLine xmlns="" xmlns:a16="http://schemas.microsoft.com/office/drawing/2014/main" xmlns:p14="http://schemas.microsoft.com/office/powerpoint/2010/main" xmlns:a14="http://schemas.microsoft.com/office/drawing/2010/main" w="9525">
+                  <a14:hiddenLine xmlns:a14="http://schemas.microsoft.com/office/drawing/2010/main" xmlns:p14="http://schemas.microsoft.com/office/powerpoint/2010/main" xmlns:a16="http://schemas.microsoft.com/office/drawing/2014/main" xmlns="" w="9525">
                     <a:solidFill>
                       <a:srgbClr val="000000"/>
                     </a:solidFill>
@@ -38871,7 +38872,7 @@
               </a:ln>
               <a:extLst>
                 <a:ext uri="{91240B29-F687-4f45-9708-019B960494DF}">
-                  <a14:hiddenLine xmlns="" xmlns:a16="http://schemas.microsoft.com/office/drawing/2014/main" xmlns:p14="http://schemas.microsoft.com/office/powerpoint/2010/main" xmlns:a14="http://schemas.microsoft.com/office/drawing/2010/main" w="9525">
+                  <a14:hiddenLine xmlns:a14="http://schemas.microsoft.com/office/drawing/2010/main" xmlns:p14="http://schemas.microsoft.com/office/powerpoint/2010/main" xmlns:a16="http://schemas.microsoft.com/office/drawing/2014/main" xmlns="" w="9525">
                     <a:solidFill>
                       <a:srgbClr val="000000"/>
                     </a:solidFill>
@@ -38948,7 +38949,7 @@
               </a:ln>
               <a:extLst>
                 <a:ext uri="{91240B29-F687-4f45-9708-019B960494DF}">
-                  <a14:hiddenLine xmlns="" xmlns:a16="http://schemas.microsoft.com/office/drawing/2014/main" xmlns:p14="http://schemas.microsoft.com/office/powerpoint/2010/main" xmlns:a14="http://schemas.microsoft.com/office/drawing/2010/main" w="9525">
+                  <a14:hiddenLine xmlns:a14="http://schemas.microsoft.com/office/drawing/2010/main" xmlns:p14="http://schemas.microsoft.com/office/powerpoint/2010/main" xmlns:a16="http://schemas.microsoft.com/office/drawing/2014/main" xmlns="" w="9525">
                     <a:solidFill>
                       <a:srgbClr val="000000"/>
                     </a:solidFill>
@@ -39053,7 +39054,7 @@
               </a:ln>
               <a:extLst>
                 <a:ext uri="{91240B29-F687-4f45-9708-019B960494DF}">
-                  <a14:hiddenLine xmlns="" xmlns:a16="http://schemas.microsoft.com/office/drawing/2014/main" xmlns:p14="http://schemas.microsoft.com/office/powerpoint/2010/main" xmlns:a14="http://schemas.microsoft.com/office/drawing/2010/main" w="9525">
+                  <a14:hiddenLine xmlns:a14="http://schemas.microsoft.com/office/drawing/2010/main" xmlns:p14="http://schemas.microsoft.com/office/powerpoint/2010/main" xmlns:a16="http://schemas.microsoft.com/office/drawing/2014/main" xmlns="" w="9525">
                     <a:solidFill>
                       <a:srgbClr val="000000"/>
                     </a:solidFill>
@@ -39130,7 +39131,7 @@
               </a:ln>
               <a:extLst>
                 <a:ext uri="{91240B29-F687-4f45-9708-019B960494DF}">
-                  <a14:hiddenLine xmlns="" xmlns:a16="http://schemas.microsoft.com/office/drawing/2014/main" xmlns:p14="http://schemas.microsoft.com/office/powerpoint/2010/main" xmlns:a14="http://schemas.microsoft.com/office/drawing/2010/main" w="9525">
+                  <a14:hiddenLine xmlns:a14="http://schemas.microsoft.com/office/drawing/2010/main" xmlns:p14="http://schemas.microsoft.com/office/powerpoint/2010/main" xmlns:a16="http://schemas.microsoft.com/office/drawing/2014/main" xmlns="" w="9525">
                     <a:solidFill>
                       <a:srgbClr val="000000"/>
                     </a:solidFill>
@@ -39207,7 +39208,7 @@
               </a:ln>
               <a:extLst>
                 <a:ext uri="{91240B29-F687-4f45-9708-019B960494DF}">
-                  <a14:hiddenLine xmlns="" xmlns:a16="http://schemas.microsoft.com/office/drawing/2014/main" xmlns:p14="http://schemas.microsoft.com/office/powerpoint/2010/main" xmlns:a14="http://schemas.microsoft.com/office/drawing/2010/main" w="9525">
+                  <a14:hiddenLine xmlns:a14="http://schemas.microsoft.com/office/drawing/2010/main" xmlns:p14="http://schemas.microsoft.com/office/powerpoint/2010/main" xmlns:a16="http://schemas.microsoft.com/office/drawing/2014/main" xmlns="" w="9525">
                     <a:solidFill>
                       <a:srgbClr val="000000"/>
                     </a:solidFill>
@@ -39312,7 +39313,7 @@
               </a:ln>
               <a:extLst>
                 <a:ext uri="{91240B29-F687-4f45-9708-019B960494DF}">
-                  <a14:hiddenLine xmlns="" xmlns:a16="http://schemas.microsoft.com/office/drawing/2014/main" xmlns:p14="http://schemas.microsoft.com/office/powerpoint/2010/main" xmlns:a14="http://schemas.microsoft.com/office/drawing/2010/main" w="9525">
+                  <a14:hiddenLine xmlns:a14="http://schemas.microsoft.com/office/drawing/2010/main" xmlns:p14="http://schemas.microsoft.com/office/powerpoint/2010/main" xmlns:a16="http://schemas.microsoft.com/office/drawing/2014/main" xmlns="" w="9525">
                     <a:solidFill>
                       <a:srgbClr val="000000"/>
                     </a:solidFill>
@@ -39417,7 +39418,7 @@
               </a:ln>
               <a:extLst>
                 <a:ext uri="{91240B29-F687-4f45-9708-019B960494DF}">
-                  <a14:hiddenLine xmlns="" xmlns:a16="http://schemas.microsoft.com/office/drawing/2014/main" xmlns:p14="http://schemas.microsoft.com/office/powerpoint/2010/main" xmlns:a14="http://schemas.microsoft.com/office/drawing/2010/main" w="9525">
+                  <a14:hiddenLine xmlns:a14="http://schemas.microsoft.com/office/drawing/2010/main" xmlns:p14="http://schemas.microsoft.com/office/powerpoint/2010/main" xmlns:a16="http://schemas.microsoft.com/office/drawing/2014/main" xmlns="" w="9525">
                     <a:solidFill>
                       <a:srgbClr val="000000"/>
                     </a:solidFill>
@@ -39494,7 +39495,7 @@
               </a:ln>
               <a:extLst>
                 <a:ext uri="{91240B29-F687-4f45-9708-019B960494DF}">
-                  <a14:hiddenLine xmlns="" xmlns:a16="http://schemas.microsoft.com/office/drawing/2014/main" xmlns:p14="http://schemas.microsoft.com/office/powerpoint/2010/main" xmlns:a14="http://schemas.microsoft.com/office/drawing/2010/main" w="9525">
+                  <a14:hiddenLine xmlns:a14="http://schemas.microsoft.com/office/drawing/2010/main" xmlns:p14="http://schemas.microsoft.com/office/powerpoint/2010/main" xmlns:a16="http://schemas.microsoft.com/office/drawing/2014/main" xmlns="" w="9525">
                     <a:solidFill>
                       <a:srgbClr val="000000"/>
                     </a:solidFill>
@@ -39619,7 +39620,7 @@
               </a:ln>
               <a:extLst>
                 <a:ext uri="{91240B29-F687-4f45-9708-019B960494DF}">
-                  <a14:hiddenLine xmlns="" xmlns:a16="http://schemas.microsoft.com/office/drawing/2014/main" xmlns:p14="http://schemas.microsoft.com/office/powerpoint/2010/main" xmlns:a14="http://schemas.microsoft.com/office/drawing/2010/main" w="9525">
+                  <a14:hiddenLine xmlns:a14="http://schemas.microsoft.com/office/drawing/2010/main" xmlns:p14="http://schemas.microsoft.com/office/powerpoint/2010/main" xmlns:a16="http://schemas.microsoft.com/office/drawing/2014/main" xmlns="" w="9525">
                     <a:solidFill>
                       <a:srgbClr val="000000"/>
                     </a:solidFill>
@@ -39733,7 +39734,7 @@
               </a:ln>
               <a:extLst>
                 <a:ext uri="{91240B29-F687-4f45-9708-019B960494DF}">
-                  <a14:hiddenLine xmlns="" xmlns:a16="http://schemas.microsoft.com/office/drawing/2014/main" xmlns:p14="http://schemas.microsoft.com/office/powerpoint/2010/main" xmlns:a14="http://schemas.microsoft.com/office/drawing/2010/main" w="9525">
+                  <a14:hiddenLine xmlns:a14="http://schemas.microsoft.com/office/drawing/2010/main" xmlns:p14="http://schemas.microsoft.com/office/powerpoint/2010/main" xmlns:a16="http://schemas.microsoft.com/office/drawing/2014/main" xmlns="" w="9525">
                     <a:solidFill>
                       <a:srgbClr val="000000"/>
                     </a:solidFill>
@@ -39810,7 +39811,7 @@
               </a:ln>
               <a:extLst>
                 <a:ext uri="{91240B29-F687-4f45-9708-019B960494DF}">
-                  <a14:hiddenLine xmlns="" xmlns:a16="http://schemas.microsoft.com/office/drawing/2014/main" xmlns:p14="http://schemas.microsoft.com/office/powerpoint/2010/main" xmlns:a14="http://schemas.microsoft.com/office/drawing/2010/main" w="9525">
+                  <a14:hiddenLine xmlns:a14="http://schemas.microsoft.com/office/drawing/2010/main" xmlns:p14="http://schemas.microsoft.com/office/powerpoint/2010/main" xmlns:a16="http://schemas.microsoft.com/office/drawing/2014/main" xmlns="" w="9525">
                     <a:solidFill>
                       <a:srgbClr val="000000"/>
                     </a:solidFill>
@@ -39887,7 +39888,7 @@
               </a:ln>
               <a:extLst>
                 <a:ext uri="{91240B29-F687-4f45-9708-019B960494DF}">
-                  <a14:hiddenLine xmlns="" xmlns:a16="http://schemas.microsoft.com/office/drawing/2014/main" xmlns:p14="http://schemas.microsoft.com/office/powerpoint/2010/main" xmlns:a14="http://schemas.microsoft.com/office/drawing/2010/main" w="9525">
+                  <a14:hiddenLine xmlns:a14="http://schemas.microsoft.com/office/drawing/2010/main" xmlns:p14="http://schemas.microsoft.com/office/powerpoint/2010/main" xmlns:a16="http://schemas.microsoft.com/office/drawing/2014/main" xmlns="" w="9525">
                     <a:solidFill>
                       <a:srgbClr val="000000"/>
                     </a:solidFill>
@@ -39992,7 +39993,7 @@
               </a:ln>
               <a:extLst>
                 <a:ext uri="{91240B29-F687-4f45-9708-019B960494DF}">
-                  <a14:hiddenLine xmlns="" xmlns:a16="http://schemas.microsoft.com/office/drawing/2014/main" xmlns:p14="http://schemas.microsoft.com/office/powerpoint/2010/main" xmlns:a14="http://schemas.microsoft.com/office/drawing/2010/main" w="9525">
+                  <a14:hiddenLine xmlns:a14="http://schemas.microsoft.com/office/drawing/2010/main" xmlns:p14="http://schemas.microsoft.com/office/powerpoint/2010/main" xmlns:a16="http://schemas.microsoft.com/office/drawing/2014/main" xmlns="" w="9525">
                     <a:solidFill>
                       <a:srgbClr val="000000"/>
                     </a:solidFill>
@@ -40041,7 +40042,7 @@
               </a:ln>
               <a:extLst>
                 <a:ext uri="{91240B29-F687-4f45-9708-019B960494DF}">
-                  <a14:hiddenLine xmlns="" xmlns:a16="http://schemas.microsoft.com/office/drawing/2014/main" xmlns:p14="http://schemas.microsoft.com/office/powerpoint/2010/main" xmlns:a14="http://schemas.microsoft.com/office/drawing/2010/main" w="9525">
+                  <a14:hiddenLine xmlns:a14="http://schemas.microsoft.com/office/drawing/2010/main" xmlns:p14="http://schemas.microsoft.com/office/powerpoint/2010/main" xmlns:a16="http://schemas.microsoft.com/office/drawing/2014/main" xmlns="" w="9525">
                     <a:solidFill>
                       <a:srgbClr val="000000"/>
                     </a:solidFill>
@@ -40121,7 +40122,7 @@
               </a:ln>
               <a:extLst>
                 <a:ext uri="{91240B29-F687-4f45-9708-019B960494DF}">
-                  <a14:hiddenLine xmlns="" xmlns:a16="http://schemas.microsoft.com/office/drawing/2014/main" xmlns:p14="http://schemas.microsoft.com/office/powerpoint/2010/main" xmlns:a14="http://schemas.microsoft.com/office/drawing/2010/main" w="9525">
+                  <a14:hiddenLine xmlns:a14="http://schemas.microsoft.com/office/drawing/2010/main" xmlns:p14="http://schemas.microsoft.com/office/powerpoint/2010/main" xmlns:a16="http://schemas.microsoft.com/office/drawing/2014/main" xmlns="" w="9525">
                     <a:solidFill>
                       <a:srgbClr val="000000"/>
                     </a:solidFill>
@@ -40226,7 +40227,7 @@
               </a:ln>
               <a:extLst>
                 <a:ext uri="{91240B29-F687-4f45-9708-019B960494DF}">
-                  <a14:hiddenLine xmlns="" xmlns:a16="http://schemas.microsoft.com/office/drawing/2014/main" xmlns:p14="http://schemas.microsoft.com/office/powerpoint/2010/main" xmlns:a14="http://schemas.microsoft.com/office/drawing/2010/main" w="9525">
+                  <a14:hiddenLine xmlns:a14="http://schemas.microsoft.com/office/drawing/2010/main" xmlns:p14="http://schemas.microsoft.com/office/powerpoint/2010/main" xmlns:a16="http://schemas.microsoft.com/office/drawing/2014/main" xmlns="" w="9525">
                     <a:solidFill>
                       <a:srgbClr val="000000"/>
                     </a:solidFill>
@@ -40303,7 +40304,7 @@
               </a:ln>
               <a:extLst>
                 <a:ext uri="{91240B29-F687-4f45-9708-019B960494DF}">
-                  <a14:hiddenLine xmlns="" xmlns:a16="http://schemas.microsoft.com/office/drawing/2014/main" xmlns:p14="http://schemas.microsoft.com/office/powerpoint/2010/main" xmlns:a14="http://schemas.microsoft.com/office/drawing/2010/main" w="9525">
+                  <a14:hiddenLine xmlns:a14="http://schemas.microsoft.com/office/drawing/2010/main" xmlns:p14="http://schemas.microsoft.com/office/powerpoint/2010/main" xmlns:a16="http://schemas.microsoft.com/office/drawing/2014/main" xmlns="" w="9525">
                     <a:solidFill>
                       <a:srgbClr val="000000"/>
                     </a:solidFill>
@@ -40408,7 +40409,7 @@
               </a:ln>
               <a:extLst>
                 <a:ext uri="{91240B29-F687-4f45-9708-019B960494DF}">
-                  <a14:hiddenLine xmlns="" xmlns:a16="http://schemas.microsoft.com/office/drawing/2014/main" xmlns:p14="http://schemas.microsoft.com/office/powerpoint/2010/main" xmlns:a14="http://schemas.microsoft.com/office/drawing/2010/main" w="9525">
+                  <a14:hiddenLine xmlns:a14="http://schemas.microsoft.com/office/drawing/2010/main" xmlns:p14="http://schemas.microsoft.com/office/powerpoint/2010/main" xmlns:a16="http://schemas.microsoft.com/office/drawing/2014/main" xmlns="" w="9525">
                     <a:solidFill>
                       <a:srgbClr val="000000"/>
                     </a:solidFill>
@@ -40488,7 +40489,7 @@
               </a:ln>
               <a:extLst>
                 <a:ext uri="{91240B29-F687-4f45-9708-019B960494DF}">
-                  <a14:hiddenLine xmlns="" xmlns:a16="http://schemas.microsoft.com/office/drawing/2014/main" xmlns:p14="http://schemas.microsoft.com/office/powerpoint/2010/main" xmlns:a14="http://schemas.microsoft.com/office/drawing/2010/main" w="9525">
+                  <a14:hiddenLine xmlns:a14="http://schemas.microsoft.com/office/drawing/2010/main" xmlns:p14="http://schemas.microsoft.com/office/powerpoint/2010/main" xmlns:a16="http://schemas.microsoft.com/office/drawing/2014/main" xmlns="" w="9525">
                     <a:solidFill>
                       <a:srgbClr val="000000"/>
                     </a:solidFill>
@@ -40565,7 +40566,7 @@
               </a:ln>
               <a:extLst>
                 <a:ext uri="{91240B29-F687-4f45-9708-019B960494DF}">
-                  <a14:hiddenLine xmlns="" xmlns:a16="http://schemas.microsoft.com/office/drawing/2014/main" xmlns:p14="http://schemas.microsoft.com/office/powerpoint/2010/main" xmlns:a14="http://schemas.microsoft.com/office/drawing/2010/main" w="9525">
+                  <a14:hiddenLine xmlns:a14="http://schemas.microsoft.com/office/drawing/2010/main" xmlns:p14="http://schemas.microsoft.com/office/powerpoint/2010/main" xmlns:a16="http://schemas.microsoft.com/office/drawing/2014/main" xmlns="" w="9525">
                     <a:solidFill>
                       <a:srgbClr val="000000"/>
                     </a:solidFill>
@@ -40670,7 +40671,7 @@
               </a:ln>
               <a:extLst>
                 <a:ext uri="{91240B29-F687-4f45-9708-019B960494DF}">
-                  <a14:hiddenLine xmlns="" xmlns:a16="http://schemas.microsoft.com/office/drawing/2014/main" xmlns:p14="http://schemas.microsoft.com/office/powerpoint/2010/main" xmlns:a14="http://schemas.microsoft.com/office/drawing/2010/main" w="9525">
+                  <a14:hiddenLine xmlns:a14="http://schemas.microsoft.com/office/drawing/2010/main" xmlns:p14="http://schemas.microsoft.com/office/powerpoint/2010/main" xmlns:a16="http://schemas.microsoft.com/office/drawing/2014/main" xmlns="" w="9525">
                     <a:solidFill>
                       <a:srgbClr val="000000"/>
                     </a:solidFill>
@@ -40775,7 +40776,7 @@
               </a:ln>
               <a:extLst>
                 <a:ext uri="{91240B29-F687-4f45-9708-019B960494DF}">
-                  <a14:hiddenLine xmlns="" xmlns:a16="http://schemas.microsoft.com/office/drawing/2014/main" xmlns:p14="http://schemas.microsoft.com/office/powerpoint/2010/main" xmlns:a14="http://schemas.microsoft.com/office/drawing/2010/main" w="9525">
+                  <a14:hiddenLine xmlns:a14="http://schemas.microsoft.com/office/drawing/2010/main" xmlns:p14="http://schemas.microsoft.com/office/powerpoint/2010/main" xmlns:a16="http://schemas.microsoft.com/office/drawing/2014/main" xmlns="" w="9525">
                     <a:solidFill>
                       <a:srgbClr val="000000"/>
                     </a:solidFill>
@@ -40855,7 +40856,7 @@
               </a:ln>
               <a:extLst>
                 <a:ext uri="{91240B29-F687-4f45-9708-019B960494DF}">
-                  <a14:hiddenLine xmlns="" xmlns:a16="http://schemas.microsoft.com/office/drawing/2014/main" xmlns:p14="http://schemas.microsoft.com/office/powerpoint/2010/main" xmlns:a14="http://schemas.microsoft.com/office/drawing/2010/main" w="9525">
+                  <a14:hiddenLine xmlns:a14="http://schemas.microsoft.com/office/drawing/2010/main" xmlns:p14="http://schemas.microsoft.com/office/powerpoint/2010/main" xmlns:a16="http://schemas.microsoft.com/office/drawing/2014/main" xmlns="" w="9525">
                     <a:solidFill>
                       <a:srgbClr val="000000"/>
                     </a:solidFill>
@@ -40990,7 +40991,7 @@
               </a:ln>
               <a:extLst>
                 <a:ext uri="{91240B29-F687-4f45-9708-019B960494DF}">
-                  <a14:hiddenLine xmlns="" xmlns:a16="http://schemas.microsoft.com/office/drawing/2014/main" xmlns:p14="http://schemas.microsoft.com/office/powerpoint/2010/main" xmlns:a14="http://schemas.microsoft.com/office/drawing/2010/main" w="9525">
+                  <a14:hiddenLine xmlns:a14="http://schemas.microsoft.com/office/drawing/2010/main" xmlns:p14="http://schemas.microsoft.com/office/powerpoint/2010/main" xmlns:a16="http://schemas.microsoft.com/office/drawing/2014/main" xmlns="" w="9525">
                     <a:solidFill>
                       <a:srgbClr val="000000"/>
                     </a:solidFill>
@@ -41118,7 +41119,7 @@
               </a:ln>
               <a:extLst>
                 <a:ext uri="{91240B29-F687-4f45-9708-019B960494DF}">
-                  <a14:hiddenLine xmlns="" xmlns:a16="http://schemas.microsoft.com/office/drawing/2014/main" xmlns:p14="http://schemas.microsoft.com/office/powerpoint/2010/main" xmlns:a14="http://schemas.microsoft.com/office/drawing/2010/main" w="9525">
+                  <a14:hiddenLine xmlns:a14="http://schemas.microsoft.com/office/drawing/2010/main" xmlns:p14="http://schemas.microsoft.com/office/powerpoint/2010/main" xmlns:a16="http://schemas.microsoft.com/office/drawing/2014/main" xmlns="" w="9525">
                     <a:solidFill>
                       <a:srgbClr val="000000"/>
                     </a:solidFill>
@@ -41248,7 +41249,7 @@
               </a:ln>
               <a:extLst>
                 <a:ext uri="{91240B29-F687-4f45-9708-019B960494DF}">
-                  <a14:hiddenLine xmlns="" xmlns:a16="http://schemas.microsoft.com/office/drawing/2014/main" xmlns:p14="http://schemas.microsoft.com/office/powerpoint/2010/main" xmlns:a14="http://schemas.microsoft.com/office/drawing/2010/main" w="9525">
+                  <a14:hiddenLine xmlns:a14="http://schemas.microsoft.com/office/drawing/2010/main" xmlns:p14="http://schemas.microsoft.com/office/powerpoint/2010/main" xmlns:a16="http://schemas.microsoft.com/office/drawing/2014/main" xmlns="" w="9525">
                     <a:solidFill>
                       <a:srgbClr val="000000"/>
                     </a:solidFill>
@@ -41353,7 +41354,7 @@
               </a:ln>
               <a:extLst>
                 <a:ext uri="{91240B29-F687-4f45-9708-019B960494DF}">
-                  <a14:hiddenLine xmlns="" xmlns:a16="http://schemas.microsoft.com/office/drawing/2014/main" xmlns:p14="http://schemas.microsoft.com/office/powerpoint/2010/main" xmlns:a14="http://schemas.microsoft.com/office/drawing/2010/main" w="9525">
+                  <a14:hiddenLine xmlns:a14="http://schemas.microsoft.com/office/drawing/2010/main" xmlns:p14="http://schemas.microsoft.com/office/powerpoint/2010/main" xmlns:a16="http://schemas.microsoft.com/office/drawing/2014/main" xmlns="" w="9525">
                     <a:solidFill>
                       <a:srgbClr val="000000"/>
                     </a:solidFill>
@@ -41433,7 +41434,7 @@
               </a:ln>
               <a:extLst>
                 <a:ext uri="{91240B29-F687-4f45-9708-019B960494DF}">
-                  <a14:hiddenLine xmlns="" xmlns:a16="http://schemas.microsoft.com/office/drawing/2014/main" xmlns:p14="http://schemas.microsoft.com/office/powerpoint/2010/main" xmlns:a14="http://schemas.microsoft.com/office/drawing/2010/main" w="9525">
+                  <a14:hiddenLine xmlns:a14="http://schemas.microsoft.com/office/drawing/2010/main" xmlns:p14="http://schemas.microsoft.com/office/powerpoint/2010/main" xmlns:a16="http://schemas.microsoft.com/office/drawing/2014/main" xmlns="" w="9525">
                     <a:solidFill>
                       <a:srgbClr val="000000"/>
                     </a:solidFill>
@@ -41538,7 +41539,7 @@
               </a:ln>
               <a:extLst>
                 <a:ext uri="{91240B29-F687-4f45-9708-019B960494DF}">
-                  <a14:hiddenLine xmlns="" xmlns:a16="http://schemas.microsoft.com/office/drawing/2014/main" xmlns:p14="http://schemas.microsoft.com/office/powerpoint/2010/main" xmlns:a14="http://schemas.microsoft.com/office/drawing/2010/main" w="9525">
+                  <a14:hiddenLine xmlns:a14="http://schemas.microsoft.com/office/drawing/2010/main" xmlns:p14="http://schemas.microsoft.com/office/powerpoint/2010/main" xmlns:a16="http://schemas.microsoft.com/office/drawing/2014/main" xmlns="" w="9525">
                     <a:solidFill>
                       <a:srgbClr val="000000"/>
                     </a:solidFill>
@@ -41621,7 +41622,7 @@
               </a:ln>
               <a:extLst>
                 <a:ext uri="{91240B29-F687-4f45-9708-019B960494DF}">
-                  <a14:hiddenLine xmlns="" xmlns:a16="http://schemas.microsoft.com/office/drawing/2014/main" xmlns:p14="http://schemas.microsoft.com/office/powerpoint/2010/main" xmlns:a14="http://schemas.microsoft.com/office/drawing/2010/main" w="9525">
+                  <a14:hiddenLine xmlns:a14="http://schemas.microsoft.com/office/drawing/2010/main" xmlns:p14="http://schemas.microsoft.com/office/powerpoint/2010/main" xmlns:a16="http://schemas.microsoft.com/office/drawing/2014/main" xmlns="" w="9525">
                     <a:solidFill>
                       <a:srgbClr val="000000"/>
                     </a:solidFill>
@@ -41726,7 +41727,7 @@
               </a:ln>
               <a:extLst>
                 <a:ext uri="{91240B29-F687-4f45-9708-019B960494DF}">
-                  <a14:hiddenLine xmlns="" xmlns:a16="http://schemas.microsoft.com/office/drawing/2014/main" xmlns:p14="http://schemas.microsoft.com/office/powerpoint/2010/main" xmlns:a14="http://schemas.microsoft.com/office/drawing/2010/main" w="9525">
+                  <a14:hiddenLine xmlns:a14="http://schemas.microsoft.com/office/drawing/2010/main" xmlns:p14="http://schemas.microsoft.com/office/powerpoint/2010/main" xmlns:a16="http://schemas.microsoft.com/office/drawing/2014/main" xmlns="" w="9525">
                     <a:solidFill>
                       <a:srgbClr val="000000"/>
                     </a:solidFill>
@@ -41809,7 +41810,7 @@
               </a:ln>
               <a:extLst>
                 <a:ext uri="{91240B29-F687-4f45-9708-019B960494DF}">
-                  <a14:hiddenLine xmlns="" xmlns:a16="http://schemas.microsoft.com/office/drawing/2014/main" xmlns:p14="http://schemas.microsoft.com/office/powerpoint/2010/main" xmlns:a14="http://schemas.microsoft.com/office/drawing/2010/main" w="9525">
+                  <a14:hiddenLine xmlns:a14="http://schemas.microsoft.com/office/drawing/2010/main" xmlns:p14="http://schemas.microsoft.com/office/powerpoint/2010/main" xmlns:a16="http://schemas.microsoft.com/office/drawing/2014/main" xmlns="" w="9525">
                     <a:solidFill>
                       <a:srgbClr val="000000"/>
                     </a:solidFill>
@@ -41914,7 +41915,7 @@
               </a:ln>
               <a:extLst>
                 <a:ext uri="{91240B29-F687-4f45-9708-019B960494DF}">
-                  <a14:hiddenLine xmlns="" xmlns:a16="http://schemas.microsoft.com/office/drawing/2014/main" xmlns:p14="http://schemas.microsoft.com/office/powerpoint/2010/main" xmlns:a14="http://schemas.microsoft.com/office/drawing/2010/main" w="9525">
+                  <a14:hiddenLine xmlns:a14="http://schemas.microsoft.com/office/drawing/2010/main" xmlns:p14="http://schemas.microsoft.com/office/powerpoint/2010/main" xmlns:a16="http://schemas.microsoft.com/office/drawing/2014/main" xmlns="" w="9525">
                     <a:solidFill>
                       <a:srgbClr val="000000"/>
                     </a:solidFill>
@@ -41963,7 +41964,7 @@
               </a:ln>
               <a:extLst>
                 <a:ext uri="{91240B29-F687-4f45-9708-019B960494DF}">
-                  <a14:hiddenLine xmlns="" xmlns:a16="http://schemas.microsoft.com/office/drawing/2014/main" xmlns:p14="http://schemas.microsoft.com/office/powerpoint/2010/main" xmlns:a14="http://schemas.microsoft.com/office/drawing/2010/main" w="9525">
+                  <a14:hiddenLine xmlns:a14="http://schemas.microsoft.com/office/drawing/2010/main" xmlns:p14="http://schemas.microsoft.com/office/powerpoint/2010/main" xmlns:a16="http://schemas.microsoft.com/office/drawing/2014/main" xmlns="" w="9525">
                     <a:solidFill>
                       <a:srgbClr val="000000"/>
                     </a:solidFill>
@@ -42083,7 +42084,7 @@
           </a:prstGeom>
           <a:extLst>
             <a:ext uri="{909E8E84-426E-40dd-AFC4-6F175D3DCCD1}">
-              <a14:hiddenFill xmlns="" xmlns:a16="http://schemas.microsoft.com/office/drawing/2014/main" xmlns:p14="http://schemas.microsoft.com/office/powerpoint/2010/main" xmlns:a14="http://schemas.microsoft.com/office/drawing/2010/main">
+              <a14:hiddenFill xmlns:a14="http://schemas.microsoft.com/office/drawing/2010/main" xmlns:p14="http://schemas.microsoft.com/office/powerpoint/2010/main" xmlns:a16="http://schemas.microsoft.com/office/drawing/2014/main" xmlns="">
                 <a:solidFill>
                   <a:srgbClr val="FFFFFF"/>
                 </a:solidFill>
@@ -42207,7 +42208,7 @@
           <a:noFill/>
           <a:extLst>
             <a:ext uri="{909E8E84-426E-40dd-AFC4-6F175D3DCCD1}">
-              <a14:hiddenFill xmlns="" xmlns:a16="http://schemas.microsoft.com/office/drawing/2014/main" xmlns:p14="http://schemas.microsoft.com/office/powerpoint/2010/main" xmlns:a14="http://schemas.microsoft.com/office/drawing/2010/main">
+              <a14:hiddenFill xmlns:a14="http://schemas.microsoft.com/office/drawing/2010/main" xmlns:p14="http://schemas.microsoft.com/office/powerpoint/2010/main" xmlns:a16="http://schemas.microsoft.com/office/drawing/2014/main" xmlns="">
                 <a:solidFill>
                   <a:srgbClr val="FFFFFF"/>
                 </a:solidFill>
@@ -42395,7 +42396,7 @@
             </a:ln>
             <a:extLst>
               <a:ext uri="{91240B29-F687-4f45-9708-019B960494DF}">
-                <a14:hiddenLine xmlns="" xmlns:a16="http://schemas.microsoft.com/office/drawing/2014/main" xmlns:p14="http://schemas.microsoft.com/office/powerpoint/2010/main" xmlns:a14="http://schemas.microsoft.com/office/drawing/2010/main" w="9525">
+                <a14:hiddenLine xmlns:a14="http://schemas.microsoft.com/office/drawing/2010/main" xmlns:p14="http://schemas.microsoft.com/office/powerpoint/2010/main" xmlns:a16="http://schemas.microsoft.com/office/drawing/2014/main" xmlns="" w="9525">
                   <a:solidFill>
                     <a:srgbClr val="000000"/>
                   </a:solidFill>
@@ -42500,7 +42501,7 @@
             </a:ln>
             <a:extLst>
               <a:ext uri="{91240B29-F687-4f45-9708-019B960494DF}">
-                <a14:hiddenLine xmlns="" xmlns:a16="http://schemas.microsoft.com/office/drawing/2014/main" xmlns:p14="http://schemas.microsoft.com/office/powerpoint/2010/main" xmlns:a14="http://schemas.microsoft.com/office/drawing/2010/main" w="9525">
+                <a14:hiddenLine xmlns:a14="http://schemas.microsoft.com/office/drawing/2010/main" xmlns:p14="http://schemas.microsoft.com/office/powerpoint/2010/main" xmlns:a16="http://schemas.microsoft.com/office/drawing/2014/main" xmlns="" w="9525">
                   <a:solidFill>
                     <a:srgbClr val="000000"/>
                   </a:solidFill>
@@ -42605,7 +42606,7 @@
             </a:ln>
             <a:extLst>
               <a:ext uri="{91240B29-F687-4f45-9708-019B960494DF}">
-                <a14:hiddenLine xmlns="" xmlns:a16="http://schemas.microsoft.com/office/drawing/2014/main" xmlns:p14="http://schemas.microsoft.com/office/powerpoint/2010/main" xmlns:a14="http://schemas.microsoft.com/office/drawing/2010/main" w="9525">
+                <a14:hiddenLine xmlns:a14="http://schemas.microsoft.com/office/drawing/2010/main" xmlns:p14="http://schemas.microsoft.com/office/powerpoint/2010/main" xmlns:a16="http://schemas.microsoft.com/office/drawing/2014/main" xmlns="" w="9525">
                   <a:solidFill>
                     <a:srgbClr val="000000"/>
                   </a:solidFill>
@@ -42682,7 +42683,7 @@
             </a:ln>
             <a:extLst>
               <a:ext uri="{91240B29-F687-4f45-9708-019B960494DF}">
-                <a14:hiddenLine xmlns="" xmlns:a16="http://schemas.microsoft.com/office/drawing/2014/main" xmlns:p14="http://schemas.microsoft.com/office/powerpoint/2010/main" xmlns:a14="http://schemas.microsoft.com/office/drawing/2010/main" w="9525">
+                <a14:hiddenLine xmlns:a14="http://schemas.microsoft.com/office/drawing/2010/main" xmlns:p14="http://schemas.microsoft.com/office/powerpoint/2010/main" xmlns:a16="http://schemas.microsoft.com/office/drawing/2014/main" xmlns="" w="9525">
                   <a:solidFill>
                     <a:srgbClr val="000000"/>
                   </a:solidFill>
@@ -42787,7 +42788,7 @@
             </a:ln>
             <a:extLst>
               <a:ext uri="{91240B29-F687-4f45-9708-019B960494DF}">
-                <a14:hiddenLine xmlns="" xmlns:a16="http://schemas.microsoft.com/office/drawing/2014/main" xmlns:p14="http://schemas.microsoft.com/office/powerpoint/2010/main" xmlns:a14="http://schemas.microsoft.com/office/drawing/2010/main" w="9525">
+                <a14:hiddenLine xmlns:a14="http://schemas.microsoft.com/office/drawing/2010/main" xmlns:p14="http://schemas.microsoft.com/office/powerpoint/2010/main" xmlns:a16="http://schemas.microsoft.com/office/drawing/2014/main" xmlns="" w="9525">
                   <a:solidFill>
                     <a:srgbClr val="000000"/>
                   </a:solidFill>
@@ -42864,7 +42865,7 @@
             </a:ln>
             <a:extLst>
               <a:ext uri="{91240B29-F687-4f45-9708-019B960494DF}">
-                <a14:hiddenLine xmlns="" xmlns:a16="http://schemas.microsoft.com/office/drawing/2014/main" xmlns:p14="http://schemas.microsoft.com/office/powerpoint/2010/main" xmlns:a14="http://schemas.microsoft.com/office/drawing/2010/main" w="9525">
+                <a14:hiddenLine xmlns:a14="http://schemas.microsoft.com/office/drawing/2010/main" xmlns:p14="http://schemas.microsoft.com/office/powerpoint/2010/main" xmlns:a16="http://schemas.microsoft.com/office/drawing/2014/main" xmlns="" w="9525">
                   <a:solidFill>
                     <a:srgbClr val="000000"/>
                   </a:solidFill>
@@ -42941,7 +42942,7 @@
             </a:ln>
             <a:extLst>
               <a:ext uri="{91240B29-F687-4f45-9708-019B960494DF}">
-                <a14:hiddenLine xmlns="" xmlns:a16="http://schemas.microsoft.com/office/drawing/2014/main" xmlns:p14="http://schemas.microsoft.com/office/powerpoint/2010/main" xmlns:a14="http://schemas.microsoft.com/office/drawing/2010/main" w="9525">
+                <a14:hiddenLine xmlns:a14="http://schemas.microsoft.com/office/drawing/2010/main" xmlns:p14="http://schemas.microsoft.com/office/powerpoint/2010/main" xmlns:a16="http://schemas.microsoft.com/office/drawing/2014/main" xmlns="" w="9525">
                   <a:solidFill>
                     <a:srgbClr val="000000"/>
                   </a:solidFill>
@@ -43046,7 +43047,7 @@
             </a:ln>
             <a:extLst>
               <a:ext uri="{91240B29-F687-4f45-9708-019B960494DF}">
-                <a14:hiddenLine xmlns="" xmlns:a16="http://schemas.microsoft.com/office/drawing/2014/main" xmlns:p14="http://schemas.microsoft.com/office/powerpoint/2010/main" xmlns:a14="http://schemas.microsoft.com/office/drawing/2010/main" w="9525">
+                <a14:hiddenLine xmlns:a14="http://schemas.microsoft.com/office/drawing/2010/main" xmlns:p14="http://schemas.microsoft.com/office/powerpoint/2010/main" xmlns:a16="http://schemas.microsoft.com/office/drawing/2014/main" xmlns="" w="9525">
                   <a:solidFill>
                     <a:srgbClr val="000000"/>
                   </a:solidFill>
@@ -43151,7 +43152,7 @@
             </a:ln>
             <a:extLst>
               <a:ext uri="{91240B29-F687-4f45-9708-019B960494DF}">
-                <a14:hiddenLine xmlns="" xmlns:a16="http://schemas.microsoft.com/office/drawing/2014/main" xmlns:p14="http://schemas.microsoft.com/office/powerpoint/2010/main" xmlns:a14="http://schemas.microsoft.com/office/drawing/2010/main" w="9525">
+                <a14:hiddenLine xmlns:a14="http://schemas.microsoft.com/office/drawing/2010/main" xmlns:p14="http://schemas.microsoft.com/office/powerpoint/2010/main" xmlns:a16="http://schemas.microsoft.com/office/drawing/2014/main" xmlns="" w="9525">
                   <a:solidFill>
                     <a:srgbClr val="000000"/>
                   </a:solidFill>
@@ -43228,7 +43229,7 @@
             </a:ln>
             <a:extLst>
               <a:ext uri="{91240B29-F687-4f45-9708-019B960494DF}">
-                <a14:hiddenLine xmlns="" xmlns:a16="http://schemas.microsoft.com/office/drawing/2014/main" xmlns:p14="http://schemas.microsoft.com/office/powerpoint/2010/main" xmlns:a14="http://schemas.microsoft.com/office/drawing/2010/main" w="9525">
+                <a14:hiddenLine xmlns:a14="http://schemas.microsoft.com/office/drawing/2010/main" xmlns:p14="http://schemas.microsoft.com/office/powerpoint/2010/main" xmlns:a16="http://schemas.microsoft.com/office/drawing/2014/main" xmlns="" w="9525">
                   <a:solidFill>
                     <a:srgbClr val="000000"/>
                   </a:solidFill>
@@ -43353,7 +43354,7 @@
             </a:ln>
             <a:extLst>
               <a:ext uri="{91240B29-F687-4f45-9708-019B960494DF}">
-                <a14:hiddenLine xmlns="" xmlns:a16="http://schemas.microsoft.com/office/drawing/2014/main" xmlns:p14="http://schemas.microsoft.com/office/powerpoint/2010/main" xmlns:a14="http://schemas.microsoft.com/office/drawing/2010/main" w="9525">
+                <a14:hiddenLine xmlns:a14="http://schemas.microsoft.com/office/drawing/2010/main" xmlns:p14="http://schemas.microsoft.com/office/powerpoint/2010/main" xmlns:a16="http://schemas.microsoft.com/office/drawing/2014/main" xmlns="" w="9525">
                   <a:solidFill>
                     <a:srgbClr val="000000"/>
                   </a:solidFill>
@@ -43467,7 +43468,7 @@
             </a:ln>
             <a:extLst>
               <a:ext uri="{91240B29-F687-4f45-9708-019B960494DF}">
-                <a14:hiddenLine xmlns="" xmlns:a16="http://schemas.microsoft.com/office/drawing/2014/main" xmlns:p14="http://schemas.microsoft.com/office/powerpoint/2010/main" xmlns:a14="http://schemas.microsoft.com/office/drawing/2010/main" w="9525">
+                <a14:hiddenLine xmlns:a14="http://schemas.microsoft.com/office/drawing/2010/main" xmlns:p14="http://schemas.microsoft.com/office/powerpoint/2010/main" xmlns:a16="http://schemas.microsoft.com/office/drawing/2014/main" xmlns="" w="9525">
                   <a:solidFill>
                     <a:srgbClr val="000000"/>
                   </a:solidFill>
@@ -43544,7 +43545,7 @@
             </a:ln>
             <a:extLst>
               <a:ext uri="{91240B29-F687-4f45-9708-019B960494DF}">
-                <a14:hiddenLine xmlns="" xmlns:a16="http://schemas.microsoft.com/office/drawing/2014/main" xmlns:p14="http://schemas.microsoft.com/office/powerpoint/2010/main" xmlns:a14="http://schemas.microsoft.com/office/drawing/2010/main" w="9525">
+                <a14:hiddenLine xmlns:a14="http://schemas.microsoft.com/office/drawing/2010/main" xmlns:p14="http://schemas.microsoft.com/office/powerpoint/2010/main" xmlns:a16="http://schemas.microsoft.com/office/drawing/2014/main" xmlns="" w="9525">
                   <a:solidFill>
                     <a:srgbClr val="000000"/>
                   </a:solidFill>
@@ -43621,7 +43622,7 @@
             </a:ln>
             <a:extLst>
               <a:ext uri="{91240B29-F687-4f45-9708-019B960494DF}">
-                <a14:hiddenLine xmlns="" xmlns:a16="http://schemas.microsoft.com/office/drawing/2014/main" xmlns:p14="http://schemas.microsoft.com/office/powerpoint/2010/main" xmlns:a14="http://schemas.microsoft.com/office/drawing/2010/main" w="9525">
+                <a14:hiddenLine xmlns:a14="http://schemas.microsoft.com/office/drawing/2010/main" xmlns:p14="http://schemas.microsoft.com/office/powerpoint/2010/main" xmlns:a16="http://schemas.microsoft.com/office/drawing/2014/main" xmlns="" w="9525">
                   <a:solidFill>
                     <a:srgbClr val="000000"/>
                   </a:solidFill>
@@ -43726,7 +43727,7 @@
             </a:ln>
             <a:extLst>
               <a:ext uri="{91240B29-F687-4f45-9708-019B960494DF}">
-                <a14:hiddenLine xmlns="" xmlns:a16="http://schemas.microsoft.com/office/drawing/2014/main" xmlns:p14="http://schemas.microsoft.com/office/powerpoint/2010/main" xmlns:a14="http://schemas.microsoft.com/office/drawing/2010/main" w="9525">
+                <a14:hiddenLine xmlns:a14="http://schemas.microsoft.com/office/drawing/2010/main" xmlns:p14="http://schemas.microsoft.com/office/powerpoint/2010/main" xmlns:a16="http://schemas.microsoft.com/office/drawing/2014/main" xmlns="" w="9525">
                   <a:solidFill>
                     <a:srgbClr val="000000"/>
                   </a:solidFill>
@@ -43775,7 +43776,7 @@
             </a:ln>
             <a:extLst>
               <a:ext uri="{91240B29-F687-4f45-9708-019B960494DF}">
-                <a14:hiddenLine xmlns="" xmlns:a16="http://schemas.microsoft.com/office/drawing/2014/main" xmlns:p14="http://schemas.microsoft.com/office/powerpoint/2010/main" xmlns:a14="http://schemas.microsoft.com/office/drawing/2010/main" w="9525">
+                <a14:hiddenLine xmlns:a14="http://schemas.microsoft.com/office/drawing/2010/main" xmlns:p14="http://schemas.microsoft.com/office/powerpoint/2010/main" xmlns:a16="http://schemas.microsoft.com/office/drawing/2014/main" xmlns="" w="9525">
                   <a:solidFill>
                     <a:srgbClr val="000000"/>
                   </a:solidFill>
@@ -43855,7 +43856,7 @@
             </a:ln>
             <a:extLst>
               <a:ext uri="{91240B29-F687-4f45-9708-019B960494DF}">
-                <a14:hiddenLine xmlns="" xmlns:a16="http://schemas.microsoft.com/office/drawing/2014/main" xmlns:p14="http://schemas.microsoft.com/office/powerpoint/2010/main" xmlns:a14="http://schemas.microsoft.com/office/drawing/2010/main" w="9525">
+                <a14:hiddenLine xmlns:a14="http://schemas.microsoft.com/office/drawing/2010/main" xmlns:p14="http://schemas.microsoft.com/office/powerpoint/2010/main" xmlns:a16="http://schemas.microsoft.com/office/drawing/2014/main" xmlns="" w="9525">
                   <a:solidFill>
                     <a:srgbClr val="000000"/>
                   </a:solidFill>
@@ -43960,7 +43961,7 @@
             </a:ln>
             <a:extLst>
               <a:ext uri="{91240B29-F687-4f45-9708-019B960494DF}">
-                <a14:hiddenLine xmlns="" xmlns:a16="http://schemas.microsoft.com/office/drawing/2014/main" xmlns:p14="http://schemas.microsoft.com/office/powerpoint/2010/main" xmlns:a14="http://schemas.microsoft.com/office/drawing/2010/main" w="9525">
+                <a14:hiddenLine xmlns:a14="http://schemas.microsoft.com/office/drawing/2010/main" xmlns:p14="http://schemas.microsoft.com/office/powerpoint/2010/main" xmlns:a16="http://schemas.microsoft.com/office/drawing/2014/main" xmlns="" w="9525">
                   <a:solidFill>
                     <a:srgbClr val="000000"/>
                   </a:solidFill>
@@ -44037,7 +44038,7 @@
             </a:ln>
             <a:extLst>
               <a:ext uri="{91240B29-F687-4f45-9708-019B960494DF}">
-                <a14:hiddenLine xmlns="" xmlns:a16="http://schemas.microsoft.com/office/drawing/2014/main" xmlns:p14="http://schemas.microsoft.com/office/powerpoint/2010/main" xmlns:a14="http://schemas.microsoft.com/office/drawing/2010/main" w="9525">
+                <a14:hiddenLine xmlns:a14="http://schemas.microsoft.com/office/drawing/2010/main" xmlns:p14="http://schemas.microsoft.com/office/powerpoint/2010/main" xmlns:a16="http://schemas.microsoft.com/office/drawing/2014/main" xmlns="" w="9525">
                   <a:solidFill>
                     <a:srgbClr val="000000"/>
                   </a:solidFill>
@@ -44142,7 +44143,7 @@
             </a:ln>
             <a:extLst>
               <a:ext uri="{91240B29-F687-4f45-9708-019B960494DF}">
-                <a14:hiddenLine xmlns="" xmlns:a16="http://schemas.microsoft.com/office/drawing/2014/main" xmlns:p14="http://schemas.microsoft.com/office/powerpoint/2010/main" xmlns:a14="http://schemas.microsoft.com/office/drawing/2010/main" w="9525">
+                <a14:hiddenLine xmlns:a14="http://schemas.microsoft.com/office/drawing/2010/main" xmlns:p14="http://schemas.microsoft.com/office/powerpoint/2010/main" xmlns:a16="http://schemas.microsoft.com/office/drawing/2014/main" xmlns="" w="9525">
                   <a:solidFill>
                     <a:srgbClr val="000000"/>
                   </a:solidFill>
@@ -44222,7 +44223,7 @@
             </a:ln>
             <a:extLst>
               <a:ext uri="{91240B29-F687-4f45-9708-019B960494DF}">
-                <a14:hiddenLine xmlns="" xmlns:a16="http://schemas.microsoft.com/office/drawing/2014/main" xmlns:p14="http://schemas.microsoft.com/office/powerpoint/2010/main" xmlns:a14="http://schemas.microsoft.com/office/drawing/2010/main" w="9525">
+                <a14:hiddenLine xmlns:a14="http://schemas.microsoft.com/office/drawing/2010/main" xmlns:p14="http://schemas.microsoft.com/office/powerpoint/2010/main" xmlns:a16="http://schemas.microsoft.com/office/drawing/2014/main" xmlns="" w="9525">
                   <a:solidFill>
                     <a:srgbClr val="000000"/>
                   </a:solidFill>
@@ -44299,7 +44300,7 @@
             </a:ln>
             <a:extLst>
               <a:ext uri="{91240B29-F687-4f45-9708-019B960494DF}">
-                <a14:hiddenLine xmlns="" xmlns:a16="http://schemas.microsoft.com/office/drawing/2014/main" xmlns:p14="http://schemas.microsoft.com/office/powerpoint/2010/main" xmlns:a14="http://schemas.microsoft.com/office/drawing/2010/main" w="9525">
+                <a14:hiddenLine xmlns:a14="http://schemas.microsoft.com/office/drawing/2010/main" xmlns:p14="http://schemas.microsoft.com/office/powerpoint/2010/main" xmlns:a16="http://schemas.microsoft.com/office/drawing/2014/main" xmlns="" w="9525">
                   <a:solidFill>
                     <a:srgbClr val="000000"/>
                   </a:solidFill>
@@ -44404,7 +44405,7 @@
             </a:ln>
             <a:extLst>
               <a:ext uri="{91240B29-F687-4f45-9708-019B960494DF}">
-                <a14:hiddenLine xmlns="" xmlns:a16="http://schemas.microsoft.com/office/drawing/2014/main" xmlns:p14="http://schemas.microsoft.com/office/powerpoint/2010/main" xmlns:a14="http://schemas.microsoft.com/office/drawing/2010/main" w="9525">
+                <a14:hiddenLine xmlns:a14="http://schemas.microsoft.com/office/drawing/2010/main" xmlns:p14="http://schemas.microsoft.com/office/powerpoint/2010/main" xmlns:a16="http://schemas.microsoft.com/office/drawing/2014/main" xmlns="" w="9525">
                   <a:solidFill>
                     <a:srgbClr val="000000"/>
                   </a:solidFill>
@@ -44509,7 +44510,7 @@
             </a:ln>
             <a:extLst>
               <a:ext uri="{91240B29-F687-4f45-9708-019B960494DF}">
-                <a14:hiddenLine xmlns="" xmlns:a16="http://schemas.microsoft.com/office/drawing/2014/main" xmlns:p14="http://schemas.microsoft.com/office/powerpoint/2010/main" xmlns:a14="http://schemas.microsoft.com/office/drawing/2010/main" w="9525">
+                <a14:hiddenLine xmlns:a14="http://schemas.microsoft.com/office/drawing/2010/main" xmlns:p14="http://schemas.microsoft.com/office/powerpoint/2010/main" xmlns:a16="http://schemas.microsoft.com/office/drawing/2014/main" xmlns="" w="9525">
                   <a:solidFill>
                     <a:srgbClr val="000000"/>
                   </a:solidFill>
@@ -44589,7 +44590,7 @@
             </a:ln>
             <a:extLst>
               <a:ext uri="{91240B29-F687-4f45-9708-019B960494DF}">
-                <a14:hiddenLine xmlns="" xmlns:a16="http://schemas.microsoft.com/office/drawing/2014/main" xmlns:p14="http://schemas.microsoft.com/office/powerpoint/2010/main" xmlns:a14="http://schemas.microsoft.com/office/drawing/2010/main" w="9525">
+                <a14:hiddenLine xmlns:a14="http://schemas.microsoft.com/office/drawing/2010/main" xmlns:p14="http://schemas.microsoft.com/office/powerpoint/2010/main" xmlns:a16="http://schemas.microsoft.com/office/drawing/2014/main" xmlns="" w="9525">
                   <a:solidFill>
                     <a:srgbClr val="000000"/>
                   </a:solidFill>
@@ -44724,7 +44725,7 @@
             </a:ln>
             <a:extLst>
               <a:ext uri="{91240B29-F687-4f45-9708-019B960494DF}">
-                <a14:hiddenLine xmlns="" xmlns:a16="http://schemas.microsoft.com/office/drawing/2014/main" xmlns:p14="http://schemas.microsoft.com/office/powerpoint/2010/main" xmlns:a14="http://schemas.microsoft.com/office/drawing/2010/main" w="9525">
+                <a14:hiddenLine xmlns:a14="http://schemas.microsoft.com/office/drawing/2010/main" xmlns:p14="http://schemas.microsoft.com/office/powerpoint/2010/main" xmlns:a16="http://schemas.microsoft.com/office/drawing/2014/main" xmlns="" w="9525">
                   <a:solidFill>
                     <a:srgbClr val="000000"/>
                   </a:solidFill>
@@ -44887,7 +44888,7 @@
           <a:p>
             <a:r>
               <a:rPr lang="en-US" dirty="0"/>
-              <a:t>Results: Relational Database design</a:t>
+              <a:t>Results: IDEAL Relational Database design</a:t>
             </a:r>
           </a:p>
         </p:txBody>
@@ -45118,6 +45119,133 @@
 </file>
 
 <file path=ppt/slides/slide15.xml><?xml version="1.0" encoding="utf-8"?>
+<p:sld xmlns:a="http://schemas.openxmlformats.org/drawingml/2006/main" xmlns:r="http://schemas.openxmlformats.org/officeDocument/2006/relationships" xmlns:p="http://schemas.openxmlformats.org/presentationml/2006/main">
+  <p:cSld>
+    <p:spTree>
+      <p:nvGrpSpPr>
+        <p:cNvPr id="1" name=""/>
+        <p:cNvGrpSpPr/>
+        <p:nvPr/>
+      </p:nvGrpSpPr>
+      <p:grpSpPr>
+        <a:xfrm>
+          <a:off x="0" y="0"/>
+          <a:ext cx="0" cy="0"/>
+          <a:chOff x="0" y="0"/>
+          <a:chExt cx="0" cy="0"/>
+        </a:xfrm>
+      </p:grpSpPr>
+      <p:sp>
+        <p:nvSpPr>
+          <p:cNvPr id="2" name="Title 1">
+            <a:extLst>
+              <a:ext uri="{FF2B5EF4-FFF2-40B4-BE49-F238E27FC236}">
+                <a16:creationId xmlns:a16="http://schemas.microsoft.com/office/drawing/2014/main" id="{F76CA0E5-8E9F-4019-B536-D2B488BAE358}"/>
+              </a:ext>
+            </a:extLst>
+          </p:cNvPr>
+          <p:cNvSpPr>
+            <a:spLocks noGrp="1"/>
+          </p:cNvSpPr>
+          <p:nvPr>
+            <p:ph type="title"/>
+          </p:nvPr>
+        </p:nvSpPr>
+        <p:spPr/>
+        <p:txBody>
+          <a:bodyPr/>
+          <a:lstStyle/>
+          <a:p>
+            <a:r>
+              <a:rPr lang="en-US" u="sng" dirty="0"/>
+              <a:t>Results: end state database design__________</a:t>
+            </a:r>
+          </a:p>
+        </p:txBody>
+      </p:sp>
+      <p:sp>
+        <p:nvSpPr>
+          <p:cNvPr id="3" name="Content Placeholder 2">
+            <a:extLst>
+              <a:ext uri="{FF2B5EF4-FFF2-40B4-BE49-F238E27FC236}">
+                <a16:creationId xmlns:a16="http://schemas.microsoft.com/office/drawing/2014/main" id="{E39D0DCC-94F3-4A47-9CF6-A2AACBDDB7C8}"/>
+              </a:ext>
+            </a:extLst>
+          </p:cNvPr>
+          <p:cNvSpPr>
+            <a:spLocks noGrp="1"/>
+          </p:cNvSpPr>
+          <p:nvPr>
+            <p:ph idx="1"/>
+          </p:nvPr>
+        </p:nvSpPr>
+        <p:spPr/>
+        <p:txBody>
+          <a:bodyPr/>
+          <a:lstStyle/>
+          <a:p>
+            <a:r>
+              <a:rPr lang="en-US" dirty="0"/>
+              <a:t>Practical Requirements:</a:t>
+            </a:r>
+          </a:p>
+          <a:p>
+            <a:pPr lvl="1"/>
+            <a:r>
+              <a:rPr lang="en-US" dirty="0"/>
+              <a:t>Ability to support quick data refreshes.</a:t>
+            </a:r>
+          </a:p>
+          <a:p>
+            <a:pPr lvl="1"/>
+            <a:r>
+              <a:rPr lang="en-US" dirty="0"/>
+              <a:t>Resiliency to rapidly changing code.</a:t>
+            </a:r>
+          </a:p>
+          <a:p>
+            <a:pPr lvl="1"/>
+            <a:r>
+              <a:rPr lang="en-US" dirty="0"/>
+              <a:t>Easy analysis by Spotfire business intelligence tool.</a:t>
+            </a:r>
+          </a:p>
+          <a:p>
+            <a:r>
+              <a:rPr lang="en-US" dirty="0"/>
+              <a:t>End State Design:</a:t>
+            </a:r>
+          </a:p>
+          <a:p>
+            <a:pPr lvl="1"/>
+            <a:r>
+              <a:rPr lang="en-US" dirty="0"/>
+              <a:t>Flat, independent tables.</a:t>
+            </a:r>
+          </a:p>
+          <a:p>
+            <a:pPr lvl="1"/>
+            <a:r>
+              <a:rPr lang="en-US" dirty="0"/>
+              <a:t>Stored procedures as abstraction layers.</a:t>
+            </a:r>
+          </a:p>
+        </p:txBody>
+      </p:sp>
+    </p:spTree>
+    <p:extLst>
+      <p:ext uri="{BB962C8B-B14F-4D97-AF65-F5344CB8AC3E}">
+        <p14:creationId xmlns:p14="http://schemas.microsoft.com/office/powerpoint/2010/main" val="1782137087"/>
+      </p:ext>
+    </p:extLst>
+  </p:cSld>
+  <p:clrMapOvr>
+    <a:masterClrMapping/>
+  </p:clrMapOvr>
+</p:sld>
+</file>
+
+<file path=ppt/slides/slide16.xml><?xml version="1.0" encoding="utf-8"?>
 <p:sld xmlns:a="http://schemas.openxmlformats.org/drawingml/2006/main" xmlns:r="http://schemas.openxmlformats.org/officeDocument/2006/relationships" xmlns:p="http://schemas.openxmlformats.org/presentationml/2006/main">
   <p:cSld>
     <p:spTree>
@@ -45420,7 +45548,7 @@
 </p:sld>
 </file>
 
-<file path=ppt/slides/slide16.xml><?xml version="1.0" encoding="utf-8"?>
+<file path=ppt/slides/slide17.xml><?xml version="1.0" encoding="utf-8"?>
 <p:sld xmlns:a="http://schemas.openxmlformats.org/drawingml/2006/main" xmlns:r="http://schemas.openxmlformats.org/officeDocument/2006/relationships" xmlns:p="http://schemas.openxmlformats.org/presentationml/2006/main">
   <p:cSld>
     <p:spTree>
@@ -45816,7 +45944,7 @@
 </p:sld>
 </file>
 
-<file path=ppt/slides/slide17.xml><?xml version="1.0" encoding="utf-8"?>
+<file path=ppt/slides/slide18.xml><?xml version="1.0" encoding="utf-8"?>
 <p:sld xmlns:a="http://schemas.openxmlformats.org/drawingml/2006/main" xmlns:r="http://schemas.openxmlformats.org/officeDocument/2006/relationships" xmlns:p="http://schemas.openxmlformats.org/presentationml/2006/main">
   <p:cSld>
     <p:spTree>
@@ -46039,7 +46167,7 @@
 </p:sld>
 </file>
 
-<file path=ppt/slides/slide18.xml><?xml version="1.0" encoding="utf-8"?>
+<file path=ppt/slides/slide19.xml><?xml version="1.0" encoding="utf-8"?>
 <p:sld xmlns:a="http://schemas.openxmlformats.org/drawingml/2006/main" xmlns:r="http://schemas.openxmlformats.org/officeDocument/2006/relationships" xmlns:p="http://schemas.openxmlformats.org/presentationml/2006/main">
   <p:cSld>
     <p:spTree>
@@ -48244,13 +48372,7 @@
               <a:rPr lang="en-US" sz="1200" dirty="0">
                 <a:hlinkClick r:id="rId5"/>
               </a:rPr>
-              <a:t>https://</a:t>
-            </a:r>
-            <a:r>
-              <a:rPr lang="en-US" sz="1200" dirty="0">
-                <a:hlinkClick r:id="rId5"/>
-              </a:rPr>
-              <a:t>api.iextrading.com </a:t>
+              <a:t>https://api.iextrading.com </a:t>
             </a:r>
             <a:endParaRPr lang="en-US" sz="1200" dirty="0"/>
           </a:p>

</xml_diff>

<commit_message>
hiding username and password in presentation file.
</commit_message>
<xml_diff>
--- a/Presentation/MSDS_7330_Group_Project_Presentation.pptx
+++ b/Presentation/MSDS_7330_Group_Project_Presentation.pptx
@@ -7084,7 +7084,7 @@
           <a:noFill/>
           <a:extLst>
             <a:ext uri="{909E8E84-426E-40dd-AFC4-6F175D3DCCD1}">
-              <a14:hiddenFill xmlns="" xmlns:a14="http://schemas.microsoft.com/office/drawing/2010/main">
+              <a14:hiddenFill xmlns:a14="http://schemas.microsoft.com/office/drawing/2010/main" xmlns="">
                 <a:solidFill>
                   <a:srgbClr val="FFFFFF"/>
                 </a:solidFill>
@@ -7144,7 +7144,7 @@
             </a:ln>
             <a:extLst>
               <a:ext uri="{91240B29-F687-4f45-9708-019B960494DF}">
-                <a14:hiddenLine xmlns="" xmlns:a14="http://schemas.microsoft.com/office/drawing/2010/main" w="9525">
+                <a14:hiddenLine xmlns:a14="http://schemas.microsoft.com/office/drawing/2010/main" xmlns="" w="9525">
                   <a:solidFill>
                     <a:srgbClr val="000000"/>
                   </a:solidFill>
@@ -7234,7 +7234,7 @@
             </a:ln>
             <a:extLst>
               <a:ext uri="{91240B29-F687-4f45-9708-019B960494DF}">
-                <a14:hiddenLine xmlns="" xmlns:a14="http://schemas.microsoft.com/office/drawing/2010/main" w="9525">
+                <a14:hiddenLine xmlns:a14="http://schemas.microsoft.com/office/drawing/2010/main" xmlns="" w="9525">
                   <a:solidFill>
                     <a:srgbClr val="000000"/>
                   </a:solidFill>
@@ -7324,7 +7324,7 @@
             </a:ln>
             <a:extLst>
               <a:ext uri="{91240B29-F687-4f45-9708-019B960494DF}">
-                <a14:hiddenLine xmlns="" xmlns:a14="http://schemas.microsoft.com/office/drawing/2010/main" w="9525">
+                <a14:hiddenLine xmlns:a14="http://schemas.microsoft.com/office/drawing/2010/main" xmlns="" w="9525">
                   <a:solidFill>
                     <a:srgbClr val="000000"/>
                   </a:solidFill>
@@ -7358,7 +7358,7 @@
             </a:ln>
             <a:extLst>
               <a:ext uri="{91240B29-F687-4f45-9708-019B960494DF}">
-                <a14:hiddenLine xmlns="" xmlns:a14="http://schemas.microsoft.com/office/drawing/2010/main" w="9525">
+                <a14:hiddenLine xmlns:a14="http://schemas.microsoft.com/office/drawing/2010/main" xmlns="" w="9525">
                   <a:solidFill>
                     <a:srgbClr val="000000"/>
                   </a:solidFill>
@@ -7448,7 +7448,7 @@
             </a:ln>
             <a:extLst>
               <a:ext uri="{91240B29-F687-4f45-9708-019B960494DF}">
-                <a14:hiddenLine xmlns="" xmlns:a14="http://schemas.microsoft.com/office/drawing/2010/main" w="9525">
+                <a14:hiddenLine xmlns:a14="http://schemas.microsoft.com/office/drawing/2010/main" xmlns="" w="9525">
                   <a:solidFill>
                     <a:srgbClr val="000000"/>
                   </a:solidFill>
@@ -7510,7 +7510,7 @@
             </a:ln>
             <a:extLst>
               <a:ext uri="{91240B29-F687-4f45-9708-019B960494DF}">
-                <a14:hiddenLine xmlns="" xmlns:a14="http://schemas.microsoft.com/office/drawing/2010/main" w="9525">
+                <a14:hiddenLine xmlns:a14="http://schemas.microsoft.com/office/drawing/2010/main" xmlns="" w="9525">
                   <a:solidFill>
                     <a:srgbClr val="000000"/>
                   </a:solidFill>
@@ -7572,7 +7572,7 @@
             </a:ln>
             <a:extLst>
               <a:ext uri="{91240B29-F687-4f45-9708-019B960494DF}">
-                <a14:hiddenLine xmlns="" xmlns:a14="http://schemas.microsoft.com/office/drawing/2010/main" w="9525">
+                <a14:hiddenLine xmlns:a14="http://schemas.microsoft.com/office/drawing/2010/main" xmlns="" w="9525">
                   <a:solidFill>
                     <a:srgbClr val="000000"/>
                   </a:solidFill>
@@ -7662,7 +7662,7 @@
             </a:ln>
             <a:extLst>
               <a:ext uri="{91240B29-F687-4f45-9708-019B960494DF}">
-                <a14:hiddenLine xmlns="" xmlns:a14="http://schemas.microsoft.com/office/drawing/2010/main" w="9525">
+                <a14:hiddenLine xmlns:a14="http://schemas.microsoft.com/office/drawing/2010/main" xmlns="" w="9525">
                   <a:solidFill>
                     <a:srgbClr val="000000"/>
                   </a:solidFill>
@@ -7724,7 +7724,7 @@
             </a:ln>
             <a:extLst>
               <a:ext uri="{91240B29-F687-4f45-9708-019B960494DF}">
-                <a14:hiddenLine xmlns="" xmlns:a14="http://schemas.microsoft.com/office/drawing/2010/main" w="9525">
+                <a14:hiddenLine xmlns:a14="http://schemas.microsoft.com/office/drawing/2010/main" xmlns="" w="9525">
                   <a:solidFill>
                     <a:srgbClr val="000000"/>
                   </a:solidFill>
@@ -7786,7 +7786,7 @@
             </a:ln>
             <a:extLst>
               <a:ext uri="{91240B29-F687-4f45-9708-019B960494DF}">
-                <a14:hiddenLine xmlns="" xmlns:a14="http://schemas.microsoft.com/office/drawing/2010/main" w="9525">
+                <a14:hiddenLine xmlns:a14="http://schemas.microsoft.com/office/drawing/2010/main" xmlns="" w="9525">
                   <a:solidFill>
                     <a:srgbClr val="000000"/>
                   </a:solidFill>
@@ -7876,7 +7876,7 @@
             </a:ln>
             <a:extLst>
               <a:ext uri="{91240B29-F687-4f45-9708-019B960494DF}">
-                <a14:hiddenLine xmlns="" xmlns:a14="http://schemas.microsoft.com/office/drawing/2010/main" w="9525">
+                <a14:hiddenLine xmlns:a14="http://schemas.microsoft.com/office/drawing/2010/main" xmlns="" w="9525">
                   <a:solidFill>
                     <a:srgbClr val="000000"/>
                   </a:solidFill>
@@ -7966,7 +7966,7 @@
             </a:ln>
             <a:extLst>
               <a:ext uri="{91240B29-F687-4f45-9708-019B960494DF}">
-                <a14:hiddenLine xmlns="" xmlns:a14="http://schemas.microsoft.com/office/drawing/2010/main" w="9525">
+                <a14:hiddenLine xmlns:a14="http://schemas.microsoft.com/office/drawing/2010/main" xmlns="" w="9525">
                   <a:solidFill>
                     <a:srgbClr val="000000"/>
                   </a:solidFill>
@@ -8028,7 +8028,7 @@
             </a:ln>
             <a:extLst>
               <a:ext uri="{91240B29-F687-4f45-9708-019B960494DF}">
-                <a14:hiddenLine xmlns="" xmlns:a14="http://schemas.microsoft.com/office/drawing/2010/main" w="9525">
+                <a14:hiddenLine xmlns:a14="http://schemas.microsoft.com/office/drawing/2010/main" xmlns="" w="9525">
                   <a:solidFill>
                     <a:srgbClr val="000000"/>
                   </a:solidFill>
@@ -8138,7 +8138,7 @@
             </a:ln>
             <a:extLst>
               <a:ext uri="{91240B29-F687-4f45-9708-019B960494DF}">
-                <a14:hiddenLine xmlns="" xmlns:a14="http://schemas.microsoft.com/office/drawing/2010/main" w="9525">
+                <a14:hiddenLine xmlns:a14="http://schemas.microsoft.com/office/drawing/2010/main" xmlns="" w="9525">
                   <a:solidFill>
                     <a:srgbClr val="000000"/>
                   </a:solidFill>
@@ -8200,7 +8200,7 @@
             </a:ln>
             <a:extLst>
               <a:ext uri="{91240B29-F687-4f45-9708-019B960494DF}">
-                <a14:hiddenLine xmlns="" xmlns:a14="http://schemas.microsoft.com/office/drawing/2010/main" w="9525">
+                <a14:hiddenLine xmlns:a14="http://schemas.microsoft.com/office/drawing/2010/main" xmlns="" w="9525">
                   <a:solidFill>
                     <a:srgbClr val="000000"/>
                   </a:solidFill>
@@ -8290,7 +8290,7 @@
             </a:ln>
             <a:extLst>
               <a:ext uri="{91240B29-F687-4f45-9708-019B960494DF}">
-                <a14:hiddenLine xmlns="" xmlns:a14="http://schemas.microsoft.com/office/drawing/2010/main" w="9525">
+                <a14:hiddenLine xmlns:a14="http://schemas.microsoft.com/office/drawing/2010/main" xmlns="" w="9525">
                   <a:solidFill>
                     <a:srgbClr val="000000"/>
                   </a:solidFill>
@@ -8380,7 +8380,7 @@
             </a:ln>
             <a:extLst>
               <a:ext uri="{91240B29-F687-4f45-9708-019B960494DF}">
-                <a14:hiddenLine xmlns="" xmlns:a14="http://schemas.microsoft.com/office/drawing/2010/main" w="9525">
+                <a14:hiddenLine xmlns:a14="http://schemas.microsoft.com/office/drawing/2010/main" xmlns="" w="9525">
                   <a:solidFill>
                     <a:srgbClr val="000000"/>
                   </a:solidFill>
@@ -8442,7 +8442,7 @@
             </a:ln>
             <a:extLst>
               <a:ext uri="{91240B29-F687-4f45-9708-019B960494DF}">
-                <a14:hiddenLine xmlns="" xmlns:a14="http://schemas.microsoft.com/office/drawing/2010/main" w="9525">
+                <a14:hiddenLine xmlns:a14="http://schemas.microsoft.com/office/drawing/2010/main" xmlns="" w="9525">
                   <a:solidFill>
                     <a:srgbClr val="000000"/>
                   </a:solidFill>
@@ -8532,7 +8532,7 @@
             </a:ln>
             <a:extLst>
               <a:ext uri="{91240B29-F687-4f45-9708-019B960494DF}">
-                <a14:hiddenLine xmlns="" xmlns:a14="http://schemas.microsoft.com/office/drawing/2010/main" w="9525">
+                <a14:hiddenLine xmlns:a14="http://schemas.microsoft.com/office/drawing/2010/main" xmlns="" w="9525">
                   <a:solidFill>
                     <a:srgbClr val="000000"/>
                   </a:solidFill>
@@ -8622,7 +8622,7 @@
             </a:ln>
             <a:extLst>
               <a:ext uri="{91240B29-F687-4f45-9708-019B960494DF}">
-                <a14:hiddenLine xmlns="" xmlns:a14="http://schemas.microsoft.com/office/drawing/2010/main" w="9525">
+                <a14:hiddenLine xmlns:a14="http://schemas.microsoft.com/office/drawing/2010/main" xmlns="" w="9525">
                   <a:solidFill>
                     <a:srgbClr val="000000"/>
                   </a:solidFill>
@@ -8678,7 +8678,7 @@
             </a:ln>
             <a:extLst>
               <a:ext uri="{91240B29-F687-4f45-9708-019B960494DF}">
-                <a14:hiddenLine xmlns="" xmlns:a14="http://schemas.microsoft.com/office/drawing/2010/main" w="9525">
+                <a14:hiddenLine xmlns:a14="http://schemas.microsoft.com/office/drawing/2010/main" xmlns="" w="9525">
                   <a:solidFill>
                     <a:srgbClr val="000000"/>
                   </a:solidFill>
@@ -8768,7 +8768,7 @@
             </a:ln>
             <a:extLst>
               <a:ext uri="{91240B29-F687-4f45-9708-019B960494DF}">
-                <a14:hiddenLine xmlns="" xmlns:a14="http://schemas.microsoft.com/office/drawing/2010/main" w="9525">
+                <a14:hiddenLine xmlns:a14="http://schemas.microsoft.com/office/drawing/2010/main" xmlns="" w="9525">
                   <a:solidFill>
                     <a:srgbClr val="000000"/>
                   </a:solidFill>
@@ -8824,7 +8824,7 @@
             </a:ln>
             <a:extLst>
               <a:ext uri="{91240B29-F687-4f45-9708-019B960494DF}">
-                <a14:hiddenLine xmlns="" xmlns:a14="http://schemas.microsoft.com/office/drawing/2010/main" w="9525">
+                <a14:hiddenLine xmlns:a14="http://schemas.microsoft.com/office/drawing/2010/main" xmlns="" w="9525">
                   <a:solidFill>
                     <a:srgbClr val="000000"/>
                   </a:solidFill>
@@ -8914,7 +8914,7 @@
             </a:ln>
             <a:extLst>
               <a:ext uri="{91240B29-F687-4f45-9708-019B960494DF}">
-                <a14:hiddenLine xmlns="" xmlns:a14="http://schemas.microsoft.com/office/drawing/2010/main" w="9525">
+                <a14:hiddenLine xmlns:a14="http://schemas.microsoft.com/office/drawing/2010/main" xmlns="" w="9525">
                   <a:solidFill>
                     <a:srgbClr val="000000"/>
                   </a:solidFill>
@@ -8982,7 +8982,7 @@
             </a:ln>
             <a:extLst>
               <a:ext uri="{91240B29-F687-4f45-9708-019B960494DF}">
-                <a14:hiddenLine xmlns="" xmlns:a14="http://schemas.microsoft.com/office/drawing/2010/main" w="9525">
+                <a14:hiddenLine xmlns:a14="http://schemas.microsoft.com/office/drawing/2010/main" xmlns="" w="9525">
                   <a:solidFill>
                     <a:srgbClr val="000000"/>
                   </a:solidFill>
@@ -9072,7 +9072,7 @@
             </a:ln>
             <a:extLst>
               <a:ext uri="{91240B29-F687-4f45-9708-019B960494DF}">
-                <a14:hiddenLine xmlns="" xmlns:a14="http://schemas.microsoft.com/office/drawing/2010/main" w="9525">
+                <a14:hiddenLine xmlns:a14="http://schemas.microsoft.com/office/drawing/2010/main" xmlns="" w="9525">
                   <a:solidFill>
                     <a:srgbClr val="000000"/>
                   </a:solidFill>
@@ -9140,7 +9140,7 @@
             </a:ln>
             <a:extLst>
               <a:ext uri="{91240B29-F687-4f45-9708-019B960494DF}">
-                <a14:hiddenLine xmlns="" xmlns:a14="http://schemas.microsoft.com/office/drawing/2010/main" w="9525">
+                <a14:hiddenLine xmlns:a14="http://schemas.microsoft.com/office/drawing/2010/main" xmlns="" w="9525">
                   <a:solidFill>
                     <a:srgbClr val="000000"/>
                   </a:solidFill>
@@ -9230,7 +9230,7 @@
             </a:ln>
             <a:extLst>
               <a:ext uri="{91240B29-F687-4f45-9708-019B960494DF}">
-                <a14:hiddenLine xmlns="" xmlns:a14="http://schemas.microsoft.com/office/drawing/2010/main" w="9525">
+                <a14:hiddenLine xmlns:a14="http://schemas.microsoft.com/office/drawing/2010/main" xmlns="" w="9525">
                   <a:solidFill>
                     <a:srgbClr val="000000"/>
                   </a:solidFill>
@@ -9264,7 +9264,7 @@
             </a:ln>
             <a:extLst>
               <a:ext uri="{91240B29-F687-4f45-9708-019B960494DF}">
-                <a14:hiddenLine xmlns="" xmlns:a14="http://schemas.microsoft.com/office/drawing/2010/main" w="9525">
+                <a14:hiddenLine xmlns:a14="http://schemas.microsoft.com/office/drawing/2010/main" xmlns="" w="9525">
                   <a:solidFill>
                     <a:srgbClr val="000000"/>
                   </a:solidFill>
@@ -9354,7 +9354,7 @@
             </a:ln>
             <a:extLst>
               <a:ext uri="{91240B29-F687-4f45-9708-019B960494DF}">
-                <a14:hiddenLine xmlns="" xmlns:a14="http://schemas.microsoft.com/office/drawing/2010/main" w="9525">
+                <a14:hiddenLine xmlns:a14="http://schemas.microsoft.com/office/drawing/2010/main" xmlns="" w="9525">
                   <a:solidFill>
                     <a:srgbClr val="000000"/>
                   </a:solidFill>
@@ -9416,7 +9416,7 @@
             </a:ln>
             <a:extLst>
               <a:ext uri="{91240B29-F687-4f45-9708-019B960494DF}">
-                <a14:hiddenLine xmlns="" xmlns:a14="http://schemas.microsoft.com/office/drawing/2010/main" w="9525">
+                <a14:hiddenLine xmlns:a14="http://schemas.microsoft.com/office/drawing/2010/main" xmlns="" w="9525">
                   <a:solidFill>
                     <a:srgbClr val="000000"/>
                   </a:solidFill>
@@ -9478,7 +9478,7 @@
             </a:ln>
             <a:extLst>
               <a:ext uri="{91240B29-F687-4f45-9708-019B960494DF}">
-                <a14:hiddenLine xmlns="" xmlns:a14="http://schemas.microsoft.com/office/drawing/2010/main" w="9525">
+                <a14:hiddenLine xmlns:a14="http://schemas.microsoft.com/office/drawing/2010/main" xmlns="" w="9525">
                   <a:solidFill>
                     <a:srgbClr val="000000"/>
                   </a:solidFill>
@@ -9568,7 +9568,7 @@
             </a:ln>
             <a:extLst>
               <a:ext uri="{91240B29-F687-4f45-9708-019B960494DF}">
-                <a14:hiddenLine xmlns="" xmlns:a14="http://schemas.microsoft.com/office/drawing/2010/main" w="9525">
+                <a14:hiddenLine xmlns:a14="http://schemas.microsoft.com/office/drawing/2010/main" xmlns="" w="9525">
                   <a:solidFill>
                     <a:srgbClr val="000000"/>
                   </a:solidFill>
@@ -9636,7 +9636,7 @@
             </a:ln>
             <a:extLst>
               <a:ext uri="{91240B29-F687-4f45-9708-019B960494DF}">
-                <a14:hiddenLine xmlns="" xmlns:a14="http://schemas.microsoft.com/office/drawing/2010/main" w="9525">
+                <a14:hiddenLine xmlns:a14="http://schemas.microsoft.com/office/drawing/2010/main" xmlns="" w="9525">
                   <a:solidFill>
                     <a:srgbClr val="000000"/>
                   </a:solidFill>
@@ -9698,7 +9698,7 @@
             </a:ln>
             <a:extLst>
               <a:ext uri="{91240B29-F687-4f45-9708-019B960494DF}">
-                <a14:hiddenLine xmlns="" xmlns:a14="http://schemas.microsoft.com/office/drawing/2010/main" w="9525">
+                <a14:hiddenLine xmlns:a14="http://schemas.microsoft.com/office/drawing/2010/main" xmlns="" w="9525">
                   <a:solidFill>
                     <a:srgbClr val="000000"/>
                   </a:solidFill>
@@ -9788,7 +9788,7 @@
             </a:ln>
             <a:extLst>
               <a:ext uri="{91240B29-F687-4f45-9708-019B960494DF}">
-                <a14:hiddenLine xmlns="" xmlns:a14="http://schemas.microsoft.com/office/drawing/2010/main" w="9525">
+                <a14:hiddenLine xmlns:a14="http://schemas.microsoft.com/office/drawing/2010/main" xmlns="" w="9525">
                   <a:solidFill>
                     <a:srgbClr val="000000"/>
                   </a:solidFill>
@@ -9850,7 +9850,7 @@
             </a:ln>
             <a:extLst>
               <a:ext uri="{91240B29-F687-4f45-9708-019B960494DF}">
-                <a14:hiddenLine xmlns="" xmlns:a14="http://schemas.microsoft.com/office/drawing/2010/main" w="9525">
+                <a14:hiddenLine xmlns:a14="http://schemas.microsoft.com/office/drawing/2010/main" xmlns="" w="9525">
                   <a:solidFill>
                     <a:srgbClr val="000000"/>
                   </a:solidFill>
@@ -9940,7 +9940,7 @@
             </a:ln>
             <a:extLst>
               <a:ext uri="{91240B29-F687-4f45-9708-019B960494DF}">
-                <a14:hiddenLine xmlns="" xmlns:a14="http://schemas.microsoft.com/office/drawing/2010/main" w="9525">
+                <a14:hiddenLine xmlns:a14="http://schemas.microsoft.com/office/drawing/2010/main" xmlns="" w="9525">
                   <a:solidFill>
                     <a:srgbClr val="000000"/>
                   </a:solidFill>
@@ -10002,7 +10002,7 @@
             </a:ln>
             <a:extLst>
               <a:ext uri="{91240B29-F687-4f45-9708-019B960494DF}">
-                <a14:hiddenLine xmlns="" xmlns:a14="http://schemas.microsoft.com/office/drawing/2010/main" w="9525">
+                <a14:hiddenLine xmlns:a14="http://schemas.microsoft.com/office/drawing/2010/main" xmlns="" w="9525">
                   <a:solidFill>
                     <a:srgbClr val="000000"/>
                   </a:solidFill>
@@ -10092,7 +10092,7 @@
             </a:ln>
             <a:extLst>
               <a:ext uri="{91240B29-F687-4f45-9708-019B960494DF}">
-                <a14:hiddenLine xmlns="" xmlns:a14="http://schemas.microsoft.com/office/drawing/2010/main" w="9525">
+                <a14:hiddenLine xmlns:a14="http://schemas.microsoft.com/office/drawing/2010/main" xmlns="" w="9525">
                   <a:solidFill>
                     <a:srgbClr val="000000"/>
                   </a:solidFill>
@@ -10126,7 +10126,7 @@
             </a:ln>
             <a:extLst>
               <a:ext uri="{91240B29-F687-4f45-9708-019B960494DF}">
-                <a14:hiddenLine xmlns="" xmlns:a14="http://schemas.microsoft.com/office/drawing/2010/main" w="9525">
+                <a14:hiddenLine xmlns:a14="http://schemas.microsoft.com/office/drawing/2010/main" xmlns="" w="9525">
                   <a:solidFill>
                     <a:srgbClr val="000000"/>
                   </a:solidFill>
@@ -10191,7 +10191,7 @@
             </a:ln>
             <a:extLst>
               <a:ext uri="{91240B29-F687-4f45-9708-019B960494DF}">
-                <a14:hiddenLine xmlns="" xmlns:a14="http://schemas.microsoft.com/office/drawing/2010/main" w="9525">
+                <a14:hiddenLine xmlns:a14="http://schemas.microsoft.com/office/drawing/2010/main" xmlns="" w="9525">
                   <a:solidFill>
                     <a:srgbClr val="000000"/>
                   </a:solidFill>
@@ -10281,7 +10281,7 @@
             </a:ln>
             <a:extLst>
               <a:ext uri="{91240B29-F687-4f45-9708-019B960494DF}">
-                <a14:hiddenLine xmlns="" xmlns:a14="http://schemas.microsoft.com/office/drawing/2010/main" w="9525">
+                <a14:hiddenLine xmlns:a14="http://schemas.microsoft.com/office/drawing/2010/main" xmlns="" w="9525">
                   <a:solidFill>
                     <a:srgbClr val="000000"/>
                   </a:solidFill>
@@ -10343,7 +10343,7 @@
             </a:ln>
             <a:extLst>
               <a:ext uri="{91240B29-F687-4f45-9708-019B960494DF}">
-                <a14:hiddenLine xmlns="" xmlns:a14="http://schemas.microsoft.com/office/drawing/2010/main" w="9525">
+                <a14:hiddenLine xmlns:a14="http://schemas.microsoft.com/office/drawing/2010/main" xmlns="" w="9525">
                   <a:solidFill>
                     <a:srgbClr val="000000"/>
                   </a:solidFill>
@@ -10433,7 +10433,7 @@
             </a:ln>
             <a:extLst>
               <a:ext uri="{91240B29-F687-4f45-9708-019B960494DF}">
-                <a14:hiddenLine xmlns="" xmlns:a14="http://schemas.microsoft.com/office/drawing/2010/main" w="9525">
+                <a14:hiddenLine xmlns:a14="http://schemas.microsoft.com/office/drawing/2010/main" xmlns="" w="9525">
                   <a:solidFill>
                     <a:srgbClr val="000000"/>
                   </a:solidFill>
@@ -10523,7 +10523,7 @@
             </a:ln>
             <a:extLst>
               <a:ext uri="{91240B29-F687-4f45-9708-019B960494DF}">
-                <a14:hiddenLine xmlns="" xmlns:a14="http://schemas.microsoft.com/office/drawing/2010/main" w="9525">
+                <a14:hiddenLine xmlns:a14="http://schemas.microsoft.com/office/drawing/2010/main" xmlns="" w="9525">
                   <a:solidFill>
                     <a:srgbClr val="000000"/>
                   </a:solidFill>
@@ -10588,7 +10588,7 @@
             </a:ln>
             <a:extLst>
               <a:ext uri="{91240B29-F687-4f45-9708-019B960494DF}">
-                <a14:hiddenLine xmlns="" xmlns:a14="http://schemas.microsoft.com/office/drawing/2010/main" w="9525">
+                <a14:hiddenLine xmlns:a14="http://schemas.microsoft.com/office/drawing/2010/main" xmlns="" w="9525">
                   <a:solidFill>
                     <a:srgbClr val="000000"/>
                   </a:solidFill>
@@ -10650,7 +10650,7 @@
             </a:ln>
             <a:extLst>
               <a:ext uri="{91240B29-F687-4f45-9708-019B960494DF}">
-                <a14:hiddenLine xmlns="" xmlns:a14="http://schemas.microsoft.com/office/drawing/2010/main" w="9525">
+                <a14:hiddenLine xmlns:a14="http://schemas.microsoft.com/office/drawing/2010/main" xmlns="" w="9525">
                   <a:solidFill>
                     <a:srgbClr val="000000"/>
                   </a:solidFill>
@@ -10740,7 +10740,7 @@
             </a:ln>
             <a:extLst>
               <a:ext uri="{91240B29-F687-4f45-9708-019B960494DF}">
-                <a14:hiddenLine xmlns="" xmlns:a14="http://schemas.microsoft.com/office/drawing/2010/main" w="9525">
+                <a14:hiddenLine xmlns:a14="http://schemas.microsoft.com/office/drawing/2010/main" xmlns="" w="9525">
                   <a:solidFill>
                     <a:srgbClr val="000000"/>
                   </a:solidFill>
@@ -10830,7 +10830,7 @@
             </a:ln>
             <a:extLst>
               <a:ext uri="{91240B29-F687-4f45-9708-019B960494DF}">
-                <a14:hiddenLine xmlns="" xmlns:a14="http://schemas.microsoft.com/office/drawing/2010/main" w="9525">
+                <a14:hiddenLine xmlns:a14="http://schemas.microsoft.com/office/drawing/2010/main" xmlns="" w="9525">
                   <a:solidFill>
                     <a:srgbClr val="000000"/>
                   </a:solidFill>
@@ -10892,7 +10892,7 @@
             </a:ln>
             <a:extLst>
               <a:ext uri="{91240B29-F687-4f45-9708-019B960494DF}">
-                <a14:hiddenLine xmlns="" xmlns:a14="http://schemas.microsoft.com/office/drawing/2010/main" w="9525">
+                <a14:hiddenLine xmlns:a14="http://schemas.microsoft.com/office/drawing/2010/main" xmlns="" w="9525">
                   <a:solidFill>
                     <a:srgbClr val="000000"/>
                   </a:solidFill>
@@ -11012,7 +11012,7 @@
             </a:ln>
             <a:extLst>
               <a:ext uri="{91240B29-F687-4f45-9708-019B960494DF}">
-                <a14:hiddenLine xmlns="" xmlns:a14="http://schemas.microsoft.com/office/drawing/2010/main" w="9525">
+                <a14:hiddenLine xmlns:a14="http://schemas.microsoft.com/office/drawing/2010/main" xmlns="" w="9525">
                   <a:solidFill>
                     <a:srgbClr val="000000"/>
                   </a:solidFill>
@@ -11080,7 +11080,7 @@
             </a:ln>
             <a:extLst>
               <a:ext uri="{91240B29-F687-4f45-9708-019B960494DF}">
-                <a14:hiddenLine xmlns="" xmlns:a14="http://schemas.microsoft.com/office/drawing/2010/main" w="9525">
+                <a14:hiddenLine xmlns:a14="http://schemas.microsoft.com/office/drawing/2010/main" xmlns="" w="9525">
                   <a:solidFill>
                     <a:srgbClr val="000000"/>
                   </a:solidFill>
@@ -11170,7 +11170,7 @@
             </a:ln>
             <a:extLst>
               <a:ext uri="{91240B29-F687-4f45-9708-019B960494DF}">
-                <a14:hiddenLine xmlns="" xmlns:a14="http://schemas.microsoft.com/office/drawing/2010/main" w="9525">
+                <a14:hiddenLine xmlns:a14="http://schemas.microsoft.com/office/drawing/2010/main" xmlns="" w="9525">
                   <a:solidFill>
                     <a:srgbClr val="000000"/>
                   </a:solidFill>
@@ -15892,7 +15892,7 @@
           <a:noFill/>
           <a:extLst>
             <a:ext uri="{909E8E84-426E-40dd-AFC4-6F175D3DCCD1}">
-              <a14:hiddenFill xmlns="" xmlns:a14="http://schemas.microsoft.com/office/drawing/2010/main">
+              <a14:hiddenFill xmlns:a14="http://schemas.microsoft.com/office/drawing/2010/main" xmlns="">
                 <a:solidFill>
                   <a:srgbClr val="FFFFFF"/>
                 </a:solidFill>
@@ -15966,7 +15966,7 @@
               </a:ln>
               <a:extLst>
                 <a:ext uri="{91240B29-F687-4f45-9708-019B960494DF}">
-                  <a14:hiddenLine xmlns="" xmlns:a14="http://schemas.microsoft.com/office/drawing/2010/main" w="9525">
+                  <a14:hiddenLine xmlns:a14="http://schemas.microsoft.com/office/drawing/2010/main" xmlns="" w="9525">
                     <a:solidFill>
                       <a:srgbClr val="000000"/>
                     </a:solidFill>
@@ -16056,7 +16056,7 @@
               </a:ln>
               <a:extLst>
                 <a:ext uri="{91240B29-F687-4f45-9708-019B960494DF}">
-                  <a14:hiddenLine xmlns="" xmlns:a14="http://schemas.microsoft.com/office/drawing/2010/main" w="9525">
+                  <a14:hiddenLine xmlns:a14="http://schemas.microsoft.com/office/drawing/2010/main" xmlns="" w="9525">
                     <a:solidFill>
                       <a:srgbClr val="000000"/>
                     </a:solidFill>
@@ -16146,7 +16146,7 @@
               </a:ln>
               <a:extLst>
                 <a:ext uri="{91240B29-F687-4f45-9708-019B960494DF}">
-                  <a14:hiddenLine xmlns="" xmlns:a14="http://schemas.microsoft.com/office/drawing/2010/main" w="9525">
+                  <a14:hiddenLine xmlns:a14="http://schemas.microsoft.com/office/drawing/2010/main" xmlns="" w="9525">
                     <a:solidFill>
                       <a:srgbClr val="000000"/>
                     </a:solidFill>
@@ -16208,7 +16208,7 @@
               </a:ln>
               <a:extLst>
                 <a:ext uri="{91240B29-F687-4f45-9708-019B960494DF}">
-                  <a14:hiddenLine xmlns="" xmlns:a14="http://schemas.microsoft.com/office/drawing/2010/main" w="9525">
+                  <a14:hiddenLine xmlns:a14="http://schemas.microsoft.com/office/drawing/2010/main" xmlns="" w="9525">
                     <a:solidFill>
                       <a:srgbClr val="000000"/>
                     </a:solidFill>
@@ -16298,7 +16298,7 @@
               </a:ln>
               <a:extLst>
                 <a:ext uri="{91240B29-F687-4f45-9708-019B960494DF}">
-                  <a14:hiddenLine xmlns="" xmlns:a14="http://schemas.microsoft.com/office/drawing/2010/main" w="9525">
+                  <a14:hiddenLine xmlns:a14="http://schemas.microsoft.com/office/drawing/2010/main" xmlns="" w="9525">
                     <a:solidFill>
                       <a:srgbClr val="000000"/>
                     </a:solidFill>
@@ -16360,7 +16360,7 @@
               </a:ln>
               <a:extLst>
                 <a:ext uri="{91240B29-F687-4f45-9708-019B960494DF}">
-                  <a14:hiddenLine xmlns="" xmlns:a14="http://schemas.microsoft.com/office/drawing/2010/main" w="9525">
+                  <a14:hiddenLine xmlns:a14="http://schemas.microsoft.com/office/drawing/2010/main" xmlns="" w="9525">
                     <a:solidFill>
                       <a:srgbClr val="000000"/>
                     </a:solidFill>
@@ -16422,7 +16422,7 @@
               </a:ln>
               <a:extLst>
                 <a:ext uri="{91240B29-F687-4f45-9708-019B960494DF}">
-                  <a14:hiddenLine xmlns="" xmlns:a14="http://schemas.microsoft.com/office/drawing/2010/main" w="9525">
+                  <a14:hiddenLine xmlns:a14="http://schemas.microsoft.com/office/drawing/2010/main" xmlns="" w="9525">
                     <a:solidFill>
                       <a:srgbClr val="000000"/>
                     </a:solidFill>
@@ -16512,7 +16512,7 @@
               </a:ln>
               <a:extLst>
                 <a:ext uri="{91240B29-F687-4f45-9708-019B960494DF}">
-                  <a14:hiddenLine xmlns="" xmlns:a14="http://schemas.microsoft.com/office/drawing/2010/main" w="9525">
+                  <a14:hiddenLine xmlns:a14="http://schemas.microsoft.com/office/drawing/2010/main" xmlns="" w="9525">
                     <a:solidFill>
                       <a:srgbClr val="000000"/>
                     </a:solidFill>
@@ -16602,7 +16602,7 @@
               </a:ln>
               <a:extLst>
                 <a:ext uri="{91240B29-F687-4f45-9708-019B960494DF}">
-                  <a14:hiddenLine xmlns="" xmlns:a14="http://schemas.microsoft.com/office/drawing/2010/main" w="9525">
+                  <a14:hiddenLine xmlns:a14="http://schemas.microsoft.com/office/drawing/2010/main" xmlns="" w="9525">
                     <a:solidFill>
                       <a:srgbClr val="000000"/>
                     </a:solidFill>
@@ -16664,7 +16664,7 @@
               </a:ln>
               <a:extLst>
                 <a:ext uri="{91240B29-F687-4f45-9708-019B960494DF}">
-                  <a14:hiddenLine xmlns="" xmlns:a14="http://schemas.microsoft.com/office/drawing/2010/main" w="9525">
+                  <a14:hiddenLine xmlns:a14="http://schemas.microsoft.com/office/drawing/2010/main" xmlns="" w="9525">
                     <a:solidFill>
                       <a:srgbClr val="000000"/>
                     </a:solidFill>
@@ -16774,7 +16774,7 @@
               </a:ln>
               <a:extLst>
                 <a:ext uri="{91240B29-F687-4f45-9708-019B960494DF}">
-                  <a14:hiddenLine xmlns="" xmlns:a14="http://schemas.microsoft.com/office/drawing/2010/main" w="9525">
+                  <a14:hiddenLine xmlns:a14="http://schemas.microsoft.com/office/drawing/2010/main" xmlns="" w="9525">
                     <a:solidFill>
                       <a:srgbClr val="000000"/>
                     </a:solidFill>
@@ -16858,7 +16858,7 @@
               </a:ln>
               <a:extLst>
                 <a:ext uri="{91240B29-F687-4f45-9708-019B960494DF}">
-                  <a14:hiddenLine xmlns="" xmlns:a14="http://schemas.microsoft.com/office/drawing/2010/main" w="9525">
+                  <a14:hiddenLine xmlns:a14="http://schemas.microsoft.com/office/drawing/2010/main" xmlns="" w="9525">
                     <a:solidFill>
                       <a:srgbClr val="000000"/>
                     </a:solidFill>
@@ -16920,7 +16920,7 @@
               </a:ln>
               <a:extLst>
                 <a:ext uri="{91240B29-F687-4f45-9708-019B960494DF}">
-                  <a14:hiddenLine xmlns="" xmlns:a14="http://schemas.microsoft.com/office/drawing/2010/main" w="9525">
+                  <a14:hiddenLine xmlns:a14="http://schemas.microsoft.com/office/drawing/2010/main" xmlns="" w="9525">
                     <a:solidFill>
                       <a:srgbClr val="000000"/>
                     </a:solidFill>
@@ -16982,7 +16982,7 @@
               </a:ln>
               <a:extLst>
                 <a:ext uri="{91240B29-F687-4f45-9708-019B960494DF}">
-                  <a14:hiddenLine xmlns="" xmlns:a14="http://schemas.microsoft.com/office/drawing/2010/main" w="9525">
+                  <a14:hiddenLine xmlns:a14="http://schemas.microsoft.com/office/drawing/2010/main" xmlns="" w="9525">
                     <a:solidFill>
                       <a:srgbClr val="000000"/>
                     </a:solidFill>
@@ -17072,7 +17072,7 @@
               </a:ln>
               <a:extLst>
                 <a:ext uri="{91240B29-F687-4f45-9708-019B960494DF}">
-                  <a14:hiddenLine xmlns="" xmlns:a14="http://schemas.microsoft.com/office/drawing/2010/main" w="9525">
+                  <a14:hiddenLine xmlns:a14="http://schemas.microsoft.com/office/drawing/2010/main" xmlns="" w="9525">
                     <a:solidFill>
                       <a:srgbClr val="000000"/>
                     </a:solidFill>
@@ -17106,7 +17106,7 @@
               </a:ln>
               <a:extLst>
                 <a:ext uri="{91240B29-F687-4f45-9708-019B960494DF}">
-                  <a14:hiddenLine xmlns="" xmlns:a14="http://schemas.microsoft.com/office/drawing/2010/main" w="9525">
+                  <a14:hiddenLine xmlns:a14="http://schemas.microsoft.com/office/drawing/2010/main" xmlns="" w="9525">
                     <a:solidFill>
                       <a:srgbClr val="000000"/>
                     </a:solidFill>
@@ -17171,7 +17171,7 @@
               </a:ln>
               <a:extLst>
                 <a:ext uri="{91240B29-F687-4f45-9708-019B960494DF}">
-                  <a14:hiddenLine xmlns="" xmlns:a14="http://schemas.microsoft.com/office/drawing/2010/main" w="9525">
+                  <a14:hiddenLine xmlns:a14="http://schemas.microsoft.com/office/drawing/2010/main" xmlns="" w="9525">
                     <a:solidFill>
                       <a:srgbClr val="000000"/>
                     </a:solidFill>
@@ -17261,7 +17261,7 @@
               </a:ln>
               <a:extLst>
                 <a:ext uri="{91240B29-F687-4f45-9708-019B960494DF}">
-                  <a14:hiddenLine xmlns="" xmlns:a14="http://schemas.microsoft.com/office/drawing/2010/main" w="9525">
+                  <a14:hiddenLine xmlns:a14="http://schemas.microsoft.com/office/drawing/2010/main" xmlns="" w="9525">
                     <a:solidFill>
                       <a:srgbClr val="000000"/>
                     </a:solidFill>
@@ -17323,7 +17323,7 @@
               </a:ln>
               <a:extLst>
                 <a:ext uri="{91240B29-F687-4f45-9708-019B960494DF}">
-                  <a14:hiddenLine xmlns="" xmlns:a14="http://schemas.microsoft.com/office/drawing/2010/main" w="9525">
+                  <a14:hiddenLine xmlns:a14="http://schemas.microsoft.com/office/drawing/2010/main" xmlns="" w="9525">
                     <a:solidFill>
                       <a:srgbClr val="000000"/>
                     </a:solidFill>
@@ -17413,7 +17413,7 @@
               </a:ln>
               <a:extLst>
                 <a:ext uri="{91240B29-F687-4f45-9708-019B960494DF}">
-                  <a14:hiddenLine xmlns="" xmlns:a14="http://schemas.microsoft.com/office/drawing/2010/main" w="9525">
+                  <a14:hiddenLine xmlns:a14="http://schemas.microsoft.com/office/drawing/2010/main" xmlns="" w="9525">
                     <a:solidFill>
                       <a:srgbClr val="000000"/>
                     </a:solidFill>
@@ -17478,7 +17478,7 @@
               </a:ln>
               <a:extLst>
                 <a:ext uri="{91240B29-F687-4f45-9708-019B960494DF}">
-                  <a14:hiddenLine xmlns="" xmlns:a14="http://schemas.microsoft.com/office/drawing/2010/main" w="9525">
+                  <a14:hiddenLine xmlns:a14="http://schemas.microsoft.com/office/drawing/2010/main" xmlns="" w="9525">
                     <a:solidFill>
                       <a:srgbClr val="000000"/>
                     </a:solidFill>
@@ -17540,7 +17540,7 @@
               </a:ln>
               <a:extLst>
                 <a:ext uri="{91240B29-F687-4f45-9708-019B960494DF}">
-                  <a14:hiddenLine xmlns="" xmlns:a14="http://schemas.microsoft.com/office/drawing/2010/main" w="9525">
+                  <a14:hiddenLine xmlns:a14="http://schemas.microsoft.com/office/drawing/2010/main" xmlns="" w="9525">
                     <a:solidFill>
                       <a:srgbClr val="000000"/>
                     </a:solidFill>
@@ -17630,7 +17630,7 @@
               </a:ln>
               <a:extLst>
                 <a:ext uri="{91240B29-F687-4f45-9708-019B960494DF}">
-                  <a14:hiddenLine xmlns="" xmlns:a14="http://schemas.microsoft.com/office/drawing/2010/main" w="9525">
+                  <a14:hiddenLine xmlns:a14="http://schemas.microsoft.com/office/drawing/2010/main" xmlns="" w="9525">
                     <a:solidFill>
                       <a:srgbClr val="000000"/>
                     </a:solidFill>
@@ -17720,7 +17720,7 @@
               </a:ln>
               <a:extLst>
                 <a:ext uri="{91240B29-F687-4f45-9708-019B960494DF}">
-                  <a14:hiddenLine xmlns="" xmlns:a14="http://schemas.microsoft.com/office/drawing/2010/main" w="9525">
+                  <a14:hiddenLine xmlns:a14="http://schemas.microsoft.com/office/drawing/2010/main" xmlns="" w="9525">
                     <a:solidFill>
                       <a:srgbClr val="000000"/>
                     </a:solidFill>
@@ -17785,7 +17785,7 @@
               </a:ln>
               <a:extLst>
                 <a:ext uri="{91240B29-F687-4f45-9708-019B960494DF}">
-                  <a14:hiddenLine xmlns="" xmlns:a14="http://schemas.microsoft.com/office/drawing/2010/main" w="9525">
+                  <a14:hiddenLine xmlns:a14="http://schemas.microsoft.com/office/drawing/2010/main" xmlns="" w="9525">
                     <a:solidFill>
                       <a:srgbClr val="000000"/>
                     </a:solidFill>
@@ -17905,7 +17905,7 @@
               </a:ln>
               <a:extLst>
                 <a:ext uri="{91240B29-F687-4f45-9708-019B960494DF}">
-                  <a14:hiddenLine xmlns="" xmlns:a14="http://schemas.microsoft.com/office/drawing/2010/main" w="9525">
+                  <a14:hiddenLine xmlns:a14="http://schemas.microsoft.com/office/drawing/2010/main" xmlns="" w="9525">
                     <a:solidFill>
                       <a:srgbClr val="000000"/>
                     </a:solidFill>
@@ -18003,7 +18003,7 @@
               </a:ln>
               <a:extLst>
                 <a:ext uri="{91240B29-F687-4f45-9708-019B960494DF}">
-                  <a14:hiddenLine xmlns="" xmlns:a14="http://schemas.microsoft.com/office/drawing/2010/main" w="9525">
+                  <a14:hiddenLine xmlns:a14="http://schemas.microsoft.com/office/drawing/2010/main" xmlns="" w="9525">
                     <a:solidFill>
                       <a:srgbClr val="000000"/>
                     </a:solidFill>
@@ -18118,7 +18118,7 @@
               </a:ln>
               <a:extLst>
                 <a:ext uri="{91240B29-F687-4f45-9708-019B960494DF}">
-                  <a14:hiddenLine xmlns="" xmlns:a14="http://schemas.microsoft.com/office/drawing/2010/main" w="9525">
+                  <a14:hiddenLine xmlns:a14="http://schemas.microsoft.com/office/drawing/2010/main" xmlns="" w="9525">
                     <a:solidFill>
                       <a:srgbClr val="000000"/>
                     </a:solidFill>
@@ -18208,7 +18208,7 @@
               </a:ln>
               <a:extLst>
                 <a:ext uri="{91240B29-F687-4f45-9708-019B960494DF}">
-                  <a14:hiddenLine xmlns="" xmlns:a14="http://schemas.microsoft.com/office/drawing/2010/main" w="9525">
+                  <a14:hiddenLine xmlns:a14="http://schemas.microsoft.com/office/drawing/2010/main" xmlns="" w="9525">
                     <a:solidFill>
                       <a:srgbClr val="000000"/>
                     </a:solidFill>
@@ -18273,7 +18273,7 @@
               </a:ln>
               <a:extLst>
                 <a:ext uri="{91240B29-F687-4f45-9708-019B960494DF}">
-                  <a14:hiddenLine xmlns="" xmlns:a14="http://schemas.microsoft.com/office/drawing/2010/main" w="9525">
+                  <a14:hiddenLine xmlns:a14="http://schemas.microsoft.com/office/drawing/2010/main" xmlns="" w="9525">
                     <a:solidFill>
                       <a:srgbClr val="000000"/>
                     </a:solidFill>
@@ -18363,7 +18363,7 @@
               </a:ln>
               <a:extLst>
                 <a:ext uri="{91240B29-F687-4f45-9708-019B960494DF}">
-                  <a14:hiddenLine xmlns="" xmlns:a14="http://schemas.microsoft.com/office/drawing/2010/main" w="9525">
+                  <a14:hiddenLine xmlns:a14="http://schemas.microsoft.com/office/drawing/2010/main" xmlns="" w="9525">
                     <a:solidFill>
                       <a:srgbClr val="000000"/>
                     </a:solidFill>
@@ -18431,7 +18431,7 @@
               </a:ln>
               <a:extLst>
                 <a:ext uri="{91240B29-F687-4f45-9708-019B960494DF}">
-                  <a14:hiddenLine xmlns="" xmlns:a14="http://schemas.microsoft.com/office/drawing/2010/main" w="9525">
+                  <a14:hiddenLine xmlns:a14="http://schemas.microsoft.com/office/drawing/2010/main" xmlns="" w="9525">
                     <a:solidFill>
                       <a:srgbClr val="000000"/>
                     </a:solidFill>
@@ -18521,7 +18521,7 @@
               </a:ln>
               <a:extLst>
                 <a:ext uri="{91240B29-F687-4f45-9708-019B960494DF}">
-                  <a14:hiddenLine xmlns="" xmlns:a14="http://schemas.microsoft.com/office/drawing/2010/main" w="9525">
+                  <a14:hiddenLine xmlns:a14="http://schemas.microsoft.com/office/drawing/2010/main" xmlns="" w="9525">
                     <a:solidFill>
                       <a:srgbClr val="000000"/>
                     </a:solidFill>
@@ -18589,7 +18589,7 @@
               </a:ln>
               <a:extLst>
                 <a:ext uri="{91240B29-F687-4f45-9708-019B960494DF}">
-                  <a14:hiddenLine xmlns="" xmlns:a14="http://schemas.microsoft.com/office/drawing/2010/main" w="9525">
+                  <a14:hiddenLine xmlns:a14="http://schemas.microsoft.com/office/drawing/2010/main" xmlns="" w="9525">
                     <a:solidFill>
                       <a:srgbClr val="000000"/>
                     </a:solidFill>
@@ -18679,7 +18679,7 @@
               </a:ln>
               <a:extLst>
                 <a:ext uri="{91240B29-F687-4f45-9708-019B960494DF}">
-                  <a14:hiddenLine xmlns="" xmlns:a14="http://schemas.microsoft.com/office/drawing/2010/main" w="9525">
+                  <a14:hiddenLine xmlns:a14="http://schemas.microsoft.com/office/drawing/2010/main" xmlns="" w="9525">
                     <a:solidFill>
                       <a:srgbClr val="000000"/>
                     </a:solidFill>
@@ -18713,7 +18713,7 @@
               </a:ln>
               <a:extLst>
                 <a:ext uri="{91240B29-F687-4f45-9708-019B960494DF}">
-                  <a14:hiddenLine xmlns="" xmlns:a14="http://schemas.microsoft.com/office/drawing/2010/main" w="9525">
+                  <a14:hiddenLine xmlns:a14="http://schemas.microsoft.com/office/drawing/2010/main" xmlns="" w="9525">
                     <a:solidFill>
                       <a:srgbClr val="000000"/>
                     </a:solidFill>
@@ -19464,7 +19464,7 @@
           <a:noFill/>
           <a:extLst>
             <a:ext uri="{909E8E84-426E-40dd-AFC4-6F175D3DCCD1}">
-              <a14:hiddenFill xmlns:a14="http://schemas.microsoft.com/office/drawing/2010/main" xmlns:p14="http://schemas.microsoft.com/office/powerpoint/2010/main" xmlns:a16="http://schemas.microsoft.com/office/drawing/2014/main" xmlns="">
+              <a14:hiddenFill xmlns="" xmlns:a16="http://schemas.microsoft.com/office/drawing/2014/main" xmlns:p14="http://schemas.microsoft.com/office/powerpoint/2010/main" xmlns:a14="http://schemas.microsoft.com/office/drawing/2010/main">
                 <a:solidFill>
                   <a:srgbClr val="FFFFFF"/>
                 </a:solidFill>
@@ -19585,7 +19585,7 @@
               </a:ln>
               <a:extLst>
                 <a:ext uri="{91240B29-F687-4f45-9708-019B960494DF}">
-                  <a14:hiddenLine xmlns:a14="http://schemas.microsoft.com/office/drawing/2010/main" xmlns:p14="http://schemas.microsoft.com/office/powerpoint/2010/main" xmlns:a16="http://schemas.microsoft.com/office/drawing/2014/main" xmlns="" w="9525">
+                  <a14:hiddenLine xmlns="" xmlns:a16="http://schemas.microsoft.com/office/drawing/2014/main" xmlns:p14="http://schemas.microsoft.com/office/powerpoint/2010/main" xmlns:a14="http://schemas.microsoft.com/office/drawing/2010/main" w="9525">
                     <a:solidFill>
                       <a:srgbClr val="000000"/>
                     </a:solidFill>
@@ -19690,7 +19690,7 @@
               </a:ln>
               <a:extLst>
                 <a:ext uri="{91240B29-F687-4f45-9708-019B960494DF}">
-                  <a14:hiddenLine xmlns:a14="http://schemas.microsoft.com/office/drawing/2010/main" xmlns:p14="http://schemas.microsoft.com/office/powerpoint/2010/main" xmlns:a16="http://schemas.microsoft.com/office/drawing/2014/main" xmlns="" w="9525">
+                  <a14:hiddenLine xmlns="" xmlns:a16="http://schemas.microsoft.com/office/drawing/2014/main" xmlns:p14="http://schemas.microsoft.com/office/powerpoint/2010/main" xmlns:a14="http://schemas.microsoft.com/office/drawing/2010/main" w="9525">
                     <a:solidFill>
                       <a:srgbClr val="000000"/>
                     </a:solidFill>
@@ -19795,7 +19795,7 @@
               </a:ln>
               <a:extLst>
                 <a:ext uri="{91240B29-F687-4f45-9708-019B960494DF}">
-                  <a14:hiddenLine xmlns:a14="http://schemas.microsoft.com/office/drawing/2010/main" xmlns:p14="http://schemas.microsoft.com/office/powerpoint/2010/main" xmlns:a16="http://schemas.microsoft.com/office/drawing/2014/main" xmlns="" w="9525">
+                  <a14:hiddenLine xmlns="" xmlns:a16="http://schemas.microsoft.com/office/drawing/2014/main" xmlns:p14="http://schemas.microsoft.com/office/powerpoint/2010/main" xmlns:a14="http://schemas.microsoft.com/office/drawing/2010/main" w="9525">
                     <a:solidFill>
                       <a:srgbClr val="000000"/>
                     </a:solidFill>
@@ -19872,7 +19872,7 @@
               </a:ln>
               <a:extLst>
                 <a:ext uri="{91240B29-F687-4f45-9708-019B960494DF}">
-                  <a14:hiddenLine xmlns:a14="http://schemas.microsoft.com/office/drawing/2010/main" xmlns:p14="http://schemas.microsoft.com/office/powerpoint/2010/main" xmlns:a16="http://schemas.microsoft.com/office/drawing/2014/main" xmlns="" w="9525">
+                  <a14:hiddenLine xmlns="" xmlns:a16="http://schemas.microsoft.com/office/drawing/2014/main" xmlns:p14="http://schemas.microsoft.com/office/powerpoint/2010/main" xmlns:a14="http://schemas.microsoft.com/office/drawing/2010/main" w="9525">
                     <a:solidFill>
                       <a:srgbClr val="000000"/>
                     </a:solidFill>
@@ -19977,7 +19977,7 @@
               </a:ln>
               <a:extLst>
                 <a:ext uri="{91240B29-F687-4f45-9708-019B960494DF}">
-                  <a14:hiddenLine xmlns:a14="http://schemas.microsoft.com/office/drawing/2010/main" xmlns:p14="http://schemas.microsoft.com/office/powerpoint/2010/main" xmlns:a16="http://schemas.microsoft.com/office/drawing/2014/main" xmlns="" w="9525">
+                  <a14:hiddenLine xmlns="" xmlns:a16="http://schemas.microsoft.com/office/drawing/2014/main" xmlns:p14="http://schemas.microsoft.com/office/powerpoint/2010/main" xmlns:a14="http://schemas.microsoft.com/office/drawing/2010/main" w="9525">
                     <a:solidFill>
                       <a:srgbClr val="000000"/>
                     </a:solidFill>
@@ -20054,7 +20054,7 @@
               </a:ln>
               <a:extLst>
                 <a:ext uri="{91240B29-F687-4f45-9708-019B960494DF}">
-                  <a14:hiddenLine xmlns:a14="http://schemas.microsoft.com/office/drawing/2010/main" xmlns:p14="http://schemas.microsoft.com/office/powerpoint/2010/main" xmlns:a16="http://schemas.microsoft.com/office/drawing/2014/main" xmlns="" w="9525">
+                  <a14:hiddenLine xmlns="" xmlns:a16="http://schemas.microsoft.com/office/drawing/2014/main" xmlns:p14="http://schemas.microsoft.com/office/powerpoint/2010/main" xmlns:a14="http://schemas.microsoft.com/office/drawing/2010/main" w="9525">
                     <a:solidFill>
                       <a:srgbClr val="000000"/>
                     </a:solidFill>
@@ -20131,7 +20131,7 @@
               </a:ln>
               <a:extLst>
                 <a:ext uri="{91240B29-F687-4f45-9708-019B960494DF}">
-                  <a14:hiddenLine xmlns:a14="http://schemas.microsoft.com/office/drawing/2010/main" xmlns:p14="http://schemas.microsoft.com/office/powerpoint/2010/main" xmlns:a16="http://schemas.microsoft.com/office/drawing/2014/main" xmlns="" w="9525">
+                  <a14:hiddenLine xmlns="" xmlns:a16="http://schemas.microsoft.com/office/drawing/2014/main" xmlns:p14="http://schemas.microsoft.com/office/powerpoint/2010/main" xmlns:a14="http://schemas.microsoft.com/office/drawing/2010/main" w="9525">
                     <a:solidFill>
                       <a:srgbClr val="000000"/>
                     </a:solidFill>
@@ -20236,7 +20236,7 @@
               </a:ln>
               <a:extLst>
                 <a:ext uri="{91240B29-F687-4f45-9708-019B960494DF}">
-                  <a14:hiddenLine xmlns:a14="http://schemas.microsoft.com/office/drawing/2010/main" xmlns:p14="http://schemas.microsoft.com/office/powerpoint/2010/main" xmlns:a16="http://schemas.microsoft.com/office/drawing/2014/main" xmlns="" w="9525">
+                  <a14:hiddenLine xmlns="" xmlns:a16="http://schemas.microsoft.com/office/drawing/2014/main" xmlns:p14="http://schemas.microsoft.com/office/powerpoint/2010/main" xmlns:a14="http://schemas.microsoft.com/office/drawing/2010/main" w="9525">
                     <a:solidFill>
                       <a:srgbClr val="000000"/>
                     </a:solidFill>
@@ -20341,7 +20341,7 @@
               </a:ln>
               <a:extLst>
                 <a:ext uri="{91240B29-F687-4f45-9708-019B960494DF}">
-                  <a14:hiddenLine xmlns:a14="http://schemas.microsoft.com/office/drawing/2010/main" xmlns:p14="http://schemas.microsoft.com/office/powerpoint/2010/main" xmlns:a16="http://schemas.microsoft.com/office/drawing/2014/main" xmlns="" w="9525">
+                  <a14:hiddenLine xmlns="" xmlns:a16="http://schemas.microsoft.com/office/drawing/2014/main" xmlns:p14="http://schemas.microsoft.com/office/powerpoint/2010/main" xmlns:a14="http://schemas.microsoft.com/office/drawing/2010/main" w="9525">
                     <a:solidFill>
                       <a:srgbClr val="000000"/>
                     </a:solidFill>
@@ -20418,7 +20418,7 @@
               </a:ln>
               <a:extLst>
                 <a:ext uri="{91240B29-F687-4f45-9708-019B960494DF}">
-                  <a14:hiddenLine xmlns:a14="http://schemas.microsoft.com/office/drawing/2010/main" xmlns:p14="http://schemas.microsoft.com/office/powerpoint/2010/main" xmlns:a16="http://schemas.microsoft.com/office/drawing/2014/main" xmlns="" w="9525">
+                  <a14:hiddenLine xmlns="" xmlns:a16="http://schemas.microsoft.com/office/drawing/2014/main" xmlns:p14="http://schemas.microsoft.com/office/powerpoint/2010/main" xmlns:a14="http://schemas.microsoft.com/office/drawing/2010/main" w="9525">
                     <a:solidFill>
                       <a:srgbClr val="000000"/>
                     </a:solidFill>
@@ -20543,7 +20543,7 @@
               </a:ln>
               <a:extLst>
                 <a:ext uri="{91240B29-F687-4f45-9708-019B960494DF}">
-                  <a14:hiddenLine xmlns:a14="http://schemas.microsoft.com/office/drawing/2010/main" xmlns:p14="http://schemas.microsoft.com/office/powerpoint/2010/main" xmlns:a16="http://schemas.microsoft.com/office/drawing/2014/main" xmlns="" w="9525">
+                  <a14:hiddenLine xmlns="" xmlns:a16="http://schemas.microsoft.com/office/drawing/2014/main" xmlns:p14="http://schemas.microsoft.com/office/powerpoint/2010/main" xmlns:a14="http://schemas.microsoft.com/office/drawing/2010/main" w="9525">
                     <a:solidFill>
                       <a:srgbClr val="000000"/>
                     </a:solidFill>
@@ -20657,7 +20657,7 @@
               </a:ln>
               <a:extLst>
                 <a:ext uri="{91240B29-F687-4f45-9708-019B960494DF}">
-                  <a14:hiddenLine xmlns:a14="http://schemas.microsoft.com/office/drawing/2010/main" xmlns:p14="http://schemas.microsoft.com/office/powerpoint/2010/main" xmlns:a16="http://schemas.microsoft.com/office/drawing/2014/main" xmlns="" w="9525">
+                  <a14:hiddenLine xmlns="" xmlns:a16="http://schemas.microsoft.com/office/drawing/2014/main" xmlns:p14="http://schemas.microsoft.com/office/powerpoint/2010/main" xmlns:a14="http://schemas.microsoft.com/office/drawing/2010/main" w="9525">
                     <a:solidFill>
                       <a:srgbClr val="000000"/>
                     </a:solidFill>
@@ -20734,7 +20734,7 @@
               </a:ln>
               <a:extLst>
                 <a:ext uri="{91240B29-F687-4f45-9708-019B960494DF}">
-                  <a14:hiddenLine xmlns:a14="http://schemas.microsoft.com/office/drawing/2010/main" xmlns:p14="http://schemas.microsoft.com/office/powerpoint/2010/main" xmlns:a16="http://schemas.microsoft.com/office/drawing/2014/main" xmlns="" w="9525">
+                  <a14:hiddenLine xmlns="" xmlns:a16="http://schemas.microsoft.com/office/drawing/2014/main" xmlns:p14="http://schemas.microsoft.com/office/powerpoint/2010/main" xmlns:a14="http://schemas.microsoft.com/office/drawing/2010/main" w="9525">
                     <a:solidFill>
                       <a:srgbClr val="000000"/>
                     </a:solidFill>
@@ -20811,7 +20811,7 @@
               </a:ln>
               <a:extLst>
                 <a:ext uri="{91240B29-F687-4f45-9708-019B960494DF}">
-                  <a14:hiddenLine xmlns:a14="http://schemas.microsoft.com/office/drawing/2010/main" xmlns:p14="http://schemas.microsoft.com/office/powerpoint/2010/main" xmlns:a16="http://schemas.microsoft.com/office/drawing/2014/main" xmlns="" w="9525">
+                  <a14:hiddenLine xmlns="" xmlns:a16="http://schemas.microsoft.com/office/drawing/2014/main" xmlns:p14="http://schemas.microsoft.com/office/powerpoint/2010/main" xmlns:a14="http://schemas.microsoft.com/office/drawing/2010/main" w="9525">
                     <a:solidFill>
                       <a:srgbClr val="000000"/>
                     </a:solidFill>
@@ -20916,7 +20916,7 @@
               </a:ln>
               <a:extLst>
                 <a:ext uri="{91240B29-F687-4f45-9708-019B960494DF}">
-                  <a14:hiddenLine xmlns:a14="http://schemas.microsoft.com/office/drawing/2010/main" xmlns:p14="http://schemas.microsoft.com/office/powerpoint/2010/main" xmlns:a16="http://schemas.microsoft.com/office/drawing/2014/main" xmlns="" w="9525">
+                  <a14:hiddenLine xmlns="" xmlns:a16="http://schemas.microsoft.com/office/drawing/2014/main" xmlns:p14="http://schemas.microsoft.com/office/powerpoint/2010/main" xmlns:a14="http://schemas.microsoft.com/office/drawing/2010/main" w="9525">
                     <a:solidFill>
                       <a:srgbClr val="000000"/>
                     </a:solidFill>
@@ -20965,7 +20965,7 @@
               </a:ln>
               <a:extLst>
                 <a:ext uri="{91240B29-F687-4f45-9708-019B960494DF}">
-                  <a14:hiddenLine xmlns:a14="http://schemas.microsoft.com/office/drawing/2010/main" xmlns:p14="http://schemas.microsoft.com/office/powerpoint/2010/main" xmlns:a16="http://schemas.microsoft.com/office/drawing/2014/main" xmlns="" w="9525">
+                  <a14:hiddenLine xmlns="" xmlns:a16="http://schemas.microsoft.com/office/drawing/2014/main" xmlns:p14="http://schemas.microsoft.com/office/powerpoint/2010/main" xmlns:a14="http://schemas.microsoft.com/office/drawing/2010/main" w="9525">
                     <a:solidFill>
                       <a:srgbClr val="000000"/>
                     </a:solidFill>
@@ -21045,7 +21045,7 @@
               </a:ln>
               <a:extLst>
                 <a:ext uri="{91240B29-F687-4f45-9708-019B960494DF}">
-                  <a14:hiddenLine xmlns:a14="http://schemas.microsoft.com/office/drawing/2010/main" xmlns:p14="http://schemas.microsoft.com/office/powerpoint/2010/main" xmlns:a16="http://schemas.microsoft.com/office/drawing/2014/main" xmlns="" w="9525">
+                  <a14:hiddenLine xmlns="" xmlns:a16="http://schemas.microsoft.com/office/drawing/2014/main" xmlns:p14="http://schemas.microsoft.com/office/powerpoint/2010/main" xmlns:a14="http://schemas.microsoft.com/office/drawing/2010/main" w="9525">
                     <a:solidFill>
                       <a:srgbClr val="000000"/>
                     </a:solidFill>
@@ -21150,7 +21150,7 @@
               </a:ln>
               <a:extLst>
                 <a:ext uri="{91240B29-F687-4f45-9708-019B960494DF}">
-                  <a14:hiddenLine xmlns:a14="http://schemas.microsoft.com/office/drawing/2010/main" xmlns:p14="http://schemas.microsoft.com/office/powerpoint/2010/main" xmlns:a16="http://schemas.microsoft.com/office/drawing/2014/main" xmlns="" w="9525">
+                  <a14:hiddenLine xmlns="" xmlns:a16="http://schemas.microsoft.com/office/drawing/2014/main" xmlns:p14="http://schemas.microsoft.com/office/powerpoint/2010/main" xmlns:a14="http://schemas.microsoft.com/office/drawing/2010/main" w="9525">
                     <a:solidFill>
                       <a:srgbClr val="000000"/>
                     </a:solidFill>
@@ -21227,7 +21227,7 @@
               </a:ln>
               <a:extLst>
                 <a:ext uri="{91240B29-F687-4f45-9708-019B960494DF}">
-                  <a14:hiddenLine xmlns:a14="http://schemas.microsoft.com/office/drawing/2010/main" xmlns:p14="http://schemas.microsoft.com/office/powerpoint/2010/main" xmlns:a16="http://schemas.microsoft.com/office/drawing/2014/main" xmlns="" w="9525">
+                  <a14:hiddenLine xmlns="" xmlns:a16="http://schemas.microsoft.com/office/drawing/2014/main" xmlns:p14="http://schemas.microsoft.com/office/powerpoint/2010/main" xmlns:a14="http://schemas.microsoft.com/office/drawing/2010/main" w="9525">
                     <a:solidFill>
                       <a:srgbClr val="000000"/>
                     </a:solidFill>
@@ -21332,7 +21332,7 @@
               </a:ln>
               <a:extLst>
                 <a:ext uri="{91240B29-F687-4f45-9708-019B960494DF}">
-                  <a14:hiddenLine xmlns:a14="http://schemas.microsoft.com/office/drawing/2010/main" xmlns:p14="http://schemas.microsoft.com/office/powerpoint/2010/main" xmlns:a16="http://schemas.microsoft.com/office/drawing/2014/main" xmlns="" w="9525">
+                  <a14:hiddenLine xmlns="" xmlns:a16="http://schemas.microsoft.com/office/drawing/2014/main" xmlns:p14="http://schemas.microsoft.com/office/powerpoint/2010/main" xmlns:a14="http://schemas.microsoft.com/office/drawing/2010/main" w="9525">
                     <a:solidFill>
                       <a:srgbClr val="000000"/>
                     </a:solidFill>
@@ -21412,7 +21412,7 @@
               </a:ln>
               <a:extLst>
                 <a:ext uri="{91240B29-F687-4f45-9708-019B960494DF}">
-                  <a14:hiddenLine xmlns:a14="http://schemas.microsoft.com/office/drawing/2010/main" xmlns:p14="http://schemas.microsoft.com/office/powerpoint/2010/main" xmlns:a16="http://schemas.microsoft.com/office/drawing/2014/main" xmlns="" w="9525">
+                  <a14:hiddenLine xmlns="" xmlns:a16="http://schemas.microsoft.com/office/drawing/2014/main" xmlns:p14="http://schemas.microsoft.com/office/powerpoint/2010/main" xmlns:a14="http://schemas.microsoft.com/office/drawing/2010/main" w="9525">
                     <a:solidFill>
                       <a:srgbClr val="000000"/>
                     </a:solidFill>
@@ -21489,7 +21489,7 @@
               </a:ln>
               <a:extLst>
                 <a:ext uri="{91240B29-F687-4f45-9708-019B960494DF}">
-                  <a14:hiddenLine xmlns:a14="http://schemas.microsoft.com/office/drawing/2010/main" xmlns:p14="http://schemas.microsoft.com/office/powerpoint/2010/main" xmlns:a16="http://schemas.microsoft.com/office/drawing/2014/main" xmlns="" w="9525">
+                  <a14:hiddenLine xmlns="" xmlns:a16="http://schemas.microsoft.com/office/drawing/2014/main" xmlns:p14="http://schemas.microsoft.com/office/powerpoint/2010/main" xmlns:a14="http://schemas.microsoft.com/office/drawing/2010/main" w="9525">
                     <a:solidFill>
                       <a:srgbClr val="000000"/>
                     </a:solidFill>
@@ -21594,7 +21594,7 @@
               </a:ln>
               <a:extLst>
                 <a:ext uri="{91240B29-F687-4f45-9708-019B960494DF}">
-                  <a14:hiddenLine xmlns:a14="http://schemas.microsoft.com/office/drawing/2010/main" xmlns:p14="http://schemas.microsoft.com/office/powerpoint/2010/main" xmlns:a16="http://schemas.microsoft.com/office/drawing/2014/main" xmlns="" w="9525">
+                  <a14:hiddenLine xmlns="" xmlns:a16="http://schemas.microsoft.com/office/drawing/2014/main" xmlns:p14="http://schemas.microsoft.com/office/powerpoint/2010/main" xmlns:a14="http://schemas.microsoft.com/office/drawing/2010/main" w="9525">
                     <a:solidFill>
                       <a:srgbClr val="000000"/>
                     </a:solidFill>
@@ -21699,7 +21699,7 @@
               </a:ln>
               <a:extLst>
                 <a:ext uri="{91240B29-F687-4f45-9708-019B960494DF}">
-                  <a14:hiddenLine xmlns:a14="http://schemas.microsoft.com/office/drawing/2010/main" xmlns:p14="http://schemas.microsoft.com/office/powerpoint/2010/main" xmlns:a16="http://schemas.microsoft.com/office/drawing/2014/main" xmlns="" w="9525">
+                  <a14:hiddenLine xmlns="" xmlns:a16="http://schemas.microsoft.com/office/drawing/2014/main" xmlns:p14="http://schemas.microsoft.com/office/powerpoint/2010/main" xmlns:a14="http://schemas.microsoft.com/office/drawing/2010/main" w="9525">
                     <a:solidFill>
                       <a:srgbClr val="000000"/>
                     </a:solidFill>
@@ -21779,7 +21779,7 @@
               </a:ln>
               <a:extLst>
                 <a:ext uri="{91240B29-F687-4f45-9708-019B960494DF}">
-                  <a14:hiddenLine xmlns:a14="http://schemas.microsoft.com/office/drawing/2010/main" xmlns:p14="http://schemas.microsoft.com/office/powerpoint/2010/main" xmlns:a16="http://schemas.microsoft.com/office/drawing/2014/main" xmlns="" w="9525">
+                  <a14:hiddenLine xmlns="" xmlns:a16="http://schemas.microsoft.com/office/drawing/2014/main" xmlns:p14="http://schemas.microsoft.com/office/powerpoint/2010/main" xmlns:a14="http://schemas.microsoft.com/office/drawing/2010/main" w="9525">
                     <a:solidFill>
                       <a:srgbClr val="000000"/>
                     </a:solidFill>
@@ -21914,7 +21914,7 @@
               </a:ln>
               <a:extLst>
                 <a:ext uri="{91240B29-F687-4f45-9708-019B960494DF}">
-                  <a14:hiddenLine xmlns:a14="http://schemas.microsoft.com/office/drawing/2010/main" xmlns:p14="http://schemas.microsoft.com/office/powerpoint/2010/main" xmlns:a16="http://schemas.microsoft.com/office/drawing/2014/main" xmlns="" w="9525">
+                  <a14:hiddenLine xmlns="" xmlns:a16="http://schemas.microsoft.com/office/drawing/2014/main" xmlns:p14="http://schemas.microsoft.com/office/powerpoint/2010/main" xmlns:a14="http://schemas.microsoft.com/office/drawing/2010/main" w="9525">
                     <a:solidFill>
                       <a:srgbClr val="000000"/>
                     </a:solidFill>
@@ -22042,7 +22042,7 @@
               </a:ln>
               <a:extLst>
                 <a:ext uri="{91240B29-F687-4f45-9708-019B960494DF}">
-                  <a14:hiddenLine xmlns:a14="http://schemas.microsoft.com/office/drawing/2010/main" xmlns:p14="http://schemas.microsoft.com/office/powerpoint/2010/main" xmlns:a16="http://schemas.microsoft.com/office/drawing/2014/main" xmlns="" w="9525">
+                  <a14:hiddenLine xmlns="" xmlns:a16="http://schemas.microsoft.com/office/drawing/2014/main" xmlns:p14="http://schemas.microsoft.com/office/powerpoint/2010/main" xmlns:a14="http://schemas.microsoft.com/office/drawing/2010/main" w="9525">
                     <a:solidFill>
                       <a:srgbClr val="000000"/>
                     </a:solidFill>
@@ -22172,7 +22172,7 @@
               </a:ln>
               <a:extLst>
                 <a:ext uri="{91240B29-F687-4f45-9708-019B960494DF}">
-                  <a14:hiddenLine xmlns:a14="http://schemas.microsoft.com/office/drawing/2010/main" xmlns:p14="http://schemas.microsoft.com/office/powerpoint/2010/main" xmlns:a16="http://schemas.microsoft.com/office/drawing/2014/main" xmlns="" w="9525">
+                  <a14:hiddenLine xmlns="" xmlns:a16="http://schemas.microsoft.com/office/drawing/2014/main" xmlns:p14="http://schemas.microsoft.com/office/powerpoint/2010/main" xmlns:a14="http://schemas.microsoft.com/office/drawing/2010/main" w="9525">
                     <a:solidFill>
                       <a:srgbClr val="000000"/>
                     </a:solidFill>
@@ -22277,7 +22277,7 @@
               </a:ln>
               <a:extLst>
                 <a:ext uri="{91240B29-F687-4f45-9708-019B960494DF}">
-                  <a14:hiddenLine xmlns:a14="http://schemas.microsoft.com/office/drawing/2010/main" xmlns:p14="http://schemas.microsoft.com/office/powerpoint/2010/main" xmlns:a16="http://schemas.microsoft.com/office/drawing/2014/main" xmlns="" w="9525">
+                  <a14:hiddenLine xmlns="" xmlns:a16="http://schemas.microsoft.com/office/drawing/2014/main" xmlns:p14="http://schemas.microsoft.com/office/powerpoint/2010/main" xmlns:a14="http://schemas.microsoft.com/office/drawing/2010/main" w="9525">
                     <a:solidFill>
                       <a:srgbClr val="000000"/>
                     </a:solidFill>
@@ -22357,7 +22357,7 @@
               </a:ln>
               <a:extLst>
                 <a:ext uri="{91240B29-F687-4f45-9708-019B960494DF}">
-                  <a14:hiddenLine xmlns:a14="http://schemas.microsoft.com/office/drawing/2010/main" xmlns:p14="http://schemas.microsoft.com/office/powerpoint/2010/main" xmlns:a16="http://schemas.microsoft.com/office/drawing/2014/main" xmlns="" w="9525">
+                  <a14:hiddenLine xmlns="" xmlns:a16="http://schemas.microsoft.com/office/drawing/2014/main" xmlns:p14="http://schemas.microsoft.com/office/powerpoint/2010/main" xmlns:a14="http://schemas.microsoft.com/office/drawing/2010/main" w="9525">
                     <a:solidFill>
                       <a:srgbClr val="000000"/>
                     </a:solidFill>
@@ -22462,7 +22462,7 @@
               </a:ln>
               <a:extLst>
                 <a:ext uri="{91240B29-F687-4f45-9708-019B960494DF}">
-                  <a14:hiddenLine xmlns:a14="http://schemas.microsoft.com/office/drawing/2010/main" xmlns:p14="http://schemas.microsoft.com/office/powerpoint/2010/main" xmlns:a16="http://schemas.microsoft.com/office/drawing/2014/main" xmlns="" w="9525">
+                  <a14:hiddenLine xmlns="" xmlns:a16="http://schemas.microsoft.com/office/drawing/2014/main" xmlns:p14="http://schemas.microsoft.com/office/powerpoint/2010/main" xmlns:a14="http://schemas.microsoft.com/office/drawing/2010/main" w="9525">
                     <a:solidFill>
                       <a:srgbClr val="000000"/>
                     </a:solidFill>
@@ -22545,7 +22545,7 @@
               </a:ln>
               <a:extLst>
                 <a:ext uri="{91240B29-F687-4f45-9708-019B960494DF}">
-                  <a14:hiddenLine xmlns:a14="http://schemas.microsoft.com/office/drawing/2010/main" xmlns:p14="http://schemas.microsoft.com/office/powerpoint/2010/main" xmlns:a16="http://schemas.microsoft.com/office/drawing/2014/main" xmlns="" w="9525">
+                  <a14:hiddenLine xmlns="" xmlns:a16="http://schemas.microsoft.com/office/drawing/2014/main" xmlns:p14="http://schemas.microsoft.com/office/powerpoint/2010/main" xmlns:a14="http://schemas.microsoft.com/office/drawing/2010/main" w="9525">
                     <a:solidFill>
                       <a:srgbClr val="000000"/>
                     </a:solidFill>
@@ -22650,7 +22650,7 @@
               </a:ln>
               <a:extLst>
                 <a:ext uri="{91240B29-F687-4f45-9708-019B960494DF}">
-                  <a14:hiddenLine xmlns:a14="http://schemas.microsoft.com/office/drawing/2010/main" xmlns:p14="http://schemas.microsoft.com/office/powerpoint/2010/main" xmlns:a16="http://schemas.microsoft.com/office/drawing/2014/main" xmlns="" w="9525">
+                  <a14:hiddenLine xmlns="" xmlns:a16="http://schemas.microsoft.com/office/drawing/2014/main" xmlns:p14="http://schemas.microsoft.com/office/powerpoint/2010/main" xmlns:a14="http://schemas.microsoft.com/office/drawing/2010/main" w="9525">
                     <a:solidFill>
                       <a:srgbClr val="000000"/>
                     </a:solidFill>
@@ -22733,7 +22733,7 @@
               </a:ln>
               <a:extLst>
                 <a:ext uri="{91240B29-F687-4f45-9708-019B960494DF}">
-                  <a14:hiddenLine xmlns:a14="http://schemas.microsoft.com/office/drawing/2010/main" xmlns:p14="http://schemas.microsoft.com/office/powerpoint/2010/main" xmlns:a16="http://schemas.microsoft.com/office/drawing/2014/main" xmlns="" w="9525">
+                  <a14:hiddenLine xmlns="" xmlns:a16="http://schemas.microsoft.com/office/drawing/2014/main" xmlns:p14="http://schemas.microsoft.com/office/powerpoint/2010/main" xmlns:a14="http://schemas.microsoft.com/office/drawing/2010/main" w="9525">
                     <a:solidFill>
                       <a:srgbClr val="000000"/>
                     </a:solidFill>
@@ -22838,7 +22838,7 @@
               </a:ln>
               <a:extLst>
                 <a:ext uri="{91240B29-F687-4f45-9708-019B960494DF}">
-                  <a14:hiddenLine xmlns:a14="http://schemas.microsoft.com/office/drawing/2010/main" xmlns:p14="http://schemas.microsoft.com/office/powerpoint/2010/main" xmlns:a16="http://schemas.microsoft.com/office/drawing/2014/main" xmlns="" w="9525">
+                  <a14:hiddenLine xmlns="" xmlns:a16="http://schemas.microsoft.com/office/drawing/2014/main" xmlns:p14="http://schemas.microsoft.com/office/powerpoint/2010/main" xmlns:a14="http://schemas.microsoft.com/office/drawing/2010/main" w="9525">
                     <a:solidFill>
                       <a:srgbClr val="000000"/>
                     </a:solidFill>
@@ -22887,7 +22887,7 @@
               </a:ln>
               <a:extLst>
                 <a:ext uri="{91240B29-F687-4f45-9708-019B960494DF}">
-                  <a14:hiddenLine xmlns:a14="http://schemas.microsoft.com/office/drawing/2010/main" xmlns:p14="http://schemas.microsoft.com/office/powerpoint/2010/main" xmlns:a16="http://schemas.microsoft.com/office/drawing/2014/main" xmlns="" w="9525">
+                  <a14:hiddenLine xmlns="" xmlns:a16="http://schemas.microsoft.com/office/drawing/2014/main" xmlns:p14="http://schemas.microsoft.com/office/powerpoint/2010/main" xmlns:a14="http://schemas.microsoft.com/office/drawing/2010/main" w="9525">
                     <a:solidFill>
                       <a:srgbClr val="000000"/>
                     </a:solidFill>
@@ -23007,7 +23007,7 @@
           </a:prstGeom>
           <a:extLst>
             <a:ext uri="{909E8E84-426E-40dd-AFC4-6F175D3DCCD1}">
-              <a14:hiddenFill xmlns:a14="http://schemas.microsoft.com/office/drawing/2010/main" xmlns:p14="http://schemas.microsoft.com/office/powerpoint/2010/main" xmlns:a16="http://schemas.microsoft.com/office/drawing/2014/main" xmlns="">
+              <a14:hiddenFill xmlns="" xmlns:a16="http://schemas.microsoft.com/office/drawing/2014/main" xmlns:p14="http://schemas.microsoft.com/office/powerpoint/2010/main" xmlns:a14="http://schemas.microsoft.com/office/drawing/2010/main">
                 <a:solidFill>
                   <a:srgbClr val="FFFFFF"/>
                 </a:solidFill>
@@ -23131,7 +23131,7 @@
           <a:noFill/>
           <a:extLst>
             <a:ext uri="{909E8E84-426E-40dd-AFC4-6F175D3DCCD1}">
-              <a14:hiddenFill xmlns:a14="http://schemas.microsoft.com/office/drawing/2010/main" xmlns:p14="http://schemas.microsoft.com/office/powerpoint/2010/main" xmlns:a16="http://schemas.microsoft.com/office/drawing/2014/main" xmlns="">
+              <a14:hiddenFill xmlns="" xmlns:a16="http://schemas.microsoft.com/office/drawing/2014/main" xmlns:p14="http://schemas.microsoft.com/office/powerpoint/2010/main" xmlns:a14="http://schemas.microsoft.com/office/drawing/2010/main">
                 <a:solidFill>
                   <a:srgbClr val="FFFFFF"/>
                 </a:solidFill>
@@ -23325,7 +23325,7 @@
             </a:ln>
             <a:extLst>
               <a:ext uri="{91240B29-F687-4f45-9708-019B960494DF}">
-                <a14:hiddenLine xmlns:a14="http://schemas.microsoft.com/office/drawing/2010/main" xmlns:p14="http://schemas.microsoft.com/office/powerpoint/2010/main" xmlns:a16="http://schemas.microsoft.com/office/drawing/2014/main" xmlns="" w="9525">
+                <a14:hiddenLine xmlns="" xmlns:a16="http://schemas.microsoft.com/office/drawing/2014/main" xmlns:p14="http://schemas.microsoft.com/office/powerpoint/2010/main" xmlns:a14="http://schemas.microsoft.com/office/drawing/2010/main" w="9525">
                   <a:solidFill>
                     <a:srgbClr val="000000"/>
                   </a:solidFill>
@@ -23430,7 +23430,7 @@
             </a:ln>
             <a:extLst>
               <a:ext uri="{91240B29-F687-4f45-9708-019B960494DF}">
-                <a14:hiddenLine xmlns:a14="http://schemas.microsoft.com/office/drawing/2010/main" xmlns:p14="http://schemas.microsoft.com/office/powerpoint/2010/main" xmlns:a16="http://schemas.microsoft.com/office/drawing/2014/main" xmlns="" w="9525">
+                <a14:hiddenLine xmlns="" xmlns:a16="http://schemas.microsoft.com/office/drawing/2014/main" xmlns:p14="http://schemas.microsoft.com/office/powerpoint/2010/main" xmlns:a14="http://schemas.microsoft.com/office/drawing/2010/main" w="9525">
                   <a:solidFill>
                     <a:srgbClr val="000000"/>
                   </a:solidFill>
@@ -23535,7 +23535,7 @@
             </a:ln>
             <a:extLst>
               <a:ext uri="{91240B29-F687-4f45-9708-019B960494DF}">
-                <a14:hiddenLine xmlns:a14="http://schemas.microsoft.com/office/drawing/2010/main" xmlns:p14="http://schemas.microsoft.com/office/powerpoint/2010/main" xmlns:a16="http://schemas.microsoft.com/office/drawing/2014/main" xmlns="" w="9525">
+                <a14:hiddenLine xmlns="" xmlns:a16="http://schemas.microsoft.com/office/drawing/2014/main" xmlns:p14="http://schemas.microsoft.com/office/powerpoint/2010/main" xmlns:a14="http://schemas.microsoft.com/office/drawing/2010/main" w="9525">
                   <a:solidFill>
                     <a:srgbClr val="000000"/>
                   </a:solidFill>
@@ -23612,7 +23612,7 @@
             </a:ln>
             <a:extLst>
               <a:ext uri="{91240B29-F687-4f45-9708-019B960494DF}">
-                <a14:hiddenLine xmlns:a14="http://schemas.microsoft.com/office/drawing/2010/main" xmlns:p14="http://schemas.microsoft.com/office/powerpoint/2010/main" xmlns:a16="http://schemas.microsoft.com/office/drawing/2014/main" xmlns="" w="9525">
+                <a14:hiddenLine xmlns="" xmlns:a16="http://schemas.microsoft.com/office/drawing/2014/main" xmlns:p14="http://schemas.microsoft.com/office/powerpoint/2010/main" xmlns:a14="http://schemas.microsoft.com/office/drawing/2010/main" w="9525">
                   <a:solidFill>
                     <a:srgbClr val="000000"/>
                   </a:solidFill>
@@ -23717,7 +23717,7 @@
             </a:ln>
             <a:extLst>
               <a:ext uri="{91240B29-F687-4f45-9708-019B960494DF}">
-                <a14:hiddenLine xmlns:a14="http://schemas.microsoft.com/office/drawing/2010/main" xmlns:p14="http://schemas.microsoft.com/office/powerpoint/2010/main" xmlns:a16="http://schemas.microsoft.com/office/drawing/2014/main" xmlns="" w="9525">
+                <a14:hiddenLine xmlns="" xmlns:a16="http://schemas.microsoft.com/office/drawing/2014/main" xmlns:p14="http://schemas.microsoft.com/office/powerpoint/2010/main" xmlns:a14="http://schemas.microsoft.com/office/drawing/2010/main" w="9525">
                   <a:solidFill>
                     <a:srgbClr val="000000"/>
                   </a:solidFill>
@@ -23794,7 +23794,7 @@
             </a:ln>
             <a:extLst>
               <a:ext uri="{91240B29-F687-4f45-9708-019B960494DF}">
-                <a14:hiddenLine xmlns:a14="http://schemas.microsoft.com/office/drawing/2010/main" xmlns:p14="http://schemas.microsoft.com/office/powerpoint/2010/main" xmlns:a16="http://schemas.microsoft.com/office/drawing/2014/main" xmlns="" w="9525">
+                <a14:hiddenLine xmlns="" xmlns:a16="http://schemas.microsoft.com/office/drawing/2014/main" xmlns:p14="http://schemas.microsoft.com/office/powerpoint/2010/main" xmlns:a14="http://schemas.microsoft.com/office/drawing/2010/main" w="9525">
                   <a:solidFill>
                     <a:srgbClr val="000000"/>
                   </a:solidFill>
@@ -23871,7 +23871,7 @@
             </a:ln>
             <a:extLst>
               <a:ext uri="{91240B29-F687-4f45-9708-019B960494DF}">
-                <a14:hiddenLine xmlns:a14="http://schemas.microsoft.com/office/drawing/2010/main" xmlns:p14="http://schemas.microsoft.com/office/powerpoint/2010/main" xmlns:a16="http://schemas.microsoft.com/office/drawing/2014/main" xmlns="" w="9525">
+                <a14:hiddenLine xmlns="" xmlns:a16="http://schemas.microsoft.com/office/drawing/2014/main" xmlns:p14="http://schemas.microsoft.com/office/powerpoint/2010/main" xmlns:a14="http://schemas.microsoft.com/office/drawing/2010/main" w="9525">
                   <a:solidFill>
                     <a:srgbClr val="000000"/>
                   </a:solidFill>
@@ -23976,7 +23976,7 @@
             </a:ln>
             <a:extLst>
               <a:ext uri="{91240B29-F687-4f45-9708-019B960494DF}">
-                <a14:hiddenLine xmlns:a14="http://schemas.microsoft.com/office/drawing/2010/main" xmlns:p14="http://schemas.microsoft.com/office/powerpoint/2010/main" xmlns:a16="http://schemas.microsoft.com/office/drawing/2014/main" xmlns="" w="9525">
+                <a14:hiddenLine xmlns="" xmlns:a16="http://schemas.microsoft.com/office/drawing/2014/main" xmlns:p14="http://schemas.microsoft.com/office/powerpoint/2010/main" xmlns:a14="http://schemas.microsoft.com/office/drawing/2010/main" w="9525">
                   <a:solidFill>
                     <a:srgbClr val="000000"/>
                   </a:solidFill>
@@ -24081,7 +24081,7 @@
             </a:ln>
             <a:extLst>
               <a:ext uri="{91240B29-F687-4f45-9708-019B960494DF}">
-                <a14:hiddenLine xmlns:a14="http://schemas.microsoft.com/office/drawing/2010/main" xmlns:p14="http://schemas.microsoft.com/office/powerpoint/2010/main" xmlns:a16="http://schemas.microsoft.com/office/drawing/2014/main" xmlns="" w="9525">
+                <a14:hiddenLine xmlns="" xmlns:a16="http://schemas.microsoft.com/office/drawing/2014/main" xmlns:p14="http://schemas.microsoft.com/office/powerpoint/2010/main" xmlns:a14="http://schemas.microsoft.com/office/drawing/2010/main" w="9525">
                   <a:solidFill>
                     <a:srgbClr val="000000"/>
                   </a:solidFill>
@@ -24158,7 +24158,7 @@
             </a:ln>
             <a:extLst>
               <a:ext uri="{91240B29-F687-4f45-9708-019B960494DF}">
-                <a14:hiddenLine xmlns:a14="http://schemas.microsoft.com/office/drawing/2010/main" xmlns:p14="http://schemas.microsoft.com/office/powerpoint/2010/main" xmlns:a16="http://schemas.microsoft.com/office/drawing/2014/main" xmlns="" w="9525">
+                <a14:hiddenLine xmlns="" xmlns:a16="http://schemas.microsoft.com/office/drawing/2014/main" xmlns:p14="http://schemas.microsoft.com/office/powerpoint/2010/main" xmlns:a14="http://schemas.microsoft.com/office/drawing/2010/main" w="9525">
                   <a:solidFill>
                     <a:srgbClr val="000000"/>
                   </a:solidFill>
@@ -24283,7 +24283,7 @@
             </a:ln>
             <a:extLst>
               <a:ext uri="{91240B29-F687-4f45-9708-019B960494DF}">
-                <a14:hiddenLine xmlns:a14="http://schemas.microsoft.com/office/drawing/2010/main" xmlns:p14="http://schemas.microsoft.com/office/powerpoint/2010/main" xmlns:a16="http://schemas.microsoft.com/office/drawing/2014/main" xmlns="" w="9525">
+                <a14:hiddenLine xmlns="" xmlns:a16="http://schemas.microsoft.com/office/drawing/2014/main" xmlns:p14="http://schemas.microsoft.com/office/powerpoint/2010/main" xmlns:a14="http://schemas.microsoft.com/office/drawing/2010/main" w="9525">
                   <a:solidFill>
                     <a:srgbClr val="000000"/>
                   </a:solidFill>
@@ -24397,7 +24397,7 @@
             </a:ln>
             <a:extLst>
               <a:ext uri="{91240B29-F687-4f45-9708-019B960494DF}">
-                <a14:hiddenLine xmlns:a14="http://schemas.microsoft.com/office/drawing/2010/main" xmlns:p14="http://schemas.microsoft.com/office/powerpoint/2010/main" xmlns:a16="http://schemas.microsoft.com/office/drawing/2014/main" xmlns="" w="9525">
+                <a14:hiddenLine xmlns="" xmlns:a16="http://schemas.microsoft.com/office/drawing/2014/main" xmlns:p14="http://schemas.microsoft.com/office/powerpoint/2010/main" xmlns:a14="http://schemas.microsoft.com/office/drawing/2010/main" w="9525">
                   <a:solidFill>
                     <a:srgbClr val="000000"/>
                   </a:solidFill>
@@ -24474,7 +24474,7 @@
             </a:ln>
             <a:extLst>
               <a:ext uri="{91240B29-F687-4f45-9708-019B960494DF}">
-                <a14:hiddenLine xmlns:a14="http://schemas.microsoft.com/office/drawing/2010/main" xmlns:p14="http://schemas.microsoft.com/office/powerpoint/2010/main" xmlns:a16="http://schemas.microsoft.com/office/drawing/2014/main" xmlns="" w="9525">
+                <a14:hiddenLine xmlns="" xmlns:a16="http://schemas.microsoft.com/office/drawing/2014/main" xmlns:p14="http://schemas.microsoft.com/office/powerpoint/2010/main" xmlns:a14="http://schemas.microsoft.com/office/drawing/2010/main" w="9525">
                   <a:solidFill>
                     <a:srgbClr val="000000"/>
                   </a:solidFill>
@@ -24551,7 +24551,7 @@
             </a:ln>
             <a:extLst>
               <a:ext uri="{91240B29-F687-4f45-9708-019B960494DF}">
-                <a14:hiddenLine xmlns:a14="http://schemas.microsoft.com/office/drawing/2010/main" xmlns:p14="http://schemas.microsoft.com/office/powerpoint/2010/main" xmlns:a16="http://schemas.microsoft.com/office/drawing/2014/main" xmlns="" w="9525">
+                <a14:hiddenLine xmlns="" xmlns:a16="http://schemas.microsoft.com/office/drawing/2014/main" xmlns:p14="http://schemas.microsoft.com/office/powerpoint/2010/main" xmlns:a14="http://schemas.microsoft.com/office/drawing/2010/main" w="9525">
                   <a:solidFill>
                     <a:srgbClr val="000000"/>
                   </a:solidFill>
@@ -24656,7 +24656,7 @@
             </a:ln>
             <a:extLst>
               <a:ext uri="{91240B29-F687-4f45-9708-019B960494DF}">
-                <a14:hiddenLine xmlns:a14="http://schemas.microsoft.com/office/drawing/2010/main" xmlns:p14="http://schemas.microsoft.com/office/powerpoint/2010/main" xmlns:a16="http://schemas.microsoft.com/office/drawing/2014/main" xmlns="" w="9525">
+                <a14:hiddenLine xmlns="" xmlns:a16="http://schemas.microsoft.com/office/drawing/2014/main" xmlns:p14="http://schemas.microsoft.com/office/powerpoint/2010/main" xmlns:a14="http://schemas.microsoft.com/office/drawing/2010/main" w="9525">
                   <a:solidFill>
                     <a:srgbClr val="000000"/>
                   </a:solidFill>
@@ -24705,7 +24705,7 @@
             </a:ln>
             <a:extLst>
               <a:ext uri="{91240B29-F687-4f45-9708-019B960494DF}">
-                <a14:hiddenLine xmlns:a14="http://schemas.microsoft.com/office/drawing/2010/main" xmlns:p14="http://schemas.microsoft.com/office/powerpoint/2010/main" xmlns:a16="http://schemas.microsoft.com/office/drawing/2014/main" xmlns="" w="9525">
+                <a14:hiddenLine xmlns="" xmlns:a16="http://schemas.microsoft.com/office/drawing/2014/main" xmlns:p14="http://schemas.microsoft.com/office/powerpoint/2010/main" xmlns:a14="http://schemas.microsoft.com/office/drawing/2010/main" w="9525">
                   <a:solidFill>
                     <a:srgbClr val="000000"/>
                   </a:solidFill>
@@ -24785,7 +24785,7 @@
             </a:ln>
             <a:extLst>
               <a:ext uri="{91240B29-F687-4f45-9708-019B960494DF}">
-                <a14:hiddenLine xmlns:a14="http://schemas.microsoft.com/office/drawing/2010/main" xmlns:p14="http://schemas.microsoft.com/office/powerpoint/2010/main" xmlns:a16="http://schemas.microsoft.com/office/drawing/2014/main" xmlns="" w="9525">
+                <a14:hiddenLine xmlns="" xmlns:a16="http://schemas.microsoft.com/office/drawing/2014/main" xmlns:p14="http://schemas.microsoft.com/office/powerpoint/2010/main" xmlns:a14="http://schemas.microsoft.com/office/drawing/2010/main" w="9525">
                   <a:solidFill>
                     <a:srgbClr val="000000"/>
                   </a:solidFill>
@@ -24890,7 +24890,7 @@
             </a:ln>
             <a:extLst>
               <a:ext uri="{91240B29-F687-4f45-9708-019B960494DF}">
-                <a14:hiddenLine xmlns:a14="http://schemas.microsoft.com/office/drawing/2010/main" xmlns:p14="http://schemas.microsoft.com/office/powerpoint/2010/main" xmlns:a16="http://schemas.microsoft.com/office/drawing/2014/main" xmlns="" w="9525">
+                <a14:hiddenLine xmlns="" xmlns:a16="http://schemas.microsoft.com/office/drawing/2014/main" xmlns:p14="http://schemas.microsoft.com/office/powerpoint/2010/main" xmlns:a14="http://schemas.microsoft.com/office/drawing/2010/main" w="9525">
                   <a:solidFill>
                     <a:srgbClr val="000000"/>
                   </a:solidFill>
@@ -24967,7 +24967,7 @@
             </a:ln>
             <a:extLst>
               <a:ext uri="{91240B29-F687-4f45-9708-019B960494DF}">
-                <a14:hiddenLine xmlns:a14="http://schemas.microsoft.com/office/drawing/2010/main" xmlns:p14="http://schemas.microsoft.com/office/powerpoint/2010/main" xmlns:a16="http://schemas.microsoft.com/office/drawing/2014/main" xmlns="" w="9525">
+                <a14:hiddenLine xmlns="" xmlns:a16="http://schemas.microsoft.com/office/drawing/2014/main" xmlns:p14="http://schemas.microsoft.com/office/powerpoint/2010/main" xmlns:a14="http://schemas.microsoft.com/office/drawing/2010/main" w="9525">
                   <a:solidFill>
                     <a:srgbClr val="000000"/>
                   </a:solidFill>
@@ -25072,7 +25072,7 @@
             </a:ln>
             <a:extLst>
               <a:ext uri="{91240B29-F687-4f45-9708-019B960494DF}">
-                <a14:hiddenLine xmlns:a14="http://schemas.microsoft.com/office/drawing/2010/main" xmlns:p14="http://schemas.microsoft.com/office/powerpoint/2010/main" xmlns:a16="http://schemas.microsoft.com/office/drawing/2014/main" xmlns="" w="9525">
+                <a14:hiddenLine xmlns="" xmlns:a16="http://schemas.microsoft.com/office/drawing/2014/main" xmlns:p14="http://schemas.microsoft.com/office/powerpoint/2010/main" xmlns:a14="http://schemas.microsoft.com/office/drawing/2010/main" w="9525">
                   <a:solidFill>
                     <a:srgbClr val="000000"/>
                   </a:solidFill>
@@ -25152,7 +25152,7 @@
             </a:ln>
             <a:extLst>
               <a:ext uri="{91240B29-F687-4f45-9708-019B960494DF}">
-                <a14:hiddenLine xmlns:a14="http://schemas.microsoft.com/office/drawing/2010/main" xmlns:p14="http://schemas.microsoft.com/office/powerpoint/2010/main" xmlns:a16="http://schemas.microsoft.com/office/drawing/2014/main" xmlns="" w="9525">
+                <a14:hiddenLine xmlns="" xmlns:a16="http://schemas.microsoft.com/office/drawing/2014/main" xmlns:p14="http://schemas.microsoft.com/office/powerpoint/2010/main" xmlns:a14="http://schemas.microsoft.com/office/drawing/2010/main" w="9525">
                   <a:solidFill>
                     <a:srgbClr val="000000"/>
                   </a:solidFill>
@@ -25229,7 +25229,7 @@
             </a:ln>
             <a:extLst>
               <a:ext uri="{91240B29-F687-4f45-9708-019B960494DF}">
-                <a14:hiddenLine xmlns:a14="http://schemas.microsoft.com/office/drawing/2010/main" xmlns:p14="http://schemas.microsoft.com/office/powerpoint/2010/main" xmlns:a16="http://schemas.microsoft.com/office/drawing/2014/main" xmlns="" w="9525">
+                <a14:hiddenLine xmlns="" xmlns:a16="http://schemas.microsoft.com/office/drawing/2014/main" xmlns:p14="http://schemas.microsoft.com/office/powerpoint/2010/main" xmlns:a14="http://schemas.microsoft.com/office/drawing/2010/main" w="9525">
                   <a:solidFill>
                     <a:srgbClr val="000000"/>
                   </a:solidFill>
@@ -25334,7 +25334,7 @@
             </a:ln>
             <a:extLst>
               <a:ext uri="{91240B29-F687-4f45-9708-019B960494DF}">
-                <a14:hiddenLine xmlns:a14="http://schemas.microsoft.com/office/drawing/2010/main" xmlns:p14="http://schemas.microsoft.com/office/powerpoint/2010/main" xmlns:a16="http://schemas.microsoft.com/office/drawing/2014/main" xmlns="" w="9525">
+                <a14:hiddenLine xmlns="" xmlns:a16="http://schemas.microsoft.com/office/drawing/2014/main" xmlns:p14="http://schemas.microsoft.com/office/powerpoint/2010/main" xmlns:a14="http://schemas.microsoft.com/office/drawing/2010/main" w="9525">
                   <a:solidFill>
                     <a:srgbClr val="000000"/>
                   </a:solidFill>
@@ -25439,7 +25439,7 @@
             </a:ln>
             <a:extLst>
               <a:ext uri="{91240B29-F687-4f45-9708-019B960494DF}">
-                <a14:hiddenLine xmlns:a14="http://schemas.microsoft.com/office/drawing/2010/main" xmlns:p14="http://schemas.microsoft.com/office/powerpoint/2010/main" xmlns:a16="http://schemas.microsoft.com/office/drawing/2014/main" xmlns="" w="9525">
+                <a14:hiddenLine xmlns="" xmlns:a16="http://schemas.microsoft.com/office/drawing/2014/main" xmlns:p14="http://schemas.microsoft.com/office/powerpoint/2010/main" xmlns:a14="http://schemas.microsoft.com/office/drawing/2010/main" w="9525">
                   <a:solidFill>
                     <a:srgbClr val="000000"/>
                   </a:solidFill>
@@ -25519,7 +25519,7 @@
             </a:ln>
             <a:extLst>
               <a:ext uri="{91240B29-F687-4f45-9708-019B960494DF}">
-                <a14:hiddenLine xmlns:a14="http://schemas.microsoft.com/office/drawing/2010/main" xmlns:p14="http://schemas.microsoft.com/office/powerpoint/2010/main" xmlns:a16="http://schemas.microsoft.com/office/drawing/2014/main" xmlns="" w="9525">
+                <a14:hiddenLine xmlns="" xmlns:a16="http://schemas.microsoft.com/office/drawing/2014/main" xmlns:p14="http://schemas.microsoft.com/office/powerpoint/2010/main" xmlns:a14="http://schemas.microsoft.com/office/drawing/2010/main" w="9525">
                   <a:solidFill>
                     <a:srgbClr val="000000"/>
                   </a:solidFill>
@@ -25654,7 +25654,7 @@
             </a:ln>
             <a:extLst>
               <a:ext uri="{91240B29-F687-4f45-9708-019B960494DF}">
-                <a14:hiddenLine xmlns:a14="http://schemas.microsoft.com/office/drawing/2010/main" xmlns:p14="http://schemas.microsoft.com/office/powerpoint/2010/main" xmlns:a16="http://schemas.microsoft.com/office/drawing/2014/main" xmlns="" w="9525">
+                <a14:hiddenLine xmlns="" xmlns:a16="http://schemas.microsoft.com/office/drawing/2014/main" xmlns:p14="http://schemas.microsoft.com/office/powerpoint/2010/main" xmlns:a14="http://schemas.microsoft.com/office/drawing/2010/main" w="9525">
                   <a:solidFill>
                     <a:srgbClr val="000000"/>
                   </a:solidFill>
@@ -25815,7 +25815,7 @@
           <a:noFill/>
           <a:extLst>
             <a:ext uri="{909E8E84-426E-40dd-AFC4-6F175D3DCCD1}">
-              <a14:hiddenFill xmlns:a14="http://schemas.microsoft.com/office/drawing/2010/main" xmlns:p14="http://schemas.microsoft.com/office/powerpoint/2010/main" xmlns:a16="http://schemas.microsoft.com/office/drawing/2014/main" xmlns="">
+              <a14:hiddenFill xmlns="" xmlns:a16="http://schemas.microsoft.com/office/drawing/2014/main" xmlns:p14="http://schemas.microsoft.com/office/powerpoint/2010/main" xmlns:a14="http://schemas.microsoft.com/office/drawing/2010/main">
                 <a:solidFill>
                   <a:srgbClr val="FFFFFF"/>
                 </a:solidFill>
@@ -25936,7 +25936,7 @@
               </a:ln>
               <a:extLst>
                 <a:ext uri="{91240B29-F687-4f45-9708-019B960494DF}">
-                  <a14:hiddenLine xmlns:a14="http://schemas.microsoft.com/office/drawing/2010/main" xmlns:p14="http://schemas.microsoft.com/office/powerpoint/2010/main" xmlns:a16="http://schemas.microsoft.com/office/drawing/2014/main" xmlns="" w="9525">
+                  <a14:hiddenLine xmlns="" xmlns:a16="http://schemas.microsoft.com/office/drawing/2014/main" xmlns:p14="http://schemas.microsoft.com/office/powerpoint/2010/main" xmlns:a14="http://schemas.microsoft.com/office/drawing/2010/main" w="9525">
                     <a:solidFill>
                       <a:srgbClr val="000000"/>
                     </a:solidFill>
@@ -26041,7 +26041,7 @@
               </a:ln>
               <a:extLst>
                 <a:ext uri="{91240B29-F687-4f45-9708-019B960494DF}">
-                  <a14:hiddenLine xmlns:a14="http://schemas.microsoft.com/office/drawing/2010/main" xmlns:p14="http://schemas.microsoft.com/office/powerpoint/2010/main" xmlns:a16="http://schemas.microsoft.com/office/drawing/2014/main" xmlns="" w="9525">
+                  <a14:hiddenLine xmlns="" xmlns:a16="http://schemas.microsoft.com/office/drawing/2014/main" xmlns:p14="http://schemas.microsoft.com/office/powerpoint/2010/main" xmlns:a14="http://schemas.microsoft.com/office/drawing/2010/main" w="9525">
                     <a:solidFill>
                       <a:srgbClr val="000000"/>
                     </a:solidFill>
@@ -26146,7 +26146,7 @@
               </a:ln>
               <a:extLst>
                 <a:ext uri="{91240B29-F687-4f45-9708-019B960494DF}">
-                  <a14:hiddenLine xmlns:a14="http://schemas.microsoft.com/office/drawing/2010/main" xmlns:p14="http://schemas.microsoft.com/office/powerpoint/2010/main" xmlns:a16="http://schemas.microsoft.com/office/drawing/2014/main" xmlns="" w="9525">
+                  <a14:hiddenLine xmlns="" xmlns:a16="http://schemas.microsoft.com/office/drawing/2014/main" xmlns:p14="http://schemas.microsoft.com/office/powerpoint/2010/main" xmlns:a14="http://schemas.microsoft.com/office/drawing/2010/main" w="9525">
                     <a:solidFill>
                       <a:srgbClr val="000000"/>
                     </a:solidFill>
@@ -26223,7 +26223,7 @@
               </a:ln>
               <a:extLst>
                 <a:ext uri="{91240B29-F687-4f45-9708-019B960494DF}">
-                  <a14:hiddenLine xmlns:a14="http://schemas.microsoft.com/office/drawing/2010/main" xmlns:p14="http://schemas.microsoft.com/office/powerpoint/2010/main" xmlns:a16="http://schemas.microsoft.com/office/drawing/2014/main" xmlns="" w="9525">
+                  <a14:hiddenLine xmlns="" xmlns:a16="http://schemas.microsoft.com/office/drawing/2014/main" xmlns:p14="http://schemas.microsoft.com/office/powerpoint/2010/main" xmlns:a14="http://schemas.microsoft.com/office/drawing/2010/main" w="9525">
                     <a:solidFill>
                       <a:srgbClr val="000000"/>
                     </a:solidFill>
@@ -26328,7 +26328,7 @@
               </a:ln>
               <a:extLst>
                 <a:ext uri="{91240B29-F687-4f45-9708-019B960494DF}">
-                  <a14:hiddenLine xmlns:a14="http://schemas.microsoft.com/office/drawing/2010/main" xmlns:p14="http://schemas.microsoft.com/office/powerpoint/2010/main" xmlns:a16="http://schemas.microsoft.com/office/drawing/2014/main" xmlns="" w="9525">
+                  <a14:hiddenLine xmlns="" xmlns:a16="http://schemas.microsoft.com/office/drawing/2014/main" xmlns:p14="http://schemas.microsoft.com/office/powerpoint/2010/main" xmlns:a14="http://schemas.microsoft.com/office/drawing/2010/main" w="9525">
                     <a:solidFill>
                       <a:srgbClr val="000000"/>
                     </a:solidFill>
@@ -26405,7 +26405,7 @@
               </a:ln>
               <a:extLst>
                 <a:ext uri="{91240B29-F687-4f45-9708-019B960494DF}">
-                  <a14:hiddenLine xmlns:a14="http://schemas.microsoft.com/office/drawing/2010/main" xmlns:p14="http://schemas.microsoft.com/office/powerpoint/2010/main" xmlns:a16="http://schemas.microsoft.com/office/drawing/2014/main" xmlns="" w="9525">
+                  <a14:hiddenLine xmlns="" xmlns:a16="http://schemas.microsoft.com/office/drawing/2014/main" xmlns:p14="http://schemas.microsoft.com/office/powerpoint/2010/main" xmlns:a14="http://schemas.microsoft.com/office/drawing/2010/main" w="9525">
                     <a:solidFill>
                       <a:srgbClr val="000000"/>
                     </a:solidFill>
@@ -26482,7 +26482,7 @@
               </a:ln>
               <a:extLst>
                 <a:ext uri="{91240B29-F687-4f45-9708-019B960494DF}">
-                  <a14:hiddenLine xmlns:a14="http://schemas.microsoft.com/office/drawing/2010/main" xmlns:p14="http://schemas.microsoft.com/office/powerpoint/2010/main" xmlns:a16="http://schemas.microsoft.com/office/drawing/2014/main" xmlns="" w="9525">
+                  <a14:hiddenLine xmlns="" xmlns:a16="http://schemas.microsoft.com/office/drawing/2014/main" xmlns:p14="http://schemas.microsoft.com/office/powerpoint/2010/main" xmlns:a14="http://schemas.microsoft.com/office/drawing/2010/main" w="9525">
                     <a:solidFill>
                       <a:srgbClr val="000000"/>
                     </a:solidFill>
@@ -26587,7 +26587,7 @@
               </a:ln>
               <a:extLst>
                 <a:ext uri="{91240B29-F687-4f45-9708-019B960494DF}">
-                  <a14:hiddenLine xmlns:a14="http://schemas.microsoft.com/office/drawing/2010/main" xmlns:p14="http://schemas.microsoft.com/office/powerpoint/2010/main" xmlns:a16="http://schemas.microsoft.com/office/drawing/2014/main" xmlns="" w="9525">
+                  <a14:hiddenLine xmlns="" xmlns:a16="http://schemas.microsoft.com/office/drawing/2014/main" xmlns:p14="http://schemas.microsoft.com/office/powerpoint/2010/main" xmlns:a14="http://schemas.microsoft.com/office/drawing/2010/main" w="9525">
                     <a:solidFill>
                       <a:srgbClr val="000000"/>
                     </a:solidFill>
@@ -26692,7 +26692,7 @@
               </a:ln>
               <a:extLst>
                 <a:ext uri="{91240B29-F687-4f45-9708-019B960494DF}">
-                  <a14:hiddenLine xmlns:a14="http://schemas.microsoft.com/office/drawing/2010/main" xmlns:p14="http://schemas.microsoft.com/office/powerpoint/2010/main" xmlns:a16="http://schemas.microsoft.com/office/drawing/2014/main" xmlns="" w="9525">
+                  <a14:hiddenLine xmlns="" xmlns:a16="http://schemas.microsoft.com/office/drawing/2014/main" xmlns:p14="http://schemas.microsoft.com/office/powerpoint/2010/main" xmlns:a14="http://schemas.microsoft.com/office/drawing/2010/main" w="9525">
                     <a:solidFill>
                       <a:srgbClr val="000000"/>
                     </a:solidFill>
@@ -26769,7 +26769,7 @@
               </a:ln>
               <a:extLst>
                 <a:ext uri="{91240B29-F687-4f45-9708-019B960494DF}">
-                  <a14:hiddenLine xmlns:a14="http://schemas.microsoft.com/office/drawing/2010/main" xmlns:p14="http://schemas.microsoft.com/office/powerpoint/2010/main" xmlns:a16="http://schemas.microsoft.com/office/drawing/2014/main" xmlns="" w="9525">
+                  <a14:hiddenLine xmlns="" xmlns:a16="http://schemas.microsoft.com/office/drawing/2014/main" xmlns:p14="http://schemas.microsoft.com/office/powerpoint/2010/main" xmlns:a14="http://schemas.microsoft.com/office/drawing/2010/main" w="9525">
                     <a:solidFill>
                       <a:srgbClr val="000000"/>
                     </a:solidFill>
@@ -26894,7 +26894,7 @@
               </a:ln>
               <a:extLst>
                 <a:ext uri="{91240B29-F687-4f45-9708-019B960494DF}">
-                  <a14:hiddenLine xmlns:a14="http://schemas.microsoft.com/office/drawing/2010/main" xmlns:p14="http://schemas.microsoft.com/office/powerpoint/2010/main" xmlns:a16="http://schemas.microsoft.com/office/drawing/2014/main" xmlns="" w="9525">
+                  <a14:hiddenLine xmlns="" xmlns:a16="http://schemas.microsoft.com/office/drawing/2014/main" xmlns:p14="http://schemas.microsoft.com/office/powerpoint/2010/main" xmlns:a14="http://schemas.microsoft.com/office/drawing/2010/main" w="9525">
                     <a:solidFill>
                       <a:srgbClr val="000000"/>
                     </a:solidFill>
@@ -27008,7 +27008,7 @@
               </a:ln>
               <a:extLst>
                 <a:ext uri="{91240B29-F687-4f45-9708-019B960494DF}">
-                  <a14:hiddenLine xmlns:a14="http://schemas.microsoft.com/office/drawing/2010/main" xmlns:p14="http://schemas.microsoft.com/office/powerpoint/2010/main" xmlns:a16="http://schemas.microsoft.com/office/drawing/2014/main" xmlns="" w="9525">
+                  <a14:hiddenLine xmlns="" xmlns:a16="http://schemas.microsoft.com/office/drawing/2014/main" xmlns:p14="http://schemas.microsoft.com/office/powerpoint/2010/main" xmlns:a14="http://schemas.microsoft.com/office/drawing/2010/main" w="9525">
                     <a:solidFill>
                       <a:srgbClr val="000000"/>
                     </a:solidFill>
@@ -27085,7 +27085,7 @@
               </a:ln>
               <a:extLst>
                 <a:ext uri="{91240B29-F687-4f45-9708-019B960494DF}">
-                  <a14:hiddenLine xmlns:a14="http://schemas.microsoft.com/office/drawing/2010/main" xmlns:p14="http://schemas.microsoft.com/office/powerpoint/2010/main" xmlns:a16="http://schemas.microsoft.com/office/drawing/2014/main" xmlns="" w="9525">
+                  <a14:hiddenLine xmlns="" xmlns:a16="http://schemas.microsoft.com/office/drawing/2014/main" xmlns:p14="http://schemas.microsoft.com/office/powerpoint/2010/main" xmlns:a14="http://schemas.microsoft.com/office/drawing/2010/main" w="9525">
                     <a:solidFill>
                       <a:srgbClr val="000000"/>
                     </a:solidFill>
@@ -27162,7 +27162,7 @@
               </a:ln>
               <a:extLst>
                 <a:ext uri="{91240B29-F687-4f45-9708-019B960494DF}">
-                  <a14:hiddenLine xmlns:a14="http://schemas.microsoft.com/office/drawing/2010/main" xmlns:p14="http://schemas.microsoft.com/office/powerpoint/2010/main" xmlns:a16="http://schemas.microsoft.com/office/drawing/2014/main" xmlns="" w="9525">
+                  <a14:hiddenLine xmlns="" xmlns:a16="http://schemas.microsoft.com/office/drawing/2014/main" xmlns:p14="http://schemas.microsoft.com/office/powerpoint/2010/main" xmlns:a14="http://schemas.microsoft.com/office/drawing/2010/main" w="9525">
                     <a:solidFill>
                       <a:srgbClr val="000000"/>
                     </a:solidFill>
@@ -27267,7 +27267,7 @@
               </a:ln>
               <a:extLst>
                 <a:ext uri="{91240B29-F687-4f45-9708-019B960494DF}">
-                  <a14:hiddenLine xmlns:a14="http://schemas.microsoft.com/office/drawing/2010/main" xmlns:p14="http://schemas.microsoft.com/office/powerpoint/2010/main" xmlns:a16="http://schemas.microsoft.com/office/drawing/2014/main" xmlns="" w="9525">
+                  <a14:hiddenLine xmlns="" xmlns:a16="http://schemas.microsoft.com/office/drawing/2014/main" xmlns:p14="http://schemas.microsoft.com/office/powerpoint/2010/main" xmlns:a14="http://schemas.microsoft.com/office/drawing/2010/main" w="9525">
                     <a:solidFill>
                       <a:srgbClr val="000000"/>
                     </a:solidFill>
@@ -27316,7 +27316,7 @@
               </a:ln>
               <a:extLst>
                 <a:ext uri="{91240B29-F687-4f45-9708-019B960494DF}">
-                  <a14:hiddenLine xmlns:a14="http://schemas.microsoft.com/office/drawing/2010/main" xmlns:p14="http://schemas.microsoft.com/office/powerpoint/2010/main" xmlns:a16="http://schemas.microsoft.com/office/drawing/2014/main" xmlns="" w="9525">
+                  <a14:hiddenLine xmlns="" xmlns:a16="http://schemas.microsoft.com/office/drawing/2014/main" xmlns:p14="http://schemas.microsoft.com/office/powerpoint/2010/main" xmlns:a14="http://schemas.microsoft.com/office/drawing/2010/main" w="9525">
                     <a:solidFill>
                       <a:srgbClr val="000000"/>
                     </a:solidFill>
@@ -27396,7 +27396,7 @@
               </a:ln>
               <a:extLst>
                 <a:ext uri="{91240B29-F687-4f45-9708-019B960494DF}">
-                  <a14:hiddenLine xmlns:a14="http://schemas.microsoft.com/office/drawing/2010/main" xmlns:p14="http://schemas.microsoft.com/office/powerpoint/2010/main" xmlns:a16="http://schemas.microsoft.com/office/drawing/2014/main" xmlns="" w="9525">
+                  <a14:hiddenLine xmlns="" xmlns:a16="http://schemas.microsoft.com/office/drawing/2014/main" xmlns:p14="http://schemas.microsoft.com/office/powerpoint/2010/main" xmlns:a14="http://schemas.microsoft.com/office/drawing/2010/main" w="9525">
                     <a:solidFill>
                       <a:srgbClr val="000000"/>
                     </a:solidFill>
@@ -27501,7 +27501,7 @@
               </a:ln>
               <a:extLst>
                 <a:ext uri="{91240B29-F687-4f45-9708-019B960494DF}">
-                  <a14:hiddenLine xmlns:a14="http://schemas.microsoft.com/office/drawing/2010/main" xmlns:p14="http://schemas.microsoft.com/office/powerpoint/2010/main" xmlns:a16="http://schemas.microsoft.com/office/drawing/2014/main" xmlns="" w="9525">
+                  <a14:hiddenLine xmlns="" xmlns:a16="http://schemas.microsoft.com/office/drawing/2014/main" xmlns:p14="http://schemas.microsoft.com/office/powerpoint/2010/main" xmlns:a14="http://schemas.microsoft.com/office/drawing/2010/main" w="9525">
                     <a:solidFill>
                       <a:srgbClr val="000000"/>
                     </a:solidFill>
@@ -27578,7 +27578,7 @@
               </a:ln>
               <a:extLst>
                 <a:ext uri="{91240B29-F687-4f45-9708-019B960494DF}">
-                  <a14:hiddenLine xmlns:a14="http://schemas.microsoft.com/office/drawing/2010/main" xmlns:p14="http://schemas.microsoft.com/office/powerpoint/2010/main" xmlns:a16="http://schemas.microsoft.com/office/drawing/2014/main" xmlns="" w="9525">
+                  <a14:hiddenLine xmlns="" xmlns:a16="http://schemas.microsoft.com/office/drawing/2014/main" xmlns:p14="http://schemas.microsoft.com/office/powerpoint/2010/main" xmlns:a14="http://schemas.microsoft.com/office/drawing/2010/main" w="9525">
                     <a:solidFill>
                       <a:srgbClr val="000000"/>
                     </a:solidFill>
@@ -27683,7 +27683,7 @@
               </a:ln>
               <a:extLst>
                 <a:ext uri="{91240B29-F687-4f45-9708-019B960494DF}">
-                  <a14:hiddenLine xmlns:a14="http://schemas.microsoft.com/office/drawing/2010/main" xmlns:p14="http://schemas.microsoft.com/office/powerpoint/2010/main" xmlns:a16="http://schemas.microsoft.com/office/drawing/2014/main" xmlns="" w="9525">
+                  <a14:hiddenLine xmlns="" xmlns:a16="http://schemas.microsoft.com/office/drawing/2014/main" xmlns:p14="http://schemas.microsoft.com/office/powerpoint/2010/main" xmlns:a14="http://schemas.microsoft.com/office/drawing/2010/main" w="9525">
                     <a:solidFill>
                       <a:srgbClr val="000000"/>
                     </a:solidFill>
@@ -27763,7 +27763,7 @@
               </a:ln>
               <a:extLst>
                 <a:ext uri="{91240B29-F687-4f45-9708-019B960494DF}">
-                  <a14:hiddenLine xmlns:a14="http://schemas.microsoft.com/office/drawing/2010/main" xmlns:p14="http://schemas.microsoft.com/office/powerpoint/2010/main" xmlns:a16="http://schemas.microsoft.com/office/drawing/2014/main" xmlns="" w="9525">
+                  <a14:hiddenLine xmlns="" xmlns:a16="http://schemas.microsoft.com/office/drawing/2014/main" xmlns:p14="http://schemas.microsoft.com/office/powerpoint/2010/main" xmlns:a14="http://schemas.microsoft.com/office/drawing/2010/main" w="9525">
                     <a:solidFill>
                       <a:srgbClr val="000000"/>
                     </a:solidFill>
@@ -27840,7 +27840,7 @@
               </a:ln>
               <a:extLst>
                 <a:ext uri="{91240B29-F687-4f45-9708-019B960494DF}">
-                  <a14:hiddenLine xmlns:a14="http://schemas.microsoft.com/office/drawing/2010/main" xmlns:p14="http://schemas.microsoft.com/office/powerpoint/2010/main" xmlns:a16="http://schemas.microsoft.com/office/drawing/2014/main" xmlns="" w="9525">
+                  <a14:hiddenLine xmlns="" xmlns:a16="http://schemas.microsoft.com/office/drawing/2014/main" xmlns:p14="http://schemas.microsoft.com/office/powerpoint/2010/main" xmlns:a14="http://schemas.microsoft.com/office/drawing/2010/main" w="9525">
                     <a:solidFill>
                       <a:srgbClr val="000000"/>
                     </a:solidFill>
@@ -27945,7 +27945,7 @@
               </a:ln>
               <a:extLst>
                 <a:ext uri="{91240B29-F687-4f45-9708-019B960494DF}">
-                  <a14:hiddenLine xmlns:a14="http://schemas.microsoft.com/office/drawing/2010/main" xmlns:p14="http://schemas.microsoft.com/office/powerpoint/2010/main" xmlns:a16="http://schemas.microsoft.com/office/drawing/2014/main" xmlns="" w="9525">
+                  <a14:hiddenLine xmlns="" xmlns:a16="http://schemas.microsoft.com/office/drawing/2014/main" xmlns:p14="http://schemas.microsoft.com/office/powerpoint/2010/main" xmlns:a14="http://schemas.microsoft.com/office/drawing/2010/main" w="9525">
                     <a:solidFill>
                       <a:srgbClr val="000000"/>
                     </a:solidFill>
@@ -28050,7 +28050,7 @@
               </a:ln>
               <a:extLst>
                 <a:ext uri="{91240B29-F687-4f45-9708-019B960494DF}">
-                  <a14:hiddenLine xmlns:a14="http://schemas.microsoft.com/office/drawing/2010/main" xmlns:p14="http://schemas.microsoft.com/office/powerpoint/2010/main" xmlns:a16="http://schemas.microsoft.com/office/drawing/2014/main" xmlns="" w="9525">
+                  <a14:hiddenLine xmlns="" xmlns:a16="http://schemas.microsoft.com/office/drawing/2014/main" xmlns:p14="http://schemas.microsoft.com/office/powerpoint/2010/main" xmlns:a14="http://schemas.microsoft.com/office/drawing/2010/main" w="9525">
                     <a:solidFill>
                       <a:srgbClr val="000000"/>
                     </a:solidFill>
@@ -28130,7 +28130,7 @@
               </a:ln>
               <a:extLst>
                 <a:ext uri="{91240B29-F687-4f45-9708-019B960494DF}">
-                  <a14:hiddenLine xmlns:a14="http://schemas.microsoft.com/office/drawing/2010/main" xmlns:p14="http://schemas.microsoft.com/office/powerpoint/2010/main" xmlns:a16="http://schemas.microsoft.com/office/drawing/2014/main" xmlns="" w="9525">
+                  <a14:hiddenLine xmlns="" xmlns:a16="http://schemas.microsoft.com/office/drawing/2014/main" xmlns:p14="http://schemas.microsoft.com/office/powerpoint/2010/main" xmlns:a14="http://schemas.microsoft.com/office/drawing/2010/main" w="9525">
                     <a:solidFill>
                       <a:srgbClr val="000000"/>
                     </a:solidFill>
@@ -28265,7 +28265,7 @@
               </a:ln>
               <a:extLst>
                 <a:ext uri="{91240B29-F687-4f45-9708-019B960494DF}">
-                  <a14:hiddenLine xmlns:a14="http://schemas.microsoft.com/office/drawing/2010/main" xmlns:p14="http://schemas.microsoft.com/office/powerpoint/2010/main" xmlns:a16="http://schemas.microsoft.com/office/drawing/2014/main" xmlns="" w="9525">
+                  <a14:hiddenLine xmlns="" xmlns:a16="http://schemas.microsoft.com/office/drawing/2014/main" xmlns:p14="http://schemas.microsoft.com/office/powerpoint/2010/main" xmlns:a14="http://schemas.microsoft.com/office/drawing/2010/main" w="9525">
                     <a:solidFill>
                       <a:srgbClr val="000000"/>
                     </a:solidFill>
@@ -28393,7 +28393,7 @@
               </a:ln>
               <a:extLst>
                 <a:ext uri="{91240B29-F687-4f45-9708-019B960494DF}">
-                  <a14:hiddenLine xmlns:a14="http://schemas.microsoft.com/office/drawing/2010/main" xmlns:p14="http://schemas.microsoft.com/office/powerpoint/2010/main" xmlns:a16="http://schemas.microsoft.com/office/drawing/2014/main" xmlns="" w="9525">
+                  <a14:hiddenLine xmlns="" xmlns:a16="http://schemas.microsoft.com/office/drawing/2014/main" xmlns:p14="http://schemas.microsoft.com/office/powerpoint/2010/main" xmlns:a14="http://schemas.microsoft.com/office/drawing/2010/main" w="9525">
                     <a:solidFill>
                       <a:srgbClr val="000000"/>
                     </a:solidFill>
@@ -28523,7 +28523,7 @@
               </a:ln>
               <a:extLst>
                 <a:ext uri="{91240B29-F687-4f45-9708-019B960494DF}">
-                  <a14:hiddenLine xmlns:a14="http://schemas.microsoft.com/office/drawing/2010/main" xmlns:p14="http://schemas.microsoft.com/office/powerpoint/2010/main" xmlns:a16="http://schemas.microsoft.com/office/drawing/2014/main" xmlns="" w="9525">
+                  <a14:hiddenLine xmlns="" xmlns:a16="http://schemas.microsoft.com/office/drawing/2014/main" xmlns:p14="http://schemas.microsoft.com/office/powerpoint/2010/main" xmlns:a14="http://schemas.microsoft.com/office/drawing/2010/main" w="9525">
                     <a:solidFill>
                       <a:srgbClr val="000000"/>
                     </a:solidFill>
@@ -28628,7 +28628,7 @@
               </a:ln>
               <a:extLst>
                 <a:ext uri="{91240B29-F687-4f45-9708-019B960494DF}">
-                  <a14:hiddenLine xmlns:a14="http://schemas.microsoft.com/office/drawing/2010/main" xmlns:p14="http://schemas.microsoft.com/office/powerpoint/2010/main" xmlns:a16="http://schemas.microsoft.com/office/drawing/2014/main" xmlns="" w="9525">
+                  <a14:hiddenLine xmlns="" xmlns:a16="http://schemas.microsoft.com/office/drawing/2014/main" xmlns:p14="http://schemas.microsoft.com/office/powerpoint/2010/main" xmlns:a14="http://schemas.microsoft.com/office/drawing/2010/main" w="9525">
                     <a:solidFill>
                       <a:srgbClr val="000000"/>
                     </a:solidFill>
@@ -28708,7 +28708,7 @@
               </a:ln>
               <a:extLst>
                 <a:ext uri="{91240B29-F687-4f45-9708-019B960494DF}">
-                  <a14:hiddenLine xmlns:a14="http://schemas.microsoft.com/office/drawing/2010/main" xmlns:p14="http://schemas.microsoft.com/office/powerpoint/2010/main" xmlns:a16="http://schemas.microsoft.com/office/drawing/2014/main" xmlns="" w="9525">
+                  <a14:hiddenLine xmlns="" xmlns:a16="http://schemas.microsoft.com/office/drawing/2014/main" xmlns:p14="http://schemas.microsoft.com/office/powerpoint/2010/main" xmlns:a14="http://schemas.microsoft.com/office/drawing/2010/main" w="9525">
                     <a:solidFill>
                       <a:srgbClr val="000000"/>
                     </a:solidFill>
@@ -28813,7 +28813,7 @@
               </a:ln>
               <a:extLst>
                 <a:ext uri="{91240B29-F687-4f45-9708-019B960494DF}">
-                  <a14:hiddenLine xmlns:a14="http://schemas.microsoft.com/office/drawing/2010/main" xmlns:p14="http://schemas.microsoft.com/office/powerpoint/2010/main" xmlns:a16="http://schemas.microsoft.com/office/drawing/2014/main" xmlns="" w="9525">
+                  <a14:hiddenLine xmlns="" xmlns:a16="http://schemas.microsoft.com/office/drawing/2014/main" xmlns:p14="http://schemas.microsoft.com/office/powerpoint/2010/main" xmlns:a14="http://schemas.microsoft.com/office/drawing/2010/main" w="9525">
                     <a:solidFill>
                       <a:srgbClr val="000000"/>
                     </a:solidFill>
@@ -28896,7 +28896,7 @@
               </a:ln>
               <a:extLst>
                 <a:ext uri="{91240B29-F687-4f45-9708-019B960494DF}">
-                  <a14:hiddenLine xmlns:a14="http://schemas.microsoft.com/office/drawing/2010/main" xmlns:p14="http://schemas.microsoft.com/office/powerpoint/2010/main" xmlns:a16="http://schemas.microsoft.com/office/drawing/2014/main" xmlns="" w="9525">
+                  <a14:hiddenLine xmlns="" xmlns:a16="http://schemas.microsoft.com/office/drawing/2014/main" xmlns:p14="http://schemas.microsoft.com/office/powerpoint/2010/main" xmlns:a14="http://schemas.microsoft.com/office/drawing/2010/main" w="9525">
                     <a:solidFill>
                       <a:srgbClr val="000000"/>
                     </a:solidFill>
@@ -29001,7 +29001,7 @@
               </a:ln>
               <a:extLst>
                 <a:ext uri="{91240B29-F687-4f45-9708-019B960494DF}">
-                  <a14:hiddenLine xmlns:a14="http://schemas.microsoft.com/office/drawing/2010/main" xmlns:p14="http://schemas.microsoft.com/office/powerpoint/2010/main" xmlns:a16="http://schemas.microsoft.com/office/drawing/2014/main" xmlns="" w="9525">
+                  <a14:hiddenLine xmlns="" xmlns:a16="http://schemas.microsoft.com/office/drawing/2014/main" xmlns:p14="http://schemas.microsoft.com/office/powerpoint/2010/main" xmlns:a14="http://schemas.microsoft.com/office/drawing/2010/main" w="9525">
                     <a:solidFill>
                       <a:srgbClr val="000000"/>
                     </a:solidFill>
@@ -29084,7 +29084,7 @@
               </a:ln>
               <a:extLst>
                 <a:ext uri="{91240B29-F687-4f45-9708-019B960494DF}">
-                  <a14:hiddenLine xmlns:a14="http://schemas.microsoft.com/office/drawing/2010/main" xmlns:p14="http://schemas.microsoft.com/office/powerpoint/2010/main" xmlns:a16="http://schemas.microsoft.com/office/drawing/2014/main" xmlns="" w="9525">
+                  <a14:hiddenLine xmlns="" xmlns:a16="http://schemas.microsoft.com/office/drawing/2014/main" xmlns:p14="http://schemas.microsoft.com/office/powerpoint/2010/main" xmlns:a14="http://schemas.microsoft.com/office/drawing/2010/main" w="9525">
                     <a:solidFill>
                       <a:srgbClr val="000000"/>
                     </a:solidFill>
@@ -29189,7 +29189,7 @@
               </a:ln>
               <a:extLst>
                 <a:ext uri="{91240B29-F687-4f45-9708-019B960494DF}">
-                  <a14:hiddenLine xmlns:a14="http://schemas.microsoft.com/office/drawing/2010/main" xmlns:p14="http://schemas.microsoft.com/office/powerpoint/2010/main" xmlns:a16="http://schemas.microsoft.com/office/drawing/2014/main" xmlns="" w="9525">
+                  <a14:hiddenLine xmlns="" xmlns:a16="http://schemas.microsoft.com/office/drawing/2014/main" xmlns:p14="http://schemas.microsoft.com/office/powerpoint/2010/main" xmlns:a14="http://schemas.microsoft.com/office/drawing/2010/main" w="9525">
                     <a:solidFill>
                       <a:srgbClr val="000000"/>
                     </a:solidFill>
@@ -29238,7 +29238,7 @@
               </a:ln>
               <a:extLst>
                 <a:ext uri="{91240B29-F687-4f45-9708-019B960494DF}">
-                  <a14:hiddenLine xmlns:a14="http://schemas.microsoft.com/office/drawing/2010/main" xmlns:p14="http://schemas.microsoft.com/office/powerpoint/2010/main" xmlns:a16="http://schemas.microsoft.com/office/drawing/2014/main" xmlns="" w="9525">
+                  <a14:hiddenLine xmlns="" xmlns:a16="http://schemas.microsoft.com/office/drawing/2014/main" xmlns:p14="http://schemas.microsoft.com/office/powerpoint/2010/main" xmlns:a14="http://schemas.microsoft.com/office/drawing/2010/main" w="9525">
                     <a:solidFill>
                       <a:srgbClr val="000000"/>
                     </a:solidFill>
@@ -29358,7 +29358,7 @@
           </a:prstGeom>
           <a:extLst>
             <a:ext uri="{909E8E84-426E-40dd-AFC4-6F175D3DCCD1}">
-              <a14:hiddenFill xmlns:a14="http://schemas.microsoft.com/office/drawing/2010/main" xmlns:p14="http://schemas.microsoft.com/office/powerpoint/2010/main" xmlns:a16="http://schemas.microsoft.com/office/drawing/2014/main" xmlns="">
+              <a14:hiddenFill xmlns="" xmlns:a16="http://schemas.microsoft.com/office/drawing/2014/main" xmlns:p14="http://schemas.microsoft.com/office/powerpoint/2010/main" xmlns:a14="http://schemas.microsoft.com/office/drawing/2010/main">
                 <a:solidFill>
                   <a:srgbClr val="FFFFFF"/>
                 </a:solidFill>
@@ -29482,7 +29482,7 @@
           <a:noFill/>
           <a:extLst>
             <a:ext uri="{909E8E84-426E-40dd-AFC4-6F175D3DCCD1}">
-              <a14:hiddenFill xmlns:a14="http://schemas.microsoft.com/office/drawing/2010/main" xmlns:p14="http://schemas.microsoft.com/office/powerpoint/2010/main" xmlns:a16="http://schemas.microsoft.com/office/drawing/2014/main" xmlns="">
+              <a14:hiddenFill xmlns="" xmlns:a16="http://schemas.microsoft.com/office/drawing/2014/main" xmlns:p14="http://schemas.microsoft.com/office/powerpoint/2010/main" xmlns:a14="http://schemas.microsoft.com/office/drawing/2010/main">
                 <a:solidFill>
                   <a:srgbClr val="FFFFFF"/>
                 </a:solidFill>
@@ -29673,7 +29673,7 @@
             </a:ln>
             <a:extLst>
               <a:ext uri="{91240B29-F687-4f45-9708-019B960494DF}">
-                <a14:hiddenLine xmlns:a14="http://schemas.microsoft.com/office/drawing/2010/main" xmlns:p14="http://schemas.microsoft.com/office/powerpoint/2010/main" xmlns:a16="http://schemas.microsoft.com/office/drawing/2014/main" xmlns="" w="9525">
+                <a14:hiddenLine xmlns="" xmlns:a16="http://schemas.microsoft.com/office/drawing/2014/main" xmlns:p14="http://schemas.microsoft.com/office/powerpoint/2010/main" xmlns:a14="http://schemas.microsoft.com/office/drawing/2010/main" w="9525">
                   <a:solidFill>
                     <a:srgbClr val="000000"/>
                   </a:solidFill>
@@ -29778,7 +29778,7 @@
             </a:ln>
             <a:extLst>
               <a:ext uri="{91240B29-F687-4f45-9708-019B960494DF}">
-                <a14:hiddenLine xmlns:a14="http://schemas.microsoft.com/office/drawing/2010/main" xmlns:p14="http://schemas.microsoft.com/office/powerpoint/2010/main" xmlns:a16="http://schemas.microsoft.com/office/drawing/2014/main" xmlns="" w="9525">
+                <a14:hiddenLine xmlns="" xmlns:a16="http://schemas.microsoft.com/office/drawing/2014/main" xmlns:p14="http://schemas.microsoft.com/office/powerpoint/2010/main" xmlns:a14="http://schemas.microsoft.com/office/drawing/2010/main" w="9525">
                   <a:solidFill>
                     <a:srgbClr val="000000"/>
                   </a:solidFill>
@@ -29883,7 +29883,7 @@
             </a:ln>
             <a:extLst>
               <a:ext uri="{91240B29-F687-4f45-9708-019B960494DF}">
-                <a14:hiddenLine xmlns:a14="http://schemas.microsoft.com/office/drawing/2010/main" xmlns:p14="http://schemas.microsoft.com/office/powerpoint/2010/main" xmlns:a16="http://schemas.microsoft.com/office/drawing/2014/main" xmlns="" w="9525">
+                <a14:hiddenLine xmlns="" xmlns:a16="http://schemas.microsoft.com/office/drawing/2014/main" xmlns:p14="http://schemas.microsoft.com/office/powerpoint/2010/main" xmlns:a14="http://schemas.microsoft.com/office/drawing/2010/main" w="9525">
                   <a:solidFill>
                     <a:srgbClr val="000000"/>
                   </a:solidFill>
@@ -29960,7 +29960,7 @@
             </a:ln>
             <a:extLst>
               <a:ext uri="{91240B29-F687-4f45-9708-019B960494DF}">
-                <a14:hiddenLine xmlns:a14="http://schemas.microsoft.com/office/drawing/2010/main" xmlns:p14="http://schemas.microsoft.com/office/powerpoint/2010/main" xmlns:a16="http://schemas.microsoft.com/office/drawing/2014/main" xmlns="" w="9525">
+                <a14:hiddenLine xmlns="" xmlns:a16="http://schemas.microsoft.com/office/drawing/2014/main" xmlns:p14="http://schemas.microsoft.com/office/powerpoint/2010/main" xmlns:a14="http://schemas.microsoft.com/office/drawing/2010/main" w="9525">
                   <a:solidFill>
                     <a:srgbClr val="000000"/>
                   </a:solidFill>
@@ -30065,7 +30065,7 @@
             </a:ln>
             <a:extLst>
               <a:ext uri="{91240B29-F687-4f45-9708-019B960494DF}">
-                <a14:hiddenLine xmlns:a14="http://schemas.microsoft.com/office/drawing/2010/main" xmlns:p14="http://schemas.microsoft.com/office/powerpoint/2010/main" xmlns:a16="http://schemas.microsoft.com/office/drawing/2014/main" xmlns="" w="9525">
+                <a14:hiddenLine xmlns="" xmlns:a16="http://schemas.microsoft.com/office/drawing/2014/main" xmlns:p14="http://schemas.microsoft.com/office/powerpoint/2010/main" xmlns:a14="http://schemas.microsoft.com/office/drawing/2010/main" w="9525">
                   <a:solidFill>
                     <a:srgbClr val="000000"/>
                   </a:solidFill>
@@ -30142,7 +30142,7 @@
             </a:ln>
             <a:extLst>
               <a:ext uri="{91240B29-F687-4f45-9708-019B960494DF}">
-                <a14:hiddenLine xmlns:a14="http://schemas.microsoft.com/office/drawing/2010/main" xmlns:p14="http://schemas.microsoft.com/office/powerpoint/2010/main" xmlns:a16="http://schemas.microsoft.com/office/drawing/2014/main" xmlns="" w="9525">
+                <a14:hiddenLine xmlns="" xmlns:a16="http://schemas.microsoft.com/office/drawing/2014/main" xmlns:p14="http://schemas.microsoft.com/office/powerpoint/2010/main" xmlns:a14="http://schemas.microsoft.com/office/drawing/2010/main" w="9525">
                   <a:solidFill>
                     <a:srgbClr val="000000"/>
                   </a:solidFill>
@@ -30219,7 +30219,7 @@
             </a:ln>
             <a:extLst>
               <a:ext uri="{91240B29-F687-4f45-9708-019B960494DF}">
-                <a14:hiddenLine xmlns:a14="http://schemas.microsoft.com/office/drawing/2010/main" xmlns:p14="http://schemas.microsoft.com/office/powerpoint/2010/main" xmlns:a16="http://schemas.microsoft.com/office/drawing/2014/main" xmlns="" w="9525">
+                <a14:hiddenLine xmlns="" xmlns:a16="http://schemas.microsoft.com/office/drawing/2014/main" xmlns:p14="http://schemas.microsoft.com/office/powerpoint/2010/main" xmlns:a14="http://schemas.microsoft.com/office/drawing/2010/main" w="9525">
                   <a:solidFill>
                     <a:srgbClr val="000000"/>
                   </a:solidFill>
@@ -30324,7 +30324,7 @@
             </a:ln>
             <a:extLst>
               <a:ext uri="{91240B29-F687-4f45-9708-019B960494DF}">
-                <a14:hiddenLine xmlns:a14="http://schemas.microsoft.com/office/drawing/2010/main" xmlns:p14="http://schemas.microsoft.com/office/powerpoint/2010/main" xmlns:a16="http://schemas.microsoft.com/office/drawing/2014/main" xmlns="" w="9525">
+                <a14:hiddenLine xmlns="" xmlns:a16="http://schemas.microsoft.com/office/drawing/2014/main" xmlns:p14="http://schemas.microsoft.com/office/powerpoint/2010/main" xmlns:a14="http://schemas.microsoft.com/office/drawing/2010/main" w="9525">
                   <a:solidFill>
                     <a:srgbClr val="000000"/>
                   </a:solidFill>
@@ -30429,7 +30429,7 @@
             </a:ln>
             <a:extLst>
               <a:ext uri="{91240B29-F687-4f45-9708-019B960494DF}">
-                <a14:hiddenLine xmlns:a14="http://schemas.microsoft.com/office/drawing/2010/main" xmlns:p14="http://schemas.microsoft.com/office/powerpoint/2010/main" xmlns:a16="http://schemas.microsoft.com/office/drawing/2014/main" xmlns="" w="9525">
+                <a14:hiddenLine xmlns="" xmlns:a16="http://schemas.microsoft.com/office/drawing/2014/main" xmlns:p14="http://schemas.microsoft.com/office/powerpoint/2010/main" xmlns:a14="http://schemas.microsoft.com/office/drawing/2010/main" w="9525">
                   <a:solidFill>
                     <a:srgbClr val="000000"/>
                   </a:solidFill>
@@ -30506,7 +30506,7 @@
             </a:ln>
             <a:extLst>
               <a:ext uri="{91240B29-F687-4f45-9708-019B960494DF}">
-                <a14:hiddenLine xmlns:a14="http://schemas.microsoft.com/office/drawing/2010/main" xmlns:p14="http://schemas.microsoft.com/office/powerpoint/2010/main" xmlns:a16="http://schemas.microsoft.com/office/drawing/2014/main" xmlns="" w="9525">
+                <a14:hiddenLine xmlns="" xmlns:a16="http://schemas.microsoft.com/office/drawing/2014/main" xmlns:p14="http://schemas.microsoft.com/office/powerpoint/2010/main" xmlns:a14="http://schemas.microsoft.com/office/drawing/2010/main" w="9525">
                   <a:solidFill>
                     <a:srgbClr val="000000"/>
                   </a:solidFill>
@@ -30631,7 +30631,7 @@
             </a:ln>
             <a:extLst>
               <a:ext uri="{91240B29-F687-4f45-9708-019B960494DF}">
-                <a14:hiddenLine xmlns:a14="http://schemas.microsoft.com/office/drawing/2010/main" xmlns:p14="http://schemas.microsoft.com/office/powerpoint/2010/main" xmlns:a16="http://schemas.microsoft.com/office/drawing/2014/main" xmlns="" w="9525">
+                <a14:hiddenLine xmlns="" xmlns:a16="http://schemas.microsoft.com/office/drawing/2014/main" xmlns:p14="http://schemas.microsoft.com/office/powerpoint/2010/main" xmlns:a14="http://schemas.microsoft.com/office/drawing/2010/main" w="9525">
                   <a:solidFill>
                     <a:srgbClr val="000000"/>
                   </a:solidFill>
@@ -30745,7 +30745,7 @@
             </a:ln>
             <a:extLst>
               <a:ext uri="{91240B29-F687-4f45-9708-019B960494DF}">
-                <a14:hiddenLine xmlns:a14="http://schemas.microsoft.com/office/drawing/2010/main" xmlns:p14="http://schemas.microsoft.com/office/powerpoint/2010/main" xmlns:a16="http://schemas.microsoft.com/office/drawing/2014/main" xmlns="" w="9525">
+                <a14:hiddenLine xmlns="" xmlns:a16="http://schemas.microsoft.com/office/drawing/2014/main" xmlns:p14="http://schemas.microsoft.com/office/powerpoint/2010/main" xmlns:a14="http://schemas.microsoft.com/office/drawing/2010/main" w="9525">
                   <a:solidFill>
                     <a:srgbClr val="000000"/>
                   </a:solidFill>
@@ -30822,7 +30822,7 @@
             </a:ln>
             <a:extLst>
               <a:ext uri="{91240B29-F687-4f45-9708-019B960494DF}">
-                <a14:hiddenLine xmlns:a14="http://schemas.microsoft.com/office/drawing/2010/main" xmlns:p14="http://schemas.microsoft.com/office/powerpoint/2010/main" xmlns:a16="http://schemas.microsoft.com/office/drawing/2014/main" xmlns="" w="9525">
+                <a14:hiddenLine xmlns="" xmlns:a16="http://schemas.microsoft.com/office/drawing/2014/main" xmlns:p14="http://schemas.microsoft.com/office/powerpoint/2010/main" xmlns:a14="http://schemas.microsoft.com/office/drawing/2010/main" w="9525">
                   <a:solidFill>
                     <a:srgbClr val="000000"/>
                   </a:solidFill>
@@ -30899,7 +30899,7 @@
             </a:ln>
             <a:extLst>
               <a:ext uri="{91240B29-F687-4f45-9708-019B960494DF}">
-                <a14:hiddenLine xmlns:a14="http://schemas.microsoft.com/office/drawing/2010/main" xmlns:p14="http://schemas.microsoft.com/office/powerpoint/2010/main" xmlns:a16="http://schemas.microsoft.com/office/drawing/2014/main" xmlns="" w="9525">
+                <a14:hiddenLine xmlns="" xmlns:a16="http://schemas.microsoft.com/office/drawing/2014/main" xmlns:p14="http://schemas.microsoft.com/office/powerpoint/2010/main" xmlns:a14="http://schemas.microsoft.com/office/drawing/2010/main" w="9525">
                   <a:solidFill>
                     <a:srgbClr val="000000"/>
                   </a:solidFill>
@@ -31004,7 +31004,7 @@
             </a:ln>
             <a:extLst>
               <a:ext uri="{91240B29-F687-4f45-9708-019B960494DF}">
-                <a14:hiddenLine xmlns:a14="http://schemas.microsoft.com/office/drawing/2010/main" xmlns:p14="http://schemas.microsoft.com/office/powerpoint/2010/main" xmlns:a16="http://schemas.microsoft.com/office/drawing/2014/main" xmlns="" w="9525">
+                <a14:hiddenLine xmlns="" xmlns:a16="http://schemas.microsoft.com/office/drawing/2014/main" xmlns:p14="http://schemas.microsoft.com/office/powerpoint/2010/main" xmlns:a14="http://schemas.microsoft.com/office/drawing/2010/main" w="9525">
                   <a:solidFill>
                     <a:srgbClr val="000000"/>
                   </a:solidFill>
@@ -31053,7 +31053,7 @@
             </a:ln>
             <a:extLst>
               <a:ext uri="{91240B29-F687-4f45-9708-019B960494DF}">
-                <a14:hiddenLine xmlns:a14="http://schemas.microsoft.com/office/drawing/2010/main" xmlns:p14="http://schemas.microsoft.com/office/powerpoint/2010/main" xmlns:a16="http://schemas.microsoft.com/office/drawing/2014/main" xmlns="" w="9525">
+                <a14:hiddenLine xmlns="" xmlns:a16="http://schemas.microsoft.com/office/drawing/2014/main" xmlns:p14="http://schemas.microsoft.com/office/powerpoint/2010/main" xmlns:a14="http://schemas.microsoft.com/office/drawing/2010/main" w="9525">
                   <a:solidFill>
                     <a:srgbClr val="000000"/>
                   </a:solidFill>
@@ -31133,7 +31133,7 @@
             </a:ln>
             <a:extLst>
               <a:ext uri="{91240B29-F687-4f45-9708-019B960494DF}">
-                <a14:hiddenLine xmlns:a14="http://schemas.microsoft.com/office/drawing/2010/main" xmlns:p14="http://schemas.microsoft.com/office/powerpoint/2010/main" xmlns:a16="http://schemas.microsoft.com/office/drawing/2014/main" xmlns="" w="9525">
+                <a14:hiddenLine xmlns="" xmlns:a16="http://schemas.microsoft.com/office/drawing/2014/main" xmlns:p14="http://schemas.microsoft.com/office/powerpoint/2010/main" xmlns:a14="http://schemas.microsoft.com/office/drawing/2010/main" w="9525">
                   <a:solidFill>
                     <a:srgbClr val="000000"/>
                   </a:solidFill>
@@ -31238,7 +31238,7 @@
             </a:ln>
             <a:extLst>
               <a:ext uri="{91240B29-F687-4f45-9708-019B960494DF}">
-                <a14:hiddenLine xmlns:a14="http://schemas.microsoft.com/office/drawing/2010/main" xmlns:p14="http://schemas.microsoft.com/office/powerpoint/2010/main" xmlns:a16="http://schemas.microsoft.com/office/drawing/2014/main" xmlns="" w="9525">
+                <a14:hiddenLine xmlns="" xmlns:a16="http://schemas.microsoft.com/office/drawing/2014/main" xmlns:p14="http://schemas.microsoft.com/office/powerpoint/2010/main" xmlns:a14="http://schemas.microsoft.com/office/drawing/2010/main" w="9525">
                   <a:solidFill>
                     <a:srgbClr val="000000"/>
                   </a:solidFill>
@@ -31315,7 +31315,7 @@
             </a:ln>
             <a:extLst>
               <a:ext uri="{91240B29-F687-4f45-9708-019B960494DF}">
-                <a14:hiddenLine xmlns:a14="http://schemas.microsoft.com/office/drawing/2010/main" xmlns:p14="http://schemas.microsoft.com/office/powerpoint/2010/main" xmlns:a16="http://schemas.microsoft.com/office/drawing/2014/main" xmlns="" w="9525">
+                <a14:hiddenLine xmlns="" xmlns:a16="http://schemas.microsoft.com/office/drawing/2014/main" xmlns:p14="http://schemas.microsoft.com/office/powerpoint/2010/main" xmlns:a14="http://schemas.microsoft.com/office/drawing/2010/main" w="9525">
                   <a:solidFill>
                     <a:srgbClr val="000000"/>
                   </a:solidFill>
@@ -31420,7 +31420,7 @@
             </a:ln>
             <a:extLst>
               <a:ext uri="{91240B29-F687-4f45-9708-019B960494DF}">
-                <a14:hiddenLine xmlns:a14="http://schemas.microsoft.com/office/drawing/2010/main" xmlns:p14="http://schemas.microsoft.com/office/powerpoint/2010/main" xmlns:a16="http://schemas.microsoft.com/office/drawing/2014/main" xmlns="" w="9525">
+                <a14:hiddenLine xmlns="" xmlns:a16="http://schemas.microsoft.com/office/drawing/2014/main" xmlns:p14="http://schemas.microsoft.com/office/powerpoint/2010/main" xmlns:a14="http://schemas.microsoft.com/office/drawing/2010/main" w="9525">
                   <a:solidFill>
                     <a:srgbClr val="000000"/>
                   </a:solidFill>
@@ -31500,7 +31500,7 @@
             </a:ln>
             <a:extLst>
               <a:ext uri="{91240B29-F687-4f45-9708-019B960494DF}">
-                <a14:hiddenLine xmlns:a14="http://schemas.microsoft.com/office/drawing/2010/main" xmlns:p14="http://schemas.microsoft.com/office/powerpoint/2010/main" xmlns:a16="http://schemas.microsoft.com/office/drawing/2014/main" xmlns="" w="9525">
+                <a14:hiddenLine xmlns="" xmlns:a16="http://schemas.microsoft.com/office/drawing/2014/main" xmlns:p14="http://schemas.microsoft.com/office/powerpoint/2010/main" xmlns:a14="http://schemas.microsoft.com/office/drawing/2010/main" w="9525">
                   <a:solidFill>
                     <a:srgbClr val="000000"/>
                   </a:solidFill>
@@ -31577,7 +31577,7 @@
             </a:ln>
             <a:extLst>
               <a:ext uri="{91240B29-F687-4f45-9708-019B960494DF}">
-                <a14:hiddenLine xmlns:a14="http://schemas.microsoft.com/office/drawing/2010/main" xmlns:p14="http://schemas.microsoft.com/office/powerpoint/2010/main" xmlns:a16="http://schemas.microsoft.com/office/drawing/2014/main" xmlns="" w="9525">
+                <a14:hiddenLine xmlns="" xmlns:a16="http://schemas.microsoft.com/office/drawing/2014/main" xmlns:p14="http://schemas.microsoft.com/office/powerpoint/2010/main" xmlns:a14="http://schemas.microsoft.com/office/drawing/2010/main" w="9525">
                   <a:solidFill>
                     <a:srgbClr val="000000"/>
                   </a:solidFill>
@@ -31682,7 +31682,7 @@
             </a:ln>
             <a:extLst>
               <a:ext uri="{91240B29-F687-4f45-9708-019B960494DF}">
-                <a14:hiddenLine xmlns:a14="http://schemas.microsoft.com/office/drawing/2010/main" xmlns:p14="http://schemas.microsoft.com/office/powerpoint/2010/main" xmlns:a16="http://schemas.microsoft.com/office/drawing/2014/main" xmlns="" w="9525">
+                <a14:hiddenLine xmlns="" xmlns:a16="http://schemas.microsoft.com/office/drawing/2014/main" xmlns:p14="http://schemas.microsoft.com/office/powerpoint/2010/main" xmlns:a14="http://schemas.microsoft.com/office/drawing/2010/main" w="9525">
                   <a:solidFill>
                     <a:srgbClr val="000000"/>
                   </a:solidFill>
@@ -31787,7 +31787,7 @@
             </a:ln>
             <a:extLst>
               <a:ext uri="{91240B29-F687-4f45-9708-019B960494DF}">
-                <a14:hiddenLine xmlns:a14="http://schemas.microsoft.com/office/drawing/2010/main" xmlns:p14="http://schemas.microsoft.com/office/powerpoint/2010/main" xmlns:a16="http://schemas.microsoft.com/office/drawing/2014/main" xmlns="" w="9525">
+                <a14:hiddenLine xmlns="" xmlns:a16="http://schemas.microsoft.com/office/drawing/2014/main" xmlns:p14="http://schemas.microsoft.com/office/powerpoint/2010/main" xmlns:a14="http://schemas.microsoft.com/office/drawing/2010/main" w="9525">
                   <a:solidFill>
                     <a:srgbClr val="000000"/>
                   </a:solidFill>
@@ -31867,7 +31867,7 @@
             </a:ln>
             <a:extLst>
               <a:ext uri="{91240B29-F687-4f45-9708-019B960494DF}">
-                <a14:hiddenLine xmlns:a14="http://schemas.microsoft.com/office/drawing/2010/main" xmlns:p14="http://schemas.microsoft.com/office/powerpoint/2010/main" xmlns:a16="http://schemas.microsoft.com/office/drawing/2014/main" xmlns="" w="9525">
+                <a14:hiddenLine xmlns="" xmlns:a16="http://schemas.microsoft.com/office/drawing/2014/main" xmlns:p14="http://schemas.microsoft.com/office/powerpoint/2010/main" xmlns:a14="http://schemas.microsoft.com/office/drawing/2010/main" w="9525">
                   <a:solidFill>
                     <a:srgbClr val="000000"/>
                   </a:solidFill>
@@ -32002,7 +32002,7 @@
             </a:ln>
             <a:extLst>
               <a:ext uri="{91240B29-F687-4f45-9708-019B960494DF}">
-                <a14:hiddenLine xmlns:a14="http://schemas.microsoft.com/office/drawing/2010/main" xmlns:p14="http://schemas.microsoft.com/office/powerpoint/2010/main" xmlns:a16="http://schemas.microsoft.com/office/drawing/2014/main" xmlns="" w="9525">
+                <a14:hiddenLine xmlns="" xmlns:a16="http://schemas.microsoft.com/office/drawing/2014/main" xmlns:p14="http://schemas.microsoft.com/office/powerpoint/2010/main" xmlns:a14="http://schemas.microsoft.com/office/drawing/2010/main" w="9525">
                   <a:solidFill>
                     <a:srgbClr val="000000"/>
                   </a:solidFill>
@@ -32079,10 +32079,10 @@
       </p:pic>
       <p:pic>
         <p:nvPicPr>
-          <p:cNvPr id="10" name="Picture 9" descr="A screenshot of a cell phone&#10;&#10;Description automatically generated">
+          <p:cNvPr id="5" name="Picture 4">
             <a:extLst>
               <a:ext uri="{FF2B5EF4-FFF2-40B4-BE49-F238E27FC236}">
-                <a16:creationId xmlns:a16="http://schemas.microsoft.com/office/drawing/2014/main" id="{683D336B-F397-EC48-B03B-2138057086A7}"/>
+                <a16:creationId xmlns:a16="http://schemas.microsoft.com/office/drawing/2014/main" id="{987245DC-9CB2-4EFC-BDF6-4AF9BFD81F1C}"/>
               </a:ext>
             </a:extLst>
           </p:cNvPr>
@@ -32099,8 +32099,8 @@
         </p:blipFill>
         <p:spPr>
           <a:xfrm>
-            <a:off x="4464421" y="4046581"/>
-            <a:ext cx="6986216" cy="2381129"/>
+            <a:off x="4508613" y="3982098"/>
+            <a:ext cx="6985075" cy="2379531"/>
           </a:xfrm>
           <a:prstGeom prst="rect">
             <a:avLst/>
@@ -32193,7 +32193,7 @@
           <a:noFill/>
           <a:extLst>
             <a:ext uri="{909E8E84-426E-40dd-AFC4-6F175D3DCCD1}">
-              <a14:hiddenFill xmlns:a14="http://schemas.microsoft.com/office/drawing/2010/main" xmlns:p14="http://schemas.microsoft.com/office/powerpoint/2010/main" xmlns:a16="http://schemas.microsoft.com/office/drawing/2014/main" xmlns="">
+              <a14:hiddenFill xmlns="" xmlns:a16="http://schemas.microsoft.com/office/drawing/2014/main" xmlns:p14="http://schemas.microsoft.com/office/powerpoint/2010/main" xmlns:a14="http://schemas.microsoft.com/office/drawing/2010/main">
                 <a:solidFill>
                   <a:srgbClr val="FFFFFF"/>
                 </a:solidFill>
@@ -32314,7 +32314,7 @@
               </a:ln>
               <a:extLst>
                 <a:ext uri="{91240B29-F687-4f45-9708-019B960494DF}">
-                  <a14:hiddenLine xmlns:a14="http://schemas.microsoft.com/office/drawing/2010/main" xmlns:p14="http://schemas.microsoft.com/office/powerpoint/2010/main" xmlns:a16="http://schemas.microsoft.com/office/drawing/2014/main" xmlns="" w="9525">
+                  <a14:hiddenLine xmlns="" xmlns:a16="http://schemas.microsoft.com/office/drawing/2014/main" xmlns:p14="http://schemas.microsoft.com/office/powerpoint/2010/main" xmlns:a14="http://schemas.microsoft.com/office/drawing/2010/main" w="9525">
                     <a:solidFill>
                       <a:srgbClr val="000000"/>
                     </a:solidFill>
@@ -32419,7 +32419,7 @@
               </a:ln>
               <a:extLst>
                 <a:ext uri="{91240B29-F687-4f45-9708-019B960494DF}">
-                  <a14:hiddenLine xmlns:a14="http://schemas.microsoft.com/office/drawing/2010/main" xmlns:p14="http://schemas.microsoft.com/office/powerpoint/2010/main" xmlns:a16="http://schemas.microsoft.com/office/drawing/2014/main" xmlns="" w="9525">
+                  <a14:hiddenLine xmlns="" xmlns:a16="http://schemas.microsoft.com/office/drawing/2014/main" xmlns:p14="http://schemas.microsoft.com/office/powerpoint/2010/main" xmlns:a14="http://schemas.microsoft.com/office/drawing/2010/main" w="9525">
                     <a:solidFill>
                       <a:srgbClr val="000000"/>
                     </a:solidFill>
@@ -32524,7 +32524,7 @@
               </a:ln>
               <a:extLst>
                 <a:ext uri="{91240B29-F687-4f45-9708-019B960494DF}">
-                  <a14:hiddenLine xmlns:a14="http://schemas.microsoft.com/office/drawing/2010/main" xmlns:p14="http://schemas.microsoft.com/office/powerpoint/2010/main" xmlns:a16="http://schemas.microsoft.com/office/drawing/2014/main" xmlns="" w="9525">
+                  <a14:hiddenLine xmlns="" xmlns:a16="http://schemas.microsoft.com/office/drawing/2014/main" xmlns:p14="http://schemas.microsoft.com/office/powerpoint/2010/main" xmlns:a14="http://schemas.microsoft.com/office/drawing/2010/main" w="9525">
                     <a:solidFill>
                       <a:srgbClr val="000000"/>
                     </a:solidFill>
@@ -32601,7 +32601,7 @@
               </a:ln>
               <a:extLst>
                 <a:ext uri="{91240B29-F687-4f45-9708-019B960494DF}">
-                  <a14:hiddenLine xmlns:a14="http://schemas.microsoft.com/office/drawing/2010/main" xmlns:p14="http://schemas.microsoft.com/office/powerpoint/2010/main" xmlns:a16="http://schemas.microsoft.com/office/drawing/2014/main" xmlns="" w="9525">
+                  <a14:hiddenLine xmlns="" xmlns:a16="http://schemas.microsoft.com/office/drawing/2014/main" xmlns:p14="http://schemas.microsoft.com/office/powerpoint/2010/main" xmlns:a14="http://schemas.microsoft.com/office/drawing/2010/main" w="9525">
                     <a:solidFill>
                       <a:srgbClr val="000000"/>
                     </a:solidFill>
@@ -32706,7 +32706,7 @@
               </a:ln>
               <a:extLst>
                 <a:ext uri="{91240B29-F687-4f45-9708-019B960494DF}">
-                  <a14:hiddenLine xmlns:a14="http://schemas.microsoft.com/office/drawing/2010/main" xmlns:p14="http://schemas.microsoft.com/office/powerpoint/2010/main" xmlns:a16="http://schemas.microsoft.com/office/drawing/2014/main" xmlns="" w="9525">
+                  <a14:hiddenLine xmlns="" xmlns:a16="http://schemas.microsoft.com/office/drawing/2014/main" xmlns:p14="http://schemas.microsoft.com/office/powerpoint/2010/main" xmlns:a14="http://schemas.microsoft.com/office/drawing/2010/main" w="9525">
                     <a:solidFill>
                       <a:srgbClr val="000000"/>
                     </a:solidFill>
@@ -32783,7 +32783,7 @@
               </a:ln>
               <a:extLst>
                 <a:ext uri="{91240B29-F687-4f45-9708-019B960494DF}">
-                  <a14:hiddenLine xmlns:a14="http://schemas.microsoft.com/office/drawing/2010/main" xmlns:p14="http://schemas.microsoft.com/office/powerpoint/2010/main" xmlns:a16="http://schemas.microsoft.com/office/drawing/2014/main" xmlns="" w="9525">
+                  <a14:hiddenLine xmlns="" xmlns:a16="http://schemas.microsoft.com/office/drawing/2014/main" xmlns:p14="http://schemas.microsoft.com/office/powerpoint/2010/main" xmlns:a14="http://schemas.microsoft.com/office/drawing/2010/main" w="9525">
                     <a:solidFill>
                       <a:srgbClr val="000000"/>
                     </a:solidFill>
@@ -32860,7 +32860,7 @@
               </a:ln>
               <a:extLst>
                 <a:ext uri="{91240B29-F687-4f45-9708-019B960494DF}">
-                  <a14:hiddenLine xmlns:a14="http://schemas.microsoft.com/office/drawing/2010/main" xmlns:p14="http://schemas.microsoft.com/office/powerpoint/2010/main" xmlns:a16="http://schemas.microsoft.com/office/drawing/2014/main" xmlns="" w="9525">
+                  <a14:hiddenLine xmlns="" xmlns:a16="http://schemas.microsoft.com/office/drawing/2014/main" xmlns:p14="http://schemas.microsoft.com/office/powerpoint/2010/main" xmlns:a14="http://schemas.microsoft.com/office/drawing/2010/main" w="9525">
                     <a:solidFill>
                       <a:srgbClr val="000000"/>
                     </a:solidFill>
@@ -32965,7 +32965,7 @@
               </a:ln>
               <a:extLst>
                 <a:ext uri="{91240B29-F687-4f45-9708-019B960494DF}">
-                  <a14:hiddenLine xmlns:a14="http://schemas.microsoft.com/office/drawing/2010/main" xmlns:p14="http://schemas.microsoft.com/office/powerpoint/2010/main" xmlns:a16="http://schemas.microsoft.com/office/drawing/2014/main" xmlns="" w="9525">
+                  <a14:hiddenLine xmlns="" xmlns:a16="http://schemas.microsoft.com/office/drawing/2014/main" xmlns:p14="http://schemas.microsoft.com/office/powerpoint/2010/main" xmlns:a14="http://schemas.microsoft.com/office/drawing/2010/main" w="9525">
                     <a:solidFill>
                       <a:srgbClr val="000000"/>
                     </a:solidFill>
@@ -33070,7 +33070,7 @@
               </a:ln>
               <a:extLst>
                 <a:ext uri="{91240B29-F687-4f45-9708-019B960494DF}">
-                  <a14:hiddenLine xmlns:a14="http://schemas.microsoft.com/office/drawing/2010/main" xmlns:p14="http://schemas.microsoft.com/office/powerpoint/2010/main" xmlns:a16="http://schemas.microsoft.com/office/drawing/2014/main" xmlns="" w="9525">
+                  <a14:hiddenLine xmlns="" xmlns:a16="http://schemas.microsoft.com/office/drawing/2014/main" xmlns:p14="http://schemas.microsoft.com/office/powerpoint/2010/main" xmlns:a14="http://schemas.microsoft.com/office/drawing/2010/main" w="9525">
                     <a:solidFill>
                       <a:srgbClr val="000000"/>
                     </a:solidFill>
@@ -33147,7 +33147,7 @@
               </a:ln>
               <a:extLst>
                 <a:ext uri="{91240B29-F687-4f45-9708-019B960494DF}">
-                  <a14:hiddenLine xmlns:a14="http://schemas.microsoft.com/office/drawing/2010/main" xmlns:p14="http://schemas.microsoft.com/office/powerpoint/2010/main" xmlns:a16="http://schemas.microsoft.com/office/drawing/2014/main" xmlns="" w="9525">
+                  <a14:hiddenLine xmlns="" xmlns:a16="http://schemas.microsoft.com/office/drawing/2014/main" xmlns:p14="http://schemas.microsoft.com/office/powerpoint/2010/main" xmlns:a14="http://schemas.microsoft.com/office/drawing/2010/main" w="9525">
                     <a:solidFill>
                       <a:srgbClr val="000000"/>
                     </a:solidFill>
@@ -33272,7 +33272,7 @@
               </a:ln>
               <a:extLst>
                 <a:ext uri="{91240B29-F687-4f45-9708-019B960494DF}">
-                  <a14:hiddenLine xmlns:a14="http://schemas.microsoft.com/office/drawing/2010/main" xmlns:p14="http://schemas.microsoft.com/office/powerpoint/2010/main" xmlns:a16="http://schemas.microsoft.com/office/drawing/2014/main" xmlns="" w="9525">
+                  <a14:hiddenLine xmlns="" xmlns:a16="http://schemas.microsoft.com/office/drawing/2014/main" xmlns:p14="http://schemas.microsoft.com/office/powerpoint/2010/main" xmlns:a14="http://schemas.microsoft.com/office/drawing/2010/main" w="9525">
                     <a:solidFill>
                       <a:srgbClr val="000000"/>
                     </a:solidFill>
@@ -33386,7 +33386,7 @@
               </a:ln>
               <a:extLst>
                 <a:ext uri="{91240B29-F687-4f45-9708-019B960494DF}">
-                  <a14:hiddenLine xmlns:a14="http://schemas.microsoft.com/office/drawing/2010/main" xmlns:p14="http://schemas.microsoft.com/office/powerpoint/2010/main" xmlns:a16="http://schemas.microsoft.com/office/drawing/2014/main" xmlns="" w="9525">
+                  <a14:hiddenLine xmlns="" xmlns:a16="http://schemas.microsoft.com/office/drawing/2014/main" xmlns:p14="http://schemas.microsoft.com/office/powerpoint/2010/main" xmlns:a14="http://schemas.microsoft.com/office/drawing/2010/main" w="9525">
                     <a:solidFill>
                       <a:srgbClr val="000000"/>
                     </a:solidFill>
@@ -33463,7 +33463,7 @@
               </a:ln>
               <a:extLst>
                 <a:ext uri="{91240B29-F687-4f45-9708-019B960494DF}">
-                  <a14:hiddenLine xmlns:a14="http://schemas.microsoft.com/office/drawing/2010/main" xmlns:p14="http://schemas.microsoft.com/office/powerpoint/2010/main" xmlns:a16="http://schemas.microsoft.com/office/drawing/2014/main" xmlns="" w="9525">
+                  <a14:hiddenLine xmlns="" xmlns:a16="http://schemas.microsoft.com/office/drawing/2014/main" xmlns:p14="http://schemas.microsoft.com/office/powerpoint/2010/main" xmlns:a14="http://schemas.microsoft.com/office/drawing/2010/main" w="9525">
                     <a:solidFill>
                       <a:srgbClr val="000000"/>
                     </a:solidFill>
@@ -33540,7 +33540,7 @@
               </a:ln>
               <a:extLst>
                 <a:ext uri="{91240B29-F687-4f45-9708-019B960494DF}">
-                  <a14:hiddenLine xmlns:a14="http://schemas.microsoft.com/office/drawing/2010/main" xmlns:p14="http://schemas.microsoft.com/office/powerpoint/2010/main" xmlns:a16="http://schemas.microsoft.com/office/drawing/2014/main" xmlns="" w="9525">
+                  <a14:hiddenLine xmlns="" xmlns:a16="http://schemas.microsoft.com/office/drawing/2014/main" xmlns:p14="http://schemas.microsoft.com/office/powerpoint/2010/main" xmlns:a14="http://schemas.microsoft.com/office/drawing/2010/main" w="9525">
                     <a:solidFill>
                       <a:srgbClr val="000000"/>
                     </a:solidFill>
@@ -33645,7 +33645,7 @@
               </a:ln>
               <a:extLst>
                 <a:ext uri="{91240B29-F687-4f45-9708-019B960494DF}">
-                  <a14:hiddenLine xmlns:a14="http://schemas.microsoft.com/office/drawing/2010/main" xmlns:p14="http://schemas.microsoft.com/office/powerpoint/2010/main" xmlns:a16="http://schemas.microsoft.com/office/drawing/2014/main" xmlns="" w="9525">
+                  <a14:hiddenLine xmlns="" xmlns:a16="http://schemas.microsoft.com/office/drawing/2014/main" xmlns:p14="http://schemas.microsoft.com/office/powerpoint/2010/main" xmlns:a14="http://schemas.microsoft.com/office/drawing/2010/main" w="9525">
                     <a:solidFill>
                       <a:srgbClr val="000000"/>
                     </a:solidFill>
@@ -33694,7 +33694,7 @@
               </a:ln>
               <a:extLst>
                 <a:ext uri="{91240B29-F687-4f45-9708-019B960494DF}">
-                  <a14:hiddenLine xmlns:a14="http://schemas.microsoft.com/office/drawing/2010/main" xmlns:p14="http://schemas.microsoft.com/office/powerpoint/2010/main" xmlns:a16="http://schemas.microsoft.com/office/drawing/2014/main" xmlns="" w="9525">
+                  <a14:hiddenLine xmlns="" xmlns:a16="http://schemas.microsoft.com/office/drawing/2014/main" xmlns:p14="http://schemas.microsoft.com/office/powerpoint/2010/main" xmlns:a14="http://schemas.microsoft.com/office/drawing/2010/main" w="9525">
                     <a:solidFill>
                       <a:srgbClr val="000000"/>
                     </a:solidFill>
@@ -33774,7 +33774,7 @@
               </a:ln>
               <a:extLst>
                 <a:ext uri="{91240B29-F687-4f45-9708-019B960494DF}">
-                  <a14:hiddenLine xmlns:a14="http://schemas.microsoft.com/office/drawing/2010/main" xmlns:p14="http://schemas.microsoft.com/office/powerpoint/2010/main" xmlns:a16="http://schemas.microsoft.com/office/drawing/2014/main" xmlns="" w="9525">
+                  <a14:hiddenLine xmlns="" xmlns:a16="http://schemas.microsoft.com/office/drawing/2014/main" xmlns:p14="http://schemas.microsoft.com/office/powerpoint/2010/main" xmlns:a14="http://schemas.microsoft.com/office/drawing/2010/main" w="9525">
                     <a:solidFill>
                       <a:srgbClr val="000000"/>
                     </a:solidFill>
@@ -33879,7 +33879,7 @@
               </a:ln>
               <a:extLst>
                 <a:ext uri="{91240B29-F687-4f45-9708-019B960494DF}">
-                  <a14:hiddenLine xmlns:a14="http://schemas.microsoft.com/office/drawing/2010/main" xmlns:p14="http://schemas.microsoft.com/office/powerpoint/2010/main" xmlns:a16="http://schemas.microsoft.com/office/drawing/2014/main" xmlns="" w="9525">
+                  <a14:hiddenLine xmlns="" xmlns:a16="http://schemas.microsoft.com/office/drawing/2014/main" xmlns:p14="http://schemas.microsoft.com/office/powerpoint/2010/main" xmlns:a14="http://schemas.microsoft.com/office/drawing/2010/main" w="9525">
                     <a:solidFill>
                       <a:srgbClr val="000000"/>
                     </a:solidFill>
@@ -33956,7 +33956,7 @@
               </a:ln>
               <a:extLst>
                 <a:ext uri="{91240B29-F687-4f45-9708-019B960494DF}">
-                  <a14:hiddenLine xmlns:a14="http://schemas.microsoft.com/office/drawing/2010/main" xmlns:p14="http://schemas.microsoft.com/office/powerpoint/2010/main" xmlns:a16="http://schemas.microsoft.com/office/drawing/2014/main" xmlns="" w="9525">
+                  <a14:hiddenLine xmlns="" xmlns:a16="http://schemas.microsoft.com/office/drawing/2014/main" xmlns:p14="http://schemas.microsoft.com/office/powerpoint/2010/main" xmlns:a14="http://schemas.microsoft.com/office/drawing/2010/main" w="9525">
                     <a:solidFill>
                       <a:srgbClr val="000000"/>
                     </a:solidFill>
@@ -34061,7 +34061,7 @@
               </a:ln>
               <a:extLst>
                 <a:ext uri="{91240B29-F687-4f45-9708-019B960494DF}">
-                  <a14:hiddenLine xmlns:a14="http://schemas.microsoft.com/office/drawing/2010/main" xmlns:p14="http://schemas.microsoft.com/office/powerpoint/2010/main" xmlns:a16="http://schemas.microsoft.com/office/drawing/2014/main" xmlns="" w="9525">
+                  <a14:hiddenLine xmlns="" xmlns:a16="http://schemas.microsoft.com/office/drawing/2014/main" xmlns:p14="http://schemas.microsoft.com/office/powerpoint/2010/main" xmlns:a14="http://schemas.microsoft.com/office/drawing/2010/main" w="9525">
                     <a:solidFill>
                       <a:srgbClr val="000000"/>
                     </a:solidFill>
@@ -34141,7 +34141,7 @@
               </a:ln>
               <a:extLst>
                 <a:ext uri="{91240B29-F687-4f45-9708-019B960494DF}">
-                  <a14:hiddenLine xmlns:a14="http://schemas.microsoft.com/office/drawing/2010/main" xmlns:p14="http://schemas.microsoft.com/office/powerpoint/2010/main" xmlns:a16="http://schemas.microsoft.com/office/drawing/2014/main" xmlns="" w="9525">
+                  <a14:hiddenLine xmlns="" xmlns:a16="http://schemas.microsoft.com/office/drawing/2014/main" xmlns:p14="http://schemas.microsoft.com/office/powerpoint/2010/main" xmlns:a14="http://schemas.microsoft.com/office/drawing/2010/main" w="9525">
                     <a:solidFill>
                       <a:srgbClr val="000000"/>
                     </a:solidFill>
@@ -34218,7 +34218,7 @@
               </a:ln>
               <a:extLst>
                 <a:ext uri="{91240B29-F687-4f45-9708-019B960494DF}">
-                  <a14:hiddenLine xmlns:a14="http://schemas.microsoft.com/office/drawing/2010/main" xmlns:p14="http://schemas.microsoft.com/office/powerpoint/2010/main" xmlns:a16="http://schemas.microsoft.com/office/drawing/2014/main" xmlns="" w="9525">
+                  <a14:hiddenLine xmlns="" xmlns:a16="http://schemas.microsoft.com/office/drawing/2014/main" xmlns:p14="http://schemas.microsoft.com/office/powerpoint/2010/main" xmlns:a14="http://schemas.microsoft.com/office/drawing/2010/main" w="9525">
                     <a:solidFill>
                       <a:srgbClr val="000000"/>
                     </a:solidFill>
@@ -34323,7 +34323,7 @@
               </a:ln>
               <a:extLst>
                 <a:ext uri="{91240B29-F687-4f45-9708-019B960494DF}">
-                  <a14:hiddenLine xmlns:a14="http://schemas.microsoft.com/office/drawing/2010/main" xmlns:p14="http://schemas.microsoft.com/office/powerpoint/2010/main" xmlns:a16="http://schemas.microsoft.com/office/drawing/2014/main" xmlns="" w="9525">
+                  <a14:hiddenLine xmlns="" xmlns:a16="http://schemas.microsoft.com/office/drawing/2014/main" xmlns:p14="http://schemas.microsoft.com/office/powerpoint/2010/main" xmlns:a14="http://schemas.microsoft.com/office/drawing/2010/main" w="9525">
                     <a:solidFill>
                       <a:srgbClr val="000000"/>
                     </a:solidFill>
@@ -34428,7 +34428,7 @@
               </a:ln>
               <a:extLst>
                 <a:ext uri="{91240B29-F687-4f45-9708-019B960494DF}">
-                  <a14:hiddenLine xmlns:a14="http://schemas.microsoft.com/office/drawing/2010/main" xmlns:p14="http://schemas.microsoft.com/office/powerpoint/2010/main" xmlns:a16="http://schemas.microsoft.com/office/drawing/2014/main" xmlns="" w="9525">
+                  <a14:hiddenLine xmlns="" xmlns:a16="http://schemas.microsoft.com/office/drawing/2014/main" xmlns:p14="http://schemas.microsoft.com/office/powerpoint/2010/main" xmlns:a14="http://schemas.microsoft.com/office/drawing/2010/main" w="9525">
                     <a:solidFill>
                       <a:srgbClr val="000000"/>
                     </a:solidFill>
@@ -34508,7 +34508,7 @@
               </a:ln>
               <a:extLst>
                 <a:ext uri="{91240B29-F687-4f45-9708-019B960494DF}">
-                  <a14:hiddenLine xmlns:a14="http://schemas.microsoft.com/office/drawing/2010/main" xmlns:p14="http://schemas.microsoft.com/office/powerpoint/2010/main" xmlns:a16="http://schemas.microsoft.com/office/drawing/2014/main" xmlns="" w="9525">
+                  <a14:hiddenLine xmlns="" xmlns:a16="http://schemas.microsoft.com/office/drawing/2014/main" xmlns:p14="http://schemas.microsoft.com/office/powerpoint/2010/main" xmlns:a14="http://schemas.microsoft.com/office/drawing/2010/main" w="9525">
                     <a:solidFill>
                       <a:srgbClr val="000000"/>
                     </a:solidFill>
@@ -34643,7 +34643,7 @@
               </a:ln>
               <a:extLst>
                 <a:ext uri="{91240B29-F687-4f45-9708-019B960494DF}">
-                  <a14:hiddenLine xmlns:a14="http://schemas.microsoft.com/office/drawing/2010/main" xmlns:p14="http://schemas.microsoft.com/office/powerpoint/2010/main" xmlns:a16="http://schemas.microsoft.com/office/drawing/2014/main" xmlns="" w="9525">
+                  <a14:hiddenLine xmlns="" xmlns:a16="http://schemas.microsoft.com/office/drawing/2014/main" xmlns:p14="http://schemas.microsoft.com/office/powerpoint/2010/main" xmlns:a14="http://schemas.microsoft.com/office/drawing/2010/main" w="9525">
                     <a:solidFill>
                       <a:srgbClr val="000000"/>
                     </a:solidFill>
@@ -34771,7 +34771,7 @@
               </a:ln>
               <a:extLst>
                 <a:ext uri="{91240B29-F687-4f45-9708-019B960494DF}">
-                  <a14:hiddenLine xmlns:a14="http://schemas.microsoft.com/office/drawing/2010/main" xmlns:p14="http://schemas.microsoft.com/office/powerpoint/2010/main" xmlns:a16="http://schemas.microsoft.com/office/drawing/2014/main" xmlns="" w="9525">
+                  <a14:hiddenLine xmlns="" xmlns:a16="http://schemas.microsoft.com/office/drawing/2014/main" xmlns:p14="http://schemas.microsoft.com/office/powerpoint/2010/main" xmlns:a14="http://schemas.microsoft.com/office/drawing/2010/main" w="9525">
                     <a:solidFill>
                       <a:srgbClr val="000000"/>
                     </a:solidFill>
@@ -34901,7 +34901,7 @@
               </a:ln>
               <a:extLst>
                 <a:ext uri="{91240B29-F687-4f45-9708-019B960494DF}">
-                  <a14:hiddenLine xmlns:a14="http://schemas.microsoft.com/office/drawing/2010/main" xmlns:p14="http://schemas.microsoft.com/office/powerpoint/2010/main" xmlns:a16="http://schemas.microsoft.com/office/drawing/2014/main" xmlns="" w="9525">
+                  <a14:hiddenLine xmlns="" xmlns:a16="http://schemas.microsoft.com/office/drawing/2014/main" xmlns:p14="http://schemas.microsoft.com/office/powerpoint/2010/main" xmlns:a14="http://schemas.microsoft.com/office/drawing/2010/main" w="9525">
                     <a:solidFill>
                       <a:srgbClr val="000000"/>
                     </a:solidFill>
@@ -35006,7 +35006,7 @@
               </a:ln>
               <a:extLst>
                 <a:ext uri="{91240B29-F687-4f45-9708-019B960494DF}">
-                  <a14:hiddenLine xmlns:a14="http://schemas.microsoft.com/office/drawing/2010/main" xmlns:p14="http://schemas.microsoft.com/office/powerpoint/2010/main" xmlns:a16="http://schemas.microsoft.com/office/drawing/2014/main" xmlns="" w="9525">
+                  <a14:hiddenLine xmlns="" xmlns:a16="http://schemas.microsoft.com/office/drawing/2014/main" xmlns:p14="http://schemas.microsoft.com/office/powerpoint/2010/main" xmlns:a14="http://schemas.microsoft.com/office/drawing/2010/main" w="9525">
                     <a:solidFill>
                       <a:srgbClr val="000000"/>
                     </a:solidFill>
@@ -35086,7 +35086,7 @@
               </a:ln>
               <a:extLst>
                 <a:ext uri="{91240B29-F687-4f45-9708-019B960494DF}">
-                  <a14:hiddenLine xmlns:a14="http://schemas.microsoft.com/office/drawing/2010/main" xmlns:p14="http://schemas.microsoft.com/office/powerpoint/2010/main" xmlns:a16="http://schemas.microsoft.com/office/drawing/2014/main" xmlns="" w="9525">
+                  <a14:hiddenLine xmlns="" xmlns:a16="http://schemas.microsoft.com/office/drawing/2014/main" xmlns:p14="http://schemas.microsoft.com/office/powerpoint/2010/main" xmlns:a14="http://schemas.microsoft.com/office/drawing/2010/main" w="9525">
                     <a:solidFill>
                       <a:srgbClr val="000000"/>
                     </a:solidFill>
@@ -35191,7 +35191,7 @@
               </a:ln>
               <a:extLst>
                 <a:ext uri="{91240B29-F687-4f45-9708-019B960494DF}">
-                  <a14:hiddenLine xmlns:a14="http://schemas.microsoft.com/office/drawing/2010/main" xmlns:p14="http://schemas.microsoft.com/office/powerpoint/2010/main" xmlns:a16="http://schemas.microsoft.com/office/drawing/2014/main" xmlns="" w="9525">
+                  <a14:hiddenLine xmlns="" xmlns:a16="http://schemas.microsoft.com/office/drawing/2014/main" xmlns:p14="http://schemas.microsoft.com/office/powerpoint/2010/main" xmlns:a14="http://schemas.microsoft.com/office/drawing/2010/main" w="9525">
                     <a:solidFill>
                       <a:srgbClr val="000000"/>
                     </a:solidFill>
@@ -35274,7 +35274,7 @@
               </a:ln>
               <a:extLst>
                 <a:ext uri="{91240B29-F687-4f45-9708-019B960494DF}">
-                  <a14:hiddenLine xmlns:a14="http://schemas.microsoft.com/office/drawing/2010/main" xmlns:p14="http://schemas.microsoft.com/office/powerpoint/2010/main" xmlns:a16="http://schemas.microsoft.com/office/drawing/2014/main" xmlns="" w="9525">
+                  <a14:hiddenLine xmlns="" xmlns:a16="http://schemas.microsoft.com/office/drawing/2014/main" xmlns:p14="http://schemas.microsoft.com/office/powerpoint/2010/main" xmlns:a14="http://schemas.microsoft.com/office/drawing/2010/main" w="9525">
                     <a:solidFill>
                       <a:srgbClr val="000000"/>
                     </a:solidFill>
@@ -35379,7 +35379,7 @@
               </a:ln>
               <a:extLst>
                 <a:ext uri="{91240B29-F687-4f45-9708-019B960494DF}">
-                  <a14:hiddenLine xmlns:a14="http://schemas.microsoft.com/office/drawing/2010/main" xmlns:p14="http://schemas.microsoft.com/office/powerpoint/2010/main" xmlns:a16="http://schemas.microsoft.com/office/drawing/2014/main" xmlns="" w="9525">
+                  <a14:hiddenLine xmlns="" xmlns:a16="http://schemas.microsoft.com/office/drawing/2014/main" xmlns:p14="http://schemas.microsoft.com/office/powerpoint/2010/main" xmlns:a14="http://schemas.microsoft.com/office/drawing/2010/main" w="9525">
                     <a:solidFill>
                       <a:srgbClr val="000000"/>
                     </a:solidFill>
@@ -35462,7 +35462,7 @@
               </a:ln>
               <a:extLst>
                 <a:ext uri="{91240B29-F687-4f45-9708-019B960494DF}">
-                  <a14:hiddenLine xmlns:a14="http://schemas.microsoft.com/office/drawing/2010/main" xmlns:p14="http://schemas.microsoft.com/office/powerpoint/2010/main" xmlns:a16="http://schemas.microsoft.com/office/drawing/2014/main" xmlns="" w="9525">
+                  <a14:hiddenLine xmlns="" xmlns:a16="http://schemas.microsoft.com/office/drawing/2014/main" xmlns:p14="http://schemas.microsoft.com/office/powerpoint/2010/main" xmlns:a14="http://schemas.microsoft.com/office/drawing/2010/main" w="9525">
                     <a:solidFill>
                       <a:srgbClr val="000000"/>
                     </a:solidFill>
@@ -35567,7 +35567,7 @@
               </a:ln>
               <a:extLst>
                 <a:ext uri="{91240B29-F687-4f45-9708-019B960494DF}">
-                  <a14:hiddenLine xmlns:a14="http://schemas.microsoft.com/office/drawing/2010/main" xmlns:p14="http://schemas.microsoft.com/office/powerpoint/2010/main" xmlns:a16="http://schemas.microsoft.com/office/drawing/2014/main" xmlns="" w="9525">
+                  <a14:hiddenLine xmlns="" xmlns:a16="http://schemas.microsoft.com/office/drawing/2014/main" xmlns:p14="http://schemas.microsoft.com/office/powerpoint/2010/main" xmlns:a14="http://schemas.microsoft.com/office/drawing/2010/main" w="9525">
                     <a:solidFill>
                       <a:srgbClr val="000000"/>
                     </a:solidFill>
@@ -35616,7 +35616,7 @@
               </a:ln>
               <a:extLst>
                 <a:ext uri="{91240B29-F687-4f45-9708-019B960494DF}">
-                  <a14:hiddenLine xmlns:a14="http://schemas.microsoft.com/office/drawing/2010/main" xmlns:p14="http://schemas.microsoft.com/office/powerpoint/2010/main" xmlns:a16="http://schemas.microsoft.com/office/drawing/2014/main" xmlns="" w="9525">
+                  <a14:hiddenLine xmlns="" xmlns:a16="http://schemas.microsoft.com/office/drawing/2014/main" xmlns:p14="http://schemas.microsoft.com/office/powerpoint/2010/main" xmlns:a14="http://schemas.microsoft.com/office/drawing/2010/main" w="9525">
                     <a:solidFill>
                       <a:srgbClr val="000000"/>
                     </a:solidFill>
@@ -35736,7 +35736,7 @@
           </a:prstGeom>
           <a:extLst>
             <a:ext uri="{909E8E84-426E-40dd-AFC4-6F175D3DCCD1}">
-              <a14:hiddenFill xmlns:a14="http://schemas.microsoft.com/office/drawing/2010/main" xmlns:p14="http://schemas.microsoft.com/office/powerpoint/2010/main" xmlns:a16="http://schemas.microsoft.com/office/drawing/2014/main" xmlns="">
+              <a14:hiddenFill xmlns="" xmlns:a16="http://schemas.microsoft.com/office/drawing/2014/main" xmlns:p14="http://schemas.microsoft.com/office/powerpoint/2010/main" xmlns:a14="http://schemas.microsoft.com/office/drawing/2010/main">
                 <a:solidFill>
                   <a:srgbClr val="FFFFFF"/>
                 </a:solidFill>
@@ -35860,7 +35860,7 @@
           <a:noFill/>
           <a:extLst>
             <a:ext uri="{909E8E84-426E-40dd-AFC4-6F175D3DCCD1}">
-              <a14:hiddenFill xmlns:a14="http://schemas.microsoft.com/office/drawing/2010/main" xmlns:p14="http://schemas.microsoft.com/office/powerpoint/2010/main" xmlns:a16="http://schemas.microsoft.com/office/drawing/2014/main" xmlns="">
+              <a14:hiddenFill xmlns="" xmlns:a16="http://schemas.microsoft.com/office/drawing/2014/main" xmlns:p14="http://schemas.microsoft.com/office/powerpoint/2010/main" xmlns:a14="http://schemas.microsoft.com/office/drawing/2010/main">
                 <a:solidFill>
                   <a:srgbClr val="FFFFFF"/>
                 </a:solidFill>
@@ -36051,7 +36051,7 @@
             </a:ln>
             <a:extLst>
               <a:ext uri="{91240B29-F687-4f45-9708-019B960494DF}">
-                <a14:hiddenLine xmlns:a14="http://schemas.microsoft.com/office/drawing/2010/main" xmlns:p14="http://schemas.microsoft.com/office/powerpoint/2010/main" xmlns:a16="http://schemas.microsoft.com/office/drawing/2014/main" xmlns="" w="9525">
+                <a14:hiddenLine xmlns="" xmlns:a16="http://schemas.microsoft.com/office/drawing/2014/main" xmlns:p14="http://schemas.microsoft.com/office/powerpoint/2010/main" xmlns:a14="http://schemas.microsoft.com/office/drawing/2010/main" w="9525">
                   <a:solidFill>
                     <a:srgbClr val="000000"/>
                   </a:solidFill>
@@ -36156,7 +36156,7 @@
             </a:ln>
             <a:extLst>
               <a:ext uri="{91240B29-F687-4f45-9708-019B960494DF}">
-                <a14:hiddenLine xmlns:a14="http://schemas.microsoft.com/office/drawing/2010/main" xmlns:p14="http://schemas.microsoft.com/office/powerpoint/2010/main" xmlns:a16="http://schemas.microsoft.com/office/drawing/2014/main" xmlns="" w="9525">
+                <a14:hiddenLine xmlns="" xmlns:a16="http://schemas.microsoft.com/office/drawing/2014/main" xmlns:p14="http://schemas.microsoft.com/office/powerpoint/2010/main" xmlns:a14="http://schemas.microsoft.com/office/drawing/2010/main" w="9525">
                   <a:solidFill>
                     <a:srgbClr val="000000"/>
                   </a:solidFill>
@@ -36261,7 +36261,7 @@
             </a:ln>
             <a:extLst>
               <a:ext uri="{91240B29-F687-4f45-9708-019B960494DF}">
-                <a14:hiddenLine xmlns:a14="http://schemas.microsoft.com/office/drawing/2010/main" xmlns:p14="http://schemas.microsoft.com/office/powerpoint/2010/main" xmlns:a16="http://schemas.microsoft.com/office/drawing/2014/main" xmlns="" w="9525">
+                <a14:hiddenLine xmlns="" xmlns:a16="http://schemas.microsoft.com/office/drawing/2014/main" xmlns:p14="http://schemas.microsoft.com/office/powerpoint/2010/main" xmlns:a14="http://schemas.microsoft.com/office/drawing/2010/main" w="9525">
                   <a:solidFill>
                     <a:srgbClr val="000000"/>
                   </a:solidFill>
@@ -36338,7 +36338,7 @@
             </a:ln>
             <a:extLst>
               <a:ext uri="{91240B29-F687-4f45-9708-019B960494DF}">
-                <a14:hiddenLine xmlns:a14="http://schemas.microsoft.com/office/drawing/2010/main" xmlns:p14="http://schemas.microsoft.com/office/powerpoint/2010/main" xmlns:a16="http://schemas.microsoft.com/office/drawing/2014/main" xmlns="" w="9525">
+                <a14:hiddenLine xmlns="" xmlns:a16="http://schemas.microsoft.com/office/drawing/2014/main" xmlns:p14="http://schemas.microsoft.com/office/powerpoint/2010/main" xmlns:a14="http://schemas.microsoft.com/office/drawing/2010/main" w="9525">
                   <a:solidFill>
                     <a:srgbClr val="000000"/>
                   </a:solidFill>
@@ -36443,7 +36443,7 @@
             </a:ln>
             <a:extLst>
               <a:ext uri="{91240B29-F687-4f45-9708-019B960494DF}">
-                <a14:hiddenLine xmlns:a14="http://schemas.microsoft.com/office/drawing/2010/main" xmlns:p14="http://schemas.microsoft.com/office/powerpoint/2010/main" xmlns:a16="http://schemas.microsoft.com/office/drawing/2014/main" xmlns="" w="9525">
+                <a14:hiddenLine xmlns="" xmlns:a16="http://schemas.microsoft.com/office/drawing/2014/main" xmlns:p14="http://schemas.microsoft.com/office/powerpoint/2010/main" xmlns:a14="http://schemas.microsoft.com/office/drawing/2010/main" w="9525">
                   <a:solidFill>
                     <a:srgbClr val="000000"/>
                   </a:solidFill>
@@ -36520,7 +36520,7 @@
             </a:ln>
             <a:extLst>
               <a:ext uri="{91240B29-F687-4f45-9708-019B960494DF}">
-                <a14:hiddenLine xmlns:a14="http://schemas.microsoft.com/office/drawing/2010/main" xmlns:p14="http://schemas.microsoft.com/office/powerpoint/2010/main" xmlns:a16="http://schemas.microsoft.com/office/drawing/2014/main" xmlns="" w="9525">
+                <a14:hiddenLine xmlns="" xmlns:a16="http://schemas.microsoft.com/office/drawing/2014/main" xmlns:p14="http://schemas.microsoft.com/office/powerpoint/2010/main" xmlns:a14="http://schemas.microsoft.com/office/drawing/2010/main" w="9525">
                   <a:solidFill>
                     <a:srgbClr val="000000"/>
                   </a:solidFill>
@@ -36597,7 +36597,7 @@
             </a:ln>
             <a:extLst>
               <a:ext uri="{91240B29-F687-4f45-9708-019B960494DF}">
-                <a14:hiddenLine xmlns:a14="http://schemas.microsoft.com/office/drawing/2010/main" xmlns:p14="http://schemas.microsoft.com/office/powerpoint/2010/main" xmlns:a16="http://schemas.microsoft.com/office/drawing/2014/main" xmlns="" w="9525">
+                <a14:hiddenLine xmlns="" xmlns:a16="http://schemas.microsoft.com/office/drawing/2014/main" xmlns:p14="http://schemas.microsoft.com/office/powerpoint/2010/main" xmlns:a14="http://schemas.microsoft.com/office/drawing/2010/main" w="9525">
                   <a:solidFill>
                     <a:srgbClr val="000000"/>
                   </a:solidFill>
@@ -36702,7 +36702,7 @@
             </a:ln>
             <a:extLst>
               <a:ext uri="{91240B29-F687-4f45-9708-019B960494DF}">
-                <a14:hiddenLine xmlns:a14="http://schemas.microsoft.com/office/drawing/2010/main" xmlns:p14="http://schemas.microsoft.com/office/powerpoint/2010/main" xmlns:a16="http://schemas.microsoft.com/office/drawing/2014/main" xmlns="" w="9525">
+                <a14:hiddenLine xmlns="" xmlns:a16="http://schemas.microsoft.com/office/drawing/2014/main" xmlns:p14="http://schemas.microsoft.com/office/powerpoint/2010/main" xmlns:a14="http://schemas.microsoft.com/office/drawing/2010/main" w="9525">
                   <a:solidFill>
                     <a:srgbClr val="000000"/>
                   </a:solidFill>
@@ -36807,7 +36807,7 @@
             </a:ln>
             <a:extLst>
               <a:ext uri="{91240B29-F687-4f45-9708-019B960494DF}">
-                <a14:hiddenLine xmlns:a14="http://schemas.microsoft.com/office/drawing/2010/main" xmlns:p14="http://schemas.microsoft.com/office/powerpoint/2010/main" xmlns:a16="http://schemas.microsoft.com/office/drawing/2014/main" xmlns="" w="9525">
+                <a14:hiddenLine xmlns="" xmlns:a16="http://schemas.microsoft.com/office/drawing/2014/main" xmlns:p14="http://schemas.microsoft.com/office/powerpoint/2010/main" xmlns:a14="http://schemas.microsoft.com/office/drawing/2010/main" w="9525">
                   <a:solidFill>
                     <a:srgbClr val="000000"/>
                   </a:solidFill>
@@ -36884,7 +36884,7 @@
             </a:ln>
             <a:extLst>
               <a:ext uri="{91240B29-F687-4f45-9708-019B960494DF}">
-                <a14:hiddenLine xmlns:a14="http://schemas.microsoft.com/office/drawing/2010/main" xmlns:p14="http://schemas.microsoft.com/office/powerpoint/2010/main" xmlns:a16="http://schemas.microsoft.com/office/drawing/2014/main" xmlns="" w="9525">
+                <a14:hiddenLine xmlns="" xmlns:a16="http://schemas.microsoft.com/office/drawing/2014/main" xmlns:p14="http://schemas.microsoft.com/office/powerpoint/2010/main" xmlns:a14="http://schemas.microsoft.com/office/drawing/2010/main" w="9525">
                   <a:solidFill>
                     <a:srgbClr val="000000"/>
                   </a:solidFill>
@@ -37009,7 +37009,7 @@
             </a:ln>
             <a:extLst>
               <a:ext uri="{91240B29-F687-4f45-9708-019B960494DF}">
-                <a14:hiddenLine xmlns:a14="http://schemas.microsoft.com/office/drawing/2010/main" xmlns:p14="http://schemas.microsoft.com/office/powerpoint/2010/main" xmlns:a16="http://schemas.microsoft.com/office/drawing/2014/main" xmlns="" w="9525">
+                <a14:hiddenLine xmlns="" xmlns:a16="http://schemas.microsoft.com/office/drawing/2014/main" xmlns:p14="http://schemas.microsoft.com/office/powerpoint/2010/main" xmlns:a14="http://schemas.microsoft.com/office/drawing/2010/main" w="9525">
                   <a:solidFill>
                     <a:srgbClr val="000000"/>
                   </a:solidFill>
@@ -37123,7 +37123,7 @@
             </a:ln>
             <a:extLst>
               <a:ext uri="{91240B29-F687-4f45-9708-019B960494DF}">
-                <a14:hiddenLine xmlns:a14="http://schemas.microsoft.com/office/drawing/2010/main" xmlns:p14="http://schemas.microsoft.com/office/powerpoint/2010/main" xmlns:a16="http://schemas.microsoft.com/office/drawing/2014/main" xmlns="" w="9525">
+                <a14:hiddenLine xmlns="" xmlns:a16="http://schemas.microsoft.com/office/drawing/2014/main" xmlns:p14="http://schemas.microsoft.com/office/powerpoint/2010/main" xmlns:a14="http://schemas.microsoft.com/office/drawing/2010/main" w="9525">
                   <a:solidFill>
                     <a:srgbClr val="000000"/>
                   </a:solidFill>
@@ -37200,7 +37200,7 @@
             </a:ln>
             <a:extLst>
               <a:ext uri="{91240B29-F687-4f45-9708-019B960494DF}">
-                <a14:hiddenLine xmlns:a14="http://schemas.microsoft.com/office/drawing/2010/main" xmlns:p14="http://schemas.microsoft.com/office/powerpoint/2010/main" xmlns:a16="http://schemas.microsoft.com/office/drawing/2014/main" xmlns="" w="9525">
+                <a14:hiddenLine xmlns="" xmlns:a16="http://schemas.microsoft.com/office/drawing/2014/main" xmlns:p14="http://schemas.microsoft.com/office/powerpoint/2010/main" xmlns:a14="http://schemas.microsoft.com/office/drawing/2010/main" w="9525">
                   <a:solidFill>
                     <a:srgbClr val="000000"/>
                   </a:solidFill>
@@ -37277,7 +37277,7 @@
             </a:ln>
             <a:extLst>
               <a:ext uri="{91240B29-F687-4f45-9708-019B960494DF}">
-                <a14:hiddenLine xmlns:a14="http://schemas.microsoft.com/office/drawing/2010/main" xmlns:p14="http://schemas.microsoft.com/office/powerpoint/2010/main" xmlns:a16="http://schemas.microsoft.com/office/drawing/2014/main" xmlns="" w="9525">
+                <a14:hiddenLine xmlns="" xmlns:a16="http://schemas.microsoft.com/office/drawing/2014/main" xmlns:p14="http://schemas.microsoft.com/office/powerpoint/2010/main" xmlns:a14="http://schemas.microsoft.com/office/drawing/2010/main" w="9525">
                   <a:solidFill>
                     <a:srgbClr val="000000"/>
                   </a:solidFill>
@@ -37382,7 +37382,7 @@
             </a:ln>
             <a:extLst>
               <a:ext uri="{91240B29-F687-4f45-9708-019B960494DF}">
-                <a14:hiddenLine xmlns:a14="http://schemas.microsoft.com/office/drawing/2010/main" xmlns:p14="http://schemas.microsoft.com/office/powerpoint/2010/main" xmlns:a16="http://schemas.microsoft.com/office/drawing/2014/main" xmlns="" w="9525">
+                <a14:hiddenLine xmlns="" xmlns:a16="http://schemas.microsoft.com/office/drawing/2014/main" xmlns:p14="http://schemas.microsoft.com/office/powerpoint/2010/main" xmlns:a14="http://schemas.microsoft.com/office/drawing/2010/main" w="9525">
                   <a:solidFill>
                     <a:srgbClr val="000000"/>
                   </a:solidFill>
@@ -37431,7 +37431,7 @@
             </a:ln>
             <a:extLst>
               <a:ext uri="{91240B29-F687-4f45-9708-019B960494DF}">
-                <a14:hiddenLine xmlns:a14="http://schemas.microsoft.com/office/drawing/2010/main" xmlns:p14="http://schemas.microsoft.com/office/powerpoint/2010/main" xmlns:a16="http://schemas.microsoft.com/office/drawing/2014/main" xmlns="" w="9525">
+                <a14:hiddenLine xmlns="" xmlns:a16="http://schemas.microsoft.com/office/drawing/2014/main" xmlns:p14="http://schemas.microsoft.com/office/powerpoint/2010/main" xmlns:a14="http://schemas.microsoft.com/office/drawing/2010/main" w="9525">
                   <a:solidFill>
                     <a:srgbClr val="000000"/>
                   </a:solidFill>
@@ -37511,7 +37511,7 @@
             </a:ln>
             <a:extLst>
               <a:ext uri="{91240B29-F687-4f45-9708-019B960494DF}">
-                <a14:hiddenLine xmlns:a14="http://schemas.microsoft.com/office/drawing/2010/main" xmlns:p14="http://schemas.microsoft.com/office/powerpoint/2010/main" xmlns:a16="http://schemas.microsoft.com/office/drawing/2014/main" xmlns="" w="9525">
+                <a14:hiddenLine xmlns="" xmlns:a16="http://schemas.microsoft.com/office/drawing/2014/main" xmlns:p14="http://schemas.microsoft.com/office/powerpoint/2010/main" xmlns:a14="http://schemas.microsoft.com/office/drawing/2010/main" w="9525">
                   <a:solidFill>
                     <a:srgbClr val="000000"/>
                   </a:solidFill>
@@ -37616,7 +37616,7 @@
             </a:ln>
             <a:extLst>
               <a:ext uri="{91240B29-F687-4f45-9708-019B960494DF}">
-                <a14:hiddenLine xmlns:a14="http://schemas.microsoft.com/office/drawing/2010/main" xmlns:p14="http://schemas.microsoft.com/office/powerpoint/2010/main" xmlns:a16="http://schemas.microsoft.com/office/drawing/2014/main" xmlns="" w="9525">
+                <a14:hiddenLine xmlns="" xmlns:a16="http://schemas.microsoft.com/office/drawing/2014/main" xmlns:p14="http://schemas.microsoft.com/office/powerpoint/2010/main" xmlns:a14="http://schemas.microsoft.com/office/drawing/2010/main" w="9525">
                   <a:solidFill>
                     <a:srgbClr val="000000"/>
                   </a:solidFill>
@@ -37693,7 +37693,7 @@
             </a:ln>
             <a:extLst>
               <a:ext uri="{91240B29-F687-4f45-9708-019B960494DF}">
-                <a14:hiddenLine xmlns:a14="http://schemas.microsoft.com/office/drawing/2010/main" xmlns:p14="http://schemas.microsoft.com/office/powerpoint/2010/main" xmlns:a16="http://schemas.microsoft.com/office/drawing/2014/main" xmlns="" w="9525">
+                <a14:hiddenLine xmlns="" xmlns:a16="http://schemas.microsoft.com/office/drawing/2014/main" xmlns:p14="http://schemas.microsoft.com/office/powerpoint/2010/main" xmlns:a14="http://schemas.microsoft.com/office/drawing/2010/main" w="9525">
                   <a:solidFill>
                     <a:srgbClr val="000000"/>
                   </a:solidFill>
@@ -37798,7 +37798,7 @@
             </a:ln>
             <a:extLst>
               <a:ext uri="{91240B29-F687-4f45-9708-019B960494DF}">
-                <a14:hiddenLine xmlns:a14="http://schemas.microsoft.com/office/drawing/2010/main" xmlns:p14="http://schemas.microsoft.com/office/powerpoint/2010/main" xmlns:a16="http://schemas.microsoft.com/office/drawing/2014/main" xmlns="" w="9525">
+                <a14:hiddenLine xmlns="" xmlns:a16="http://schemas.microsoft.com/office/drawing/2014/main" xmlns:p14="http://schemas.microsoft.com/office/powerpoint/2010/main" xmlns:a14="http://schemas.microsoft.com/office/drawing/2010/main" w="9525">
                   <a:solidFill>
                     <a:srgbClr val="000000"/>
                   </a:solidFill>
@@ -37878,7 +37878,7 @@
             </a:ln>
             <a:extLst>
               <a:ext uri="{91240B29-F687-4f45-9708-019B960494DF}">
-                <a14:hiddenLine xmlns:a14="http://schemas.microsoft.com/office/drawing/2010/main" xmlns:p14="http://schemas.microsoft.com/office/powerpoint/2010/main" xmlns:a16="http://schemas.microsoft.com/office/drawing/2014/main" xmlns="" w="9525">
+                <a14:hiddenLine xmlns="" xmlns:a16="http://schemas.microsoft.com/office/drawing/2014/main" xmlns:p14="http://schemas.microsoft.com/office/powerpoint/2010/main" xmlns:a14="http://schemas.microsoft.com/office/drawing/2010/main" w="9525">
                   <a:solidFill>
                     <a:srgbClr val="000000"/>
                   </a:solidFill>
@@ -37955,7 +37955,7 @@
             </a:ln>
             <a:extLst>
               <a:ext uri="{91240B29-F687-4f45-9708-019B960494DF}">
-                <a14:hiddenLine xmlns:a14="http://schemas.microsoft.com/office/drawing/2010/main" xmlns:p14="http://schemas.microsoft.com/office/powerpoint/2010/main" xmlns:a16="http://schemas.microsoft.com/office/drawing/2014/main" xmlns="" w="9525">
+                <a14:hiddenLine xmlns="" xmlns:a16="http://schemas.microsoft.com/office/drawing/2014/main" xmlns:p14="http://schemas.microsoft.com/office/powerpoint/2010/main" xmlns:a14="http://schemas.microsoft.com/office/drawing/2010/main" w="9525">
                   <a:solidFill>
                     <a:srgbClr val="000000"/>
                   </a:solidFill>
@@ -38060,7 +38060,7 @@
             </a:ln>
             <a:extLst>
               <a:ext uri="{91240B29-F687-4f45-9708-019B960494DF}">
-                <a14:hiddenLine xmlns:a14="http://schemas.microsoft.com/office/drawing/2010/main" xmlns:p14="http://schemas.microsoft.com/office/powerpoint/2010/main" xmlns:a16="http://schemas.microsoft.com/office/drawing/2014/main" xmlns="" w="9525">
+                <a14:hiddenLine xmlns="" xmlns:a16="http://schemas.microsoft.com/office/drawing/2014/main" xmlns:p14="http://schemas.microsoft.com/office/powerpoint/2010/main" xmlns:a14="http://schemas.microsoft.com/office/drawing/2010/main" w="9525">
                   <a:solidFill>
                     <a:srgbClr val="000000"/>
                   </a:solidFill>
@@ -38165,7 +38165,7 @@
             </a:ln>
             <a:extLst>
               <a:ext uri="{91240B29-F687-4f45-9708-019B960494DF}">
-                <a14:hiddenLine xmlns:a14="http://schemas.microsoft.com/office/drawing/2010/main" xmlns:p14="http://schemas.microsoft.com/office/powerpoint/2010/main" xmlns:a16="http://schemas.microsoft.com/office/drawing/2014/main" xmlns="" w="9525">
+                <a14:hiddenLine xmlns="" xmlns:a16="http://schemas.microsoft.com/office/drawing/2014/main" xmlns:p14="http://schemas.microsoft.com/office/powerpoint/2010/main" xmlns:a14="http://schemas.microsoft.com/office/drawing/2010/main" w="9525">
                   <a:solidFill>
                     <a:srgbClr val="000000"/>
                   </a:solidFill>
@@ -38245,7 +38245,7 @@
             </a:ln>
             <a:extLst>
               <a:ext uri="{91240B29-F687-4f45-9708-019B960494DF}">
-                <a14:hiddenLine xmlns:a14="http://schemas.microsoft.com/office/drawing/2010/main" xmlns:p14="http://schemas.microsoft.com/office/powerpoint/2010/main" xmlns:a16="http://schemas.microsoft.com/office/drawing/2014/main" xmlns="" w="9525">
+                <a14:hiddenLine xmlns="" xmlns:a16="http://schemas.microsoft.com/office/drawing/2014/main" xmlns:p14="http://schemas.microsoft.com/office/powerpoint/2010/main" xmlns:a14="http://schemas.microsoft.com/office/drawing/2010/main" w="9525">
                   <a:solidFill>
                     <a:srgbClr val="000000"/>
                   </a:solidFill>
@@ -38380,7 +38380,7 @@
             </a:ln>
             <a:extLst>
               <a:ext uri="{91240B29-F687-4f45-9708-019B960494DF}">
-                <a14:hiddenLine xmlns:a14="http://schemas.microsoft.com/office/drawing/2010/main" xmlns:p14="http://schemas.microsoft.com/office/powerpoint/2010/main" xmlns:a16="http://schemas.microsoft.com/office/drawing/2014/main" xmlns="" w="9525">
+                <a14:hiddenLine xmlns="" xmlns:a16="http://schemas.microsoft.com/office/drawing/2014/main" xmlns:p14="http://schemas.microsoft.com/office/powerpoint/2010/main" xmlns:a14="http://schemas.microsoft.com/office/drawing/2010/main" w="9525">
                   <a:solidFill>
                     <a:srgbClr val="000000"/>
                   </a:solidFill>
@@ -38541,7 +38541,7 @@
           <a:noFill/>
           <a:extLst>
             <a:ext uri="{909E8E84-426E-40dd-AFC4-6F175D3DCCD1}">
-              <a14:hiddenFill xmlns:a14="http://schemas.microsoft.com/office/drawing/2010/main" xmlns:p14="http://schemas.microsoft.com/office/powerpoint/2010/main" xmlns:a16="http://schemas.microsoft.com/office/drawing/2014/main" xmlns="">
+              <a14:hiddenFill xmlns="" xmlns:a16="http://schemas.microsoft.com/office/drawing/2014/main" xmlns:p14="http://schemas.microsoft.com/office/powerpoint/2010/main" xmlns:a14="http://schemas.microsoft.com/office/drawing/2010/main">
                 <a:solidFill>
                   <a:srgbClr val="FFFFFF"/>
                 </a:solidFill>
@@ -38662,7 +38662,7 @@
               </a:ln>
               <a:extLst>
                 <a:ext uri="{91240B29-F687-4f45-9708-019B960494DF}">
-                  <a14:hiddenLine xmlns:a14="http://schemas.microsoft.com/office/drawing/2010/main" xmlns:p14="http://schemas.microsoft.com/office/powerpoint/2010/main" xmlns:a16="http://schemas.microsoft.com/office/drawing/2014/main" xmlns="" w="9525">
+                  <a14:hiddenLine xmlns="" xmlns:a16="http://schemas.microsoft.com/office/drawing/2014/main" xmlns:p14="http://schemas.microsoft.com/office/powerpoint/2010/main" xmlns:a14="http://schemas.microsoft.com/office/drawing/2010/main" w="9525">
                     <a:solidFill>
                       <a:srgbClr val="000000"/>
                     </a:solidFill>
@@ -38767,7 +38767,7 @@
               </a:ln>
               <a:extLst>
                 <a:ext uri="{91240B29-F687-4f45-9708-019B960494DF}">
-                  <a14:hiddenLine xmlns:a14="http://schemas.microsoft.com/office/drawing/2010/main" xmlns:p14="http://schemas.microsoft.com/office/powerpoint/2010/main" xmlns:a16="http://schemas.microsoft.com/office/drawing/2014/main" xmlns="" w="9525">
+                  <a14:hiddenLine xmlns="" xmlns:a16="http://schemas.microsoft.com/office/drawing/2014/main" xmlns:p14="http://schemas.microsoft.com/office/powerpoint/2010/main" xmlns:a14="http://schemas.microsoft.com/office/drawing/2010/main" w="9525">
                     <a:solidFill>
                       <a:srgbClr val="000000"/>
                     </a:solidFill>
@@ -38872,7 +38872,7 @@
               </a:ln>
               <a:extLst>
                 <a:ext uri="{91240B29-F687-4f45-9708-019B960494DF}">
-                  <a14:hiddenLine xmlns:a14="http://schemas.microsoft.com/office/drawing/2010/main" xmlns:p14="http://schemas.microsoft.com/office/powerpoint/2010/main" xmlns:a16="http://schemas.microsoft.com/office/drawing/2014/main" xmlns="" w="9525">
+                  <a14:hiddenLine xmlns="" xmlns:a16="http://schemas.microsoft.com/office/drawing/2014/main" xmlns:p14="http://schemas.microsoft.com/office/powerpoint/2010/main" xmlns:a14="http://schemas.microsoft.com/office/drawing/2010/main" w="9525">
                     <a:solidFill>
                       <a:srgbClr val="000000"/>
                     </a:solidFill>
@@ -38949,7 +38949,7 @@
               </a:ln>
               <a:extLst>
                 <a:ext uri="{91240B29-F687-4f45-9708-019B960494DF}">
-                  <a14:hiddenLine xmlns:a14="http://schemas.microsoft.com/office/drawing/2010/main" xmlns:p14="http://schemas.microsoft.com/office/powerpoint/2010/main" xmlns:a16="http://schemas.microsoft.com/office/drawing/2014/main" xmlns="" w="9525">
+                  <a14:hiddenLine xmlns="" xmlns:a16="http://schemas.microsoft.com/office/drawing/2014/main" xmlns:p14="http://schemas.microsoft.com/office/powerpoint/2010/main" xmlns:a14="http://schemas.microsoft.com/office/drawing/2010/main" w="9525">
                     <a:solidFill>
                       <a:srgbClr val="000000"/>
                     </a:solidFill>
@@ -39054,7 +39054,7 @@
               </a:ln>
               <a:extLst>
                 <a:ext uri="{91240B29-F687-4f45-9708-019B960494DF}">
-                  <a14:hiddenLine xmlns:a14="http://schemas.microsoft.com/office/drawing/2010/main" xmlns:p14="http://schemas.microsoft.com/office/powerpoint/2010/main" xmlns:a16="http://schemas.microsoft.com/office/drawing/2014/main" xmlns="" w="9525">
+                  <a14:hiddenLine xmlns="" xmlns:a16="http://schemas.microsoft.com/office/drawing/2014/main" xmlns:p14="http://schemas.microsoft.com/office/powerpoint/2010/main" xmlns:a14="http://schemas.microsoft.com/office/drawing/2010/main" w="9525">
                     <a:solidFill>
                       <a:srgbClr val="000000"/>
                     </a:solidFill>
@@ -39131,7 +39131,7 @@
               </a:ln>
               <a:extLst>
                 <a:ext uri="{91240B29-F687-4f45-9708-019B960494DF}">
-                  <a14:hiddenLine xmlns:a14="http://schemas.microsoft.com/office/drawing/2010/main" xmlns:p14="http://schemas.microsoft.com/office/powerpoint/2010/main" xmlns:a16="http://schemas.microsoft.com/office/drawing/2014/main" xmlns="" w="9525">
+                  <a14:hiddenLine xmlns="" xmlns:a16="http://schemas.microsoft.com/office/drawing/2014/main" xmlns:p14="http://schemas.microsoft.com/office/powerpoint/2010/main" xmlns:a14="http://schemas.microsoft.com/office/drawing/2010/main" w="9525">
                     <a:solidFill>
                       <a:srgbClr val="000000"/>
                     </a:solidFill>
@@ -39208,7 +39208,7 @@
               </a:ln>
               <a:extLst>
                 <a:ext uri="{91240B29-F687-4f45-9708-019B960494DF}">
-                  <a14:hiddenLine xmlns:a14="http://schemas.microsoft.com/office/drawing/2010/main" xmlns:p14="http://schemas.microsoft.com/office/powerpoint/2010/main" xmlns:a16="http://schemas.microsoft.com/office/drawing/2014/main" xmlns="" w="9525">
+                  <a14:hiddenLine xmlns="" xmlns:a16="http://schemas.microsoft.com/office/drawing/2014/main" xmlns:p14="http://schemas.microsoft.com/office/powerpoint/2010/main" xmlns:a14="http://schemas.microsoft.com/office/drawing/2010/main" w="9525">
                     <a:solidFill>
                       <a:srgbClr val="000000"/>
                     </a:solidFill>
@@ -39313,7 +39313,7 @@
               </a:ln>
               <a:extLst>
                 <a:ext uri="{91240B29-F687-4f45-9708-019B960494DF}">
-                  <a14:hiddenLine xmlns:a14="http://schemas.microsoft.com/office/drawing/2010/main" xmlns:p14="http://schemas.microsoft.com/office/powerpoint/2010/main" xmlns:a16="http://schemas.microsoft.com/office/drawing/2014/main" xmlns="" w="9525">
+                  <a14:hiddenLine xmlns="" xmlns:a16="http://schemas.microsoft.com/office/drawing/2014/main" xmlns:p14="http://schemas.microsoft.com/office/powerpoint/2010/main" xmlns:a14="http://schemas.microsoft.com/office/drawing/2010/main" w="9525">
                     <a:solidFill>
                       <a:srgbClr val="000000"/>
                     </a:solidFill>
@@ -39418,7 +39418,7 @@
               </a:ln>
               <a:extLst>
                 <a:ext uri="{91240B29-F687-4f45-9708-019B960494DF}">
-                  <a14:hiddenLine xmlns:a14="http://schemas.microsoft.com/office/drawing/2010/main" xmlns:p14="http://schemas.microsoft.com/office/powerpoint/2010/main" xmlns:a16="http://schemas.microsoft.com/office/drawing/2014/main" xmlns="" w="9525">
+                  <a14:hiddenLine xmlns="" xmlns:a16="http://schemas.microsoft.com/office/drawing/2014/main" xmlns:p14="http://schemas.microsoft.com/office/powerpoint/2010/main" xmlns:a14="http://schemas.microsoft.com/office/drawing/2010/main" w="9525">
                     <a:solidFill>
                       <a:srgbClr val="000000"/>
                     </a:solidFill>
@@ -39495,7 +39495,7 @@
               </a:ln>
               <a:extLst>
                 <a:ext uri="{91240B29-F687-4f45-9708-019B960494DF}">
-                  <a14:hiddenLine xmlns:a14="http://schemas.microsoft.com/office/drawing/2010/main" xmlns:p14="http://schemas.microsoft.com/office/powerpoint/2010/main" xmlns:a16="http://schemas.microsoft.com/office/drawing/2014/main" xmlns="" w="9525">
+                  <a14:hiddenLine xmlns="" xmlns:a16="http://schemas.microsoft.com/office/drawing/2014/main" xmlns:p14="http://schemas.microsoft.com/office/powerpoint/2010/main" xmlns:a14="http://schemas.microsoft.com/office/drawing/2010/main" w="9525">
                     <a:solidFill>
                       <a:srgbClr val="000000"/>
                     </a:solidFill>
@@ -39620,7 +39620,7 @@
               </a:ln>
               <a:extLst>
                 <a:ext uri="{91240B29-F687-4f45-9708-019B960494DF}">
-                  <a14:hiddenLine xmlns:a14="http://schemas.microsoft.com/office/drawing/2010/main" xmlns:p14="http://schemas.microsoft.com/office/powerpoint/2010/main" xmlns:a16="http://schemas.microsoft.com/office/drawing/2014/main" xmlns="" w="9525">
+                  <a14:hiddenLine xmlns="" xmlns:a16="http://schemas.microsoft.com/office/drawing/2014/main" xmlns:p14="http://schemas.microsoft.com/office/powerpoint/2010/main" xmlns:a14="http://schemas.microsoft.com/office/drawing/2010/main" w="9525">
                     <a:solidFill>
                       <a:srgbClr val="000000"/>
                     </a:solidFill>
@@ -39734,7 +39734,7 @@
               </a:ln>
               <a:extLst>
                 <a:ext uri="{91240B29-F687-4f45-9708-019B960494DF}">
-                  <a14:hiddenLine xmlns:a14="http://schemas.microsoft.com/office/drawing/2010/main" xmlns:p14="http://schemas.microsoft.com/office/powerpoint/2010/main" xmlns:a16="http://schemas.microsoft.com/office/drawing/2014/main" xmlns="" w="9525">
+                  <a14:hiddenLine xmlns="" xmlns:a16="http://schemas.microsoft.com/office/drawing/2014/main" xmlns:p14="http://schemas.microsoft.com/office/powerpoint/2010/main" xmlns:a14="http://schemas.microsoft.com/office/drawing/2010/main" w="9525">
                     <a:solidFill>
                       <a:srgbClr val="000000"/>
                     </a:solidFill>
@@ -39811,7 +39811,7 @@
               </a:ln>
               <a:extLst>
                 <a:ext uri="{91240B29-F687-4f45-9708-019B960494DF}">
-                  <a14:hiddenLine xmlns:a14="http://schemas.microsoft.com/office/drawing/2010/main" xmlns:p14="http://schemas.microsoft.com/office/powerpoint/2010/main" xmlns:a16="http://schemas.microsoft.com/office/drawing/2014/main" xmlns="" w="9525">
+                  <a14:hiddenLine xmlns="" xmlns:a16="http://schemas.microsoft.com/office/drawing/2014/main" xmlns:p14="http://schemas.microsoft.com/office/powerpoint/2010/main" xmlns:a14="http://schemas.microsoft.com/office/drawing/2010/main" w="9525">
                     <a:solidFill>
                       <a:srgbClr val="000000"/>
                     </a:solidFill>
@@ -39888,7 +39888,7 @@
               </a:ln>
               <a:extLst>
                 <a:ext uri="{91240B29-F687-4f45-9708-019B960494DF}">
-                  <a14:hiddenLine xmlns:a14="http://schemas.microsoft.com/office/drawing/2010/main" xmlns:p14="http://schemas.microsoft.com/office/powerpoint/2010/main" xmlns:a16="http://schemas.microsoft.com/office/drawing/2014/main" xmlns="" w="9525">
+                  <a14:hiddenLine xmlns="" xmlns:a16="http://schemas.microsoft.com/office/drawing/2014/main" xmlns:p14="http://schemas.microsoft.com/office/powerpoint/2010/main" xmlns:a14="http://schemas.microsoft.com/office/drawing/2010/main" w="9525">
                     <a:solidFill>
                       <a:srgbClr val="000000"/>
                     </a:solidFill>
@@ -39993,7 +39993,7 @@
               </a:ln>
               <a:extLst>
                 <a:ext uri="{91240B29-F687-4f45-9708-019B960494DF}">
-                  <a14:hiddenLine xmlns:a14="http://schemas.microsoft.com/office/drawing/2010/main" xmlns:p14="http://schemas.microsoft.com/office/powerpoint/2010/main" xmlns:a16="http://schemas.microsoft.com/office/drawing/2014/main" xmlns="" w="9525">
+                  <a14:hiddenLine xmlns="" xmlns:a16="http://schemas.microsoft.com/office/drawing/2014/main" xmlns:p14="http://schemas.microsoft.com/office/powerpoint/2010/main" xmlns:a14="http://schemas.microsoft.com/office/drawing/2010/main" w="9525">
                     <a:solidFill>
                       <a:srgbClr val="000000"/>
                     </a:solidFill>
@@ -40042,7 +40042,7 @@
               </a:ln>
               <a:extLst>
                 <a:ext uri="{91240B29-F687-4f45-9708-019B960494DF}">
-                  <a14:hiddenLine xmlns:a14="http://schemas.microsoft.com/office/drawing/2010/main" xmlns:p14="http://schemas.microsoft.com/office/powerpoint/2010/main" xmlns:a16="http://schemas.microsoft.com/office/drawing/2014/main" xmlns="" w="9525">
+                  <a14:hiddenLine xmlns="" xmlns:a16="http://schemas.microsoft.com/office/drawing/2014/main" xmlns:p14="http://schemas.microsoft.com/office/powerpoint/2010/main" xmlns:a14="http://schemas.microsoft.com/office/drawing/2010/main" w="9525">
                     <a:solidFill>
                       <a:srgbClr val="000000"/>
                     </a:solidFill>
@@ -40122,7 +40122,7 @@
               </a:ln>
               <a:extLst>
                 <a:ext uri="{91240B29-F687-4f45-9708-019B960494DF}">
-                  <a14:hiddenLine xmlns:a14="http://schemas.microsoft.com/office/drawing/2010/main" xmlns:p14="http://schemas.microsoft.com/office/powerpoint/2010/main" xmlns:a16="http://schemas.microsoft.com/office/drawing/2014/main" xmlns="" w="9525">
+                  <a14:hiddenLine xmlns="" xmlns:a16="http://schemas.microsoft.com/office/drawing/2014/main" xmlns:p14="http://schemas.microsoft.com/office/powerpoint/2010/main" xmlns:a14="http://schemas.microsoft.com/office/drawing/2010/main" w="9525">
                     <a:solidFill>
                       <a:srgbClr val="000000"/>
                     </a:solidFill>
@@ -40227,7 +40227,7 @@
               </a:ln>
               <a:extLst>
                 <a:ext uri="{91240B29-F687-4f45-9708-019B960494DF}">
-                  <a14:hiddenLine xmlns:a14="http://schemas.microsoft.com/office/drawing/2010/main" xmlns:p14="http://schemas.microsoft.com/office/powerpoint/2010/main" xmlns:a16="http://schemas.microsoft.com/office/drawing/2014/main" xmlns="" w="9525">
+                  <a14:hiddenLine xmlns="" xmlns:a16="http://schemas.microsoft.com/office/drawing/2014/main" xmlns:p14="http://schemas.microsoft.com/office/powerpoint/2010/main" xmlns:a14="http://schemas.microsoft.com/office/drawing/2010/main" w="9525">
                     <a:solidFill>
                       <a:srgbClr val="000000"/>
                     </a:solidFill>
@@ -40304,7 +40304,7 @@
               </a:ln>
               <a:extLst>
                 <a:ext uri="{91240B29-F687-4f45-9708-019B960494DF}">
-                  <a14:hiddenLine xmlns:a14="http://schemas.microsoft.com/office/drawing/2010/main" xmlns:p14="http://schemas.microsoft.com/office/powerpoint/2010/main" xmlns:a16="http://schemas.microsoft.com/office/drawing/2014/main" xmlns="" w="9525">
+                  <a14:hiddenLine xmlns="" xmlns:a16="http://schemas.microsoft.com/office/drawing/2014/main" xmlns:p14="http://schemas.microsoft.com/office/powerpoint/2010/main" xmlns:a14="http://schemas.microsoft.com/office/drawing/2010/main" w="9525">
                     <a:solidFill>
                       <a:srgbClr val="000000"/>
                     </a:solidFill>
@@ -40409,7 +40409,7 @@
               </a:ln>
               <a:extLst>
                 <a:ext uri="{91240B29-F687-4f45-9708-019B960494DF}">
-                  <a14:hiddenLine xmlns:a14="http://schemas.microsoft.com/office/drawing/2010/main" xmlns:p14="http://schemas.microsoft.com/office/powerpoint/2010/main" xmlns:a16="http://schemas.microsoft.com/office/drawing/2014/main" xmlns="" w="9525">
+                  <a14:hiddenLine xmlns="" xmlns:a16="http://schemas.microsoft.com/office/drawing/2014/main" xmlns:p14="http://schemas.microsoft.com/office/powerpoint/2010/main" xmlns:a14="http://schemas.microsoft.com/office/drawing/2010/main" w="9525">
                     <a:solidFill>
                       <a:srgbClr val="000000"/>
                     </a:solidFill>
@@ -40489,7 +40489,7 @@
               </a:ln>
               <a:extLst>
                 <a:ext uri="{91240B29-F687-4f45-9708-019B960494DF}">
-                  <a14:hiddenLine xmlns:a14="http://schemas.microsoft.com/office/drawing/2010/main" xmlns:p14="http://schemas.microsoft.com/office/powerpoint/2010/main" xmlns:a16="http://schemas.microsoft.com/office/drawing/2014/main" xmlns="" w="9525">
+                  <a14:hiddenLine xmlns="" xmlns:a16="http://schemas.microsoft.com/office/drawing/2014/main" xmlns:p14="http://schemas.microsoft.com/office/powerpoint/2010/main" xmlns:a14="http://schemas.microsoft.com/office/drawing/2010/main" w="9525">
                     <a:solidFill>
                       <a:srgbClr val="000000"/>
                     </a:solidFill>
@@ -40566,7 +40566,7 @@
               </a:ln>
               <a:extLst>
                 <a:ext uri="{91240B29-F687-4f45-9708-019B960494DF}">
-                  <a14:hiddenLine xmlns:a14="http://schemas.microsoft.com/office/drawing/2010/main" xmlns:p14="http://schemas.microsoft.com/office/powerpoint/2010/main" xmlns:a16="http://schemas.microsoft.com/office/drawing/2014/main" xmlns="" w="9525">
+                  <a14:hiddenLine xmlns="" xmlns:a16="http://schemas.microsoft.com/office/drawing/2014/main" xmlns:p14="http://schemas.microsoft.com/office/powerpoint/2010/main" xmlns:a14="http://schemas.microsoft.com/office/drawing/2010/main" w="9525">
                     <a:solidFill>
                       <a:srgbClr val="000000"/>
                     </a:solidFill>
@@ -40671,7 +40671,7 @@
               </a:ln>
               <a:extLst>
                 <a:ext uri="{91240B29-F687-4f45-9708-019B960494DF}">
-                  <a14:hiddenLine xmlns:a14="http://schemas.microsoft.com/office/drawing/2010/main" xmlns:p14="http://schemas.microsoft.com/office/powerpoint/2010/main" xmlns:a16="http://schemas.microsoft.com/office/drawing/2014/main" xmlns="" w="9525">
+                  <a14:hiddenLine xmlns="" xmlns:a16="http://schemas.microsoft.com/office/drawing/2014/main" xmlns:p14="http://schemas.microsoft.com/office/powerpoint/2010/main" xmlns:a14="http://schemas.microsoft.com/office/drawing/2010/main" w="9525">
                     <a:solidFill>
                       <a:srgbClr val="000000"/>
                     </a:solidFill>
@@ -40776,7 +40776,7 @@
               </a:ln>
               <a:extLst>
                 <a:ext uri="{91240B29-F687-4f45-9708-019B960494DF}">
-                  <a14:hiddenLine xmlns:a14="http://schemas.microsoft.com/office/drawing/2010/main" xmlns:p14="http://schemas.microsoft.com/office/powerpoint/2010/main" xmlns:a16="http://schemas.microsoft.com/office/drawing/2014/main" xmlns="" w="9525">
+                  <a14:hiddenLine xmlns="" xmlns:a16="http://schemas.microsoft.com/office/drawing/2014/main" xmlns:p14="http://schemas.microsoft.com/office/powerpoint/2010/main" xmlns:a14="http://schemas.microsoft.com/office/drawing/2010/main" w="9525">
                     <a:solidFill>
                       <a:srgbClr val="000000"/>
                     </a:solidFill>
@@ -40856,7 +40856,7 @@
               </a:ln>
               <a:extLst>
                 <a:ext uri="{91240B29-F687-4f45-9708-019B960494DF}">
-                  <a14:hiddenLine xmlns:a14="http://schemas.microsoft.com/office/drawing/2010/main" xmlns:p14="http://schemas.microsoft.com/office/powerpoint/2010/main" xmlns:a16="http://schemas.microsoft.com/office/drawing/2014/main" xmlns="" w="9525">
+                  <a14:hiddenLine xmlns="" xmlns:a16="http://schemas.microsoft.com/office/drawing/2014/main" xmlns:p14="http://schemas.microsoft.com/office/powerpoint/2010/main" xmlns:a14="http://schemas.microsoft.com/office/drawing/2010/main" w="9525">
                     <a:solidFill>
                       <a:srgbClr val="000000"/>
                     </a:solidFill>
@@ -40991,7 +40991,7 @@
               </a:ln>
               <a:extLst>
                 <a:ext uri="{91240B29-F687-4f45-9708-019B960494DF}">
-                  <a14:hiddenLine xmlns:a14="http://schemas.microsoft.com/office/drawing/2010/main" xmlns:p14="http://schemas.microsoft.com/office/powerpoint/2010/main" xmlns:a16="http://schemas.microsoft.com/office/drawing/2014/main" xmlns="" w="9525">
+                  <a14:hiddenLine xmlns="" xmlns:a16="http://schemas.microsoft.com/office/drawing/2014/main" xmlns:p14="http://schemas.microsoft.com/office/powerpoint/2010/main" xmlns:a14="http://schemas.microsoft.com/office/drawing/2010/main" w="9525">
                     <a:solidFill>
                       <a:srgbClr val="000000"/>
                     </a:solidFill>
@@ -41119,7 +41119,7 @@
               </a:ln>
               <a:extLst>
                 <a:ext uri="{91240B29-F687-4f45-9708-019B960494DF}">
-                  <a14:hiddenLine xmlns:a14="http://schemas.microsoft.com/office/drawing/2010/main" xmlns:p14="http://schemas.microsoft.com/office/powerpoint/2010/main" xmlns:a16="http://schemas.microsoft.com/office/drawing/2014/main" xmlns="" w="9525">
+                  <a14:hiddenLine xmlns="" xmlns:a16="http://schemas.microsoft.com/office/drawing/2014/main" xmlns:p14="http://schemas.microsoft.com/office/powerpoint/2010/main" xmlns:a14="http://schemas.microsoft.com/office/drawing/2010/main" w="9525">
                     <a:solidFill>
                       <a:srgbClr val="000000"/>
                     </a:solidFill>
@@ -41249,7 +41249,7 @@
               </a:ln>
               <a:extLst>
                 <a:ext uri="{91240B29-F687-4f45-9708-019B960494DF}">
-                  <a14:hiddenLine xmlns:a14="http://schemas.microsoft.com/office/drawing/2010/main" xmlns:p14="http://schemas.microsoft.com/office/powerpoint/2010/main" xmlns:a16="http://schemas.microsoft.com/office/drawing/2014/main" xmlns="" w="9525">
+                  <a14:hiddenLine xmlns="" xmlns:a16="http://schemas.microsoft.com/office/drawing/2014/main" xmlns:p14="http://schemas.microsoft.com/office/powerpoint/2010/main" xmlns:a14="http://schemas.microsoft.com/office/drawing/2010/main" w="9525">
                     <a:solidFill>
                       <a:srgbClr val="000000"/>
                     </a:solidFill>
@@ -41354,7 +41354,7 @@
               </a:ln>
               <a:extLst>
                 <a:ext uri="{91240B29-F687-4f45-9708-019B960494DF}">
-                  <a14:hiddenLine xmlns:a14="http://schemas.microsoft.com/office/drawing/2010/main" xmlns:p14="http://schemas.microsoft.com/office/powerpoint/2010/main" xmlns:a16="http://schemas.microsoft.com/office/drawing/2014/main" xmlns="" w="9525">
+                  <a14:hiddenLine xmlns="" xmlns:a16="http://schemas.microsoft.com/office/drawing/2014/main" xmlns:p14="http://schemas.microsoft.com/office/powerpoint/2010/main" xmlns:a14="http://schemas.microsoft.com/office/drawing/2010/main" w="9525">
                     <a:solidFill>
                       <a:srgbClr val="000000"/>
                     </a:solidFill>
@@ -41434,7 +41434,7 @@
               </a:ln>
               <a:extLst>
                 <a:ext uri="{91240B29-F687-4f45-9708-019B960494DF}">
-                  <a14:hiddenLine xmlns:a14="http://schemas.microsoft.com/office/drawing/2010/main" xmlns:p14="http://schemas.microsoft.com/office/powerpoint/2010/main" xmlns:a16="http://schemas.microsoft.com/office/drawing/2014/main" xmlns="" w="9525">
+                  <a14:hiddenLine xmlns="" xmlns:a16="http://schemas.microsoft.com/office/drawing/2014/main" xmlns:p14="http://schemas.microsoft.com/office/powerpoint/2010/main" xmlns:a14="http://schemas.microsoft.com/office/drawing/2010/main" w="9525">
                     <a:solidFill>
                       <a:srgbClr val="000000"/>
                     </a:solidFill>
@@ -41539,7 +41539,7 @@
               </a:ln>
               <a:extLst>
                 <a:ext uri="{91240B29-F687-4f45-9708-019B960494DF}">
-                  <a14:hiddenLine xmlns:a14="http://schemas.microsoft.com/office/drawing/2010/main" xmlns:p14="http://schemas.microsoft.com/office/powerpoint/2010/main" xmlns:a16="http://schemas.microsoft.com/office/drawing/2014/main" xmlns="" w="9525">
+                  <a14:hiddenLine xmlns="" xmlns:a16="http://schemas.microsoft.com/office/drawing/2014/main" xmlns:p14="http://schemas.microsoft.com/office/powerpoint/2010/main" xmlns:a14="http://schemas.microsoft.com/office/drawing/2010/main" w="9525">
                     <a:solidFill>
                       <a:srgbClr val="000000"/>
                     </a:solidFill>
@@ -41622,7 +41622,7 @@
               </a:ln>
               <a:extLst>
                 <a:ext uri="{91240B29-F687-4f45-9708-019B960494DF}">
-                  <a14:hiddenLine xmlns:a14="http://schemas.microsoft.com/office/drawing/2010/main" xmlns:p14="http://schemas.microsoft.com/office/powerpoint/2010/main" xmlns:a16="http://schemas.microsoft.com/office/drawing/2014/main" xmlns="" w="9525">
+                  <a14:hiddenLine xmlns="" xmlns:a16="http://schemas.microsoft.com/office/drawing/2014/main" xmlns:p14="http://schemas.microsoft.com/office/powerpoint/2010/main" xmlns:a14="http://schemas.microsoft.com/office/drawing/2010/main" w="9525">
                     <a:solidFill>
                       <a:srgbClr val="000000"/>
                     </a:solidFill>
@@ -41727,7 +41727,7 @@
               </a:ln>
               <a:extLst>
                 <a:ext uri="{91240B29-F687-4f45-9708-019B960494DF}">
-                  <a14:hiddenLine xmlns:a14="http://schemas.microsoft.com/office/drawing/2010/main" xmlns:p14="http://schemas.microsoft.com/office/powerpoint/2010/main" xmlns:a16="http://schemas.microsoft.com/office/drawing/2014/main" xmlns="" w="9525">
+                  <a14:hiddenLine xmlns="" xmlns:a16="http://schemas.microsoft.com/office/drawing/2014/main" xmlns:p14="http://schemas.microsoft.com/office/powerpoint/2010/main" xmlns:a14="http://schemas.microsoft.com/office/drawing/2010/main" w="9525">
                     <a:solidFill>
                       <a:srgbClr val="000000"/>
                     </a:solidFill>
@@ -41810,7 +41810,7 @@
               </a:ln>
               <a:extLst>
                 <a:ext uri="{91240B29-F687-4f45-9708-019B960494DF}">
-                  <a14:hiddenLine xmlns:a14="http://schemas.microsoft.com/office/drawing/2010/main" xmlns:p14="http://schemas.microsoft.com/office/powerpoint/2010/main" xmlns:a16="http://schemas.microsoft.com/office/drawing/2014/main" xmlns="" w="9525">
+                  <a14:hiddenLine xmlns="" xmlns:a16="http://schemas.microsoft.com/office/drawing/2014/main" xmlns:p14="http://schemas.microsoft.com/office/powerpoint/2010/main" xmlns:a14="http://schemas.microsoft.com/office/drawing/2010/main" w="9525">
                     <a:solidFill>
                       <a:srgbClr val="000000"/>
                     </a:solidFill>
@@ -41915,7 +41915,7 @@
               </a:ln>
               <a:extLst>
                 <a:ext uri="{91240B29-F687-4f45-9708-019B960494DF}">
-                  <a14:hiddenLine xmlns:a14="http://schemas.microsoft.com/office/drawing/2010/main" xmlns:p14="http://schemas.microsoft.com/office/powerpoint/2010/main" xmlns:a16="http://schemas.microsoft.com/office/drawing/2014/main" xmlns="" w="9525">
+                  <a14:hiddenLine xmlns="" xmlns:a16="http://schemas.microsoft.com/office/drawing/2014/main" xmlns:p14="http://schemas.microsoft.com/office/powerpoint/2010/main" xmlns:a14="http://schemas.microsoft.com/office/drawing/2010/main" w="9525">
                     <a:solidFill>
                       <a:srgbClr val="000000"/>
                     </a:solidFill>
@@ -41964,7 +41964,7 @@
               </a:ln>
               <a:extLst>
                 <a:ext uri="{91240B29-F687-4f45-9708-019B960494DF}">
-                  <a14:hiddenLine xmlns:a14="http://schemas.microsoft.com/office/drawing/2010/main" xmlns:p14="http://schemas.microsoft.com/office/powerpoint/2010/main" xmlns:a16="http://schemas.microsoft.com/office/drawing/2014/main" xmlns="" w="9525">
+                  <a14:hiddenLine xmlns="" xmlns:a16="http://schemas.microsoft.com/office/drawing/2014/main" xmlns:p14="http://schemas.microsoft.com/office/powerpoint/2010/main" xmlns:a14="http://schemas.microsoft.com/office/drawing/2010/main" w="9525">
                     <a:solidFill>
                       <a:srgbClr val="000000"/>
                     </a:solidFill>
@@ -42084,7 +42084,7 @@
           </a:prstGeom>
           <a:extLst>
             <a:ext uri="{909E8E84-426E-40dd-AFC4-6F175D3DCCD1}">
-              <a14:hiddenFill xmlns:a14="http://schemas.microsoft.com/office/drawing/2010/main" xmlns:p14="http://schemas.microsoft.com/office/powerpoint/2010/main" xmlns:a16="http://schemas.microsoft.com/office/drawing/2014/main" xmlns="">
+              <a14:hiddenFill xmlns="" xmlns:a16="http://schemas.microsoft.com/office/drawing/2014/main" xmlns:p14="http://schemas.microsoft.com/office/powerpoint/2010/main" xmlns:a14="http://schemas.microsoft.com/office/drawing/2010/main">
                 <a:solidFill>
                   <a:srgbClr val="FFFFFF"/>
                 </a:solidFill>
@@ -42208,7 +42208,7 @@
           <a:noFill/>
           <a:extLst>
             <a:ext uri="{909E8E84-426E-40dd-AFC4-6F175D3DCCD1}">
-              <a14:hiddenFill xmlns:a14="http://schemas.microsoft.com/office/drawing/2010/main" xmlns:p14="http://schemas.microsoft.com/office/powerpoint/2010/main" xmlns:a16="http://schemas.microsoft.com/office/drawing/2014/main" xmlns="">
+              <a14:hiddenFill xmlns="" xmlns:a16="http://schemas.microsoft.com/office/drawing/2014/main" xmlns:p14="http://schemas.microsoft.com/office/powerpoint/2010/main" xmlns:a14="http://schemas.microsoft.com/office/drawing/2010/main">
                 <a:solidFill>
                   <a:srgbClr val="FFFFFF"/>
                 </a:solidFill>
@@ -42396,7 +42396,7 @@
             </a:ln>
             <a:extLst>
               <a:ext uri="{91240B29-F687-4f45-9708-019B960494DF}">
-                <a14:hiddenLine xmlns:a14="http://schemas.microsoft.com/office/drawing/2010/main" xmlns:p14="http://schemas.microsoft.com/office/powerpoint/2010/main" xmlns:a16="http://schemas.microsoft.com/office/drawing/2014/main" xmlns="" w="9525">
+                <a14:hiddenLine xmlns="" xmlns:a16="http://schemas.microsoft.com/office/drawing/2014/main" xmlns:p14="http://schemas.microsoft.com/office/powerpoint/2010/main" xmlns:a14="http://schemas.microsoft.com/office/drawing/2010/main" w="9525">
                   <a:solidFill>
                     <a:srgbClr val="000000"/>
                   </a:solidFill>
@@ -42501,7 +42501,7 @@
             </a:ln>
             <a:extLst>
               <a:ext uri="{91240B29-F687-4f45-9708-019B960494DF}">
-                <a14:hiddenLine xmlns:a14="http://schemas.microsoft.com/office/drawing/2010/main" xmlns:p14="http://schemas.microsoft.com/office/powerpoint/2010/main" xmlns:a16="http://schemas.microsoft.com/office/drawing/2014/main" xmlns="" w="9525">
+                <a14:hiddenLine xmlns="" xmlns:a16="http://schemas.microsoft.com/office/drawing/2014/main" xmlns:p14="http://schemas.microsoft.com/office/powerpoint/2010/main" xmlns:a14="http://schemas.microsoft.com/office/drawing/2010/main" w="9525">
                   <a:solidFill>
                     <a:srgbClr val="000000"/>
                   </a:solidFill>
@@ -42606,7 +42606,7 @@
             </a:ln>
             <a:extLst>
               <a:ext uri="{91240B29-F687-4f45-9708-019B960494DF}">
-                <a14:hiddenLine xmlns:a14="http://schemas.microsoft.com/office/drawing/2010/main" xmlns:p14="http://schemas.microsoft.com/office/powerpoint/2010/main" xmlns:a16="http://schemas.microsoft.com/office/drawing/2014/main" xmlns="" w="9525">
+                <a14:hiddenLine xmlns="" xmlns:a16="http://schemas.microsoft.com/office/drawing/2014/main" xmlns:p14="http://schemas.microsoft.com/office/powerpoint/2010/main" xmlns:a14="http://schemas.microsoft.com/office/drawing/2010/main" w="9525">
                   <a:solidFill>
                     <a:srgbClr val="000000"/>
                   </a:solidFill>
@@ -42683,7 +42683,7 @@
             </a:ln>
             <a:extLst>
               <a:ext uri="{91240B29-F687-4f45-9708-019B960494DF}">
-                <a14:hiddenLine xmlns:a14="http://schemas.microsoft.com/office/drawing/2010/main" xmlns:p14="http://schemas.microsoft.com/office/powerpoint/2010/main" xmlns:a16="http://schemas.microsoft.com/office/drawing/2014/main" xmlns="" w="9525">
+                <a14:hiddenLine xmlns="" xmlns:a16="http://schemas.microsoft.com/office/drawing/2014/main" xmlns:p14="http://schemas.microsoft.com/office/powerpoint/2010/main" xmlns:a14="http://schemas.microsoft.com/office/drawing/2010/main" w="9525">
                   <a:solidFill>
                     <a:srgbClr val="000000"/>
                   </a:solidFill>
@@ -42788,7 +42788,7 @@
             </a:ln>
             <a:extLst>
               <a:ext uri="{91240B29-F687-4f45-9708-019B960494DF}">
-                <a14:hiddenLine xmlns:a14="http://schemas.microsoft.com/office/drawing/2010/main" xmlns:p14="http://schemas.microsoft.com/office/powerpoint/2010/main" xmlns:a16="http://schemas.microsoft.com/office/drawing/2014/main" xmlns="" w="9525">
+                <a14:hiddenLine xmlns="" xmlns:a16="http://schemas.microsoft.com/office/drawing/2014/main" xmlns:p14="http://schemas.microsoft.com/office/powerpoint/2010/main" xmlns:a14="http://schemas.microsoft.com/office/drawing/2010/main" w="9525">
                   <a:solidFill>
                     <a:srgbClr val="000000"/>
                   </a:solidFill>
@@ -42865,7 +42865,7 @@
             </a:ln>
             <a:extLst>
               <a:ext uri="{91240B29-F687-4f45-9708-019B960494DF}">
-                <a14:hiddenLine xmlns:a14="http://schemas.microsoft.com/office/drawing/2010/main" xmlns:p14="http://schemas.microsoft.com/office/powerpoint/2010/main" xmlns:a16="http://schemas.microsoft.com/office/drawing/2014/main" xmlns="" w="9525">
+                <a14:hiddenLine xmlns="" xmlns:a16="http://schemas.microsoft.com/office/drawing/2014/main" xmlns:p14="http://schemas.microsoft.com/office/powerpoint/2010/main" xmlns:a14="http://schemas.microsoft.com/office/drawing/2010/main" w="9525">
                   <a:solidFill>
                     <a:srgbClr val="000000"/>
                   </a:solidFill>
@@ -42942,7 +42942,7 @@
             </a:ln>
             <a:extLst>
               <a:ext uri="{91240B29-F687-4f45-9708-019B960494DF}">
-                <a14:hiddenLine xmlns:a14="http://schemas.microsoft.com/office/drawing/2010/main" xmlns:p14="http://schemas.microsoft.com/office/powerpoint/2010/main" xmlns:a16="http://schemas.microsoft.com/office/drawing/2014/main" xmlns="" w="9525">
+                <a14:hiddenLine xmlns="" xmlns:a16="http://schemas.microsoft.com/office/drawing/2014/main" xmlns:p14="http://schemas.microsoft.com/office/powerpoint/2010/main" xmlns:a14="http://schemas.microsoft.com/office/drawing/2010/main" w="9525">
                   <a:solidFill>
                     <a:srgbClr val="000000"/>
                   </a:solidFill>
@@ -43047,7 +43047,7 @@
             </a:ln>
             <a:extLst>
               <a:ext uri="{91240B29-F687-4f45-9708-019B960494DF}">
-                <a14:hiddenLine xmlns:a14="http://schemas.microsoft.com/office/drawing/2010/main" xmlns:p14="http://schemas.microsoft.com/office/powerpoint/2010/main" xmlns:a16="http://schemas.microsoft.com/office/drawing/2014/main" xmlns="" w="9525">
+                <a14:hiddenLine xmlns="" xmlns:a16="http://schemas.microsoft.com/office/drawing/2014/main" xmlns:p14="http://schemas.microsoft.com/office/powerpoint/2010/main" xmlns:a14="http://schemas.microsoft.com/office/drawing/2010/main" w="9525">
                   <a:solidFill>
                     <a:srgbClr val="000000"/>
                   </a:solidFill>
@@ -43152,7 +43152,7 @@
             </a:ln>
             <a:extLst>
               <a:ext uri="{91240B29-F687-4f45-9708-019B960494DF}">
-                <a14:hiddenLine xmlns:a14="http://schemas.microsoft.com/office/drawing/2010/main" xmlns:p14="http://schemas.microsoft.com/office/powerpoint/2010/main" xmlns:a16="http://schemas.microsoft.com/office/drawing/2014/main" xmlns="" w="9525">
+                <a14:hiddenLine xmlns="" xmlns:a16="http://schemas.microsoft.com/office/drawing/2014/main" xmlns:p14="http://schemas.microsoft.com/office/powerpoint/2010/main" xmlns:a14="http://schemas.microsoft.com/office/drawing/2010/main" w="9525">
                   <a:solidFill>
                     <a:srgbClr val="000000"/>
                   </a:solidFill>
@@ -43229,7 +43229,7 @@
             </a:ln>
             <a:extLst>
               <a:ext uri="{91240B29-F687-4f45-9708-019B960494DF}">
-                <a14:hiddenLine xmlns:a14="http://schemas.microsoft.com/office/drawing/2010/main" xmlns:p14="http://schemas.microsoft.com/office/powerpoint/2010/main" xmlns:a16="http://schemas.microsoft.com/office/drawing/2014/main" xmlns="" w="9525">
+                <a14:hiddenLine xmlns="" xmlns:a16="http://schemas.microsoft.com/office/drawing/2014/main" xmlns:p14="http://schemas.microsoft.com/office/powerpoint/2010/main" xmlns:a14="http://schemas.microsoft.com/office/drawing/2010/main" w="9525">
                   <a:solidFill>
                     <a:srgbClr val="000000"/>
                   </a:solidFill>
@@ -43354,7 +43354,7 @@
             </a:ln>
             <a:extLst>
               <a:ext uri="{91240B29-F687-4f45-9708-019B960494DF}">
-                <a14:hiddenLine xmlns:a14="http://schemas.microsoft.com/office/drawing/2010/main" xmlns:p14="http://schemas.microsoft.com/office/powerpoint/2010/main" xmlns:a16="http://schemas.microsoft.com/office/drawing/2014/main" xmlns="" w="9525">
+                <a14:hiddenLine xmlns="" xmlns:a16="http://schemas.microsoft.com/office/drawing/2014/main" xmlns:p14="http://schemas.microsoft.com/office/powerpoint/2010/main" xmlns:a14="http://schemas.microsoft.com/office/drawing/2010/main" w="9525">
                   <a:solidFill>
                     <a:srgbClr val="000000"/>
                   </a:solidFill>
@@ -43468,7 +43468,7 @@
             </a:ln>
             <a:extLst>
               <a:ext uri="{91240B29-F687-4f45-9708-019B960494DF}">
-                <a14:hiddenLine xmlns:a14="http://schemas.microsoft.com/office/drawing/2010/main" xmlns:p14="http://schemas.microsoft.com/office/powerpoint/2010/main" xmlns:a16="http://schemas.microsoft.com/office/drawing/2014/main" xmlns="" w="9525">
+                <a14:hiddenLine xmlns="" xmlns:a16="http://schemas.microsoft.com/office/drawing/2014/main" xmlns:p14="http://schemas.microsoft.com/office/powerpoint/2010/main" xmlns:a14="http://schemas.microsoft.com/office/drawing/2010/main" w="9525">
                   <a:solidFill>
                     <a:srgbClr val="000000"/>
                   </a:solidFill>
@@ -43545,7 +43545,7 @@
             </a:ln>
             <a:extLst>
               <a:ext uri="{91240B29-F687-4f45-9708-019B960494DF}">
-                <a14:hiddenLine xmlns:a14="http://schemas.microsoft.com/office/drawing/2010/main" xmlns:p14="http://schemas.microsoft.com/office/powerpoint/2010/main" xmlns:a16="http://schemas.microsoft.com/office/drawing/2014/main" xmlns="" w="9525">
+                <a14:hiddenLine xmlns="" xmlns:a16="http://schemas.microsoft.com/office/drawing/2014/main" xmlns:p14="http://schemas.microsoft.com/office/powerpoint/2010/main" xmlns:a14="http://schemas.microsoft.com/office/drawing/2010/main" w="9525">
                   <a:solidFill>
                     <a:srgbClr val="000000"/>
                   </a:solidFill>
@@ -43622,7 +43622,7 @@
             </a:ln>
             <a:extLst>
               <a:ext uri="{91240B29-F687-4f45-9708-019B960494DF}">
-                <a14:hiddenLine xmlns:a14="http://schemas.microsoft.com/office/drawing/2010/main" xmlns:p14="http://schemas.microsoft.com/office/powerpoint/2010/main" xmlns:a16="http://schemas.microsoft.com/office/drawing/2014/main" xmlns="" w="9525">
+                <a14:hiddenLine xmlns="" xmlns:a16="http://schemas.microsoft.com/office/drawing/2014/main" xmlns:p14="http://schemas.microsoft.com/office/powerpoint/2010/main" xmlns:a14="http://schemas.microsoft.com/office/drawing/2010/main" w="9525">
                   <a:solidFill>
                     <a:srgbClr val="000000"/>
                   </a:solidFill>
@@ -43727,7 +43727,7 @@
             </a:ln>
             <a:extLst>
               <a:ext uri="{91240B29-F687-4f45-9708-019B960494DF}">
-                <a14:hiddenLine xmlns:a14="http://schemas.microsoft.com/office/drawing/2010/main" xmlns:p14="http://schemas.microsoft.com/office/powerpoint/2010/main" xmlns:a16="http://schemas.microsoft.com/office/drawing/2014/main" xmlns="" w="9525">
+                <a14:hiddenLine xmlns="" xmlns:a16="http://schemas.microsoft.com/office/drawing/2014/main" xmlns:p14="http://schemas.microsoft.com/office/powerpoint/2010/main" xmlns:a14="http://schemas.microsoft.com/office/drawing/2010/main" w="9525">
                   <a:solidFill>
                     <a:srgbClr val="000000"/>
                   </a:solidFill>
@@ -43776,7 +43776,7 @@
             </a:ln>
             <a:extLst>
               <a:ext uri="{91240B29-F687-4f45-9708-019B960494DF}">
-                <a14:hiddenLine xmlns:a14="http://schemas.microsoft.com/office/drawing/2010/main" xmlns:p14="http://schemas.microsoft.com/office/powerpoint/2010/main" xmlns:a16="http://schemas.microsoft.com/office/drawing/2014/main" xmlns="" w="9525">
+                <a14:hiddenLine xmlns="" xmlns:a16="http://schemas.microsoft.com/office/drawing/2014/main" xmlns:p14="http://schemas.microsoft.com/office/powerpoint/2010/main" xmlns:a14="http://schemas.microsoft.com/office/drawing/2010/main" w="9525">
                   <a:solidFill>
                     <a:srgbClr val="000000"/>
                   </a:solidFill>
@@ -43856,7 +43856,7 @@
             </a:ln>
             <a:extLst>
               <a:ext uri="{91240B29-F687-4f45-9708-019B960494DF}">
-                <a14:hiddenLine xmlns:a14="http://schemas.microsoft.com/office/drawing/2010/main" xmlns:p14="http://schemas.microsoft.com/office/powerpoint/2010/main" xmlns:a16="http://schemas.microsoft.com/office/drawing/2014/main" xmlns="" w="9525">
+                <a14:hiddenLine xmlns="" xmlns:a16="http://schemas.microsoft.com/office/drawing/2014/main" xmlns:p14="http://schemas.microsoft.com/office/powerpoint/2010/main" xmlns:a14="http://schemas.microsoft.com/office/drawing/2010/main" w="9525">
                   <a:solidFill>
                     <a:srgbClr val="000000"/>
                   </a:solidFill>
@@ -43961,7 +43961,7 @@
             </a:ln>
             <a:extLst>
               <a:ext uri="{91240B29-F687-4f45-9708-019B960494DF}">
-                <a14:hiddenLine xmlns:a14="http://schemas.microsoft.com/office/drawing/2010/main" xmlns:p14="http://schemas.microsoft.com/office/powerpoint/2010/main" xmlns:a16="http://schemas.microsoft.com/office/drawing/2014/main" xmlns="" w="9525">
+                <a14:hiddenLine xmlns="" xmlns:a16="http://schemas.microsoft.com/office/drawing/2014/main" xmlns:p14="http://schemas.microsoft.com/office/powerpoint/2010/main" xmlns:a14="http://schemas.microsoft.com/office/drawing/2010/main" w="9525">
                   <a:solidFill>
                     <a:srgbClr val="000000"/>
                   </a:solidFill>
@@ -44038,7 +44038,7 @@
             </a:ln>
             <a:extLst>
               <a:ext uri="{91240B29-F687-4f45-9708-019B960494DF}">
-                <a14:hiddenLine xmlns:a14="http://schemas.microsoft.com/office/drawing/2010/main" xmlns:p14="http://schemas.microsoft.com/office/powerpoint/2010/main" xmlns:a16="http://schemas.microsoft.com/office/drawing/2014/main" xmlns="" w="9525">
+                <a14:hiddenLine xmlns="" xmlns:a16="http://schemas.microsoft.com/office/drawing/2014/main" xmlns:p14="http://schemas.microsoft.com/office/powerpoint/2010/main" xmlns:a14="http://schemas.microsoft.com/office/drawing/2010/main" w="9525">
                   <a:solidFill>
                     <a:srgbClr val="000000"/>
                   </a:solidFill>
@@ -44143,7 +44143,7 @@
             </a:ln>
             <a:extLst>
               <a:ext uri="{91240B29-F687-4f45-9708-019B960494DF}">
-                <a14:hiddenLine xmlns:a14="http://schemas.microsoft.com/office/drawing/2010/main" xmlns:p14="http://schemas.microsoft.com/office/powerpoint/2010/main" xmlns:a16="http://schemas.microsoft.com/office/drawing/2014/main" xmlns="" w="9525">
+                <a14:hiddenLine xmlns="" xmlns:a16="http://schemas.microsoft.com/office/drawing/2014/main" xmlns:p14="http://schemas.microsoft.com/office/powerpoint/2010/main" xmlns:a14="http://schemas.microsoft.com/office/drawing/2010/main" w="9525">
                   <a:solidFill>
                     <a:srgbClr val="000000"/>
                   </a:solidFill>
@@ -44223,7 +44223,7 @@
             </a:ln>
             <a:extLst>
               <a:ext uri="{91240B29-F687-4f45-9708-019B960494DF}">
-                <a14:hiddenLine xmlns:a14="http://schemas.microsoft.com/office/drawing/2010/main" xmlns:p14="http://schemas.microsoft.com/office/powerpoint/2010/main" xmlns:a16="http://schemas.microsoft.com/office/drawing/2014/main" xmlns="" w="9525">
+                <a14:hiddenLine xmlns="" xmlns:a16="http://schemas.microsoft.com/office/drawing/2014/main" xmlns:p14="http://schemas.microsoft.com/office/powerpoint/2010/main" xmlns:a14="http://schemas.microsoft.com/office/drawing/2010/main" w="9525">
                   <a:solidFill>
                     <a:srgbClr val="000000"/>
                   </a:solidFill>
@@ -44300,7 +44300,7 @@
             </a:ln>
             <a:extLst>
               <a:ext uri="{91240B29-F687-4f45-9708-019B960494DF}">
-                <a14:hiddenLine xmlns:a14="http://schemas.microsoft.com/office/drawing/2010/main" xmlns:p14="http://schemas.microsoft.com/office/powerpoint/2010/main" xmlns:a16="http://schemas.microsoft.com/office/drawing/2014/main" xmlns="" w="9525">
+                <a14:hiddenLine xmlns="" xmlns:a16="http://schemas.microsoft.com/office/drawing/2014/main" xmlns:p14="http://schemas.microsoft.com/office/powerpoint/2010/main" xmlns:a14="http://schemas.microsoft.com/office/drawing/2010/main" w="9525">
                   <a:solidFill>
                     <a:srgbClr val="000000"/>
                   </a:solidFill>
@@ -44405,7 +44405,7 @@
             </a:ln>
             <a:extLst>
               <a:ext uri="{91240B29-F687-4f45-9708-019B960494DF}">
-                <a14:hiddenLine xmlns:a14="http://schemas.microsoft.com/office/drawing/2010/main" xmlns:p14="http://schemas.microsoft.com/office/powerpoint/2010/main" xmlns:a16="http://schemas.microsoft.com/office/drawing/2014/main" xmlns="" w="9525">
+                <a14:hiddenLine xmlns="" xmlns:a16="http://schemas.microsoft.com/office/drawing/2014/main" xmlns:p14="http://schemas.microsoft.com/office/powerpoint/2010/main" xmlns:a14="http://schemas.microsoft.com/office/drawing/2010/main" w="9525">
                   <a:solidFill>
                     <a:srgbClr val="000000"/>
                   </a:solidFill>
@@ -44510,7 +44510,7 @@
             </a:ln>
             <a:extLst>
               <a:ext uri="{91240B29-F687-4f45-9708-019B960494DF}">
-                <a14:hiddenLine xmlns:a14="http://schemas.microsoft.com/office/drawing/2010/main" xmlns:p14="http://schemas.microsoft.com/office/powerpoint/2010/main" xmlns:a16="http://schemas.microsoft.com/office/drawing/2014/main" xmlns="" w="9525">
+                <a14:hiddenLine xmlns="" xmlns:a16="http://schemas.microsoft.com/office/drawing/2014/main" xmlns:p14="http://schemas.microsoft.com/office/powerpoint/2010/main" xmlns:a14="http://schemas.microsoft.com/office/drawing/2010/main" w="9525">
                   <a:solidFill>
                     <a:srgbClr val="000000"/>
                   </a:solidFill>
@@ -44590,7 +44590,7 @@
             </a:ln>
             <a:extLst>
               <a:ext uri="{91240B29-F687-4f45-9708-019B960494DF}">
-                <a14:hiddenLine xmlns:a14="http://schemas.microsoft.com/office/drawing/2010/main" xmlns:p14="http://schemas.microsoft.com/office/powerpoint/2010/main" xmlns:a16="http://schemas.microsoft.com/office/drawing/2014/main" xmlns="" w="9525">
+                <a14:hiddenLine xmlns="" xmlns:a16="http://schemas.microsoft.com/office/drawing/2014/main" xmlns:p14="http://schemas.microsoft.com/office/powerpoint/2010/main" xmlns:a14="http://schemas.microsoft.com/office/drawing/2010/main" w="9525">
                   <a:solidFill>
                     <a:srgbClr val="000000"/>
                   </a:solidFill>
@@ -44725,7 +44725,7 @@
             </a:ln>
             <a:extLst>
               <a:ext uri="{91240B29-F687-4f45-9708-019B960494DF}">
-                <a14:hiddenLine xmlns:a14="http://schemas.microsoft.com/office/drawing/2010/main" xmlns:p14="http://schemas.microsoft.com/office/powerpoint/2010/main" xmlns:a16="http://schemas.microsoft.com/office/drawing/2014/main" xmlns="" w="9525">
+                <a14:hiddenLine xmlns="" xmlns:a16="http://schemas.microsoft.com/office/drawing/2014/main" xmlns:p14="http://schemas.microsoft.com/office/powerpoint/2010/main" xmlns:a14="http://schemas.microsoft.com/office/drawing/2010/main" w="9525">
                   <a:solidFill>
                     <a:srgbClr val="000000"/>
                   </a:solidFill>

</xml_diff>

<commit_message>
fixed grammar issue and renamed backup slides to supplemental analysis.
</commit_message>
<xml_diff>
--- a/Presentation/MSDS_7330_Group_Project_Presentation.pptx
+++ b/Presentation/MSDS_7330_Group_Project_Presentation.pptx
@@ -5992,7 +5992,7 @@
           <a:p>
             <a:fld id="{8255D30F-08CA-F947-9E33-FA70FD82FF0C}" type="datetimeFigureOut">
               <a:rPr lang="en-US" smtClean="0"/>
-              <a:t>11/25/2018</a:t>
+              <a:t>11/26/2018</a:t>
             </a:fld>
             <a:endParaRPr lang="en-US"/>
           </a:p>
@@ -11315,7 +11315,7 @@
           <a:p>
             <a:fld id="{48A87A34-81AB-432B-8DAE-1953F412C126}" type="datetimeFigureOut">
               <a:rPr lang="en-US" dirty="0"/>
-              <a:t>11/25/2018</a:t>
+              <a:t>11/26/2018</a:t>
             </a:fld>
             <a:endParaRPr lang="en-US" dirty="0"/>
           </a:p>
@@ -11577,7 +11577,7 @@
           <a:p>
             <a:fld id="{48A87A34-81AB-432B-8DAE-1953F412C126}" type="datetimeFigureOut">
               <a:rPr lang="en-US" dirty="0"/>
-              <a:t>11/25/2018</a:t>
+              <a:t>11/26/2018</a:t>
             </a:fld>
             <a:endParaRPr lang="en-US" dirty="0"/>
           </a:p>
@@ -11768,7 +11768,7 @@
           <a:p>
             <a:fld id="{48A87A34-81AB-432B-8DAE-1953F412C126}" type="datetimeFigureOut">
               <a:rPr lang="en-US" dirty="0"/>
-              <a:t>11/25/2018</a:t>
+              <a:t>11/26/2018</a:t>
             </a:fld>
             <a:endParaRPr lang="en-US" dirty="0"/>
           </a:p>
@@ -12026,7 +12026,7 @@
           <a:p>
             <a:fld id="{48A87A34-81AB-432B-8DAE-1953F412C126}" type="datetimeFigureOut">
               <a:rPr lang="en-US" dirty="0"/>
-              <a:t>11/25/2018</a:t>
+              <a:t>11/26/2018</a:t>
             </a:fld>
             <a:endParaRPr lang="en-US" dirty="0"/>
           </a:p>
@@ -12455,7 +12455,7 @@
           <a:p>
             <a:fld id="{48A87A34-81AB-432B-8DAE-1953F412C126}" type="datetimeFigureOut">
               <a:rPr lang="en-US" dirty="0"/>
-              <a:t>11/25/2018</a:t>
+              <a:t>11/26/2018</a:t>
             </a:fld>
             <a:endParaRPr lang="en-US" dirty="0"/>
           </a:p>
@@ -12996,7 +12996,7 @@
           <a:p>
             <a:fld id="{48A87A34-81AB-432B-8DAE-1953F412C126}" type="datetimeFigureOut">
               <a:rPr lang="en-US" dirty="0"/>
-              <a:t>11/25/2018</a:t>
+              <a:t>11/26/2018</a:t>
             </a:fld>
             <a:endParaRPr lang="en-US" dirty="0"/>
           </a:p>
@@ -13711,7 +13711,7 @@
           <a:p>
             <a:fld id="{48A87A34-81AB-432B-8DAE-1953F412C126}" type="datetimeFigureOut">
               <a:rPr lang="en-US" dirty="0"/>
-              <a:t>11/25/2018</a:t>
+              <a:t>11/26/2018</a:t>
             </a:fld>
             <a:endParaRPr lang="en-US" dirty="0"/>
           </a:p>
@@ -13876,7 +13876,7 @@
           <a:p>
             <a:fld id="{48A87A34-81AB-432B-8DAE-1953F412C126}" type="datetimeFigureOut">
               <a:rPr lang="en-US" dirty="0"/>
-              <a:t>11/25/2018</a:t>
+              <a:t>11/26/2018</a:t>
             </a:fld>
             <a:endParaRPr lang="en-US" dirty="0"/>
           </a:p>
@@ -14051,7 +14051,7 @@
           <a:p>
             <a:fld id="{48A87A34-81AB-432B-8DAE-1953F412C126}" type="datetimeFigureOut">
               <a:rPr lang="en-US" dirty="0"/>
-              <a:t>11/25/2018</a:t>
+              <a:t>11/26/2018</a:t>
             </a:fld>
             <a:endParaRPr lang="en-US" dirty="0"/>
           </a:p>
@@ -14216,7 +14216,7 @@
           <a:p>
             <a:fld id="{48A87A34-81AB-432B-8DAE-1953F412C126}" type="datetimeFigureOut">
               <a:rPr lang="en-US" dirty="0"/>
-              <a:t>11/25/2018</a:t>
+              <a:t>11/26/2018</a:t>
             </a:fld>
             <a:endParaRPr lang="en-US" dirty="0"/>
           </a:p>
@@ -14461,7 +14461,7 @@
           <a:p>
             <a:fld id="{48A87A34-81AB-432B-8DAE-1953F412C126}" type="datetimeFigureOut">
               <a:rPr lang="en-US" dirty="0"/>
-              <a:t>11/25/2018</a:t>
+              <a:t>11/26/2018</a:t>
             </a:fld>
             <a:endParaRPr lang="en-US" dirty="0"/>
           </a:p>
@@ -14688,7 +14688,7 @@
           <a:p>
             <a:fld id="{48A87A34-81AB-432B-8DAE-1953F412C126}" type="datetimeFigureOut">
               <a:rPr lang="en-US" dirty="0"/>
-              <a:t>11/25/2018</a:t>
+              <a:t>11/26/2018</a:t>
             </a:fld>
             <a:endParaRPr lang="en-US" dirty="0"/>
           </a:p>
@@ -15064,7 +15064,7 @@
           <a:p>
             <a:fld id="{48A87A34-81AB-432B-8DAE-1953F412C126}" type="datetimeFigureOut">
               <a:rPr lang="en-US" dirty="0"/>
-              <a:t>11/25/2018</a:t>
+              <a:t>11/26/2018</a:t>
             </a:fld>
             <a:endParaRPr lang="en-US" dirty="0"/>
           </a:p>
@@ -15177,7 +15177,7 @@
           <a:p>
             <a:fld id="{48A87A34-81AB-432B-8DAE-1953F412C126}" type="datetimeFigureOut">
               <a:rPr lang="en-US" dirty="0"/>
-              <a:t>11/25/2018</a:t>
+              <a:t>11/26/2018</a:t>
             </a:fld>
             <a:endParaRPr lang="en-US" dirty="0"/>
           </a:p>
@@ -15267,7 +15267,7 @@
           <a:p>
             <a:fld id="{48A87A34-81AB-432B-8DAE-1953F412C126}" type="datetimeFigureOut">
               <a:rPr lang="en-US" dirty="0"/>
-              <a:t>11/25/2018</a:t>
+              <a:t>11/26/2018</a:t>
             </a:fld>
             <a:endParaRPr lang="en-US" dirty="0"/>
           </a:p>
@@ -15511,7 +15511,7 @@
           <a:p>
             <a:fld id="{48A87A34-81AB-432B-8DAE-1953F412C126}" type="datetimeFigureOut">
               <a:rPr lang="en-US" dirty="0"/>
-              <a:t>11/25/2018</a:t>
+              <a:t>11/26/2018</a:t>
             </a:fld>
             <a:endParaRPr lang="en-US" dirty="0"/>
           </a:p>
@@ -15786,7 +15786,7 @@
           <a:p>
             <a:fld id="{48A87A34-81AB-432B-8DAE-1953F412C126}" type="datetimeFigureOut">
               <a:rPr lang="en-US" dirty="0"/>
-              <a:t>11/25/2018</a:t>
+              <a:t>11/26/2018</a:t>
             </a:fld>
             <a:endParaRPr lang="en-US" dirty="0"/>
           </a:p>
@@ -18859,7 +18859,7 @@
             <a:fld id="{48A87A34-81AB-432B-8DAE-1953F412C126}" type="datetimeFigureOut">
               <a:rPr lang="en-US" dirty="0"/>
               <a:pPr/>
-              <a:t>11/25/2018</a:t>
+              <a:t>11/26/2018</a:t>
             </a:fld>
             <a:endParaRPr lang="en-US" dirty="0"/>
           </a:p>
@@ -47064,7 +47064,7 @@
           <a:p>
             <a:r>
               <a:rPr lang="en-US" dirty="0"/>
-              <a:t>Back up slides</a:t>
+              <a:t>Supplemental Analysis</a:t>
             </a:r>
           </a:p>
         </p:txBody>
@@ -47395,7 +47395,7 @@
           <a:p>
             <a:r>
               <a:rPr lang="en-US" dirty="0"/>
-              <a:t>American Outdoor stock has dropped quite a bit during Trump presidency, but Ruger seems to stay consistent between party affiliation</a:t>
+              <a:t>American Outdoor stock has dropped quite a bit during Trump presidency, but Ruger seems to stay consistent between party affiliation.</a:t>
             </a:r>
           </a:p>
           <a:p>
@@ -47404,7 +47404,7 @@
           <a:p>
             <a:r>
               <a:rPr lang="en-US" dirty="0"/>
-              <a:t>Ruger is a much larger company then American Outdoor.  Possible reason for withstanding better stock prices.</a:t>
+              <a:t>Ruger is a much larger company than American Outdoor.  Possible reason for withstanding better stock prices.</a:t>
             </a:r>
           </a:p>
         </p:txBody>
@@ -47571,7 +47571,7 @@
           <a:p>
             <a:r>
               <a:rPr lang="en-US" dirty="0"/>
-              <a:t>Back up slides</a:t>
+              <a:t>Supplemental Analysis</a:t>
             </a:r>
           </a:p>
         </p:txBody>

</xml_diff>